<commit_message>
Eliminada la captura del repo
</commit_message>
<xml_diff>
--- a/doc/Presentación_mitad_de_curso_JuanEspinosayNachoRodriguez.pptx
+++ b/doc/Presentación_mitad_de_curso_JuanEspinosayNachoRodriguez.pptx
@@ -5,16 +5,15 @@
     <p:sldMasterId id="2147483648" r:id="rId1"/>
   </p:sldMasterIdLst>
   <p:notesMasterIdLst>
-    <p:notesMasterId r:id="rId9"/>
+    <p:notesMasterId r:id="rId8"/>
   </p:notesMasterIdLst>
   <p:sldIdLst>
     <p:sldId id="256" r:id="rId2"/>
     <p:sldId id="257" r:id="rId3"/>
-    <p:sldId id="258" r:id="rId4"/>
-    <p:sldId id="259" r:id="rId5"/>
-    <p:sldId id="260" r:id="rId6"/>
-    <p:sldId id="261" r:id="rId7"/>
-    <p:sldId id="262" r:id="rId8"/>
+    <p:sldId id="259" r:id="rId4"/>
+    <p:sldId id="260" r:id="rId5"/>
+    <p:sldId id="261" r:id="rId6"/>
+    <p:sldId id="262" r:id="rId7"/>
   </p:sldIdLst>
   <p:sldSz cx="12192000" cy="6858000"/>
   <p:notesSz cx="6858000" cy="9144000"/>
@@ -203,7 +202,7 @@
           <a:p>
             <a:fld id="{6494474F-FB99-4D66-9794-76C269664995}" type="datetimeFigureOut">
               <a:rPr lang="es-ES" smtClean="0"/>
-              <a:t>31/03/2022</a:t>
+              <a:t>05/04/2022</a:t>
             </a:fld>
             <a:endParaRPr lang="es-ES"/>
           </a:p>
@@ -516,29 +515,34 @@
           <a:p>
             <a:r>
               <a:rPr lang="es-ES" dirty="0"/>
-              <a:t>Actualmente, tenemos un repositorio en GitHub donde tenemos toda la información de nuestro proyecto.</a:t>
-            </a:r>
-          </a:p>
-          <a:p>
-            <a:r>
-              <a:rPr lang="es-ES" dirty="0">
-                <a:hlinkClick r:id="rId3"/>
-              </a:rPr>
-              <a:t>https://github.com/JuanEspinosa97/tis_2022_repositorio</a:t>
-            </a:r>
-            <a:endParaRPr lang="es-ES" dirty="0"/>
-          </a:p>
-          <a:p>
-            <a:r>
-              <a:rPr lang="es-ES" dirty="0">
-                <a:hlinkClick r:id="rId4"/>
-              </a:rPr>
-              <a:t>https://github.com/IgnacioRodrig/tis_2022_repositorio</a:t>
-            </a:r>
-            <a:endParaRPr lang="es-ES" dirty="0"/>
-          </a:p>
-          <a:p>
-            <a:endParaRPr lang="es-ES" dirty="0"/>
+              <a:t>Este diagrama UML está basado en un hospital privado en el que encontramos 3 actores principales que son: enfermera, paciente y doctor. </a:t>
+            </a:r>
+          </a:p>
+          <a:p>
+            <a:r>
+              <a:rPr lang="es-ES" dirty="0"/>
+              <a:t>*Cada uno va a poder </a:t>
+            </a:r>
+            <a:r>
+              <a:rPr lang="es-ES" dirty="0" err="1"/>
+              <a:t>logearse</a:t>
+            </a:r>
+            <a:r>
+              <a:rPr lang="es-ES" dirty="0"/>
+              <a:t> sin problema en la aplicación específica del hospital lo que les va a permitir consultar el historial de sus pacientes. </a:t>
+            </a:r>
+          </a:p>
+          <a:p>
+            <a:r>
+              <a:rPr lang="es-ES" dirty="0"/>
+              <a:t>*El doctor va a ser el único que va a poder modificar dicho historial con el fin de proteger los datos del paciente. </a:t>
+            </a:r>
+          </a:p>
+          <a:p>
+            <a:r>
+              <a:rPr lang="es-ES" dirty="0"/>
+              <a:t>*El paciente podrá pedir cita sin problema a través de la aplicación y, en caso de que ya lo hubiese hecho, darle la opción de modificar la fecha asignada siempre y cuando esté disponible. Una vez finalizado el encuentro con el doctor llega el momento de pagar. Si es miembro de una aseguradora privada, el hospital habla con dicha aseguradora para tramitar el cobro. En caso contrario, al paciente se le da la opción de pagar en efectivo o tarjeta.</a:t>
+            </a:r>
           </a:p>
         </p:txBody>
       </p:sp>
@@ -568,7 +572,7 @@
     </p:spTree>
     <p:extLst>
       <p:ext uri="{BB962C8B-B14F-4D97-AF65-F5344CB8AC3E}">
-        <p14:creationId xmlns:p14="http://schemas.microsoft.com/office/powerpoint/2010/main" val="158017563"/>
+        <p14:creationId xmlns:p14="http://schemas.microsoft.com/office/powerpoint/2010/main" val="1109452671"/>
       </p:ext>
     </p:extLst>
   </p:cSld>
@@ -623,35 +627,543 @@
           <a:lstStyle/>
           <a:p>
             <a:r>
-              <a:rPr lang="es-ES" dirty="0"/>
-              <a:t>Este diagrama UML está basado en un hospital privado en el que encontramos 3 actores principales que son: enfermera, paciente y doctor. </a:t>
-            </a:r>
-          </a:p>
-          <a:p>
-            <a:r>
-              <a:rPr lang="es-ES" dirty="0"/>
-              <a:t>*Cada uno va a poder </a:t>
-            </a:r>
-            <a:r>
-              <a:rPr lang="es-ES" dirty="0" err="1"/>
-              <a:t>logearse</a:t>
-            </a:r>
-            <a:r>
-              <a:rPr lang="es-ES" dirty="0"/>
-              <a:t> sin problema en la aplicación específica del hospital lo que les va a permitir consultar el historial de sus pacientes. </a:t>
-            </a:r>
-          </a:p>
-          <a:p>
-            <a:r>
-              <a:rPr lang="es-ES" dirty="0"/>
-              <a:t>*El doctor va a ser el único que va a poder modificar dicho historial con el fin de proteger los datos del paciente. </a:t>
-            </a:r>
-          </a:p>
-          <a:p>
-            <a:r>
-              <a:rPr lang="es-ES" dirty="0"/>
-              <a:t>*El paciente podrá pedir cita sin problema a través de la aplicación y, en caso de que ya lo hubiese hecho, darle la opción de modificar la fecha asignada siempre y cuando esté disponible. Una vez finalizado el encuentro con el doctor llega el momento de pagar. Si es miembro de una aseguradora privada, el hospital habla con dicha aseguradora para tramitar el cobro. En caso contrario, al paciente se le da la opción de pagar en efectivo o tarjeta.</a:t>
-            </a:r>
+              <a:rPr lang="es-ES" b="0" dirty="0">
+                <a:solidFill>
+                  <a:srgbClr val="D4D4D4"/>
+                </a:solidFill>
+                <a:effectLst/>
+                <a:latin typeface="Consolas" panose="020B0609020204030204" pitchFamily="49" charset="0"/>
+              </a:rPr>
+              <a:t>-En la tabla Departamentos tenemos las columnas Id, Nombre y </a:t>
+            </a:r>
+            <a:r>
+              <a:rPr lang="es-ES" b="0" dirty="0" err="1">
+                <a:solidFill>
+                  <a:srgbClr val="D4D4D4"/>
+                </a:solidFill>
+                <a:effectLst/>
+                <a:latin typeface="Consolas" panose="020B0609020204030204" pitchFamily="49" charset="0"/>
+              </a:rPr>
+              <a:t>NumEmpleados</a:t>
+            </a:r>
+            <a:r>
+              <a:rPr lang="es-ES" b="0" dirty="0">
+                <a:solidFill>
+                  <a:srgbClr val="D4D4D4"/>
+                </a:solidFill>
+                <a:effectLst/>
+                <a:latin typeface="Consolas" panose="020B0609020204030204" pitchFamily="49" charset="0"/>
+              </a:rPr>
+              <a:t>. Tenemos un Id </a:t>
+            </a:r>
+            <a:r>
+              <a:rPr lang="es-ES" b="0" dirty="0" err="1">
+                <a:solidFill>
+                  <a:srgbClr val="D4D4D4"/>
+                </a:solidFill>
+                <a:effectLst/>
+                <a:latin typeface="Consolas" panose="020B0609020204030204" pitchFamily="49" charset="0"/>
+              </a:rPr>
+              <a:t>unico</a:t>
+            </a:r>
+            <a:r>
+              <a:rPr lang="es-ES" b="0" dirty="0">
+                <a:solidFill>
+                  <a:srgbClr val="D4D4D4"/>
+                </a:solidFill>
+                <a:effectLst/>
+                <a:latin typeface="Consolas" panose="020B0609020204030204" pitchFamily="49" charset="0"/>
+              </a:rPr>
+              <a:t> para cada departamento.</a:t>
+            </a:r>
+          </a:p>
+          <a:p>
+            <a:br>
+              <a:rPr lang="es-ES" b="0" dirty="0">
+                <a:solidFill>
+                  <a:srgbClr val="D4D4D4"/>
+                </a:solidFill>
+                <a:effectLst/>
+                <a:latin typeface="Consolas" panose="020B0609020204030204" pitchFamily="49" charset="0"/>
+              </a:rPr>
+            </a:br>
+            <a:r>
+              <a:rPr lang="es-ES" b="0" dirty="0">
+                <a:solidFill>
+                  <a:srgbClr val="D4D4D4"/>
+                </a:solidFill>
+                <a:effectLst/>
+                <a:latin typeface="Consolas" panose="020B0609020204030204" pitchFamily="49" charset="0"/>
+              </a:rPr>
+              <a:t>    -En la tabla Doctores tenemos las columnas Id, Nombre, </a:t>
+            </a:r>
+            <a:r>
+              <a:rPr lang="es-ES" b="0" dirty="0" err="1">
+                <a:solidFill>
+                  <a:srgbClr val="D4D4D4"/>
+                </a:solidFill>
+                <a:effectLst/>
+                <a:latin typeface="Consolas" panose="020B0609020204030204" pitchFamily="49" charset="0"/>
+              </a:rPr>
+              <a:t>NumColegiado</a:t>
+            </a:r>
+            <a:r>
+              <a:rPr lang="es-ES" b="0" dirty="0">
+                <a:solidFill>
+                  <a:srgbClr val="D4D4D4"/>
+                </a:solidFill>
+                <a:effectLst/>
+                <a:latin typeface="Consolas" panose="020B0609020204030204" pitchFamily="49" charset="0"/>
+              </a:rPr>
+              <a:t>, Edad, Sexo y </a:t>
+            </a:r>
+            <a:r>
+              <a:rPr lang="es-ES" b="0" dirty="0" err="1">
+                <a:solidFill>
+                  <a:srgbClr val="D4D4D4"/>
+                </a:solidFill>
+                <a:effectLst/>
+                <a:latin typeface="Consolas" panose="020B0609020204030204" pitchFamily="49" charset="0"/>
+              </a:rPr>
+              <a:t>IdDep</a:t>
+            </a:r>
+            <a:r>
+              <a:rPr lang="es-ES" b="0" dirty="0">
+                <a:solidFill>
+                  <a:srgbClr val="D4D4D4"/>
+                </a:solidFill>
+                <a:effectLst/>
+                <a:latin typeface="Consolas" panose="020B0609020204030204" pitchFamily="49" charset="0"/>
+              </a:rPr>
+              <a:t>. </a:t>
+            </a:r>
+            <a:r>
+              <a:rPr lang="es-ES" b="0" dirty="0" err="1">
+                <a:solidFill>
+                  <a:srgbClr val="D4D4D4"/>
+                </a:solidFill>
+                <a:effectLst/>
+                <a:latin typeface="Consolas" panose="020B0609020204030204" pitchFamily="49" charset="0"/>
+              </a:rPr>
+              <a:t>IdDep</a:t>
+            </a:r>
+            <a:r>
+              <a:rPr lang="es-ES" b="0" dirty="0">
+                <a:solidFill>
+                  <a:srgbClr val="D4D4D4"/>
+                </a:solidFill>
+                <a:effectLst/>
+                <a:latin typeface="Consolas" panose="020B0609020204030204" pitchFamily="49" charset="0"/>
+              </a:rPr>
+              <a:t> es una FOREIGN KEY </a:t>
+            </a:r>
+            <a:r>
+              <a:rPr lang="es-ES" b="0" dirty="0" err="1">
+                <a:solidFill>
+                  <a:srgbClr val="D4D4D4"/>
+                </a:solidFill>
+                <a:effectLst/>
+                <a:latin typeface="Consolas" panose="020B0609020204030204" pitchFamily="49" charset="0"/>
+              </a:rPr>
+              <a:t>wue</a:t>
+            </a:r>
+            <a:r>
+              <a:rPr lang="es-ES" b="0" dirty="0">
+                <a:solidFill>
+                  <a:srgbClr val="D4D4D4"/>
+                </a:solidFill>
+                <a:effectLst/>
+                <a:latin typeface="Consolas" panose="020B0609020204030204" pitchFamily="49" charset="0"/>
+              </a:rPr>
+              <a:t> referencia a la columna Id de la tabla departamentos. La columna Sexo solo puede </a:t>
+            </a:r>
+            <a:r>
+              <a:rPr lang="es-ES" b="0" dirty="0" err="1">
+                <a:solidFill>
+                  <a:srgbClr val="D4D4D4"/>
+                </a:solidFill>
+                <a:effectLst/>
+                <a:latin typeface="Consolas" panose="020B0609020204030204" pitchFamily="49" charset="0"/>
+              </a:rPr>
+              <a:t>rellenarase</a:t>
+            </a:r>
+            <a:r>
+              <a:rPr lang="es-ES" b="0" dirty="0">
+                <a:solidFill>
+                  <a:srgbClr val="D4D4D4"/>
+                </a:solidFill>
+                <a:effectLst/>
+                <a:latin typeface="Consolas" panose="020B0609020204030204" pitchFamily="49" charset="0"/>
+              </a:rPr>
+              <a:t> con los valores 'Hombre', 'Mujer' y puede ser NULL. </a:t>
+            </a:r>
+          </a:p>
+          <a:p>
+            <a:br>
+              <a:rPr lang="es-ES" b="0" dirty="0">
+                <a:solidFill>
+                  <a:srgbClr val="D4D4D4"/>
+                </a:solidFill>
+                <a:effectLst/>
+                <a:latin typeface="Consolas" panose="020B0609020204030204" pitchFamily="49" charset="0"/>
+              </a:rPr>
+            </a:br>
+            <a:r>
+              <a:rPr lang="es-ES" b="0" dirty="0">
+                <a:solidFill>
+                  <a:srgbClr val="D4D4D4"/>
+                </a:solidFill>
+                <a:effectLst/>
+                <a:latin typeface="Consolas" panose="020B0609020204030204" pitchFamily="49" charset="0"/>
+              </a:rPr>
+              <a:t>    -La tabla Enfermeros tiene las columnas Id, Nombre y Edad. El Id es </a:t>
+            </a:r>
+            <a:r>
+              <a:rPr lang="es-ES" b="0" dirty="0" err="1">
+                <a:solidFill>
+                  <a:srgbClr val="D4D4D4"/>
+                </a:solidFill>
+                <a:effectLst/>
+                <a:latin typeface="Consolas" panose="020B0609020204030204" pitchFamily="49" charset="0"/>
+              </a:rPr>
+              <a:t>unico</a:t>
+            </a:r>
+            <a:r>
+              <a:rPr lang="es-ES" b="0" dirty="0">
+                <a:solidFill>
+                  <a:srgbClr val="D4D4D4"/>
+                </a:solidFill>
+                <a:effectLst/>
+                <a:latin typeface="Consolas" panose="020B0609020204030204" pitchFamily="49" charset="0"/>
+              </a:rPr>
+              <a:t> para cada elemento.</a:t>
+            </a:r>
+          </a:p>
+          <a:p>
+            <a:br>
+              <a:rPr lang="es-ES" b="0" dirty="0">
+                <a:solidFill>
+                  <a:srgbClr val="D4D4D4"/>
+                </a:solidFill>
+                <a:effectLst/>
+                <a:latin typeface="Consolas" panose="020B0609020204030204" pitchFamily="49" charset="0"/>
+              </a:rPr>
+            </a:br>
+            <a:r>
+              <a:rPr lang="es-ES" b="0" dirty="0">
+                <a:solidFill>
+                  <a:srgbClr val="D4D4D4"/>
+                </a:solidFill>
+                <a:effectLst/>
+                <a:latin typeface="Consolas" panose="020B0609020204030204" pitchFamily="49" charset="0"/>
+              </a:rPr>
+              <a:t>    -La tabla </a:t>
+            </a:r>
+            <a:r>
+              <a:rPr lang="es-ES" b="0" dirty="0" err="1">
+                <a:solidFill>
+                  <a:srgbClr val="D4D4D4"/>
+                </a:solidFill>
+                <a:effectLst/>
+                <a:latin typeface="Consolas" panose="020B0609020204030204" pitchFamily="49" charset="0"/>
+              </a:rPr>
+              <a:t>EnfermerosPacientes</a:t>
+            </a:r>
+            <a:r>
+              <a:rPr lang="es-ES" b="0" dirty="0">
+                <a:solidFill>
+                  <a:srgbClr val="D4D4D4"/>
+                </a:solidFill>
+                <a:effectLst/>
+                <a:latin typeface="Consolas" panose="020B0609020204030204" pitchFamily="49" charset="0"/>
+              </a:rPr>
+              <a:t> representa la </a:t>
+            </a:r>
+            <a:r>
+              <a:rPr lang="es-ES" b="0" dirty="0" err="1">
+                <a:solidFill>
+                  <a:srgbClr val="D4D4D4"/>
+                </a:solidFill>
+                <a:effectLst/>
+                <a:latin typeface="Consolas" panose="020B0609020204030204" pitchFamily="49" charset="0"/>
+              </a:rPr>
+              <a:t>relacion</a:t>
+            </a:r>
+            <a:r>
+              <a:rPr lang="es-ES" b="0" dirty="0">
+                <a:solidFill>
+                  <a:srgbClr val="D4D4D4"/>
+                </a:solidFill>
+                <a:effectLst/>
+                <a:latin typeface="Consolas" panose="020B0609020204030204" pitchFamily="49" charset="0"/>
+              </a:rPr>
+              <a:t> N-M que tienen estas dos entidades en el diagrama E-R. Consta de dos columnas </a:t>
+            </a:r>
+            <a:r>
+              <a:rPr lang="es-ES" b="0" dirty="0" err="1">
+                <a:solidFill>
+                  <a:srgbClr val="D4D4D4"/>
+                </a:solidFill>
+                <a:effectLst/>
+                <a:latin typeface="Consolas" panose="020B0609020204030204" pitchFamily="49" charset="0"/>
+              </a:rPr>
+              <a:t>IdEnfermero</a:t>
+            </a:r>
+            <a:r>
+              <a:rPr lang="es-ES" b="0" dirty="0">
+                <a:solidFill>
+                  <a:srgbClr val="D4D4D4"/>
+                </a:solidFill>
+                <a:effectLst/>
+                <a:latin typeface="Consolas" panose="020B0609020204030204" pitchFamily="49" charset="0"/>
+              </a:rPr>
+              <a:t> y </a:t>
+            </a:r>
+            <a:r>
+              <a:rPr lang="es-ES" b="0" dirty="0" err="1">
+                <a:solidFill>
+                  <a:srgbClr val="D4D4D4"/>
+                </a:solidFill>
+                <a:effectLst/>
+                <a:latin typeface="Consolas" panose="020B0609020204030204" pitchFamily="49" charset="0"/>
+              </a:rPr>
+              <a:t>IdPaciente</a:t>
+            </a:r>
+            <a:r>
+              <a:rPr lang="es-ES" b="0" dirty="0">
+                <a:solidFill>
+                  <a:srgbClr val="D4D4D4"/>
+                </a:solidFill>
+                <a:effectLst/>
+                <a:latin typeface="Consolas" panose="020B0609020204030204" pitchFamily="49" charset="0"/>
+              </a:rPr>
+              <a:t> ambas son PRIMARY KEY.</a:t>
+            </a:r>
+          </a:p>
+          <a:p>
+            <a:br>
+              <a:rPr lang="es-ES" b="0" dirty="0">
+                <a:solidFill>
+                  <a:srgbClr val="D4D4D4"/>
+                </a:solidFill>
+                <a:effectLst/>
+                <a:latin typeface="Consolas" panose="020B0609020204030204" pitchFamily="49" charset="0"/>
+              </a:rPr>
+            </a:br>
+            <a:r>
+              <a:rPr lang="es-ES" b="0" dirty="0">
+                <a:solidFill>
+                  <a:srgbClr val="D4D4D4"/>
+                </a:solidFill>
+                <a:effectLst/>
+                <a:latin typeface="Consolas" panose="020B0609020204030204" pitchFamily="49" charset="0"/>
+              </a:rPr>
+              <a:t>    -Tabla Habitaciones, consta de las columnas Id, </a:t>
+            </a:r>
+            <a:r>
+              <a:rPr lang="es-ES" b="0" dirty="0" err="1">
+                <a:solidFill>
+                  <a:srgbClr val="D4D4D4"/>
+                </a:solidFill>
+                <a:effectLst/>
+                <a:latin typeface="Consolas" panose="020B0609020204030204" pitchFamily="49" charset="0"/>
+              </a:rPr>
+              <a:t>NumHabitacion</a:t>
+            </a:r>
+            <a:r>
+              <a:rPr lang="es-ES" b="0" dirty="0">
+                <a:solidFill>
+                  <a:srgbClr val="D4D4D4"/>
+                </a:solidFill>
+                <a:effectLst/>
+                <a:latin typeface="Consolas" panose="020B0609020204030204" pitchFamily="49" charset="0"/>
+              </a:rPr>
+              <a:t> y Estado. Estado solo puede rellenarse con los valores 'Libre' o 'Ocupado'. </a:t>
+            </a:r>
+          </a:p>
+          <a:p>
+            <a:br>
+              <a:rPr lang="es-ES" b="0" dirty="0">
+                <a:solidFill>
+                  <a:srgbClr val="D4D4D4"/>
+                </a:solidFill>
+                <a:effectLst/>
+                <a:latin typeface="Consolas" panose="020B0609020204030204" pitchFamily="49" charset="0"/>
+              </a:rPr>
+            </a:br>
+            <a:r>
+              <a:rPr lang="es-ES" b="0" dirty="0">
+                <a:solidFill>
+                  <a:srgbClr val="D4D4D4"/>
+                </a:solidFill>
+                <a:effectLst/>
+                <a:latin typeface="Consolas" panose="020B0609020204030204" pitchFamily="49" charset="0"/>
+              </a:rPr>
+              <a:t>    -La tabla Pacientes tiene las columnas Id, Nombre, Edad, </a:t>
+            </a:r>
+            <a:r>
+              <a:rPr lang="es-ES" b="0" dirty="0" err="1">
+                <a:solidFill>
+                  <a:srgbClr val="D4D4D4"/>
+                </a:solidFill>
+                <a:effectLst/>
+                <a:latin typeface="Consolas" panose="020B0609020204030204" pitchFamily="49" charset="0"/>
+              </a:rPr>
+              <a:t>MotivoIngreso</a:t>
+            </a:r>
+            <a:r>
+              <a:rPr lang="es-ES" b="0" dirty="0">
+                <a:solidFill>
+                  <a:srgbClr val="D4D4D4"/>
+                </a:solidFill>
+                <a:effectLst/>
+                <a:latin typeface="Consolas" panose="020B0609020204030204" pitchFamily="49" charset="0"/>
+              </a:rPr>
+              <a:t>, </a:t>
+            </a:r>
+            <a:r>
+              <a:rPr lang="es-ES" b="0" dirty="0" err="1">
+                <a:solidFill>
+                  <a:srgbClr val="D4D4D4"/>
+                </a:solidFill>
+                <a:effectLst/>
+                <a:latin typeface="Consolas" panose="020B0609020204030204" pitchFamily="49" charset="0"/>
+              </a:rPr>
+              <a:t>IdDoctor</a:t>
+            </a:r>
+            <a:r>
+              <a:rPr lang="es-ES" b="0" dirty="0">
+                <a:solidFill>
+                  <a:srgbClr val="D4D4D4"/>
+                </a:solidFill>
+                <a:effectLst/>
+                <a:latin typeface="Consolas" panose="020B0609020204030204" pitchFamily="49" charset="0"/>
+              </a:rPr>
+              <a:t>, </a:t>
+            </a:r>
+            <a:r>
+              <a:rPr lang="es-ES" b="0" dirty="0" err="1">
+                <a:solidFill>
+                  <a:srgbClr val="D4D4D4"/>
+                </a:solidFill>
+                <a:effectLst/>
+                <a:latin typeface="Consolas" panose="020B0609020204030204" pitchFamily="49" charset="0"/>
+              </a:rPr>
+              <a:t>IdHabitacion</a:t>
+            </a:r>
+            <a:r>
+              <a:rPr lang="es-ES" b="0" dirty="0">
+                <a:solidFill>
+                  <a:srgbClr val="D4D4D4"/>
+                </a:solidFill>
+                <a:effectLst/>
+                <a:latin typeface="Consolas" panose="020B0609020204030204" pitchFamily="49" charset="0"/>
+              </a:rPr>
+              <a:t>, </a:t>
+            </a:r>
+            <a:r>
+              <a:rPr lang="es-ES" b="0" dirty="0" err="1">
+                <a:solidFill>
+                  <a:srgbClr val="D4D4D4"/>
+                </a:solidFill>
+                <a:effectLst/>
+                <a:latin typeface="Consolas" panose="020B0609020204030204" pitchFamily="49" charset="0"/>
+              </a:rPr>
+              <a:t>FechaIngreso</a:t>
+            </a:r>
+            <a:r>
+              <a:rPr lang="es-ES" b="0" dirty="0">
+                <a:solidFill>
+                  <a:srgbClr val="D4D4D4"/>
+                </a:solidFill>
+                <a:effectLst/>
+                <a:latin typeface="Consolas" panose="020B0609020204030204" pitchFamily="49" charset="0"/>
+              </a:rPr>
+              <a:t> y Sexo. </a:t>
+            </a:r>
+            <a:r>
+              <a:rPr lang="es-ES" b="0" dirty="0" err="1">
+                <a:solidFill>
+                  <a:srgbClr val="D4D4D4"/>
+                </a:solidFill>
+                <a:effectLst/>
+                <a:latin typeface="Consolas" panose="020B0609020204030204" pitchFamily="49" charset="0"/>
+              </a:rPr>
+              <a:t>IdDoctor</a:t>
+            </a:r>
+            <a:r>
+              <a:rPr lang="es-ES" b="0" dirty="0">
+                <a:solidFill>
+                  <a:srgbClr val="D4D4D4"/>
+                </a:solidFill>
+                <a:effectLst/>
+                <a:latin typeface="Consolas" panose="020B0609020204030204" pitchFamily="49" charset="0"/>
+              </a:rPr>
+              <a:t> y </a:t>
+            </a:r>
+            <a:r>
+              <a:rPr lang="es-ES" b="0" dirty="0" err="1">
+                <a:solidFill>
+                  <a:srgbClr val="D4D4D4"/>
+                </a:solidFill>
+                <a:effectLst/>
+                <a:latin typeface="Consolas" panose="020B0609020204030204" pitchFamily="49" charset="0"/>
+              </a:rPr>
+              <a:t>IdHabitacion</a:t>
+            </a:r>
+            <a:r>
+              <a:rPr lang="es-ES" b="0" dirty="0">
+                <a:solidFill>
+                  <a:srgbClr val="D4D4D4"/>
+                </a:solidFill>
+                <a:effectLst/>
+                <a:latin typeface="Consolas" panose="020B0609020204030204" pitchFamily="49" charset="0"/>
+              </a:rPr>
+              <a:t> son FOREIGN KEY que referencian al id de las tablas Doctores y Habitaciones </a:t>
+            </a:r>
+            <a:r>
+              <a:rPr lang="es-ES" b="0" dirty="0" err="1">
+                <a:solidFill>
+                  <a:srgbClr val="D4D4D4"/>
+                </a:solidFill>
+                <a:effectLst/>
+                <a:latin typeface="Consolas" panose="020B0609020204030204" pitchFamily="49" charset="0"/>
+              </a:rPr>
+              <a:t>respectivamente.La</a:t>
+            </a:r>
+            <a:r>
+              <a:rPr lang="es-ES" b="0" dirty="0">
+                <a:solidFill>
+                  <a:srgbClr val="D4D4D4"/>
+                </a:solidFill>
+                <a:effectLst/>
+                <a:latin typeface="Consolas" panose="020B0609020204030204" pitchFamily="49" charset="0"/>
+              </a:rPr>
+              <a:t> columna Sexo solo puede </a:t>
+            </a:r>
+            <a:r>
+              <a:rPr lang="es-ES" b="0" dirty="0" err="1">
+                <a:solidFill>
+                  <a:srgbClr val="D4D4D4"/>
+                </a:solidFill>
+                <a:effectLst/>
+                <a:latin typeface="Consolas" panose="020B0609020204030204" pitchFamily="49" charset="0"/>
+              </a:rPr>
+              <a:t>rellenarase</a:t>
+            </a:r>
+            <a:r>
+              <a:rPr lang="es-ES" b="0" dirty="0">
+                <a:solidFill>
+                  <a:srgbClr val="D4D4D4"/>
+                </a:solidFill>
+                <a:effectLst/>
+                <a:latin typeface="Consolas" panose="020B0609020204030204" pitchFamily="49" charset="0"/>
+              </a:rPr>
+              <a:t> con los valores 'Hombre', 'Mujer' y puede ser NULL.</a:t>
+            </a:r>
+          </a:p>
+          <a:p>
+            <a:endParaRPr lang="es-ES" dirty="0"/>
           </a:p>
         </p:txBody>
       </p:sp>
@@ -672,7 +1184,7 @@
           <a:p>
             <a:fld id="{850C8A68-B0DA-436B-AE1F-7E2DFF33396B}" type="slidenum">
               <a:rPr lang="es-ES" smtClean="0"/>
-              <a:t>4</a:t>
+              <a:t>5</a:t>
             </a:fld>
             <a:endParaRPr lang="es-ES"/>
           </a:p>
@@ -681,7 +1193,7 @@
     </p:spTree>
     <p:extLst>
       <p:ext uri="{BB962C8B-B14F-4D97-AF65-F5344CB8AC3E}">
-        <p14:creationId xmlns:p14="http://schemas.microsoft.com/office/powerpoint/2010/main" val="1109452671"/>
+        <p14:creationId xmlns:p14="http://schemas.microsoft.com/office/powerpoint/2010/main" val="4214382848"/>
       </p:ext>
     </p:extLst>
   </p:cSld>
@@ -735,6 +1247,23 @@
           <a:bodyPr/>
           <a:lstStyle/>
           <a:p>
+            <a:pPr marL="0" marR="0" lvl="0" indent="0" algn="l" defTabSz="914400" rtl="0" eaLnBrk="1" fontAlgn="auto" latinLnBrk="0" hangingPunct="1">
+              <a:lnSpc>
+                <a:spcPct val="100000"/>
+              </a:lnSpc>
+              <a:spcBef>
+                <a:spcPts val="0"/>
+              </a:spcBef>
+              <a:spcAft>
+                <a:spcPts val="0"/>
+              </a:spcAft>
+              <a:buClrTx/>
+              <a:buSzTx/>
+              <a:buFontTx/>
+              <a:buNone/>
+              <a:tabLst/>
+              <a:defRPr/>
+            </a:pPr>
             <a:r>
               <a:rPr lang="es-ES" b="0" dirty="0">
                 <a:solidFill>
@@ -743,7 +1272,7 @@
                 <a:effectLst/>
                 <a:latin typeface="Consolas" panose="020B0609020204030204" pitchFamily="49" charset="0"/>
               </a:rPr>
-              <a:t>-En la tabla Departamentos tenemos las columnas Id, Nombre y </a:t>
+              <a:t>En este diagrama representamos como es el flujo de la interfaz de nuestro proyecto. Empezando por una identificación para diferenciar entre Pacientes, Doctores y Enfermeros. Luego procedemos a un </a:t>
             </a:r>
             <a:r>
               <a:rPr lang="es-ES" b="0" dirty="0" err="1">
@@ -753,7 +1282,7 @@
                 <a:effectLst/>
                 <a:latin typeface="Consolas" panose="020B0609020204030204" pitchFamily="49" charset="0"/>
               </a:rPr>
-              <a:t>NumEmpleados</a:t>
+              <a:t>menu</a:t>
             </a:r>
             <a:r>
               <a:rPr lang="es-ES" b="0" dirty="0">
@@ -763,512 +1292,7 @@
                 <a:effectLst/>
                 <a:latin typeface="Consolas" panose="020B0609020204030204" pitchFamily="49" charset="0"/>
               </a:rPr>
-              <a:t>. Tenemos un Id </a:t>
-            </a:r>
-            <a:r>
-              <a:rPr lang="es-ES" b="0" dirty="0" err="1">
-                <a:solidFill>
-                  <a:srgbClr val="D4D4D4"/>
-                </a:solidFill>
-                <a:effectLst/>
-                <a:latin typeface="Consolas" panose="020B0609020204030204" pitchFamily="49" charset="0"/>
-              </a:rPr>
-              <a:t>unico</a:t>
-            </a:r>
-            <a:r>
-              <a:rPr lang="es-ES" b="0" dirty="0">
-                <a:solidFill>
-                  <a:srgbClr val="D4D4D4"/>
-                </a:solidFill>
-                <a:effectLst/>
-                <a:latin typeface="Consolas" panose="020B0609020204030204" pitchFamily="49" charset="0"/>
-              </a:rPr>
-              <a:t> para cada departamento.</a:t>
-            </a:r>
-          </a:p>
-          <a:p>
-            <a:br>
-              <a:rPr lang="es-ES" b="0" dirty="0">
-                <a:solidFill>
-                  <a:srgbClr val="D4D4D4"/>
-                </a:solidFill>
-                <a:effectLst/>
-                <a:latin typeface="Consolas" panose="020B0609020204030204" pitchFamily="49" charset="0"/>
-              </a:rPr>
-            </a:br>
-            <a:r>
-              <a:rPr lang="es-ES" b="0" dirty="0">
-                <a:solidFill>
-                  <a:srgbClr val="D4D4D4"/>
-                </a:solidFill>
-                <a:effectLst/>
-                <a:latin typeface="Consolas" panose="020B0609020204030204" pitchFamily="49" charset="0"/>
-              </a:rPr>
-              <a:t>    -En la tabla Doctores tenemos las columnas Id, Nombre, </a:t>
-            </a:r>
-            <a:r>
-              <a:rPr lang="es-ES" b="0" dirty="0" err="1">
-                <a:solidFill>
-                  <a:srgbClr val="D4D4D4"/>
-                </a:solidFill>
-                <a:effectLst/>
-                <a:latin typeface="Consolas" panose="020B0609020204030204" pitchFamily="49" charset="0"/>
-              </a:rPr>
-              <a:t>NumColegiado</a:t>
-            </a:r>
-            <a:r>
-              <a:rPr lang="es-ES" b="0" dirty="0">
-                <a:solidFill>
-                  <a:srgbClr val="D4D4D4"/>
-                </a:solidFill>
-                <a:effectLst/>
-                <a:latin typeface="Consolas" panose="020B0609020204030204" pitchFamily="49" charset="0"/>
-              </a:rPr>
-              <a:t>, Edad, Sexo y </a:t>
-            </a:r>
-            <a:r>
-              <a:rPr lang="es-ES" b="0" dirty="0" err="1">
-                <a:solidFill>
-                  <a:srgbClr val="D4D4D4"/>
-                </a:solidFill>
-                <a:effectLst/>
-                <a:latin typeface="Consolas" panose="020B0609020204030204" pitchFamily="49" charset="0"/>
-              </a:rPr>
-              <a:t>IdDep</a:t>
-            </a:r>
-            <a:r>
-              <a:rPr lang="es-ES" b="0" dirty="0">
-                <a:solidFill>
-                  <a:srgbClr val="D4D4D4"/>
-                </a:solidFill>
-                <a:effectLst/>
-                <a:latin typeface="Consolas" panose="020B0609020204030204" pitchFamily="49" charset="0"/>
-              </a:rPr>
-              <a:t>. </a:t>
-            </a:r>
-            <a:r>
-              <a:rPr lang="es-ES" b="0" dirty="0" err="1">
-                <a:solidFill>
-                  <a:srgbClr val="D4D4D4"/>
-                </a:solidFill>
-                <a:effectLst/>
-                <a:latin typeface="Consolas" panose="020B0609020204030204" pitchFamily="49" charset="0"/>
-              </a:rPr>
-              <a:t>IdDep</a:t>
-            </a:r>
-            <a:r>
-              <a:rPr lang="es-ES" b="0" dirty="0">
-                <a:solidFill>
-                  <a:srgbClr val="D4D4D4"/>
-                </a:solidFill>
-                <a:effectLst/>
-                <a:latin typeface="Consolas" panose="020B0609020204030204" pitchFamily="49" charset="0"/>
-              </a:rPr>
-              <a:t> es una FOREIGN KEY </a:t>
-            </a:r>
-            <a:r>
-              <a:rPr lang="es-ES" b="0" dirty="0" err="1">
-                <a:solidFill>
-                  <a:srgbClr val="D4D4D4"/>
-                </a:solidFill>
-                <a:effectLst/>
-                <a:latin typeface="Consolas" panose="020B0609020204030204" pitchFamily="49" charset="0"/>
-              </a:rPr>
-              <a:t>wue</a:t>
-            </a:r>
-            <a:r>
-              <a:rPr lang="es-ES" b="0" dirty="0">
-                <a:solidFill>
-                  <a:srgbClr val="D4D4D4"/>
-                </a:solidFill>
-                <a:effectLst/>
-                <a:latin typeface="Consolas" panose="020B0609020204030204" pitchFamily="49" charset="0"/>
-              </a:rPr>
-              <a:t> referencia a la columna Id de la tabla departamentos. La columna Sexo solo puede </a:t>
-            </a:r>
-            <a:r>
-              <a:rPr lang="es-ES" b="0" dirty="0" err="1">
-                <a:solidFill>
-                  <a:srgbClr val="D4D4D4"/>
-                </a:solidFill>
-                <a:effectLst/>
-                <a:latin typeface="Consolas" panose="020B0609020204030204" pitchFamily="49" charset="0"/>
-              </a:rPr>
-              <a:t>rellenarase</a:t>
-            </a:r>
-            <a:r>
-              <a:rPr lang="es-ES" b="0" dirty="0">
-                <a:solidFill>
-                  <a:srgbClr val="D4D4D4"/>
-                </a:solidFill>
-                <a:effectLst/>
-                <a:latin typeface="Consolas" panose="020B0609020204030204" pitchFamily="49" charset="0"/>
-              </a:rPr>
-              <a:t> con los valores 'Hombre', 'Mujer' y puede ser NULL. </a:t>
-            </a:r>
-          </a:p>
-          <a:p>
-            <a:br>
-              <a:rPr lang="es-ES" b="0" dirty="0">
-                <a:solidFill>
-                  <a:srgbClr val="D4D4D4"/>
-                </a:solidFill>
-                <a:effectLst/>
-                <a:latin typeface="Consolas" panose="020B0609020204030204" pitchFamily="49" charset="0"/>
-              </a:rPr>
-            </a:br>
-            <a:r>
-              <a:rPr lang="es-ES" b="0" dirty="0">
-                <a:solidFill>
-                  <a:srgbClr val="D4D4D4"/>
-                </a:solidFill>
-                <a:effectLst/>
-                <a:latin typeface="Consolas" panose="020B0609020204030204" pitchFamily="49" charset="0"/>
-              </a:rPr>
-              <a:t>    -La tabla Enfermeros tiene las columnas Id, Nombre y Edad. El Id es </a:t>
-            </a:r>
-            <a:r>
-              <a:rPr lang="es-ES" b="0" dirty="0" err="1">
-                <a:solidFill>
-                  <a:srgbClr val="D4D4D4"/>
-                </a:solidFill>
-                <a:effectLst/>
-                <a:latin typeface="Consolas" panose="020B0609020204030204" pitchFamily="49" charset="0"/>
-              </a:rPr>
-              <a:t>unico</a:t>
-            </a:r>
-            <a:r>
-              <a:rPr lang="es-ES" b="0" dirty="0">
-                <a:solidFill>
-                  <a:srgbClr val="D4D4D4"/>
-                </a:solidFill>
-                <a:effectLst/>
-                <a:latin typeface="Consolas" panose="020B0609020204030204" pitchFamily="49" charset="0"/>
-              </a:rPr>
-              <a:t> para cada elemento.</a:t>
-            </a:r>
-          </a:p>
-          <a:p>
-            <a:br>
-              <a:rPr lang="es-ES" b="0" dirty="0">
-                <a:solidFill>
-                  <a:srgbClr val="D4D4D4"/>
-                </a:solidFill>
-                <a:effectLst/>
-                <a:latin typeface="Consolas" panose="020B0609020204030204" pitchFamily="49" charset="0"/>
-              </a:rPr>
-            </a:br>
-            <a:r>
-              <a:rPr lang="es-ES" b="0" dirty="0">
-                <a:solidFill>
-                  <a:srgbClr val="D4D4D4"/>
-                </a:solidFill>
-                <a:effectLst/>
-                <a:latin typeface="Consolas" panose="020B0609020204030204" pitchFamily="49" charset="0"/>
-              </a:rPr>
-              <a:t>    -La tabla </a:t>
-            </a:r>
-            <a:r>
-              <a:rPr lang="es-ES" b="0" dirty="0" err="1">
-                <a:solidFill>
-                  <a:srgbClr val="D4D4D4"/>
-                </a:solidFill>
-                <a:effectLst/>
-                <a:latin typeface="Consolas" panose="020B0609020204030204" pitchFamily="49" charset="0"/>
-              </a:rPr>
-              <a:t>EnfermerosPacientes</a:t>
-            </a:r>
-            <a:r>
-              <a:rPr lang="es-ES" b="0" dirty="0">
-                <a:solidFill>
-                  <a:srgbClr val="D4D4D4"/>
-                </a:solidFill>
-                <a:effectLst/>
-                <a:latin typeface="Consolas" panose="020B0609020204030204" pitchFamily="49" charset="0"/>
-              </a:rPr>
-              <a:t> representa la </a:t>
-            </a:r>
-            <a:r>
-              <a:rPr lang="es-ES" b="0" dirty="0" err="1">
-                <a:solidFill>
-                  <a:srgbClr val="D4D4D4"/>
-                </a:solidFill>
-                <a:effectLst/>
-                <a:latin typeface="Consolas" panose="020B0609020204030204" pitchFamily="49" charset="0"/>
-              </a:rPr>
-              <a:t>relacion</a:t>
-            </a:r>
-            <a:r>
-              <a:rPr lang="es-ES" b="0" dirty="0">
-                <a:solidFill>
-                  <a:srgbClr val="D4D4D4"/>
-                </a:solidFill>
-                <a:effectLst/>
-                <a:latin typeface="Consolas" panose="020B0609020204030204" pitchFamily="49" charset="0"/>
-              </a:rPr>
-              <a:t> N-M que tienen estas dos entidades en el diagrama E-R. Consta de dos columnas </a:t>
-            </a:r>
-            <a:r>
-              <a:rPr lang="es-ES" b="0" dirty="0" err="1">
-                <a:solidFill>
-                  <a:srgbClr val="D4D4D4"/>
-                </a:solidFill>
-                <a:effectLst/>
-                <a:latin typeface="Consolas" panose="020B0609020204030204" pitchFamily="49" charset="0"/>
-              </a:rPr>
-              <a:t>IdEnfermero</a:t>
-            </a:r>
-            <a:r>
-              <a:rPr lang="es-ES" b="0" dirty="0">
-                <a:solidFill>
-                  <a:srgbClr val="D4D4D4"/>
-                </a:solidFill>
-                <a:effectLst/>
-                <a:latin typeface="Consolas" panose="020B0609020204030204" pitchFamily="49" charset="0"/>
-              </a:rPr>
-              <a:t> y </a:t>
-            </a:r>
-            <a:r>
-              <a:rPr lang="es-ES" b="0" dirty="0" err="1">
-                <a:solidFill>
-                  <a:srgbClr val="D4D4D4"/>
-                </a:solidFill>
-                <a:effectLst/>
-                <a:latin typeface="Consolas" panose="020B0609020204030204" pitchFamily="49" charset="0"/>
-              </a:rPr>
-              <a:t>IdPaciente</a:t>
-            </a:r>
-            <a:r>
-              <a:rPr lang="es-ES" b="0" dirty="0">
-                <a:solidFill>
-                  <a:srgbClr val="D4D4D4"/>
-                </a:solidFill>
-                <a:effectLst/>
-                <a:latin typeface="Consolas" panose="020B0609020204030204" pitchFamily="49" charset="0"/>
-              </a:rPr>
-              <a:t> ambas son PRIMARY KEY.</a:t>
-            </a:r>
-          </a:p>
-          <a:p>
-            <a:br>
-              <a:rPr lang="es-ES" b="0" dirty="0">
-                <a:solidFill>
-                  <a:srgbClr val="D4D4D4"/>
-                </a:solidFill>
-                <a:effectLst/>
-                <a:latin typeface="Consolas" panose="020B0609020204030204" pitchFamily="49" charset="0"/>
-              </a:rPr>
-            </a:br>
-            <a:r>
-              <a:rPr lang="es-ES" b="0" dirty="0">
-                <a:solidFill>
-                  <a:srgbClr val="D4D4D4"/>
-                </a:solidFill>
-                <a:effectLst/>
-                <a:latin typeface="Consolas" panose="020B0609020204030204" pitchFamily="49" charset="0"/>
-              </a:rPr>
-              <a:t>    -Tabla Habitaciones, consta de las columnas Id, </a:t>
-            </a:r>
-            <a:r>
-              <a:rPr lang="es-ES" b="0" dirty="0" err="1">
-                <a:solidFill>
-                  <a:srgbClr val="D4D4D4"/>
-                </a:solidFill>
-                <a:effectLst/>
-                <a:latin typeface="Consolas" panose="020B0609020204030204" pitchFamily="49" charset="0"/>
-              </a:rPr>
-              <a:t>NumHabitacion</a:t>
-            </a:r>
-            <a:r>
-              <a:rPr lang="es-ES" b="0" dirty="0">
-                <a:solidFill>
-                  <a:srgbClr val="D4D4D4"/>
-                </a:solidFill>
-                <a:effectLst/>
-                <a:latin typeface="Consolas" panose="020B0609020204030204" pitchFamily="49" charset="0"/>
-              </a:rPr>
-              <a:t> y Estado. Estado solo puede rellenarse con los valores 'Libre' o 'Ocupado'. </a:t>
-            </a:r>
-          </a:p>
-          <a:p>
-            <a:br>
-              <a:rPr lang="es-ES" b="0" dirty="0">
-                <a:solidFill>
-                  <a:srgbClr val="D4D4D4"/>
-                </a:solidFill>
-                <a:effectLst/>
-                <a:latin typeface="Consolas" panose="020B0609020204030204" pitchFamily="49" charset="0"/>
-              </a:rPr>
-            </a:br>
-            <a:r>
-              <a:rPr lang="es-ES" b="0" dirty="0">
-                <a:solidFill>
-                  <a:srgbClr val="D4D4D4"/>
-                </a:solidFill>
-                <a:effectLst/>
-                <a:latin typeface="Consolas" panose="020B0609020204030204" pitchFamily="49" charset="0"/>
-              </a:rPr>
-              <a:t>    -La tabla Pacientes tiene las columnas Id, Nombre, Edad, </a:t>
-            </a:r>
-            <a:r>
-              <a:rPr lang="es-ES" b="0" dirty="0" err="1">
-                <a:solidFill>
-                  <a:srgbClr val="D4D4D4"/>
-                </a:solidFill>
-                <a:effectLst/>
-                <a:latin typeface="Consolas" panose="020B0609020204030204" pitchFamily="49" charset="0"/>
-              </a:rPr>
-              <a:t>MotivoIngreso</a:t>
-            </a:r>
-            <a:r>
-              <a:rPr lang="es-ES" b="0" dirty="0">
-                <a:solidFill>
-                  <a:srgbClr val="D4D4D4"/>
-                </a:solidFill>
-                <a:effectLst/>
-                <a:latin typeface="Consolas" panose="020B0609020204030204" pitchFamily="49" charset="0"/>
-              </a:rPr>
-              <a:t>, </a:t>
-            </a:r>
-            <a:r>
-              <a:rPr lang="es-ES" b="0" dirty="0" err="1">
-                <a:solidFill>
-                  <a:srgbClr val="D4D4D4"/>
-                </a:solidFill>
-                <a:effectLst/>
-                <a:latin typeface="Consolas" panose="020B0609020204030204" pitchFamily="49" charset="0"/>
-              </a:rPr>
-              <a:t>IdDoctor</a:t>
-            </a:r>
-            <a:r>
-              <a:rPr lang="es-ES" b="0" dirty="0">
-                <a:solidFill>
-                  <a:srgbClr val="D4D4D4"/>
-                </a:solidFill>
-                <a:effectLst/>
-                <a:latin typeface="Consolas" panose="020B0609020204030204" pitchFamily="49" charset="0"/>
-              </a:rPr>
-              <a:t>, </a:t>
-            </a:r>
-            <a:r>
-              <a:rPr lang="es-ES" b="0" dirty="0" err="1">
-                <a:solidFill>
-                  <a:srgbClr val="D4D4D4"/>
-                </a:solidFill>
-                <a:effectLst/>
-                <a:latin typeface="Consolas" panose="020B0609020204030204" pitchFamily="49" charset="0"/>
-              </a:rPr>
-              <a:t>IdHabitacion</a:t>
-            </a:r>
-            <a:r>
-              <a:rPr lang="es-ES" b="0" dirty="0">
-                <a:solidFill>
-                  <a:srgbClr val="D4D4D4"/>
-                </a:solidFill>
-                <a:effectLst/>
-                <a:latin typeface="Consolas" panose="020B0609020204030204" pitchFamily="49" charset="0"/>
-              </a:rPr>
-              <a:t>, </a:t>
-            </a:r>
-            <a:r>
-              <a:rPr lang="es-ES" b="0" dirty="0" err="1">
-                <a:solidFill>
-                  <a:srgbClr val="D4D4D4"/>
-                </a:solidFill>
-                <a:effectLst/>
-                <a:latin typeface="Consolas" panose="020B0609020204030204" pitchFamily="49" charset="0"/>
-              </a:rPr>
-              <a:t>FechaIngreso</a:t>
-            </a:r>
-            <a:r>
-              <a:rPr lang="es-ES" b="0" dirty="0">
-                <a:solidFill>
-                  <a:srgbClr val="D4D4D4"/>
-                </a:solidFill>
-                <a:effectLst/>
-                <a:latin typeface="Consolas" panose="020B0609020204030204" pitchFamily="49" charset="0"/>
-              </a:rPr>
-              <a:t> y Sexo. </a:t>
-            </a:r>
-            <a:r>
-              <a:rPr lang="es-ES" b="0" dirty="0" err="1">
-                <a:solidFill>
-                  <a:srgbClr val="D4D4D4"/>
-                </a:solidFill>
-                <a:effectLst/>
-                <a:latin typeface="Consolas" panose="020B0609020204030204" pitchFamily="49" charset="0"/>
-              </a:rPr>
-              <a:t>IdDoctor</a:t>
-            </a:r>
-            <a:r>
-              <a:rPr lang="es-ES" b="0" dirty="0">
-                <a:solidFill>
-                  <a:srgbClr val="D4D4D4"/>
-                </a:solidFill>
-                <a:effectLst/>
-                <a:latin typeface="Consolas" panose="020B0609020204030204" pitchFamily="49" charset="0"/>
-              </a:rPr>
-              <a:t> y </a:t>
-            </a:r>
-            <a:r>
-              <a:rPr lang="es-ES" b="0" dirty="0" err="1">
-                <a:solidFill>
-                  <a:srgbClr val="D4D4D4"/>
-                </a:solidFill>
-                <a:effectLst/>
-                <a:latin typeface="Consolas" panose="020B0609020204030204" pitchFamily="49" charset="0"/>
-              </a:rPr>
-              <a:t>IdHabitacion</a:t>
-            </a:r>
-            <a:r>
-              <a:rPr lang="es-ES" b="0" dirty="0">
-                <a:solidFill>
-                  <a:srgbClr val="D4D4D4"/>
-                </a:solidFill>
-                <a:effectLst/>
-                <a:latin typeface="Consolas" panose="020B0609020204030204" pitchFamily="49" charset="0"/>
-              </a:rPr>
-              <a:t> son FOREIGN KEY que referencian al id de las tablas Doctores y Habitaciones </a:t>
-            </a:r>
-            <a:r>
-              <a:rPr lang="es-ES" b="0" dirty="0" err="1">
-                <a:solidFill>
-                  <a:srgbClr val="D4D4D4"/>
-                </a:solidFill>
-                <a:effectLst/>
-                <a:latin typeface="Consolas" panose="020B0609020204030204" pitchFamily="49" charset="0"/>
-              </a:rPr>
-              <a:t>respectivamente.La</a:t>
-            </a:r>
-            <a:r>
-              <a:rPr lang="es-ES" b="0" dirty="0">
-                <a:solidFill>
-                  <a:srgbClr val="D4D4D4"/>
-                </a:solidFill>
-                <a:effectLst/>
-                <a:latin typeface="Consolas" panose="020B0609020204030204" pitchFamily="49" charset="0"/>
-              </a:rPr>
-              <a:t> columna Sexo solo puede </a:t>
-            </a:r>
-            <a:r>
-              <a:rPr lang="es-ES" b="0" dirty="0" err="1">
-                <a:solidFill>
-                  <a:srgbClr val="D4D4D4"/>
-                </a:solidFill>
-                <a:effectLst/>
-                <a:latin typeface="Consolas" panose="020B0609020204030204" pitchFamily="49" charset="0"/>
-              </a:rPr>
-              <a:t>rellenarase</a:t>
-            </a:r>
-            <a:r>
-              <a:rPr lang="es-ES" b="0" dirty="0">
-                <a:solidFill>
-                  <a:srgbClr val="D4D4D4"/>
-                </a:solidFill>
-                <a:effectLst/>
-                <a:latin typeface="Consolas" panose="020B0609020204030204" pitchFamily="49" charset="0"/>
-              </a:rPr>
-              <a:t> con los valores 'Hombre', 'Mujer' y puede ser NULL.</a:t>
+              <a:t> personalizado para cada uno de ellos con las diferentes opciones que tienen.</a:t>
             </a:r>
           </a:p>
           <a:p>
@@ -1294,139 +1318,6 @@
             <a:fld id="{850C8A68-B0DA-436B-AE1F-7E2DFF33396B}" type="slidenum">
               <a:rPr lang="es-ES" smtClean="0"/>
               <a:t>6</a:t>
-            </a:fld>
-            <a:endParaRPr lang="es-ES"/>
-          </a:p>
-        </p:txBody>
-      </p:sp>
-    </p:spTree>
-    <p:extLst>
-      <p:ext uri="{BB962C8B-B14F-4D97-AF65-F5344CB8AC3E}">
-        <p14:creationId xmlns:p14="http://schemas.microsoft.com/office/powerpoint/2010/main" val="4214382848"/>
-      </p:ext>
-    </p:extLst>
-  </p:cSld>
-  <p:clrMapOvr>
-    <a:masterClrMapping/>
-  </p:clrMapOvr>
-</p:notes>
-</file>
-
-<file path=ppt/notesSlides/notesSlide4.xml><?xml version="1.0" encoding="utf-8"?>
-<p:notes xmlns:a="http://schemas.openxmlformats.org/drawingml/2006/main" xmlns:r="http://schemas.openxmlformats.org/officeDocument/2006/relationships" xmlns:p="http://schemas.openxmlformats.org/presentationml/2006/main">
-  <p:cSld>
-    <p:spTree>
-      <p:nvGrpSpPr>
-        <p:cNvPr id="1" name=""/>
-        <p:cNvGrpSpPr/>
-        <p:nvPr/>
-      </p:nvGrpSpPr>
-      <p:grpSpPr>
-        <a:xfrm>
-          <a:off x="0" y="0"/>
-          <a:ext cx="0" cy="0"/>
-          <a:chOff x="0" y="0"/>
-          <a:chExt cx="0" cy="0"/>
-        </a:xfrm>
-      </p:grpSpPr>
-      <p:sp>
-        <p:nvSpPr>
-          <p:cNvPr id="2" name="Marcador de imagen de diapositiva 1"/>
-          <p:cNvSpPr>
-            <a:spLocks noGrp="1" noRot="1" noChangeAspect="1"/>
-          </p:cNvSpPr>
-          <p:nvPr>
-            <p:ph type="sldImg"/>
-          </p:nvPr>
-        </p:nvSpPr>
-        <p:spPr/>
-      </p:sp>
-      <p:sp>
-        <p:nvSpPr>
-          <p:cNvPr id="3" name="Marcador de notas 2"/>
-          <p:cNvSpPr>
-            <a:spLocks noGrp="1"/>
-          </p:cNvSpPr>
-          <p:nvPr>
-            <p:ph type="body" idx="1"/>
-          </p:nvPr>
-        </p:nvSpPr>
-        <p:spPr/>
-        <p:txBody>
-          <a:bodyPr/>
-          <a:lstStyle/>
-          <a:p>
-            <a:pPr marL="0" marR="0" lvl="0" indent="0" algn="l" defTabSz="914400" rtl="0" eaLnBrk="1" fontAlgn="auto" latinLnBrk="0" hangingPunct="1">
-              <a:lnSpc>
-                <a:spcPct val="100000"/>
-              </a:lnSpc>
-              <a:spcBef>
-                <a:spcPts val="0"/>
-              </a:spcBef>
-              <a:spcAft>
-                <a:spcPts val="0"/>
-              </a:spcAft>
-              <a:buClrTx/>
-              <a:buSzTx/>
-              <a:buFontTx/>
-              <a:buNone/>
-              <a:tabLst/>
-              <a:defRPr/>
-            </a:pPr>
-            <a:r>
-              <a:rPr lang="es-ES" b="0" dirty="0">
-                <a:solidFill>
-                  <a:srgbClr val="D4D4D4"/>
-                </a:solidFill>
-                <a:effectLst/>
-                <a:latin typeface="Consolas" panose="020B0609020204030204" pitchFamily="49" charset="0"/>
-              </a:rPr>
-              <a:t>En este diagrama representamos como es el flujo de la interfaz de nuestro proyecto. Empezando por una identificación para diferenciar entre Pacientes, Doctores y Enfermeros. Luego procedemos a un </a:t>
-            </a:r>
-            <a:r>
-              <a:rPr lang="es-ES" b="0" dirty="0" err="1">
-                <a:solidFill>
-                  <a:srgbClr val="D4D4D4"/>
-                </a:solidFill>
-                <a:effectLst/>
-                <a:latin typeface="Consolas" panose="020B0609020204030204" pitchFamily="49" charset="0"/>
-              </a:rPr>
-              <a:t>menu</a:t>
-            </a:r>
-            <a:r>
-              <a:rPr lang="es-ES" b="0" dirty="0">
-                <a:solidFill>
-                  <a:srgbClr val="D4D4D4"/>
-                </a:solidFill>
-                <a:effectLst/>
-                <a:latin typeface="Consolas" panose="020B0609020204030204" pitchFamily="49" charset="0"/>
-              </a:rPr>
-              <a:t> personalizado para cada uno de ellos con las diferentes opciones que tienen.</a:t>
-            </a:r>
-          </a:p>
-          <a:p>
-            <a:endParaRPr lang="es-ES" dirty="0"/>
-          </a:p>
-        </p:txBody>
-      </p:sp>
-      <p:sp>
-        <p:nvSpPr>
-          <p:cNvPr id="4" name="Marcador de número de diapositiva 3"/>
-          <p:cNvSpPr>
-            <a:spLocks noGrp="1"/>
-          </p:cNvSpPr>
-          <p:nvPr>
-            <p:ph type="sldNum" sz="quarter" idx="5"/>
-          </p:nvPr>
-        </p:nvSpPr>
-        <p:spPr/>
-        <p:txBody>
-          <a:bodyPr/>
-          <a:lstStyle/>
-          <a:p>
-            <a:fld id="{850C8A68-B0DA-436B-AE1F-7E2DFF33396B}" type="slidenum">
-              <a:rPr lang="es-ES" smtClean="0"/>
-              <a:t>7</a:t>
             </a:fld>
             <a:endParaRPr lang="es-ES"/>
           </a:p>
@@ -1502,7 +1393,7 @@
           <a:noFill/>
           <a:extLst>
             <a:ext uri="{909E8E84-426E-40dd-AFC4-6F175D3DCCD1}">
-              <a14:hiddenFill xmlns="" xmlns:a14="http://schemas.microsoft.com/office/drawing/2010/main">
+              <a14:hiddenFill xmlns:a14="http://schemas.microsoft.com/office/drawing/2010/main" xmlns="">
                 <a:solidFill>
                   <a:srgbClr val="FFFFFF"/>
                 </a:solidFill>
@@ -1561,7 +1452,7 @@
             </a:ln>
             <a:extLst>
               <a:ext uri="{91240B29-F687-4f45-9708-019B960494DF}">
-                <a14:hiddenLine xmlns="" xmlns:a14="http://schemas.microsoft.com/office/drawing/2010/main" w="9525">
+                <a14:hiddenLine xmlns:a14="http://schemas.microsoft.com/office/drawing/2010/main" xmlns="" w="9525">
                   <a:solidFill>
                     <a:srgbClr val="000000"/>
                   </a:solidFill>
@@ -1651,7 +1542,7 @@
             </a:ln>
             <a:extLst>
               <a:ext uri="{91240B29-F687-4f45-9708-019B960494DF}">
-                <a14:hiddenLine xmlns="" xmlns:a14="http://schemas.microsoft.com/office/drawing/2010/main" w="9525">
+                <a14:hiddenLine xmlns:a14="http://schemas.microsoft.com/office/drawing/2010/main" xmlns="" w="9525">
                   <a:solidFill>
                     <a:srgbClr val="000000"/>
                   </a:solidFill>
@@ -1741,7 +1632,7 @@
             </a:ln>
             <a:extLst>
               <a:ext uri="{91240B29-F687-4f45-9708-019B960494DF}">
-                <a14:hiddenLine xmlns="" xmlns:a14="http://schemas.microsoft.com/office/drawing/2010/main" w="9525">
+                <a14:hiddenLine xmlns:a14="http://schemas.microsoft.com/office/drawing/2010/main" xmlns="" w="9525">
                   <a:solidFill>
                     <a:srgbClr val="000000"/>
                   </a:solidFill>
@@ -1775,7 +1666,7 @@
             </a:ln>
             <a:extLst>
               <a:ext uri="{91240B29-F687-4f45-9708-019B960494DF}">
-                <a14:hiddenLine xmlns="" xmlns:a14="http://schemas.microsoft.com/office/drawing/2010/main" w="9525">
+                <a14:hiddenLine xmlns:a14="http://schemas.microsoft.com/office/drawing/2010/main" xmlns="" w="9525">
                   <a:solidFill>
                     <a:srgbClr val="000000"/>
                   </a:solidFill>
@@ -1865,7 +1756,7 @@
             </a:ln>
             <a:extLst>
               <a:ext uri="{91240B29-F687-4f45-9708-019B960494DF}">
-                <a14:hiddenLine xmlns="" xmlns:a14="http://schemas.microsoft.com/office/drawing/2010/main" w="9525">
+                <a14:hiddenLine xmlns:a14="http://schemas.microsoft.com/office/drawing/2010/main" xmlns="" w="9525">
                   <a:solidFill>
                     <a:srgbClr val="000000"/>
                   </a:solidFill>
@@ -1927,7 +1818,7 @@
             </a:ln>
             <a:extLst>
               <a:ext uri="{91240B29-F687-4f45-9708-019B960494DF}">
-                <a14:hiddenLine xmlns="" xmlns:a14="http://schemas.microsoft.com/office/drawing/2010/main" w="9525">
+                <a14:hiddenLine xmlns:a14="http://schemas.microsoft.com/office/drawing/2010/main" xmlns="" w="9525">
                   <a:solidFill>
                     <a:srgbClr val="000000"/>
                   </a:solidFill>
@@ -1989,7 +1880,7 @@
             </a:ln>
             <a:extLst>
               <a:ext uri="{91240B29-F687-4f45-9708-019B960494DF}">
-                <a14:hiddenLine xmlns="" xmlns:a14="http://schemas.microsoft.com/office/drawing/2010/main" w="9525">
+                <a14:hiddenLine xmlns:a14="http://schemas.microsoft.com/office/drawing/2010/main" xmlns="" w="9525">
                   <a:solidFill>
                     <a:srgbClr val="000000"/>
                   </a:solidFill>
@@ -2079,7 +1970,7 @@
             </a:ln>
             <a:extLst>
               <a:ext uri="{91240B29-F687-4f45-9708-019B960494DF}">
-                <a14:hiddenLine xmlns="" xmlns:a14="http://schemas.microsoft.com/office/drawing/2010/main" w="9525">
+                <a14:hiddenLine xmlns:a14="http://schemas.microsoft.com/office/drawing/2010/main" xmlns="" w="9525">
                   <a:solidFill>
                     <a:srgbClr val="000000"/>
                   </a:solidFill>
@@ -2141,7 +2032,7 @@
             </a:ln>
             <a:extLst>
               <a:ext uri="{91240B29-F687-4f45-9708-019B960494DF}">
-                <a14:hiddenLine xmlns="" xmlns:a14="http://schemas.microsoft.com/office/drawing/2010/main" w="9525">
+                <a14:hiddenLine xmlns:a14="http://schemas.microsoft.com/office/drawing/2010/main" xmlns="" w="9525">
                   <a:solidFill>
                     <a:srgbClr val="000000"/>
                   </a:solidFill>
@@ -2203,7 +2094,7 @@
             </a:ln>
             <a:extLst>
               <a:ext uri="{91240B29-F687-4f45-9708-019B960494DF}">
-                <a14:hiddenLine xmlns="" xmlns:a14="http://schemas.microsoft.com/office/drawing/2010/main" w="9525">
+                <a14:hiddenLine xmlns:a14="http://schemas.microsoft.com/office/drawing/2010/main" xmlns="" w="9525">
                   <a:solidFill>
                     <a:srgbClr val="000000"/>
                   </a:solidFill>
@@ -2293,7 +2184,7 @@
             </a:ln>
             <a:extLst>
               <a:ext uri="{91240B29-F687-4f45-9708-019B960494DF}">
-                <a14:hiddenLine xmlns="" xmlns:a14="http://schemas.microsoft.com/office/drawing/2010/main" w="9525">
+                <a14:hiddenLine xmlns:a14="http://schemas.microsoft.com/office/drawing/2010/main" xmlns="" w="9525">
                   <a:solidFill>
                     <a:srgbClr val="000000"/>
                   </a:solidFill>
@@ -2383,7 +2274,7 @@
             </a:ln>
             <a:extLst>
               <a:ext uri="{91240B29-F687-4f45-9708-019B960494DF}">
-                <a14:hiddenLine xmlns="" xmlns:a14="http://schemas.microsoft.com/office/drawing/2010/main" w="9525">
+                <a14:hiddenLine xmlns:a14="http://schemas.microsoft.com/office/drawing/2010/main" xmlns="" w="9525">
                   <a:solidFill>
                     <a:srgbClr val="000000"/>
                   </a:solidFill>
@@ -2445,7 +2336,7 @@
             </a:ln>
             <a:extLst>
               <a:ext uri="{91240B29-F687-4f45-9708-019B960494DF}">
-                <a14:hiddenLine xmlns="" xmlns:a14="http://schemas.microsoft.com/office/drawing/2010/main" w="9525">
+                <a14:hiddenLine xmlns:a14="http://schemas.microsoft.com/office/drawing/2010/main" xmlns="" w="9525">
                   <a:solidFill>
                     <a:srgbClr val="000000"/>
                   </a:solidFill>
@@ -2555,7 +2446,7 @@
             </a:ln>
             <a:extLst>
               <a:ext uri="{91240B29-F687-4f45-9708-019B960494DF}">
-                <a14:hiddenLine xmlns="" xmlns:a14="http://schemas.microsoft.com/office/drawing/2010/main" w="9525">
+                <a14:hiddenLine xmlns:a14="http://schemas.microsoft.com/office/drawing/2010/main" xmlns="" w="9525">
                   <a:solidFill>
                     <a:srgbClr val="000000"/>
                   </a:solidFill>
@@ -2617,7 +2508,7 @@
             </a:ln>
             <a:extLst>
               <a:ext uri="{91240B29-F687-4f45-9708-019B960494DF}">
-                <a14:hiddenLine xmlns="" xmlns:a14="http://schemas.microsoft.com/office/drawing/2010/main" w="9525">
+                <a14:hiddenLine xmlns:a14="http://schemas.microsoft.com/office/drawing/2010/main" xmlns="" w="9525">
                   <a:solidFill>
                     <a:srgbClr val="000000"/>
                   </a:solidFill>
@@ -2707,7 +2598,7 @@
             </a:ln>
             <a:extLst>
               <a:ext uri="{91240B29-F687-4f45-9708-019B960494DF}">
-                <a14:hiddenLine xmlns="" xmlns:a14="http://schemas.microsoft.com/office/drawing/2010/main" w="9525">
+                <a14:hiddenLine xmlns:a14="http://schemas.microsoft.com/office/drawing/2010/main" xmlns="" w="9525">
                   <a:solidFill>
                     <a:srgbClr val="000000"/>
                   </a:solidFill>
@@ -2797,7 +2688,7 @@
             </a:ln>
             <a:extLst>
               <a:ext uri="{91240B29-F687-4f45-9708-019B960494DF}">
-                <a14:hiddenLine xmlns="" xmlns:a14="http://schemas.microsoft.com/office/drawing/2010/main" w="9525">
+                <a14:hiddenLine xmlns:a14="http://schemas.microsoft.com/office/drawing/2010/main" xmlns="" w="9525">
                   <a:solidFill>
                     <a:srgbClr val="000000"/>
                   </a:solidFill>
@@ -2859,7 +2750,7 @@
             </a:ln>
             <a:extLst>
               <a:ext uri="{91240B29-F687-4f45-9708-019B960494DF}">
-                <a14:hiddenLine xmlns="" xmlns:a14="http://schemas.microsoft.com/office/drawing/2010/main" w="9525">
+                <a14:hiddenLine xmlns:a14="http://schemas.microsoft.com/office/drawing/2010/main" xmlns="" w="9525">
                   <a:solidFill>
                     <a:srgbClr val="000000"/>
                   </a:solidFill>
@@ -2949,7 +2840,7 @@
             </a:ln>
             <a:extLst>
               <a:ext uri="{91240B29-F687-4f45-9708-019B960494DF}">
-                <a14:hiddenLine xmlns="" xmlns:a14="http://schemas.microsoft.com/office/drawing/2010/main" w="9525">
+                <a14:hiddenLine xmlns:a14="http://schemas.microsoft.com/office/drawing/2010/main" xmlns="" w="9525">
                   <a:solidFill>
                     <a:srgbClr val="000000"/>
                   </a:solidFill>
@@ -3039,7 +2930,7 @@
             </a:ln>
             <a:extLst>
               <a:ext uri="{91240B29-F687-4f45-9708-019B960494DF}">
-                <a14:hiddenLine xmlns="" xmlns:a14="http://schemas.microsoft.com/office/drawing/2010/main" w="9525">
+                <a14:hiddenLine xmlns:a14="http://schemas.microsoft.com/office/drawing/2010/main" xmlns="" w="9525">
                   <a:solidFill>
                     <a:srgbClr val="000000"/>
                   </a:solidFill>
@@ -3095,7 +2986,7 @@
             </a:ln>
             <a:extLst>
               <a:ext uri="{91240B29-F687-4f45-9708-019B960494DF}">
-                <a14:hiddenLine xmlns="" xmlns:a14="http://schemas.microsoft.com/office/drawing/2010/main" w="9525">
+                <a14:hiddenLine xmlns:a14="http://schemas.microsoft.com/office/drawing/2010/main" xmlns="" w="9525">
                   <a:solidFill>
                     <a:srgbClr val="000000"/>
                   </a:solidFill>
@@ -3185,7 +3076,7 @@
             </a:ln>
             <a:extLst>
               <a:ext uri="{91240B29-F687-4f45-9708-019B960494DF}">
-                <a14:hiddenLine xmlns="" xmlns:a14="http://schemas.microsoft.com/office/drawing/2010/main" w="9525">
+                <a14:hiddenLine xmlns:a14="http://schemas.microsoft.com/office/drawing/2010/main" xmlns="" w="9525">
                   <a:solidFill>
                     <a:srgbClr val="000000"/>
                   </a:solidFill>
@@ -3241,7 +3132,7 @@
             </a:ln>
             <a:extLst>
               <a:ext uri="{91240B29-F687-4f45-9708-019B960494DF}">
-                <a14:hiddenLine xmlns="" xmlns:a14="http://schemas.microsoft.com/office/drawing/2010/main" w="9525">
+                <a14:hiddenLine xmlns:a14="http://schemas.microsoft.com/office/drawing/2010/main" xmlns="" w="9525">
                   <a:solidFill>
                     <a:srgbClr val="000000"/>
                   </a:solidFill>
@@ -3331,7 +3222,7 @@
             </a:ln>
             <a:extLst>
               <a:ext uri="{91240B29-F687-4f45-9708-019B960494DF}">
-                <a14:hiddenLine xmlns="" xmlns:a14="http://schemas.microsoft.com/office/drawing/2010/main" w="9525">
+                <a14:hiddenLine xmlns:a14="http://schemas.microsoft.com/office/drawing/2010/main" xmlns="" w="9525">
                   <a:solidFill>
                     <a:srgbClr val="000000"/>
                   </a:solidFill>
@@ -3399,7 +3290,7 @@
             </a:ln>
             <a:extLst>
               <a:ext uri="{91240B29-F687-4f45-9708-019B960494DF}">
-                <a14:hiddenLine xmlns="" xmlns:a14="http://schemas.microsoft.com/office/drawing/2010/main" w="9525">
+                <a14:hiddenLine xmlns:a14="http://schemas.microsoft.com/office/drawing/2010/main" xmlns="" w="9525">
                   <a:solidFill>
                     <a:srgbClr val="000000"/>
                   </a:solidFill>
@@ -3489,7 +3380,7 @@
             </a:ln>
             <a:extLst>
               <a:ext uri="{91240B29-F687-4f45-9708-019B960494DF}">
-                <a14:hiddenLine xmlns="" xmlns:a14="http://schemas.microsoft.com/office/drawing/2010/main" w="9525">
+                <a14:hiddenLine xmlns:a14="http://schemas.microsoft.com/office/drawing/2010/main" xmlns="" w="9525">
                   <a:solidFill>
                     <a:srgbClr val="000000"/>
                   </a:solidFill>
@@ -3557,7 +3448,7 @@
             </a:ln>
             <a:extLst>
               <a:ext uri="{91240B29-F687-4f45-9708-019B960494DF}">
-                <a14:hiddenLine xmlns="" xmlns:a14="http://schemas.microsoft.com/office/drawing/2010/main" w="9525">
+                <a14:hiddenLine xmlns:a14="http://schemas.microsoft.com/office/drawing/2010/main" xmlns="" w="9525">
                   <a:solidFill>
                     <a:srgbClr val="000000"/>
                   </a:solidFill>
@@ -3647,7 +3538,7 @@
             </a:ln>
             <a:extLst>
               <a:ext uri="{91240B29-F687-4f45-9708-019B960494DF}">
-                <a14:hiddenLine xmlns="" xmlns:a14="http://schemas.microsoft.com/office/drawing/2010/main" w="9525">
+                <a14:hiddenLine xmlns:a14="http://schemas.microsoft.com/office/drawing/2010/main" xmlns="" w="9525">
                   <a:solidFill>
                     <a:srgbClr val="000000"/>
                   </a:solidFill>
@@ -3681,7 +3572,7 @@
             </a:ln>
             <a:extLst>
               <a:ext uri="{91240B29-F687-4f45-9708-019B960494DF}">
-                <a14:hiddenLine xmlns="" xmlns:a14="http://schemas.microsoft.com/office/drawing/2010/main" w="9525">
+                <a14:hiddenLine xmlns:a14="http://schemas.microsoft.com/office/drawing/2010/main" xmlns="" w="9525">
                   <a:solidFill>
                     <a:srgbClr val="000000"/>
                   </a:solidFill>
@@ -3771,7 +3662,7 @@
             </a:ln>
             <a:extLst>
               <a:ext uri="{91240B29-F687-4f45-9708-019B960494DF}">
-                <a14:hiddenLine xmlns="" xmlns:a14="http://schemas.microsoft.com/office/drawing/2010/main" w="9525">
+                <a14:hiddenLine xmlns:a14="http://schemas.microsoft.com/office/drawing/2010/main" xmlns="" w="9525">
                   <a:solidFill>
                     <a:srgbClr val="000000"/>
                   </a:solidFill>
@@ -3833,7 +3724,7 @@
             </a:ln>
             <a:extLst>
               <a:ext uri="{91240B29-F687-4f45-9708-019B960494DF}">
-                <a14:hiddenLine xmlns="" xmlns:a14="http://schemas.microsoft.com/office/drawing/2010/main" w="9525">
+                <a14:hiddenLine xmlns:a14="http://schemas.microsoft.com/office/drawing/2010/main" xmlns="" w="9525">
                   <a:solidFill>
                     <a:srgbClr val="000000"/>
                   </a:solidFill>
@@ -3895,7 +3786,7 @@
             </a:ln>
             <a:extLst>
               <a:ext uri="{91240B29-F687-4f45-9708-019B960494DF}">
-                <a14:hiddenLine xmlns="" xmlns:a14="http://schemas.microsoft.com/office/drawing/2010/main" w="9525">
+                <a14:hiddenLine xmlns:a14="http://schemas.microsoft.com/office/drawing/2010/main" xmlns="" w="9525">
                   <a:solidFill>
                     <a:srgbClr val="000000"/>
                   </a:solidFill>
@@ -3985,7 +3876,7 @@
             </a:ln>
             <a:extLst>
               <a:ext uri="{91240B29-F687-4f45-9708-019B960494DF}">
-                <a14:hiddenLine xmlns="" xmlns:a14="http://schemas.microsoft.com/office/drawing/2010/main" w="9525">
+                <a14:hiddenLine xmlns:a14="http://schemas.microsoft.com/office/drawing/2010/main" xmlns="" w="9525">
                   <a:solidFill>
                     <a:srgbClr val="000000"/>
                   </a:solidFill>
@@ -4053,7 +3944,7 @@
             </a:ln>
             <a:extLst>
               <a:ext uri="{91240B29-F687-4f45-9708-019B960494DF}">
-                <a14:hiddenLine xmlns="" xmlns:a14="http://schemas.microsoft.com/office/drawing/2010/main" w="9525">
+                <a14:hiddenLine xmlns:a14="http://schemas.microsoft.com/office/drawing/2010/main" xmlns="" w="9525">
                   <a:solidFill>
                     <a:srgbClr val="000000"/>
                   </a:solidFill>
@@ -4115,7 +4006,7 @@
             </a:ln>
             <a:extLst>
               <a:ext uri="{91240B29-F687-4f45-9708-019B960494DF}">
-                <a14:hiddenLine xmlns="" xmlns:a14="http://schemas.microsoft.com/office/drawing/2010/main" w="9525">
+                <a14:hiddenLine xmlns:a14="http://schemas.microsoft.com/office/drawing/2010/main" xmlns="" w="9525">
                   <a:solidFill>
                     <a:srgbClr val="000000"/>
                   </a:solidFill>
@@ -4205,7 +4096,7 @@
             </a:ln>
             <a:extLst>
               <a:ext uri="{91240B29-F687-4f45-9708-019B960494DF}">
-                <a14:hiddenLine xmlns="" xmlns:a14="http://schemas.microsoft.com/office/drawing/2010/main" w="9525">
+                <a14:hiddenLine xmlns:a14="http://schemas.microsoft.com/office/drawing/2010/main" xmlns="" w="9525">
                   <a:solidFill>
                     <a:srgbClr val="000000"/>
                   </a:solidFill>
@@ -4267,7 +4158,7 @@
             </a:ln>
             <a:extLst>
               <a:ext uri="{91240B29-F687-4f45-9708-019B960494DF}">
-                <a14:hiddenLine xmlns="" xmlns:a14="http://schemas.microsoft.com/office/drawing/2010/main" w="9525">
+                <a14:hiddenLine xmlns:a14="http://schemas.microsoft.com/office/drawing/2010/main" xmlns="" w="9525">
                   <a:solidFill>
                     <a:srgbClr val="000000"/>
                   </a:solidFill>
@@ -4357,7 +4248,7 @@
             </a:ln>
             <a:extLst>
               <a:ext uri="{91240B29-F687-4f45-9708-019B960494DF}">
-                <a14:hiddenLine xmlns="" xmlns:a14="http://schemas.microsoft.com/office/drawing/2010/main" w="9525">
+                <a14:hiddenLine xmlns:a14="http://schemas.microsoft.com/office/drawing/2010/main" xmlns="" w="9525">
                   <a:solidFill>
                     <a:srgbClr val="000000"/>
                   </a:solidFill>
@@ -4419,7 +4310,7 @@
             </a:ln>
             <a:extLst>
               <a:ext uri="{91240B29-F687-4f45-9708-019B960494DF}">
-                <a14:hiddenLine xmlns="" xmlns:a14="http://schemas.microsoft.com/office/drawing/2010/main" w="9525">
+                <a14:hiddenLine xmlns:a14="http://schemas.microsoft.com/office/drawing/2010/main" xmlns="" w="9525">
                   <a:solidFill>
                     <a:srgbClr val="000000"/>
                   </a:solidFill>
@@ -4509,7 +4400,7 @@
             </a:ln>
             <a:extLst>
               <a:ext uri="{91240B29-F687-4f45-9708-019B960494DF}">
-                <a14:hiddenLine xmlns="" xmlns:a14="http://schemas.microsoft.com/office/drawing/2010/main" w="9525">
+                <a14:hiddenLine xmlns:a14="http://schemas.microsoft.com/office/drawing/2010/main" xmlns="" w="9525">
                   <a:solidFill>
                     <a:srgbClr val="000000"/>
                   </a:solidFill>
@@ -4543,7 +4434,7 @@
             </a:ln>
             <a:extLst>
               <a:ext uri="{91240B29-F687-4f45-9708-019B960494DF}">
-                <a14:hiddenLine xmlns="" xmlns:a14="http://schemas.microsoft.com/office/drawing/2010/main" w="9525">
+                <a14:hiddenLine xmlns:a14="http://schemas.microsoft.com/office/drawing/2010/main" xmlns="" w="9525">
                   <a:solidFill>
                     <a:srgbClr val="000000"/>
                   </a:solidFill>
@@ -4608,7 +4499,7 @@
             </a:ln>
             <a:extLst>
               <a:ext uri="{91240B29-F687-4f45-9708-019B960494DF}">
-                <a14:hiddenLine xmlns="" xmlns:a14="http://schemas.microsoft.com/office/drawing/2010/main" w="9525">
+                <a14:hiddenLine xmlns:a14="http://schemas.microsoft.com/office/drawing/2010/main" xmlns="" w="9525">
                   <a:solidFill>
                     <a:srgbClr val="000000"/>
                   </a:solidFill>
@@ -4698,7 +4589,7 @@
             </a:ln>
             <a:extLst>
               <a:ext uri="{91240B29-F687-4f45-9708-019B960494DF}">
-                <a14:hiddenLine xmlns="" xmlns:a14="http://schemas.microsoft.com/office/drawing/2010/main" w="9525">
+                <a14:hiddenLine xmlns:a14="http://schemas.microsoft.com/office/drawing/2010/main" xmlns="" w="9525">
                   <a:solidFill>
                     <a:srgbClr val="000000"/>
                   </a:solidFill>
@@ -4760,7 +4651,7 @@
             </a:ln>
             <a:extLst>
               <a:ext uri="{91240B29-F687-4f45-9708-019B960494DF}">
-                <a14:hiddenLine xmlns="" xmlns:a14="http://schemas.microsoft.com/office/drawing/2010/main" w="9525">
+                <a14:hiddenLine xmlns:a14="http://schemas.microsoft.com/office/drawing/2010/main" xmlns="" w="9525">
                   <a:solidFill>
                     <a:srgbClr val="000000"/>
                   </a:solidFill>
@@ -4850,7 +4741,7 @@
             </a:ln>
             <a:extLst>
               <a:ext uri="{91240B29-F687-4f45-9708-019B960494DF}">
-                <a14:hiddenLine xmlns="" xmlns:a14="http://schemas.microsoft.com/office/drawing/2010/main" w="9525">
+                <a14:hiddenLine xmlns:a14="http://schemas.microsoft.com/office/drawing/2010/main" xmlns="" w="9525">
                   <a:solidFill>
                     <a:srgbClr val="000000"/>
                   </a:solidFill>
@@ -4940,7 +4831,7 @@
             </a:ln>
             <a:extLst>
               <a:ext uri="{91240B29-F687-4f45-9708-019B960494DF}">
-                <a14:hiddenLine xmlns="" xmlns:a14="http://schemas.microsoft.com/office/drawing/2010/main" w="9525">
+                <a14:hiddenLine xmlns:a14="http://schemas.microsoft.com/office/drawing/2010/main" xmlns="" w="9525">
                   <a:solidFill>
                     <a:srgbClr val="000000"/>
                   </a:solidFill>
@@ -5005,7 +4896,7 @@
             </a:ln>
             <a:extLst>
               <a:ext uri="{91240B29-F687-4f45-9708-019B960494DF}">
-                <a14:hiddenLine xmlns="" xmlns:a14="http://schemas.microsoft.com/office/drawing/2010/main" w="9525">
+                <a14:hiddenLine xmlns:a14="http://schemas.microsoft.com/office/drawing/2010/main" xmlns="" w="9525">
                   <a:solidFill>
                     <a:srgbClr val="000000"/>
                   </a:solidFill>
@@ -5067,7 +4958,7 @@
             </a:ln>
             <a:extLst>
               <a:ext uri="{91240B29-F687-4f45-9708-019B960494DF}">
-                <a14:hiddenLine xmlns="" xmlns:a14="http://schemas.microsoft.com/office/drawing/2010/main" w="9525">
+                <a14:hiddenLine xmlns:a14="http://schemas.microsoft.com/office/drawing/2010/main" xmlns="" w="9525">
                   <a:solidFill>
                     <a:srgbClr val="000000"/>
                   </a:solidFill>
@@ -5157,7 +5048,7 @@
             </a:ln>
             <a:extLst>
               <a:ext uri="{91240B29-F687-4f45-9708-019B960494DF}">
-                <a14:hiddenLine xmlns="" xmlns:a14="http://schemas.microsoft.com/office/drawing/2010/main" w="9525">
+                <a14:hiddenLine xmlns:a14="http://schemas.microsoft.com/office/drawing/2010/main" xmlns="" w="9525">
                   <a:solidFill>
                     <a:srgbClr val="000000"/>
                   </a:solidFill>
@@ -5247,7 +5138,7 @@
             </a:ln>
             <a:extLst>
               <a:ext uri="{91240B29-F687-4f45-9708-019B960494DF}">
-                <a14:hiddenLine xmlns="" xmlns:a14="http://schemas.microsoft.com/office/drawing/2010/main" w="9525">
+                <a14:hiddenLine xmlns:a14="http://schemas.microsoft.com/office/drawing/2010/main" xmlns="" w="9525">
                   <a:solidFill>
                     <a:srgbClr val="000000"/>
                   </a:solidFill>
@@ -5309,7 +5200,7 @@
             </a:ln>
             <a:extLst>
               <a:ext uri="{91240B29-F687-4f45-9708-019B960494DF}">
-                <a14:hiddenLine xmlns="" xmlns:a14="http://schemas.microsoft.com/office/drawing/2010/main" w="9525">
+                <a14:hiddenLine xmlns:a14="http://schemas.microsoft.com/office/drawing/2010/main" xmlns="" w="9525">
                   <a:solidFill>
                     <a:srgbClr val="000000"/>
                   </a:solidFill>
@@ -5429,7 +5320,7 @@
             </a:ln>
             <a:extLst>
               <a:ext uri="{91240B29-F687-4f45-9708-019B960494DF}">
-                <a14:hiddenLine xmlns="" xmlns:a14="http://schemas.microsoft.com/office/drawing/2010/main" w="9525">
+                <a14:hiddenLine xmlns:a14="http://schemas.microsoft.com/office/drawing/2010/main" xmlns="" w="9525">
                   <a:solidFill>
                     <a:srgbClr val="000000"/>
                   </a:solidFill>
@@ -5497,7 +5388,7 @@
             </a:ln>
             <a:extLst>
               <a:ext uri="{91240B29-F687-4f45-9708-019B960494DF}">
-                <a14:hiddenLine xmlns="" xmlns:a14="http://schemas.microsoft.com/office/drawing/2010/main" w="9525">
+                <a14:hiddenLine xmlns:a14="http://schemas.microsoft.com/office/drawing/2010/main" xmlns="" w="9525">
                   <a:solidFill>
                     <a:srgbClr val="000000"/>
                   </a:solidFill>
@@ -5587,7 +5478,7 @@
             </a:ln>
             <a:extLst>
               <a:ext uri="{91240B29-F687-4f45-9708-019B960494DF}">
-                <a14:hiddenLine xmlns="" xmlns:a14="http://schemas.microsoft.com/office/drawing/2010/main" w="9525">
+                <a14:hiddenLine xmlns:a14="http://schemas.microsoft.com/office/drawing/2010/main" xmlns="" w="9525">
                   <a:solidFill>
                     <a:srgbClr val="000000"/>
                   </a:solidFill>
@@ -5727,7 +5618,7 @@
           <a:p>
             <a:fld id="{48A87A34-81AB-432B-8DAE-1953F412C126}" type="datetimeFigureOut">
               <a:rPr lang="en-US" dirty="0"/>
-              <a:t>3/31/2022</a:t>
+              <a:t>4/5/2022</a:t>
             </a:fld>
             <a:endParaRPr lang="en-US" dirty="0"/>
           </a:p>
@@ -5989,7 +5880,7 @@
           <a:p>
             <a:fld id="{48A87A34-81AB-432B-8DAE-1953F412C126}" type="datetimeFigureOut">
               <a:rPr lang="en-US" dirty="0"/>
-              <a:t>3/31/2022</a:t>
+              <a:t>4/5/2022</a:t>
             </a:fld>
             <a:endParaRPr lang="en-US" dirty="0"/>
           </a:p>
@@ -6180,7 +6071,7 @@
           <a:p>
             <a:fld id="{48A87A34-81AB-432B-8DAE-1953F412C126}" type="datetimeFigureOut">
               <a:rPr lang="en-US" dirty="0"/>
-              <a:t>3/31/2022</a:t>
+              <a:t>4/5/2022</a:t>
             </a:fld>
             <a:endParaRPr lang="en-US" dirty="0"/>
           </a:p>
@@ -6438,7 +6329,7 @@
           <a:p>
             <a:fld id="{48A87A34-81AB-432B-8DAE-1953F412C126}" type="datetimeFigureOut">
               <a:rPr lang="en-US" dirty="0"/>
-              <a:t>3/31/2022</a:t>
+              <a:t>4/5/2022</a:t>
             </a:fld>
             <a:endParaRPr lang="en-US" dirty="0"/>
           </a:p>
@@ -6867,7 +6758,7 @@
           <a:p>
             <a:fld id="{48A87A34-81AB-432B-8DAE-1953F412C126}" type="datetimeFigureOut">
               <a:rPr lang="en-US" dirty="0"/>
-              <a:t>3/31/2022</a:t>
+              <a:t>4/5/2022</a:t>
             </a:fld>
             <a:endParaRPr lang="en-US" dirty="0"/>
           </a:p>
@@ -7408,7 +7299,7 @@
           <a:p>
             <a:fld id="{48A87A34-81AB-432B-8DAE-1953F412C126}" type="datetimeFigureOut">
               <a:rPr lang="en-US" dirty="0"/>
-              <a:t>3/31/2022</a:t>
+              <a:t>4/5/2022</a:t>
             </a:fld>
             <a:endParaRPr lang="en-US" dirty="0"/>
           </a:p>
@@ -8123,7 +8014,7 @@
           <a:p>
             <a:fld id="{48A87A34-81AB-432B-8DAE-1953F412C126}" type="datetimeFigureOut">
               <a:rPr lang="en-US" dirty="0"/>
-              <a:t>3/31/2022</a:t>
+              <a:t>4/5/2022</a:t>
             </a:fld>
             <a:endParaRPr lang="en-US" dirty="0"/>
           </a:p>
@@ -8288,7 +8179,7 @@
           <a:p>
             <a:fld id="{48A87A34-81AB-432B-8DAE-1953F412C126}" type="datetimeFigureOut">
               <a:rPr lang="en-US" dirty="0"/>
-              <a:t>3/31/2022</a:t>
+              <a:t>4/5/2022</a:t>
             </a:fld>
             <a:endParaRPr lang="en-US" dirty="0"/>
           </a:p>
@@ -8463,7 +8354,7 @@
           <a:p>
             <a:fld id="{48A87A34-81AB-432B-8DAE-1953F412C126}" type="datetimeFigureOut">
               <a:rPr lang="en-US" dirty="0"/>
-              <a:t>3/31/2022</a:t>
+              <a:t>4/5/2022</a:t>
             </a:fld>
             <a:endParaRPr lang="en-US" dirty="0"/>
           </a:p>
@@ -8628,7 +8519,7 @@
           <a:p>
             <a:fld id="{48A87A34-81AB-432B-8DAE-1953F412C126}" type="datetimeFigureOut">
               <a:rPr lang="en-US" dirty="0"/>
-              <a:t>3/31/2022</a:t>
+              <a:t>4/5/2022</a:t>
             </a:fld>
             <a:endParaRPr lang="en-US" dirty="0"/>
           </a:p>
@@ -8873,7 +8764,7 @@
           <a:p>
             <a:fld id="{48A87A34-81AB-432B-8DAE-1953F412C126}" type="datetimeFigureOut">
               <a:rPr lang="en-US" dirty="0"/>
-              <a:t>3/31/2022</a:t>
+              <a:t>4/5/2022</a:t>
             </a:fld>
             <a:endParaRPr lang="en-US" dirty="0"/>
           </a:p>
@@ -9100,7 +8991,7 @@
           <a:p>
             <a:fld id="{48A87A34-81AB-432B-8DAE-1953F412C126}" type="datetimeFigureOut">
               <a:rPr lang="en-US" dirty="0"/>
-              <a:t>3/31/2022</a:t>
+              <a:t>4/5/2022</a:t>
             </a:fld>
             <a:endParaRPr lang="en-US" dirty="0"/>
           </a:p>
@@ -9476,7 +9367,7 @@
           <a:p>
             <a:fld id="{48A87A34-81AB-432B-8DAE-1953F412C126}" type="datetimeFigureOut">
               <a:rPr lang="en-US" dirty="0"/>
-              <a:t>3/31/2022</a:t>
+              <a:t>4/5/2022</a:t>
             </a:fld>
             <a:endParaRPr lang="en-US" dirty="0"/>
           </a:p>
@@ -9589,7 +9480,7 @@
           <a:p>
             <a:fld id="{48A87A34-81AB-432B-8DAE-1953F412C126}" type="datetimeFigureOut">
               <a:rPr lang="en-US" dirty="0"/>
-              <a:t>3/31/2022</a:t>
+              <a:t>4/5/2022</a:t>
             </a:fld>
             <a:endParaRPr lang="en-US" dirty="0"/>
           </a:p>
@@ -9679,7 +9570,7 @@
           <a:p>
             <a:fld id="{48A87A34-81AB-432B-8DAE-1953F412C126}" type="datetimeFigureOut">
               <a:rPr lang="en-US" dirty="0"/>
-              <a:t>3/31/2022</a:t>
+              <a:t>4/5/2022</a:t>
             </a:fld>
             <a:endParaRPr lang="en-US" dirty="0"/>
           </a:p>
@@ -9923,7 +9814,7 @@
           <a:p>
             <a:fld id="{48A87A34-81AB-432B-8DAE-1953F412C126}" type="datetimeFigureOut">
               <a:rPr lang="en-US" dirty="0"/>
-              <a:t>3/31/2022</a:t>
+              <a:t>4/5/2022</a:t>
             </a:fld>
             <a:endParaRPr lang="en-US" dirty="0"/>
           </a:p>
@@ -10198,7 +10089,7 @@
           <a:p>
             <a:fld id="{48A87A34-81AB-432B-8DAE-1953F412C126}" type="datetimeFigureOut">
               <a:rPr lang="en-US" dirty="0"/>
-              <a:t>3/31/2022</a:t>
+              <a:t>4/5/2022</a:t>
             </a:fld>
             <a:endParaRPr lang="en-US" dirty="0"/>
           </a:p>
@@ -10316,7 +10207,7 @@
           <a:noFill/>
           <a:extLst>
             <a:ext uri="{909E8E84-426E-40dd-AFC4-6F175D3DCCD1}">
-              <a14:hiddenFill xmlns="" xmlns:a14="http://schemas.microsoft.com/office/drawing/2010/main">
+              <a14:hiddenFill xmlns:a14="http://schemas.microsoft.com/office/drawing/2010/main" xmlns="">
                 <a:solidFill>
                   <a:srgbClr val="FFFFFF"/>
                 </a:solidFill>
@@ -10390,7 +10281,7 @@
               </a:ln>
               <a:extLst>
                 <a:ext uri="{91240B29-F687-4f45-9708-019B960494DF}">
-                  <a14:hiddenLine xmlns="" xmlns:a14="http://schemas.microsoft.com/office/drawing/2010/main" w="9525">
+                  <a14:hiddenLine xmlns:a14="http://schemas.microsoft.com/office/drawing/2010/main" xmlns="" w="9525">
                     <a:solidFill>
                       <a:srgbClr val="000000"/>
                     </a:solidFill>
@@ -10480,7 +10371,7 @@
               </a:ln>
               <a:extLst>
                 <a:ext uri="{91240B29-F687-4f45-9708-019B960494DF}">
-                  <a14:hiddenLine xmlns="" xmlns:a14="http://schemas.microsoft.com/office/drawing/2010/main" w="9525">
+                  <a14:hiddenLine xmlns:a14="http://schemas.microsoft.com/office/drawing/2010/main" xmlns="" w="9525">
                     <a:solidFill>
                       <a:srgbClr val="000000"/>
                     </a:solidFill>
@@ -10570,7 +10461,7 @@
               </a:ln>
               <a:extLst>
                 <a:ext uri="{91240B29-F687-4f45-9708-019B960494DF}">
-                  <a14:hiddenLine xmlns="" xmlns:a14="http://schemas.microsoft.com/office/drawing/2010/main" w="9525">
+                  <a14:hiddenLine xmlns:a14="http://schemas.microsoft.com/office/drawing/2010/main" xmlns="" w="9525">
                     <a:solidFill>
                       <a:srgbClr val="000000"/>
                     </a:solidFill>
@@ -10632,7 +10523,7 @@
               </a:ln>
               <a:extLst>
                 <a:ext uri="{91240B29-F687-4f45-9708-019B960494DF}">
-                  <a14:hiddenLine xmlns="" xmlns:a14="http://schemas.microsoft.com/office/drawing/2010/main" w="9525">
+                  <a14:hiddenLine xmlns:a14="http://schemas.microsoft.com/office/drawing/2010/main" xmlns="" w="9525">
                     <a:solidFill>
                       <a:srgbClr val="000000"/>
                     </a:solidFill>
@@ -10722,7 +10613,7 @@
               </a:ln>
               <a:extLst>
                 <a:ext uri="{91240B29-F687-4f45-9708-019B960494DF}">
-                  <a14:hiddenLine xmlns="" xmlns:a14="http://schemas.microsoft.com/office/drawing/2010/main" w="9525">
+                  <a14:hiddenLine xmlns:a14="http://schemas.microsoft.com/office/drawing/2010/main" xmlns="" w="9525">
                     <a:solidFill>
                       <a:srgbClr val="000000"/>
                     </a:solidFill>
@@ -10784,7 +10675,7 @@
               </a:ln>
               <a:extLst>
                 <a:ext uri="{91240B29-F687-4f45-9708-019B960494DF}">
-                  <a14:hiddenLine xmlns="" xmlns:a14="http://schemas.microsoft.com/office/drawing/2010/main" w="9525">
+                  <a14:hiddenLine xmlns:a14="http://schemas.microsoft.com/office/drawing/2010/main" xmlns="" w="9525">
                     <a:solidFill>
                       <a:srgbClr val="000000"/>
                     </a:solidFill>
@@ -10846,7 +10737,7 @@
               </a:ln>
               <a:extLst>
                 <a:ext uri="{91240B29-F687-4f45-9708-019B960494DF}">
-                  <a14:hiddenLine xmlns="" xmlns:a14="http://schemas.microsoft.com/office/drawing/2010/main" w="9525">
+                  <a14:hiddenLine xmlns:a14="http://schemas.microsoft.com/office/drawing/2010/main" xmlns="" w="9525">
                     <a:solidFill>
                       <a:srgbClr val="000000"/>
                     </a:solidFill>
@@ -10936,7 +10827,7 @@
               </a:ln>
               <a:extLst>
                 <a:ext uri="{91240B29-F687-4f45-9708-019B960494DF}">
-                  <a14:hiddenLine xmlns="" xmlns:a14="http://schemas.microsoft.com/office/drawing/2010/main" w="9525">
+                  <a14:hiddenLine xmlns:a14="http://schemas.microsoft.com/office/drawing/2010/main" xmlns="" w="9525">
                     <a:solidFill>
                       <a:srgbClr val="000000"/>
                     </a:solidFill>
@@ -11026,7 +10917,7 @@
               </a:ln>
               <a:extLst>
                 <a:ext uri="{91240B29-F687-4f45-9708-019B960494DF}">
-                  <a14:hiddenLine xmlns="" xmlns:a14="http://schemas.microsoft.com/office/drawing/2010/main" w="9525">
+                  <a14:hiddenLine xmlns:a14="http://schemas.microsoft.com/office/drawing/2010/main" xmlns="" w="9525">
                     <a:solidFill>
                       <a:srgbClr val="000000"/>
                     </a:solidFill>
@@ -11088,7 +10979,7 @@
               </a:ln>
               <a:extLst>
                 <a:ext uri="{91240B29-F687-4f45-9708-019B960494DF}">
-                  <a14:hiddenLine xmlns="" xmlns:a14="http://schemas.microsoft.com/office/drawing/2010/main" w="9525">
+                  <a14:hiddenLine xmlns:a14="http://schemas.microsoft.com/office/drawing/2010/main" xmlns="" w="9525">
                     <a:solidFill>
                       <a:srgbClr val="000000"/>
                     </a:solidFill>
@@ -11198,7 +11089,7 @@
               </a:ln>
               <a:extLst>
                 <a:ext uri="{91240B29-F687-4f45-9708-019B960494DF}">
-                  <a14:hiddenLine xmlns="" xmlns:a14="http://schemas.microsoft.com/office/drawing/2010/main" w="9525">
+                  <a14:hiddenLine xmlns:a14="http://schemas.microsoft.com/office/drawing/2010/main" xmlns="" w="9525">
                     <a:solidFill>
                       <a:srgbClr val="000000"/>
                     </a:solidFill>
@@ -11282,7 +11173,7 @@
               </a:ln>
               <a:extLst>
                 <a:ext uri="{91240B29-F687-4f45-9708-019B960494DF}">
-                  <a14:hiddenLine xmlns="" xmlns:a14="http://schemas.microsoft.com/office/drawing/2010/main" w="9525">
+                  <a14:hiddenLine xmlns:a14="http://schemas.microsoft.com/office/drawing/2010/main" xmlns="" w="9525">
                     <a:solidFill>
                       <a:srgbClr val="000000"/>
                     </a:solidFill>
@@ -11344,7 +11235,7 @@
               </a:ln>
               <a:extLst>
                 <a:ext uri="{91240B29-F687-4f45-9708-019B960494DF}">
-                  <a14:hiddenLine xmlns="" xmlns:a14="http://schemas.microsoft.com/office/drawing/2010/main" w="9525">
+                  <a14:hiddenLine xmlns:a14="http://schemas.microsoft.com/office/drawing/2010/main" xmlns="" w="9525">
                     <a:solidFill>
                       <a:srgbClr val="000000"/>
                     </a:solidFill>
@@ -11406,7 +11297,7 @@
               </a:ln>
               <a:extLst>
                 <a:ext uri="{91240B29-F687-4f45-9708-019B960494DF}">
-                  <a14:hiddenLine xmlns="" xmlns:a14="http://schemas.microsoft.com/office/drawing/2010/main" w="9525">
+                  <a14:hiddenLine xmlns:a14="http://schemas.microsoft.com/office/drawing/2010/main" xmlns="" w="9525">
                     <a:solidFill>
                       <a:srgbClr val="000000"/>
                     </a:solidFill>
@@ -11496,7 +11387,7 @@
               </a:ln>
               <a:extLst>
                 <a:ext uri="{91240B29-F687-4f45-9708-019B960494DF}">
-                  <a14:hiddenLine xmlns="" xmlns:a14="http://schemas.microsoft.com/office/drawing/2010/main" w="9525">
+                  <a14:hiddenLine xmlns:a14="http://schemas.microsoft.com/office/drawing/2010/main" xmlns="" w="9525">
                     <a:solidFill>
                       <a:srgbClr val="000000"/>
                     </a:solidFill>
@@ -11530,7 +11421,7 @@
               </a:ln>
               <a:extLst>
                 <a:ext uri="{91240B29-F687-4f45-9708-019B960494DF}">
-                  <a14:hiddenLine xmlns="" xmlns:a14="http://schemas.microsoft.com/office/drawing/2010/main" w="9525">
+                  <a14:hiddenLine xmlns:a14="http://schemas.microsoft.com/office/drawing/2010/main" xmlns="" w="9525">
                     <a:solidFill>
                       <a:srgbClr val="000000"/>
                     </a:solidFill>
@@ -11595,7 +11486,7 @@
               </a:ln>
               <a:extLst>
                 <a:ext uri="{91240B29-F687-4f45-9708-019B960494DF}">
-                  <a14:hiddenLine xmlns="" xmlns:a14="http://schemas.microsoft.com/office/drawing/2010/main" w="9525">
+                  <a14:hiddenLine xmlns:a14="http://schemas.microsoft.com/office/drawing/2010/main" xmlns="" w="9525">
                     <a:solidFill>
                       <a:srgbClr val="000000"/>
                     </a:solidFill>
@@ -11685,7 +11576,7 @@
               </a:ln>
               <a:extLst>
                 <a:ext uri="{91240B29-F687-4f45-9708-019B960494DF}">
-                  <a14:hiddenLine xmlns="" xmlns:a14="http://schemas.microsoft.com/office/drawing/2010/main" w="9525">
+                  <a14:hiddenLine xmlns:a14="http://schemas.microsoft.com/office/drawing/2010/main" xmlns="" w="9525">
                     <a:solidFill>
                       <a:srgbClr val="000000"/>
                     </a:solidFill>
@@ -11747,7 +11638,7 @@
               </a:ln>
               <a:extLst>
                 <a:ext uri="{91240B29-F687-4f45-9708-019B960494DF}">
-                  <a14:hiddenLine xmlns="" xmlns:a14="http://schemas.microsoft.com/office/drawing/2010/main" w="9525">
+                  <a14:hiddenLine xmlns:a14="http://schemas.microsoft.com/office/drawing/2010/main" xmlns="" w="9525">
                     <a:solidFill>
                       <a:srgbClr val="000000"/>
                     </a:solidFill>
@@ -11837,7 +11728,7 @@
               </a:ln>
               <a:extLst>
                 <a:ext uri="{91240B29-F687-4f45-9708-019B960494DF}">
-                  <a14:hiddenLine xmlns="" xmlns:a14="http://schemas.microsoft.com/office/drawing/2010/main" w="9525">
+                  <a14:hiddenLine xmlns:a14="http://schemas.microsoft.com/office/drawing/2010/main" xmlns="" w="9525">
                     <a:solidFill>
                       <a:srgbClr val="000000"/>
                     </a:solidFill>
@@ -11902,7 +11793,7 @@
               </a:ln>
               <a:extLst>
                 <a:ext uri="{91240B29-F687-4f45-9708-019B960494DF}">
-                  <a14:hiddenLine xmlns="" xmlns:a14="http://schemas.microsoft.com/office/drawing/2010/main" w="9525">
+                  <a14:hiddenLine xmlns:a14="http://schemas.microsoft.com/office/drawing/2010/main" xmlns="" w="9525">
                     <a:solidFill>
                       <a:srgbClr val="000000"/>
                     </a:solidFill>
@@ -11964,7 +11855,7 @@
               </a:ln>
               <a:extLst>
                 <a:ext uri="{91240B29-F687-4f45-9708-019B960494DF}">
-                  <a14:hiddenLine xmlns="" xmlns:a14="http://schemas.microsoft.com/office/drawing/2010/main" w="9525">
+                  <a14:hiddenLine xmlns:a14="http://schemas.microsoft.com/office/drawing/2010/main" xmlns="" w="9525">
                     <a:solidFill>
                       <a:srgbClr val="000000"/>
                     </a:solidFill>
@@ -12054,7 +11945,7 @@
               </a:ln>
               <a:extLst>
                 <a:ext uri="{91240B29-F687-4f45-9708-019B960494DF}">
-                  <a14:hiddenLine xmlns="" xmlns:a14="http://schemas.microsoft.com/office/drawing/2010/main" w="9525">
+                  <a14:hiddenLine xmlns:a14="http://schemas.microsoft.com/office/drawing/2010/main" xmlns="" w="9525">
                     <a:solidFill>
                       <a:srgbClr val="000000"/>
                     </a:solidFill>
@@ -12144,7 +12035,7 @@
               </a:ln>
               <a:extLst>
                 <a:ext uri="{91240B29-F687-4f45-9708-019B960494DF}">
-                  <a14:hiddenLine xmlns="" xmlns:a14="http://schemas.microsoft.com/office/drawing/2010/main" w="9525">
+                  <a14:hiddenLine xmlns:a14="http://schemas.microsoft.com/office/drawing/2010/main" xmlns="" w="9525">
                     <a:solidFill>
                       <a:srgbClr val="000000"/>
                     </a:solidFill>
@@ -12209,7 +12100,7 @@
               </a:ln>
               <a:extLst>
                 <a:ext uri="{91240B29-F687-4f45-9708-019B960494DF}">
-                  <a14:hiddenLine xmlns="" xmlns:a14="http://schemas.microsoft.com/office/drawing/2010/main" w="9525">
+                  <a14:hiddenLine xmlns:a14="http://schemas.microsoft.com/office/drawing/2010/main" xmlns="" w="9525">
                     <a:solidFill>
                       <a:srgbClr val="000000"/>
                     </a:solidFill>
@@ -12329,7 +12220,7 @@
               </a:ln>
               <a:extLst>
                 <a:ext uri="{91240B29-F687-4f45-9708-019B960494DF}">
-                  <a14:hiddenLine xmlns="" xmlns:a14="http://schemas.microsoft.com/office/drawing/2010/main" w="9525">
+                  <a14:hiddenLine xmlns:a14="http://schemas.microsoft.com/office/drawing/2010/main" xmlns="" w="9525">
                     <a:solidFill>
                       <a:srgbClr val="000000"/>
                     </a:solidFill>
@@ -12410,7 +12301,7 @@
               </a:ln>
               <a:extLst>
                 <a:ext uri="{91240B29-F687-4f45-9708-019B960494DF}">
-                  <a14:hiddenLine xmlns="" xmlns:a14="http://schemas.microsoft.com/office/drawing/2010/main" w="9525">
+                  <a14:hiddenLine xmlns:a14="http://schemas.microsoft.com/office/drawing/2010/main" xmlns="" w="9525">
                     <a:solidFill>
                       <a:srgbClr val="000000"/>
                     </a:solidFill>
@@ -12525,7 +12416,7 @@
               </a:ln>
               <a:extLst>
                 <a:ext uri="{91240B29-F687-4f45-9708-019B960494DF}">
-                  <a14:hiddenLine xmlns="" xmlns:a14="http://schemas.microsoft.com/office/drawing/2010/main" w="9525">
+                  <a14:hiddenLine xmlns:a14="http://schemas.microsoft.com/office/drawing/2010/main" xmlns="" w="9525">
                     <a:solidFill>
                       <a:srgbClr val="000000"/>
                     </a:solidFill>
@@ -12615,7 +12506,7 @@
               </a:ln>
               <a:extLst>
                 <a:ext uri="{91240B29-F687-4f45-9708-019B960494DF}">
-                  <a14:hiddenLine xmlns="" xmlns:a14="http://schemas.microsoft.com/office/drawing/2010/main" w="9525">
+                  <a14:hiddenLine xmlns:a14="http://schemas.microsoft.com/office/drawing/2010/main" xmlns="" w="9525">
                     <a:solidFill>
                       <a:srgbClr val="000000"/>
                     </a:solidFill>
@@ -12680,7 +12571,7 @@
               </a:ln>
               <a:extLst>
                 <a:ext uri="{91240B29-F687-4f45-9708-019B960494DF}">
-                  <a14:hiddenLine xmlns="" xmlns:a14="http://schemas.microsoft.com/office/drawing/2010/main" w="9525">
+                  <a14:hiddenLine xmlns:a14="http://schemas.microsoft.com/office/drawing/2010/main" xmlns="" w="9525">
                     <a:solidFill>
                       <a:srgbClr val="000000"/>
                     </a:solidFill>
@@ -12770,7 +12661,7 @@
               </a:ln>
               <a:extLst>
                 <a:ext uri="{91240B29-F687-4f45-9708-019B960494DF}">
-                  <a14:hiddenLine xmlns="" xmlns:a14="http://schemas.microsoft.com/office/drawing/2010/main" w="9525">
+                  <a14:hiddenLine xmlns:a14="http://schemas.microsoft.com/office/drawing/2010/main" xmlns="" w="9525">
                     <a:solidFill>
                       <a:srgbClr val="000000"/>
                     </a:solidFill>
@@ -12838,7 +12729,7 @@
               </a:ln>
               <a:extLst>
                 <a:ext uri="{91240B29-F687-4f45-9708-019B960494DF}">
-                  <a14:hiddenLine xmlns="" xmlns:a14="http://schemas.microsoft.com/office/drawing/2010/main" w="9525">
+                  <a14:hiddenLine xmlns:a14="http://schemas.microsoft.com/office/drawing/2010/main" xmlns="" w="9525">
                     <a:solidFill>
                       <a:srgbClr val="000000"/>
                     </a:solidFill>
@@ -12928,7 +12819,7 @@
               </a:ln>
               <a:extLst>
                 <a:ext uri="{91240B29-F687-4f45-9708-019B960494DF}">
-                  <a14:hiddenLine xmlns="" xmlns:a14="http://schemas.microsoft.com/office/drawing/2010/main" w="9525">
+                  <a14:hiddenLine xmlns:a14="http://schemas.microsoft.com/office/drawing/2010/main" xmlns="" w="9525">
                     <a:solidFill>
                       <a:srgbClr val="000000"/>
                     </a:solidFill>
@@ -12996,7 +12887,7 @@
               </a:ln>
               <a:extLst>
                 <a:ext uri="{91240B29-F687-4f45-9708-019B960494DF}">
-                  <a14:hiddenLine xmlns="" xmlns:a14="http://schemas.microsoft.com/office/drawing/2010/main" w="9525">
+                  <a14:hiddenLine xmlns:a14="http://schemas.microsoft.com/office/drawing/2010/main" xmlns="" w="9525">
                     <a:solidFill>
                       <a:srgbClr val="000000"/>
                     </a:solidFill>
@@ -13086,7 +12977,7 @@
               </a:ln>
               <a:extLst>
                 <a:ext uri="{91240B29-F687-4f45-9708-019B960494DF}">
-                  <a14:hiddenLine xmlns="" xmlns:a14="http://schemas.microsoft.com/office/drawing/2010/main" w="9525">
+                  <a14:hiddenLine xmlns:a14="http://schemas.microsoft.com/office/drawing/2010/main" xmlns="" w="9525">
                     <a:solidFill>
                       <a:srgbClr val="000000"/>
                     </a:solidFill>
@@ -13120,7 +13011,7 @@
               </a:ln>
               <a:extLst>
                 <a:ext uri="{91240B29-F687-4f45-9708-019B960494DF}">
-                  <a14:hiddenLine xmlns="" xmlns:a14="http://schemas.microsoft.com/office/drawing/2010/main" w="9525">
+                  <a14:hiddenLine xmlns:a14="http://schemas.microsoft.com/office/drawing/2010/main" xmlns="" w="9525">
                     <a:solidFill>
                       <a:srgbClr val="000000"/>
                     </a:solidFill>
@@ -13261,7 +13152,7 @@
             <a:fld id="{48A87A34-81AB-432B-8DAE-1953F412C126}" type="datetimeFigureOut">
               <a:rPr lang="en-US" dirty="0"/>
               <a:pPr/>
-              <a:t>3/31/2022</a:t>
+              <a:t>4/5/2022</a:t>
             </a:fld>
             <a:endParaRPr lang="en-US" dirty="0"/>
           </a:p>
@@ -13956,127 +13847,6 @@
 <file path=ppt/slides/slide3.xml><?xml version="1.0" encoding="utf-8"?>
 <p:sld xmlns:a="http://schemas.openxmlformats.org/drawingml/2006/main" xmlns:r="http://schemas.openxmlformats.org/officeDocument/2006/relationships" xmlns:p="http://schemas.openxmlformats.org/presentationml/2006/main">
   <p:cSld>
-    <p:spTree>
-      <p:nvGrpSpPr>
-        <p:cNvPr id="1" name=""/>
-        <p:cNvGrpSpPr/>
-        <p:nvPr/>
-      </p:nvGrpSpPr>
-      <p:grpSpPr>
-        <a:xfrm>
-          <a:off x="0" y="0"/>
-          <a:ext cx="0" cy="0"/>
-          <a:chOff x="0" y="0"/>
-          <a:chExt cx="0" cy="0"/>
-        </a:xfrm>
-      </p:grpSpPr>
-      <p:sp>
-        <p:nvSpPr>
-          <p:cNvPr id="2" name="Título 1">
-            <a:extLst>
-              <a:ext uri="{FF2B5EF4-FFF2-40B4-BE49-F238E27FC236}">
-                <a16:creationId xmlns:a16="http://schemas.microsoft.com/office/drawing/2014/main" id="{C2383D55-C708-47A0-8FA6-1905EF0BA1DC}"/>
-              </a:ext>
-            </a:extLst>
-          </p:cNvPr>
-          <p:cNvSpPr>
-            <a:spLocks noGrp="1"/>
-          </p:cNvSpPr>
-          <p:nvPr>
-            <p:ph type="title"/>
-          </p:nvPr>
-        </p:nvSpPr>
-        <p:spPr>
-          <a:xfrm>
-            <a:off x="1143001" y="377979"/>
-            <a:ext cx="9905998" cy="886725"/>
-          </a:xfrm>
-        </p:spPr>
-        <p:txBody>
-          <a:bodyPr/>
-          <a:lstStyle/>
-          <a:p>
-            <a:r>
-              <a:rPr lang="es-ES" sz="5400" dirty="0"/>
-              <a:t>				GITHUB</a:t>
-            </a:r>
-          </a:p>
-        </p:txBody>
-      </p:sp>
-      <p:sp>
-        <p:nvSpPr>
-          <p:cNvPr id="3" name="Marcador de contenido 2">
-            <a:extLst>
-              <a:ext uri="{FF2B5EF4-FFF2-40B4-BE49-F238E27FC236}">
-                <a16:creationId xmlns:a16="http://schemas.microsoft.com/office/drawing/2014/main" id="{E7C5FE10-3045-444C-BC5F-817542FA3CBD}"/>
-              </a:ext>
-            </a:extLst>
-          </p:cNvPr>
-          <p:cNvSpPr>
-            <a:spLocks noGrp="1"/>
-          </p:cNvSpPr>
-          <p:nvPr>
-            <p:ph idx="1"/>
-          </p:nvPr>
-        </p:nvSpPr>
-        <p:spPr/>
-        <p:txBody>
-          <a:bodyPr/>
-          <a:lstStyle/>
-          <a:p>
-            <a:endParaRPr lang="es-ES" dirty="0"/>
-          </a:p>
-          <a:p>
-            <a:endParaRPr lang="es-ES" dirty="0"/>
-          </a:p>
-        </p:txBody>
-      </p:sp>
-      <p:pic>
-        <p:nvPicPr>
-          <p:cNvPr id="5" name="Imagen 4">
-            <a:extLst>
-              <a:ext uri="{FF2B5EF4-FFF2-40B4-BE49-F238E27FC236}">
-                <a16:creationId xmlns:a16="http://schemas.microsoft.com/office/drawing/2014/main" id="{C826346E-5220-4531-AC53-45B9153C46EE}"/>
-              </a:ext>
-            </a:extLst>
-          </p:cNvPr>
-          <p:cNvPicPr>
-            <a:picLocks noChangeAspect="1"/>
-          </p:cNvPicPr>
-          <p:nvPr/>
-        </p:nvPicPr>
-        <p:blipFill>
-          <a:blip r:embed="rId3"/>
-          <a:stretch>
-            <a:fillRect/>
-          </a:stretch>
-        </p:blipFill>
-        <p:spPr>
-          <a:xfrm>
-            <a:off x="1024494" y="1264704"/>
-            <a:ext cx="10143012" cy="4911013"/>
-          </a:xfrm>
-          <a:prstGeom prst="rect">
-            <a:avLst/>
-          </a:prstGeom>
-        </p:spPr>
-      </p:pic>
-    </p:spTree>
-    <p:extLst>
-      <p:ext uri="{BB962C8B-B14F-4D97-AF65-F5344CB8AC3E}">
-        <p14:creationId xmlns:p14="http://schemas.microsoft.com/office/powerpoint/2010/main" val="1020433331"/>
-      </p:ext>
-    </p:extLst>
-  </p:cSld>
-  <p:clrMapOvr>
-    <a:masterClrMapping/>
-  </p:clrMapOvr>
-</p:sld>
-</file>
-
-<file path=ppt/slides/slide4.xml><?xml version="1.0" encoding="utf-8"?>
-<p:sld xmlns:a="http://schemas.openxmlformats.org/drawingml/2006/main" xmlns:r="http://schemas.openxmlformats.org/officeDocument/2006/relationships" xmlns:p="http://schemas.openxmlformats.org/presentationml/2006/main">
-  <p:cSld>
     <p:bg>
       <p:bgPr>
         <a:solidFill>
@@ -14182,7 +13952,7 @@
 </p:sld>
 </file>
 
-<file path=ppt/slides/slide5.xml><?xml version="1.0" encoding="utf-8"?>
+<file path=ppt/slides/slide4.xml><?xml version="1.0" encoding="utf-8"?>
 <p:sld xmlns:a="http://schemas.openxmlformats.org/drawingml/2006/main" xmlns:r="http://schemas.openxmlformats.org/officeDocument/2006/relationships" xmlns:p="http://schemas.openxmlformats.org/presentationml/2006/main">
   <p:cSld>
     <p:bg>
@@ -14290,7 +14060,7 @@
 </p:sld>
 </file>
 
-<file path=ppt/slides/slide6.xml><?xml version="1.0" encoding="utf-8"?>
+<file path=ppt/slides/slide5.xml><?xml version="1.0" encoding="utf-8"?>
 <p:sld xmlns:a="http://schemas.openxmlformats.org/drawingml/2006/main" xmlns:r="http://schemas.openxmlformats.org/officeDocument/2006/relationships" xmlns:p="http://schemas.openxmlformats.org/presentationml/2006/main">
   <p:cSld>
     <p:spTree>
@@ -14446,7 +14216,7 @@
 </p:sld>
 </file>
 
-<file path=ppt/slides/slide7.xml><?xml version="1.0" encoding="utf-8"?>
+<file path=ppt/slides/slide6.xml><?xml version="1.0" encoding="utf-8"?>
 <p:sld xmlns:a="http://schemas.openxmlformats.org/drawingml/2006/main" xmlns:r="http://schemas.openxmlformats.org/officeDocument/2006/relationships" xmlns:p="http://schemas.openxmlformats.org/presentationml/2006/main">
   <p:cSld>
     <p:bg>

</xml_diff>

<commit_message>
Cambio Diagrama E-R en powerpoint
</commit_message>
<xml_diff>
--- a/doc/Presentación_mitad_de_curso_JuanEspinosayNachoRodriguez.pptx
+++ b/doc/Presentación_mitad_de_curso_JuanEspinosayNachoRodriguez.pptx
@@ -1393,7 +1393,7 @@
           <a:noFill/>
           <a:extLst>
             <a:ext uri="{909E8E84-426E-40dd-AFC4-6F175D3DCCD1}">
-              <a14:hiddenFill xmlns:a14="http://schemas.microsoft.com/office/drawing/2010/main" xmlns="">
+              <a14:hiddenFill xmlns="" xmlns:a14="http://schemas.microsoft.com/office/drawing/2010/main">
                 <a:solidFill>
                   <a:srgbClr val="FFFFFF"/>
                 </a:solidFill>
@@ -1452,7 +1452,7 @@
             </a:ln>
             <a:extLst>
               <a:ext uri="{91240B29-F687-4f45-9708-019B960494DF}">
-                <a14:hiddenLine xmlns:a14="http://schemas.microsoft.com/office/drawing/2010/main" xmlns="" w="9525">
+                <a14:hiddenLine xmlns="" xmlns:a14="http://schemas.microsoft.com/office/drawing/2010/main" w="9525">
                   <a:solidFill>
                     <a:srgbClr val="000000"/>
                   </a:solidFill>
@@ -1542,7 +1542,7 @@
             </a:ln>
             <a:extLst>
               <a:ext uri="{91240B29-F687-4f45-9708-019B960494DF}">
-                <a14:hiddenLine xmlns:a14="http://schemas.microsoft.com/office/drawing/2010/main" xmlns="" w="9525">
+                <a14:hiddenLine xmlns="" xmlns:a14="http://schemas.microsoft.com/office/drawing/2010/main" w="9525">
                   <a:solidFill>
                     <a:srgbClr val="000000"/>
                   </a:solidFill>
@@ -1632,7 +1632,7 @@
             </a:ln>
             <a:extLst>
               <a:ext uri="{91240B29-F687-4f45-9708-019B960494DF}">
-                <a14:hiddenLine xmlns:a14="http://schemas.microsoft.com/office/drawing/2010/main" xmlns="" w="9525">
+                <a14:hiddenLine xmlns="" xmlns:a14="http://schemas.microsoft.com/office/drawing/2010/main" w="9525">
                   <a:solidFill>
                     <a:srgbClr val="000000"/>
                   </a:solidFill>
@@ -1666,7 +1666,7 @@
             </a:ln>
             <a:extLst>
               <a:ext uri="{91240B29-F687-4f45-9708-019B960494DF}">
-                <a14:hiddenLine xmlns:a14="http://schemas.microsoft.com/office/drawing/2010/main" xmlns="" w="9525">
+                <a14:hiddenLine xmlns="" xmlns:a14="http://schemas.microsoft.com/office/drawing/2010/main" w="9525">
                   <a:solidFill>
                     <a:srgbClr val="000000"/>
                   </a:solidFill>
@@ -1756,7 +1756,7 @@
             </a:ln>
             <a:extLst>
               <a:ext uri="{91240B29-F687-4f45-9708-019B960494DF}">
-                <a14:hiddenLine xmlns:a14="http://schemas.microsoft.com/office/drawing/2010/main" xmlns="" w="9525">
+                <a14:hiddenLine xmlns="" xmlns:a14="http://schemas.microsoft.com/office/drawing/2010/main" w="9525">
                   <a:solidFill>
                     <a:srgbClr val="000000"/>
                   </a:solidFill>
@@ -1818,7 +1818,7 @@
             </a:ln>
             <a:extLst>
               <a:ext uri="{91240B29-F687-4f45-9708-019B960494DF}">
-                <a14:hiddenLine xmlns:a14="http://schemas.microsoft.com/office/drawing/2010/main" xmlns="" w="9525">
+                <a14:hiddenLine xmlns="" xmlns:a14="http://schemas.microsoft.com/office/drawing/2010/main" w="9525">
                   <a:solidFill>
                     <a:srgbClr val="000000"/>
                   </a:solidFill>
@@ -1880,7 +1880,7 @@
             </a:ln>
             <a:extLst>
               <a:ext uri="{91240B29-F687-4f45-9708-019B960494DF}">
-                <a14:hiddenLine xmlns:a14="http://schemas.microsoft.com/office/drawing/2010/main" xmlns="" w="9525">
+                <a14:hiddenLine xmlns="" xmlns:a14="http://schemas.microsoft.com/office/drawing/2010/main" w="9525">
                   <a:solidFill>
                     <a:srgbClr val="000000"/>
                   </a:solidFill>
@@ -1970,7 +1970,7 @@
             </a:ln>
             <a:extLst>
               <a:ext uri="{91240B29-F687-4f45-9708-019B960494DF}">
-                <a14:hiddenLine xmlns:a14="http://schemas.microsoft.com/office/drawing/2010/main" xmlns="" w="9525">
+                <a14:hiddenLine xmlns="" xmlns:a14="http://schemas.microsoft.com/office/drawing/2010/main" w="9525">
                   <a:solidFill>
                     <a:srgbClr val="000000"/>
                   </a:solidFill>
@@ -2032,7 +2032,7 @@
             </a:ln>
             <a:extLst>
               <a:ext uri="{91240B29-F687-4f45-9708-019B960494DF}">
-                <a14:hiddenLine xmlns:a14="http://schemas.microsoft.com/office/drawing/2010/main" xmlns="" w="9525">
+                <a14:hiddenLine xmlns="" xmlns:a14="http://schemas.microsoft.com/office/drawing/2010/main" w="9525">
                   <a:solidFill>
                     <a:srgbClr val="000000"/>
                   </a:solidFill>
@@ -2094,7 +2094,7 @@
             </a:ln>
             <a:extLst>
               <a:ext uri="{91240B29-F687-4f45-9708-019B960494DF}">
-                <a14:hiddenLine xmlns:a14="http://schemas.microsoft.com/office/drawing/2010/main" xmlns="" w="9525">
+                <a14:hiddenLine xmlns="" xmlns:a14="http://schemas.microsoft.com/office/drawing/2010/main" w="9525">
                   <a:solidFill>
                     <a:srgbClr val="000000"/>
                   </a:solidFill>
@@ -2184,7 +2184,7 @@
             </a:ln>
             <a:extLst>
               <a:ext uri="{91240B29-F687-4f45-9708-019B960494DF}">
-                <a14:hiddenLine xmlns:a14="http://schemas.microsoft.com/office/drawing/2010/main" xmlns="" w="9525">
+                <a14:hiddenLine xmlns="" xmlns:a14="http://schemas.microsoft.com/office/drawing/2010/main" w="9525">
                   <a:solidFill>
                     <a:srgbClr val="000000"/>
                   </a:solidFill>
@@ -2274,7 +2274,7 @@
             </a:ln>
             <a:extLst>
               <a:ext uri="{91240B29-F687-4f45-9708-019B960494DF}">
-                <a14:hiddenLine xmlns:a14="http://schemas.microsoft.com/office/drawing/2010/main" xmlns="" w="9525">
+                <a14:hiddenLine xmlns="" xmlns:a14="http://schemas.microsoft.com/office/drawing/2010/main" w="9525">
                   <a:solidFill>
                     <a:srgbClr val="000000"/>
                   </a:solidFill>
@@ -2336,7 +2336,7 @@
             </a:ln>
             <a:extLst>
               <a:ext uri="{91240B29-F687-4f45-9708-019B960494DF}">
-                <a14:hiddenLine xmlns:a14="http://schemas.microsoft.com/office/drawing/2010/main" xmlns="" w="9525">
+                <a14:hiddenLine xmlns="" xmlns:a14="http://schemas.microsoft.com/office/drawing/2010/main" w="9525">
                   <a:solidFill>
                     <a:srgbClr val="000000"/>
                   </a:solidFill>
@@ -2446,7 +2446,7 @@
             </a:ln>
             <a:extLst>
               <a:ext uri="{91240B29-F687-4f45-9708-019B960494DF}">
-                <a14:hiddenLine xmlns:a14="http://schemas.microsoft.com/office/drawing/2010/main" xmlns="" w="9525">
+                <a14:hiddenLine xmlns="" xmlns:a14="http://schemas.microsoft.com/office/drawing/2010/main" w="9525">
                   <a:solidFill>
                     <a:srgbClr val="000000"/>
                   </a:solidFill>
@@ -2508,7 +2508,7 @@
             </a:ln>
             <a:extLst>
               <a:ext uri="{91240B29-F687-4f45-9708-019B960494DF}">
-                <a14:hiddenLine xmlns:a14="http://schemas.microsoft.com/office/drawing/2010/main" xmlns="" w="9525">
+                <a14:hiddenLine xmlns="" xmlns:a14="http://schemas.microsoft.com/office/drawing/2010/main" w="9525">
                   <a:solidFill>
                     <a:srgbClr val="000000"/>
                   </a:solidFill>
@@ -2598,7 +2598,7 @@
             </a:ln>
             <a:extLst>
               <a:ext uri="{91240B29-F687-4f45-9708-019B960494DF}">
-                <a14:hiddenLine xmlns:a14="http://schemas.microsoft.com/office/drawing/2010/main" xmlns="" w="9525">
+                <a14:hiddenLine xmlns="" xmlns:a14="http://schemas.microsoft.com/office/drawing/2010/main" w="9525">
                   <a:solidFill>
                     <a:srgbClr val="000000"/>
                   </a:solidFill>
@@ -2688,7 +2688,7 @@
             </a:ln>
             <a:extLst>
               <a:ext uri="{91240B29-F687-4f45-9708-019B960494DF}">
-                <a14:hiddenLine xmlns:a14="http://schemas.microsoft.com/office/drawing/2010/main" xmlns="" w="9525">
+                <a14:hiddenLine xmlns="" xmlns:a14="http://schemas.microsoft.com/office/drawing/2010/main" w="9525">
                   <a:solidFill>
                     <a:srgbClr val="000000"/>
                   </a:solidFill>
@@ -2750,7 +2750,7 @@
             </a:ln>
             <a:extLst>
               <a:ext uri="{91240B29-F687-4f45-9708-019B960494DF}">
-                <a14:hiddenLine xmlns:a14="http://schemas.microsoft.com/office/drawing/2010/main" xmlns="" w="9525">
+                <a14:hiddenLine xmlns="" xmlns:a14="http://schemas.microsoft.com/office/drawing/2010/main" w="9525">
                   <a:solidFill>
                     <a:srgbClr val="000000"/>
                   </a:solidFill>
@@ -2840,7 +2840,7 @@
             </a:ln>
             <a:extLst>
               <a:ext uri="{91240B29-F687-4f45-9708-019B960494DF}">
-                <a14:hiddenLine xmlns:a14="http://schemas.microsoft.com/office/drawing/2010/main" xmlns="" w="9525">
+                <a14:hiddenLine xmlns="" xmlns:a14="http://schemas.microsoft.com/office/drawing/2010/main" w="9525">
                   <a:solidFill>
                     <a:srgbClr val="000000"/>
                   </a:solidFill>
@@ -2930,7 +2930,7 @@
             </a:ln>
             <a:extLst>
               <a:ext uri="{91240B29-F687-4f45-9708-019B960494DF}">
-                <a14:hiddenLine xmlns:a14="http://schemas.microsoft.com/office/drawing/2010/main" xmlns="" w="9525">
+                <a14:hiddenLine xmlns="" xmlns:a14="http://schemas.microsoft.com/office/drawing/2010/main" w="9525">
                   <a:solidFill>
                     <a:srgbClr val="000000"/>
                   </a:solidFill>
@@ -2986,7 +2986,7 @@
             </a:ln>
             <a:extLst>
               <a:ext uri="{91240B29-F687-4f45-9708-019B960494DF}">
-                <a14:hiddenLine xmlns:a14="http://schemas.microsoft.com/office/drawing/2010/main" xmlns="" w="9525">
+                <a14:hiddenLine xmlns="" xmlns:a14="http://schemas.microsoft.com/office/drawing/2010/main" w="9525">
                   <a:solidFill>
                     <a:srgbClr val="000000"/>
                   </a:solidFill>
@@ -3076,7 +3076,7 @@
             </a:ln>
             <a:extLst>
               <a:ext uri="{91240B29-F687-4f45-9708-019B960494DF}">
-                <a14:hiddenLine xmlns:a14="http://schemas.microsoft.com/office/drawing/2010/main" xmlns="" w="9525">
+                <a14:hiddenLine xmlns="" xmlns:a14="http://schemas.microsoft.com/office/drawing/2010/main" w="9525">
                   <a:solidFill>
                     <a:srgbClr val="000000"/>
                   </a:solidFill>
@@ -3132,7 +3132,7 @@
             </a:ln>
             <a:extLst>
               <a:ext uri="{91240B29-F687-4f45-9708-019B960494DF}">
-                <a14:hiddenLine xmlns:a14="http://schemas.microsoft.com/office/drawing/2010/main" xmlns="" w="9525">
+                <a14:hiddenLine xmlns="" xmlns:a14="http://schemas.microsoft.com/office/drawing/2010/main" w="9525">
                   <a:solidFill>
                     <a:srgbClr val="000000"/>
                   </a:solidFill>
@@ -3222,7 +3222,7 @@
             </a:ln>
             <a:extLst>
               <a:ext uri="{91240B29-F687-4f45-9708-019B960494DF}">
-                <a14:hiddenLine xmlns:a14="http://schemas.microsoft.com/office/drawing/2010/main" xmlns="" w="9525">
+                <a14:hiddenLine xmlns="" xmlns:a14="http://schemas.microsoft.com/office/drawing/2010/main" w="9525">
                   <a:solidFill>
                     <a:srgbClr val="000000"/>
                   </a:solidFill>
@@ -3290,7 +3290,7 @@
             </a:ln>
             <a:extLst>
               <a:ext uri="{91240B29-F687-4f45-9708-019B960494DF}">
-                <a14:hiddenLine xmlns:a14="http://schemas.microsoft.com/office/drawing/2010/main" xmlns="" w="9525">
+                <a14:hiddenLine xmlns="" xmlns:a14="http://schemas.microsoft.com/office/drawing/2010/main" w="9525">
                   <a:solidFill>
                     <a:srgbClr val="000000"/>
                   </a:solidFill>
@@ -3380,7 +3380,7 @@
             </a:ln>
             <a:extLst>
               <a:ext uri="{91240B29-F687-4f45-9708-019B960494DF}">
-                <a14:hiddenLine xmlns:a14="http://schemas.microsoft.com/office/drawing/2010/main" xmlns="" w="9525">
+                <a14:hiddenLine xmlns="" xmlns:a14="http://schemas.microsoft.com/office/drawing/2010/main" w="9525">
                   <a:solidFill>
                     <a:srgbClr val="000000"/>
                   </a:solidFill>
@@ -3448,7 +3448,7 @@
             </a:ln>
             <a:extLst>
               <a:ext uri="{91240B29-F687-4f45-9708-019B960494DF}">
-                <a14:hiddenLine xmlns:a14="http://schemas.microsoft.com/office/drawing/2010/main" xmlns="" w="9525">
+                <a14:hiddenLine xmlns="" xmlns:a14="http://schemas.microsoft.com/office/drawing/2010/main" w="9525">
                   <a:solidFill>
                     <a:srgbClr val="000000"/>
                   </a:solidFill>
@@ -3538,7 +3538,7 @@
             </a:ln>
             <a:extLst>
               <a:ext uri="{91240B29-F687-4f45-9708-019B960494DF}">
-                <a14:hiddenLine xmlns:a14="http://schemas.microsoft.com/office/drawing/2010/main" xmlns="" w="9525">
+                <a14:hiddenLine xmlns="" xmlns:a14="http://schemas.microsoft.com/office/drawing/2010/main" w="9525">
                   <a:solidFill>
                     <a:srgbClr val="000000"/>
                   </a:solidFill>
@@ -3572,7 +3572,7 @@
             </a:ln>
             <a:extLst>
               <a:ext uri="{91240B29-F687-4f45-9708-019B960494DF}">
-                <a14:hiddenLine xmlns:a14="http://schemas.microsoft.com/office/drawing/2010/main" xmlns="" w="9525">
+                <a14:hiddenLine xmlns="" xmlns:a14="http://schemas.microsoft.com/office/drawing/2010/main" w="9525">
                   <a:solidFill>
                     <a:srgbClr val="000000"/>
                   </a:solidFill>
@@ -3662,7 +3662,7 @@
             </a:ln>
             <a:extLst>
               <a:ext uri="{91240B29-F687-4f45-9708-019B960494DF}">
-                <a14:hiddenLine xmlns:a14="http://schemas.microsoft.com/office/drawing/2010/main" xmlns="" w="9525">
+                <a14:hiddenLine xmlns="" xmlns:a14="http://schemas.microsoft.com/office/drawing/2010/main" w="9525">
                   <a:solidFill>
                     <a:srgbClr val="000000"/>
                   </a:solidFill>
@@ -3724,7 +3724,7 @@
             </a:ln>
             <a:extLst>
               <a:ext uri="{91240B29-F687-4f45-9708-019B960494DF}">
-                <a14:hiddenLine xmlns:a14="http://schemas.microsoft.com/office/drawing/2010/main" xmlns="" w="9525">
+                <a14:hiddenLine xmlns="" xmlns:a14="http://schemas.microsoft.com/office/drawing/2010/main" w="9525">
                   <a:solidFill>
                     <a:srgbClr val="000000"/>
                   </a:solidFill>
@@ -3786,7 +3786,7 @@
             </a:ln>
             <a:extLst>
               <a:ext uri="{91240B29-F687-4f45-9708-019B960494DF}">
-                <a14:hiddenLine xmlns:a14="http://schemas.microsoft.com/office/drawing/2010/main" xmlns="" w="9525">
+                <a14:hiddenLine xmlns="" xmlns:a14="http://schemas.microsoft.com/office/drawing/2010/main" w="9525">
                   <a:solidFill>
                     <a:srgbClr val="000000"/>
                   </a:solidFill>
@@ -3876,7 +3876,7 @@
             </a:ln>
             <a:extLst>
               <a:ext uri="{91240B29-F687-4f45-9708-019B960494DF}">
-                <a14:hiddenLine xmlns:a14="http://schemas.microsoft.com/office/drawing/2010/main" xmlns="" w="9525">
+                <a14:hiddenLine xmlns="" xmlns:a14="http://schemas.microsoft.com/office/drawing/2010/main" w="9525">
                   <a:solidFill>
                     <a:srgbClr val="000000"/>
                   </a:solidFill>
@@ -3944,7 +3944,7 @@
             </a:ln>
             <a:extLst>
               <a:ext uri="{91240B29-F687-4f45-9708-019B960494DF}">
-                <a14:hiddenLine xmlns:a14="http://schemas.microsoft.com/office/drawing/2010/main" xmlns="" w="9525">
+                <a14:hiddenLine xmlns="" xmlns:a14="http://schemas.microsoft.com/office/drawing/2010/main" w="9525">
                   <a:solidFill>
                     <a:srgbClr val="000000"/>
                   </a:solidFill>
@@ -4006,7 +4006,7 @@
             </a:ln>
             <a:extLst>
               <a:ext uri="{91240B29-F687-4f45-9708-019B960494DF}">
-                <a14:hiddenLine xmlns:a14="http://schemas.microsoft.com/office/drawing/2010/main" xmlns="" w="9525">
+                <a14:hiddenLine xmlns="" xmlns:a14="http://schemas.microsoft.com/office/drawing/2010/main" w="9525">
                   <a:solidFill>
                     <a:srgbClr val="000000"/>
                   </a:solidFill>
@@ -4096,7 +4096,7 @@
             </a:ln>
             <a:extLst>
               <a:ext uri="{91240B29-F687-4f45-9708-019B960494DF}">
-                <a14:hiddenLine xmlns:a14="http://schemas.microsoft.com/office/drawing/2010/main" xmlns="" w="9525">
+                <a14:hiddenLine xmlns="" xmlns:a14="http://schemas.microsoft.com/office/drawing/2010/main" w="9525">
                   <a:solidFill>
                     <a:srgbClr val="000000"/>
                   </a:solidFill>
@@ -4158,7 +4158,7 @@
             </a:ln>
             <a:extLst>
               <a:ext uri="{91240B29-F687-4f45-9708-019B960494DF}">
-                <a14:hiddenLine xmlns:a14="http://schemas.microsoft.com/office/drawing/2010/main" xmlns="" w="9525">
+                <a14:hiddenLine xmlns="" xmlns:a14="http://schemas.microsoft.com/office/drawing/2010/main" w="9525">
                   <a:solidFill>
                     <a:srgbClr val="000000"/>
                   </a:solidFill>
@@ -4248,7 +4248,7 @@
             </a:ln>
             <a:extLst>
               <a:ext uri="{91240B29-F687-4f45-9708-019B960494DF}">
-                <a14:hiddenLine xmlns:a14="http://schemas.microsoft.com/office/drawing/2010/main" xmlns="" w="9525">
+                <a14:hiddenLine xmlns="" xmlns:a14="http://schemas.microsoft.com/office/drawing/2010/main" w="9525">
                   <a:solidFill>
                     <a:srgbClr val="000000"/>
                   </a:solidFill>
@@ -4310,7 +4310,7 @@
             </a:ln>
             <a:extLst>
               <a:ext uri="{91240B29-F687-4f45-9708-019B960494DF}">
-                <a14:hiddenLine xmlns:a14="http://schemas.microsoft.com/office/drawing/2010/main" xmlns="" w="9525">
+                <a14:hiddenLine xmlns="" xmlns:a14="http://schemas.microsoft.com/office/drawing/2010/main" w="9525">
                   <a:solidFill>
                     <a:srgbClr val="000000"/>
                   </a:solidFill>
@@ -4400,7 +4400,7 @@
             </a:ln>
             <a:extLst>
               <a:ext uri="{91240B29-F687-4f45-9708-019B960494DF}">
-                <a14:hiddenLine xmlns:a14="http://schemas.microsoft.com/office/drawing/2010/main" xmlns="" w="9525">
+                <a14:hiddenLine xmlns="" xmlns:a14="http://schemas.microsoft.com/office/drawing/2010/main" w="9525">
                   <a:solidFill>
                     <a:srgbClr val="000000"/>
                   </a:solidFill>
@@ -4434,7 +4434,7 @@
             </a:ln>
             <a:extLst>
               <a:ext uri="{91240B29-F687-4f45-9708-019B960494DF}">
-                <a14:hiddenLine xmlns:a14="http://schemas.microsoft.com/office/drawing/2010/main" xmlns="" w="9525">
+                <a14:hiddenLine xmlns="" xmlns:a14="http://schemas.microsoft.com/office/drawing/2010/main" w="9525">
                   <a:solidFill>
                     <a:srgbClr val="000000"/>
                   </a:solidFill>
@@ -4499,7 +4499,7 @@
             </a:ln>
             <a:extLst>
               <a:ext uri="{91240B29-F687-4f45-9708-019B960494DF}">
-                <a14:hiddenLine xmlns:a14="http://schemas.microsoft.com/office/drawing/2010/main" xmlns="" w="9525">
+                <a14:hiddenLine xmlns="" xmlns:a14="http://schemas.microsoft.com/office/drawing/2010/main" w="9525">
                   <a:solidFill>
                     <a:srgbClr val="000000"/>
                   </a:solidFill>
@@ -4589,7 +4589,7 @@
             </a:ln>
             <a:extLst>
               <a:ext uri="{91240B29-F687-4f45-9708-019B960494DF}">
-                <a14:hiddenLine xmlns:a14="http://schemas.microsoft.com/office/drawing/2010/main" xmlns="" w="9525">
+                <a14:hiddenLine xmlns="" xmlns:a14="http://schemas.microsoft.com/office/drawing/2010/main" w="9525">
                   <a:solidFill>
                     <a:srgbClr val="000000"/>
                   </a:solidFill>
@@ -4651,7 +4651,7 @@
             </a:ln>
             <a:extLst>
               <a:ext uri="{91240B29-F687-4f45-9708-019B960494DF}">
-                <a14:hiddenLine xmlns:a14="http://schemas.microsoft.com/office/drawing/2010/main" xmlns="" w="9525">
+                <a14:hiddenLine xmlns="" xmlns:a14="http://schemas.microsoft.com/office/drawing/2010/main" w="9525">
                   <a:solidFill>
                     <a:srgbClr val="000000"/>
                   </a:solidFill>
@@ -4741,7 +4741,7 @@
             </a:ln>
             <a:extLst>
               <a:ext uri="{91240B29-F687-4f45-9708-019B960494DF}">
-                <a14:hiddenLine xmlns:a14="http://schemas.microsoft.com/office/drawing/2010/main" xmlns="" w="9525">
+                <a14:hiddenLine xmlns="" xmlns:a14="http://schemas.microsoft.com/office/drawing/2010/main" w="9525">
                   <a:solidFill>
                     <a:srgbClr val="000000"/>
                   </a:solidFill>
@@ -4831,7 +4831,7 @@
             </a:ln>
             <a:extLst>
               <a:ext uri="{91240B29-F687-4f45-9708-019B960494DF}">
-                <a14:hiddenLine xmlns:a14="http://schemas.microsoft.com/office/drawing/2010/main" xmlns="" w="9525">
+                <a14:hiddenLine xmlns="" xmlns:a14="http://schemas.microsoft.com/office/drawing/2010/main" w="9525">
                   <a:solidFill>
                     <a:srgbClr val="000000"/>
                   </a:solidFill>
@@ -4896,7 +4896,7 @@
             </a:ln>
             <a:extLst>
               <a:ext uri="{91240B29-F687-4f45-9708-019B960494DF}">
-                <a14:hiddenLine xmlns:a14="http://schemas.microsoft.com/office/drawing/2010/main" xmlns="" w="9525">
+                <a14:hiddenLine xmlns="" xmlns:a14="http://schemas.microsoft.com/office/drawing/2010/main" w="9525">
                   <a:solidFill>
                     <a:srgbClr val="000000"/>
                   </a:solidFill>
@@ -4958,7 +4958,7 @@
             </a:ln>
             <a:extLst>
               <a:ext uri="{91240B29-F687-4f45-9708-019B960494DF}">
-                <a14:hiddenLine xmlns:a14="http://schemas.microsoft.com/office/drawing/2010/main" xmlns="" w="9525">
+                <a14:hiddenLine xmlns="" xmlns:a14="http://schemas.microsoft.com/office/drawing/2010/main" w="9525">
                   <a:solidFill>
                     <a:srgbClr val="000000"/>
                   </a:solidFill>
@@ -5048,7 +5048,7 @@
             </a:ln>
             <a:extLst>
               <a:ext uri="{91240B29-F687-4f45-9708-019B960494DF}">
-                <a14:hiddenLine xmlns:a14="http://schemas.microsoft.com/office/drawing/2010/main" xmlns="" w="9525">
+                <a14:hiddenLine xmlns="" xmlns:a14="http://schemas.microsoft.com/office/drawing/2010/main" w="9525">
                   <a:solidFill>
                     <a:srgbClr val="000000"/>
                   </a:solidFill>
@@ -5138,7 +5138,7 @@
             </a:ln>
             <a:extLst>
               <a:ext uri="{91240B29-F687-4f45-9708-019B960494DF}">
-                <a14:hiddenLine xmlns:a14="http://schemas.microsoft.com/office/drawing/2010/main" xmlns="" w="9525">
+                <a14:hiddenLine xmlns="" xmlns:a14="http://schemas.microsoft.com/office/drawing/2010/main" w="9525">
                   <a:solidFill>
                     <a:srgbClr val="000000"/>
                   </a:solidFill>
@@ -5200,7 +5200,7 @@
             </a:ln>
             <a:extLst>
               <a:ext uri="{91240B29-F687-4f45-9708-019B960494DF}">
-                <a14:hiddenLine xmlns:a14="http://schemas.microsoft.com/office/drawing/2010/main" xmlns="" w="9525">
+                <a14:hiddenLine xmlns="" xmlns:a14="http://schemas.microsoft.com/office/drawing/2010/main" w="9525">
                   <a:solidFill>
                     <a:srgbClr val="000000"/>
                   </a:solidFill>
@@ -5320,7 +5320,7 @@
             </a:ln>
             <a:extLst>
               <a:ext uri="{91240B29-F687-4f45-9708-019B960494DF}">
-                <a14:hiddenLine xmlns:a14="http://schemas.microsoft.com/office/drawing/2010/main" xmlns="" w="9525">
+                <a14:hiddenLine xmlns="" xmlns:a14="http://schemas.microsoft.com/office/drawing/2010/main" w="9525">
                   <a:solidFill>
                     <a:srgbClr val="000000"/>
                   </a:solidFill>
@@ -5388,7 +5388,7 @@
             </a:ln>
             <a:extLst>
               <a:ext uri="{91240B29-F687-4f45-9708-019B960494DF}">
-                <a14:hiddenLine xmlns:a14="http://schemas.microsoft.com/office/drawing/2010/main" xmlns="" w="9525">
+                <a14:hiddenLine xmlns="" xmlns:a14="http://schemas.microsoft.com/office/drawing/2010/main" w="9525">
                   <a:solidFill>
                     <a:srgbClr val="000000"/>
                   </a:solidFill>
@@ -5478,7 +5478,7 @@
             </a:ln>
             <a:extLst>
               <a:ext uri="{91240B29-F687-4f45-9708-019B960494DF}">
-                <a14:hiddenLine xmlns:a14="http://schemas.microsoft.com/office/drawing/2010/main" xmlns="" w="9525">
+                <a14:hiddenLine xmlns="" xmlns:a14="http://schemas.microsoft.com/office/drawing/2010/main" w="9525">
                   <a:solidFill>
                     <a:srgbClr val="000000"/>
                   </a:solidFill>
@@ -10207,7 +10207,7 @@
           <a:noFill/>
           <a:extLst>
             <a:ext uri="{909E8E84-426E-40dd-AFC4-6F175D3DCCD1}">
-              <a14:hiddenFill xmlns:a14="http://schemas.microsoft.com/office/drawing/2010/main" xmlns="">
+              <a14:hiddenFill xmlns="" xmlns:a14="http://schemas.microsoft.com/office/drawing/2010/main">
                 <a:solidFill>
                   <a:srgbClr val="FFFFFF"/>
                 </a:solidFill>
@@ -10281,7 +10281,7 @@
               </a:ln>
               <a:extLst>
                 <a:ext uri="{91240B29-F687-4f45-9708-019B960494DF}">
-                  <a14:hiddenLine xmlns:a14="http://schemas.microsoft.com/office/drawing/2010/main" xmlns="" w="9525">
+                  <a14:hiddenLine xmlns="" xmlns:a14="http://schemas.microsoft.com/office/drawing/2010/main" w="9525">
                     <a:solidFill>
                       <a:srgbClr val="000000"/>
                     </a:solidFill>
@@ -10371,7 +10371,7 @@
               </a:ln>
               <a:extLst>
                 <a:ext uri="{91240B29-F687-4f45-9708-019B960494DF}">
-                  <a14:hiddenLine xmlns:a14="http://schemas.microsoft.com/office/drawing/2010/main" xmlns="" w="9525">
+                  <a14:hiddenLine xmlns="" xmlns:a14="http://schemas.microsoft.com/office/drawing/2010/main" w="9525">
                     <a:solidFill>
                       <a:srgbClr val="000000"/>
                     </a:solidFill>
@@ -10461,7 +10461,7 @@
               </a:ln>
               <a:extLst>
                 <a:ext uri="{91240B29-F687-4f45-9708-019B960494DF}">
-                  <a14:hiddenLine xmlns:a14="http://schemas.microsoft.com/office/drawing/2010/main" xmlns="" w="9525">
+                  <a14:hiddenLine xmlns="" xmlns:a14="http://schemas.microsoft.com/office/drawing/2010/main" w="9525">
                     <a:solidFill>
                       <a:srgbClr val="000000"/>
                     </a:solidFill>
@@ -10523,7 +10523,7 @@
               </a:ln>
               <a:extLst>
                 <a:ext uri="{91240B29-F687-4f45-9708-019B960494DF}">
-                  <a14:hiddenLine xmlns:a14="http://schemas.microsoft.com/office/drawing/2010/main" xmlns="" w="9525">
+                  <a14:hiddenLine xmlns="" xmlns:a14="http://schemas.microsoft.com/office/drawing/2010/main" w="9525">
                     <a:solidFill>
                       <a:srgbClr val="000000"/>
                     </a:solidFill>
@@ -10613,7 +10613,7 @@
               </a:ln>
               <a:extLst>
                 <a:ext uri="{91240B29-F687-4f45-9708-019B960494DF}">
-                  <a14:hiddenLine xmlns:a14="http://schemas.microsoft.com/office/drawing/2010/main" xmlns="" w="9525">
+                  <a14:hiddenLine xmlns="" xmlns:a14="http://schemas.microsoft.com/office/drawing/2010/main" w="9525">
                     <a:solidFill>
                       <a:srgbClr val="000000"/>
                     </a:solidFill>
@@ -10675,7 +10675,7 @@
               </a:ln>
               <a:extLst>
                 <a:ext uri="{91240B29-F687-4f45-9708-019B960494DF}">
-                  <a14:hiddenLine xmlns:a14="http://schemas.microsoft.com/office/drawing/2010/main" xmlns="" w="9525">
+                  <a14:hiddenLine xmlns="" xmlns:a14="http://schemas.microsoft.com/office/drawing/2010/main" w="9525">
                     <a:solidFill>
                       <a:srgbClr val="000000"/>
                     </a:solidFill>
@@ -10737,7 +10737,7 @@
               </a:ln>
               <a:extLst>
                 <a:ext uri="{91240B29-F687-4f45-9708-019B960494DF}">
-                  <a14:hiddenLine xmlns:a14="http://schemas.microsoft.com/office/drawing/2010/main" xmlns="" w="9525">
+                  <a14:hiddenLine xmlns="" xmlns:a14="http://schemas.microsoft.com/office/drawing/2010/main" w="9525">
                     <a:solidFill>
                       <a:srgbClr val="000000"/>
                     </a:solidFill>
@@ -10827,7 +10827,7 @@
               </a:ln>
               <a:extLst>
                 <a:ext uri="{91240B29-F687-4f45-9708-019B960494DF}">
-                  <a14:hiddenLine xmlns:a14="http://schemas.microsoft.com/office/drawing/2010/main" xmlns="" w="9525">
+                  <a14:hiddenLine xmlns="" xmlns:a14="http://schemas.microsoft.com/office/drawing/2010/main" w="9525">
                     <a:solidFill>
                       <a:srgbClr val="000000"/>
                     </a:solidFill>
@@ -10917,7 +10917,7 @@
               </a:ln>
               <a:extLst>
                 <a:ext uri="{91240B29-F687-4f45-9708-019B960494DF}">
-                  <a14:hiddenLine xmlns:a14="http://schemas.microsoft.com/office/drawing/2010/main" xmlns="" w="9525">
+                  <a14:hiddenLine xmlns="" xmlns:a14="http://schemas.microsoft.com/office/drawing/2010/main" w="9525">
                     <a:solidFill>
                       <a:srgbClr val="000000"/>
                     </a:solidFill>
@@ -10979,7 +10979,7 @@
               </a:ln>
               <a:extLst>
                 <a:ext uri="{91240B29-F687-4f45-9708-019B960494DF}">
-                  <a14:hiddenLine xmlns:a14="http://schemas.microsoft.com/office/drawing/2010/main" xmlns="" w="9525">
+                  <a14:hiddenLine xmlns="" xmlns:a14="http://schemas.microsoft.com/office/drawing/2010/main" w="9525">
                     <a:solidFill>
                       <a:srgbClr val="000000"/>
                     </a:solidFill>
@@ -11089,7 +11089,7 @@
               </a:ln>
               <a:extLst>
                 <a:ext uri="{91240B29-F687-4f45-9708-019B960494DF}">
-                  <a14:hiddenLine xmlns:a14="http://schemas.microsoft.com/office/drawing/2010/main" xmlns="" w="9525">
+                  <a14:hiddenLine xmlns="" xmlns:a14="http://schemas.microsoft.com/office/drawing/2010/main" w="9525">
                     <a:solidFill>
                       <a:srgbClr val="000000"/>
                     </a:solidFill>
@@ -11173,7 +11173,7 @@
               </a:ln>
               <a:extLst>
                 <a:ext uri="{91240B29-F687-4f45-9708-019B960494DF}">
-                  <a14:hiddenLine xmlns:a14="http://schemas.microsoft.com/office/drawing/2010/main" xmlns="" w="9525">
+                  <a14:hiddenLine xmlns="" xmlns:a14="http://schemas.microsoft.com/office/drawing/2010/main" w="9525">
                     <a:solidFill>
                       <a:srgbClr val="000000"/>
                     </a:solidFill>
@@ -11235,7 +11235,7 @@
               </a:ln>
               <a:extLst>
                 <a:ext uri="{91240B29-F687-4f45-9708-019B960494DF}">
-                  <a14:hiddenLine xmlns:a14="http://schemas.microsoft.com/office/drawing/2010/main" xmlns="" w="9525">
+                  <a14:hiddenLine xmlns="" xmlns:a14="http://schemas.microsoft.com/office/drawing/2010/main" w="9525">
                     <a:solidFill>
                       <a:srgbClr val="000000"/>
                     </a:solidFill>
@@ -11297,7 +11297,7 @@
               </a:ln>
               <a:extLst>
                 <a:ext uri="{91240B29-F687-4f45-9708-019B960494DF}">
-                  <a14:hiddenLine xmlns:a14="http://schemas.microsoft.com/office/drawing/2010/main" xmlns="" w="9525">
+                  <a14:hiddenLine xmlns="" xmlns:a14="http://schemas.microsoft.com/office/drawing/2010/main" w="9525">
                     <a:solidFill>
                       <a:srgbClr val="000000"/>
                     </a:solidFill>
@@ -11387,7 +11387,7 @@
               </a:ln>
               <a:extLst>
                 <a:ext uri="{91240B29-F687-4f45-9708-019B960494DF}">
-                  <a14:hiddenLine xmlns:a14="http://schemas.microsoft.com/office/drawing/2010/main" xmlns="" w="9525">
+                  <a14:hiddenLine xmlns="" xmlns:a14="http://schemas.microsoft.com/office/drawing/2010/main" w="9525">
                     <a:solidFill>
                       <a:srgbClr val="000000"/>
                     </a:solidFill>
@@ -11421,7 +11421,7 @@
               </a:ln>
               <a:extLst>
                 <a:ext uri="{91240B29-F687-4f45-9708-019B960494DF}">
-                  <a14:hiddenLine xmlns:a14="http://schemas.microsoft.com/office/drawing/2010/main" xmlns="" w="9525">
+                  <a14:hiddenLine xmlns="" xmlns:a14="http://schemas.microsoft.com/office/drawing/2010/main" w="9525">
                     <a:solidFill>
                       <a:srgbClr val="000000"/>
                     </a:solidFill>
@@ -11486,7 +11486,7 @@
               </a:ln>
               <a:extLst>
                 <a:ext uri="{91240B29-F687-4f45-9708-019B960494DF}">
-                  <a14:hiddenLine xmlns:a14="http://schemas.microsoft.com/office/drawing/2010/main" xmlns="" w="9525">
+                  <a14:hiddenLine xmlns="" xmlns:a14="http://schemas.microsoft.com/office/drawing/2010/main" w="9525">
                     <a:solidFill>
                       <a:srgbClr val="000000"/>
                     </a:solidFill>
@@ -11576,7 +11576,7 @@
               </a:ln>
               <a:extLst>
                 <a:ext uri="{91240B29-F687-4f45-9708-019B960494DF}">
-                  <a14:hiddenLine xmlns:a14="http://schemas.microsoft.com/office/drawing/2010/main" xmlns="" w="9525">
+                  <a14:hiddenLine xmlns="" xmlns:a14="http://schemas.microsoft.com/office/drawing/2010/main" w="9525">
                     <a:solidFill>
                       <a:srgbClr val="000000"/>
                     </a:solidFill>
@@ -11638,7 +11638,7 @@
               </a:ln>
               <a:extLst>
                 <a:ext uri="{91240B29-F687-4f45-9708-019B960494DF}">
-                  <a14:hiddenLine xmlns:a14="http://schemas.microsoft.com/office/drawing/2010/main" xmlns="" w="9525">
+                  <a14:hiddenLine xmlns="" xmlns:a14="http://schemas.microsoft.com/office/drawing/2010/main" w="9525">
                     <a:solidFill>
                       <a:srgbClr val="000000"/>
                     </a:solidFill>
@@ -11728,7 +11728,7 @@
               </a:ln>
               <a:extLst>
                 <a:ext uri="{91240B29-F687-4f45-9708-019B960494DF}">
-                  <a14:hiddenLine xmlns:a14="http://schemas.microsoft.com/office/drawing/2010/main" xmlns="" w="9525">
+                  <a14:hiddenLine xmlns="" xmlns:a14="http://schemas.microsoft.com/office/drawing/2010/main" w="9525">
                     <a:solidFill>
                       <a:srgbClr val="000000"/>
                     </a:solidFill>
@@ -11793,7 +11793,7 @@
               </a:ln>
               <a:extLst>
                 <a:ext uri="{91240B29-F687-4f45-9708-019B960494DF}">
-                  <a14:hiddenLine xmlns:a14="http://schemas.microsoft.com/office/drawing/2010/main" xmlns="" w="9525">
+                  <a14:hiddenLine xmlns="" xmlns:a14="http://schemas.microsoft.com/office/drawing/2010/main" w="9525">
                     <a:solidFill>
                       <a:srgbClr val="000000"/>
                     </a:solidFill>
@@ -11855,7 +11855,7 @@
               </a:ln>
               <a:extLst>
                 <a:ext uri="{91240B29-F687-4f45-9708-019B960494DF}">
-                  <a14:hiddenLine xmlns:a14="http://schemas.microsoft.com/office/drawing/2010/main" xmlns="" w="9525">
+                  <a14:hiddenLine xmlns="" xmlns:a14="http://schemas.microsoft.com/office/drawing/2010/main" w="9525">
                     <a:solidFill>
                       <a:srgbClr val="000000"/>
                     </a:solidFill>
@@ -11945,7 +11945,7 @@
               </a:ln>
               <a:extLst>
                 <a:ext uri="{91240B29-F687-4f45-9708-019B960494DF}">
-                  <a14:hiddenLine xmlns:a14="http://schemas.microsoft.com/office/drawing/2010/main" xmlns="" w="9525">
+                  <a14:hiddenLine xmlns="" xmlns:a14="http://schemas.microsoft.com/office/drawing/2010/main" w="9525">
                     <a:solidFill>
                       <a:srgbClr val="000000"/>
                     </a:solidFill>
@@ -12035,7 +12035,7 @@
               </a:ln>
               <a:extLst>
                 <a:ext uri="{91240B29-F687-4f45-9708-019B960494DF}">
-                  <a14:hiddenLine xmlns:a14="http://schemas.microsoft.com/office/drawing/2010/main" xmlns="" w="9525">
+                  <a14:hiddenLine xmlns="" xmlns:a14="http://schemas.microsoft.com/office/drawing/2010/main" w="9525">
                     <a:solidFill>
                       <a:srgbClr val="000000"/>
                     </a:solidFill>
@@ -12100,7 +12100,7 @@
               </a:ln>
               <a:extLst>
                 <a:ext uri="{91240B29-F687-4f45-9708-019B960494DF}">
-                  <a14:hiddenLine xmlns:a14="http://schemas.microsoft.com/office/drawing/2010/main" xmlns="" w="9525">
+                  <a14:hiddenLine xmlns="" xmlns:a14="http://schemas.microsoft.com/office/drawing/2010/main" w="9525">
                     <a:solidFill>
                       <a:srgbClr val="000000"/>
                     </a:solidFill>
@@ -12220,7 +12220,7 @@
               </a:ln>
               <a:extLst>
                 <a:ext uri="{91240B29-F687-4f45-9708-019B960494DF}">
-                  <a14:hiddenLine xmlns:a14="http://schemas.microsoft.com/office/drawing/2010/main" xmlns="" w="9525">
+                  <a14:hiddenLine xmlns="" xmlns:a14="http://schemas.microsoft.com/office/drawing/2010/main" w="9525">
                     <a:solidFill>
                       <a:srgbClr val="000000"/>
                     </a:solidFill>
@@ -12301,7 +12301,7 @@
               </a:ln>
               <a:extLst>
                 <a:ext uri="{91240B29-F687-4f45-9708-019B960494DF}">
-                  <a14:hiddenLine xmlns:a14="http://schemas.microsoft.com/office/drawing/2010/main" xmlns="" w="9525">
+                  <a14:hiddenLine xmlns="" xmlns:a14="http://schemas.microsoft.com/office/drawing/2010/main" w="9525">
                     <a:solidFill>
                       <a:srgbClr val="000000"/>
                     </a:solidFill>
@@ -12416,7 +12416,7 @@
               </a:ln>
               <a:extLst>
                 <a:ext uri="{91240B29-F687-4f45-9708-019B960494DF}">
-                  <a14:hiddenLine xmlns:a14="http://schemas.microsoft.com/office/drawing/2010/main" xmlns="" w="9525">
+                  <a14:hiddenLine xmlns="" xmlns:a14="http://schemas.microsoft.com/office/drawing/2010/main" w="9525">
                     <a:solidFill>
                       <a:srgbClr val="000000"/>
                     </a:solidFill>
@@ -12506,7 +12506,7 @@
               </a:ln>
               <a:extLst>
                 <a:ext uri="{91240B29-F687-4f45-9708-019B960494DF}">
-                  <a14:hiddenLine xmlns:a14="http://schemas.microsoft.com/office/drawing/2010/main" xmlns="" w="9525">
+                  <a14:hiddenLine xmlns="" xmlns:a14="http://schemas.microsoft.com/office/drawing/2010/main" w="9525">
                     <a:solidFill>
                       <a:srgbClr val="000000"/>
                     </a:solidFill>
@@ -12571,7 +12571,7 @@
               </a:ln>
               <a:extLst>
                 <a:ext uri="{91240B29-F687-4f45-9708-019B960494DF}">
-                  <a14:hiddenLine xmlns:a14="http://schemas.microsoft.com/office/drawing/2010/main" xmlns="" w="9525">
+                  <a14:hiddenLine xmlns="" xmlns:a14="http://schemas.microsoft.com/office/drawing/2010/main" w="9525">
                     <a:solidFill>
                       <a:srgbClr val="000000"/>
                     </a:solidFill>
@@ -12661,7 +12661,7 @@
               </a:ln>
               <a:extLst>
                 <a:ext uri="{91240B29-F687-4f45-9708-019B960494DF}">
-                  <a14:hiddenLine xmlns:a14="http://schemas.microsoft.com/office/drawing/2010/main" xmlns="" w="9525">
+                  <a14:hiddenLine xmlns="" xmlns:a14="http://schemas.microsoft.com/office/drawing/2010/main" w="9525">
                     <a:solidFill>
                       <a:srgbClr val="000000"/>
                     </a:solidFill>
@@ -12729,7 +12729,7 @@
               </a:ln>
               <a:extLst>
                 <a:ext uri="{91240B29-F687-4f45-9708-019B960494DF}">
-                  <a14:hiddenLine xmlns:a14="http://schemas.microsoft.com/office/drawing/2010/main" xmlns="" w="9525">
+                  <a14:hiddenLine xmlns="" xmlns:a14="http://schemas.microsoft.com/office/drawing/2010/main" w="9525">
                     <a:solidFill>
                       <a:srgbClr val="000000"/>
                     </a:solidFill>
@@ -12819,7 +12819,7 @@
               </a:ln>
               <a:extLst>
                 <a:ext uri="{91240B29-F687-4f45-9708-019B960494DF}">
-                  <a14:hiddenLine xmlns:a14="http://schemas.microsoft.com/office/drawing/2010/main" xmlns="" w="9525">
+                  <a14:hiddenLine xmlns="" xmlns:a14="http://schemas.microsoft.com/office/drawing/2010/main" w="9525">
                     <a:solidFill>
                       <a:srgbClr val="000000"/>
                     </a:solidFill>
@@ -12887,7 +12887,7 @@
               </a:ln>
               <a:extLst>
                 <a:ext uri="{91240B29-F687-4f45-9708-019B960494DF}">
-                  <a14:hiddenLine xmlns:a14="http://schemas.microsoft.com/office/drawing/2010/main" xmlns="" w="9525">
+                  <a14:hiddenLine xmlns="" xmlns:a14="http://schemas.microsoft.com/office/drawing/2010/main" w="9525">
                     <a:solidFill>
                       <a:srgbClr val="000000"/>
                     </a:solidFill>
@@ -12977,7 +12977,7 @@
               </a:ln>
               <a:extLst>
                 <a:ext uri="{91240B29-F687-4f45-9708-019B960494DF}">
-                  <a14:hiddenLine xmlns:a14="http://schemas.microsoft.com/office/drawing/2010/main" xmlns="" w="9525">
+                  <a14:hiddenLine xmlns="" xmlns:a14="http://schemas.microsoft.com/office/drawing/2010/main" w="9525">
                     <a:solidFill>
                       <a:srgbClr val="000000"/>
                     </a:solidFill>
@@ -13011,7 +13011,7 @@
               </a:ln>
               <a:extLst>
                 <a:ext uri="{91240B29-F687-4f45-9708-019B960494DF}">
-                  <a14:hiddenLine xmlns:a14="http://schemas.microsoft.com/office/drawing/2010/main" xmlns="" w="9525">
+                  <a14:hiddenLine xmlns="" xmlns:a14="http://schemas.microsoft.com/office/drawing/2010/main" w="9525">
                     <a:solidFill>
                       <a:srgbClr val="000000"/>
                     </a:solidFill>
@@ -14020,10 +14020,10 @@
       </p:sp>
       <p:pic>
         <p:nvPicPr>
-          <p:cNvPr id="5" name="Marcador de contenido 4" descr="Imagen de la pantalla de un celular con letras&#10;&#10;Descripción generada automáticamente con confianza media">
+          <p:cNvPr id="7" name="Marcador de contenido 6" descr="Diagrama&#10;&#10;Descripción generada automáticamente">
             <a:extLst>
               <a:ext uri="{FF2B5EF4-FFF2-40B4-BE49-F238E27FC236}">
-                <a16:creationId xmlns:a16="http://schemas.microsoft.com/office/drawing/2014/main" id="{13E843F7-DDCC-41B1-AB6B-EAA5B36F7E45}"/>
+                <a16:creationId xmlns:a16="http://schemas.microsoft.com/office/drawing/2014/main" id="{BF7B8341-4CDA-4BEB-84CA-5B10F7F7D77F}"/>
               </a:ext>
             </a:extLst>
           </p:cNvPr>
@@ -14042,8 +14042,8 @@
         </p:blipFill>
         <p:spPr>
           <a:xfrm>
-            <a:off x="3573194" y="1103034"/>
-            <a:ext cx="4726745" cy="5571998"/>
+            <a:off x="2725270" y="1013422"/>
+            <a:ext cx="6741459" cy="5201914"/>
           </a:xfrm>
         </p:spPr>
       </p:pic>

</xml_diff>

<commit_message>
Modificación Texto en las diapositivas
</commit_message>
<xml_diff>
--- a/doc/Presentación_mitad_de_curso_JuanEspinosayNachoRodriguez.pptx
+++ b/doc/Presentación_mitad_de_curso_JuanEspinosayNachoRodriguez.pptx
@@ -515,34 +515,43 @@
           <a:p>
             <a:r>
               <a:rPr lang="es-ES" dirty="0"/>
-              <a:t>Este diagrama UML está basado en un hospital privado en el que encontramos 3 actores principales que son: enfermera, paciente y doctor. </a:t>
+              <a:t>* 3 actores principales: enfermera, paciente y doctor. </a:t>
             </a:r>
           </a:p>
           <a:p>
             <a:r>
               <a:rPr lang="es-ES" dirty="0"/>
-              <a:t>*Cada uno va a poder </a:t>
+              <a:t>*</a:t>
             </a:r>
             <a:r>
               <a:rPr lang="es-ES" dirty="0" err="1"/>
-              <a:t>logearse</a:t>
+              <a:t>Login</a:t>
             </a:r>
             <a:r>
               <a:rPr lang="es-ES" dirty="0"/>
-              <a:t> sin problema en la aplicación específica del hospital lo que les va a permitir consultar el historial de sus pacientes. </a:t>
+              <a:t> + consultar historial.</a:t>
             </a:r>
           </a:p>
           <a:p>
             <a:r>
               <a:rPr lang="es-ES" dirty="0"/>
-              <a:t>*El doctor va a ser el único que va a poder modificar dicho historial con el fin de proteger los datos del paciente. </a:t>
+              <a:t>*Modificar historial.</a:t>
             </a:r>
           </a:p>
           <a:p>
             <a:r>
               <a:rPr lang="es-ES" dirty="0"/>
-              <a:t>*El paciente podrá pedir cita sin problema a través de la aplicación y, en caso de que ya lo hubiese hecho, darle la opción de modificar la fecha asignada siempre y cuando esté disponible. Una vez finalizado el encuentro con el doctor llega el momento de pagar. Si es miembro de una aseguradora privada, el hospital habla con dicha aseguradora para tramitar el cobro. En caso contrario, al paciente se le da la opción de pagar en efectivo o tarjeta.</a:t>
-            </a:r>
+              <a:t>*Pedir cita y pago.</a:t>
+            </a:r>
+          </a:p>
+          <a:p>
+            <a:r>
+              <a:rPr lang="es-ES" dirty="0"/>
+              <a:t> </a:t>
+            </a:r>
+          </a:p>
+          <a:p>
+            <a:endParaRPr lang="es-ES" dirty="0"/>
           </a:p>
         </p:txBody>
       </p:sp>
@@ -1272,17 +1281,17 @@
                 <a:effectLst/>
                 <a:latin typeface="Consolas" panose="020B0609020204030204" pitchFamily="49" charset="0"/>
               </a:rPr>
-              <a:t>En este diagrama representamos como es el flujo de la interfaz de nuestro proyecto. Empezando por una identificación para diferenciar entre Pacientes, Doctores y Enfermeros. Luego procedemos a un </a:t>
-            </a:r>
-            <a:r>
-              <a:rPr lang="es-ES" b="0" dirty="0" err="1">
+              <a:t>En este diagrama representamos como es el flujo de la interfaz de nuestro proyecto. Empezando por una identificación para diferenciar entre Pacientes, Doctores y Enfermeros. Luego procedemos a </a:t>
+            </a:r>
+            <a:r>
+              <a:rPr lang="es-ES" b="0">
                 <a:solidFill>
                   <a:srgbClr val="D4D4D4"/>
                 </a:solidFill>
                 <a:effectLst/>
                 <a:latin typeface="Consolas" panose="020B0609020204030204" pitchFamily="49" charset="0"/>
               </a:rPr>
-              <a:t>menu</a:t>
+              <a:t>un menú </a:t>
             </a:r>
             <a:r>
               <a:rPr lang="es-ES" b="0" dirty="0">
@@ -1292,7 +1301,7 @@
                 <a:effectLst/>
                 <a:latin typeface="Consolas" panose="020B0609020204030204" pitchFamily="49" charset="0"/>
               </a:rPr>
-              <a:t> personalizado para cada uno de ellos con las diferentes opciones que tienen.</a:t>
+              <a:t>personalizado para cada uno de ellos con las diferentes opciones que tienen.</a:t>
             </a:r>
           </a:p>
           <a:p>
@@ -1393,7 +1402,7 @@
           <a:noFill/>
           <a:extLst>
             <a:ext uri="{909E8E84-426E-40dd-AFC4-6F175D3DCCD1}">
-              <a14:hiddenFill xmlns="" xmlns:a14="http://schemas.microsoft.com/office/drawing/2010/main">
+              <a14:hiddenFill xmlns:a14="http://schemas.microsoft.com/office/drawing/2010/main" xmlns="">
                 <a:solidFill>
                   <a:srgbClr val="FFFFFF"/>
                 </a:solidFill>
@@ -1452,7 +1461,7 @@
             </a:ln>
             <a:extLst>
               <a:ext uri="{91240B29-F687-4f45-9708-019B960494DF}">
-                <a14:hiddenLine xmlns="" xmlns:a14="http://schemas.microsoft.com/office/drawing/2010/main" w="9525">
+                <a14:hiddenLine xmlns:a14="http://schemas.microsoft.com/office/drawing/2010/main" xmlns="" w="9525">
                   <a:solidFill>
                     <a:srgbClr val="000000"/>
                   </a:solidFill>
@@ -1542,7 +1551,7 @@
             </a:ln>
             <a:extLst>
               <a:ext uri="{91240B29-F687-4f45-9708-019B960494DF}">
-                <a14:hiddenLine xmlns="" xmlns:a14="http://schemas.microsoft.com/office/drawing/2010/main" w="9525">
+                <a14:hiddenLine xmlns:a14="http://schemas.microsoft.com/office/drawing/2010/main" xmlns="" w="9525">
                   <a:solidFill>
                     <a:srgbClr val="000000"/>
                   </a:solidFill>
@@ -1632,7 +1641,7 @@
             </a:ln>
             <a:extLst>
               <a:ext uri="{91240B29-F687-4f45-9708-019B960494DF}">
-                <a14:hiddenLine xmlns="" xmlns:a14="http://schemas.microsoft.com/office/drawing/2010/main" w="9525">
+                <a14:hiddenLine xmlns:a14="http://schemas.microsoft.com/office/drawing/2010/main" xmlns="" w="9525">
                   <a:solidFill>
                     <a:srgbClr val="000000"/>
                   </a:solidFill>
@@ -1666,7 +1675,7 @@
             </a:ln>
             <a:extLst>
               <a:ext uri="{91240B29-F687-4f45-9708-019B960494DF}">
-                <a14:hiddenLine xmlns="" xmlns:a14="http://schemas.microsoft.com/office/drawing/2010/main" w="9525">
+                <a14:hiddenLine xmlns:a14="http://schemas.microsoft.com/office/drawing/2010/main" xmlns="" w="9525">
                   <a:solidFill>
                     <a:srgbClr val="000000"/>
                   </a:solidFill>
@@ -1756,7 +1765,7 @@
             </a:ln>
             <a:extLst>
               <a:ext uri="{91240B29-F687-4f45-9708-019B960494DF}">
-                <a14:hiddenLine xmlns="" xmlns:a14="http://schemas.microsoft.com/office/drawing/2010/main" w="9525">
+                <a14:hiddenLine xmlns:a14="http://schemas.microsoft.com/office/drawing/2010/main" xmlns="" w="9525">
                   <a:solidFill>
                     <a:srgbClr val="000000"/>
                   </a:solidFill>
@@ -1818,7 +1827,7 @@
             </a:ln>
             <a:extLst>
               <a:ext uri="{91240B29-F687-4f45-9708-019B960494DF}">
-                <a14:hiddenLine xmlns="" xmlns:a14="http://schemas.microsoft.com/office/drawing/2010/main" w="9525">
+                <a14:hiddenLine xmlns:a14="http://schemas.microsoft.com/office/drawing/2010/main" xmlns="" w="9525">
                   <a:solidFill>
                     <a:srgbClr val="000000"/>
                   </a:solidFill>
@@ -1880,7 +1889,7 @@
             </a:ln>
             <a:extLst>
               <a:ext uri="{91240B29-F687-4f45-9708-019B960494DF}">
-                <a14:hiddenLine xmlns="" xmlns:a14="http://schemas.microsoft.com/office/drawing/2010/main" w="9525">
+                <a14:hiddenLine xmlns:a14="http://schemas.microsoft.com/office/drawing/2010/main" xmlns="" w="9525">
                   <a:solidFill>
                     <a:srgbClr val="000000"/>
                   </a:solidFill>
@@ -1970,7 +1979,7 @@
             </a:ln>
             <a:extLst>
               <a:ext uri="{91240B29-F687-4f45-9708-019B960494DF}">
-                <a14:hiddenLine xmlns="" xmlns:a14="http://schemas.microsoft.com/office/drawing/2010/main" w="9525">
+                <a14:hiddenLine xmlns:a14="http://schemas.microsoft.com/office/drawing/2010/main" xmlns="" w="9525">
                   <a:solidFill>
                     <a:srgbClr val="000000"/>
                   </a:solidFill>
@@ -2032,7 +2041,7 @@
             </a:ln>
             <a:extLst>
               <a:ext uri="{91240B29-F687-4f45-9708-019B960494DF}">
-                <a14:hiddenLine xmlns="" xmlns:a14="http://schemas.microsoft.com/office/drawing/2010/main" w="9525">
+                <a14:hiddenLine xmlns:a14="http://schemas.microsoft.com/office/drawing/2010/main" xmlns="" w="9525">
                   <a:solidFill>
                     <a:srgbClr val="000000"/>
                   </a:solidFill>
@@ -2094,7 +2103,7 @@
             </a:ln>
             <a:extLst>
               <a:ext uri="{91240B29-F687-4f45-9708-019B960494DF}">
-                <a14:hiddenLine xmlns="" xmlns:a14="http://schemas.microsoft.com/office/drawing/2010/main" w="9525">
+                <a14:hiddenLine xmlns:a14="http://schemas.microsoft.com/office/drawing/2010/main" xmlns="" w="9525">
                   <a:solidFill>
                     <a:srgbClr val="000000"/>
                   </a:solidFill>
@@ -2184,7 +2193,7 @@
             </a:ln>
             <a:extLst>
               <a:ext uri="{91240B29-F687-4f45-9708-019B960494DF}">
-                <a14:hiddenLine xmlns="" xmlns:a14="http://schemas.microsoft.com/office/drawing/2010/main" w="9525">
+                <a14:hiddenLine xmlns:a14="http://schemas.microsoft.com/office/drawing/2010/main" xmlns="" w="9525">
                   <a:solidFill>
                     <a:srgbClr val="000000"/>
                   </a:solidFill>
@@ -2274,7 +2283,7 @@
             </a:ln>
             <a:extLst>
               <a:ext uri="{91240B29-F687-4f45-9708-019B960494DF}">
-                <a14:hiddenLine xmlns="" xmlns:a14="http://schemas.microsoft.com/office/drawing/2010/main" w="9525">
+                <a14:hiddenLine xmlns:a14="http://schemas.microsoft.com/office/drawing/2010/main" xmlns="" w="9525">
                   <a:solidFill>
                     <a:srgbClr val="000000"/>
                   </a:solidFill>
@@ -2336,7 +2345,7 @@
             </a:ln>
             <a:extLst>
               <a:ext uri="{91240B29-F687-4f45-9708-019B960494DF}">
-                <a14:hiddenLine xmlns="" xmlns:a14="http://schemas.microsoft.com/office/drawing/2010/main" w="9525">
+                <a14:hiddenLine xmlns:a14="http://schemas.microsoft.com/office/drawing/2010/main" xmlns="" w="9525">
                   <a:solidFill>
                     <a:srgbClr val="000000"/>
                   </a:solidFill>
@@ -2446,7 +2455,7 @@
             </a:ln>
             <a:extLst>
               <a:ext uri="{91240B29-F687-4f45-9708-019B960494DF}">
-                <a14:hiddenLine xmlns="" xmlns:a14="http://schemas.microsoft.com/office/drawing/2010/main" w="9525">
+                <a14:hiddenLine xmlns:a14="http://schemas.microsoft.com/office/drawing/2010/main" xmlns="" w="9525">
                   <a:solidFill>
                     <a:srgbClr val="000000"/>
                   </a:solidFill>
@@ -2508,7 +2517,7 @@
             </a:ln>
             <a:extLst>
               <a:ext uri="{91240B29-F687-4f45-9708-019B960494DF}">
-                <a14:hiddenLine xmlns="" xmlns:a14="http://schemas.microsoft.com/office/drawing/2010/main" w="9525">
+                <a14:hiddenLine xmlns:a14="http://schemas.microsoft.com/office/drawing/2010/main" xmlns="" w="9525">
                   <a:solidFill>
                     <a:srgbClr val="000000"/>
                   </a:solidFill>
@@ -2598,7 +2607,7 @@
             </a:ln>
             <a:extLst>
               <a:ext uri="{91240B29-F687-4f45-9708-019B960494DF}">
-                <a14:hiddenLine xmlns="" xmlns:a14="http://schemas.microsoft.com/office/drawing/2010/main" w="9525">
+                <a14:hiddenLine xmlns:a14="http://schemas.microsoft.com/office/drawing/2010/main" xmlns="" w="9525">
                   <a:solidFill>
                     <a:srgbClr val="000000"/>
                   </a:solidFill>
@@ -2688,7 +2697,7 @@
             </a:ln>
             <a:extLst>
               <a:ext uri="{91240B29-F687-4f45-9708-019B960494DF}">
-                <a14:hiddenLine xmlns="" xmlns:a14="http://schemas.microsoft.com/office/drawing/2010/main" w="9525">
+                <a14:hiddenLine xmlns:a14="http://schemas.microsoft.com/office/drawing/2010/main" xmlns="" w="9525">
                   <a:solidFill>
                     <a:srgbClr val="000000"/>
                   </a:solidFill>
@@ -2750,7 +2759,7 @@
             </a:ln>
             <a:extLst>
               <a:ext uri="{91240B29-F687-4f45-9708-019B960494DF}">
-                <a14:hiddenLine xmlns="" xmlns:a14="http://schemas.microsoft.com/office/drawing/2010/main" w="9525">
+                <a14:hiddenLine xmlns:a14="http://schemas.microsoft.com/office/drawing/2010/main" xmlns="" w="9525">
                   <a:solidFill>
                     <a:srgbClr val="000000"/>
                   </a:solidFill>
@@ -2840,7 +2849,7 @@
             </a:ln>
             <a:extLst>
               <a:ext uri="{91240B29-F687-4f45-9708-019B960494DF}">
-                <a14:hiddenLine xmlns="" xmlns:a14="http://schemas.microsoft.com/office/drawing/2010/main" w="9525">
+                <a14:hiddenLine xmlns:a14="http://schemas.microsoft.com/office/drawing/2010/main" xmlns="" w="9525">
                   <a:solidFill>
                     <a:srgbClr val="000000"/>
                   </a:solidFill>
@@ -2930,7 +2939,7 @@
             </a:ln>
             <a:extLst>
               <a:ext uri="{91240B29-F687-4f45-9708-019B960494DF}">
-                <a14:hiddenLine xmlns="" xmlns:a14="http://schemas.microsoft.com/office/drawing/2010/main" w="9525">
+                <a14:hiddenLine xmlns:a14="http://schemas.microsoft.com/office/drawing/2010/main" xmlns="" w="9525">
                   <a:solidFill>
                     <a:srgbClr val="000000"/>
                   </a:solidFill>
@@ -2986,7 +2995,7 @@
             </a:ln>
             <a:extLst>
               <a:ext uri="{91240B29-F687-4f45-9708-019B960494DF}">
-                <a14:hiddenLine xmlns="" xmlns:a14="http://schemas.microsoft.com/office/drawing/2010/main" w="9525">
+                <a14:hiddenLine xmlns:a14="http://schemas.microsoft.com/office/drawing/2010/main" xmlns="" w="9525">
                   <a:solidFill>
                     <a:srgbClr val="000000"/>
                   </a:solidFill>
@@ -3076,7 +3085,7 @@
             </a:ln>
             <a:extLst>
               <a:ext uri="{91240B29-F687-4f45-9708-019B960494DF}">
-                <a14:hiddenLine xmlns="" xmlns:a14="http://schemas.microsoft.com/office/drawing/2010/main" w="9525">
+                <a14:hiddenLine xmlns:a14="http://schemas.microsoft.com/office/drawing/2010/main" xmlns="" w="9525">
                   <a:solidFill>
                     <a:srgbClr val="000000"/>
                   </a:solidFill>
@@ -3132,7 +3141,7 @@
             </a:ln>
             <a:extLst>
               <a:ext uri="{91240B29-F687-4f45-9708-019B960494DF}">
-                <a14:hiddenLine xmlns="" xmlns:a14="http://schemas.microsoft.com/office/drawing/2010/main" w="9525">
+                <a14:hiddenLine xmlns:a14="http://schemas.microsoft.com/office/drawing/2010/main" xmlns="" w="9525">
                   <a:solidFill>
                     <a:srgbClr val="000000"/>
                   </a:solidFill>
@@ -3222,7 +3231,7 @@
             </a:ln>
             <a:extLst>
               <a:ext uri="{91240B29-F687-4f45-9708-019B960494DF}">
-                <a14:hiddenLine xmlns="" xmlns:a14="http://schemas.microsoft.com/office/drawing/2010/main" w="9525">
+                <a14:hiddenLine xmlns:a14="http://schemas.microsoft.com/office/drawing/2010/main" xmlns="" w="9525">
                   <a:solidFill>
                     <a:srgbClr val="000000"/>
                   </a:solidFill>
@@ -3290,7 +3299,7 @@
             </a:ln>
             <a:extLst>
               <a:ext uri="{91240B29-F687-4f45-9708-019B960494DF}">
-                <a14:hiddenLine xmlns="" xmlns:a14="http://schemas.microsoft.com/office/drawing/2010/main" w="9525">
+                <a14:hiddenLine xmlns:a14="http://schemas.microsoft.com/office/drawing/2010/main" xmlns="" w="9525">
                   <a:solidFill>
                     <a:srgbClr val="000000"/>
                   </a:solidFill>
@@ -3380,7 +3389,7 @@
             </a:ln>
             <a:extLst>
               <a:ext uri="{91240B29-F687-4f45-9708-019B960494DF}">
-                <a14:hiddenLine xmlns="" xmlns:a14="http://schemas.microsoft.com/office/drawing/2010/main" w="9525">
+                <a14:hiddenLine xmlns:a14="http://schemas.microsoft.com/office/drawing/2010/main" xmlns="" w="9525">
                   <a:solidFill>
                     <a:srgbClr val="000000"/>
                   </a:solidFill>
@@ -3448,7 +3457,7 @@
             </a:ln>
             <a:extLst>
               <a:ext uri="{91240B29-F687-4f45-9708-019B960494DF}">
-                <a14:hiddenLine xmlns="" xmlns:a14="http://schemas.microsoft.com/office/drawing/2010/main" w="9525">
+                <a14:hiddenLine xmlns:a14="http://schemas.microsoft.com/office/drawing/2010/main" xmlns="" w="9525">
                   <a:solidFill>
                     <a:srgbClr val="000000"/>
                   </a:solidFill>
@@ -3538,7 +3547,7 @@
             </a:ln>
             <a:extLst>
               <a:ext uri="{91240B29-F687-4f45-9708-019B960494DF}">
-                <a14:hiddenLine xmlns="" xmlns:a14="http://schemas.microsoft.com/office/drawing/2010/main" w="9525">
+                <a14:hiddenLine xmlns:a14="http://schemas.microsoft.com/office/drawing/2010/main" xmlns="" w="9525">
                   <a:solidFill>
                     <a:srgbClr val="000000"/>
                   </a:solidFill>
@@ -3572,7 +3581,7 @@
             </a:ln>
             <a:extLst>
               <a:ext uri="{91240B29-F687-4f45-9708-019B960494DF}">
-                <a14:hiddenLine xmlns="" xmlns:a14="http://schemas.microsoft.com/office/drawing/2010/main" w="9525">
+                <a14:hiddenLine xmlns:a14="http://schemas.microsoft.com/office/drawing/2010/main" xmlns="" w="9525">
                   <a:solidFill>
                     <a:srgbClr val="000000"/>
                   </a:solidFill>
@@ -3662,7 +3671,7 @@
             </a:ln>
             <a:extLst>
               <a:ext uri="{91240B29-F687-4f45-9708-019B960494DF}">
-                <a14:hiddenLine xmlns="" xmlns:a14="http://schemas.microsoft.com/office/drawing/2010/main" w="9525">
+                <a14:hiddenLine xmlns:a14="http://schemas.microsoft.com/office/drawing/2010/main" xmlns="" w="9525">
                   <a:solidFill>
                     <a:srgbClr val="000000"/>
                   </a:solidFill>
@@ -3724,7 +3733,7 @@
             </a:ln>
             <a:extLst>
               <a:ext uri="{91240B29-F687-4f45-9708-019B960494DF}">
-                <a14:hiddenLine xmlns="" xmlns:a14="http://schemas.microsoft.com/office/drawing/2010/main" w="9525">
+                <a14:hiddenLine xmlns:a14="http://schemas.microsoft.com/office/drawing/2010/main" xmlns="" w="9525">
                   <a:solidFill>
                     <a:srgbClr val="000000"/>
                   </a:solidFill>
@@ -3786,7 +3795,7 @@
             </a:ln>
             <a:extLst>
               <a:ext uri="{91240B29-F687-4f45-9708-019B960494DF}">
-                <a14:hiddenLine xmlns="" xmlns:a14="http://schemas.microsoft.com/office/drawing/2010/main" w="9525">
+                <a14:hiddenLine xmlns:a14="http://schemas.microsoft.com/office/drawing/2010/main" xmlns="" w="9525">
                   <a:solidFill>
                     <a:srgbClr val="000000"/>
                   </a:solidFill>
@@ -3876,7 +3885,7 @@
             </a:ln>
             <a:extLst>
               <a:ext uri="{91240B29-F687-4f45-9708-019B960494DF}">
-                <a14:hiddenLine xmlns="" xmlns:a14="http://schemas.microsoft.com/office/drawing/2010/main" w="9525">
+                <a14:hiddenLine xmlns:a14="http://schemas.microsoft.com/office/drawing/2010/main" xmlns="" w="9525">
                   <a:solidFill>
                     <a:srgbClr val="000000"/>
                   </a:solidFill>
@@ -3944,7 +3953,7 @@
             </a:ln>
             <a:extLst>
               <a:ext uri="{91240B29-F687-4f45-9708-019B960494DF}">
-                <a14:hiddenLine xmlns="" xmlns:a14="http://schemas.microsoft.com/office/drawing/2010/main" w="9525">
+                <a14:hiddenLine xmlns:a14="http://schemas.microsoft.com/office/drawing/2010/main" xmlns="" w="9525">
                   <a:solidFill>
                     <a:srgbClr val="000000"/>
                   </a:solidFill>
@@ -4006,7 +4015,7 @@
             </a:ln>
             <a:extLst>
               <a:ext uri="{91240B29-F687-4f45-9708-019B960494DF}">
-                <a14:hiddenLine xmlns="" xmlns:a14="http://schemas.microsoft.com/office/drawing/2010/main" w="9525">
+                <a14:hiddenLine xmlns:a14="http://schemas.microsoft.com/office/drawing/2010/main" xmlns="" w="9525">
                   <a:solidFill>
                     <a:srgbClr val="000000"/>
                   </a:solidFill>
@@ -4096,7 +4105,7 @@
             </a:ln>
             <a:extLst>
               <a:ext uri="{91240B29-F687-4f45-9708-019B960494DF}">
-                <a14:hiddenLine xmlns="" xmlns:a14="http://schemas.microsoft.com/office/drawing/2010/main" w="9525">
+                <a14:hiddenLine xmlns:a14="http://schemas.microsoft.com/office/drawing/2010/main" xmlns="" w="9525">
                   <a:solidFill>
                     <a:srgbClr val="000000"/>
                   </a:solidFill>
@@ -4158,7 +4167,7 @@
             </a:ln>
             <a:extLst>
               <a:ext uri="{91240B29-F687-4f45-9708-019B960494DF}">
-                <a14:hiddenLine xmlns="" xmlns:a14="http://schemas.microsoft.com/office/drawing/2010/main" w="9525">
+                <a14:hiddenLine xmlns:a14="http://schemas.microsoft.com/office/drawing/2010/main" xmlns="" w="9525">
                   <a:solidFill>
                     <a:srgbClr val="000000"/>
                   </a:solidFill>
@@ -4248,7 +4257,7 @@
             </a:ln>
             <a:extLst>
               <a:ext uri="{91240B29-F687-4f45-9708-019B960494DF}">
-                <a14:hiddenLine xmlns="" xmlns:a14="http://schemas.microsoft.com/office/drawing/2010/main" w="9525">
+                <a14:hiddenLine xmlns:a14="http://schemas.microsoft.com/office/drawing/2010/main" xmlns="" w="9525">
                   <a:solidFill>
                     <a:srgbClr val="000000"/>
                   </a:solidFill>
@@ -4310,7 +4319,7 @@
             </a:ln>
             <a:extLst>
               <a:ext uri="{91240B29-F687-4f45-9708-019B960494DF}">
-                <a14:hiddenLine xmlns="" xmlns:a14="http://schemas.microsoft.com/office/drawing/2010/main" w="9525">
+                <a14:hiddenLine xmlns:a14="http://schemas.microsoft.com/office/drawing/2010/main" xmlns="" w="9525">
                   <a:solidFill>
                     <a:srgbClr val="000000"/>
                   </a:solidFill>
@@ -4400,7 +4409,7 @@
             </a:ln>
             <a:extLst>
               <a:ext uri="{91240B29-F687-4f45-9708-019B960494DF}">
-                <a14:hiddenLine xmlns="" xmlns:a14="http://schemas.microsoft.com/office/drawing/2010/main" w="9525">
+                <a14:hiddenLine xmlns:a14="http://schemas.microsoft.com/office/drawing/2010/main" xmlns="" w="9525">
                   <a:solidFill>
                     <a:srgbClr val="000000"/>
                   </a:solidFill>
@@ -4434,7 +4443,7 @@
             </a:ln>
             <a:extLst>
               <a:ext uri="{91240B29-F687-4f45-9708-019B960494DF}">
-                <a14:hiddenLine xmlns="" xmlns:a14="http://schemas.microsoft.com/office/drawing/2010/main" w="9525">
+                <a14:hiddenLine xmlns:a14="http://schemas.microsoft.com/office/drawing/2010/main" xmlns="" w="9525">
                   <a:solidFill>
                     <a:srgbClr val="000000"/>
                   </a:solidFill>
@@ -4499,7 +4508,7 @@
             </a:ln>
             <a:extLst>
               <a:ext uri="{91240B29-F687-4f45-9708-019B960494DF}">
-                <a14:hiddenLine xmlns="" xmlns:a14="http://schemas.microsoft.com/office/drawing/2010/main" w="9525">
+                <a14:hiddenLine xmlns:a14="http://schemas.microsoft.com/office/drawing/2010/main" xmlns="" w="9525">
                   <a:solidFill>
                     <a:srgbClr val="000000"/>
                   </a:solidFill>
@@ -4589,7 +4598,7 @@
             </a:ln>
             <a:extLst>
               <a:ext uri="{91240B29-F687-4f45-9708-019B960494DF}">
-                <a14:hiddenLine xmlns="" xmlns:a14="http://schemas.microsoft.com/office/drawing/2010/main" w="9525">
+                <a14:hiddenLine xmlns:a14="http://schemas.microsoft.com/office/drawing/2010/main" xmlns="" w="9525">
                   <a:solidFill>
                     <a:srgbClr val="000000"/>
                   </a:solidFill>
@@ -4651,7 +4660,7 @@
             </a:ln>
             <a:extLst>
               <a:ext uri="{91240B29-F687-4f45-9708-019B960494DF}">
-                <a14:hiddenLine xmlns="" xmlns:a14="http://schemas.microsoft.com/office/drawing/2010/main" w="9525">
+                <a14:hiddenLine xmlns:a14="http://schemas.microsoft.com/office/drawing/2010/main" xmlns="" w="9525">
                   <a:solidFill>
                     <a:srgbClr val="000000"/>
                   </a:solidFill>
@@ -4741,7 +4750,7 @@
             </a:ln>
             <a:extLst>
               <a:ext uri="{91240B29-F687-4f45-9708-019B960494DF}">
-                <a14:hiddenLine xmlns="" xmlns:a14="http://schemas.microsoft.com/office/drawing/2010/main" w="9525">
+                <a14:hiddenLine xmlns:a14="http://schemas.microsoft.com/office/drawing/2010/main" xmlns="" w="9525">
                   <a:solidFill>
                     <a:srgbClr val="000000"/>
                   </a:solidFill>
@@ -4831,7 +4840,7 @@
             </a:ln>
             <a:extLst>
               <a:ext uri="{91240B29-F687-4f45-9708-019B960494DF}">
-                <a14:hiddenLine xmlns="" xmlns:a14="http://schemas.microsoft.com/office/drawing/2010/main" w="9525">
+                <a14:hiddenLine xmlns:a14="http://schemas.microsoft.com/office/drawing/2010/main" xmlns="" w="9525">
                   <a:solidFill>
                     <a:srgbClr val="000000"/>
                   </a:solidFill>
@@ -4896,7 +4905,7 @@
             </a:ln>
             <a:extLst>
               <a:ext uri="{91240B29-F687-4f45-9708-019B960494DF}">
-                <a14:hiddenLine xmlns="" xmlns:a14="http://schemas.microsoft.com/office/drawing/2010/main" w="9525">
+                <a14:hiddenLine xmlns:a14="http://schemas.microsoft.com/office/drawing/2010/main" xmlns="" w="9525">
                   <a:solidFill>
                     <a:srgbClr val="000000"/>
                   </a:solidFill>
@@ -4958,7 +4967,7 @@
             </a:ln>
             <a:extLst>
               <a:ext uri="{91240B29-F687-4f45-9708-019B960494DF}">
-                <a14:hiddenLine xmlns="" xmlns:a14="http://schemas.microsoft.com/office/drawing/2010/main" w="9525">
+                <a14:hiddenLine xmlns:a14="http://schemas.microsoft.com/office/drawing/2010/main" xmlns="" w="9525">
                   <a:solidFill>
                     <a:srgbClr val="000000"/>
                   </a:solidFill>
@@ -5048,7 +5057,7 @@
             </a:ln>
             <a:extLst>
               <a:ext uri="{91240B29-F687-4f45-9708-019B960494DF}">
-                <a14:hiddenLine xmlns="" xmlns:a14="http://schemas.microsoft.com/office/drawing/2010/main" w="9525">
+                <a14:hiddenLine xmlns:a14="http://schemas.microsoft.com/office/drawing/2010/main" xmlns="" w="9525">
                   <a:solidFill>
                     <a:srgbClr val="000000"/>
                   </a:solidFill>
@@ -5138,7 +5147,7 @@
             </a:ln>
             <a:extLst>
               <a:ext uri="{91240B29-F687-4f45-9708-019B960494DF}">
-                <a14:hiddenLine xmlns="" xmlns:a14="http://schemas.microsoft.com/office/drawing/2010/main" w="9525">
+                <a14:hiddenLine xmlns:a14="http://schemas.microsoft.com/office/drawing/2010/main" xmlns="" w="9525">
                   <a:solidFill>
                     <a:srgbClr val="000000"/>
                   </a:solidFill>
@@ -5200,7 +5209,7 @@
             </a:ln>
             <a:extLst>
               <a:ext uri="{91240B29-F687-4f45-9708-019B960494DF}">
-                <a14:hiddenLine xmlns="" xmlns:a14="http://schemas.microsoft.com/office/drawing/2010/main" w="9525">
+                <a14:hiddenLine xmlns:a14="http://schemas.microsoft.com/office/drawing/2010/main" xmlns="" w="9525">
                   <a:solidFill>
                     <a:srgbClr val="000000"/>
                   </a:solidFill>
@@ -5320,7 +5329,7 @@
             </a:ln>
             <a:extLst>
               <a:ext uri="{91240B29-F687-4f45-9708-019B960494DF}">
-                <a14:hiddenLine xmlns="" xmlns:a14="http://schemas.microsoft.com/office/drawing/2010/main" w="9525">
+                <a14:hiddenLine xmlns:a14="http://schemas.microsoft.com/office/drawing/2010/main" xmlns="" w="9525">
                   <a:solidFill>
                     <a:srgbClr val="000000"/>
                   </a:solidFill>
@@ -5388,7 +5397,7 @@
             </a:ln>
             <a:extLst>
               <a:ext uri="{91240B29-F687-4f45-9708-019B960494DF}">
-                <a14:hiddenLine xmlns="" xmlns:a14="http://schemas.microsoft.com/office/drawing/2010/main" w="9525">
+                <a14:hiddenLine xmlns:a14="http://schemas.microsoft.com/office/drawing/2010/main" xmlns="" w="9525">
                   <a:solidFill>
                     <a:srgbClr val="000000"/>
                   </a:solidFill>
@@ -5478,7 +5487,7 @@
             </a:ln>
             <a:extLst>
               <a:ext uri="{91240B29-F687-4f45-9708-019B960494DF}">
-                <a14:hiddenLine xmlns="" xmlns:a14="http://schemas.microsoft.com/office/drawing/2010/main" w="9525">
+                <a14:hiddenLine xmlns:a14="http://schemas.microsoft.com/office/drawing/2010/main" xmlns="" w="9525">
                   <a:solidFill>
                     <a:srgbClr val="000000"/>
                   </a:solidFill>
@@ -10207,7 +10216,7 @@
           <a:noFill/>
           <a:extLst>
             <a:ext uri="{909E8E84-426E-40dd-AFC4-6F175D3DCCD1}">
-              <a14:hiddenFill xmlns="" xmlns:a14="http://schemas.microsoft.com/office/drawing/2010/main">
+              <a14:hiddenFill xmlns:a14="http://schemas.microsoft.com/office/drawing/2010/main" xmlns="">
                 <a:solidFill>
                   <a:srgbClr val="FFFFFF"/>
                 </a:solidFill>
@@ -10281,7 +10290,7 @@
               </a:ln>
               <a:extLst>
                 <a:ext uri="{91240B29-F687-4f45-9708-019B960494DF}">
-                  <a14:hiddenLine xmlns="" xmlns:a14="http://schemas.microsoft.com/office/drawing/2010/main" w="9525">
+                  <a14:hiddenLine xmlns:a14="http://schemas.microsoft.com/office/drawing/2010/main" xmlns="" w="9525">
                     <a:solidFill>
                       <a:srgbClr val="000000"/>
                     </a:solidFill>
@@ -10371,7 +10380,7 @@
               </a:ln>
               <a:extLst>
                 <a:ext uri="{91240B29-F687-4f45-9708-019B960494DF}">
-                  <a14:hiddenLine xmlns="" xmlns:a14="http://schemas.microsoft.com/office/drawing/2010/main" w="9525">
+                  <a14:hiddenLine xmlns:a14="http://schemas.microsoft.com/office/drawing/2010/main" xmlns="" w="9525">
                     <a:solidFill>
                       <a:srgbClr val="000000"/>
                     </a:solidFill>
@@ -10461,7 +10470,7 @@
               </a:ln>
               <a:extLst>
                 <a:ext uri="{91240B29-F687-4f45-9708-019B960494DF}">
-                  <a14:hiddenLine xmlns="" xmlns:a14="http://schemas.microsoft.com/office/drawing/2010/main" w="9525">
+                  <a14:hiddenLine xmlns:a14="http://schemas.microsoft.com/office/drawing/2010/main" xmlns="" w="9525">
                     <a:solidFill>
                       <a:srgbClr val="000000"/>
                     </a:solidFill>
@@ -10523,7 +10532,7 @@
               </a:ln>
               <a:extLst>
                 <a:ext uri="{91240B29-F687-4f45-9708-019B960494DF}">
-                  <a14:hiddenLine xmlns="" xmlns:a14="http://schemas.microsoft.com/office/drawing/2010/main" w="9525">
+                  <a14:hiddenLine xmlns:a14="http://schemas.microsoft.com/office/drawing/2010/main" xmlns="" w="9525">
                     <a:solidFill>
                       <a:srgbClr val="000000"/>
                     </a:solidFill>
@@ -10613,7 +10622,7 @@
               </a:ln>
               <a:extLst>
                 <a:ext uri="{91240B29-F687-4f45-9708-019B960494DF}">
-                  <a14:hiddenLine xmlns="" xmlns:a14="http://schemas.microsoft.com/office/drawing/2010/main" w="9525">
+                  <a14:hiddenLine xmlns:a14="http://schemas.microsoft.com/office/drawing/2010/main" xmlns="" w="9525">
                     <a:solidFill>
                       <a:srgbClr val="000000"/>
                     </a:solidFill>
@@ -10675,7 +10684,7 @@
               </a:ln>
               <a:extLst>
                 <a:ext uri="{91240B29-F687-4f45-9708-019B960494DF}">
-                  <a14:hiddenLine xmlns="" xmlns:a14="http://schemas.microsoft.com/office/drawing/2010/main" w="9525">
+                  <a14:hiddenLine xmlns:a14="http://schemas.microsoft.com/office/drawing/2010/main" xmlns="" w="9525">
                     <a:solidFill>
                       <a:srgbClr val="000000"/>
                     </a:solidFill>
@@ -10737,7 +10746,7 @@
               </a:ln>
               <a:extLst>
                 <a:ext uri="{91240B29-F687-4f45-9708-019B960494DF}">
-                  <a14:hiddenLine xmlns="" xmlns:a14="http://schemas.microsoft.com/office/drawing/2010/main" w="9525">
+                  <a14:hiddenLine xmlns:a14="http://schemas.microsoft.com/office/drawing/2010/main" xmlns="" w="9525">
                     <a:solidFill>
                       <a:srgbClr val="000000"/>
                     </a:solidFill>
@@ -10827,7 +10836,7 @@
               </a:ln>
               <a:extLst>
                 <a:ext uri="{91240B29-F687-4f45-9708-019B960494DF}">
-                  <a14:hiddenLine xmlns="" xmlns:a14="http://schemas.microsoft.com/office/drawing/2010/main" w="9525">
+                  <a14:hiddenLine xmlns:a14="http://schemas.microsoft.com/office/drawing/2010/main" xmlns="" w="9525">
                     <a:solidFill>
                       <a:srgbClr val="000000"/>
                     </a:solidFill>
@@ -10917,7 +10926,7 @@
               </a:ln>
               <a:extLst>
                 <a:ext uri="{91240B29-F687-4f45-9708-019B960494DF}">
-                  <a14:hiddenLine xmlns="" xmlns:a14="http://schemas.microsoft.com/office/drawing/2010/main" w="9525">
+                  <a14:hiddenLine xmlns:a14="http://schemas.microsoft.com/office/drawing/2010/main" xmlns="" w="9525">
                     <a:solidFill>
                       <a:srgbClr val="000000"/>
                     </a:solidFill>
@@ -10979,7 +10988,7 @@
               </a:ln>
               <a:extLst>
                 <a:ext uri="{91240B29-F687-4f45-9708-019B960494DF}">
-                  <a14:hiddenLine xmlns="" xmlns:a14="http://schemas.microsoft.com/office/drawing/2010/main" w="9525">
+                  <a14:hiddenLine xmlns:a14="http://schemas.microsoft.com/office/drawing/2010/main" xmlns="" w="9525">
                     <a:solidFill>
                       <a:srgbClr val="000000"/>
                     </a:solidFill>
@@ -11089,7 +11098,7 @@
               </a:ln>
               <a:extLst>
                 <a:ext uri="{91240B29-F687-4f45-9708-019B960494DF}">
-                  <a14:hiddenLine xmlns="" xmlns:a14="http://schemas.microsoft.com/office/drawing/2010/main" w="9525">
+                  <a14:hiddenLine xmlns:a14="http://schemas.microsoft.com/office/drawing/2010/main" xmlns="" w="9525">
                     <a:solidFill>
                       <a:srgbClr val="000000"/>
                     </a:solidFill>
@@ -11173,7 +11182,7 @@
               </a:ln>
               <a:extLst>
                 <a:ext uri="{91240B29-F687-4f45-9708-019B960494DF}">
-                  <a14:hiddenLine xmlns="" xmlns:a14="http://schemas.microsoft.com/office/drawing/2010/main" w="9525">
+                  <a14:hiddenLine xmlns:a14="http://schemas.microsoft.com/office/drawing/2010/main" xmlns="" w="9525">
                     <a:solidFill>
                       <a:srgbClr val="000000"/>
                     </a:solidFill>
@@ -11235,7 +11244,7 @@
               </a:ln>
               <a:extLst>
                 <a:ext uri="{91240B29-F687-4f45-9708-019B960494DF}">
-                  <a14:hiddenLine xmlns="" xmlns:a14="http://schemas.microsoft.com/office/drawing/2010/main" w="9525">
+                  <a14:hiddenLine xmlns:a14="http://schemas.microsoft.com/office/drawing/2010/main" xmlns="" w="9525">
                     <a:solidFill>
                       <a:srgbClr val="000000"/>
                     </a:solidFill>
@@ -11297,7 +11306,7 @@
               </a:ln>
               <a:extLst>
                 <a:ext uri="{91240B29-F687-4f45-9708-019B960494DF}">
-                  <a14:hiddenLine xmlns="" xmlns:a14="http://schemas.microsoft.com/office/drawing/2010/main" w="9525">
+                  <a14:hiddenLine xmlns:a14="http://schemas.microsoft.com/office/drawing/2010/main" xmlns="" w="9525">
                     <a:solidFill>
                       <a:srgbClr val="000000"/>
                     </a:solidFill>
@@ -11387,7 +11396,7 @@
               </a:ln>
               <a:extLst>
                 <a:ext uri="{91240B29-F687-4f45-9708-019B960494DF}">
-                  <a14:hiddenLine xmlns="" xmlns:a14="http://schemas.microsoft.com/office/drawing/2010/main" w="9525">
+                  <a14:hiddenLine xmlns:a14="http://schemas.microsoft.com/office/drawing/2010/main" xmlns="" w="9525">
                     <a:solidFill>
                       <a:srgbClr val="000000"/>
                     </a:solidFill>
@@ -11421,7 +11430,7 @@
               </a:ln>
               <a:extLst>
                 <a:ext uri="{91240B29-F687-4f45-9708-019B960494DF}">
-                  <a14:hiddenLine xmlns="" xmlns:a14="http://schemas.microsoft.com/office/drawing/2010/main" w="9525">
+                  <a14:hiddenLine xmlns:a14="http://schemas.microsoft.com/office/drawing/2010/main" xmlns="" w="9525">
                     <a:solidFill>
                       <a:srgbClr val="000000"/>
                     </a:solidFill>
@@ -11486,7 +11495,7 @@
               </a:ln>
               <a:extLst>
                 <a:ext uri="{91240B29-F687-4f45-9708-019B960494DF}">
-                  <a14:hiddenLine xmlns="" xmlns:a14="http://schemas.microsoft.com/office/drawing/2010/main" w="9525">
+                  <a14:hiddenLine xmlns:a14="http://schemas.microsoft.com/office/drawing/2010/main" xmlns="" w="9525">
                     <a:solidFill>
                       <a:srgbClr val="000000"/>
                     </a:solidFill>
@@ -11576,7 +11585,7 @@
               </a:ln>
               <a:extLst>
                 <a:ext uri="{91240B29-F687-4f45-9708-019B960494DF}">
-                  <a14:hiddenLine xmlns="" xmlns:a14="http://schemas.microsoft.com/office/drawing/2010/main" w="9525">
+                  <a14:hiddenLine xmlns:a14="http://schemas.microsoft.com/office/drawing/2010/main" xmlns="" w="9525">
                     <a:solidFill>
                       <a:srgbClr val="000000"/>
                     </a:solidFill>
@@ -11638,7 +11647,7 @@
               </a:ln>
               <a:extLst>
                 <a:ext uri="{91240B29-F687-4f45-9708-019B960494DF}">
-                  <a14:hiddenLine xmlns="" xmlns:a14="http://schemas.microsoft.com/office/drawing/2010/main" w="9525">
+                  <a14:hiddenLine xmlns:a14="http://schemas.microsoft.com/office/drawing/2010/main" xmlns="" w="9525">
                     <a:solidFill>
                       <a:srgbClr val="000000"/>
                     </a:solidFill>
@@ -11728,7 +11737,7 @@
               </a:ln>
               <a:extLst>
                 <a:ext uri="{91240B29-F687-4f45-9708-019B960494DF}">
-                  <a14:hiddenLine xmlns="" xmlns:a14="http://schemas.microsoft.com/office/drawing/2010/main" w="9525">
+                  <a14:hiddenLine xmlns:a14="http://schemas.microsoft.com/office/drawing/2010/main" xmlns="" w="9525">
                     <a:solidFill>
                       <a:srgbClr val="000000"/>
                     </a:solidFill>
@@ -11793,7 +11802,7 @@
               </a:ln>
               <a:extLst>
                 <a:ext uri="{91240B29-F687-4f45-9708-019B960494DF}">
-                  <a14:hiddenLine xmlns="" xmlns:a14="http://schemas.microsoft.com/office/drawing/2010/main" w="9525">
+                  <a14:hiddenLine xmlns:a14="http://schemas.microsoft.com/office/drawing/2010/main" xmlns="" w="9525">
                     <a:solidFill>
                       <a:srgbClr val="000000"/>
                     </a:solidFill>
@@ -11855,7 +11864,7 @@
               </a:ln>
               <a:extLst>
                 <a:ext uri="{91240B29-F687-4f45-9708-019B960494DF}">
-                  <a14:hiddenLine xmlns="" xmlns:a14="http://schemas.microsoft.com/office/drawing/2010/main" w="9525">
+                  <a14:hiddenLine xmlns:a14="http://schemas.microsoft.com/office/drawing/2010/main" xmlns="" w="9525">
                     <a:solidFill>
                       <a:srgbClr val="000000"/>
                     </a:solidFill>
@@ -11945,7 +11954,7 @@
               </a:ln>
               <a:extLst>
                 <a:ext uri="{91240B29-F687-4f45-9708-019B960494DF}">
-                  <a14:hiddenLine xmlns="" xmlns:a14="http://schemas.microsoft.com/office/drawing/2010/main" w="9525">
+                  <a14:hiddenLine xmlns:a14="http://schemas.microsoft.com/office/drawing/2010/main" xmlns="" w="9525">
                     <a:solidFill>
                       <a:srgbClr val="000000"/>
                     </a:solidFill>
@@ -12035,7 +12044,7 @@
               </a:ln>
               <a:extLst>
                 <a:ext uri="{91240B29-F687-4f45-9708-019B960494DF}">
-                  <a14:hiddenLine xmlns="" xmlns:a14="http://schemas.microsoft.com/office/drawing/2010/main" w="9525">
+                  <a14:hiddenLine xmlns:a14="http://schemas.microsoft.com/office/drawing/2010/main" xmlns="" w="9525">
                     <a:solidFill>
                       <a:srgbClr val="000000"/>
                     </a:solidFill>
@@ -12100,7 +12109,7 @@
               </a:ln>
               <a:extLst>
                 <a:ext uri="{91240B29-F687-4f45-9708-019B960494DF}">
-                  <a14:hiddenLine xmlns="" xmlns:a14="http://schemas.microsoft.com/office/drawing/2010/main" w="9525">
+                  <a14:hiddenLine xmlns:a14="http://schemas.microsoft.com/office/drawing/2010/main" xmlns="" w="9525">
                     <a:solidFill>
                       <a:srgbClr val="000000"/>
                     </a:solidFill>
@@ -12220,7 +12229,7 @@
               </a:ln>
               <a:extLst>
                 <a:ext uri="{91240B29-F687-4f45-9708-019B960494DF}">
-                  <a14:hiddenLine xmlns="" xmlns:a14="http://schemas.microsoft.com/office/drawing/2010/main" w="9525">
+                  <a14:hiddenLine xmlns:a14="http://schemas.microsoft.com/office/drawing/2010/main" xmlns="" w="9525">
                     <a:solidFill>
                       <a:srgbClr val="000000"/>
                     </a:solidFill>
@@ -12301,7 +12310,7 @@
               </a:ln>
               <a:extLst>
                 <a:ext uri="{91240B29-F687-4f45-9708-019B960494DF}">
-                  <a14:hiddenLine xmlns="" xmlns:a14="http://schemas.microsoft.com/office/drawing/2010/main" w="9525">
+                  <a14:hiddenLine xmlns:a14="http://schemas.microsoft.com/office/drawing/2010/main" xmlns="" w="9525">
                     <a:solidFill>
                       <a:srgbClr val="000000"/>
                     </a:solidFill>
@@ -12416,7 +12425,7 @@
               </a:ln>
               <a:extLst>
                 <a:ext uri="{91240B29-F687-4f45-9708-019B960494DF}">
-                  <a14:hiddenLine xmlns="" xmlns:a14="http://schemas.microsoft.com/office/drawing/2010/main" w="9525">
+                  <a14:hiddenLine xmlns:a14="http://schemas.microsoft.com/office/drawing/2010/main" xmlns="" w="9525">
                     <a:solidFill>
                       <a:srgbClr val="000000"/>
                     </a:solidFill>
@@ -12506,7 +12515,7 @@
               </a:ln>
               <a:extLst>
                 <a:ext uri="{91240B29-F687-4f45-9708-019B960494DF}">
-                  <a14:hiddenLine xmlns="" xmlns:a14="http://schemas.microsoft.com/office/drawing/2010/main" w="9525">
+                  <a14:hiddenLine xmlns:a14="http://schemas.microsoft.com/office/drawing/2010/main" xmlns="" w="9525">
                     <a:solidFill>
                       <a:srgbClr val="000000"/>
                     </a:solidFill>
@@ -12571,7 +12580,7 @@
               </a:ln>
               <a:extLst>
                 <a:ext uri="{91240B29-F687-4f45-9708-019B960494DF}">
-                  <a14:hiddenLine xmlns="" xmlns:a14="http://schemas.microsoft.com/office/drawing/2010/main" w="9525">
+                  <a14:hiddenLine xmlns:a14="http://schemas.microsoft.com/office/drawing/2010/main" xmlns="" w="9525">
                     <a:solidFill>
                       <a:srgbClr val="000000"/>
                     </a:solidFill>
@@ -12661,7 +12670,7 @@
               </a:ln>
               <a:extLst>
                 <a:ext uri="{91240B29-F687-4f45-9708-019B960494DF}">
-                  <a14:hiddenLine xmlns="" xmlns:a14="http://schemas.microsoft.com/office/drawing/2010/main" w="9525">
+                  <a14:hiddenLine xmlns:a14="http://schemas.microsoft.com/office/drawing/2010/main" xmlns="" w="9525">
                     <a:solidFill>
                       <a:srgbClr val="000000"/>
                     </a:solidFill>
@@ -12729,7 +12738,7 @@
               </a:ln>
               <a:extLst>
                 <a:ext uri="{91240B29-F687-4f45-9708-019B960494DF}">
-                  <a14:hiddenLine xmlns="" xmlns:a14="http://schemas.microsoft.com/office/drawing/2010/main" w="9525">
+                  <a14:hiddenLine xmlns:a14="http://schemas.microsoft.com/office/drawing/2010/main" xmlns="" w="9525">
                     <a:solidFill>
                       <a:srgbClr val="000000"/>
                     </a:solidFill>
@@ -12819,7 +12828,7 @@
               </a:ln>
               <a:extLst>
                 <a:ext uri="{91240B29-F687-4f45-9708-019B960494DF}">
-                  <a14:hiddenLine xmlns="" xmlns:a14="http://schemas.microsoft.com/office/drawing/2010/main" w="9525">
+                  <a14:hiddenLine xmlns:a14="http://schemas.microsoft.com/office/drawing/2010/main" xmlns="" w="9525">
                     <a:solidFill>
                       <a:srgbClr val="000000"/>
                     </a:solidFill>
@@ -12887,7 +12896,7 @@
               </a:ln>
               <a:extLst>
                 <a:ext uri="{91240B29-F687-4f45-9708-019B960494DF}">
-                  <a14:hiddenLine xmlns="" xmlns:a14="http://schemas.microsoft.com/office/drawing/2010/main" w="9525">
+                  <a14:hiddenLine xmlns:a14="http://schemas.microsoft.com/office/drawing/2010/main" xmlns="" w="9525">
                     <a:solidFill>
                       <a:srgbClr val="000000"/>
                     </a:solidFill>
@@ -12977,7 +12986,7 @@
               </a:ln>
               <a:extLst>
                 <a:ext uri="{91240B29-F687-4f45-9708-019B960494DF}">
-                  <a14:hiddenLine xmlns="" xmlns:a14="http://schemas.microsoft.com/office/drawing/2010/main" w="9525">
+                  <a14:hiddenLine xmlns:a14="http://schemas.microsoft.com/office/drawing/2010/main" xmlns="" w="9525">
                     <a:solidFill>
                       <a:srgbClr val="000000"/>
                     </a:solidFill>
@@ -13011,7 +13020,7 @@
               </a:ln>
               <a:extLst>
                 <a:ext uri="{91240B29-F687-4f45-9708-019B960494DF}">
-                  <a14:hiddenLine xmlns="" xmlns:a14="http://schemas.microsoft.com/office/drawing/2010/main" w="9525">
+                  <a14:hiddenLine xmlns:a14="http://schemas.microsoft.com/office/drawing/2010/main" xmlns="" w="9525">
                     <a:solidFill>
                       <a:srgbClr val="000000"/>
                     </a:solidFill>
@@ -13820,8 +13829,26 @@
                 <a:effectLst/>
                 <a:latin typeface="Consolas" panose="020B0609020204030204" pitchFamily="49" charset="0"/>
               </a:rPr>
-              <a:t>Nuestro proyecto se basa en un hospital. Vamos a crear una base de datos para recabar información sobre los pacientes, doctores, enfermeros y habitaciones. Esto nos permitirá llevar un correcto funcionamiento de la gestión de los clientes.</a:t>
-            </a:r>
+              <a:t>Nuestro proyecto se basa en un hospital. </a:t>
+            </a:r>
+          </a:p>
+          <a:p>
+            <a:r>
+              <a:rPr lang="es-ES" dirty="0">
+                <a:solidFill>
+                  <a:srgbClr val="FFFF00"/>
+                </a:solidFill>
+                <a:latin typeface="Consolas" panose="020B0609020204030204" pitchFamily="49" charset="0"/>
+              </a:rPr>
+              <a:t>OBJETIVO: recabar información y gestionarla.</a:t>
+            </a:r>
+            <a:endParaRPr lang="es-ES" b="0" dirty="0">
+              <a:solidFill>
+                <a:srgbClr val="FFFF00"/>
+              </a:solidFill>
+              <a:effectLst/>
+              <a:latin typeface="Consolas" panose="020B0609020204030204" pitchFamily="49" charset="0"/>
+            </a:endParaRPr>
           </a:p>
           <a:p>
             <a:pPr marL="0" indent="0">

</xml_diff>

<commit_message>
Cambios en el DDL
</commit_message>
<xml_diff>
--- a/doc/Presentación_mitad_de_curso_JuanEspinosayNachoRodriguez.pptx
+++ b/doc/Presentación_mitad_de_curso_JuanEspinosayNachoRodriguez.pptx
@@ -1449,7 +1449,7 @@
           <a:noFill/>
           <a:extLst>
             <a:ext uri="{909E8E84-426E-40dd-AFC4-6F175D3DCCD1}">
-              <a14:hiddenFill xmlns="" xmlns:a14="http://schemas.microsoft.com/office/drawing/2010/main">
+              <a14:hiddenFill xmlns:a14="http://schemas.microsoft.com/office/drawing/2010/main" xmlns="">
                 <a:solidFill>
                   <a:srgbClr val="FFFFFF"/>
                 </a:solidFill>
@@ -1508,7 +1508,7 @@
             </a:ln>
             <a:extLst>
               <a:ext uri="{91240B29-F687-4f45-9708-019B960494DF}">
-                <a14:hiddenLine xmlns="" xmlns:a14="http://schemas.microsoft.com/office/drawing/2010/main" w="9525">
+                <a14:hiddenLine xmlns:a14="http://schemas.microsoft.com/office/drawing/2010/main" xmlns="" w="9525">
                   <a:solidFill>
                     <a:srgbClr val="000000"/>
                   </a:solidFill>
@@ -1598,7 +1598,7 @@
             </a:ln>
             <a:extLst>
               <a:ext uri="{91240B29-F687-4f45-9708-019B960494DF}">
-                <a14:hiddenLine xmlns="" xmlns:a14="http://schemas.microsoft.com/office/drawing/2010/main" w="9525">
+                <a14:hiddenLine xmlns:a14="http://schemas.microsoft.com/office/drawing/2010/main" xmlns="" w="9525">
                   <a:solidFill>
                     <a:srgbClr val="000000"/>
                   </a:solidFill>
@@ -1688,7 +1688,7 @@
             </a:ln>
             <a:extLst>
               <a:ext uri="{91240B29-F687-4f45-9708-019B960494DF}">
-                <a14:hiddenLine xmlns="" xmlns:a14="http://schemas.microsoft.com/office/drawing/2010/main" w="9525">
+                <a14:hiddenLine xmlns:a14="http://schemas.microsoft.com/office/drawing/2010/main" xmlns="" w="9525">
                   <a:solidFill>
                     <a:srgbClr val="000000"/>
                   </a:solidFill>
@@ -1722,7 +1722,7 @@
             </a:ln>
             <a:extLst>
               <a:ext uri="{91240B29-F687-4f45-9708-019B960494DF}">
-                <a14:hiddenLine xmlns="" xmlns:a14="http://schemas.microsoft.com/office/drawing/2010/main" w="9525">
+                <a14:hiddenLine xmlns:a14="http://schemas.microsoft.com/office/drawing/2010/main" xmlns="" w="9525">
                   <a:solidFill>
                     <a:srgbClr val="000000"/>
                   </a:solidFill>
@@ -1812,7 +1812,7 @@
             </a:ln>
             <a:extLst>
               <a:ext uri="{91240B29-F687-4f45-9708-019B960494DF}">
-                <a14:hiddenLine xmlns="" xmlns:a14="http://schemas.microsoft.com/office/drawing/2010/main" w="9525">
+                <a14:hiddenLine xmlns:a14="http://schemas.microsoft.com/office/drawing/2010/main" xmlns="" w="9525">
                   <a:solidFill>
                     <a:srgbClr val="000000"/>
                   </a:solidFill>
@@ -1874,7 +1874,7 @@
             </a:ln>
             <a:extLst>
               <a:ext uri="{91240B29-F687-4f45-9708-019B960494DF}">
-                <a14:hiddenLine xmlns="" xmlns:a14="http://schemas.microsoft.com/office/drawing/2010/main" w="9525">
+                <a14:hiddenLine xmlns:a14="http://schemas.microsoft.com/office/drawing/2010/main" xmlns="" w="9525">
                   <a:solidFill>
                     <a:srgbClr val="000000"/>
                   </a:solidFill>
@@ -1936,7 +1936,7 @@
             </a:ln>
             <a:extLst>
               <a:ext uri="{91240B29-F687-4f45-9708-019B960494DF}">
-                <a14:hiddenLine xmlns="" xmlns:a14="http://schemas.microsoft.com/office/drawing/2010/main" w="9525">
+                <a14:hiddenLine xmlns:a14="http://schemas.microsoft.com/office/drawing/2010/main" xmlns="" w="9525">
                   <a:solidFill>
                     <a:srgbClr val="000000"/>
                   </a:solidFill>
@@ -2026,7 +2026,7 @@
             </a:ln>
             <a:extLst>
               <a:ext uri="{91240B29-F687-4f45-9708-019B960494DF}">
-                <a14:hiddenLine xmlns="" xmlns:a14="http://schemas.microsoft.com/office/drawing/2010/main" w="9525">
+                <a14:hiddenLine xmlns:a14="http://schemas.microsoft.com/office/drawing/2010/main" xmlns="" w="9525">
                   <a:solidFill>
                     <a:srgbClr val="000000"/>
                   </a:solidFill>
@@ -2088,7 +2088,7 @@
             </a:ln>
             <a:extLst>
               <a:ext uri="{91240B29-F687-4f45-9708-019B960494DF}">
-                <a14:hiddenLine xmlns="" xmlns:a14="http://schemas.microsoft.com/office/drawing/2010/main" w="9525">
+                <a14:hiddenLine xmlns:a14="http://schemas.microsoft.com/office/drawing/2010/main" xmlns="" w="9525">
                   <a:solidFill>
                     <a:srgbClr val="000000"/>
                   </a:solidFill>
@@ -2150,7 +2150,7 @@
             </a:ln>
             <a:extLst>
               <a:ext uri="{91240B29-F687-4f45-9708-019B960494DF}">
-                <a14:hiddenLine xmlns="" xmlns:a14="http://schemas.microsoft.com/office/drawing/2010/main" w="9525">
+                <a14:hiddenLine xmlns:a14="http://schemas.microsoft.com/office/drawing/2010/main" xmlns="" w="9525">
                   <a:solidFill>
                     <a:srgbClr val="000000"/>
                   </a:solidFill>
@@ -2240,7 +2240,7 @@
             </a:ln>
             <a:extLst>
               <a:ext uri="{91240B29-F687-4f45-9708-019B960494DF}">
-                <a14:hiddenLine xmlns="" xmlns:a14="http://schemas.microsoft.com/office/drawing/2010/main" w="9525">
+                <a14:hiddenLine xmlns:a14="http://schemas.microsoft.com/office/drawing/2010/main" xmlns="" w="9525">
                   <a:solidFill>
                     <a:srgbClr val="000000"/>
                   </a:solidFill>
@@ -2330,7 +2330,7 @@
             </a:ln>
             <a:extLst>
               <a:ext uri="{91240B29-F687-4f45-9708-019B960494DF}">
-                <a14:hiddenLine xmlns="" xmlns:a14="http://schemas.microsoft.com/office/drawing/2010/main" w="9525">
+                <a14:hiddenLine xmlns:a14="http://schemas.microsoft.com/office/drawing/2010/main" xmlns="" w="9525">
                   <a:solidFill>
                     <a:srgbClr val="000000"/>
                   </a:solidFill>
@@ -2392,7 +2392,7 @@
             </a:ln>
             <a:extLst>
               <a:ext uri="{91240B29-F687-4f45-9708-019B960494DF}">
-                <a14:hiddenLine xmlns="" xmlns:a14="http://schemas.microsoft.com/office/drawing/2010/main" w="9525">
+                <a14:hiddenLine xmlns:a14="http://schemas.microsoft.com/office/drawing/2010/main" xmlns="" w="9525">
                   <a:solidFill>
                     <a:srgbClr val="000000"/>
                   </a:solidFill>
@@ -2502,7 +2502,7 @@
             </a:ln>
             <a:extLst>
               <a:ext uri="{91240B29-F687-4f45-9708-019B960494DF}">
-                <a14:hiddenLine xmlns="" xmlns:a14="http://schemas.microsoft.com/office/drawing/2010/main" w="9525">
+                <a14:hiddenLine xmlns:a14="http://schemas.microsoft.com/office/drawing/2010/main" xmlns="" w="9525">
                   <a:solidFill>
                     <a:srgbClr val="000000"/>
                   </a:solidFill>
@@ -2564,7 +2564,7 @@
             </a:ln>
             <a:extLst>
               <a:ext uri="{91240B29-F687-4f45-9708-019B960494DF}">
-                <a14:hiddenLine xmlns="" xmlns:a14="http://schemas.microsoft.com/office/drawing/2010/main" w="9525">
+                <a14:hiddenLine xmlns:a14="http://schemas.microsoft.com/office/drawing/2010/main" xmlns="" w="9525">
                   <a:solidFill>
                     <a:srgbClr val="000000"/>
                   </a:solidFill>
@@ -2654,7 +2654,7 @@
             </a:ln>
             <a:extLst>
               <a:ext uri="{91240B29-F687-4f45-9708-019B960494DF}">
-                <a14:hiddenLine xmlns="" xmlns:a14="http://schemas.microsoft.com/office/drawing/2010/main" w="9525">
+                <a14:hiddenLine xmlns:a14="http://schemas.microsoft.com/office/drawing/2010/main" xmlns="" w="9525">
                   <a:solidFill>
                     <a:srgbClr val="000000"/>
                   </a:solidFill>
@@ -2744,7 +2744,7 @@
             </a:ln>
             <a:extLst>
               <a:ext uri="{91240B29-F687-4f45-9708-019B960494DF}">
-                <a14:hiddenLine xmlns="" xmlns:a14="http://schemas.microsoft.com/office/drawing/2010/main" w="9525">
+                <a14:hiddenLine xmlns:a14="http://schemas.microsoft.com/office/drawing/2010/main" xmlns="" w="9525">
                   <a:solidFill>
                     <a:srgbClr val="000000"/>
                   </a:solidFill>
@@ -2806,7 +2806,7 @@
             </a:ln>
             <a:extLst>
               <a:ext uri="{91240B29-F687-4f45-9708-019B960494DF}">
-                <a14:hiddenLine xmlns="" xmlns:a14="http://schemas.microsoft.com/office/drawing/2010/main" w="9525">
+                <a14:hiddenLine xmlns:a14="http://schemas.microsoft.com/office/drawing/2010/main" xmlns="" w="9525">
                   <a:solidFill>
                     <a:srgbClr val="000000"/>
                   </a:solidFill>
@@ -2896,7 +2896,7 @@
             </a:ln>
             <a:extLst>
               <a:ext uri="{91240B29-F687-4f45-9708-019B960494DF}">
-                <a14:hiddenLine xmlns="" xmlns:a14="http://schemas.microsoft.com/office/drawing/2010/main" w="9525">
+                <a14:hiddenLine xmlns:a14="http://schemas.microsoft.com/office/drawing/2010/main" xmlns="" w="9525">
                   <a:solidFill>
                     <a:srgbClr val="000000"/>
                   </a:solidFill>
@@ -2986,7 +2986,7 @@
             </a:ln>
             <a:extLst>
               <a:ext uri="{91240B29-F687-4f45-9708-019B960494DF}">
-                <a14:hiddenLine xmlns="" xmlns:a14="http://schemas.microsoft.com/office/drawing/2010/main" w="9525">
+                <a14:hiddenLine xmlns:a14="http://schemas.microsoft.com/office/drawing/2010/main" xmlns="" w="9525">
                   <a:solidFill>
                     <a:srgbClr val="000000"/>
                   </a:solidFill>
@@ -3042,7 +3042,7 @@
             </a:ln>
             <a:extLst>
               <a:ext uri="{91240B29-F687-4f45-9708-019B960494DF}">
-                <a14:hiddenLine xmlns="" xmlns:a14="http://schemas.microsoft.com/office/drawing/2010/main" w="9525">
+                <a14:hiddenLine xmlns:a14="http://schemas.microsoft.com/office/drawing/2010/main" xmlns="" w="9525">
                   <a:solidFill>
                     <a:srgbClr val="000000"/>
                   </a:solidFill>
@@ -3132,7 +3132,7 @@
             </a:ln>
             <a:extLst>
               <a:ext uri="{91240B29-F687-4f45-9708-019B960494DF}">
-                <a14:hiddenLine xmlns="" xmlns:a14="http://schemas.microsoft.com/office/drawing/2010/main" w="9525">
+                <a14:hiddenLine xmlns:a14="http://schemas.microsoft.com/office/drawing/2010/main" xmlns="" w="9525">
                   <a:solidFill>
                     <a:srgbClr val="000000"/>
                   </a:solidFill>
@@ -3188,7 +3188,7 @@
             </a:ln>
             <a:extLst>
               <a:ext uri="{91240B29-F687-4f45-9708-019B960494DF}">
-                <a14:hiddenLine xmlns="" xmlns:a14="http://schemas.microsoft.com/office/drawing/2010/main" w="9525">
+                <a14:hiddenLine xmlns:a14="http://schemas.microsoft.com/office/drawing/2010/main" xmlns="" w="9525">
                   <a:solidFill>
                     <a:srgbClr val="000000"/>
                   </a:solidFill>
@@ -3278,7 +3278,7 @@
             </a:ln>
             <a:extLst>
               <a:ext uri="{91240B29-F687-4f45-9708-019B960494DF}">
-                <a14:hiddenLine xmlns="" xmlns:a14="http://schemas.microsoft.com/office/drawing/2010/main" w="9525">
+                <a14:hiddenLine xmlns:a14="http://schemas.microsoft.com/office/drawing/2010/main" xmlns="" w="9525">
                   <a:solidFill>
                     <a:srgbClr val="000000"/>
                   </a:solidFill>
@@ -3346,7 +3346,7 @@
             </a:ln>
             <a:extLst>
               <a:ext uri="{91240B29-F687-4f45-9708-019B960494DF}">
-                <a14:hiddenLine xmlns="" xmlns:a14="http://schemas.microsoft.com/office/drawing/2010/main" w="9525">
+                <a14:hiddenLine xmlns:a14="http://schemas.microsoft.com/office/drawing/2010/main" xmlns="" w="9525">
                   <a:solidFill>
                     <a:srgbClr val="000000"/>
                   </a:solidFill>
@@ -3436,7 +3436,7 @@
             </a:ln>
             <a:extLst>
               <a:ext uri="{91240B29-F687-4f45-9708-019B960494DF}">
-                <a14:hiddenLine xmlns="" xmlns:a14="http://schemas.microsoft.com/office/drawing/2010/main" w="9525">
+                <a14:hiddenLine xmlns:a14="http://schemas.microsoft.com/office/drawing/2010/main" xmlns="" w="9525">
                   <a:solidFill>
                     <a:srgbClr val="000000"/>
                   </a:solidFill>
@@ -3504,7 +3504,7 @@
             </a:ln>
             <a:extLst>
               <a:ext uri="{91240B29-F687-4f45-9708-019B960494DF}">
-                <a14:hiddenLine xmlns="" xmlns:a14="http://schemas.microsoft.com/office/drawing/2010/main" w="9525">
+                <a14:hiddenLine xmlns:a14="http://schemas.microsoft.com/office/drawing/2010/main" xmlns="" w="9525">
                   <a:solidFill>
                     <a:srgbClr val="000000"/>
                   </a:solidFill>
@@ -3594,7 +3594,7 @@
             </a:ln>
             <a:extLst>
               <a:ext uri="{91240B29-F687-4f45-9708-019B960494DF}">
-                <a14:hiddenLine xmlns="" xmlns:a14="http://schemas.microsoft.com/office/drawing/2010/main" w="9525">
+                <a14:hiddenLine xmlns:a14="http://schemas.microsoft.com/office/drawing/2010/main" xmlns="" w="9525">
                   <a:solidFill>
                     <a:srgbClr val="000000"/>
                   </a:solidFill>
@@ -3628,7 +3628,7 @@
             </a:ln>
             <a:extLst>
               <a:ext uri="{91240B29-F687-4f45-9708-019B960494DF}">
-                <a14:hiddenLine xmlns="" xmlns:a14="http://schemas.microsoft.com/office/drawing/2010/main" w="9525">
+                <a14:hiddenLine xmlns:a14="http://schemas.microsoft.com/office/drawing/2010/main" xmlns="" w="9525">
                   <a:solidFill>
                     <a:srgbClr val="000000"/>
                   </a:solidFill>
@@ -3718,7 +3718,7 @@
             </a:ln>
             <a:extLst>
               <a:ext uri="{91240B29-F687-4f45-9708-019B960494DF}">
-                <a14:hiddenLine xmlns="" xmlns:a14="http://schemas.microsoft.com/office/drawing/2010/main" w="9525">
+                <a14:hiddenLine xmlns:a14="http://schemas.microsoft.com/office/drawing/2010/main" xmlns="" w="9525">
                   <a:solidFill>
                     <a:srgbClr val="000000"/>
                   </a:solidFill>
@@ -3780,7 +3780,7 @@
             </a:ln>
             <a:extLst>
               <a:ext uri="{91240B29-F687-4f45-9708-019B960494DF}">
-                <a14:hiddenLine xmlns="" xmlns:a14="http://schemas.microsoft.com/office/drawing/2010/main" w="9525">
+                <a14:hiddenLine xmlns:a14="http://schemas.microsoft.com/office/drawing/2010/main" xmlns="" w="9525">
                   <a:solidFill>
                     <a:srgbClr val="000000"/>
                   </a:solidFill>
@@ -3842,7 +3842,7 @@
             </a:ln>
             <a:extLst>
               <a:ext uri="{91240B29-F687-4f45-9708-019B960494DF}">
-                <a14:hiddenLine xmlns="" xmlns:a14="http://schemas.microsoft.com/office/drawing/2010/main" w="9525">
+                <a14:hiddenLine xmlns:a14="http://schemas.microsoft.com/office/drawing/2010/main" xmlns="" w="9525">
                   <a:solidFill>
                     <a:srgbClr val="000000"/>
                   </a:solidFill>
@@ -3932,7 +3932,7 @@
             </a:ln>
             <a:extLst>
               <a:ext uri="{91240B29-F687-4f45-9708-019B960494DF}">
-                <a14:hiddenLine xmlns="" xmlns:a14="http://schemas.microsoft.com/office/drawing/2010/main" w="9525">
+                <a14:hiddenLine xmlns:a14="http://schemas.microsoft.com/office/drawing/2010/main" xmlns="" w="9525">
                   <a:solidFill>
                     <a:srgbClr val="000000"/>
                   </a:solidFill>
@@ -4000,7 +4000,7 @@
             </a:ln>
             <a:extLst>
               <a:ext uri="{91240B29-F687-4f45-9708-019B960494DF}">
-                <a14:hiddenLine xmlns="" xmlns:a14="http://schemas.microsoft.com/office/drawing/2010/main" w="9525">
+                <a14:hiddenLine xmlns:a14="http://schemas.microsoft.com/office/drawing/2010/main" xmlns="" w="9525">
                   <a:solidFill>
                     <a:srgbClr val="000000"/>
                   </a:solidFill>
@@ -4062,7 +4062,7 @@
             </a:ln>
             <a:extLst>
               <a:ext uri="{91240B29-F687-4f45-9708-019B960494DF}">
-                <a14:hiddenLine xmlns="" xmlns:a14="http://schemas.microsoft.com/office/drawing/2010/main" w="9525">
+                <a14:hiddenLine xmlns:a14="http://schemas.microsoft.com/office/drawing/2010/main" xmlns="" w="9525">
                   <a:solidFill>
                     <a:srgbClr val="000000"/>
                   </a:solidFill>
@@ -4152,7 +4152,7 @@
             </a:ln>
             <a:extLst>
               <a:ext uri="{91240B29-F687-4f45-9708-019B960494DF}">
-                <a14:hiddenLine xmlns="" xmlns:a14="http://schemas.microsoft.com/office/drawing/2010/main" w="9525">
+                <a14:hiddenLine xmlns:a14="http://schemas.microsoft.com/office/drawing/2010/main" xmlns="" w="9525">
                   <a:solidFill>
                     <a:srgbClr val="000000"/>
                   </a:solidFill>
@@ -4214,7 +4214,7 @@
             </a:ln>
             <a:extLst>
               <a:ext uri="{91240B29-F687-4f45-9708-019B960494DF}">
-                <a14:hiddenLine xmlns="" xmlns:a14="http://schemas.microsoft.com/office/drawing/2010/main" w="9525">
+                <a14:hiddenLine xmlns:a14="http://schemas.microsoft.com/office/drawing/2010/main" xmlns="" w="9525">
                   <a:solidFill>
                     <a:srgbClr val="000000"/>
                   </a:solidFill>
@@ -4304,7 +4304,7 @@
             </a:ln>
             <a:extLst>
               <a:ext uri="{91240B29-F687-4f45-9708-019B960494DF}">
-                <a14:hiddenLine xmlns="" xmlns:a14="http://schemas.microsoft.com/office/drawing/2010/main" w="9525">
+                <a14:hiddenLine xmlns:a14="http://schemas.microsoft.com/office/drawing/2010/main" xmlns="" w="9525">
                   <a:solidFill>
                     <a:srgbClr val="000000"/>
                   </a:solidFill>
@@ -4366,7 +4366,7 @@
             </a:ln>
             <a:extLst>
               <a:ext uri="{91240B29-F687-4f45-9708-019B960494DF}">
-                <a14:hiddenLine xmlns="" xmlns:a14="http://schemas.microsoft.com/office/drawing/2010/main" w="9525">
+                <a14:hiddenLine xmlns:a14="http://schemas.microsoft.com/office/drawing/2010/main" xmlns="" w="9525">
                   <a:solidFill>
                     <a:srgbClr val="000000"/>
                   </a:solidFill>
@@ -4456,7 +4456,7 @@
             </a:ln>
             <a:extLst>
               <a:ext uri="{91240B29-F687-4f45-9708-019B960494DF}">
-                <a14:hiddenLine xmlns="" xmlns:a14="http://schemas.microsoft.com/office/drawing/2010/main" w="9525">
+                <a14:hiddenLine xmlns:a14="http://schemas.microsoft.com/office/drawing/2010/main" xmlns="" w="9525">
                   <a:solidFill>
                     <a:srgbClr val="000000"/>
                   </a:solidFill>
@@ -4490,7 +4490,7 @@
             </a:ln>
             <a:extLst>
               <a:ext uri="{91240B29-F687-4f45-9708-019B960494DF}">
-                <a14:hiddenLine xmlns="" xmlns:a14="http://schemas.microsoft.com/office/drawing/2010/main" w="9525">
+                <a14:hiddenLine xmlns:a14="http://schemas.microsoft.com/office/drawing/2010/main" xmlns="" w="9525">
                   <a:solidFill>
                     <a:srgbClr val="000000"/>
                   </a:solidFill>
@@ -4555,7 +4555,7 @@
             </a:ln>
             <a:extLst>
               <a:ext uri="{91240B29-F687-4f45-9708-019B960494DF}">
-                <a14:hiddenLine xmlns="" xmlns:a14="http://schemas.microsoft.com/office/drawing/2010/main" w="9525">
+                <a14:hiddenLine xmlns:a14="http://schemas.microsoft.com/office/drawing/2010/main" xmlns="" w="9525">
                   <a:solidFill>
                     <a:srgbClr val="000000"/>
                   </a:solidFill>
@@ -4645,7 +4645,7 @@
             </a:ln>
             <a:extLst>
               <a:ext uri="{91240B29-F687-4f45-9708-019B960494DF}">
-                <a14:hiddenLine xmlns="" xmlns:a14="http://schemas.microsoft.com/office/drawing/2010/main" w="9525">
+                <a14:hiddenLine xmlns:a14="http://schemas.microsoft.com/office/drawing/2010/main" xmlns="" w="9525">
                   <a:solidFill>
                     <a:srgbClr val="000000"/>
                   </a:solidFill>
@@ -4707,7 +4707,7 @@
             </a:ln>
             <a:extLst>
               <a:ext uri="{91240B29-F687-4f45-9708-019B960494DF}">
-                <a14:hiddenLine xmlns="" xmlns:a14="http://schemas.microsoft.com/office/drawing/2010/main" w="9525">
+                <a14:hiddenLine xmlns:a14="http://schemas.microsoft.com/office/drawing/2010/main" xmlns="" w="9525">
                   <a:solidFill>
                     <a:srgbClr val="000000"/>
                   </a:solidFill>
@@ -4797,7 +4797,7 @@
             </a:ln>
             <a:extLst>
               <a:ext uri="{91240B29-F687-4f45-9708-019B960494DF}">
-                <a14:hiddenLine xmlns="" xmlns:a14="http://schemas.microsoft.com/office/drawing/2010/main" w="9525">
+                <a14:hiddenLine xmlns:a14="http://schemas.microsoft.com/office/drawing/2010/main" xmlns="" w="9525">
                   <a:solidFill>
                     <a:srgbClr val="000000"/>
                   </a:solidFill>
@@ -4887,7 +4887,7 @@
             </a:ln>
             <a:extLst>
               <a:ext uri="{91240B29-F687-4f45-9708-019B960494DF}">
-                <a14:hiddenLine xmlns="" xmlns:a14="http://schemas.microsoft.com/office/drawing/2010/main" w="9525">
+                <a14:hiddenLine xmlns:a14="http://schemas.microsoft.com/office/drawing/2010/main" xmlns="" w="9525">
                   <a:solidFill>
                     <a:srgbClr val="000000"/>
                   </a:solidFill>
@@ -4952,7 +4952,7 @@
             </a:ln>
             <a:extLst>
               <a:ext uri="{91240B29-F687-4f45-9708-019B960494DF}">
-                <a14:hiddenLine xmlns="" xmlns:a14="http://schemas.microsoft.com/office/drawing/2010/main" w="9525">
+                <a14:hiddenLine xmlns:a14="http://schemas.microsoft.com/office/drawing/2010/main" xmlns="" w="9525">
                   <a:solidFill>
                     <a:srgbClr val="000000"/>
                   </a:solidFill>
@@ -5014,7 +5014,7 @@
             </a:ln>
             <a:extLst>
               <a:ext uri="{91240B29-F687-4f45-9708-019B960494DF}">
-                <a14:hiddenLine xmlns="" xmlns:a14="http://schemas.microsoft.com/office/drawing/2010/main" w="9525">
+                <a14:hiddenLine xmlns:a14="http://schemas.microsoft.com/office/drawing/2010/main" xmlns="" w="9525">
                   <a:solidFill>
                     <a:srgbClr val="000000"/>
                   </a:solidFill>
@@ -5104,7 +5104,7 @@
             </a:ln>
             <a:extLst>
               <a:ext uri="{91240B29-F687-4f45-9708-019B960494DF}">
-                <a14:hiddenLine xmlns="" xmlns:a14="http://schemas.microsoft.com/office/drawing/2010/main" w="9525">
+                <a14:hiddenLine xmlns:a14="http://schemas.microsoft.com/office/drawing/2010/main" xmlns="" w="9525">
                   <a:solidFill>
                     <a:srgbClr val="000000"/>
                   </a:solidFill>
@@ -5194,7 +5194,7 @@
             </a:ln>
             <a:extLst>
               <a:ext uri="{91240B29-F687-4f45-9708-019B960494DF}">
-                <a14:hiddenLine xmlns="" xmlns:a14="http://schemas.microsoft.com/office/drawing/2010/main" w="9525">
+                <a14:hiddenLine xmlns:a14="http://schemas.microsoft.com/office/drawing/2010/main" xmlns="" w="9525">
                   <a:solidFill>
                     <a:srgbClr val="000000"/>
                   </a:solidFill>
@@ -5256,7 +5256,7 @@
             </a:ln>
             <a:extLst>
               <a:ext uri="{91240B29-F687-4f45-9708-019B960494DF}">
-                <a14:hiddenLine xmlns="" xmlns:a14="http://schemas.microsoft.com/office/drawing/2010/main" w="9525">
+                <a14:hiddenLine xmlns:a14="http://schemas.microsoft.com/office/drawing/2010/main" xmlns="" w="9525">
                   <a:solidFill>
                     <a:srgbClr val="000000"/>
                   </a:solidFill>
@@ -5376,7 +5376,7 @@
             </a:ln>
             <a:extLst>
               <a:ext uri="{91240B29-F687-4f45-9708-019B960494DF}">
-                <a14:hiddenLine xmlns="" xmlns:a14="http://schemas.microsoft.com/office/drawing/2010/main" w="9525">
+                <a14:hiddenLine xmlns:a14="http://schemas.microsoft.com/office/drawing/2010/main" xmlns="" w="9525">
                   <a:solidFill>
                     <a:srgbClr val="000000"/>
                   </a:solidFill>
@@ -5444,7 +5444,7 @@
             </a:ln>
             <a:extLst>
               <a:ext uri="{91240B29-F687-4f45-9708-019B960494DF}">
-                <a14:hiddenLine xmlns="" xmlns:a14="http://schemas.microsoft.com/office/drawing/2010/main" w="9525">
+                <a14:hiddenLine xmlns:a14="http://schemas.microsoft.com/office/drawing/2010/main" xmlns="" w="9525">
                   <a:solidFill>
                     <a:srgbClr val="000000"/>
                   </a:solidFill>
@@ -5534,7 +5534,7 @@
             </a:ln>
             <a:extLst>
               <a:ext uri="{91240B29-F687-4f45-9708-019B960494DF}">
-                <a14:hiddenLine xmlns="" xmlns:a14="http://schemas.microsoft.com/office/drawing/2010/main" w="9525">
+                <a14:hiddenLine xmlns:a14="http://schemas.microsoft.com/office/drawing/2010/main" xmlns="" w="9525">
                   <a:solidFill>
                     <a:srgbClr val="000000"/>
                   </a:solidFill>
@@ -10263,7 +10263,7 @@
           <a:noFill/>
           <a:extLst>
             <a:ext uri="{909E8E84-426E-40dd-AFC4-6F175D3DCCD1}">
-              <a14:hiddenFill xmlns="" xmlns:a14="http://schemas.microsoft.com/office/drawing/2010/main">
+              <a14:hiddenFill xmlns:a14="http://schemas.microsoft.com/office/drawing/2010/main" xmlns="">
                 <a:solidFill>
                   <a:srgbClr val="FFFFFF"/>
                 </a:solidFill>
@@ -10337,7 +10337,7 @@
               </a:ln>
               <a:extLst>
                 <a:ext uri="{91240B29-F687-4f45-9708-019B960494DF}">
-                  <a14:hiddenLine xmlns="" xmlns:a14="http://schemas.microsoft.com/office/drawing/2010/main" w="9525">
+                  <a14:hiddenLine xmlns:a14="http://schemas.microsoft.com/office/drawing/2010/main" xmlns="" w="9525">
                     <a:solidFill>
                       <a:srgbClr val="000000"/>
                     </a:solidFill>
@@ -10427,7 +10427,7 @@
               </a:ln>
               <a:extLst>
                 <a:ext uri="{91240B29-F687-4f45-9708-019B960494DF}">
-                  <a14:hiddenLine xmlns="" xmlns:a14="http://schemas.microsoft.com/office/drawing/2010/main" w="9525">
+                  <a14:hiddenLine xmlns:a14="http://schemas.microsoft.com/office/drawing/2010/main" xmlns="" w="9525">
                     <a:solidFill>
                       <a:srgbClr val="000000"/>
                     </a:solidFill>
@@ -10517,7 +10517,7 @@
               </a:ln>
               <a:extLst>
                 <a:ext uri="{91240B29-F687-4f45-9708-019B960494DF}">
-                  <a14:hiddenLine xmlns="" xmlns:a14="http://schemas.microsoft.com/office/drawing/2010/main" w="9525">
+                  <a14:hiddenLine xmlns:a14="http://schemas.microsoft.com/office/drawing/2010/main" xmlns="" w="9525">
                     <a:solidFill>
                       <a:srgbClr val="000000"/>
                     </a:solidFill>
@@ -10579,7 +10579,7 @@
               </a:ln>
               <a:extLst>
                 <a:ext uri="{91240B29-F687-4f45-9708-019B960494DF}">
-                  <a14:hiddenLine xmlns="" xmlns:a14="http://schemas.microsoft.com/office/drawing/2010/main" w="9525">
+                  <a14:hiddenLine xmlns:a14="http://schemas.microsoft.com/office/drawing/2010/main" xmlns="" w="9525">
                     <a:solidFill>
                       <a:srgbClr val="000000"/>
                     </a:solidFill>
@@ -10669,7 +10669,7 @@
               </a:ln>
               <a:extLst>
                 <a:ext uri="{91240B29-F687-4f45-9708-019B960494DF}">
-                  <a14:hiddenLine xmlns="" xmlns:a14="http://schemas.microsoft.com/office/drawing/2010/main" w="9525">
+                  <a14:hiddenLine xmlns:a14="http://schemas.microsoft.com/office/drawing/2010/main" xmlns="" w="9525">
                     <a:solidFill>
                       <a:srgbClr val="000000"/>
                     </a:solidFill>
@@ -10731,7 +10731,7 @@
               </a:ln>
               <a:extLst>
                 <a:ext uri="{91240B29-F687-4f45-9708-019B960494DF}">
-                  <a14:hiddenLine xmlns="" xmlns:a14="http://schemas.microsoft.com/office/drawing/2010/main" w="9525">
+                  <a14:hiddenLine xmlns:a14="http://schemas.microsoft.com/office/drawing/2010/main" xmlns="" w="9525">
                     <a:solidFill>
                       <a:srgbClr val="000000"/>
                     </a:solidFill>
@@ -10793,7 +10793,7 @@
               </a:ln>
               <a:extLst>
                 <a:ext uri="{91240B29-F687-4f45-9708-019B960494DF}">
-                  <a14:hiddenLine xmlns="" xmlns:a14="http://schemas.microsoft.com/office/drawing/2010/main" w="9525">
+                  <a14:hiddenLine xmlns:a14="http://schemas.microsoft.com/office/drawing/2010/main" xmlns="" w="9525">
                     <a:solidFill>
                       <a:srgbClr val="000000"/>
                     </a:solidFill>
@@ -10883,7 +10883,7 @@
               </a:ln>
               <a:extLst>
                 <a:ext uri="{91240B29-F687-4f45-9708-019B960494DF}">
-                  <a14:hiddenLine xmlns="" xmlns:a14="http://schemas.microsoft.com/office/drawing/2010/main" w="9525">
+                  <a14:hiddenLine xmlns:a14="http://schemas.microsoft.com/office/drawing/2010/main" xmlns="" w="9525">
                     <a:solidFill>
                       <a:srgbClr val="000000"/>
                     </a:solidFill>
@@ -10973,7 +10973,7 @@
               </a:ln>
               <a:extLst>
                 <a:ext uri="{91240B29-F687-4f45-9708-019B960494DF}">
-                  <a14:hiddenLine xmlns="" xmlns:a14="http://schemas.microsoft.com/office/drawing/2010/main" w="9525">
+                  <a14:hiddenLine xmlns:a14="http://schemas.microsoft.com/office/drawing/2010/main" xmlns="" w="9525">
                     <a:solidFill>
                       <a:srgbClr val="000000"/>
                     </a:solidFill>
@@ -11035,7 +11035,7 @@
               </a:ln>
               <a:extLst>
                 <a:ext uri="{91240B29-F687-4f45-9708-019B960494DF}">
-                  <a14:hiddenLine xmlns="" xmlns:a14="http://schemas.microsoft.com/office/drawing/2010/main" w="9525">
+                  <a14:hiddenLine xmlns:a14="http://schemas.microsoft.com/office/drawing/2010/main" xmlns="" w="9525">
                     <a:solidFill>
                       <a:srgbClr val="000000"/>
                     </a:solidFill>
@@ -11145,7 +11145,7 @@
               </a:ln>
               <a:extLst>
                 <a:ext uri="{91240B29-F687-4f45-9708-019B960494DF}">
-                  <a14:hiddenLine xmlns="" xmlns:a14="http://schemas.microsoft.com/office/drawing/2010/main" w="9525">
+                  <a14:hiddenLine xmlns:a14="http://schemas.microsoft.com/office/drawing/2010/main" xmlns="" w="9525">
                     <a:solidFill>
                       <a:srgbClr val="000000"/>
                     </a:solidFill>
@@ -11229,7 +11229,7 @@
               </a:ln>
               <a:extLst>
                 <a:ext uri="{91240B29-F687-4f45-9708-019B960494DF}">
-                  <a14:hiddenLine xmlns="" xmlns:a14="http://schemas.microsoft.com/office/drawing/2010/main" w="9525">
+                  <a14:hiddenLine xmlns:a14="http://schemas.microsoft.com/office/drawing/2010/main" xmlns="" w="9525">
                     <a:solidFill>
                       <a:srgbClr val="000000"/>
                     </a:solidFill>
@@ -11291,7 +11291,7 @@
               </a:ln>
               <a:extLst>
                 <a:ext uri="{91240B29-F687-4f45-9708-019B960494DF}">
-                  <a14:hiddenLine xmlns="" xmlns:a14="http://schemas.microsoft.com/office/drawing/2010/main" w="9525">
+                  <a14:hiddenLine xmlns:a14="http://schemas.microsoft.com/office/drawing/2010/main" xmlns="" w="9525">
                     <a:solidFill>
                       <a:srgbClr val="000000"/>
                     </a:solidFill>
@@ -11353,7 +11353,7 @@
               </a:ln>
               <a:extLst>
                 <a:ext uri="{91240B29-F687-4f45-9708-019B960494DF}">
-                  <a14:hiddenLine xmlns="" xmlns:a14="http://schemas.microsoft.com/office/drawing/2010/main" w="9525">
+                  <a14:hiddenLine xmlns:a14="http://schemas.microsoft.com/office/drawing/2010/main" xmlns="" w="9525">
                     <a:solidFill>
                       <a:srgbClr val="000000"/>
                     </a:solidFill>
@@ -11443,7 +11443,7 @@
               </a:ln>
               <a:extLst>
                 <a:ext uri="{91240B29-F687-4f45-9708-019B960494DF}">
-                  <a14:hiddenLine xmlns="" xmlns:a14="http://schemas.microsoft.com/office/drawing/2010/main" w="9525">
+                  <a14:hiddenLine xmlns:a14="http://schemas.microsoft.com/office/drawing/2010/main" xmlns="" w="9525">
                     <a:solidFill>
                       <a:srgbClr val="000000"/>
                     </a:solidFill>
@@ -11477,7 +11477,7 @@
               </a:ln>
               <a:extLst>
                 <a:ext uri="{91240B29-F687-4f45-9708-019B960494DF}">
-                  <a14:hiddenLine xmlns="" xmlns:a14="http://schemas.microsoft.com/office/drawing/2010/main" w="9525">
+                  <a14:hiddenLine xmlns:a14="http://schemas.microsoft.com/office/drawing/2010/main" xmlns="" w="9525">
                     <a:solidFill>
                       <a:srgbClr val="000000"/>
                     </a:solidFill>
@@ -11542,7 +11542,7 @@
               </a:ln>
               <a:extLst>
                 <a:ext uri="{91240B29-F687-4f45-9708-019B960494DF}">
-                  <a14:hiddenLine xmlns="" xmlns:a14="http://schemas.microsoft.com/office/drawing/2010/main" w="9525">
+                  <a14:hiddenLine xmlns:a14="http://schemas.microsoft.com/office/drawing/2010/main" xmlns="" w="9525">
                     <a:solidFill>
                       <a:srgbClr val="000000"/>
                     </a:solidFill>
@@ -11632,7 +11632,7 @@
               </a:ln>
               <a:extLst>
                 <a:ext uri="{91240B29-F687-4f45-9708-019B960494DF}">
-                  <a14:hiddenLine xmlns="" xmlns:a14="http://schemas.microsoft.com/office/drawing/2010/main" w="9525">
+                  <a14:hiddenLine xmlns:a14="http://schemas.microsoft.com/office/drawing/2010/main" xmlns="" w="9525">
                     <a:solidFill>
                       <a:srgbClr val="000000"/>
                     </a:solidFill>
@@ -11694,7 +11694,7 @@
               </a:ln>
               <a:extLst>
                 <a:ext uri="{91240B29-F687-4f45-9708-019B960494DF}">
-                  <a14:hiddenLine xmlns="" xmlns:a14="http://schemas.microsoft.com/office/drawing/2010/main" w="9525">
+                  <a14:hiddenLine xmlns:a14="http://schemas.microsoft.com/office/drawing/2010/main" xmlns="" w="9525">
                     <a:solidFill>
                       <a:srgbClr val="000000"/>
                     </a:solidFill>
@@ -11784,7 +11784,7 @@
               </a:ln>
               <a:extLst>
                 <a:ext uri="{91240B29-F687-4f45-9708-019B960494DF}">
-                  <a14:hiddenLine xmlns="" xmlns:a14="http://schemas.microsoft.com/office/drawing/2010/main" w="9525">
+                  <a14:hiddenLine xmlns:a14="http://schemas.microsoft.com/office/drawing/2010/main" xmlns="" w="9525">
                     <a:solidFill>
                       <a:srgbClr val="000000"/>
                     </a:solidFill>
@@ -11849,7 +11849,7 @@
               </a:ln>
               <a:extLst>
                 <a:ext uri="{91240B29-F687-4f45-9708-019B960494DF}">
-                  <a14:hiddenLine xmlns="" xmlns:a14="http://schemas.microsoft.com/office/drawing/2010/main" w="9525">
+                  <a14:hiddenLine xmlns:a14="http://schemas.microsoft.com/office/drawing/2010/main" xmlns="" w="9525">
                     <a:solidFill>
                       <a:srgbClr val="000000"/>
                     </a:solidFill>
@@ -11911,7 +11911,7 @@
               </a:ln>
               <a:extLst>
                 <a:ext uri="{91240B29-F687-4f45-9708-019B960494DF}">
-                  <a14:hiddenLine xmlns="" xmlns:a14="http://schemas.microsoft.com/office/drawing/2010/main" w="9525">
+                  <a14:hiddenLine xmlns:a14="http://schemas.microsoft.com/office/drawing/2010/main" xmlns="" w="9525">
                     <a:solidFill>
                       <a:srgbClr val="000000"/>
                     </a:solidFill>
@@ -12001,7 +12001,7 @@
               </a:ln>
               <a:extLst>
                 <a:ext uri="{91240B29-F687-4f45-9708-019B960494DF}">
-                  <a14:hiddenLine xmlns="" xmlns:a14="http://schemas.microsoft.com/office/drawing/2010/main" w="9525">
+                  <a14:hiddenLine xmlns:a14="http://schemas.microsoft.com/office/drawing/2010/main" xmlns="" w="9525">
                     <a:solidFill>
                       <a:srgbClr val="000000"/>
                     </a:solidFill>
@@ -12091,7 +12091,7 @@
               </a:ln>
               <a:extLst>
                 <a:ext uri="{91240B29-F687-4f45-9708-019B960494DF}">
-                  <a14:hiddenLine xmlns="" xmlns:a14="http://schemas.microsoft.com/office/drawing/2010/main" w="9525">
+                  <a14:hiddenLine xmlns:a14="http://schemas.microsoft.com/office/drawing/2010/main" xmlns="" w="9525">
                     <a:solidFill>
                       <a:srgbClr val="000000"/>
                     </a:solidFill>
@@ -12156,7 +12156,7 @@
               </a:ln>
               <a:extLst>
                 <a:ext uri="{91240B29-F687-4f45-9708-019B960494DF}">
-                  <a14:hiddenLine xmlns="" xmlns:a14="http://schemas.microsoft.com/office/drawing/2010/main" w="9525">
+                  <a14:hiddenLine xmlns:a14="http://schemas.microsoft.com/office/drawing/2010/main" xmlns="" w="9525">
                     <a:solidFill>
                       <a:srgbClr val="000000"/>
                     </a:solidFill>
@@ -12276,7 +12276,7 @@
               </a:ln>
               <a:extLst>
                 <a:ext uri="{91240B29-F687-4f45-9708-019B960494DF}">
-                  <a14:hiddenLine xmlns="" xmlns:a14="http://schemas.microsoft.com/office/drawing/2010/main" w="9525">
+                  <a14:hiddenLine xmlns:a14="http://schemas.microsoft.com/office/drawing/2010/main" xmlns="" w="9525">
                     <a:solidFill>
                       <a:srgbClr val="000000"/>
                     </a:solidFill>
@@ -12357,7 +12357,7 @@
               </a:ln>
               <a:extLst>
                 <a:ext uri="{91240B29-F687-4f45-9708-019B960494DF}">
-                  <a14:hiddenLine xmlns="" xmlns:a14="http://schemas.microsoft.com/office/drawing/2010/main" w="9525">
+                  <a14:hiddenLine xmlns:a14="http://schemas.microsoft.com/office/drawing/2010/main" xmlns="" w="9525">
                     <a:solidFill>
                       <a:srgbClr val="000000"/>
                     </a:solidFill>
@@ -12472,7 +12472,7 @@
               </a:ln>
               <a:extLst>
                 <a:ext uri="{91240B29-F687-4f45-9708-019B960494DF}">
-                  <a14:hiddenLine xmlns="" xmlns:a14="http://schemas.microsoft.com/office/drawing/2010/main" w="9525">
+                  <a14:hiddenLine xmlns:a14="http://schemas.microsoft.com/office/drawing/2010/main" xmlns="" w="9525">
                     <a:solidFill>
                       <a:srgbClr val="000000"/>
                     </a:solidFill>
@@ -12562,7 +12562,7 @@
               </a:ln>
               <a:extLst>
                 <a:ext uri="{91240B29-F687-4f45-9708-019B960494DF}">
-                  <a14:hiddenLine xmlns="" xmlns:a14="http://schemas.microsoft.com/office/drawing/2010/main" w="9525">
+                  <a14:hiddenLine xmlns:a14="http://schemas.microsoft.com/office/drawing/2010/main" xmlns="" w="9525">
                     <a:solidFill>
                       <a:srgbClr val="000000"/>
                     </a:solidFill>
@@ -12627,7 +12627,7 @@
               </a:ln>
               <a:extLst>
                 <a:ext uri="{91240B29-F687-4f45-9708-019B960494DF}">
-                  <a14:hiddenLine xmlns="" xmlns:a14="http://schemas.microsoft.com/office/drawing/2010/main" w="9525">
+                  <a14:hiddenLine xmlns:a14="http://schemas.microsoft.com/office/drawing/2010/main" xmlns="" w="9525">
                     <a:solidFill>
                       <a:srgbClr val="000000"/>
                     </a:solidFill>
@@ -12717,7 +12717,7 @@
               </a:ln>
               <a:extLst>
                 <a:ext uri="{91240B29-F687-4f45-9708-019B960494DF}">
-                  <a14:hiddenLine xmlns="" xmlns:a14="http://schemas.microsoft.com/office/drawing/2010/main" w="9525">
+                  <a14:hiddenLine xmlns:a14="http://schemas.microsoft.com/office/drawing/2010/main" xmlns="" w="9525">
                     <a:solidFill>
                       <a:srgbClr val="000000"/>
                     </a:solidFill>
@@ -12785,7 +12785,7 @@
               </a:ln>
               <a:extLst>
                 <a:ext uri="{91240B29-F687-4f45-9708-019B960494DF}">
-                  <a14:hiddenLine xmlns="" xmlns:a14="http://schemas.microsoft.com/office/drawing/2010/main" w="9525">
+                  <a14:hiddenLine xmlns:a14="http://schemas.microsoft.com/office/drawing/2010/main" xmlns="" w="9525">
                     <a:solidFill>
                       <a:srgbClr val="000000"/>
                     </a:solidFill>
@@ -12875,7 +12875,7 @@
               </a:ln>
               <a:extLst>
                 <a:ext uri="{91240B29-F687-4f45-9708-019B960494DF}">
-                  <a14:hiddenLine xmlns="" xmlns:a14="http://schemas.microsoft.com/office/drawing/2010/main" w="9525">
+                  <a14:hiddenLine xmlns:a14="http://schemas.microsoft.com/office/drawing/2010/main" xmlns="" w="9525">
                     <a:solidFill>
                       <a:srgbClr val="000000"/>
                     </a:solidFill>
@@ -12943,7 +12943,7 @@
               </a:ln>
               <a:extLst>
                 <a:ext uri="{91240B29-F687-4f45-9708-019B960494DF}">
-                  <a14:hiddenLine xmlns="" xmlns:a14="http://schemas.microsoft.com/office/drawing/2010/main" w="9525">
+                  <a14:hiddenLine xmlns:a14="http://schemas.microsoft.com/office/drawing/2010/main" xmlns="" w="9525">
                     <a:solidFill>
                       <a:srgbClr val="000000"/>
                     </a:solidFill>
@@ -13033,7 +13033,7 @@
               </a:ln>
               <a:extLst>
                 <a:ext uri="{91240B29-F687-4f45-9708-019B960494DF}">
-                  <a14:hiddenLine xmlns="" xmlns:a14="http://schemas.microsoft.com/office/drawing/2010/main" w="9525">
+                  <a14:hiddenLine xmlns:a14="http://schemas.microsoft.com/office/drawing/2010/main" xmlns="" w="9525">
                     <a:solidFill>
                       <a:srgbClr val="000000"/>
                     </a:solidFill>
@@ -13067,7 +13067,7 @@
               </a:ln>
               <a:extLst>
                 <a:ext uri="{91240B29-F687-4f45-9708-019B960494DF}">
-                  <a14:hiddenLine xmlns="" xmlns:a14="http://schemas.microsoft.com/office/drawing/2010/main" w="9525">
+                  <a14:hiddenLine xmlns:a14="http://schemas.microsoft.com/office/drawing/2010/main" xmlns="" w="9525">
                     <a:solidFill>
                       <a:srgbClr val="000000"/>
                     </a:solidFill>
@@ -14315,7 +14315,7 @@
           <a:noFill/>
           <a:extLst>
             <a:ext uri="{909E8E84-426E-40dd-AFC4-6F175D3DCCD1}">
-              <a14:hiddenFill xmlns="" xmlns:a16="http://schemas.microsoft.com/office/drawing/2014/main" xmlns:a14="http://schemas.microsoft.com/office/drawing/2010/main">
+              <a14:hiddenFill xmlns:a14="http://schemas.microsoft.com/office/drawing/2010/main" xmlns:a16="http://schemas.microsoft.com/office/drawing/2014/main" xmlns="">
                 <a:solidFill>
                   <a:srgbClr val="FFFFFF"/>
                 </a:solidFill>
@@ -14407,7 +14407,7 @@
             </a:ln>
             <a:extLst>
               <a:ext uri="{91240B29-F687-4f45-9708-019B960494DF}">
-                <a14:hiddenLine xmlns="" xmlns:a16="http://schemas.microsoft.com/office/drawing/2014/main" xmlns:a14="http://schemas.microsoft.com/office/drawing/2010/main" w="9525">
+                <a14:hiddenLine xmlns:a14="http://schemas.microsoft.com/office/drawing/2010/main" xmlns:a16="http://schemas.microsoft.com/office/drawing/2014/main" xmlns="" w="9525">
                   <a:solidFill>
                     <a:srgbClr val="000000"/>
                   </a:solidFill>
@@ -14512,7 +14512,7 @@
             </a:ln>
             <a:extLst>
               <a:ext uri="{91240B29-F687-4f45-9708-019B960494DF}">
-                <a14:hiddenLine xmlns="" xmlns:a16="http://schemas.microsoft.com/office/drawing/2014/main" xmlns:a14="http://schemas.microsoft.com/office/drawing/2010/main" w="9525">
+                <a14:hiddenLine xmlns:a14="http://schemas.microsoft.com/office/drawing/2010/main" xmlns:a16="http://schemas.microsoft.com/office/drawing/2014/main" xmlns="" w="9525">
                   <a:solidFill>
                     <a:srgbClr val="000000"/>
                   </a:solidFill>
@@ -14617,7 +14617,7 @@
             </a:ln>
             <a:extLst>
               <a:ext uri="{91240B29-F687-4f45-9708-019B960494DF}">
-                <a14:hiddenLine xmlns="" xmlns:a16="http://schemas.microsoft.com/office/drawing/2014/main" xmlns:a14="http://schemas.microsoft.com/office/drawing/2010/main" w="9525">
+                <a14:hiddenLine xmlns:a14="http://schemas.microsoft.com/office/drawing/2010/main" xmlns:a16="http://schemas.microsoft.com/office/drawing/2014/main" xmlns="" w="9525">
                   <a:solidFill>
                     <a:srgbClr val="000000"/>
                   </a:solidFill>
@@ -14666,7 +14666,7 @@
             </a:ln>
             <a:extLst>
               <a:ext uri="{91240B29-F687-4f45-9708-019B960494DF}">
-                <a14:hiddenLine xmlns="" xmlns:a16="http://schemas.microsoft.com/office/drawing/2014/main" xmlns:a14="http://schemas.microsoft.com/office/drawing/2010/main" w="9525">
+                <a14:hiddenLine xmlns:a14="http://schemas.microsoft.com/office/drawing/2010/main" xmlns:a16="http://schemas.microsoft.com/office/drawing/2014/main" xmlns="" w="9525">
                   <a:solidFill>
                     <a:srgbClr val="000000"/>
                   </a:solidFill>
@@ -14771,7 +14771,7 @@
             </a:ln>
             <a:extLst>
               <a:ext uri="{91240B29-F687-4f45-9708-019B960494DF}">
-                <a14:hiddenLine xmlns="" xmlns:a16="http://schemas.microsoft.com/office/drawing/2014/main" xmlns:a14="http://schemas.microsoft.com/office/drawing/2010/main" w="9525">
+                <a14:hiddenLine xmlns:a14="http://schemas.microsoft.com/office/drawing/2010/main" xmlns:a16="http://schemas.microsoft.com/office/drawing/2014/main" xmlns="" w="9525">
                   <a:solidFill>
                     <a:srgbClr val="000000"/>
                   </a:solidFill>
@@ -14848,7 +14848,7 @@
             </a:ln>
             <a:extLst>
               <a:ext uri="{91240B29-F687-4f45-9708-019B960494DF}">
-                <a14:hiddenLine xmlns="" xmlns:a16="http://schemas.microsoft.com/office/drawing/2014/main" xmlns:a14="http://schemas.microsoft.com/office/drawing/2010/main" w="9525">
+                <a14:hiddenLine xmlns:a14="http://schemas.microsoft.com/office/drawing/2010/main" xmlns:a16="http://schemas.microsoft.com/office/drawing/2014/main" xmlns="" w="9525">
                   <a:solidFill>
                     <a:srgbClr val="000000"/>
                   </a:solidFill>
@@ -14925,7 +14925,7 @@
             </a:ln>
             <a:extLst>
               <a:ext uri="{91240B29-F687-4f45-9708-019B960494DF}">
-                <a14:hiddenLine xmlns="" xmlns:a16="http://schemas.microsoft.com/office/drawing/2014/main" xmlns:a14="http://schemas.microsoft.com/office/drawing/2010/main" w="9525">
+                <a14:hiddenLine xmlns:a14="http://schemas.microsoft.com/office/drawing/2010/main" xmlns:a16="http://schemas.microsoft.com/office/drawing/2014/main" xmlns="" w="9525">
                   <a:solidFill>
                     <a:srgbClr val="000000"/>
                   </a:solidFill>
@@ -15030,7 +15030,7 @@
             </a:ln>
             <a:extLst>
               <a:ext uri="{91240B29-F687-4f45-9708-019B960494DF}">
-                <a14:hiddenLine xmlns="" xmlns:a16="http://schemas.microsoft.com/office/drawing/2014/main" xmlns:a14="http://schemas.microsoft.com/office/drawing/2010/main" w="9525">
+                <a14:hiddenLine xmlns:a14="http://schemas.microsoft.com/office/drawing/2010/main" xmlns:a16="http://schemas.microsoft.com/office/drawing/2014/main" xmlns="" w="9525">
                   <a:solidFill>
                     <a:srgbClr val="000000"/>
                   </a:solidFill>
@@ -15107,7 +15107,7 @@
             </a:ln>
             <a:extLst>
               <a:ext uri="{91240B29-F687-4f45-9708-019B960494DF}">
-                <a14:hiddenLine xmlns="" xmlns:a16="http://schemas.microsoft.com/office/drawing/2014/main" xmlns:a14="http://schemas.microsoft.com/office/drawing/2010/main" w="9525">
+                <a14:hiddenLine xmlns:a14="http://schemas.microsoft.com/office/drawing/2010/main" xmlns:a16="http://schemas.microsoft.com/office/drawing/2014/main" xmlns="" w="9525">
                   <a:solidFill>
                     <a:srgbClr val="000000"/>
                   </a:solidFill>
@@ -15184,7 +15184,7 @@
             </a:ln>
             <a:extLst>
               <a:ext uri="{91240B29-F687-4f45-9708-019B960494DF}">
-                <a14:hiddenLine xmlns="" xmlns:a16="http://schemas.microsoft.com/office/drawing/2014/main" xmlns:a14="http://schemas.microsoft.com/office/drawing/2010/main" w="9525">
+                <a14:hiddenLine xmlns:a14="http://schemas.microsoft.com/office/drawing/2010/main" xmlns:a16="http://schemas.microsoft.com/office/drawing/2014/main" xmlns="" w="9525">
                   <a:solidFill>
                     <a:srgbClr val="000000"/>
                   </a:solidFill>
@@ -15289,7 +15289,7 @@
             </a:ln>
             <a:extLst>
               <a:ext uri="{91240B29-F687-4f45-9708-019B960494DF}">
-                <a14:hiddenLine xmlns="" xmlns:a16="http://schemas.microsoft.com/office/drawing/2014/main" xmlns:a14="http://schemas.microsoft.com/office/drawing/2010/main" w="9525">
+                <a14:hiddenLine xmlns:a14="http://schemas.microsoft.com/office/drawing/2010/main" xmlns:a16="http://schemas.microsoft.com/office/drawing/2014/main" xmlns="" w="9525">
                   <a:solidFill>
                     <a:srgbClr val="000000"/>
                   </a:solidFill>
@@ -15394,7 +15394,7 @@
             </a:ln>
             <a:extLst>
               <a:ext uri="{91240B29-F687-4f45-9708-019B960494DF}">
-                <a14:hiddenLine xmlns="" xmlns:a16="http://schemas.microsoft.com/office/drawing/2014/main" xmlns:a14="http://schemas.microsoft.com/office/drawing/2010/main" w="9525">
+                <a14:hiddenLine xmlns:a14="http://schemas.microsoft.com/office/drawing/2010/main" xmlns:a16="http://schemas.microsoft.com/office/drawing/2014/main" xmlns="" w="9525">
                   <a:solidFill>
                     <a:srgbClr val="000000"/>
                   </a:solidFill>
@@ -15471,7 +15471,7 @@
             </a:ln>
             <a:extLst>
               <a:ext uri="{91240B29-F687-4f45-9708-019B960494DF}">
-                <a14:hiddenLine xmlns="" xmlns:a16="http://schemas.microsoft.com/office/drawing/2014/main" xmlns:a14="http://schemas.microsoft.com/office/drawing/2010/main" w="9525">
+                <a14:hiddenLine xmlns:a14="http://schemas.microsoft.com/office/drawing/2010/main" xmlns:a16="http://schemas.microsoft.com/office/drawing/2014/main" xmlns="" w="9525">
                   <a:solidFill>
                     <a:srgbClr val="000000"/>
                   </a:solidFill>
@@ -15596,7 +15596,7 @@
             </a:ln>
             <a:extLst>
               <a:ext uri="{91240B29-F687-4f45-9708-019B960494DF}">
-                <a14:hiddenLine xmlns="" xmlns:a16="http://schemas.microsoft.com/office/drawing/2014/main" xmlns:a14="http://schemas.microsoft.com/office/drawing/2010/main" w="9525">
+                <a14:hiddenLine xmlns:a14="http://schemas.microsoft.com/office/drawing/2010/main" xmlns:a16="http://schemas.microsoft.com/office/drawing/2014/main" xmlns="" w="9525">
                   <a:solidFill>
                     <a:srgbClr val="000000"/>
                   </a:solidFill>
@@ -15673,7 +15673,7 @@
             </a:ln>
             <a:extLst>
               <a:ext uri="{91240B29-F687-4f45-9708-019B960494DF}">
-                <a14:hiddenLine xmlns="" xmlns:a16="http://schemas.microsoft.com/office/drawing/2014/main" xmlns:a14="http://schemas.microsoft.com/office/drawing/2010/main" w="9525">
+                <a14:hiddenLine xmlns:a14="http://schemas.microsoft.com/office/drawing/2010/main" xmlns:a16="http://schemas.microsoft.com/office/drawing/2014/main" xmlns="" w="9525">
                   <a:solidFill>
                     <a:srgbClr val="000000"/>
                   </a:solidFill>
@@ -15778,7 +15778,7 @@
             </a:ln>
             <a:extLst>
               <a:ext uri="{91240B29-F687-4f45-9708-019B960494DF}">
-                <a14:hiddenLine xmlns="" xmlns:a16="http://schemas.microsoft.com/office/drawing/2014/main" xmlns:a14="http://schemas.microsoft.com/office/drawing/2010/main" w="9525">
+                <a14:hiddenLine xmlns:a14="http://schemas.microsoft.com/office/drawing/2010/main" xmlns:a16="http://schemas.microsoft.com/office/drawing/2014/main" xmlns="" w="9525">
                   <a:solidFill>
                     <a:srgbClr val="000000"/>
                   </a:solidFill>
@@ -15883,7 +15883,7 @@
             </a:ln>
             <a:extLst>
               <a:ext uri="{91240B29-F687-4f45-9708-019B960494DF}">
-                <a14:hiddenLine xmlns="" xmlns:a16="http://schemas.microsoft.com/office/drawing/2014/main" xmlns:a14="http://schemas.microsoft.com/office/drawing/2010/main" w="9525">
+                <a14:hiddenLine xmlns:a14="http://schemas.microsoft.com/office/drawing/2010/main" xmlns:a16="http://schemas.microsoft.com/office/drawing/2014/main" xmlns="" w="9525">
                   <a:solidFill>
                     <a:srgbClr val="000000"/>
                   </a:solidFill>
@@ -15960,7 +15960,7 @@
             </a:ln>
             <a:extLst>
               <a:ext uri="{91240B29-F687-4f45-9708-019B960494DF}">
-                <a14:hiddenLine xmlns="" xmlns:a16="http://schemas.microsoft.com/office/drawing/2014/main" xmlns:a14="http://schemas.microsoft.com/office/drawing/2010/main" w="9525">
+                <a14:hiddenLine xmlns:a14="http://schemas.microsoft.com/office/drawing/2010/main" xmlns:a16="http://schemas.microsoft.com/office/drawing/2014/main" xmlns="" w="9525">
                   <a:solidFill>
                     <a:srgbClr val="000000"/>
                   </a:solidFill>
@@ -16065,7 +16065,7 @@
             </a:ln>
             <a:extLst>
               <a:ext uri="{91240B29-F687-4f45-9708-019B960494DF}">
-                <a14:hiddenLine xmlns="" xmlns:a16="http://schemas.microsoft.com/office/drawing/2014/main" xmlns:a14="http://schemas.microsoft.com/office/drawing/2010/main" w="9525">
+                <a14:hiddenLine xmlns:a14="http://schemas.microsoft.com/office/drawing/2010/main" xmlns:a16="http://schemas.microsoft.com/office/drawing/2014/main" xmlns="" w="9525">
                   <a:solidFill>
                     <a:srgbClr val="000000"/>
                   </a:solidFill>
@@ -16170,7 +16170,7 @@
             </a:ln>
             <a:extLst>
               <a:ext uri="{91240B29-F687-4f45-9708-019B960494DF}">
-                <a14:hiddenLine xmlns="" xmlns:a16="http://schemas.microsoft.com/office/drawing/2014/main" xmlns:a14="http://schemas.microsoft.com/office/drawing/2010/main" w="9525">
+                <a14:hiddenLine xmlns:a14="http://schemas.microsoft.com/office/drawing/2010/main" xmlns:a16="http://schemas.microsoft.com/office/drawing/2014/main" xmlns="" w="9525">
                   <a:solidFill>
                     <a:srgbClr val="000000"/>
                   </a:solidFill>
@@ -16241,7 +16241,7 @@
             </a:ln>
             <a:extLst>
               <a:ext uri="{91240B29-F687-4f45-9708-019B960494DF}">
-                <a14:hiddenLine xmlns="" xmlns:a16="http://schemas.microsoft.com/office/drawing/2014/main" xmlns:a14="http://schemas.microsoft.com/office/drawing/2010/main" w="9525">
+                <a14:hiddenLine xmlns:a14="http://schemas.microsoft.com/office/drawing/2010/main" xmlns:a16="http://schemas.microsoft.com/office/drawing/2014/main" xmlns="" w="9525">
                   <a:solidFill>
                     <a:srgbClr val="000000"/>
                   </a:solidFill>
@@ -16346,7 +16346,7 @@
             </a:ln>
             <a:extLst>
               <a:ext uri="{91240B29-F687-4f45-9708-019B960494DF}">
-                <a14:hiddenLine xmlns="" xmlns:a16="http://schemas.microsoft.com/office/drawing/2014/main" xmlns:a14="http://schemas.microsoft.com/office/drawing/2010/main" w="9525">
+                <a14:hiddenLine xmlns:a14="http://schemas.microsoft.com/office/drawing/2010/main" xmlns:a16="http://schemas.microsoft.com/office/drawing/2014/main" xmlns="" w="9525">
                   <a:solidFill>
                     <a:srgbClr val="000000"/>
                   </a:solidFill>
@@ -16417,7 +16417,7 @@
             </a:ln>
             <a:extLst>
               <a:ext uri="{91240B29-F687-4f45-9708-019B960494DF}">
-                <a14:hiddenLine xmlns="" xmlns:a16="http://schemas.microsoft.com/office/drawing/2014/main" xmlns:a14="http://schemas.microsoft.com/office/drawing/2010/main" w="9525">
+                <a14:hiddenLine xmlns:a14="http://schemas.microsoft.com/office/drawing/2010/main" xmlns:a16="http://schemas.microsoft.com/office/drawing/2014/main" xmlns="" w="9525">
                   <a:solidFill>
                     <a:srgbClr val="000000"/>
                   </a:solidFill>
@@ -16522,7 +16522,7 @@
             </a:ln>
             <a:extLst>
               <a:ext uri="{91240B29-F687-4f45-9708-019B960494DF}">
-                <a14:hiddenLine xmlns="" xmlns:a16="http://schemas.microsoft.com/office/drawing/2014/main" xmlns:a14="http://schemas.microsoft.com/office/drawing/2010/main" w="9525">
+                <a14:hiddenLine xmlns:a14="http://schemas.microsoft.com/office/drawing/2010/main" xmlns:a16="http://schemas.microsoft.com/office/drawing/2014/main" xmlns="" w="9525">
                   <a:solidFill>
                     <a:srgbClr val="000000"/>
                   </a:solidFill>
@@ -16605,7 +16605,7 @@
             </a:ln>
             <a:extLst>
               <a:ext uri="{91240B29-F687-4f45-9708-019B960494DF}">
-                <a14:hiddenLine xmlns="" xmlns:a16="http://schemas.microsoft.com/office/drawing/2014/main" xmlns:a14="http://schemas.microsoft.com/office/drawing/2010/main" w="9525">
+                <a14:hiddenLine xmlns:a14="http://schemas.microsoft.com/office/drawing/2010/main" xmlns:a16="http://schemas.microsoft.com/office/drawing/2014/main" xmlns="" w="9525">
                   <a:solidFill>
                     <a:srgbClr val="000000"/>
                   </a:solidFill>
@@ -16710,7 +16710,7 @@
             </a:ln>
             <a:extLst>
               <a:ext uri="{91240B29-F687-4f45-9708-019B960494DF}">
-                <a14:hiddenLine xmlns="" xmlns:a16="http://schemas.microsoft.com/office/drawing/2014/main" xmlns:a14="http://schemas.microsoft.com/office/drawing/2010/main" w="9525">
+                <a14:hiddenLine xmlns:a14="http://schemas.microsoft.com/office/drawing/2010/main" xmlns:a16="http://schemas.microsoft.com/office/drawing/2014/main" xmlns="" w="9525">
                   <a:solidFill>
                     <a:srgbClr val="000000"/>
                   </a:solidFill>
@@ -16793,7 +16793,7 @@
             </a:ln>
             <a:extLst>
               <a:ext uri="{91240B29-F687-4f45-9708-019B960494DF}">
-                <a14:hiddenLine xmlns="" xmlns:a16="http://schemas.microsoft.com/office/drawing/2014/main" xmlns:a14="http://schemas.microsoft.com/office/drawing/2010/main" w="9525">
+                <a14:hiddenLine xmlns:a14="http://schemas.microsoft.com/office/drawing/2010/main" xmlns:a16="http://schemas.microsoft.com/office/drawing/2014/main" xmlns="" w="9525">
                   <a:solidFill>
                     <a:srgbClr val="000000"/>
                   </a:solidFill>
@@ -16898,7 +16898,7 @@
             </a:ln>
             <a:extLst>
               <a:ext uri="{91240B29-F687-4f45-9708-019B960494DF}">
-                <a14:hiddenLine xmlns="" xmlns:a16="http://schemas.microsoft.com/office/drawing/2014/main" xmlns:a14="http://schemas.microsoft.com/office/drawing/2010/main" w="9525">
+                <a14:hiddenLine xmlns:a14="http://schemas.microsoft.com/office/drawing/2010/main" xmlns:a16="http://schemas.microsoft.com/office/drawing/2014/main" xmlns="" w="9525">
                   <a:solidFill>
                     <a:srgbClr val="000000"/>
                   </a:solidFill>
@@ -16947,7 +16947,7 @@
             </a:ln>
             <a:extLst>
               <a:ext uri="{91240B29-F687-4f45-9708-019B960494DF}">
-                <a14:hiddenLine xmlns="" xmlns:a16="http://schemas.microsoft.com/office/drawing/2014/main" xmlns:a14="http://schemas.microsoft.com/office/drawing/2010/main" w="9525">
+                <a14:hiddenLine xmlns:a14="http://schemas.microsoft.com/office/drawing/2010/main" xmlns:a16="http://schemas.microsoft.com/office/drawing/2014/main" xmlns="" w="9525">
                   <a:solidFill>
                     <a:srgbClr val="000000"/>
                   </a:solidFill>
@@ -17052,7 +17052,7 @@
             </a:ln>
             <a:extLst>
               <a:ext uri="{91240B29-F687-4f45-9708-019B960494DF}">
-                <a14:hiddenLine xmlns="" xmlns:a16="http://schemas.microsoft.com/office/drawing/2014/main" xmlns:a14="http://schemas.microsoft.com/office/drawing/2010/main" w="9525">
+                <a14:hiddenLine xmlns:a14="http://schemas.microsoft.com/office/drawing/2010/main" xmlns:a16="http://schemas.microsoft.com/office/drawing/2014/main" xmlns="" w="9525">
                   <a:solidFill>
                     <a:srgbClr val="000000"/>
                   </a:solidFill>
@@ -17129,7 +17129,7 @@
             </a:ln>
             <a:extLst>
               <a:ext uri="{91240B29-F687-4f45-9708-019B960494DF}">
-                <a14:hiddenLine xmlns="" xmlns:a16="http://schemas.microsoft.com/office/drawing/2014/main" xmlns:a14="http://schemas.microsoft.com/office/drawing/2010/main" w="9525">
+                <a14:hiddenLine xmlns:a14="http://schemas.microsoft.com/office/drawing/2010/main" xmlns:a16="http://schemas.microsoft.com/office/drawing/2014/main" xmlns="" w="9525">
                   <a:solidFill>
                     <a:srgbClr val="000000"/>
                   </a:solidFill>
@@ -17206,7 +17206,7 @@
             </a:ln>
             <a:extLst>
               <a:ext uri="{91240B29-F687-4f45-9708-019B960494DF}">
-                <a14:hiddenLine xmlns="" xmlns:a16="http://schemas.microsoft.com/office/drawing/2014/main" xmlns:a14="http://schemas.microsoft.com/office/drawing/2010/main" w="9525">
+                <a14:hiddenLine xmlns:a14="http://schemas.microsoft.com/office/drawing/2010/main" xmlns:a16="http://schemas.microsoft.com/office/drawing/2014/main" xmlns="" w="9525">
                   <a:solidFill>
                     <a:srgbClr val="000000"/>
                   </a:solidFill>
@@ -17311,7 +17311,7 @@
             </a:ln>
             <a:extLst>
               <a:ext uri="{91240B29-F687-4f45-9708-019B960494DF}">
-                <a14:hiddenLine xmlns="" xmlns:a16="http://schemas.microsoft.com/office/drawing/2014/main" xmlns:a14="http://schemas.microsoft.com/office/drawing/2010/main" w="9525">
+                <a14:hiddenLine xmlns:a14="http://schemas.microsoft.com/office/drawing/2010/main" xmlns:a16="http://schemas.microsoft.com/office/drawing/2014/main" xmlns="" w="9525">
                   <a:solidFill>
                     <a:srgbClr val="000000"/>
                   </a:solidFill>
@@ -17394,7 +17394,7 @@
             </a:ln>
             <a:extLst>
               <a:ext uri="{91240B29-F687-4f45-9708-019B960494DF}">
-                <a14:hiddenLine xmlns="" xmlns:a16="http://schemas.microsoft.com/office/drawing/2014/main" xmlns:a14="http://schemas.microsoft.com/office/drawing/2010/main" w="9525">
+                <a14:hiddenLine xmlns:a14="http://schemas.microsoft.com/office/drawing/2010/main" xmlns:a16="http://schemas.microsoft.com/office/drawing/2014/main" xmlns="" w="9525">
                   <a:solidFill>
                     <a:srgbClr val="000000"/>
                   </a:solidFill>
@@ -17471,7 +17471,7 @@
             </a:ln>
             <a:extLst>
               <a:ext uri="{91240B29-F687-4f45-9708-019B960494DF}">
-                <a14:hiddenLine xmlns="" xmlns:a16="http://schemas.microsoft.com/office/drawing/2014/main" xmlns:a14="http://schemas.microsoft.com/office/drawing/2010/main" w="9525">
+                <a14:hiddenLine xmlns:a14="http://schemas.microsoft.com/office/drawing/2010/main" xmlns:a16="http://schemas.microsoft.com/office/drawing/2014/main" xmlns="" w="9525">
                   <a:solidFill>
                     <a:srgbClr val="000000"/>
                   </a:solidFill>
@@ -17576,7 +17576,7 @@
             </a:ln>
             <a:extLst>
               <a:ext uri="{91240B29-F687-4f45-9708-019B960494DF}">
-                <a14:hiddenLine xmlns="" xmlns:a16="http://schemas.microsoft.com/office/drawing/2014/main" xmlns:a14="http://schemas.microsoft.com/office/drawing/2010/main" w="9525">
+                <a14:hiddenLine xmlns:a14="http://schemas.microsoft.com/office/drawing/2010/main" xmlns:a16="http://schemas.microsoft.com/office/drawing/2014/main" xmlns="" w="9525">
                   <a:solidFill>
                     <a:srgbClr val="000000"/>
                   </a:solidFill>
@@ -17653,7 +17653,7 @@
             </a:ln>
             <a:extLst>
               <a:ext uri="{91240B29-F687-4f45-9708-019B960494DF}">
-                <a14:hiddenLine xmlns="" xmlns:a16="http://schemas.microsoft.com/office/drawing/2014/main" xmlns:a14="http://schemas.microsoft.com/office/drawing/2010/main" w="9525">
+                <a14:hiddenLine xmlns:a14="http://schemas.microsoft.com/office/drawing/2010/main" xmlns:a16="http://schemas.microsoft.com/office/drawing/2014/main" xmlns="" w="9525">
                   <a:solidFill>
                     <a:srgbClr val="000000"/>
                   </a:solidFill>
@@ -17758,7 +17758,7 @@
             </a:ln>
             <a:extLst>
               <a:ext uri="{91240B29-F687-4f45-9708-019B960494DF}">
-                <a14:hiddenLine xmlns="" xmlns:a16="http://schemas.microsoft.com/office/drawing/2014/main" xmlns:a14="http://schemas.microsoft.com/office/drawing/2010/main" w="9525">
+                <a14:hiddenLine xmlns:a14="http://schemas.microsoft.com/office/drawing/2010/main" xmlns:a16="http://schemas.microsoft.com/office/drawing/2014/main" xmlns="" w="9525">
                   <a:solidFill>
                     <a:srgbClr val="000000"/>
                   </a:solidFill>
@@ -17835,7 +17835,7 @@
             </a:ln>
             <a:extLst>
               <a:ext uri="{91240B29-F687-4f45-9708-019B960494DF}">
-                <a14:hiddenLine xmlns="" xmlns:a16="http://schemas.microsoft.com/office/drawing/2014/main" xmlns:a14="http://schemas.microsoft.com/office/drawing/2010/main" w="9525">
+                <a14:hiddenLine xmlns:a14="http://schemas.microsoft.com/office/drawing/2010/main" xmlns:a16="http://schemas.microsoft.com/office/drawing/2014/main" xmlns="" w="9525">
                   <a:solidFill>
                     <a:srgbClr val="000000"/>
                   </a:solidFill>
@@ -17940,7 +17940,7 @@
             </a:ln>
             <a:extLst>
               <a:ext uri="{91240B29-F687-4f45-9708-019B960494DF}">
-                <a14:hiddenLine xmlns="" xmlns:a16="http://schemas.microsoft.com/office/drawing/2014/main" xmlns:a14="http://schemas.microsoft.com/office/drawing/2010/main" w="9525">
+                <a14:hiddenLine xmlns:a14="http://schemas.microsoft.com/office/drawing/2010/main" xmlns:a16="http://schemas.microsoft.com/office/drawing/2014/main" xmlns="" w="9525">
                   <a:solidFill>
                     <a:srgbClr val="000000"/>
                   </a:solidFill>
@@ -17989,7 +17989,7 @@
             </a:ln>
             <a:extLst>
               <a:ext uri="{91240B29-F687-4f45-9708-019B960494DF}">
-                <a14:hiddenLine xmlns="" xmlns:a16="http://schemas.microsoft.com/office/drawing/2014/main" xmlns:a14="http://schemas.microsoft.com/office/drawing/2010/main" w="9525">
+                <a14:hiddenLine xmlns:a14="http://schemas.microsoft.com/office/drawing/2010/main" xmlns:a16="http://schemas.microsoft.com/office/drawing/2014/main" xmlns="" w="9525">
                   <a:solidFill>
                     <a:srgbClr val="000000"/>
                   </a:solidFill>
@@ -18069,7 +18069,7 @@
             </a:ln>
             <a:extLst>
               <a:ext uri="{91240B29-F687-4f45-9708-019B960494DF}">
-                <a14:hiddenLine xmlns="" xmlns:a16="http://schemas.microsoft.com/office/drawing/2014/main" xmlns:a14="http://schemas.microsoft.com/office/drawing/2010/main" w="9525">
+                <a14:hiddenLine xmlns:a14="http://schemas.microsoft.com/office/drawing/2010/main" xmlns:a16="http://schemas.microsoft.com/office/drawing/2014/main" xmlns="" w="9525">
                   <a:solidFill>
                     <a:srgbClr val="000000"/>
                   </a:solidFill>
@@ -18174,7 +18174,7 @@
             </a:ln>
             <a:extLst>
               <a:ext uri="{91240B29-F687-4f45-9708-019B960494DF}">
-                <a14:hiddenLine xmlns="" xmlns:a16="http://schemas.microsoft.com/office/drawing/2014/main" xmlns:a14="http://schemas.microsoft.com/office/drawing/2010/main" w="9525">
+                <a14:hiddenLine xmlns:a14="http://schemas.microsoft.com/office/drawing/2010/main" xmlns:a16="http://schemas.microsoft.com/office/drawing/2014/main" xmlns="" w="9525">
                   <a:solidFill>
                     <a:srgbClr val="000000"/>
                   </a:solidFill>
@@ -18251,7 +18251,7 @@
             </a:ln>
             <a:extLst>
               <a:ext uri="{91240B29-F687-4f45-9708-019B960494DF}">
-                <a14:hiddenLine xmlns="" xmlns:a16="http://schemas.microsoft.com/office/drawing/2014/main" xmlns:a14="http://schemas.microsoft.com/office/drawing/2010/main" w="9525">
+                <a14:hiddenLine xmlns:a14="http://schemas.microsoft.com/office/drawing/2010/main" xmlns:a16="http://schemas.microsoft.com/office/drawing/2014/main" xmlns="" w="9525">
                   <a:solidFill>
                     <a:srgbClr val="000000"/>
                   </a:solidFill>
@@ -18356,7 +18356,7 @@
             </a:ln>
             <a:extLst>
               <a:ext uri="{91240B29-F687-4f45-9708-019B960494DF}">
-                <a14:hiddenLine xmlns="" xmlns:a16="http://schemas.microsoft.com/office/drawing/2014/main" xmlns:a14="http://schemas.microsoft.com/office/drawing/2010/main" w="9525">
+                <a14:hiddenLine xmlns:a14="http://schemas.microsoft.com/office/drawing/2010/main" xmlns:a16="http://schemas.microsoft.com/office/drawing/2014/main" xmlns="" w="9525">
                   <a:solidFill>
                     <a:srgbClr val="000000"/>
                   </a:solidFill>
@@ -18461,7 +18461,7 @@
             </a:ln>
             <a:extLst>
               <a:ext uri="{91240B29-F687-4f45-9708-019B960494DF}">
-                <a14:hiddenLine xmlns="" xmlns:a16="http://schemas.microsoft.com/office/drawing/2014/main" xmlns:a14="http://schemas.microsoft.com/office/drawing/2010/main" w="9525">
+                <a14:hiddenLine xmlns:a14="http://schemas.microsoft.com/office/drawing/2010/main" xmlns:a16="http://schemas.microsoft.com/office/drawing/2014/main" xmlns="" w="9525">
                   <a:solidFill>
                     <a:srgbClr val="000000"/>
                   </a:solidFill>
@@ -18541,7 +18541,7 @@
             </a:ln>
             <a:extLst>
               <a:ext uri="{91240B29-F687-4f45-9708-019B960494DF}">
-                <a14:hiddenLine xmlns="" xmlns:a16="http://schemas.microsoft.com/office/drawing/2014/main" xmlns:a14="http://schemas.microsoft.com/office/drawing/2010/main" w="9525">
+                <a14:hiddenLine xmlns:a14="http://schemas.microsoft.com/office/drawing/2010/main" xmlns:a16="http://schemas.microsoft.com/office/drawing/2014/main" xmlns="" w="9525">
                   <a:solidFill>
                     <a:srgbClr val="000000"/>
                   </a:solidFill>
@@ -18618,7 +18618,7 @@
             </a:ln>
             <a:extLst>
               <a:ext uri="{91240B29-F687-4f45-9708-019B960494DF}">
-                <a14:hiddenLine xmlns="" xmlns:a16="http://schemas.microsoft.com/office/drawing/2014/main" xmlns:a14="http://schemas.microsoft.com/office/drawing/2010/main" w="9525">
+                <a14:hiddenLine xmlns:a14="http://schemas.microsoft.com/office/drawing/2010/main" xmlns:a16="http://schemas.microsoft.com/office/drawing/2014/main" xmlns="" w="9525">
                   <a:solidFill>
                     <a:srgbClr val="000000"/>
                   </a:solidFill>
@@ -18723,7 +18723,7 @@
             </a:ln>
             <a:extLst>
               <a:ext uri="{91240B29-F687-4f45-9708-019B960494DF}">
-                <a14:hiddenLine xmlns="" xmlns:a16="http://schemas.microsoft.com/office/drawing/2014/main" xmlns:a14="http://schemas.microsoft.com/office/drawing/2010/main" w="9525">
+                <a14:hiddenLine xmlns:a14="http://schemas.microsoft.com/office/drawing/2010/main" xmlns:a16="http://schemas.microsoft.com/office/drawing/2014/main" xmlns="" w="9525">
                   <a:solidFill>
                     <a:srgbClr val="000000"/>
                   </a:solidFill>
@@ -18828,7 +18828,7 @@
             </a:ln>
             <a:extLst>
               <a:ext uri="{91240B29-F687-4f45-9708-019B960494DF}">
-                <a14:hiddenLine xmlns="" xmlns:a16="http://schemas.microsoft.com/office/drawing/2014/main" xmlns:a14="http://schemas.microsoft.com/office/drawing/2010/main" w="9525">
+                <a14:hiddenLine xmlns:a14="http://schemas.microsoft.com/office/drawing/2010/main" xmlns:a16="http://schemas.microsoft.com/office/drawing/2014/main" xmlns="" w="9525">
                   <a:solidFill>
                     <a:srgbClr val="000000"/>
                   </a:solidFill>
@@ -18905,7 +18905,7 @@
             </a:ln>
             <a:extLst>
               <a:ext uri="{91240B29-F687-4f45-9708-019B960494DF}">
-                <a14:hiddenLine xmlns="" xmlns:a16="http://schemas.microsoft.com/office/drawing/2014/main" xmlns:a14="http://schemas.microsoft.com/office/drawing/2010/main" w="9525">
+                <a14:hiddenLine xmlns:a14="http://schemas.microsoft.com/office/drawing/2010/main" xmlns:a16="http://schemas.microsoft.com/office/drawing/2014/main" xmlns="" w="9525">
                   <a:solidFill>
                     <a:srgbClr val="000000"/>
                   </a:solidFill>
@@ -19040,7 +19040,7 @@
             </a:ln>
             <a:extLst>
               <a:ext uri="{91240B29-F687-4f45-9708-019B960494DF}">
-                <a14:hiddenLine xmlns="" xmlns:a16="http://schemas.microsoft.com/office/drawing/2014/main" xmlns:a14="http://schemas.microsoft.com/office/drawing/2010/main" w="9525">
+                <a14:hiddenLine xmlns:a14="http://schemas.microsoft.com/office/drawing/2010/main" xmlns:a16="http://schemas.microsoft.com/office/drawing/2014/main" xmlns="" w="9525">
                   <a:solidFill>
                     <a:srgbClr val="000000"/>
                   </a:solidFill>
@@ -19123,7 +19123,7 @@
             </a:ln>
             <a:extLst>
               <a:ext uri="{91240B29-F687-4f45-9708-019B960494DF}">
-                <a14:hiddenLine xmlns="" xmlns:a16="http://schemas.microsoft.com/office/drawing/2014/main" xmlns:a14="http://schemas.microsoft.com/office/drawing/2010/main" w="9525">
+                <a14:hiddenLine xmlns:a14="http://schemas.microsoft.com/office/drawing/2010/main" xmlns:a16="http://schemas.microsoft.com/office/drawing/2014/main" xmlns="" w="9525">
                   <a:solidFill>
                     <a:srgbClr val="000000"/>
                   </a:solidFill>
@@ -19228,7 +19228,7 @@
             </a:ln>
             <a:extLst>
               <a:ext uri="{91240B29-F687-4f45-9708-019B960494DF}">
-                <a14:hiddenLine xmlns="" xmlns:a16="http://schemas.microsoft.com/office/drawing/2014/main" xmlns:a14="http://schemas.microsoft.com/office/drawing/2010/main" w="9525">
+                <a14:hiddenLine xmlns:a14="http://schemas.microsoft.com/office/drawing/2010/main" xmlns:a16="http://schemas.microsoft.com/office/drawing/2014/main" xmlns="" w="9525">
                   <a:solidFill>
                     <a:srgbClr val="000000"/>
                   </a:solidFill>
@@ -19422,7 +19422,7 @@
             </a:ln>
             <a:extLst>
               <a:ext uri="{91240B29-F687-4f45-9708-019B960494DF}">
-                <a14:hiddenLine xmlns="" xmlns:a16="http://schemas.microsoft.com/office/drawing/2014/main" xmlns:p14="http://schemas.microsoft.com/office/powerpoint/2010/main" xmlns:a14="http://schemas.microsoft.com/office/drawing/2010/main" w="9525">
+                <a14:hiddenLine xmlns:a14="http://schemas.microsoft.com/office/drawing/2010/main" xmlns:p14="http://schemas.microsoft.com/office/powerpoint/2010/main" xmlns:a16="http://schemas.microsoft.com/office/drawing/2014/main" xmlns="" w="9525">
                   <a:solidFill>
                     <a:srgbClr val="000000"/>
                   </a:solidFill>
@@ -19527,7 +19527,7 @@
             </a:ln>
             <a:extLst>
               <a:ext uri="{91240B29-F687-4f45-9708-019B960494DF}">
-                <a14:hiddenLine xmlns="" xmlns:a16="http://schemas.microsoft.com/office/drawing/2014/main" xmlns:p14="http://schemas.microsoft.com/office/powerpoint/2010/main" xmlns:a14="http://schemas.microsoft.com/office/drawing/2010/main" w="9525">
+                <a14:hiddenLine xmlns:a14="http://schemas.microsoft.com/office/drawing/2010/main" xmlns:p14="http://schemas.microsoft.com/office/powerpoint/2010/main" xmlns:a16="http://schemas.microsoft.com/office/drawing/2014/main" xmlns="" w="9525">
                   <a:solidFill>
                     <a:srgbClr val="000000"/>
                   </a:solidFill>
@@ -19632,7 +19632,7 @@
             </a:ln>
             <a:extLst>
               <a:ext uri="{91240B29-F687-4f45-9708-019B960494DF}">
-                <a14:hiddenLine xmlns="" xmlns:a16="http://schemas.microsoft.com/office/drawing/2014/main" xmlns:p14="http://schemas.microsoft.com/office/powerpoint/2010/main" xmlns:a14="http://schemas.microsoft.com/office/drawing/2010/main" w="9525">
+                <a14:hiddenLine xmlns:a14="http://schemas.microsoft.com/office/drawing/2010/main" xmlns:p14="http://schemas.microsoft.com/office/powerpoint/2010/main" xmlns:a16="http://schemas.microsoft.com/office/drawing/2014/main" xmlns="" w="9525">
                   <a:solidFill>
                     <a:srgbClr val="000000"/>
                   </a:solidFill>
@@ -19681,7 +19681,7 @@
             </a:ln>
             <a:extLst>
               <a:ext uri="{91240B29-F687-4f45-9708-019B960494DF}">
-                <a14:hiddenLine xmlns="" xmlns:a16="http://schemas.microsoft.com/office/drawing/2014/main" xmlns:p14="http://schemas.microsoft.com/office/powerpoint/2010/main" xmlns:a14="http://schemas.microsoft.com/office/drawing/2010/main" w="9525">
+                <a14:hiddenLine xmlns:a14="http://schemas.microsoft.com/office/drawing/2010/main" xmlns:p14="http://schemas.microsoft.com/office/powerpoint/2010/main" xmlns:a16="http://schemas.microsoft.com/office/drawing/2014/main" xmlns="" w="9525">
                   <a:solidFill>
                     <a:srgbClr val="000000"/>
                   </a:solidFill>
@@ -19786,7 +19786,7 @@
             </a:ln>
             <a:extLst>
               <a:ext uri="{91240B29-F687-4f45-9708-019B960494DF}">
-                <a14:hiddenLine xmlns="" xmlns:a16="http://schemas.microsoft.com/office/drawing/2014/main" xmlns:p14="http://schemas.microsoft.com/office/powerpoint/2010/main" xmlns:a14="http://schemas.microsoft.com/office/drawing/2010/main" w="9525">
+                <a14:hiddenLine xmlns:a14="http://schemas.microsoft.com/office/drawing/2010/main" xmlns:p14="http://schemas.microsoft.com/office/powerpoint/2010/main" xmlns:a16="http://schemas.microsoft.com/office/drawing/2014/main" xmlns="" w="9525">
                   <a:solidFill>
                     <a:srgbClr val="000000"/>
                   </a:solidFill>
@@ -19863,7 +19863,7 @@
             </a:ln>
             <a:extLst>
               <a:ext uri="{91240B29-F687-4f45-9708-019B960494DF}">
-                <a14:hiddenLine xmlns="" xmlns:a16="http://schemas.microsoft.com/office/drawing/2014/main" xmlns:p14="http://schemas.microsoft.com/office/powerpoint/2010/main" xmlns:a14="http://schemas.microsoft.com/office/drawing/2010/main" w="9525">
+                <a14:hiddenLine xmlns:a14="http://schemas.microsoft.com/office/drawing/2010/main" xmlns:p14="http://schemas.microsoft.com/office/powerpoint/2010/main" xmlns:a16="http://schemas.microsoft.com/office/drawing/2014/main" xmlns="" w="9525">
                   <a:solidFill>
                     <a:srgbClr val="000000"/>
                   </a:solidFill>
@@ -19940,7 +19940,7 @@
             </a:ln>
             <a:extLst>
               <a:ext uri="{91240B29-F687-4f45-9708-019B960494DF}">
-                <a14:hiddenLine xmlns="" xmlns:a16="http://schemas.microsoft.com/office/drawing/2014/main" xmlns:p14="http://schemas.microsoft.com/office/powerpoint/2010/main" xmlns:a14="http://schemas.microsoft.com/office/drawing/2010/main" w="9525">
+                <a14:hiddenLine xmlns:a14="http://schemas.microsoft.com/office/drawing/2010/main" xmlns:p14="http://schemas.microsoft.com/office/powerpoint/2010/main" xmlns:a16="http://schemas.microsoft.com/office/drawing/2014/main" xmlns="" w="9525">
                   <a:solidFill>
                     <a:srgbClr val="000000"/>
                   </a:solidFill>
@@ -20045,7 +20045,7 @@
             </a:ln>
             <a:extLst>
               <a:ext uri="{91240B29-F687-4f45-9708-019B960494DF}">
-                <a14:hiddenLine xmlns="" xmlns:a16="http://schemas.microsoft.com/office/drawing/2014/main" xmlns:p14="http://schemas.microsoft.com/office/powerpoint/2010/main" xmlns:a14="http://schemas.microsoft.com/office/drawing/2010/main" w="9525">
+                <a14:hiddenLine xmlns:a14="http://schemas.microsoft.com/office/drawing/2010/main" xmlns:p14="http://schemas.microsoft.com/office/powerpoint/2010/main" xmlns:a16="http://schemas.microsoft.com/office/drawing/2014/main" xmlns="" w="9525">
                   <a:solidFill>
                     <a:srgbClr val="000000"/>
                   </a:solidFill>
@@ -20122,7 +20122,7 @@
             </a:ln>
             <a:extLst>
               <a:ext uri="{91240B29-F687-4f45-9708-019B960494DF}">
-                <a14:hiddenLine xmlns="" xmlns:a16="http://schemas.microsoft.com/office/drawing/2014/main" xmlns:p14="http://schemas.microsoft.com/office/powerpoint/2010/main" xmlns:a14="http://schemas.microsoft.com/office/drawing/2010/main" w="9525">
+                <a14:hiddenLine xmlns:a14="http://schemas.microsoft.com/office/drawing/2010/main" xmlns:p14="http://schemas.microsoft.com/office/powerpoint/2010/main" xmlns:a16="http://schemas.microsoft.com/office/drawing/2014/main" xmlns="" w="9525">
                   <a:solidFill>
                     <a:srgbClr val="000000"/>
                   </a:solidFill>
@@ -20199,7 +20199,7 @@
             </a:ln>
             <a:extLst>
               <a:ext uri="{91240B29-F687-4f45-9708-019B960494DF}">
-                <a14:hiddenLine xmlns="" xmlns:a16="http://schemas.microsoft.com/office/drawing/2014/main" xmlns:p14="http://schemas.microsoft.com/office/powerpoint/2010/main" xmlns:a14="http://schemas.microsoft.com/office/drawing/2010/main" w="9525">
+                <a14:hiddenLine xmlns:a14="http://schemas.microsoft.com/office/drawing/2010/main" xmlns:p14="http://schemas.microsoft.com/office/powerpoint/2010/main" xmlns:a16="http://schemas.microsoft.com/office/drawing/2014/main" xmlns="" w="9525">
                   <a:solidFill>
                     <a:srgbClr val="000000"/>
                   </a:solidFill>
@@ -20304,7 +20304,7 @@
             </a:ln>
             <a:extLst>
               <a:ext uri="{91240B29-F687-4f45-9708-019B960494DF}">
-                <a14:hiddenLine xmlns="" xmlns:a16="http://schemas.microsoft.com/office/drawing/2014/main" xmlns:p14="http://schemas.microsoft.com/office/powerpoint/2010/main" xmlns:a14="http://schemas.microsoft.com/office/drawing/2010/main" w="9525">
+                <a14:hiddenLine xmlns:a14="http://schemas.microsoft.com/office/drawing/2010/main" xmlns:p14="http://schemas.microsoft.com/office/powerpoint/2010/main" xmlns:a16="http://schemas.microsoft.com/office/drawing/2014/main" xmlns="" w="9525">
                   <a:solidFill>
                     <a:srgbClr val="000000"/>
                   </a:solidFill>
@@ -20409,7 +20409,7 @@
             </a:ln>
             <a:extLst>
               <a:ext uri="{91240B29-F687-4f45-9708-019B960494DF}">
-                <a14:hiddenLine xmlns="" xmlns:a16="http://schemas.microsoft.com/office/drawing/2014/main" xmlns:p14="http://schemas.microsoft.com/office/powerpoint/2010/main" xmlns:a14="http://schemas.microsoft.com/office/drawing/2010/main" w="9525">
+                <a14:hiddenLine xmlns:a14="http://schemas.microsoft.com/office/drawing/2010/main" xmlns:p14="http://schemas.microsoft.com/office/powerpoint/2010/main" xmlns:a16="http://schemas.microsoft.com/office/drawing/2014/main" xmlns="" w="9525">
                   <a:solidFill>
                     <a:srgbClr val="000000"/>
                   </a:solidFill>
@@ -20486,7 +20486,7 @@
             </a:ln>
             <a:extLst>
               <a:ext uri="{91240B29-F687-4f45-9708-019B960494DF}">
-                <a14:hiddenLine xmlns="" xmlns:a16="http://schemas.microsoft.com/office/drawing/2014/main" xmlns:p14="http://schemas.microsoft.com/office/powerpoint/2010/main" xmlns:a14="http://schemas.microsoft.com/office/drawing/2010/main" w="9525">
+                <a14:hiddenLine xmlns:a14="http://schemas.microsoft.com/office/drawing/2010/main" xmlns:p14="http://schemas.microsoft.com/office/powerpoint/2010/main" xmlns:a16="http://schemas.microsoft.com/office/drawing/2014/main" xmlns="" w="9525">
                   <a:solidFill>
                     <a:srgbClr val="000000"/>
                   </a:solidFill>
@@ -20611,7 +20611,7 @@
             </a:ln>
             <a:extLst>
               <a:ext uri="{91240B29-F687-4f45-9708-019B960494DF}">
-                <a14:hiddenLine xmlns="" xmlns:a16="http://schemas.microsoft.com/office/drawing/2014/main" xmlns:p14="http://schemas.microsoft.com/office/powerpoint/2010/main" xmlns:a14="http://schemas.microsoft.com/office/drawing/2010/main" w="9525">
+                <a14:hiddenLine xmlns:a14="http://schemas.microsoft.com/office/drawing/2010/main" xmlns:p14="http://schemas.microsoft.com/office/powerpoint/2010/main" xmlns:a16="http://schemas.microsoft.com/office/drawing/2014/main" xmlns="" w="9525">
                   <a:solidFill>
                     <a:srgbClr val="000000"/>
                   </a:solidFill>
@@ -20688,7 +20688,7 @@
             </a:ln>
             <a:extLst>
               <a:ext uri="{91240B29-F687-4f45-9708-019B960494DF}">
-                <a14:hiddenLine xmlns="" xmlns:a16="http://schemas.microsoft.com/office/drawing/2014/main" xmlns:p14="http://schemas.microsoft.com/office/powerpoint/2010/main" xmlns:a14="http://schemas.microsoft.com/office/drawing/2010/main" w="9525">
+                <a14:hiddenLine xmlns:a14="http://schemas.microsoft.com/office/drawing/2010/main" xmlns:p14="http://schemas.microsoft.com/office/powerpoint/2010/main" xmlns:a16="http://schemas.microsoft.com/office/drawing/2014/main" xmlns="" w="9525">
                   <a:solidFill>
                     <a:srgbClr val="000000"/>
                   </a:solidFill>
@@ -20793,7 +20793,7 @@
             </a:ln>
             <a:extLst>
               <a:ext uri="{91240B29-F687-4f45-9708-019B960494DF}">
-                <a14:hiddenLine xmlns="" xmlns:a16="http://schemas.microsoft.com/office/drawing/2014/main" xmlns:p14="http://schemas.microsoft.com/office/powerpoint/2010/main" xmlns:a14="http://schemas.microsoft.com/office/drawing/2010/main" w="9525">
+                <a14:hiddenLine xmlns:a14="http://schemas.microsoft.com/office/drawing/2010/main" xmlns:p14="http://schemas.microsoft.com/office/powerpoint/2010/main" xmlns:a16="http://schemas.microsoft.com/office/drawing/2014/main" xmlns="" w="9525">
                   <a:solidFill>
                     <a:srgbClr val="000000"/>
                   </a:solidFill>
@@ -20898,7 +20898,7 @@
             </a:ln>
             <a:extLst>
               <a:ext uri="{91240B29-F687-4f45-9708-019B960494DF}">
-                <a14:hiddenLine xmlns="" xmlns:a16="http://schemas.microsoft.com/office/drawing/2014/main" xmlns:p14="http://schemas.microsoft.com/office/powerpoint/2010/main" xmlns:a14="http://schemas.microsoft.com/office/drawing/2010/main" w="9525">
+                <a14:hiddenLine xmlns:a14="http://schemas.microsoft.com/office/drawing/2010/main" xmlns:p14="http://schemas.microsoft.com/office/powerpoint/2010/main" xmlns:a16="http://schemas.microsoft.com/office/drawing/2014/main" xmlns="" w="9525">
                   <a:solidFill>
                     <a:srgbClr val="000000"/>
                   </a:solidFill>
@@ -20975,7 +20975,7 @@
             </a:ln>
             <a:extLst>
               <a:ext uri="{91240B29-F687-4f45-9708-019B960494DF}">
-                <a14:hiddenLine xmlns="" xmlns:a16="http://schemas.microsoft.com/office/drawing/2014/main" xmlns:p14="http://schemas.microsoft.com/office/powerpoint/2010/main" xmlns:a14="http://schemas.microsoft.com/office/drawing/2010/main" w="9525">
+                <a14:hiddenLine xmlns:a14="http://schemas.microsoft.com/office/drawing/2010/main" xmlns:p14="http://schemas.microsoft.com/office/powerpoint/2010/main" xmlns:a16="http://schemas.microsoft.com/office/drawing/2014/main" xmlns="" w="9525">
                   <a:solidFill>
                     <a:srgbClr val="000000"/>
                   </a:solidFill>
@@ -21080,7 +21080,7 @@
             </a:ln>
             <a:extLst>
               <a:ext uri="{91240B29-F687-4f45-9708-019B960494DF}">
-                <a14:hiddenLine xmlns="" xmlns:a16="http://schemas.microsoft.com/office/drawing/2014/main" xmlns:p14="http://schemas.microsoft.com/office/powerpoint/2010/main" xmlns:a14="http://schemas.microsoft.com/office/drawing/2010/main" w="9525">
+                <a14:hiddenLine xmlns:a14="http://schemas.microsoft.com/office/drawing/2010/main" xmlns:p14="http://schemas.microsoft.com/office/powerpoint/2010/main" xmlns:a16="http://schemas.microsoft.com/office/drawing/2014/main" xmlns="" w="9525">
                   <a:solidFill>
                     <a:srgbClr val="000000"/>
                   </a:solidFill>
@@ -21185,7 +21185,7 @@
             </a:ln>
             <a:extLst>
               <a:ext uri="{91240B29-F687-4f45-9708-019B960494DF}">
-                <a14:hiddenLine xmlns="" xmlns:a16="http://schemas.microsoft.com/office/drawing/2014/main" xmlns:p14="http://schemas.microsoft.com/office/powerpoint/2010/main" xmlns:a14="http://schemas.microsoft.com/office/drawing/2010/main" w="9525">
+                <a14:hiddenLine xmlns:a14="http://schemas.microsoft.com/office/drawing/2010/main" xmlns:p14="http://schemas.microsoft.com/office/powerpoint/2010/main" xmlns:a16="http://schemas.microsoft.com/office/drawing/2014/main" xmlns="" w="9525">
                   <a:solidFill>
                     <a:srgbClr val="000000"/>
                   </a:solidFill>
@@ -21256,7 +21256,7 @@
             </a:ln>
             <a:extLst>
               <a:ext uri="{91240B29-F687-4f45-9708-019B960494DF}">
-                <a14:hiddenLine xmlns="" xmlns:a16="http://schemas.microsoft.com/office/drawing/2014/main" xmlns:p14="http://schemas.microsoft.com/office/powerpoint/2010/main" xmlns:a14="http://schemas.microsoft.com/office/drawing/2010/main" w="9525">
+                <a14:hiddenLine xmlns:a14="http://schemas.microsoft.com/office/drawing/2010/main" xmlns:p14="http://schemas.microsoft.com/office/powerpoint/2010/main" xmlns:a16="http://schemas.microsoft.com/office/drawing/2014/main" xmlns="" w="9525">
                   <a:solidFill>
                     <a:srgbClr val="000000"/>
                   </a:solidFill>
@@ -21361,7 +21361,7 @@
             </a:ln>
             <a:extLst>
               <a:ext uri="{91240B29-F687-4f45-9708-019B960494DF}">
-                <a14:hiddenLine xmlns="" xmlns:a16="http://schemas.microsoft.com/office/drawing/2014/main" xmlns:p14="http://schemas.microsoft.com/office/powerpoint/2010/main" xmlns:a14="http://schemas.microsoft.com/office/drawing/2010/main" w="9525">
+                <a14:hiddenLine xmlns:a14="http://schemas.microsoft.com/office/drawing/2010/main" xmlns:p14="http://schemas.microsoft.com/office/powerpoint/2010/main" xmlns:a16="http://schemas.microsoft.com/office/drawing/2014/main" xmlns="" w="9525">
                   <a:solidFill>
                     <a:srgbClr val="000000"/>
                   </a:solidFill>
@@ -21432,7 +21432,7 @@
             </a:ln>
             <a:extLst>
               <a:ext uri="{91240B29-F687-4f45-9708-019B960494DF}">
-                <a14:hiddenLine xmlns="" xmlns:a16="http://schemas.microsoft.com/office/drawing/2014/main" xmlns:p14="http://schemas.microsoft.com/office/powerpoint/2010/main" xmlns:a14="http://schemas.microsoft.com/office/drawing/2010/main" w="9525">
+                <a14:hiddenLine xmlns:a14="http://schemas.microsoft.com/office/drawing/2010/main" xmlns:p14="http://schemas.microsoft.com/office/powerpoint/2010/main" xmlns:a16="http://schemas.microsoft.com/office/drawing/2014/main" xmlns="" w="9525">
                   <a:solidFill>
                     <a:srgbClr val="000000"/>
                   </a:solidFill>
@@ -21537,7 +21537,7 @@
             </a:ln>
             <a:extLst>
               <a:ext uri="{91240B29-F687-4f45-9708-019B960494DF}">
-                <a14:hiddenLine xmlns="" xmlns:a16="http://schemas.microsoft.com/office/drawing/2014/main" xmlns:p14="http://schemas.microsoft.com/office/powerpoint/2010/main" xmlns:a14="http://schemas.microsoft.com/office/drawing/2010/main" w="9525">
+                <a14:hiddenLine xmlns:a14="http://schemas.microsoft.com/office/drawing/2010/main" xmlns:p14="http://schemas.microsoft.com/office/powerpoint/2010/main" xmlns:a16="http://schemas.microsoft.com/office/drawing/2014/main" xmlns="" w="9525">
                   <a:solidFill>
                     <a:srgbClr val="000000"/>
                   </a:solidFill>
@@ -21620,7 +21620,7 @@
             </a:ln>
             <a:extLst>
               <a:ext uri="{91240B29-F687-4f45-9708-019B960494DF}">
-                <a14:hiddenLine xmlns="" xmlns:a16="http://schemas.microsoft.com/office/drawing/2014/main" xmlns:p14="http://schemas.microsoft.com/office/powerpoint/2010/main" xmlns:a14="http://schemas.microsoft.com/office/drawing/2010/main" w="9525">
+                <a14:hiddenLine xmlns:a14="http://schemas.microsoft.com/office/drawing/2010/main" xmlns:p14="http://schemas.microsoft.com/office/powerpoint/2010/main" xmlns:a16="http://schemas.microsoft.com/office/drawing/2014/main" xmlns="" w="9525">
                   <a:solidFill>
                     <a:srgbClr val="000000"/>
                   </a:solidFill>
@@ -21725,7 +21725,7 @@
             </a:ln>
             <a:extLst>
               <a:ext uri="{91240B29-F687-4f45-9708-019B960494DF}">
-                <a14:hiddenLine xmlns="" xmlns:a16="http://schemas.microsoft.com/office/drawing/2014/main" xmlns:p14="http://schemas.microsoft.com/office/powerpoint/2010/main" xmlns:a14="http://schemas.microsoft.com/office/drawing/2010/main" w="9525">
+                <a14:hiddenLine xmlns:a14="http://schemas.microsoft.com/office/drawing/2010/main" xmlns:p14="http://schemas.microsoft.com/office/powerpoint/2010/main" xmlns:a16="http://schemas.microsoft.com/office/drawing/2014/main" xmlns="" w="9525">
                   <a:solidFill>
                     <a:srgbClr val="000000"/>
                   </a:solidFill>
@@ -21808,7 +21808,7 @@
             </a:ln>
             <a:extLst>
               <a:ext uri="{91240B29-F687-4f45-9708-019B960494DF}">
-                <a14:hiddenLine xmlns="" xmlns:a16="http://schemas.microsoft.com/office/drawing/2014/main" xmlns:p14="http://schemas.microsoft.com/office/powerpoint/2010/main" xmlns:a14="http://schemas.microsoft.com/office/drawing/2010/main" w="9525">
+                <a14:hiddenLine xmlns:a14="http://schemas.microsoft.com/office/drawing/2010/main" xmlns:p14="http://schemas.microsoft.com/office/powerpoint/2010/main" xmlns:a16="http://schemas.microsoft.com/office/drawing/2014/main" xmlns="" w="9525">
                   <a:solidFill>
                     <a:srgbClr val="000000"/>
                   </a:solidFill>
@@ -21913,7 +21913,7 @@
             </a:ln>
             <a:extLst>
               <a:ext uri="{91240B29-F687-4f45-9708-019B960494DF}">
-                <a14:hiddenLine xmlns="" xmlns:a16="http://schemas.microsoft.com/office/drawing/2014/main" xmlns:p14="http://schemas.microsoft.com/office/powerpoint/2010/main" xmlns:a14="http://schemas.microsoft.com/office/drawing/2010/main" w="9525">
+                <a14:hiddenLine xmlns:a14="http://schemas.microsoft.com/office/drawing/2010/main" xmlns:p14="http://schemas.microsoft.com/office/powerpoint/2010/main" xmlns:a16="http://schemas.microsoft.com/office/drawing/2014/main" xmlns="" w="9525">
                   <a:solidFill>
                     <a:srgbClr val="000000"/>
                   </a:solidFill>
@@ -21962,7 +21962,7 @@
             </a:ln>
             <a:extLst>
               <a:ext uri="{91240B29-F687-4f45-9708-019B960494DF}">
-                <a14:hiddenLine xmlns="" xmlns:a16="http://schemas.microsoft.com/office/drawing/2014/main" xmlns:p14="http://schemas.microsoft.com/office/powerpoint/2010/main" xmlns:a14="http://schemas.microsoft.com/office/drawing/2010/main" w="9525">
+                <a14:hiddenLine xmlns:a14="http://schemas.microsoft.com/office/drawing/2010/main" xmlns:p14="http://schemas.microsoft.com/office/powerpoint/2010/main" xmlns:a16="http://schemas.microsoft.com/office/drawing/2014/main" xmlns="" w="9525">
                   <a:solidFill>
                     <a:srgbClr val="000000"/>
                   </a:solidFill>
@@ -22067,7 +22067,7 @@
             </a:ln>
             <a:extLst>
               <a:ext uri="{91240B29-F687-4f45-9708-019B960494DF}">
-                <a14:hiddenLine xmlns="" xmlns:a16="http://schemas.microsoft.com/office/drawing/2014/main" xmlns:p14="http://schemas.microsoft.com/office/powerpoint/2010/main" xmlns:a14="http://schemas.microsoft.com/office/drawing/2010/main" w="9525">
+                <a14:hiddenLine xmlns:a14="http://schemas.microsoft.com/office/drawing/2010/main" xmlns:p14="http://schemas.microsoft.com/office/powerpoint/2010/main" xmlns:a16="http://schemas.microsoft.com/office/drawing/2014/main" xmlns="" w="9525">
                   <a:solidFill>
                     <a:srgbClr val="000000"/>
                   </a:solidFill>
@@ -22144,7 +22144,7 @@
             </a:ln>
             <a:extLst>
               <a:ext uri="{91240B29-F687-4f45-9708-019B960494DF}">
-                <a14:hiddenLine xmlns="" xmlns:a16="http://schemas.microsoft.com/office/drawing/2014/main" xmlns:p14="http://schemas.microsoft.com/office/powerpoint/2010/main" xmlns:a14="http://schemas.microsoft.com/office/drawing/2010/main" w="9525">
+                <a14:hiddenLine xmlns:a14="http://schemas.microsoft.com/office/drawing/2010/main" xmlns:p14="http://schemas.microsoft.com/office/powerpoint/2010/main" xmlns:a16="http://schemas.microsoft.com/office/drawing/2014/main" xmlns="" w="9525">
                   <a:solidFill>
                     <a:srgbClr val="000000"/>
                   </a:solidFill>
@@ -22221,7 +22221,7 @@
             </a:ln>
             <a:extLst>
               <a:ext uri="{91240B29-F687-4f45-9708-019B960494DF}">
-                <a14:hiddenLine xmlns="" xmlns:a16="http://schemas.microsoft.com/office/drawing/2014/main" xmlns:p14="http://schemas.microsoft.com/office/powerpoint/2010/main" xmlns:a14="http://schemas.microsoft.com/office/drawing/2010/main" w="9525">
+                <a14:hiddenLine xmlns:a14="http://schemas.microsoft.com/office/drawing/2010/main" xmlns:p14="http://schemas.microsoft.com/office/powerpoint/2010/main" xmlns:a16="http://schemas.microsoft.com/office/drawing/2014/main" xmlns="" w="9525">
                   <a:solidFill>
                     <a:srgbClr val="000000"/>
                   </a:solidFill>
@@ -22326,7 +22326,7 @@
             </a:ln>
             <a:extLst>
               <a:ext uri="{91240B29-F687-4f45-9708-019B960494DF}">
-                <a14:hiddenLine xmlns="" xmlns:a16="http://schemas.microsoft.com/office/drawing/2014/main" xmlns:p14="http://schemas.microsoft.com/office/powerpoint/2010/main" xmlns:a14="http://schemas.microsoft.com/office/drawing/2010/main" w="9525">
+                <a14:hiddenLine xmlns:a14="http://schemas.microsoft.com/office/drawing/2010/main" xmlns:p14="http://schemas.microsoft.com/office/powerpoint/2010/main" xmlns:a16="http://schemas.microsoft.com/office/drawing/2014/main" xmlns="" w="9525">
                   <a:solidFill>
                     <a:srgbClr val="000000"/>
                   </a:solidFill>
@@ -22409,7 +22409,7 @@
             </a:ln>
             <a:extLst>
               <a:ext uri="{91240B29-F687-4f45-9708-019B960494DF}">
-                <a14:hiddenLine xmlns="" xmlns:a16="http://schemas.microsoft.com/office/drawing/2014/main" xmlns:p14="http://schemas.microsoft.com/office/powerpoint/2010/main" xmlns:a14="http://schemas.microsoft.com/office/drawing/2010/main" w="9525">
+                <a14:hiddenLine xmlns:a14="http://schemas.microsoft.com/office/drawing/2010/main" xmlns:p14="http://schemas.microsoft.com/office/powerpoint/2010/main" xmlns:a16="http://schemas.microsoft.com/office/drawing/2014/main" xmlns="" w="9525">
                   <a:solidFill>
                     <a:srgbClr val="000000"/>
                   </a:solidFill>
@@ -22486,7 +22486,7 @@
             </a:ln>
             <a:extLst>
               <a:ext uri="{91240B29-F687-4f45-9708-019B960494DF}">
-                <a14:hiddenLine xmlns="" xmlns:a16="http://schemas.microsoft.com/office/drawing/2014/main" xmlns:p14="http://schemas.microsoft.com/office/powerpoint/2010/main" xmlns:a14="http://schemas.microsoft.com/office/drawing/2010/main" w="9525">
+                <a14:hiddenLine xmlns:a14="http://schemas.microsoft.com/office/drawing/2010/main" xmlns:p14="http://schemas.microsoft.com/office/powerpoint/2010/main" xmlns:a16="http://schemas.microsoft.com/office/drawing/2014/main" xmlns="" w="9525">
                   <a:solidFill>
                     <a:srgbClr val="000000"/>
                   </a:solidFill>
@@ -22591,7 +22591,7 @@
             </a:ln>
             <a:extLst>
               <a:ext uri="{91240B29-F687-4f45-9708-019B960494DF}">
-                <a14:hiddenLine xmlns="" xmlns:a16="http://schemas.microsoft.com/office/drawing/2014/main" xmlns:p14="http://schemas.microsoft.com/office/powerpoint/2010/main" xmlns:a14="http://schemas.microsoft.com/office/drawing/2010/main" w="9525">
+                <a14:hiddenLine xmlns:a14="http://schemas.microsoft.com/office/drawing/2010/main" xmlns:p14="http://schemas.microsoft.com/office/powerpoint/2010/main" xmlns:a16="http://schemas.microsoft.com/office/drawing/2014/main" xmlns="" w="9525">
                   <a:solidFill>
                     <a:srgbClr val="000000"/>
                   </a:solidFill>
@@ -22668,7 +22668,7 @@
             </a:ln>
             <a:extLst>
               <a:ext uri="{91240B29-F687-4f45-9708-019B960494DF}">
-                <a14:hiddenLine xmlns="" xmlns:a16="http://schemas.microsoft.com/office/drawing/2014/main" xmlns:p14="http://schemas.microsoft.com/office/powerpoint/2010/main" xmlns:a14="http://schemas.microsoft.com/office/drawing/2010/main" w="9525">
+                <a14:hiddenLine xmlns:a14="http://schemas.microsoft.com/office/drawing/2010/main" xmlns:p14="http://schemas.microsoft.com/office/powerpoint/2010/main" xmlns:a16="http://schemas.microsoft.com/office/drawing/2014/main" xmlns="" w="9525">
                   <a:solidFill>
                     <a:srgbClr val="000000"/>
                   </a:solidFill>
@@ -22773,7 +22773,7 @@
             </a:ln>
             <a:extLst>
               <a:ext uri="{91240B29-F687-4f45-9708-019B960494DF}">
-                <a14:hiddenLine xmlns="" xmlns:a16="http://schemas.microsoft.com/office/drawing/2014/main" xmlns:p14="http://schemas.microsoft.com/office/powerpoint/2010/main" xmlns:a14="http://schemas.microsoft.com/office/drawing/2010/main" w="9525">
+                <a14:hiddenLine xmlns:a14="http://schemas.microsoft.com/office/drawing/2010/main" xmlns:p14="http://schemas.microsoft.com/office/powerpoint/2010/main" xmlns:a16="http://schemas.microsoft.com/office/drawing/2014/main" xmlns="" w="9525">
                   <a:solidFill>
                     <a:srgbClr val="000000"/>
                   </a:solidFill>
@@ -22850,7 +22850,7 @@
             </a:ln>
             <a:extLst>
               <a:ext uri="{91240B29-F687-4f45-9708-019B960494DF}">
-                <a14:hiddenLine xmlns="" xmlns:a16="http://schemas.microsoft.com/office/drawing/2014/main" xmlns:p14="http://schemas.microsoft.com/office/powerpoint/2010/main" xmlns:a14="http://schemas.microsoft.com/office/drawing/2010/main" w="9525">
+                <a14:hiddenLine xmlns:a14="http://schemas.microsoft.com/office/drawing/2010/main" xmlns:p14="http://schemas.microsoft.com/office/powerpoint/2010/main" xmlns:a16="http://schemas.microsoft.com/office/drawing/2014/main" xmlns="" w="9525">
                   <a:solidFill>
                     <a:srgbClr val="000000"/>
                   </a:solidFill>
@@ -22955,7 +22955,7 @@
             </a:ln>
             <a:extLst>
               <a:ext uri="{91240B29-F687-4f45-9708-019B960494DF}">
-                <a14:hiddenLine xmlns="" xmlns:a16="http://schemas.microsoft.com/office/drawing/2014/main" xmlns:p14="http://schemas.microsoft.com/office/powerpoint/2010/main" xmlns:a14="http://schemas.microsoft.com/office/drawing/2010/main" w="9525">
+                <a14:hiddenLine xmlns:a14="http://schemas.microsoft.com/office/drawing/2010/main" xmlns:p14="http://schemas.microsoft.com/office/powerpoint/2010/main" xmlns:a16="http://schemas.microsoft.com/office/drawing/2014/main" xmlns="" w="9525">
                   <a:solidFill>
                     <a:srgbClr val="000000"/>
                   </a:solidFill>
@@ -23004,7 +23004,7 @@
             </a:ln>
             <a:extLst>
               <a:ext uri="{91240B29-F687-4f45-9708-019B960494DF}">
-                <a14:hiddenLine xmlns="" xmlns:a16="http://schemas.microsoft.com/office/drawing/2014/main" xmlns:p14="http://schemas.microsoft.com/office/powerpoint/2010/main" xmlns:a14="http://schemas.microsoft.com/office/drawing/2010/main" w="9525">
+                <a14:hiddenLine xmlns:a14="http://schemas.microsoft.com/office/drawing/2010/main" xmlns:p14="http://schemas.microsoft.com/office/powerpoint/2010/main" xmlns:a16="http://schemas.microsoft.com/office/drawing/2014/main" xmlns="" w="9525">
                   <a:solidFill>
                     <a:srgbClr val="000000"/>
                   </a:solidFill>
@@ -23084,7 +23084,7 @@
             </a:ln>
             <a:extLst>
               <a:ext uri="{91240B29-F687-4f45-9708-019B960494DF}">
-                <a14:hiddenLine xmlns="" xmlns:a16="http://schemas.microsoft.com/office/drawing/2014/main" xmlns:p14="http://schemas.microsoft.com/office/powerpoint/2010/main" xmlns:a14="http://schemas.microsoft.com/office/drawing/2010/main" w="9525">
+                <a14:hiddenLine xmlns:a14="http://schemas.microsoft.com/office/drawing/2010/main" xmlns:p14="http://schemas.microsoft.com/office/powerpoint/2010/main" xmlns:a16="http://schemas.microsoft.com/office/drawing/2014/main" xmlns="" w="9525">
                   <a:solidFill>
                     <a:srgbClr val="000000"/>
                   </a:solidFill>
@@ -23189,7 +23189,7 @@
             </a:ln>
             <a:extLst>
               <a:ext uri="{91240B29-F687-4f45-9708-019B960494DF}">
-                <a14:hiddenLine xmlns="" xmlns:a16="http://schemas.microsoft.com/office/drawing/2014/main" xmlns:p14="http://schemas.microsoft.com/office/powerpoint/2010/main" xmlns:a14="http://schemas.microsoft.com/office/drawing/2010/main" w="9525">
+                <a14:hiddenLine xmlns:a14="http://schemas.microsoft.com/office/drawing/2010/main" xmlns:p14="http://schemas.microsoft.com/office/powerpoint/2010/main" xmlns:a16="http://schemas.microsoft.com/office/drawing/2014/main" xmlns="" w="9525">
                   <a:solidFill>
                     <a:srgbClr val="000000"/>
                   </a:solidFill>
@@ -23266,7 +23266,7 @@
             </a:ln>
             <a:extLst>
               <a:ext uri="{91240B29-F687-4f45-9708-019B960494DF}">
-                <a14:hiddenLine xmlns="" xmlns:a16="http://schemas.microsoft.com/office/drawing/2014/main" xmlns:p14="http://schemas.microsoft.com/office/powerpoint/2010/main" xmlns:a14="http://schemas.microsoft.com/office/drawing/2010/main" w="9525">
+                <a14:hiddenLine xmlns:a14="http://schemas.microsoft.com/office/drawing/2010/main" xmlns:p14="http://schemas.microsoft.com/office/powerpoint/2010/main" xmlns:a16="http://schemas.microsoft.com/office/drawing/2014/main" xmlns="" w="9525">
                   <a:solidFill>
                     <a:srgbClr val="000000"/>
                   </a:solidFill>
@@ -23371,7 +23371,7 @@
             </a:ln>
             <a:extLst>
               <a:ext uri="{91240B29-F687-4f45-9708-019B960494DF}">
-                <a14:hiddenLine xmlns="" xmlns:a16="http://schemas.microsoft.com/office/drawing/2014/main" xmlns:p14="http://schemas.microsoft.com/office/powerpoint/2010/main" xmlns:a14="http://schemas.microsoft.com/office/drawing/2010/main" w="9525">
+                <a14:hiddenLine xmlns:a14="http://schemas.microsoft.com/office/drawing/2010/main" xmlns:p14="http://schemas.microsoft.com/office/powerpoint/2010/main" xmlns:a16="http://schemas.microsoft.com/office/drawing/2014/main" xmlns="" w="9525">
                   <a:solidFill>
                     <a:srgbClr val="000000"/>
                   </a:solidFill>
@@ -23476,7 +23476,7 @@
             </a:ln>
             <a:extLst>
               <a:ext uri="{91240B29-F687-4f45-9708-019B960494DF}">
-                <a14:hiddenLine xmlns="" xmlns:a16="http://schemas.microsoft.com/office/drawing/2014/main" xmlns:p14="http://schemas.microsoft.com/office/powerpoint/2010/main" xmlns:a14="http://schemas.microsoft.com/office/drawing/2010/main" w="9525">
+                <a14:hiddenLine xmlns:a14="http://schemas.microsoft.com/office/drawing/2010/main" xmlns:p14="http://schemas.microsoft.com/office/powerpoint/2010/main" xmlns:a16="http://schemas.microsoft.com/office/drawing/2014/main" xmlns="" w="9525">
                   <a:solidFill>
                     <a:srgbClr val="000000"/>
                   </a:solidFill>
@@ -23556,7 +23556,7 @@
             </a:ln>
             <a:extLst>
               <a:ext uri="{91240B29-F687-4f45-9708-019B960494DF}">
-                <a14:hiddenLine xmlns="" xmlns:a16="http://schemas.microsoft.com/office/drawing/2014/main" xmlns:p14="http://schemas.microsoft.com/office/powerpoint/2010/main" xmlns:a14="http://schemas.microsoft.com/office/drawing/2010/main" w="9525">
+                <a14:hiddenLine xmlns:a14="http://schemas.microsoft.com/office/drawing/2010/main" xmlns:p14="http://schemas.microsoft.com/office/powerpoint/2010/main" xmlns:a16="http://schemas.microsoft.com/office/drawing/2014/main" xmlns="" w="9525">
                   <a:solidFill>
                     <a:srgbClr val="000000"/>
                   </a:solidFill>
@@ -23633,7 +23633,7 @@
             </a:ln>
             <a:extLst>
               <a:ext uri="{91240B29-F687-4f45-9708-019B960494DF}">
-                <a14:hiddenLine xmlns="" xmlns:a16="http://schemas.microsoft.com/office/drawing/2014/main" xmlns:p14="http://schemas.microsoft.com/office/powerpoint/2010/main" xmlns:a14="http://schemas.microsoft.com/office/drawing/2010/main" w="9525">
+                <a14:hiddenLine xmlns:a14="http://schemas.microsoft.com/office/drawing/2010/main" xmlns:p14="http://schemas.microsoft.com/office/powerpoint/2010/main" xmlns:a16="http://schemas.microsoft.com/office/drawing/2014/main" xmlns="" w="9525">
                   <a:solidFill>
                     <a:srgbClr val="000000"/>
                   </a:solidFill>
@@ -23738,7 +23738,7 @@
             </a:ln>
             <a:extLst>
               <a:ext uri="{91240B29-F687-4f45-9708-019B960494DF}">
-                <a14:hiddenLine xmlns="" xmlns:a16="http://schemas.microsoft.com/office/drawing/2014/main" xmlns:p14="http://schemas.microsoft.com/office/powerpoint/2010/main" xmlns:a14="http://schemas.microsoft.com/office/drawing/2010/main" w="9525">
+                <a14:hiddenLine xmlns:a14="http://schemas.microsoft.com/office/drawing/2010/main" xmlns:p14="http://schemas.microsoft.com/office/powerpoint/2010/main" xmlns:a16="http://schemas.microsoft.com/office/drawing/2014/main" xmlns="" w="9525">
                   <a:solidFill>
                     <a:srgbClr val="000000"/>
                   </a:solidFill>
@@ -23843,7 +23843,7 @@
             </a:ln>
             <a:extLst>
               <a:ext uri="{91240B29-F687-4f45-9708-019B960494DF}">
-                <a14:hiddenLine xmlns="" xmlns:a16="http://schemas.microsoft.com/office/drawing/2014/main" xmlns:p14="http://schemas.microsoft.com/office/powerpoint/2010/main" xmlns:a14="http://schemas.microsoft.com/office/drawing/2010/main" w="9525">
+                <a14:hiddenLine xmlns:a14="http://schemas.microsoft.com/office/drawing/2010/main" xmlns:p14="http://schemas.microsoft.com/office/powerpoint/2010/main" xmlns:a16="http://schemas.microsoft.com/office/drawing/2014/main" xmlns="" w="9525">
                   <a:solidFill>
                     <a:srgbClr val="000000"/>
                   </a:solidFill>
@@ -23920,7 +23920,7 @@
             </a:ln>
             <a:extLst>
               <a:ext uri="{91240B29-F687-4f45-9708-019B960494DF}">
-                <a14:hiddenLine xmlns="" xmlns:a16="http://schemas.microsoft.com/office/drawing/2014/main" xmlns:p14="http://schemas.microsoft.com/office/powerpoint/2010/main" xmlns:a14="http://schemas.microsoft.com/office/drawing/2010/main" w="9525">
+                <a14:hiddenLine xmlns:a14="http://schemas.microsoft.com/office/drawing/2010/main" xmlns:p14="http://schemas.microsoft.com/office/powerpoint/2010/main" xmlns:a16="http://schemas.microsoft.com/office/drawing/2014/main" xmlns="" w="9525">
                   <a:solidFill>
                     <a:srgbClr val="000000"/>
                   </a:solidFill>
@@ -24055,7 +24055,7 @@
             </a:ln>
             <a:extLst>
               <a:ext uri="{91240B29-F687-4f45-9708-019B960494DF}">
-                <a14:hiddenLine xmlns="" xmlns:a16="http://schemas.microsoft.com/office/drawing/2014/main" xmlns:p14="http://schemas.microsoft.com/office/powerpoint/2010/main" xmlns:a14="http://schemas.microsoft.com/office/drawing/2010/main" w="9525">
+                <a14:hiddenLine xmlns:a14="http://schemas.microsoft.com/office/drawing/2010/main" xmlns:p14="http://schemas.microsoft.com/office/powerpoint/2010/main" xmlns:a16="http://schemas.microsoft.com/office/drawing/2014/main" xmlns="" w="9525">
                   <a:solidFill>
                     <a:srgbClr val="000000"/>
                   </a:solidFill>
@@ -24138,7 +24138,7 @@
             </a:ln>
             <a:extLst>
               <a:ext uri="{91240B29-F687-4f45-9708-019B960494DF}">
-                <a14:hiddenLine xmlns="" xmlns:a16="http://schemas.microsoft.com/office/drawing/2014/main" xmlns:p14="http://schemas.microsoft.com/office/powerpoint/2010/main" xmlns:a14="http://schemas.microsoft.com/office/drawing/2010/main" w="9525">
+                <a14:hiddenLine xmlns:a14="http://schemas.microsoft.com/office/drawing/2010/main" xmlns:p14="http://schemas.microsoft.com/office/powerpoint/2010/main" xmlns:a16="http://schemas.microsoft.com/office/drawing/2014/main" xmlns="" w="9525">
                   <a:solidFill>
                     <a:srgbClr val="000000"/>
                   </a:solidFill>
@@ -24243,7 +24243,7 @@
             </a:ln>
             <a:extLst>
               <a:ext uri="{91240B29-F687-4f45-9708-019B960494DF}">
-                <a14:hiddenLine xmlns="" xmlns:a16="http://schemas.microsoft.com/office/drawing/2014/main" xmlns:p14="http://schemas.microsoft.com/office/powerpoint/2010/main" xmlns:a14="http://schemas.microsoft.com/office/drawing/2010/main" w="9525">
+                <a14:hiddenLine xmlns:a14="http://schemas.microsoft.com/office/drawing/2010/main" xmlns:p14="http://schemas.microsoft.com/office/powerpoint/2010/main" xmlns:a16="http://schemas.microsoft.com/office/drawing/2014/main" xmlns="" w="9525">
                   <a:solidFill>
                     <a:srgbClr val="000000"/>
                   </a:solidFill>
@@ -24470,36 +24470,6 @@
           </a:p>
         </p:txBody>
       </p:sp>
-      <p:pic>
-        <p:nvPicPr>
-          <p:cNvPr id="7" name="Imagen 6" descr="Interfaz de usuario gráfica, Aplicación&#10;&#10;Descripción generada automáticamente">
-            <a:extLst>
-              <a:ext uri="{FF2B5EF4-FFF2-40B4-BE49-F238E27FC236}">
-                <a16:creationId xmlns:a16="http://schemas.microsoft.com/office/drawing/2014/main" id="{7FD56472-F14B-46D0-9996-195C24EE5C7B}"/>
-              </a:ext>
-            </a:extLst>
-          </p:cNvPr>
-          <p:cNvPicPr>
-            <a:picLocks noChangeAspect="1"/>
-          </p:cNvPicPr>
-          <p:nvPr/>
-        </p:nvPicPr>
-        <p:blipFill>
-          <a:blip r:embed="rId3"/>
-          <a:stretch>
-            <a:fillRect/>
-          </a:stretch>
-        </p:blipFill>
-        <p:spPr>
-          <a:xfrm>
-            <a:off x="7780595" y="3324611"/>
-            <a:ext cx="3168492" cy="2274412"/>
-          </a:xfrm>
-          <a:prstGeom prst="rect">
-            <a:avLst/>
-          </a:prstGeom>
-        </p:spPr>
-      </p:pic>
       <p:sp>
         <p:nvSpPr>
           <p:cNvPr id="12" name="CuadroTexto 11">
@@ -24649,6 +24619,36 @@
           </a:p>
         </p:txBody>
       </p:sp>
+      <p:pic>
+        <p:nvPicPr>
+          <p:cNvPr id="8" name="Imagen 7" descr="Interfaz de usuario gráfica, Aplicación&#10;&#10;Descripción generada automáticamente">
+            <a:extLst>
+              <a:ext uri="{FF2B5EF4-FFF2-40B4-BE49-F238E27FC236}">
+                <a16:creationId xmlns:a16="http://schemas.microsoft.com/office/drawing/2014/main" id="{5EBEBD1B-5C99-4108-9FDA-2CF5B74741DB}"/>
+              </a:ext>
+            </a:extLst>
+          </p:cNvPr>
+          <p:cNvPicPr>
+            <a:picLocks noChangeAspect="1"/>
+          </p:cNvPicPr>
+          <p:nvPr/>
+        </p:nvPicPr>
+        <p:blipFill>
+          <a:blip r:embed="rId3"/>
+          <a:stretch>
+            <a:fillRect/>
+          </a:stretch>
+        </p:blipFill>
+        <p:spPr>
+          <a:xfrm>
+            <a:off x="7763045" y="3302399"/>
+            <a:ext cx="3186042" cy="2566056"/>
+          </a:xfrm>
+          <a:prstGeom prst="rect">
+            <a:avLst/>
+          </a:prstGeom>
+        </p:spPr>
+      </p:pic>
     </p:spTree>
     <p:extLst>
       <p:ext uri="{BB962C8B-B14F-4D97-AF65-F5344CB8AC3E}">
@@ -24898,36 +24898,6 @@
           </a:prstGeom>
         </p:spPr>
       </p:pic>
-      <p:pic>
-        <p:nvPicPr>
-          <p:cNvPr id="7" name="Imagen 6" descr="Interfaz de usuario gráfica, Aplicación&#10;&#10;Descripción generada automáticamente">
-            <a:extLst>
-              <a:ext uri="{FF2B5EF4-FFF2-40B4-BE49-F238E27FC236}">
-                <a16:creationId xmlns:a16="http://schemas.microsoft.com/office/drawing/2014/main" id="{20AC799F-8E88-4310-AF8A-B4F86F2BCAC4}"/>
-              </a:ext>
-            </a:extLst>
-          </p:cNvPr>
-          <p:cNvPicPr>
-            <a:picLocks noChangeAspect="1"/>
-          </p:cNvPicPr>
-          <p:nvPr/>
-        </p:nvPicPr>
-        <p:blipFill>
-          <a:blip r:embed="rId3"/>
-          <a:stretch>
-            <a:fillRect/>
-          </a:stretch>
-        </p:blipFill>
-        <p:spPr>
-          <a:xfrm>
-            <a:off x="7000741" y="3429000"/>
-            <a:ext cx="2857634" cy="2591482"/>
-          </a:xfrm>
-          <a:prstGeom prst="rect">
-            <a:avLst/>
-          </a:prstGeom>
-        </p:spPr>
-      </p:pic>
       <p:sp>
         <p:nvSpPr>
           <p:cNvPr id="8" name="Flecha: a la derecha 7">
@@ -25042,6 +25012,36 @@
           </a:p>
         </p:txBody>
       </p:sp>
+      <p:pic>
+        <p:nvPicPr>
+          <p:cNvPr id="6" name="Imagen 5" descr="Interfaz de usuario gráfica, Aplicación&#10;&#10;Descripción generada automáticamente">
+            <a:extLst>
+              <a:ext uri="{FF2B5EF4-FFF2-40B4-BE49-F238E27FC236}">
+                <a16:creationId xmlns:a16="http://schemas.microsoft.com/office/drawing/2014/main" id="{A3847EAB-E76F-4675-817D-63B7F4AA1AAF}"/>
+              </a:ext>
+            </a:extLst>
+          </p:cNvPr>
+          <p:cNvPicPr>
+            <a:picLocks noChangeAspect="1"/>
+          </p:cNvPicPr>
+          <p:nvPr/>
+        </p:nvPicPr>
+        <p:blipFill>
+          <a:blip r:embed="rId3"/>
+          <a:stretch>
+            <a:fillRect/>
+          </a:stretch>
+        </p:blipFill>
+        <p:spPr>
+          <a:xfrm>
+            <a:off x="7000739" y="3613093"/>
+            <a:ext cx="2857633" cy="2544655"/>
+          </a:xfrm>
+          <a:prstGeom prst="rect">
+            <a:avLst/>
+          </a:prstGeom>
+        </p:spPr>
+      </p:pic>
     </p:spTree>
     <p:extLst>
       <p:ext uri="{BB962C8B-B14F-4D97-AF65-F5344CB8AC3E}">

</xml_diff>

<commit_message>
Nuevo Flujo de interfaz y añadido presentacion
</commit_message>
<xml_diff>
--- a/doc/Presentación_mitad_de_curso_JuanEspinosayNachoRodriguez.pptx
+++ b/doc/Presentación_mitad_de_curso_JuanEspinosayNachoRodriguez.pptx
@@ -5,18 +5,19 @@
     <p:sldMasterId id="2147483648" r:id="rId1"/>
   </p:sldMasterIdLst>
   <p:notesMasterIdLst>
-    <p:notesMasterId r:id="rId11"/>
+    <p:notesMasterId r:id="rId12"/>
   </p:notesMasterIdLst>
   <p:sldIdLst>
     <p:sldId id="256" r:id="rId2"/>
     <p:sldId id="257" r:id="rId3"/>
     <p:sldId id="262" r:id="rId4"/>
-    <p:sldId id="259" r:id="rId5"/>
-    <p:sldId id="260" r:id="rId6"/>
-    <p:sldId id="261" r:id="rId7"/>
-    <p:sldId id="264" r:id="rId8"/>
-    <p:sldId id="265" r:id="rId9"/>
-    <p:sldId id="266" r:id="rId10"/>
+    <p:sldId id="267" r:id="rId5"/>
+    <p:sldId id="259" r:id="rId6"/>
+    <p:sldId id="260" r:id="rId7"/>
+    <p:sldId id="261" r:id="rId8"/>
+    <p:sldId id="264" r:id="rId9"/>
+    <p:sldId id="265" r:id="rId10"/>
+    <p:sldId id="266" r:id="rId11"/>
   </p:sldIdLst>
   <p:sldSz cx="12192000" cy="6858000"/>
   <p:notesSz cx="6858000" cy="9144000"/>
@@ -205,7 +206,7 @@
           <a:p>
             <a:fld id="{6494474F-FB99-4D66-9794-76C269664995}" type="datetimeFigureOut">
               <a:rPr lang="es-ES" smtClean="0"/>
-              <a:t>05/04/2022</a:t>
+              <a:t>10/06/2022</a:t>
             </a:fld>
             <a:endParaRPr lang="es-ES"/>
           </a:p>
@@ -733,6 +734,139 @@
           <a:bodyPr/>
           <a:lstStyle/>
           <a:p>
+            <a:pPr marL="0" marR="0" lvl="0" indent="0" algn="l" defTabSz="914400" rtl="0" eaLnBrk="1" fontAlgn="auto" latinLnBrk="0" hangingPunct="1">
+              <a:lnSpc>
+                <a:spcPct val="100000"/>
+              </a:lnSpc>
+              <a:spcBef>
+                <a:spcPts val="0"/>
+              </a:spcBef>
+              <a:spcAft>
+                <a:spcPts val="0"/>
+              </a:spcAft>
+              <a:buClrTx/>
+              <a:buSzTx/>
+              <a:buFontTx/>
+              <a:buNone/>
+              <a:tabLst/>
+              <a:defRPr/>
+            </a:pPr>
+            <a:r>
+              <a:rPr lang="es-ES" b="0" dirty="0">
+                <a:solidFill>
+                  <a:srgbClr val="D4D4D4"/>
+                </a:solidFill>
+                <a:effectLst/>
+                <a:latin typeface="Consolas" panose="020B0609020204030204" pitchFamily="49" charset="0"/>
+              </a:rPr>
+              <a:t>En este diagrama representamos como es el flujo de la interfaz de nuestro proyecto. Empezando por una identificación para diferenciar entre Pacientes, Doctores y Enfermeros. Luego procedemos a </a:t>
+            </a:r>
+            <a:r>
+              <a:rPr lang="es-ES" b="0">
+                <a:solidFill>
+                  <a:srgbClr val="D4D4D4"/>
+                </a:solidFill>
+                <a:effectLst/>
+                <a:latin typeface="Consolas" panose="020B0609020204030204" pitchFamily="49" charset="0"/>
+              </a:rPr>
+              <a:t>un menú </a:t>
+            </a:r>
+            <a:r>
+              <a:rPr lang="es-ES" b="0" dirty="0">
+                <a:solidFill>
+                  <a:srgbClr val="D4D4D4"/>
+                </a:solidFill>
+                <a:effectLst/>
+                <a:latin typeface="Consolas" panose="020B0609020204030204" pitchFamily="49" charset="0"/>
+              </a:rPr>
+              <a:t>personalizado para cada uno de ellos con las diferentes opciones que tienen.</a:t>
+            </a:r>
+          </a:p>
+          <a:p>
+            <a:endParaRPr lang="es-ES" dirty="0"/>
+          </a:p>
+        </p:txBody>
+      </p:sp>
+      <p:sp>
+        <p:nvSpPr>
+          <p:cNvPr id="4" name="Marcador de número de diapositiva 3"/>
+          <p:cNvSpPr>
+            <a:spLocks noGrp="1"/>
+          </p:cNvSpPr>
+          <p:nvPr>
+            <p:ph type="sldNum" sz="quarter" idx="5"/>
+          </p:nvPr>
+        </p:nvSpPr>
+        <p:spPr/>
+        <p:txBody>
+          <a:bodyPr/>
+          <a:lstStyle/>
+          <a:p>
+            <a:fld id="{850C8A68-B0DA-436B-AE1F-7E2DFF33396B}" type="slidenum">
+              <a:rPr lang="es-ES" smtClean="0"/>
+              <a:t>4</a:t>
+            </a:fld>
+            <a:endParaRPr lang="es-ES"/>
+          </a:p>
+        </p:txBody>
+      </p:sp>
+    </p:spTree>
+    <p:extLst>
+      <p:ext uri="{BB962C8B-B14F-4D97-AF65-F5344CB8AC3E}">
+        <p14:creationId xmlns:p14="http://schemas.microsoft.com/office/powerpoint/2010/main" val="1831273823"/>
+      </p:ext>
+    </p:extLst>
+  </p:cSld>
+  <p:clrMapOvr>
+    <a:masterClrMapping/>
+  </p:clrMapOvr>
+</p:notes>
+</file>
+
+<file path=ppt/notesSlides/notesSlide4.xml><?xml version="1.0" encoding="utf-8"?>
+<p:notes xmlns:a="http://schemas.openxmlformats.org/drawingml/2006/main" xmlns:r="http://schemas.openxmlformats.org/officeDocument/2006/relationships" xmlns:p="http://schemas.openxmlformats.org/presentationml/2006/main">
+  <p:cSld>
+    <p:spTree>
+      <p:nvGrpSpPr>
+        <p:cNvPr id="1" name=""/>
+        <p:cNvGrpSpPr/>
+        <p:nvPr/>
+      </p:nvGrpSpPr>
+      <p:grpSpPr>
+        <a:xfrm>
+          <a:off x="0" y="0"/>
+          <a:ext cx="0" cy="0"/>
+          <a:chOff x="0" y="0"/>
+          <a:chExt cx="0" cy="0"/>
+        </a:xfrm>
+      </p:grpSpPr>
+      <p:sp>
+        <p:nvSpPr>
+          <p:cNvPr id="2" name="Marcador de imagen de diapositiva 1"/>
+          <p:cNvSpPr>
+            <a:spLocks noGrp="1" noRot="1" noChangeAspect="1"/>
+          </p:cNvSpPr>
+          <p:nvPr>
+            <p:ph type="sldImg"/>
+          </p:nvPr>
+        </p:nvSpPr>
+        <p:spPr/>
+      </p:sp>
+      <p:sp>
+        <p:nvSpPr>
+          <p:cNvPr id="3" name="Marcador de notas 2"/>
+          <p:cNvSpPr>
+            <a:spLocks noGrp="1"/>
+          </p:cNvSpPr>
+          <p:nvPr>
+            <p:ph type="body" idx="1"/>
+          </p:nvPr>
+        </p:nvSpPr>
+        <p:spPr/>
+        <p:txBody>
+          <a:bodyPr/>
+          <a:lstStyle/>
+          <a:p>
             <a:r>
               <a:rPr lang="es-ES" dirty="0"/>
               <a:t>* 3 actores principales: enfermera, paciente y doctor. </a:t>
@@ -792,7 +926,7 @@
           <a:p>
             <a:fld id="{850C8A68-B0DA-436B-AE1F-7E2DFF33396B}" type="slidenum">
               <a:rPr lang="es-ES" smtClean="0"/>
-              <a:t>4</a:t>
+              <a:t>5</a:t>
             </a:fld>
             <a:endParaRPr lang="es-ES"/>
           </a:p>
@@ -811,7 +945,7 @@
 </p:notes>
 </file>
 
-<file path=ppt/notesSlides/notesSlide4.xml><?xml version="1.0" encoding="utf-8"?>
+<file path=ppt/notesSlides/notesSlide5.xml><?xml version="1.0" encoding="utf-8"?>
 <p:notes xmlns:a="http://schemas.openxmlformats.org/drawingml/2006/main" xmlns:r="http://schemas.openxmlformats.org/officeDocument/2006/relationships" xmlns:p="http://schemas.openxmlformats.org/presentationml/2006/main">
   <p:cSld>
     <p:spTree>
@@ -1373,7 +1507,7 @@
           <a:p>
             <a:fld id="{850C8A68-B0DA-436B-AE1F-7E2DFF33396B}" type="slidenum">
               <a:rPr lang="es-ES" smtClean="0"/>
-              <a:t>6</a:t>
+              <a:t>7</a:t>
             </a:fld>
             <a:endParaRPr lang="es-ES"/>
           </a:p>
@@ -1449,7 +1583,7 @@
           <a:noFill/>
           <a:extLst>
             <a:ext uri="{909E8E84-426E-40dd-AFC4-6F175D3DCCD1}">
-              <a14:hiddenFill xmlns:a14="http://schemas.microsoft.com/office/drawing/2010/main" xmlns="">
+              <a14:hiddenFill xmlns="" xmlns:a14="http://schemas.microsoft.com/office/drawing/2010/main">
                 <a:solidFill>
                   <a:srgbClr val="FFFFFF"/>
                 </a:solidFill>
@@ -1508,7 +1642,7 @@
             </a:ln>
             <a:extLst>
               <a:ext uri="{91240B29-F687-4f45-9708-019B960494DF}">
-                <a14:hiddenLine xmlns:a14="http://schemas.microsoft.com/office/drawing/2010/main" xmlns="" w="9525">
+                <a14:hiddenLine xmlns="" xmlns:a14="http://schemas.microsoft.com/office/drawing/2010/main" w="9525">
                   <a:solidFill>
                     <a:srgbClr val="000000"/>
                   </a:solidFill>
@@ -1598,7 +1732,7 @@
             </a:ln>
             <a:extLst>
               <a:ext uri="{91240B29-F687-4f45-9708-019B960494DF}">
-                <a14:hiddenLine xmlns:a14="http://schemas.microsoft.com/office/drawing/2010/main" xmlns="" w="9525">
+                <a14:hiddenLine xmlns="" xmlns:a14="http://schemas.microsoft.com/office/drawing/2010/main" w="9525">
                   <a:solidFill>
                     <a:srgbClr val="000000"/>
                   </a:solidFill>
@@ -1688,7 +1822,7 @@
             </a:ln>
             <a:extLst>
               <a:ext uri="{91240B29-F687-4f45-9708-019B960494DF}">
-                <a14:hiddenLine xmlns:a14="http://schemas.microsoft.com/office/drawing/2010/main" xmlns="" w="9525">
+                <a14:hiddenLine xmlns="" xmlns:a14="http://schemas.microsoft.com/office/drawing/2010/main" w="9525">
                   <a:solidFill>
                     <a:srgbClr val="000000"/>
                   </a:solidFill>
@@ -1722,7 +1856,7 @@
             </a:ln>
             <a:extLst>
               <a:ext uri="{91240B29-F687-4f45-9708-019B960494DF}">
-                <a14:hiddenLine xmlns:a14="http://schemas.microsoft.com/office/drawing/2010/main" xmlns="" w="9525">
+                <a14:hiddenLine xmlns="" xmlns:a14="http://schemas.microsoft.com/office/drawing/2010/main" w="9525">
                   <a:solidFill>
                     <a:srgbClr val="000000"/>
                   </a:solidFill>
@@ -1812,7 +1946,7 @@
             </a:ln>
             <a:extLst>
               <a:ext uri="{91240B29-F687-4f45-9708-019B960494DF}">
-                <a14:hiddenLine xmlns:a14="http://schemas.microsoft.com/office/drawing/2010/main" xmlns="" w="9525">
+                <a14:hiddenLine xmlns="" xmlns:a14="http://schemas.microsoft.com/office/drawing/2010/main" w="9525">
                   <a:solidFill>
                     <a:srgbClr val="000000"/>
                   </a:solidFill>
@@ -1874,7 +2008,7 @@
             </a:ln>
             <a:extLst>
               <a:ext uri="{91240B29-F687-4f45-9708-019B960494DF}">
-                <a14:hiddenLine xmlns:a14="http://schemas.microsoft.com/office/drawing/2010/main" xmlns="" w="9525">
+                <a14:hiddenLine xmlns="" xmlns:a14="http://schemas.microsoft.com/office/drawing/2010/main" w="9525">
                   <a:solidFill>
                     <a:srgbClr val="000000"/>
                   </a:solidFill>
@@ -1936,7 +2070,7 @@
             </a:ln>
             <a:extLst>
               <a:ext uri="{91240B29-F687-4f45-9708-019B960494DF}">
-                <a14:hiddenLine xmlns:a14="http://schemas.microsoft.com/office/drawing/2010/main" xmlns="" w="9525">
+                <a14:hiddenLine xmlns="" xmlns:a14="http://schemas.microsoft.com/office/drawing/2010/main" w="9525">
                   <a:solidFill>
                     <a:srgbClr val="000000"/>
                   </a:solidFill>
@@ -2026,7 +2160,7 @@
             </a:ln>
             <a:extLst>
               <a:ext uri="{91240B29-F687-4f45-9708-019B960494DF}">
-                <a14:hiddenLine xmlns:a14="http://schemas.microsoft.com/office/drawing/2010/main" xmlns="" w="9525">
+                <a14:hiddenLine xmlns="" xmlns:a14="http://schemas.microsoft.com/office/drawing/2010/main" w="9525">
                   <a:solidFill>
                     <a:srgbClr val="000000"/>
                   </a:solidFill>
@@ -2088,7 +2222,7 @@
             </a:ln>
             <a:extLst>
               <a:ext uri="{91240B29-F687-4f45-9708-019B960494DF}">
-                <a14:hiddenLine xmlns:a14="http://schemas.microsoft.com/office/drawing/2010/main" xmlns="" w="9525">
+                <a14:hiddenLine xmlns="" xmlns:a14="http://schemas.microsoft.com/office/drawing/2010/main" w="9525">
                   <a:solidFill>
                     <a:srgbClr val="000000"/>
                   </a:solidFill>
@@ -2150,7 +2284,7 @@
             </a:ln>
             <a:extLst>
               <a:ext uri="{91240B29-F687-4f45-9708-019B960494DF}">
-                <a14:hiddenLine xmlns:a14="http://schemas.microsoft.com/office/drawing/2010/main" xmlns="" w="9525">
+                <a14:hiddenLine xmlns="" xmlns:a14="http://schemas.microsoft.com/office/drawing/2010/main" w="9525">
                   <a:solidFill>
                     <a:srgbClr val="000000"/>
                   </a:solidFill>
@@ -2240,7 +2374,7 @@
             </a:ln>
             <a:extLst>
               <a:ext uri="{91240B29-F687-4f45-9708-019B960494DF}">
-                <a14:hiddenLine xmlns:a14="http://schemas.microsoft.com/office/drawing/2010/main" xmlns="" w="9525">
+                <a14:hiddenLine xmlns="" xmlns:a14="http://schemas.microsoft.com/office/drawing/2010/main" w="9525">
                   <a:solidFill>
                     <a:srgbClr val="000000"/>
                   </a:solidFill>
@@ -2330,7 +2464,7 @@
             </a:ln>
             <a:extLst>
               <a:ext uri="{91240B29-F687-4f45-9708-019B960494DF}">
-                <a14:hiddenLine xmlns:a14="http://schemas.microsoft.com/office/drawing/2010/main" xmlns="" w="9525">
+                <a14:hiddenLine xmlns="" xmlns:a14="http://schemas.microsoft.com/office/drawing/2010/main" w="9525">
                   <a:solidFill>
                     <a:srgbClr val="000000"/>
                   </a:solidFill>
@@ -2392,7 +2526,7 @@
             </a:ln>
             <a:extLst>
               <a:ext uri="{91240B29-F687-4f45-9708-019B960494DF}">
-                <a14:hiddenLine xmlns:a14="http://schemas.microsoft.com/office/drawing/2010/main" xmlns="" w="9525">
+                <a14:hiddenLine xmlns="" xmlns:a14="http://schemas.microsoft.com/office/drawing/2010/main" w="9525">
                   <a:solidFill>
                     <a:srgbClr val="000000"/>
                   </a:solidFill>
@@ -2502,7 +2636,7 @@
             </a:ln>
             <a:extLst>
               <a:ext uri="{91240B29-F687-4f45-9708-019B960494DF}">
-                <a14:hiddenLine xmlns:a14="http://schemas.microsoft.com/office/drawing/2010/main" xmlns="" w="9525">
+                <a14:hiddenLine xmlns="" xmlns:a14="http://schemas.microsoft.com/office/drawing/2010/main" w="9525">
                   <a:solidFill>
                     <a:srgbClr val="000000"/>
                   </a:solidFill>
@@ -2564,7 +2698,7 @@
             </a:ln>
             <a:extLst>
               <a:ext uri="{91240B29-F687-4f45-9708-019B960494DF}">
-                <a14:hiddenLine xmlns:a14="http://schemas.microsoft.com/office/drawing/2010/main" xmlns="" w="9525">
+                <a14:hiddenLine xmlns="" xmlns:a14="http://schemas.microsoft.com/office/drawing/2010/main" w="9525">
                   <a:solidFill>
                     <a:srgbClr val="000000"/>
                   </a:solidFill>
@@ -2654,7 +2788,7 @@
             </a:ln>
             <a:extLst>
               <a:ext uri="{91240B29-F687-4f45-9708-019B960494DF}">
-                <a14:hiddenLine xmlns:a14="http://schemas.microsoft.com/office/drawing/2010/main" xmlns="" w="9525">
+                <a14:hiddenLine xmlns="" xmlns:a14="http://schemas.microsoft.com/office/drawing/2010/main" w="9525">
                   <a:solidFill>
                     <a:srgbClr val="000000"/>
                   </a:solidFill>
@@ -2744,7 +2878,7 @@
             </a:ln>
             <a:extLst>
               <a:ext uri="{91240B29-F687-4f45-9708-019B960494DF}">
-                <a14:hiddenLine xmlns:a14="http://schemas.microsoft.com/office/drawing/2010/main" xmlns="" w="9525">
+                <a14:hiddenLine xmlns="" xmlns:a14="http://schemas.microsoft.com/office/drawing/2010/main" w="9525">
                   <a:solidFill>
                     <a:srgbClr val="000000"/>
                   </a:solidFill>
@@ -2806,7 +2940,7 @@
             </a:ln>
             <a:extLst>
               <a:ext uri="{91240B29-F687-4f45-9708-019B960494DF}">
-                <a14:hiddenLine xmlns:a14="http://schemas.microsoft.com/office/drawing/2010/main" xmlns="" w="9525">
+                <a14:hiddenLine xmlns="" xmlns:a14="http://schemas.microsoft.com/office/drawing/2010/main" w="9525">
                   <a:solidFill>
                     <a:srgbClr val="000000"/>
                   </a:solidFill>
@@ -2896,7 +3030,7 @@
             </a:ln>
             <a:extLst>
               <a:ext uri="{91240B29-F687-4f45-9708-019B960494DF}">
-                <a14:hiddenLine xmlns:a14="http://schemas.microsoft.com/office/drawing/2010/main" xmlns="" w="9525">
+                <a14:hiddenLine xmlns="" xmlns:a14="http://schemas.microsoft.com/office/drawing/2010/main" w="9525">
                   <a:solidFill>
                     <a:srgbClr val="000000"/>
                   </a:solidFill>
@@ -2986,7 +3120,7 @@
             </a:ln>
             <a:extLst>
               <a:ext uri="{91240B29-F687-4f45-9708-019B960494DF}">
-                <a14:hiddenLine xmlns:a14="http://schemas.microsoft.com/office/drawing/2010/main" xmlns="" w="9525">
+                <a14:hiddenLine xmlns="" xmlns:a14="http://schemas.microsoft.com/office/drawing/2010/main" w="9525">
                   <a:solidFill>
                     <a:srgbClr val="000000"/>
                   </a:solidFill>
@@ -3042,7 +3176,7 @@
             </a:ln>
             <a:extLst>
               <a:ext uri="{91240B29-F687-4f45-9708-019B960494DF}">
-                <a14:hiddenLine xmlns:a14="http://schemas.microsoft.com/office/drawing/2010/main" xmlns="" w="9525">
+                <a14:hiddenLine xmlns="" xmlns:a14="http://schemas.microsoft.com/office/drawing/2010/main" w="9525">
                   <a:solidFill>
                     <a:srgbClr val="000000"/>
                   </a:solidFill>
@@ -3132,7 +3266,7 @@
             </a:ln>
             <a:extLst>
               <a:ext uri="{91240B29-F687-4f45-9708-019B960494DF}">
-                <a14:hiddenLine xmlns:a14="http://schemas.microsoft.com/office/drawing/2010/main" xmlns="" w="9525">
+                <a14:hiddenLine xmlns="" xmlns:a14="http://schemas.microsoft.com/office/drawing/2010/main" w="9525">
                   <a:solidFill>
                     <a:srgbClr val="000000"/>
                   </a:solidFill>
@@ -3188,7 +3322,7 @@
             </a:ln>
             <a:extLst>
               <a:ext uri="{91240B29-F687-4f45-9708-019B960494DF}">
-                <a14:hiddenLine xmlns:a14="http://schemas.microsoft.com/office/drawing/2010/main" xmlns="" w="9525">
+                <a14:hiddenLine xmlns="" xmlns:a14="http://schemas.microsoft.com/office/drawing/2010/main" w="9525">
                   <a:solidFill>
                     <a:srgbClr val="000000"/>
                   </a:solidFill>
@@ -3278,7 +3412,7 @@
             </a:ln>
             <a:extLst>
               <a:ext uri="{91240B29-F687-4f45-9708-019B960494DF}">
-                <a14:hiddenLine xmlns:a14="http://schemas.microsoft.com/office/drawing/2010/main" xmlns="" w="9525">
+                <a14:hiddenLine xmlns="" xmlns:a14="http://schemas.microsoft.com/office/drawing/2010/main" w="9525">
                   <a:solidFill>
                     <a:srgbClr val="000000"/>
                   </a:solidFill>
@@ -3346,7 +3480,7 @@
             </a:ln>
             <a:extLst>
               <a:ext uri="{91240B29-F687-4f45-9708-019B960494DF}">
-                <a14:hiddenLine xmlns:a14="http://schemas.microsoft.com/office/drawing/2010/main" xmlns="" w="9525">
+                <a14:hiddenLine xmlns="" xmlns:a14="http://schemas.microsoft.com/office/drawing/2010/main" w="9525">
                   <a:solidFill>
                     <a:srgbClr val="000000"/>
                   </a:solidFill>
@@ -3436,7 +3570,7 @@
             </a:ln>
             <a:extLst>
               <a:ext uri="{91240B29-F687-4f45-9708-019B960494DF}">
-                <a14:hiddenLine xmlns:a14="http://schemas.microsoft.com/office/drawing/2010/main" xmlns="" w="9525">
+                <a14:hiddenLine xmlns="" xmlns:a14="http://schemas.microsoft.com/office/drawing/2010/main" w="9525">
                   <a:solidFill>
                     <a:srgbClr val="000000"/>
                   </a:solidFill>
@@ -3504,7 +3638,7 @@
             </a:ln>
             <a:extLst>
               <a:ext uri="{91240B29-F687-4f45-9708-019B960494DF}">
-                <a14:hiddenLine xmlns:a14="http://schemas.microsoft.com/office/drawing/2010/main" xmlns="" w="9525">
+                <a14:hiddenLine xmlns="" xmlns:a14="http://schemas.microsoft.com/office/drawing/2010/main" w="9525">
                   <a:solidFill>
                     <a:srgbClr val="000000"/>
                   </a:solidFill>
@@ -3594,7 +3728,7 @@
             </a:ln>
             <a:extLst>
               <a:ext uri="{91240B29-F687-4f45-9708-019B960494DF}">
-                <a14:hiddenLine xmlns:a14="http://schemas.microsoft.com/office/drawing/2010/main" xmlns="" w="9525">
+                <a14:hiddenLine xmlns="" xmlns:a14="http://schemas.microsoft.com/office/drawing/2010/main" w="9525">
                   <a:solidFill>
                     <a:srgbClr val="000000"/>
                   </a:solidFill>
@@ -3628,7 +3762,7 @@
             </a:ln>
             <a:extLst>
               <a:ext uri="{91240B29-F687-4f45-9708-019B960494DF}">
-                <a14:hiddenLine xmlns:a14="http://schemas.microsoft.com/office/drawing/2010/main" xmlns="" w="9525">
+                <a14:hiddenLine xmlns="" xmlns:a14="http://schemas.microsoft.com/office/drawing/2010/main" w="9525">
                   <a:solidFill>
                     <a:srgbClr val="000000"/>
                   </a:solidFill>
@@ -3718,7 +3852,7 @@
             </a:ln>
             <a:extLst>
               <a:ext uri="{91240B29-F687-4f45-9708-019B960494DF}">
-                <a14:hiddenLine xmlns:a14="http://schemas.microsoft.com/office/drawing/2010/main" xmlns="" w="9525">
+                <a14:hiddenLine xmlns="" xmlns:a14="http://schemas.microsoft.com/office/drawing/2010/main" w="9525">
                   <a:solidFill>
                     <a:srgbClr val="000000"/>
                   </a:solidFill>
@@ -3780,7 +3914,7 @@
             </a:ln>
             <a:extLst>
               <a:ext uri="{91240B29-F687-4f45-9708-019B960494DF}">
-                <a14:hiddenLine xmlns:a14="http://schemas.microsoft.com/office/drawing/2010/main" xmlns="" w="9525">
+                <a14:hiddenLine xmlns="" xmlns:a14="http://schemas.microsoft.com/office/drawing/2010/main" w="9525">
                   <a:solidFill>
                     <a:srgbClr val="000000"/>
                   </a:solidFill>
@@ -3842,7 +3976,7 @@
             </a:ln>
             <a:extLst>
               <a:ext uri="{91240B29-F687-4f45-9708-019B960494DF}">
-                <a14:hiddenLine xmlns:a14="http://schemas.microsoft.com/office/drawing/2010/main" xmlns="" w="9525">
+                <a14:hiddenLine xmlns="" xmlns:a14="http://schemas.microsoft.com/office/drawing/2010/main" w="9525">
                   <a:solidFill>
                     <a:srgbClr val="000000"/>
                   </a:solidFill>
@@ -3932,7 +4066,7 @@
             </a:ln>
             <a:extLst>
               <a:ext uri="{91240B29-F687-4f45-9708-019B960494DF}">
-                <a14:hiddenLine xmlns:a14="http://schemas.microsoft.com/office/drawing/2010/main" xmlns="" w="9525">
+                <a14:hiddenLine xmlns="" xmlns:a14="http://schemas.microsoft.com/office/drawing/2010/main" w="9525">
                   <a:solidFill>
                     <a:srgbClr val="000000"/>
                   </a:solidFill>
@@ -4000,7 +4134,7 @@
             </a:ln>
             <a:extLst>
               <a:ext uri="{91240B29-F687-4f45-9708-019B960494DF}">
-                <a14:hiddenLine xmlns:a14="http://schemas.microsoft.com/office/drawing/2010/main" xmlns="" w="9525">
+                <a14:hiddenLine xmlns="" xmlns:a14="http://schemas.microsoft.com/office/drawing/2010/main" w="9525">
                   <a:solidFill>
                     <a:srgbClr val="000000"/>
                   </a:solidFill>
@@ -4062,7 +4196,7 @@
             </a:ln>
             <a:extLst>
               <a:ext uri="{91240B29-F687-4f45-9708-019B960494DF}">
-                <a14:hiddenLine xmlns:a14="http://schemas.microsoft.com/office/drawing/2010/main" xmlns="" w="9525">
+                <a14:hiddenLine xmlns="" xmlns:a14="http://schemas.microsoft.com/office/drawing/2010/main" w="9525">
                   <a:solidFill>
                     <a:srgbClr val="000000"/>
                   </a:solidFill>
@@ -4152,7 +4286,7 @@
             </a:ln>
             <a:extLst>
               <a:ext uri="{91240B29-F687-4f45-9708-019B960494DF}">
-                <a14:hiddenLine xmlns:a14="http://schemas.microsoft.com/office/drawing/2010/main" xmlns="" w="9525">
+                <a14:hiddenLine xmlns="" xmlns:a14="http://schemas.microsoft.com/office/drawing/2010/main" w="9525">
                   <a:solidFill>
                     <a:srgbClr val="000000"/>
                   </a:solidFill>
@@ -4214,7 +4348,7 @@
             </a:ln>
             <a:extLst>
               <a:ext uri="{91240B29-F687-4f45-9708-019B960494DF}">
-                <a14:hiddenLine xmlns:a14="http://schemas.microsoft.com/office/drawing/2010/main" xmlns="" w="9525">
+                <a14:hiddenLine xmlns="" xmlns:a14="http://schemas.microsoft.com/office/drawing/2010/main" w="9525">
                   <a:solidFill>
                     <a:srgbClr val="000000"/>
                   </a:solidFill>
@@ -4304,7 +4438,7 @@
             </a:ln>
             <a:extLst>
               <a:ext uri="{91240B29-F687-4f45-9708-019B960494DF}">
-                <a14:hiddenLine xmlns:a14="http://schemas.microsoft.com/office/drawing/2010/main" xmlns="" w="9525">
+                <a14:hiddenLine xmlns="" xmlns:a14="http://schemas.microsoft.com/office/drawing/2010/main" w="9525">
                   <a:solidFill>
                     <a:srgbClr val="000000"/>
                   </a:solidFill>
@@ -4366,7 +4500,7 @@
             </a:ln>
             <a:extLst>
               <a:ext uri="{91240B29-F687-4f45-9708-019B960494DF}">
-                <a14:hiddenLine xmlns:a14="http://schemas.microsoft.com/office/drawing/2010/main" xmlns="" w="9525">
+                <a14:hiddenLine xmlns="" xmlns:a14="http://schemas.microsoft.com/office/drawing/2010/main" w="9525">
                   <a:solidFill>
                     <a:srgbClr val="000000"/>
                   </a:solidFill>
@@ -4456,7 +4590,7 @@
             </a:ln>
             <a:extLst>
               <a:ext uri="{91240B29-F687-4f45-9708-019B960494DF}">
-                <a14:hiddenLine xmlns:a14="http://schemas.microsoft.com/office/drawing/2010/main" xmlns="" w="9525">
+                <a14:hiddenLine xmlns="" xmlns:a14="http://schemas.microsoft.com/office/drawing/2010/main" w="9525">
                   <a:solidFill>
                     <a:srgbClr val="000000"/>
                   </a:solidFill>
@@ -4490,7 +4624,7 @@
             </a:ln>
             <a:extLst>
               <a:ext uri="{91240B29-F687-4f45-9708-019B960494DF}">
-                <a14:hiddenLine xmlns:a14="http://schemas.microsoft.com/office/drawing/2010/main" xmlns="" w="9525">
+                <a14:hiddenLine xmlns="" xmlns:a14="http://schemas.microsoft.com/office/drawing/2010/main" w="9525">
                   <a:solidFill>
                     <a:srgbClr val="000000"/>
                   </a:solidFill>
@@ -4555,7 +4689,7 @@
             </a:ln>
             <a:extLst>
               <a:ext uri="{91240B29-F687-4f45-9708-019B960494DF}">
-                <a14:hiddenLine xmlns:a14="http://schemas.microsoft.com/office/drawing/2010/main" xmlns="" w="9525">
+                <a14:hiddenLine xmlns="" xmlns:a14="http://schemas.microsoft.com/office/drawing/2010/main" w="9525">
                   <a:solidFill>
                     <a:srgbClr val="000000"/>
                   </a:solidFill>
@@ -4645,7 +4779,7 @@
             </a:ln>
             <a:extLst>
               <a:ext uri="{91240B29-F687-4f45-9708-019B960494DF}">
-                <a14:hiddenLine xmlns:a14="http://schemas.microsoft.com/office/drawing/2010/main" xmlns="" w="9525">
+                <a14:hiddenLine xmlns="" xmlns:a14="http://schemas.microsoft.com/office/drawing/2010/main" w="9525">
                   <a:solidFill>
                     <a:srgbClr val="000000"/>
                   </a:solidFill>
@@ -4707,7 +4841,7 @@
             </a:ln>
             <a:extLst>
               <a:ext uri="{91240B29-F687-4f45-9708-019B960494DF}">
-                <a14:hiddenLine xmlns:a14="http://schemas.microsoft.com/office/drawing/2010/main" xmlns="" w="9525">
+                <a14:hiddenLine xmlns="" xmlns:a14="http://schemas.microsoft.com/office/drawing/2010/main" w="9525">
                   <a:solidFill>
                     <a:srgbClr val="000000"/>
                   </a:solidFill>
@@ -4797,7 +4931,7 @@
             </a:ln>
             <a:extLst>
               <a:ext uri="{91240B29-F687-4f45-9708-019B960494DF}">
-                <a14:hiddenLine xmlns:a14="http://schemas.microsoft.com/office/drawing/2010/main" xmlns="" w="9525">
+                <a14:hiddenLine xmlns="" xmlns:a14="http://schemas.microsoft.com/office/drawing/2010/main" w="9525">
                   <a:solidFill>
                     <a:srgbClr val="000000"/>
                   </a:solidFill>
@@ -4887,7 +5021,7 @@
             </a:ln>
             <a:extLst>
               <a:ext uri="{91240B29-F687-4f45-9708-019B960494DF}">
-                <a14:hiddenLine xmlns:a14="http://schemas.microsoft.com/office/drawing/2010/main" xmlns="" w="9525">
+                <a14:hiddenLine xmlns="" xmlns:a14="http://schemas.microsoft.com/office/drawing/2010/main" w="9525">
                   <a:solidFill>
                     <a:srgbClr val="000000"/>
                   </a:solidFill>
@@ -4952,7 +5086,7 @@
             </a:ln>
             <a:extLst>
               <a:ext uri="{91240B29-F687-4f45-9708-019B960494DF}">
-                <a14:hiddenLine xmlns:a14="http://schemas.microsoft.com/office/drawing/2010/main" xmlns="" w="9525">
+                <a14:hiddenLine xmlns="" xmlns:a14="http://schemas.microsoft.com/office/drawing/2010/main" w="9525">
                   <a:solidFill>
                     <a:srgbClr val="000000"/>
                   </a:solidFill>
@@ -5014,7 +5148,7 @@
             </a:ln>
             <a:extLst>
               <a:ext uri="{91240B29-F687-4f45-9708-019B960494DF}">
-                <a14:hiddenLine xmlns:a14="http://schemas.microsoft.com/office/drawing/2010/main" xmlns="" w="9525">
+                <a14:hiddenLine xmlns="" xmlns:a14="http://schemas.microsoft.com/office/drawing/2010/main" w="9525">
                   <a:solidFill>
                     <a:srgbClr val="000000"/>
                   </a:solidFill>
@@ -5104,7 +5238,7 @@
             </a:ln>
             <a:extLst>
               <a:ext uri="{91240B29-F687-4f45-9708-019B960494DF}">
-                <a14:hiddenLine xmlns:a14="http://schemas.microsoft.com/office/drawing/2010/main" xmlns="" w="9525">
+                <a14:hiddenLine xmlns="" xmlns:a14="http://schemas.microsoft.com/office/drawing/2010/main" w="9525">
                   <a:solidFill>
                     <a:srgbClr val="000000"/>
                   </a:solidFill>
@@ -5194,7 +5328,7 @@
             </a:ln>
             <a:extLst>
               <a:ext uri="{91240B29-F687-4f45-9708-019B960494DF}">
-                <a14:hiddenLine xmlns:a14="http://schemas.microsoft.com/office/drawing/2010/main" xmlns="" w="9525">
+                <a14:hiddenLine xmlns="" xmlns:a14="http://schemas.microsoft.com/office/drawing/2010/main" w="9525">
                   <a:solidFill>
                     <a:srgbClr val="000000"/>
                   </a:solidFill>
@@ -5256,7 +5390,7 @@
             </a:ln>
             <a:extLst>
               <a:ext uri="{91240B29-F687-4f45-9708-019B960494DF}">
-                <a14:hiddenLine xmlns:a14="http://schemas.microsoft.com/office/drawing/2010/main" xmlns="" w="9525">
+                <a14:hiddenLine xmlns="" xmlns:a14="http://schemas.microsoft.com/office/drawing/2010/main" w="9525">
                   <a:solidFill>
                     <a:srgbClr val="000000"/>
                   </a:solidFill>
@@ -5376,7 +5510,7 @@
             </a:ln>
             <a:extLst>
               <a:ext uri="{91240B29-F687-4f45-9708-019B960494DF}">
-                <a14:hiddenLine xmlns:a14="http://schemas.microsoft.com/office/drawing/2010/main" xmlns="" w="9525">
+                <a14:hiddenLine xmlns="" xmlns:a14="http://schemas.microsoft.com/office/drawing/2010/main" w="9525">
                   <a:solidFill>
                     <a:srgbClr val="000000"/>
                   </a:solidFill>
@@ -5444,7 +5578,7 @@
             </a:ln>
             <a:extLst>
               <a:ext uri="{91240B29-F687-4f45-9708-019B960494DF}">
-                <a14:hiddenLine xmlns:a14="http://schemas.microsoft.com/office/drawing/2010/main" xmlns="" w="9525">
+                <a14:hiddenLine xmlns="" xmlns:a14="http://schemas.microsoft.com/office/drawing/2010/main" w="9525">
                   <a:solidFill>
                     <a:srgbClr val="000000"/>
                   </a:solidFill>
@@ -5534,7 +5668,7 @@
             </a:ln>
             <a:extLst>
               <a:ext uri="{91240B29-F687-4f45-9708-019B960494DF}">
-                <a14:hiddenLine xmlns:a14="http://schemas.microsoft.com/office/drawing/2010/main" xmlns="" w="9525">
+                <a14:hiddenLine xmlns="" xmlns:a14="http://schemas.microsoft.com/office/drawing/2010/main" w="9525">
                   <a:solidFill>
                     <a:srgbClr val="000000"/>
                   </a:solidFill>
@@ -5674,7 +5808,7 @@
           <a:p>
             <a:fld id="{48A87A34-81AB-432B-8DAE-1953F412C126}" type="datetimeFigureOut">
               <a:rPr lang="en-US" dirty="0"/>
-              <a:t>4/5/2022</a:t>
+              <a:t>6/10/2022</a:t>
             </a:fld>
             <a:endParaRPr lang="en-US" dirty="0"/>
           </a:p>
@@ -5936,7 +6070,7 @@
           <a:p>
             <a:fld id="{48A87A34-81AB-432B-8DAE-1953F412C126}" type="datetimeFigureOut">
               <a:rPr lang="en-US" dirty="0"/>
-              <a:t>4/5/2022</a:t>
+              <a:t>6/10/2022</a:t>
             </a:fld>
             <a:endParaRPr lang="en-US" dirty="0"/>
           </a:p>
@@ -6127,7 +6261,7 @@
           <a:p>
             <a:fld id="{48A87A34-81AB-432B-8DAE-1953F412C126}" type="datetimeFigureOut">
               <a:rPr lang="en-US" dirty="0"/>
-              <a:t>4/5/2022</a:t>
+              <a:t>6/10/2022</a:t>
             </a:fld>
             <a:endParaRPr lang="en-US" dirty="0"/>
           </a:p>
@@ -6385,7 +6519,7 @@
           <a:p>
             <a:fld id="{48A87A34-81AB-432B-8DAE-1953F412C126}" type="datetimeFigureOut">
               <a:rPr lang="en-US" dirty="0"/>
-              <a:t>4/5/2022</a:t>
+              <a:t>6/10/2022</a:t>
             </a:fld>
             <a:endParaRPr lang="en-US" dirty="0"/>
           </a:p>
@@ -6814,7 +6948,7 @@
           <a:p>
             <a:fld id="{48A87A34-81AB-432B-8DAE-1953F412C126}" type="datetimeFigureOut">
               <a:rPr lang="en-US" dirty="0"/>
-              <a:t>4/5/2022</a:t>
+              <a:t>6/10/2022</a:t>
             </a:fld>
             <a:endParaRPr lang="en-US" dirty="0"/>
           </a:p>
@@ -7355,7 +7489,7 @@
           <a:p>
             <a:fld id="{48A87A34-81AB-432B-8DAE-1953F412C126}" type="datetimeFigureOut">
               <a:rPr lang="en-US" dirty="0"/>
-              <a:t>4/5/2022</a:t>
+              <a:t>6/10/2022</a:t>
             </a:fld>
             <a:endParaRPr lang="en-US" dirty="0"/>
           </a:p>
@@ -8070,7 +8204,7 @@
           <a:p>
             <a:fld id="{48A87A34-81AB-432B-8DAE-1953F412C126}" type="datetimeFigureOut">
               <a:rPr lang="en-US" dirty="0"/>
-              <a:t>4/5/2022</a:t>
+              <a:t>6/10/2022</a:t>
             </a:fld>
             <a:endParaRPr lang="en-US" dirty="0"/>
           </a:p>
@@ -8235,7 +8369,7 @@
           <a:p>
             <a:fld id="{48A87A34-81AB-432B-8DAE-1953F412C126}" type="datetimeFigureOut">
               <a:rPr lang="en-US" dirty="0"/>
-              <a:t>4/5/2022</a:t>
+              <a:t>6/10/2022</a:t>
             </a:fld>
             <a:endParaRPr lang="en-US" dirty="0"/>
           </a:p>
@@ -8410,7 +8544,7 @@
           <a:p>
             <a:fld id="{48A87A34-81AB-432B-8DAE-1953F412C126}" type="datetimeFigureOut">
               <a:rPr lang="en-US" dirty="0"/>
-              <a:t>4/5/2022</a:t>
+              <a:t>6/10/2022</a:t>
             </a:fld>
             <a:endParaRPr lang="en-US" dirty="0"/>
           </a:p>
@@ -8575,7 +8709,7 @@
           <a:p>
             <a:fld id="{48A87A34-81AB-432B-8DAE-1953F412C126}" type="datetimeFigureOut">
               <a:rPr lang="en-US" dirty="0"/>
-              <a:t>4/5/2022</a:t>
+              <a:t>6/10/2022</a:t>
             </a:fld>
             <a:endParaRPr lang="en-US" dirty="0"/>
           </a:p>
@@ -8820,7 +8954,7 @@
           <a:p>
             <a:fld id="{48A87A34-81AB-432B-8DAE-1953F412C126}" type="datetimeFigureOut">
               <a:rPr lang="en-US" dirty="0"/>
-              <a:t>4/5/2022</a:t>
+              <a:t>6/10/2022</a:t>
             </a:fld>
             <a:endParaRPr lang="en-US" dirty="0"/>
           </a:p>
@@ -9047,7 +9181,7 @@
           <a:p>
             <a:fld id="{48A87A34-81AB-432B-8DAE-1953F412C126}" type="datetimeFigureOut">
               <a:rPr lang="en-US" dirty="0"/>
-              <a:t>4/5/2022</a:t>
+              <a:t>6/10/2022</a:t>
             </a:fld>
             <a:endParaRPr lang="en-US" dirty="0"/>
           </a:p>
@@ -9423,7 +9557,7 @@
           <a:p>
             <a:fld id="{48A87A34-81AB-432B-8DAE-1953F412C126}" type="datetimeFigureOut">
               <a:rPr lang="en-US" dirty="0"/>
-              <a:t>4/5/2022</a:t>
+              <a:t>6/10/2022</a:t>
             </a:fld>
             <a:endParaRPr lang="en-US" dirty="0"/>
           </a:p>
@@ -9536,7 +9670,7 @@
           <a:p>
             <a:fld id="{48A87A34-81AB-432B-8DAE-1953F412C126}" type="datetimeFigureOut">
               <a:rPr lang="en-US" dirty="0"/>
-              <a:t>4/5/2022</a:t>
+              <a:t>6/10/2022</a:t>
             </a:fld>
             <a:endParaRPr lang="en-US" dirty="0"/>
           </a:p>
@@ -9626,7 +9760,7 @@
           <a:p>
             <a:fld id="{48A87A34-81AB-432B-8DAE-1953F412C126}" type="datetimeFigureOut">
               <a:rPr lang="en-US" dirty="0"/>
-              <a:t>4/5/2022</a:t>
+              <a:t>6/10/2022</a:t>
             </a:fld>
             <a:endParaRPr lang="en-US" dirty="0"/>
           </a:p>
@@ -9870,7 +10004,7 @@
           <a:p>
             <a:fld id="{48A87A34-81AB-432B-8DAE-1953F412C126}" type="datetimeFigureOut">
               <a:rPr lang="en-US" dirty="0"/>
-              <a:t>4/5/2022</a:t>
+              <a:t>6/10/2022</a:t>
             </a:fld>
             <a:endParaRPr lang="en-US" dirty="0"/>
           </a:p>
@@ -10145,7 +10279,7 @@
           <a:p>
             <a:fld id="{48A87A34-81AB-432B-8DAE-1953F412C126}" type="datetimeFigureOut">
               <a:rPr lang="en-US" dirty="0"/>
-              <a:t>4/5/2022</a:t>
+              <a:t>6/10/2022</a:t>
             </a:fld>
             <a:endParaRPr lang="en-US" dirty="0"/>
           </a:p>
@@ -10263,7 +10397,7 @@
           <a:noFill/>
           <a:extLst>
             <a:ext uri="{909E8E84-426E-40dd-AFC4-6F175D3DCCD1}">
-              <a14:hiddenFill xmlns:a14="http://schemas.microsoft.com/office/drawing/2010/main" xmlns="">
+              <a14:hiddenFill xmlns="" xmlns:a14="http://schemas.microsoft.com/office/drawing/2010/main">
                 <a:solidFill>
                   <a:srgbClr val="FFFFFF"/>
                 </a:solidFill>
@@ -10337,7 +10471,7 @@
               </a:ln>
               <a:extLst>
                 <a:ext uri="{91240B29-F687-4f45-9708-019B960494DF}">
-                  <a14:hiddenLine xmlns:a14="http://schemas.microsoft.com/office/drawing/2010/main" xmlns="" w="9525">
+                  <a14:hiddenLine xmlns="" xmlns:a14="http://schemas.microsoft.com/office/drawing/2010/main" w="9525">
                     <a:solidFill>
                       <a:srgbClr val="000000"/>
                     </a:solidFill>
@@ -10427,7 +10561,7 @@
               </a:ln>
               <a:extLst>
                 <a:ext uri="{91240B29-F687-4f45-9708-019B960494DF}">
-                  <a14:hiddenLine xmlns:a14="http://schemas.microsoft.com/office/drawing/2010/main" xmlns="" w="9525">
+                  <a14:hiddenLine xmlns="" xmlns:a14="http://schemas.microsoft.com/office/drawing/2010/main" w="9525">
                     <a:solidFill>
                       <a:srgbClr val="000000"/>
                     </a:solidFill>
@@ -10517,7 +10651,7 @@
               </a:ln>
               <a:extLst>
                 <a:ext uri="{91240B29-F687-4f45-9708-019B960494DF}">
-                  <a14:hiddenLine xmlns:a14="http://schemas.microsoft.com/office/drawing/2010/main" xmlns="" w="9525">
+                  <a14:hiddenLine xmlns="" xmlns:a14="http://schemas.microsoft.com/office/drawing/2010/main" w="9525">
                     <a:solidFill>
                       <a:srgbClr val="000000"/>
                     </a:solidFill>
@@ -10579,7 +10713,7 @@
               </a:ln>
               <a:extLst>
                 <a:ext uri="{91240B29-F687-4f45-9708-019B960494DF}">
-                  <a14:hiddenLine xmlns:a14="http://schemas.microsoft.com/office/drawing/2010/main" xmlns="" w="9525">
+                  <a14:hiddenLine xmlns="" xmlns:a14="http://schemas.microsoft.com/office/drawing/2010/main" w="9525">
                     <a:solidFill>
                       <a:srgbClr val="000000"/>
                     </a:solidFill>
@@ -10669,7 +10803,7 @@
               </a:ln>
               <a:extLst>
                 <a:ext uri="{91240B29-F687-4f45-9708-019B960494DF}">
-                  <a14:hiddenLine xmlns:a14="http://schemas.microsoft.com/office/drawing/2010/main" xmlns="" w="9525">
+                  <a14:hiddenLine xmlns="" xmlns:a14="http://schemas.microsoft.com/office/drawing/2010/main" w="9525">
                     <a:solidFill>
                       <a:srgbClr val="000000"/>
                     </a:solidFill>
@@ -10731,7 +10865,7 @@
               </a:ln>
               <a:extLst>
                 <a:ext uri="{91240B29-F687-4f45-9708-019B960494DF}">
-                  <a14:hiddenLine xmlns:a14="http://schemas.microsoft.com/office/drawing/2010/main" xmlns="" w="9525">
+                  <a14:hiddenLine xmlns="" xmlns:a14="http://schemas.microsoft.com/office/drawing/2010/main" w="9525">
                     <a:solidFill>
                       <a:srgbClr val="000000"/>
                     </a:solidFill>
@@ -10793,7 +10927,7 @@
               </a:ln>
               <a:extLst>
                 <a:ext uri="{91240B29-F687-4f45-9708-019B960494DF}">
-                  <a14:hiddenLine xmlns:a14="http://schemas.microsoft.com/office/drawing/2010/main" xmlns="" w="9525">
+                  <a14:hiddenLine xmlns="" xmlns:a14="http://schemas.microsoft.com/office/drawing/2010/main" w="9525">
                     <a:solidFill>
                       <a:srgbClr val="000000"/>
                     </a:solidFill>
@@ -10883,7 +11017,7 @@
               </a:ln>
               <a:extLst>
                 <a:ext uri="{91240B29-F687-4f45-9708-019B960494DF}">
-                  <a14:hiddenLine xmlns:a14="http://schemas.microsoft.com/office/drawing/2010/main" xmlns="" w="9525">
+                  <a14:hiddenLine xmlns="" xmlns:a14="http://schemas.microsoft.com/office/drawing/2010/main" w="9525">
                     <a:solidFill>
                       <a:srgbClr val="000000"/>
                     </a:solidFill>
@@ -10973,7 +11107,7 @@
               </a:ln>
               <a:extLst>
                 <a:ext uri="{91240B29-F687-4f45-9708-019B960494DF}">
-                  <a14:hiddenLine xmlns:a14="http://schemas.microsoft.com/office/drawing/2010/main" xmlns="" w="9525">
+                  <a14:hiddenLine xmlns="" xmlns:a14="http://schemas.microsoft.com/office/drawing/2010/main" w="9525">
                     <a:solidFill>
                       <a:srgbClr val="000000"/>
                     </a:solidFill>
@@ -11035,7 +11169,7 @@
               </a:ln>
               <a:extLst>
                 <a:ext uri="{91240B29-F687-4f45-9708-019B960494DF}">
-                  <a14:hiddenLine xmlns:a14="http://schemas.microsoft.com/office/drawing/2010/main" xmlns="" w="9525">
+                  <a14:hiddenLine xmlns="" xmlns:a14="http://schemas.microsoft.com/office/drawing/2010/main" w="9525">
                     <a:solidFill>
                       <a:srgbClr val="000000"/>
                     </a:solidFill>
@@ -11145,7 +11279,7 @@
               </a:ln>
               <a:extLst>
                 <a:ext uri="{91240B29-F687-4f45-9708-019B960494DF}">
-                  <a14:hiddenLine xmlns:a14="http://schemas.microsoft.com/office/drawing/2010/main" xmlns="" w="9525">
+                  <a14:hiddenLine xmlns="" xmlns:a14="http://schemas.microsoft.com/office/drawing/2010/main" w="9525">
                     <a:solidFill>
                       <a:srgbClr val="000000"/>
                     </a:solidFill>
@@ -11229,7 +11363,7 @@
               </a:ln>
               <a:extLst>
                 <a:ext uri="{91240B29-F687-4f45-9708-019B960494DF}">
-                  <a14:hiddenLine xmlns:a14="http://schemas.microsoft.com/office/drawing/2010/main" xmlns="" w="9525">
+                  <a14:hiddenLine xmlns="" xmlns:a14="http://schemas.microsoft.com/office/drawing/2010/main" w="9525">
                     <a:solidFill>
                       <a:srgbClr val="000000"/>
                     </a:solidFill>
@@ -11291,7 +11425,7 @@
               </a:ln>
               <a:extLst>
                 <a:ext uri="{91240B29-F687-4f45-9708-019B960494DF}">
-                  <a14:hiddenLine xmlns:a14="http://schemas.microsoft.com/office/drawing/2010/main" xmlns="" w="9525">
+                  <a14:hiddenLine xmlns="" xmlns:a14="http://schemas.microsoft.com/office/drawing/2010/main" w="9525">
                     <a:solidFill>
                       <a:srgbClr val="000000"/>
                     </a:solidFill>
@@ -11353,7 +11487,7 @@
               </a:ln>
               <a:extLst>
                 <a:ext uri="{91240B29-F687-4f45-9708-019B960494DF}">
-                  <a14:hiddenLine xmlns:a14="http://schemas.microsoft.com/office/drawing/2010/main" xmlns="" w="9525">
+                  <a14:hiddenLine xmlns="" xmlns:a14="http://schemas.microsoft.com/office/drawing/2010/main" w="9525">
                     <a:solidFill>
                       <a:srgbClr val="000000"/>
                     </a:solidFill>
@@ -11443,7 +11577,7 @@
               </a:ln>
               <a:extLst>
                 <a:ext uri="{91240B29-F687-4f45-9708-019B960494DF}">
-                  <a14:hiddenLine xmlns:a14="http://schemas.microsoft.com/office/drawing/2010/main" xmlns="" w="9525">
+                  <a14:hiddenLine xmlns="" xmlns:a14="http://schemas.microsoft.com/office/drawing/2010/main" w="9525">
                     <a:solidFill>
                       <a:srgbClr val="000000"/>
                     </a:solidFill>
@@ -11477,7 +11611,7 @@
               </a:ln>
               <a:extLst>
                 <a:ext uri="{91240B29-F687-4f45-9708-019B960494DF}">
-                  <a14:hiddenLine xmlns:a14="http://schemas.microsoft.com/office/drawing/2010/main" xmlns="" w="9525">
+                  <a14:hiddenLine xmlns="" xmlns:a14="http://schemas.microsoft.com/office/drawing/2010/main" w="9525">
                     <a:solidFill>
                       <a:srgbClr val="000000"/>
                     </a:solidFill>
@@ -11542,7 +11676,7 @@
               </a:ln>
               <a:extLst>
                 <a:ext uri="{91240B29-F687-4f45-9708-019B960494DF}">
-                  <a14:hiddenLine xmlns:a14="http://schemas.microsoft.com/office/drawing/2010/main" xmlns="" w="9525">
+                  <a14:hiddenLine xmlns="" xmlns:a14="http://schemas.microsoft.com/office/drawing/2010/main" w="9525">
                     <a:solidFill>
                       <a:srgbClr val="000000"/>
                     </a:solidFill>
@@ -11632,7 +11766,7 @@
               </a:ln>
               <a:extLst>
                 <a:ext uri="{91240B29-F687-4f45-9708-019B960494DF}">
-                  <a14:hiddenLine xmlns:a14="http://schemas.microsoft.com/office/drawing/2010/main" xmlns="" w="9525">
+                  <a14:hiddenLine xmlns="" xmlns:a14="http://schemas.microsoft.com/office/drawing/2010/main" w="9525">
                     <a:solidFill>
                       <a:srgbClr val="000000"/>
                     </a:solidFill>
@@ -11694,7 +11828,7 @@
               </a:ln>
               <a:extLst>
                 <a:ext uri="{91240B29-F687-4f45-9708-019B960494DF}">
-                  <a14:hiddenLine xmlns:a14="http://schemas.microsoft.com/office/drawing/2010/main" xmlns="" w="9525">
+                  <a14:hiddenLine xmlns="" xmlns:a14="http://schemas.microsoft.com/office/drawing/2010/main" w="9525">
                     <a:solidFill>
                       <a:srgbClr val="000000"/>
                     </a:solidFill>
@@ -11784,7 +11918,7 @@
               </a:ln>
               <a:extLst>
                 <a:ext uri="{91240B29-F687-4f45-9708-019B960494DF}">
-                  <a14:hiddenLine xmlns:a14="http://schemas.microsoft.com/office/drawing/2010/main" xmlns="" w="9525">
+                  <a14:hiddenLine xmlns="" xmlns:a14="http://schemas.microsoft.com/office/drawing/2010/main" w="9525">
                     <a:solidFill>
                       <a:srgbClr val="000000"/>
                     </a:solidFill>
@@ -11849,7 +11983,7 @@
               </a:ln>
               <a:extLst>
                 <a:ext uri="{91240B29-F687-4f45-9708-019B960494DF}">
-                  <a14:hiddenLine xmlns:a14="http://schemas.microsoft.com/office/drawing/2010/main" xmlns="" w="9525">
+                  <a14:hiddenLine xmlns="" xmlns:a14="http://schemas.microsoft.com/office/drawing/2010/main" w="9525">
                     <a:solidFill>
                       <a:srgbClr val="000000"/>
                     </a:solidFill>
@@ -11911,7 +12045,7 @@
               </a:ln>
               <a:extLst>
                 <a:ext uri="{91240B29-F687-4f45-9708-019B960494DF}">
-                  <a14:hiddenLine xmlns:a14="http://schemas.microsoft.com/office/drawing/2010/main" xmlns="" w="9525">
+                  <a14:hiddenLine xmlns="" xmlns:a14="http://schemas.microsoft.com/office/drawing/2010/main" w="9525">
                     <a:solidFill>
                       <a:srgbClr val="000000"/>
                     </a:solidFill>
@@ -12001,7 +12135,7 @@
               </a:ln>
               <a:extLst>
                 <a:ext uri="{91240B29-F687-4f45-9708-019B960494DF}">
-                  <a14:hiddenLine xmlns:a14="http://schemas.microsoft.com/office/drawing/2010/main" xmlns="" w="9525">
+                  <a14:hiddenLine xmlns="" xmlns:a14="http://schemas.microsoft.com/office/drawing/2010/main" w="9525">
                     <a:solidFill>
                       <a:srgbClr val="000000"/>
                     </a:solidFill>
@@ -12091,7 +12225,7 @@
               </a:ln>
               <a:extLst>
                 <a:ext uri="{91240B29-F687-4f45-9708-019B960494DF}">
-                  <a14:hiddenLine xmlns:a14="http://schemas.microsoft.com/office/drawing/2010/main" xmlns="" w="9525">
+                  <a14:hiddenLine xmlns="" xmlns:a14="http://schemas.microsoft.com/office/drawing/2010/main" w="9525">
                     <a:solidFill>
                       <a:srgbClr val="000000"/>
                     </a:solidFill>
@@ -12156,7 +12290,7 @@
               </a:ln>
               <a:extLst>
                 <a:ext uri="{91240B29-F687-4f45-9708-019B960494DF}">
-                  <a14:hiddenLine xmlns:a14="http://schemas.microsoft.com/office/drawing/2010/main" xmlns="" w="9525">
+                  <a14:hiddenLine xmlns="" xmlns:a14="http://schemas.microsoft.com/office/drawing/2010/main" w="9525">
                     <a:solidFill>
                       <a:srgbClr val="000000"/>
                     </a:solidFill>
@@ -12276,7 +12410,7 @@
               </a:ln>
               <a:extLst>
                 <a:ext uri="{91240B29-F687-4f45-9708-019B960494DF}">
-                  <a14:hiddenLine xmlns:a14="http://schemas.microsoft.com/office/drawing/2010/main" xmlns="" w="9525">
+                  <a14:hiddenLine xmlns="" xmlns:a14="http://schemas.microsoft.com/office/drawing/2010/main" w="9525">
                     <a:solidFill>
                       <a:srgbClr val="000000"/>
                     </a:solidFill>
@@ -12357,7 +12491,7 @@
               </a:ln>
               <a:extLst>
                 <a:ext uri="{91240B29-F687-4f45-9708-019B960494DF}">
-                  <a14:hiddenLine xmlns:a14="http://schemas.microsoft.com/office/drawing/2010/main" xmlns="" w="9525">
+                  <a14:hiddenLine xmlns="" xmlns:a14="http://schemas.microsoft.com/office/drawing/2010/main" w="9525">
                     <a:solidFill>
                       <a:srgbClr val="000000"/>
                     </a:solidFill>
@@ -12472,7 +12606,7 @@
               </a:ln>
               <a:extLst>
                 <a:ext uri="{91240B29-F687-4f45-9708-019B960494DF}">
-                  <a14:hiddenLine xmlns:a14="http://schemas.microsoft.com/office/drawing/2010/main" xmlns="" w="9525">
+                  <a14:hiddenLine xmlns="" xmlns:a14="http://schemas.microsoft.com/office/drawing/2010/main" w="9525">
                     <a:solidFill>
                       <a:srgbClr val="000000"/>
                     </a:solidFill>
@@ -12562,7 +12696,7 @@
               </a:ln>
               <a:extLst>
                 <a:ext uri="{91240B29-F687-4f45-9708-019B960494DF}">
-                  <a14:hiddenLine xmlns:a14="http://schemas.microsoft.com/office/drawing/2010/main" xmlns="" w="9525">
+                  <a14:hiddenLine xmlns="" xmlns:a14="http://schemas.microsoft.com/office/drawing/2010/main" w="9525">
                     <a:solidFill>
                       <a:srgbClr val="000000"/>
                     </a:solidFill>
@@ -12627,7 +12761,7 @@
               </a:ln>
               <a:extLst>
                 <a:ext uri="{91240B29-F687-4f45-9708-019B960494DF}">
-                  <a14:hiddenLine xmlns:a14="http://schemas.microsoft.com/office/drawing/2010/main" xmlns="" w="9525">
+                  <a14:hiddenLine xmlns="" xmlns:a14="http://schemas.microsoft.com/office/drawing/2010/main" w="9525">
                     <a:solidFill>
                       <a:srgbClr val="000000"/>
                     </a:solidFill>
@@ -12717,7 +12851,7 @@
               </a:ln>
               <a:extLst>
                 <a:ext uri="{91240B29-F687-4f45-9708-019B960494DF}">
-                  <a14:hiddenLine xmlns:a14="http://schemas.microsoft.com/office/drawing/2010/main" xmlns="" w="9525">
+                  <a14:hiddenLine xmlns="" xmlns:a14="http://schemas.microsoft.com/office/drawing/2010/main" w="9525">
                     <a:solidFill>
                       <a:srgbClr val="000000"/>
                     </a:solidFill>
@@ -12785,7 +12919,7 @@
               </a:ln>
               <a:extLst>
                 <a:ext uri="{91240B29-F687-4f45-9708-019B960494DF}">
-                  <a14:hiddenLine xmlns:a14="http://schemas.microsoft.com/office/drawing/2010/main" xmlns="" w="9525">
+                  <a14:hiddenLine xmlns="" xmlns:a14="http://schemas.microsoft.com/office/drawing/2010/main" w="9525">
                     <a:solidFill>
                       <a:srgbClr val="000000"/>
                     </a:solidFill>
@@ -12875,7 +13009,7 @@
               </a:ln>
               <a:extLst>
                 <a:ext uri="{91240B29-F687-4f45-9708-019B960494DF}">
-                  <a14:hiddenLine xmlns:a14="http://schemas.microsoft.com/office/drawing/2010/main" xmlns="" w="9525">
+                  <a14:hiddenLine xmlns="" xmlns:a14="http://schemas.microsoft.com/office/drawing/2010/main" w="9525">
                     <a:solidFill>
                       <a:srgbClr val="000000"/>
                     </a:solidFill>
@@ -12943,7 +13077,7 @@
               </a:ln>
               <a:extLst>
                 <a:ext uri="{91240B29-F687-4f45-9708-019B960494DF}">
-                  <a14:hiddenLine xmlns:a14="http://schemas.microsoft.com/office/drawing/2010/main" xmlns="" w="9525">
+                  <a14:hiddenLine xmlns="" xmlns:a14="http://schemas.microsoft.com/office/drawing/2010/main" w="9525">
                     <a:solidFill>
                       <a:srgbClr val="000000"/>
                     </a:solidFill>
@@ -13033,7 +13167,7 @@
               </a:ln>
               <a:extLst>
                 <a:ext uri="{91240B29-F687-4f45-9708-019B960494DF}">
-                  <a14:hiddenLine xmlns:a14="http://schemas.microsoft.com/office/drawing/2010/main" xmlns="" w="9525">
+                  <a14:hiddenLine xmlns="" xmlns:a14="http://schemas.microsoft.com/office/drawing/2010/main" w="9525">
                     <a:solidFill>
                       <a:srgbClr val="000000"/>
                     </a:solidFill>
@@ -13067,7 +13201,7 @@
               </a:ln>
               <a:extLst>
                 <a:ext uri="{91240B29-F687-4f45-9708-019B960494DF}">
-                  <a14:hiddenLine xmlns:a14="http://schemas.microsoft.com/office/drawing/2010/main" xmlns="" w="9525">
+                  <a14:hiddenLine xmlns="" xmlns:a14="http://schemas.microsoft.com/office/drawing/2010/main" w="9525">
                     <a:solidFill>
                       <a:srgbClr val="000000"/>
                     </a:solidFill>
@@ -13208,7 +13342,7 @@
             <a:fld id="{48A87A34-81AB-432B-8DAE-1953F412C126}" type="datetimeFigureOut">
               <a:rPr lang="en-US" dirty="0"/>
               <a:pPr/>
-              <a:t>4/5/2022</a:t>
+              <a:t>6/10/2022</a:t>
             </a:fld>
             <a:endParaRPr lang="en-US" dirty="0"/>
           </a:p>
@@ -13793,6 +13927,343 @@
 </p:sld>
 </file>
 
+<file path=ppt/slides/slide10.xml><?xml version="1.0" encoding="utf-8"?>
+<p:sld xmlns:a="http://schemas.openxmlformats.org/drawingml/2006/main" xmlns:r="http://schemas.openxmlformats.org/officeDocument/2006/relationships" xmlns:p="http://schemas.openxmlformats.org/presentationml/2006/main">
+  <p:cSld>
+    <p:spTree>
+      <p:nvGrpSpPr>
+        <p:cNvPr id="1" name=""/>
+        <p:cNvGrpSpPr/>
+        <p:nvPr/>
+      </p:nvGrpSpPr>
+      <p:grpSpPr>
+        <a:xfrm>
+          <a:off x="0" y="0"/>
+          <a:ext cx="0" cy="0"/>
+          <a:chOff x="0" y="0"/>
+          <a:chExt cx="0" cy="0"/>
+        </a:xfrm>
+      </p:grpSpPr>
+      <p:sp>
+        <p:nvSpPr>
+          <p:cNvPr id="2" name="Título 1">
+            <a:extLst>
+              <a:ext uri="{FF2B5EF4-FFF2-40B4-BE49-F238E27FC236}">
+                <a16:creationId xmlns:a16="http://schemas.microsoft.com/office/drawing/2014/main" id="{CF671BC0-D702-4B14-A755-913591B15581}"/>
+              </a:ext>
+            </a:extLst>
+          </p:cNvPr>
+          <p:cNvSpPr>
+            <a:spLocks noGrp="1"/>
+          </p:cNvSpPr>
+          <p:nvPr>
+            <p:ph type="title"/>
+          </p:nvPr>
+        </p:nvSpPr>
+        <p:spPr/>
+        <p:txBody>
+          <a:bodyPr/>
+          <a:lstStyle/>
+          <a:p>
+            <a:pPr algn="ctr"/>
+            <a:r>
+              <a:rPr lang="es-ES" sz="3600" dirty="0"/>
+              <a:t>Tablas en SQL</a:t>
+            </a:r>
+            <a:endParaRPr lang="es-ES" dirty="0"/>
+          </a:p>
+        </p:txBody>
+      </p:sp>
+      <p:sp>
+        <p:nvSpPr>
+          <p:cNvPr id="3" name="CuadroTexto 2">
+            <a:extLst>
+              <a:ext uri="{FF2B5EF4-FFF2-40B4-BE49-F238E27FC236}">
+                <a16:creationId xmlns:a16="http://schemas.microsoft.com/office/drawing/2014/main" id="{712A6D8C-E204-4D31-8CBC-AFE1404E1CE7}"/>
+              </a:ext>
+            </a:extLst>
+          </p:cNvPr>
+          <p:cNvSpPr txBox="1"/>
+          <p:nvPr/>
+        </p:nvSpPr>
+        <p:spPr>
+          <a:xfrm>
+            <a:off x="1571625" y="2619543"/>
+            <a:ext cx="2914650" cy="2585323"/>
+          </a:xfrm>
+          <a:prstGeom prst="rect">
+            <a:avLst/>
+          </a:prstGeom>
+          <a:noFill/>
+        </p:spPr>
+        <p:txBody>
+          <a:bodyPr wrap="square" rtlCol="0">
+            <a:spAutoFit/>
+          </a:bodyPr>
+          <a:lstStyle/>
+          <a:p>
+            <a:r>
+              <a:rPr lang="es-ES" dirty="0"/>
+              <a:t>	EnfermerosPacientes:</a:t>
+            </a:r>
+          </a:p>
+          <a:p>
+            <a:pPr marL="742950" lvl="1" indent="-285750">
+              <a:buFont typeface="Arial" panose="020B0604020202020204" pitchFamily="34" charset="0"/>
+              <a:buChar char="•"/>
+            </a:pPr>
+            <a:r>
+              <a:rPr lang="es-ES" dirty="0"/>
+              <a:t>Id Enfermero.</a:t>
+            </a:r>
+          </a:p>
+          <a:p>
+            <a:pPr marL="742950" lvl="1" indent="-285750">
+              <a:buFont typeface="Arial" panose="020B0604020202020204" pitchFamily="34" charset="0"/>
+              <a:buChar char="•"/>
+            </a:pPr>
+            <a:r>
+              <a:rPr lang="es-ES" dirty="0"/>
+              <a:t>Id Pacientes.</a:t>
+            </a:r>
+          </a:p>
+          <a:p>
+            <a:pPr marL="742950" lvl="1" indent="-285750">
+              <a:buFont typeface="Arial" panose="020B0604020202020204" pitchFamily="34" charset="0"/>
+              <a:buChar char="•"/>
+            </a:pPr>
+            <a:endParaRPr lang="es-ES" dirty="0"/>
+          </a:p>
+          <a:p>
+            <a:pPr lvl="1"/>
+            <a:endParaRPr lang="es-ES" dirty="0"/>
+          </a:p>
+          <a:p>
+            <a:pPr lvl="1"/>
+            <a:r>
+              <a:rPr lang="es-ES" dirty="0"/>
+              <a:t>Habitaciones:</a:t>
+            </a:r>
+          </a:p>
+          <a:p>
+            <a:pPr marL="742950" lvl="1" indent="-285750">
+              <a:buFont typeface="Arial" panose="020B0604020202020204" pitchFamily="34" charset="0"/>
+              <a:buChar char="•"/>
+            </a:pPr>
+            <a:r>
+              <a:rPr lang="es-ES" dirty="0"/>
+              <a:t>Id.</a:t>
+            </a:r>
+          </a:p>
+          <a:p>
+            <a:pPr marL="742950" lvl="1" indent="-285750">
+              <a:buFont typeface="Arial" panose="020B0604020202020204" pitchFamily="34" charset="0"/>
+              <a:buChar char="•"/>
+            </a:pPr>
+            <a:r>
+              <a:rPr lang="es-ES" dirty="0"/>
+              <a:t>Numero Habitación.</a:t>
+            </a:r>
+          </a:p>
+          <a:p>
+            <a:pPr marL="742950" lvl="1" indent="-285750">
+              <a:buFont typeface="Arial" panose="020B0604020202020204" pitchFamily="34" charset="0"/>
+              <a:buChar char="•"/>
+            </a:pPr>
+            <a:r>
+              <a:rPr lang="es-ES" dirty="0"/>
+              <a:t>Estado.</a:t>
+            </a:r>
+          </a:p>
+        </p:txBody>
+      </p:sp>
+      <p:pic>
+        <p:nvPicPr>
+          <p:cNvPr id="5" name="Imagen 4" descr="Interfaz de usuario gráfica, Texto, Sitio web&#10;&#10;Descripción generada automáticamente">
+            <a:extLst>
+              <a:ext uri="{FF2B5EF4-FFF2-40B4-BE49-F238E27FC236}">
+                <a16:creationId xmlns:a16="http://schemas.microsoft.com/office/drawing/2014/main" id="{E48C6981-F60C-406B-9264-BE5704023A67}"/>
+              </a:ext>
+            </a:extLst>
+          </p:cNvPr>
+          <p:cNvPicPr>
+            <a:picLocks noChangeAspect="1"/>
+          </p:cNvPicPr>
+          <p:nvPr/>
+        </p:nvPicPr>
+        <p:blipFill>
+          <a:blip r:embed="rId2"/>
+          <a:stretch>
+            <a:fillRect/>
+          </a:stretch>
+        </p:blipFill>
+        <p:spPr>
+          <a:xfrm>
+            <a:off x="7326610" y="2743200"/>
+            <a:ext cx="3293765" cy="966826"/>
+          </a:xfrm>
+          <a:prstGeom prst="rect">
+            <a:avLst/>
+          </a:prstGeom>
+        </p:spPr>
+      </p:pic>
+      <p:pic>
+        <p:nvPicPr>
+          <p:cNvPr id="7" name="Imagen 6" descr="Interfaz de usuario gráfica, Texto, Aplicación&#10;&#10;Descripción generada automáticamente">
+            <a:extLst>
+              <a:ext uri="{FF2B5EF4-FFF2-40B4-BE49-F238E27FC236}">
+                <a16:creationId xmlns:a16="http://schemas.microsoft.com/office/drawing/2014/main" id="{ABE0775A-AAA5-463A-B748-F156944207C9}"/>
+              </a:ext>
+            </a:extLst>
+          </p:cNvPr>
+          <p:cNvPicPr>
+            <a:picLocks noChangeAspect="1"/>
+          </p:cNvPicPr>
+          <p:nvPr/>
+        </p:nvPicPr>
+        <p:blipFill>
+          <a:blip r:embed="rId3"/>
+          <a:stretch>
+            <a:fillRect/>
+          </a:stretch>
+        </p:blipFill>
+        <p:spPr>
+          <a:xfrm>
+            <a:off x="7326610" y="4063409"/>
+            <a:ext cx="3293764" cy="1416318"/>
+          </a:xfrm>
+          <a:prstGeom prst="rect">
+            <a:avLst/>
+          </a:prstGeom>
+        </p:spPr>
+      </p:pic>
+      <p:sp>
+        <p:nvSpPr>
+          <p:cNvPr id="8" name="Flecha: a la derecha 7">
+            <a:extLst>
+              <a:ext uri="{FF2B5EF4-FFF2-40B4-BE49-F238E27FC236}">
+                <a16:creationId xmlns:a16="http://schemas.microsoft.com/office/drawing/2014/main" id="{2D6B5585-C494-486B-A9F3-40176C06E462}"/>
+              </a:ext>
+            </a:extLst>
+          </p:cNvPr>
+          <p:cNvSpPr/>
+          <p:nvPr/>
+        </p:nvSpPr>
+        <p:spPr>
+          <a:xfrm>
+            <a:off x="5417238" y="3027731"/>
+            <a:ext cx="978408" cy="484632"/>
+          </a:xfrm>
+          <a:prstGeom prst="rightArrow">
+            <a:avLst/>
+          </a:prstGeom>
+          <a:solidFill>
+            <a:schemeClr val="bg2">
+              <a:lumMod val="50000"/>
+              <a:lumOff val="50000"/>
+            </a:schemeClr>
+          </a:solidFill>
+          <a:ln>
+            <a:solidFill>
+              <a:schemeClr val="bg1"/>
+            </a:solidFill>
+          </a:ln>
+        </p:spPr>
+        <p:style>
+          <a:lnRef idx="2">
+            <a:schemeClr val="accent1">
+              <a:shade val="50000"/>
+            </a:schemeClr>
+          </a:lnRef>
+          <a:fillRef idx="1">
+            <a:schemeClr val="accent1"/>
+          </a:fillRef>
+          <a:effectRef idx="0">
+            <a:schemeClr val="accent1"/>
+          </a:effectRef>
+          <a:fontRef idx="minor">
+            <a:schemeClr val="lt1"/>
+          </a:fontRef>
+        </p:style>
+        <p:txBody>
+          <a:bodyPr rtlCol="0" anchor="ctr"/>
+          <a:lstStyle/>
+          <a:p>
+            <a:pPr algn="ctr"/>
+            <a:endParaRPr lang="es-ES"/>
+          </a:p>
+        </p:txBody>
+      </p:sp>
+      <p:sp>
+        <p:nvSpPr>
+          <p:cNvPr id="9" name="Flecha: a la derecha 8">
+            <a:extLst>
+              <a:ext uri="{FF2B5EF4-FFF2-40B4-BE49-F238E27FC236}">
+                <a16:creationId xmlns:a16="http://schemas.microsoft.com/office/drawing/2014/main" id="{AB75753F-21C9-4607-B1FF-1D0A6D87D853}"/>
+              </a:ext>
+            </a:extLst>
+          </p:cNvPr>
+          <p:cNvSpPr/>
+          <p:nvPr/>
+        </p:nvSpPr>
+        <p:spPr>
+          <a:xfrm>
+            <a:off x="5417238" y="4443006"/>
+            <a:ext cx="978408" cy="484632"/>
+          </a:xfrm>
+          <a:prstGeom prst="rightArrow">
+            <a:avLst/>
+          </a:prstGeom>
+          <a:solidFill>
+            <a:schemeClr val="bg2">
+              <a:lumMod val="50000"/>
+              <a:lumOff val="50000"/>
+            </a:schemeClr>
+          </a:solidFill>
+          <a:ln>
+            <a:solidFill>
+              <a:schemeClr val="bg1"/>
+            </a:solidFill>
+          </a:ln>
+        </p:spPr>
+        <p:style>
+          <a:lnRef idx="2">
+            <a:schemeClr val="accent1">
+              <a:shade val="50000"/>
+            </a:schemeClr>
+          </a:lnRef>
+          <a:fillRef idx="1">
+            <a:schemeClr val="accent1"/>
+          </a:fillRef>
+          <a:effectRef idx="0">
+            <a:schemeClr val="accent1"/>
+          </a:effectRef>
+          <a:fontRef idx="minor">
+            <a:schemeClr val="lt1"/>
+          </a:fontRef>
+        </p:style>
+        <p:txBody>
+          <a:bodyPr rtlCol="0" anchor="ctr"/>
+          <a:lstStyle/>
+          <a:p>
+            <a:pPr algn="ctr"/>
+            <a:endParaRPr lang="es-ES"/>
+          </a:p>
+        </p:txBody>
+      </p:sp>
+    </p:spTree>
+    <p:extLst>
+      <p:ext uri="{BB962C8B-B14F-4D97-AF65-F5344CB8AC3E}">
+        <p14:creationId xmlns:p14="http://schemas.microsoft.com/office/powerpoint/2010/main" val="1652138279"/>
+      </p:ext>
+    </p:extLst>
+  </p:cSld>
+  <p:clrMapOvr>
+    <a:masterClrMapping/>
+  </p:clrMapOvr>
+</p:sld>
+</file>
+
 <file path=ppt/slides/slide2.xml><?xml version="1.0" encoding="utf-8"?>
 <p:sld xmlns:a="http://schemas.openxmlformats.org/drawingml/2006/main" xmlns:r="http://schemas.openxmlformats.org/officeDocument/2006/relationships" xmlns:p="http://schemas.openxmlformats.org/presentationml/2006/main">
   <p:cSld>
@@ -13979,7 +14450,7 @@
                   <a:schemeClr val="bg1"/>
                 </a:solidFill>
               </a:rPr>
-              <a:t>interfaz</a:t>
+              <a:t>interfaz ANTIGUA</a:t>
             </a:r>
           </a:p>
         </p:txBody>
@@ -14027,6 +14498,114 @@
 </file>
 
 <file path=ppt/slides/slide4.xml><?xml version="1.0" encoding="utf-8"?>
+<p:sld xmlns:a="http://schemas.openxmlformats.org/drawingml/2006/main" xmlns:r="http://schemas.openxmlformats.org/officeDocument/2006/relationships" xmlns:p="http://schemas.openxmlformats.org/presentationml/2006/main">
+  <p:cSld>
+    <p:bg>
+      <p:bgPr>
+        <a:solidFill>
+          <a:schemeClr val="tx1"/>
+        </a:solidFill>
+        <a:effectLst/>
+      </p:bgPr>
+    </p:bg>
+    <p:spTree>
+      <p:nvGrpSpPr>
+        <p:cNvPr id="1" name=""/>
+        <p:cNvGrpSpPr/>
+        <p:nvPr/>
+      </p:nvGrpSpPr>
+      <p:grpSpPr>
+        <a:xfrm>
+          <a:off x="0" y="0"/>
+          <a:ext cx="0" cy="0"/>
+          <a:chOff x="0" y="0"/>
+          <a:chExt cx="0" cy="0"/>
+        </a:xfrm>
+      </p:grpSpPr>
+      <p:sp>
+        <p:nvSpPr>
+          <p:cNvPr id="2" name="Título 1">
+            <a:extLst>
+              <a:ext uri="{FF2B5EF4-FFF2-40B4-BE49-F238E27FC236}">
+                <a16:creationId xmlns:a16="http://schemas.microsoft.com/office/drawing/2014/main" id="{5C278B81-D8CB-49A6-8AA2-4D09FAA02BE0}"/>
+              </a:ext>
+            </a:extLst>
+          </p:cNvPr>
+          <p:cNvSpPr>
+            <a:spLocks noGrp="1"/>
+          </p:cNvSpPr>
+          <p:nvPr>
+            <p:ph type="title"/>
+          </p:nvPr>
+        </p:nvSpPr>
+        <p:spPr>
+          <a:xfrm>
+            <a:off x="4039927" y="454771"/>
+            <a:ext cx="9905998" cy="896374"/>
+          </a:xfrm>
+        </p:spPr>
+        <p:txBody>
+          <a:bodyPr/>
+          <a:lstStyle/>
+          <a:p>
+            <a:r>
+              <a:rPr lang="es-ES" dirty="0"/>
+              <a:t>				</a:t>
+            </a:r>
+            <a:r>
+              <a:rPr lang="es-ES" dirty="0">
+                <a:solidFill>
+                  <a:schemeClr val="bg1"/>
+                </a:solidFill>
+              </a:rPr>
+              <a:t>interfaz NUEVA</a:t>
+            </a:r>
+          </a:p>
+        </p:txBody>
+      </p:sp>
+      <p:pic>
+        <p:nvPicPr>
+          <p:cNvPr id="6" name="Marcador de contenido 5" descr="Una captura de pantalla de un celular&#10;&#10;Descripción generada automáticamente con confianza media">
+            <a:extLst>
+              <a:ext uri="{FF2B5EF4-FFF2-40B4-BE49-F238E27FC236}">
+                <a16:creationId xmlns:a16="http://schemas.microsoft.com/office/drawing/2014/main" id="{740373D1-4D19-CA74-1A03-0D0AE8583878}"/>
+              </a:ext>
+            </a:extLst>
+          </p:cNvPr>
+          <p:cNvPicPr>
+            <a:picLocks noGrp="1" noChangeAspect="1"/>
+          </p:cNvPicPr>
+          <p:nvPr>
+            <p:ph idx="1"/>
+          </p:nvPr>
+        </p:nvPicPr>
+        <p:blipFill>
+          <a:blip r:embed="rId3"/>
+          <a:stretch>
+            <a:fillRect/>
+          </a:stretch>
+        </p:blipFill>
+        <p:spPr>
+          <a:xfrm>
+            <a:off x="1349604" y="454771"/>
+            <a:ext cx="9905998" cy="6119537"/>
+          </a:xfrm>
+        </p:spPr>
+      </p:pic>
+    </p:spTree>
+    <p:extLst>
+      <p:ext uri="{BB962C8B-B14F-4D97-AF65-F5344CB8AC3E}">
+        <p14:creationId xmlns:p14="http://schemas.microsoft.com/office/powerpoint/2010/main" val="81744778"/>
+      </p:ext>
+    </p:extLst>
+  </p:cSld>
+  <p:clrMapOvr>
+    <a:masterClrMapping/>
+  </p:clrMapOvr>
+</p:sld>
+</file>
+
+<file path=ppt/slides/slide5.xml><?xml version="1.0" encoding="utf-8"?>
 <p:sld xmlns:a="http://schemas.openxmlformats.org/drawingml/2006/main" xmlns:r="http://schemas.openxmlformats.org/officeDocument/2006/relationships" xmlns:p="http://schemas.openxmlformats.org/presentationml/2006/main">
   <p:cSld>
     <p:bg>
@@ -14134,7 +14713,7 @@
 </p:sld>
 </file>
 
-<file path=ppt/slides/slide5.xml><?xml version="1.0" encoding="utf-8"?>
+<file path=ppt/slides/slide6.xml><?xml version="1.0" encoding="utf-8"?>
 <p:sld xmlns:a="http://schemas.openxmlformats.org/drawingml/2006/main" xmlns:r="http://schemas.openxmlformats.org/officeDocument/2006/relationships" xmlns:p="http://schemas.openxmlformats.org/presentationml/2006/main">
   <p:cSld>
     <p:bg>
@@ -14242,7 +14821,7 @@
 </p:sld>
 </file>
 
-<file path=ppt/slides/slide6.xml><?xml version="1.0" encoding="utf-8"?>
+<file path=ppt/slides/slide7.xml><?xml version="1.0" encoding="utf-8"?>
 <p:sld xmlns:a="http://schemas.openxmlformats.org/drawingml/2006/main" xmlns:r="http://schemas.openxmlformats.org/officeDocument/2006/relationships" xmlns:p="http://schemas.openxmlformats.org/presentationml/2006/main">
   <p:cSld>
     <p:bg>
@@ -14315,7 +14894,7 @@
           <a:noFill/>
           <a:extLst>
             <a:ext uri="{909E8E84-426E-40dd-AFC4-6F175D3DCCD1}">
-              <a14:hiddenFill xmlns:a14="http://schemas.microsoft.com/office/drawing/2010/main" xmlns:a16="http://schemas.microsoft.com/office/drawing/2014/main" xmlns="">
+              <a14:hiddenFill xmlns="" xmlns:a16="http://schemas.microsoft.com/office/drawing/2014/main" xmlns:a14="http://schemas.microsoft.com/office/drawing/2010/main">
                 <a:solidFill>
                   <a:srgbClr val="FFFFFF"/>
                 </a:solidFill>
@@ -14407,7 +14986,7 @@
             </a:ln>
             <a:extLst>
               <a:ext uri="{91240B29-F687-4f45-9708-019B960494DF}">
-                <a14:hiddenLine xmlns:a14="http://schemas.microsoft.com/office/drawing/2010/main" xmlns:a16="http://schemas.microsoft.com/office/drawing/2014/main" xmlns="" w="9525">
+                <a14:hiddenLine xmlns="" xmlns:a16="http://schemas.microsoft.com/office/drawing/2014/main" xmlns:a14="http://schemas.microsoft.com/office/drawing/2010/main" w="9525">
                   <a:solidFill>
                     <a:srgbClr val="000000"/>
                   </a:solidFill>
@@ -14512,7 +15091,7 @@
             </a:ln>
             <a:extLst>
               <a:ext uri="{91240B29-F687-4f45-9708-019B960494DF}">
-                <a14:hiddenLine xmlns:a14="http://schemas.microsoft.com/office/drawing/2010/main" xmlns:a16="http://schemas.microsoft.com/office/drawing/2014/main" xmlns="" w="9525">
+                <a14:hiddenLine xmlns="" xmlns:a16="http://schemas.microsoft.com/office/drawing/2014/main" xmlns:a14="http://schemas.microsoft.com/office/drawing/2010/main" w="9525">
                   <a:solidFill>
                     <a:srgbClr val="000000"/>
                   </a:solidFill>
@@ -14617,7 +15196,7 @@
             </a:ln>
             <a:extLst>
               <a:ext uri="{91240B29-F687-4f45-9708-019B960494DF}">
-                <a14:hiddenLine xmlns:a14="http://schemas.microsoft.com/office/drawing/2010/main" xmlns:a16="http://schemas.microsoft.com/office/drawing/2014/main" xmlns="" w="9525">
+                <a14:hiddenLine xmlns="" xmlns:a16="http://schemas.microsoft.com/office/drawing/2014/main" xmlns:a14="http://schemas.microsoft.com/office/drawing/2010/main" w="9525">
                   <a:solidFill>
                     <a:srgbClr val="000000"/>
                   </a:solidFill>
@@ -14666,7 +15245,7 @@
             </a:ln>
             <a:extLst>
               <a:ext uri="{91240B29-F687-4f45-9708-019B960494DF}">
-                <a14:hiddenLine xmlns:a14="http://schemas.microsoft.com/office/drawing/2010/main" xmlns:a16="http://schemas.microsoft.com/office/drawing/2014/main" xmlns="" w="9525">
+                <a14:hiddenLine xmlns="" xmlns:a16="http://schemas.microsoft.com/office/drawing/2014/main" xmlns:a14="http://schemas.microsoft.com/office/drawing/2010/main" w="9525">
                   <a:solidFill>
                     <a:srgbClr val="000000"/>
                   </a:solidFill>
@@ -14771,7 +15350,7 @@
             </a:ln>
             <a:extLst>
               <a:ext uri="{91240B29-F687-4f45-9708-019B960494DF}">
-                <a14:hiddenLine xmlns:a14="http://schemas.microsoft.com/office/drawing/2010/main" xmlns:a16="http://schemas.microsoft.com/office/drawing/2014/main" xmlns="" w="9525">
+                <a14:hiddenLine xmlns="" xmlns:a16="http://schemas.microsoft.com/office/drawing/2014/main" xmlns:a14="http://schemas.microsoft.com/office/drawing/2010/main" w="9525">
                   <a:solidFill>
                     <a:srgbClr val="000000"/>
                   </a:solidFill>
@@ -14848,7 +15427,7 @@
             </a:ln>
             <a:extLst>
               <a:ext uri="{91240B29-F687-4f45-9708-019B960494DF}">
-                <a14:hiddenLine xmlns:a14="http://schemas.microsoft.com/office/drawing/2010/main" xmlns:a16="http://schemas.microsoft.com/office/drawing/2014/main" xmlns="" w="9525">
+                <a14:hiddenLine xmlns="" xmlns:a16="http://schemas.microsoft.com/office/drawing/2014/main" xmlns:a14="http://schemas.microsoft.com/office/drawing/2010/main" w="9525">
                   <a:solidFill>
                     <a:srgbClr val="000000"/>
                   </a:solidFill>
@@ -14925,7 +15504,7 @@
             </a:ln>
             <a:extLst>
               <a:ext uri="{91240B29-F687-4f45-9708-019B960494DF}">
-                <a14:hiddenLine xmlns:a14="http://schemas.microsoft.com/office/drawing/2010/main" xmlns:a16="http://schemas.microsoft.com/office/drawing/2014/main" xmlns="" w="9525">
+                <a14:hiddenLine xmlns="" xmlns:a16="http://schemas.microsoft.com/office/drawing/2014/main" xmlns:a14="http://schemas.microsoft.com/office/drawing/2010/main" w="9525">
                   <a:solidFill>
                     <a:srgbClr val="000000"/>
                   </a:solidFill>
@@ -15030,7 +15609,7 @@
             </a:ln>
             <a:extLst>
               <a:ext uri="{91240B29-F687-4f45-9708-019B960494DF}">
-                <a14:hiddenLine xmlns:a14="http://schemas.microsoft.com/office/drawing/2010/main" xmlns:a16="http://schemas.microsoft.com/office/drawing/2014/main" xmlns="" w="9525">
+                <a14:hiddenLine xmlns="" xmlns:a16="http://schemas.microsoft.com/office/drawing/2014/main" xmlns:a14="http://schemas.microsoft.com/office/drawing/2010/main" w="9525">
                   <a:solidFill>
                     <a:srgbClr val="000000"/>
                   </a:solidFill>
@@ -15107,7 +15686,7 @@
             </a:ln>
             <a:extLst>
               <a:ext uri="{91240B29-F687-4f45-9708-019B960494DF}">
-                <a14:hiddenLine xmlns:a14="http://schemas.microsoft.com/office/drawing/2010/main" xmlns:a16="http://schemas.microsoft.com/office/drawing/2014/main" xmlns="" w="9525">
+                <a14:hiddenLine xmlns="" xmlns:a16="http://schemas.microsoft.com/office/drawing/2014/main" xmlns:a14="http://schemas.microsoft.com/office/drawing/2010/main" w="9525">
                   <a:solidFill>
                     <a:srgbClr val="000000"/>
                   </a:solidFill>
@@ -15184,7 +15763,7 @@
             </a:ln>
             <a:extLst>
               <a:ext uri="{91240B29-F687-4f45-9708-019B960494DF}">
-                <a14:hiddenLine xmlns:a14="http://schemas.microsoft.com/office/drawing/2010/main" xmlns:a16="http://schemas.microsoft.com/office/drawing/2014/main" xmlns="" w="9525">
+                <a14:hiddenLine xmlns="" xmlns:a16="http://schemas.microsoft.com/office/drawing/2014/main" xmlns:a14="http://schemas.microsoft.com/office/drawing/2010/main" w="9525">
                   <a:solidFill>
                     <a:srgbClr val="000000"/>
                   </a:solidFill>
@@ -15289,7 +15868,7 @@
             </a:ln>
             <a:extLst>
               <a:ext uri="{91240B29-F687-4f45-9708-019B960494DF}">
-                <a14:hiddenLine xmlns:a14="http://schemas.microsoft.com/office/drawing/2010/main" xmlns:a16="http://schemas.microsoft.com/office/drawing/2014/main" xmlns="" w="9525">
+                <a14:hiddenLine xmlns="" xmlns:a16="http://schemas.microsoft.com/office/drawing/2014/main" xmlns:a14="http://schemas.microsoft.com/office/drawing/2010/main" w="9525">
                   <a:solidFill>
                     <a:srgbClr val="000000"/>
                   </a:solidFill>
@@ -15394,7 +15973,7 @@
             </a:ln>
             <a:extLst>
               <a:ext uri="{91240B29-F687-4f45-9708-019B960494DF}">
-                <a14:hiddenLine xmlns:a14="http://schemas.microsoft.com/office/drawing/2010/main" xmlns:a16="http://schemas.microsoft.com/office/drawing/2014/main" xmlns="" w="9525">
+                <a14:hiddenLine xmlns="" xmlns:a16="http://schemas.microsoft.com/office/drawing/2014/main" xmlns:a14="http://schemas.microsoft.com/office/drawing/2010/main" w="9525">
                   <a:solidFill>
                     <a:srgbClr val="000000"/>
                   </a:solidFill>
@@ -15471,7 +16050,7 @@
             </a:ln>
             <a:extLst>
               <a:ext uri="{91240B29-F687-4f45-9708-019B960494DF}">
-                <a14:hiddenLine xmlns:a14="http://schemas.microsoft.com/office/drawing/2010/main" xmlns:a16="http://schemas.microsoft.com/office/drawing/2014/main" xmlns="" w="9525">
+                <a14:hiddenLine xmlns="" xmlns:a16="http://schemas.microsoft.com/office/drawing/2014/main" xmlns:a14="http://schemas.microsoft.com/office/drawing/2010/main" w="9525">
                   <a:solidFill>
                     <a:srgbClr val="000000"/>
                   </a:solidFill>
@@ -15596,7 +16175,7 @@
             </a:ln>
             <a:extLst>
               <a:ext uri="{91240B29-F687-4f45-9708-019B960494DF}">
-                <a14:hiddenLine xmlns:a14="http://schemas.microsoft.com/office/drawing/2010/main" xmlns:a16="http://schemas.microsoft.com/office/drawing/2014/main" xmlns="" w="9525">
+                <a14:hiddenLine xmlns="" xmlns:a16="http://schemas.microsoft.com/office/drawing/2014/main" xmlns:a14="http://schemas.microsoft.com/office/drawing/2010/main" w="9525">
                   <a:solidFill>
                     <a:srgbClr val="000000"/>
                   </a:solidFill>
@@ -15673,7 +16252,7 @@
             </a:ln>
             <a:extLst>
               <a:ext uri="{91240B29-F687-4f45-9708-019B960494DF}">
-                <a14:hiddenLine xmlns:a14="http://schemas.microsoft.com/office/drawing/2010/main" xmlns:a16="http://schemas.microsoft.com/office/drawing/2014/main" xmlns="" w="9525">
+                <a14:hiddenLine xmlns="" xmlns:a16="http://schemas.microsoft.com/office/drawing/2014/main" xmlns:a14="http://schemas.microsoft.com/office/drawing/2010/main" w="9525">
                   <a:solidFill>
                     <a:srgbClr val="000000"/>
                   </a:solidFill>
@@ -15778,7 +16357,7 @@
             </a:ln>
             <a:extLst>
               <a:ext uri="{91240B29-F687-4f45-9708-019B960494DF}">
-                <a14:hiddenLine xmlns:a14="http://schemas.microsoft.com/office/drawing/2010/main" xmlns:a16="http://schemas.microsoft.com/office/drawing/2014/main" xmlns="" w="9525">
+                <a14:hiddenLine xmlns="" xmlns:a16="http://schemas.microsoft.com/office/drawing/2014/main" xmlns:a14="http://schemas.microsoft.com/office/drawing/2010/main" w="9525">
                   <a:solidFill>
                     <a:srgbClr val="000000"/>
                   </a:solidFill>
@@ -15883,7 +16462,7 @@
             </a:ln>
             <a:extLst>
               <a:ext uri="{91240B29-F687-4f45-9708-019B960494DF}">
-                <a14:hiddenLine xmlns:a14="http://schemas.microsoft.com/office/drawing/2010/main" xmlns:a16="http://schemas.microsoft.com/office/drawing/2014/main" xmlns="" w="9525">
+                <a14:hiddenLine xmlns="" xmlns:a16="http://schemas.microsoft.com/office/drawing/2014/main" xmlns:a14="http://schemas.microsoft.com/office/drawing/2010/main" w="9525">
                   <a:solidFill>
                     <a:srgbClr val="000000"/>
                   </a:solidFill>
@@ -15960,7 +16539,7 @@
             </a:ln>
             <a:extLst>
               <a:ext uri="{91240B29-F687-4f45-9708-019B960494DF}">
-                <a14:hiddenLine xmlns:a14="http://schemas.microsoft.com/office/drawing/2010/main" xmlns:a16="http://schemas.microsoft.com/office/drawing/2014/main" xmlns="" w="9525">
+                <a14:hiddenLine xmlns="" xmlns:a16="http://schemas.microsoft.com/office/drawing/2014/main" xmlns:a14="http://schemas.microsoft.com/office/drawing/2010/main" w="9525">
                   <a:solidFill>
                     <a:srgbClr val="000000"/>
                   </a:solidFill>
@@ -16065,7 +16644,7 @@
             </a:ln>
             <a:extLst>
               <a:ext uri="{91240B29-F687-4f45-9708-019B960494DF}">
-                <a14:hiddenLine xmlns:a14="http://schemas.microsoft.com/office/drawing/2010/main" xmlns:a16="http://schemas.microsoft.com/office/drawing/2014/main" xmlns="" w="9525">
+                <a14:hiddenLine xmlns="" xmlns:a16="http://schemas.microsoft.com/office/drawing/2014/main" xmlns:a14="http://schemas.microsoft.com/office/drawing/2010/main" w="9525">
                   <a:solidFill>
                     <a:srgbClr val="000000"/>
                   </a:solidFill>
@@ -16170,7 +16749,7 @@
             </a:ln>
             <a:extLst>
               <a:ext uri="{91240B29-F687-4f45-9708-019B960494DF}">
-                <a14:hiddenLine xmlns:a14="http://schemas.microsoft.com/office/drawing/2010/main" xmlns:a16="http://schemas.microsoft.com/office/drawing/2014/main" xmlns="" w="9525">
+                <a14:hiddenLine xmlns="" xmlns:a16="http://schemas.microsoft.com/office/drawing/2014/main" xmlns:a14="http://schemas.microsoft.com/office/drawing/2010/main" w="9525">
                   <a:solidFill>
                     <a:srgbClr val="000000"/>
                   </a:solidFill>
@@ -16241,7 +16820,7 @@
             </a:ln>
             <a:extLst>
               <a:ext uri="{91240B29-F687-4f45-9708-019B960494DF}">
-                <a14:hiddenLine xmlns:a14="http://schemas.microsoft.com/office/drawing/2010/main" xmlns:a16="http://schemas.microsoft.com/office/drawing/2014/main" xmlns="" w="9525">
+                <a14:hiddenLine xmlns="" xmlns:a16="http://schemas.microsoft.com/office/drawing/2014/main" xmlns:a14="http://schemas.microsoft.com/office/drawing/2010/main" w="9525">
                   <a:solidFill>
                     <a:srgbClr val="000000"/>
                   </a:solidFill>
@@ -16346,7 +16925,7 @@
             </a:ln>
             <a:extLst>
               <a:ext uri="{91240B29-F687-4f45-9708-019B960494DF}">
-                <a14:hiddenLine xmlns:a14="http://schemas.microsoft.com/office/drawing/2010/main" xmlns:a16="http://schemas.microsoft.com/office/drawing/2014/main" xmlns="" w="9525">
+                <a14:hiddenLine xmlns="" xmlns:a16="http://schemas.microsoft.com/office/drawing/2014/main" xmlns:a14="http://schemas.microsoft.com/office/drawing/2010/main" w="9525">
                   <a:solidFill>
                     <a:srgbClr val="000000"/>
                   </a:solidFill>
@@ -16417,7 +16996,7 @@
             </a:ln>
             <a:extLst>
               <a:ext uri="{91240B29-F687-4f45-9708-019B960494DF}">
-                <a14:hiddenLine xmlns:a14="http://schemas.microsoft.com/office/drawing/2010/main" xmlns:a16="http://schemas.microsoft.com/office/drawing/2014/main" xmlns="" w="9525">
+                <a14:hiddenLine xmlns="" xmlns:a16="http://schemas.microsoft.com/office/drawing/2014/main" xmlns:a14="http://schemas.microsoft.com/office/drawing/2010/main" w="9525">
                   <a:solidFill>
                     <a:srgbClr val="000000"/>
                   </a:solidFill>
@@ -16522,7 +17101,7 @@
             </a:ln>
             <a:extLst>
               <a:ext uri="{91240B29-F687-4f45-9708-019B960494DF}">
-                <a14:hiddenLine xmlns:a14="http://schemas.microsoft.com/office/drawing/2010/main" xmlns:a16="http://schemas.microsoft.com/office/drawing/2014/main" xmlns="" w="9525">
+                <a14:hiddenLine xmlns="" xmlns:a16="http://schemas.microsoft.com/office/drawing/2014/main" xmlns:a14="http://schemas.microsoft.com/office/drawing/2010/main" w="9525">
                   <a:solidFill>
                     <a:srgbClr val="000000"/>
                   </a:solidFill>
@@ -16605,7 +17184,7 @@
             </a:ln>
             <a:extLst>
               <a:ext uri="{91240B29-F687-4f45-9708-019B960494DF}">
-                <a14:hiddenLine xmlns:a14="http://schemas.microsoft.com/office/drawing/2010/main" xmlns:a16="http://schemas.microsoft.com/office/drawing/2014/main" xmlns="" w="9525">
+                <a14:hiddenLine xmlns="" xmlns:a16="http://schemas.microsoft.com/office/drawing/2014/main" xmlns:a14="http://schemas.microsoft.com/office/drawing/2010/main" w="9525">
                   <a:solidFill>
                     <a:srgbClr val="000000"/>
                   </a:solidFill>
@@ -16710,7 +17289,7 @@
             </a:ln>
             <a:extLst>
               <a:ext uri="{91240B29-F687-4f45-9708-019B960494DF}">
-                <a14:hiddenLine xmlns:a14="http://schemas.microsoft.com/office/drawing/2010/main" xmlns:a16="http://schemas.microsoft.com/office/drawing/2014/main" xmlns="" w="9525">
+                <a14:hiddenLine xmlns="" xmlns:a16="http://schemas.microsoft.com/office/drawing/2014/main" xmlns:a14="http://schemas.microsoft.com/office/drawing/2010/main" w="9525">
                   <a:solidFill>
                     <a:srgbClr val="000000"/>
                   </a:solidFill>
@@ -16793,7 +17372,7 @@
             </a:ln>
             <a:extLst>
               <a:ext uri="{91240B29-F687-4f45-9708-019B960494DF}">
-                <a14:hiddenLine xmlns:a14="http://schemas.microsoft.com/office/drawing/2010/main" xmlns:a16="http://schemas.microsoft.com/office/drawing/2014/main" xmlns="" w="9525">
+                <a14:hiddenLine xmlns="" xmlns:a16="http://schemas.microsoft.com/office/drawing/2014/main" xmlns:a14="http://schemas.microsoft.com/office/drawing/2010/main" w="9525">
                   <a:solidFill>
                     <a:srgbClr val="000000"/>
                   </a:solidFill>
@@ -16898,7 +17477,7 @@
             </a:ln>
             <a:extLst>
               <a:ext uri="{91240B29-F687-4f45-9708-019B960494DF}">
-                <a14:hiddenLine xmlns:a14="http://schemas.microsoft.com/office/drawing/2010/main" xmlns:a16="http://schemas.microsoft.com/office/drawing/2014/main" xmlns="" w="9525">
+                <a14:hiddenLine xmlns="" xmlns:a16="http://schemas.microsoft.com/office/drawing/2014/main" xmlns:a14="http://schemas.microsoft.com/office/drawing/2010/main" w="9525">
                   <a:solidFill>
                     <a:srgbClr val="000000"/>
                   </a:solidFill>
@@ -16947,7 +17526,7 @@
             </a:ln>
             <a:extLst>
               <a:ext uri="{91240B29-F687-4f45-9708-019B960494DF}">
-                <a14:hiddenLine xmlns:a14="http://schemas.microsoft.com/office/drawing/2010/main" xmlns:a16="http://schemas.microsoft.com/office/drawing/2014/main" xmlns="" w="9525">
+                <a14:hiddenLine xmlns="" xmlns:a16="http://schemas.microsoft.com/office/drawing/2014/main" xmlns:a14="http://schemas.microsoft.com/office/drawing/2010/main" w="9525">
                   <a:solidFill>
                     <a:srgbClr val="000000"/>
                   </a:solidFill>
@@ -17052,7 +17631,7 @@
             </a:ln>
             <a:extLst>
               <a:ext uri="{91240B29-F687-4f45-9708-019B960494DF}">
-                <a14:hiddenLine xmlns:a14="http://schemas.microsoft.com/office/drawing/2010/main" xmlns:a16="http://schemas.microsoft.com/office/drawing/2014/main" xmlns="" w="9525">
+                <a14:hiddenLine xmlns="" xmlns:a16="http://schemas.microsoft.com/office/drawing/2014/main" xmlns:a14="http://schemas.microsoft.com/office/drawing/2010/main" w="9525">
                   <a:solidFill>
                     <a:srgbClr val="000000"/>
                   </a:solidFill>
@@ -17129,7 +17708,7 @@
             </a:ln>
             <a:extLst>
               <a:ext uri="{91240B29-F687-4f45-9708-019B960494DF}">
-                <a14:hiddenLine xmlns:a14="http://schemas.microsoft.com/office/drawing/2010/main" xmlns:a16="http://schemas.microsoft.com/office/drawing/2014/main" xmlns="" w="9525">
+                <a14:hiddenLine xmlns="" xmlns:a16="http://schemas.microsoft.com/office/drawing/2014/main" xmlns:a14="http://schemas.microsoft.com/office/drawing/2010/main" w="9525">
                   <a:solidFill>
                     <a:srgbClr val="000000"/>
                   </a:solidFill>
@@ -17206,7 +17785,7 @@
             </a:ln>
             <a:extLst>
               <a:ext uri="{91240B29-F687-4f45-9708-019B960494DF}">
-                <a14:hiddenLine xmlns:a14="http://schemas.microsoft.com/office/drawing/2010/main" xmlns:a16="http://schemas.microsoft.com/office/drawing/2014/main" xmlns="" w="9525">
+                <a14:hiddenLine xmlns="" xmlns:a16="http://schemas.microsoft.com/office/drawing/2014/main" xmlns:a14="http://schemas.microsoft.com/office/drawing/2010/main" w="9525">
                   <a:solidFill>
                     <a:srgbClr val="000000"/>
                   </a:solidFill>
@@ -17311,7 +17890,7 @@
             </a:ln>
             <a:extLst>
               <a:ext uri="{91240B29-F687-4f45-9708-019B960494DF}">
-                <a14:hiddenLine xmlns:a14="http://schemas.microsoft.com/office/drawing/2010/main" xmlns:a16="http://schemas.microsoft.com/office/drawing/2014/main" xmlns="" w="9525">
+                <a14:hiddenLine xmlns="" xmlns:a16="http://schemas.microsoft.com/office/drawing/2014/main" xmlns:a14="http://schemas.microsoft.com/office/drawing/2010/main" w="9525">
                   <a:solidFill>
                     <a:srgbClr val="000000"/>
                   </a:solidFill>
@@ -17394,7 +17973,7 @@
             </a:ln>
             <a:extLst>
               <a:ext uri="{91240B29-F687-4f45-9708-019B960494DF}">
-                <a14:hiddenLine xmlns:a14="http://schemas.microsoft.com/office/drawing/2010/main" xmlns:a16="http://schemas.microsoft.com/office/drawing/2014/main" xmlns="" w="9525">
+                <a14:hiddenLine xmlns="" xmlns:a16="http://schemas.microsoft.com/office/drawing/2014/main" xmlns:a14="http://schemas.microsoft.com/office/drawing/2010/main" w="9525">
                   <a:solidFill>
                     <a:srgbClr val="000000"/>
                   </a:solidFill>
@@ -17471,7 +18050,7 @@
             </a:ln>
             <a:extLst>
               <a:ext uri="{91240B29-F687-4f45-9708-019B960494DF}">
-                <a14:hiddenLine xmlns:a14="http://schemas.microsoft.com/office/drawing/2010/main" xmlns:a16="http://schemas.microsoft.com/office/drawing/2014/main" xmlns="" w="9525">
+                <a14:hiddenLine xmlns="" xmlns:a16="http://schemas.microsoft.com/office/drawing/2014/main" xmlns:a14="http://schemas.microsoft.com/office/drawing/2010/main" w="9525">
                   <a:solidFill>
                     <a:srgbClr val="000000"/>
                   </a:solidFill>
@@ -17576,7 +18155,7 @@
             </a:ln>
             <a:extLst>
               <a:ext uri="{91240B29-F687-4f45-9708-019B960494DF}">
-                <a14:hiddenLine xmlns:a14="http://schemas.microsoft.com/office/drawing/2010/main" xmlns:a16="http://schemas.microsoft.com/office/drawing/2014/main" xmlns="" w="9525">
+                <a14:hiddenLine xmlns="" xmlns:a16="http://schemas.microsoft.com/office/drawing/2014/main" xmlns:a14="http://schemas.microsoft.com/office/drawing/2010/main" w="9525">
                   <a:solidFill>
                     <a:srgbClr val="000000"/>
                   </a:solidFill>
@@ -17653,7 +18232,7 @@
             </a:ln>
             <a:extLst>
               <a:ext uri="{91240B29-F687-4f45-9708-019B960494DF}">
-                <a14:hiddenLine xmlns:a14="http://schemas.microsoft.com/office/drawing/2010/main" xmlns:a16="http://schemas.microsoft.com/office/drawing/2014/main" xmlns="" w="9525">
+                <a14:hiddenLine xmlns="" xmlns:a16="http://schemas.microsoft.com/office/drawing/2014/main" xmlns:a14="http://schemas.microsoft.com/office/drawing/2010/main" w="9525">
                   <a:solidFill>
                     <a:srgbClr val="000000"/>
                   </a:solidFill>
@@ -17758,7 +18337,7 @@
             </a:ln>
             <a:extLst>
               <a:ext uri="{91240B29-F687-4f45-9708-019B960494DF}">
-                <a14:hiddenLine xmlns:a14="http://schemas.microsoft.com/office/drawing/2010/main" xmlns:a16="http://schemas.microsoft.com/office/drawing/2014/main" xmlns="" w="9525">
+                <a14:hiddenLine xmlns="" xmlns:a16="http://schemas.microsoft.com/office/drawing/2014/main" xmlns:a14="http://schemas.microsoft.com/office/drawing/2010/main" w="9525">
                   <a:solidFill>
                     <a:srgbClr val="000000"/>
                   </a:solidFill>
@@ -17835,7 +18414,7 @@
             </a:ln>
             <a:extLst>
               <a:ext uri="{91240B29-F687-4f45-9708-019B960494DF}">
-                <a14:hiddenLine xmlns:a14="http://schemas.microsoft.com/office/drawing/2010/main" xmlns:a16="http://schemas.microsoft.com/office/drawing/2014/main" xmlns="" w="9525">
+                <a14:hiddenLine xmlns="" xmlns:a16="http://schemas.microsoft.com/office/drawing/2014/main" xmlns:a14="http://schemas.microsoft.com/office/drawing/2010/main" w="9525">
                   <a:solidFill>
                     <a:srgbClr val="000000"/>
                   </a:solidFill>
@@ -17940,7 +18519,7 @@
             </a:ln>
             <a:extLst>
               <a:ext uri="{91240B29-F687-4f45-9708-019B960494DF}">
-                <a14:hiddenLine xmlns:a14="http://schemas.microsoft.com/office/drawing/2010/main" xmlns:a16="http://schemas.microsoft.com/office/drawing/2014/main" xmlns="" w="9525">
+                <a14:hiddenLine xmlns="" xmlns:a16="http://schemas.microsoft.com/office/drawing/2014/main" xmlns:a14="http://schemas.microsoft.com/office/drawing/2010/main" w="9525">
                   <a:solidFill>
                     <a:srgbClr val="000000"/>
                   </a:solidFill>
@@ -17989,7 +18568,7 @@
             </a:ln>
             <a:extLst>
               <a:ext uri="{91240B29-F687-4f45-9708-019B960494DF}">
-                <a14:hiddenLine xmlns:a14="http://schemas.microsoft.com/office/drawing/2010/main" xmlns:a16="http://schemas.microsoft.com/office/drawing/2014/main" xmlns="" w="9525">
+                <a14:hiddenLine xmlns="" xmlns:a16="http://schemas.microsoft.com/office/drawing/2014/main" xmlns:a14="http://schemas.microsoft.com/office/drawing/2010/main" w="9525">
                   <a:solidFill>
                     <a:srgbClr val="000000"/>
                   </a:solidFill>
@@ -18069,7 +18648,7 @@
             </a:ln>
             <a:extLst>
               <a:ext uri="{91240B29-F687-4f45-9708-019B960494DF}">
-                <a14:hiddenLine xmlns:a14="http://schemas.microsoft.com/office/drawing/2010/main" xmlns:a16="http://schemas.microsoft.com/office/drawing/2014/main" xmlns="" w="9525">
+                <a14:hiddenLine xmlns="" xmlns:a16="http://schemas.microsoft.com/office/drawing/2014/main" xmlns:a14="http://schemas.microsoft.com/office/drawing/2010/main" w="9525">
                   <a:solidFill>
                     <a:srgbClr val="000000"/>
                   </a:solidFill>
@@ -18174,7 +18753,7 @@
             </a:ln>
             <a:extLst>
               <a:ext uri="{91240B29-F687-4f45-9708-019B960494DF}">
-                <a14:hiddenLine xmlns:a14="http://schemas.microsoft.com/office/drawing/2010/main" xmlns:a16="http://schemas.microsoft.com/office/drawing/2014/main" xmlns="" w="9525">
+                <a14:hiddenLine xmlns="" xmlns:a16="http://schemas.microsoft.com/office/drawing/2014/main" xmlns:a14="http://schemas.microsoft.com/office/drawing/2010/main" w="9525">
                   <a:solidFill>
                     <a:srgbClr val="000000"/>
                   </a:solidFill>
@@ -18251,7 +18830,7 @@
             </a:ln>
             <a:extLst>
               <a:ext uri="{91240B29-F687-4f45-9708-019B960494DF}">
-                <a14:hiddenLine xmlns:a14="http://schemas.microsoft.com/office/drawing/2010/main" xmlns:a16="http://schemas.microsoft.com/office/drawing/2014/main" xmlns="" w="9525">
+                <a14:hiddenLine xmlns="" xmlns:a16="http://schemas.microsoft.com/office/drawing/2014/main" xmlns:a14="http://schemas.microsoft.com/office/drawing/2010/main" w="9525">
                   <a:solidFill>
                     <a:srgbClr val="000000"/>
                   </a:solidFill>
@@ -18356,7 +18935,7 @@
             </a:ln>
             <a:extLst>
               <a:ext uri="{91240B29-F687-4f45-9708-019B960494DF}">
-                <a14:hiddenLine xmlns:a14="http://schemas.microsoft.com/office/drawing/2010/main" xmlns:a16="http://schemas.microsoft.com/office/drawing/2014/main" xmlns="" w="9525">
+                <a14:hiddenLine xmlns="" xmlns:a16="http://schemas.microsoft.com/office/drawing/2014/main" xmlns:a14="http://schemas.microsoft.com/office/drawing/2010/main" w="9525">
                   <a:solidFill>
                     <a:srgbClr val="000000"/>
                   </a:solidFill>
@@ -18461,7 +19040,7 @@
             </a:ln>
             <a:extLst>
               <a:ext uri="{91240B29-F687-4f45-9708-019B960494DF}">
-                <a14:hiddenLine xmlns:a14="http://schemas.microsoft.com/office/drawing/2010/main" xmlns:a16="http://schemas.microsoft.com/office/drawing/2014/main" xmlns="" w="9525">
+                <a14:hiddenLine xmlns="" xmlns:a16="http://schemas.microsoft.com/office/drawing/2014/main" xmlns:a14="http://schemas.microsoft.com/office/drawing/2010/main" w="9525">
                   <a:solidFill>
                     <a:srgbClr val="000000"/>
                   </a:solidFill>
@@ -18541,7 +19120,7 @@
             </a:ln>
             <a:extLst>
               <a:ext uri="{91240B29-F687-4f45-9708-019B960494DF}">
-                <a14:hiddenLine xmlns:a14="http://schemas.microsoft.com/office/drawing/2010/main" xmlns:a16="http://schemas.microsoft.com/office/drawing/2014/main" xmlns="" w="9525">
+                <a14:hiddenLine xmlns="" xmlns:a16="http://schemas.microsoft.com/office/drawing/2014/main" xmlns:a14="http://schemas.microsoft.com/office/drawing/2010/main" w="9525">
                   <a:solidFill>
                     <a:srgbClr val="000000"/>
                   </a:solidFill>
@@ -18618,7 +19197,7 @@
             </a:ln>
             <a:extLst>
               <a:ext uri="{91240B29-F687-4f45-9708-019B960494DF}">
-                <a14:hiddenLine xmlns:a14="http://schemas.microsoft.com/office/drawing/2010/main" xmlns:a16="http://schemas.microsoft.com/office/drawing/2014/main" xmlns="" w="9525">
+                <a14:hiddenLine xmlns="" xmlns:a16="http://schemas.microsoft.com/office/drawing/2014/main" xmlns:a14="http://schemas.microsoft.com/office/drawing/2010/main" w="9525">
                   <a:solidFill>
                     <a:srgbClr val="000000"/>
                   </a:solidFill>
@@ -18723,7 +19302,7 @@
             </a:ln>
             <a:extLst>
               <a:ext uri="{91240B29-F687-4f45-9708-019B960494DF}">
-                <a14:hiddenLine xmlns:a14="http://schemas.microsoft.com/office/drawing/2010/main" xmlns:a16="http://schemas.microsoft.com/office/drawing/2014/main" xmlns="" w="9525">
+                <a14:hiddenLine xmlns="" xmlns:a16="http://schemas.microsoft.com/office/drawing/2014/main" xmlns:a14="http://schemas.microsoft.com/office/drawing/2010/main" w="9525">
                   <a:solidFill>
                     <a:srgbClr val="000000"/>
                   </a:solidFill>
@@ -18828,7 +19407,7 @@
             </a:ln>
             <a:extLst>
               <a:ext uri="{91240B29-F687-4f45-9708-019B960494DF}">
-                <a14:hiddenLine xmlns:a14="http://schemas.microsoft.com/office/drawing/2010/main" xmlns:a16="http://schemas.microsoft.com/office/drawing/2014/main" xmlns="" w="9525">
+                <a14:hiddenLine xmlns="" xmlns:a16="http://schemas.microsoft.com/office/drawing/2014/main" xmlns:a14="http://schemas.microsoft.com/office/drawing/2010/main" w="9525">
                   <a:solidFill>
                     <a:srgbClr val="000000"/>
                   </a:solidFill>
@@ -18905,7 +19484,7 @@
             </a:ln>
             <a:extLst>
               <a:ext uri="{91240B29-F687-4f45-9708-019B960494DF}">
-                <a14:hiddenLine xmlns:a14="http://schemas.microsoft.com/office/drawing/2010/main" xmlns:a16="http://schemas.microsoft.com/office/drawing/2014/main" xmlns="" w="9525">
+                <a14:hiddenLine xmlns="" xmlns:a16="http://schemas.microsoft.com/office/drawing/2014/main" xmlns:a14="http://schemas.microsoft.com/office/drawing/2010/main" w="9525">
                   <a:solidFill>
                     <a:srgbClr val="000000"/>
                   </a:solidFill>
@@ -19040,7 +19619,7 @@
             </a:ln>
             <a:extLst>
               <a:ext uri="{91240B29-F687-4f45-9708-019B960494DF}">
-                <a14:hiddenLine xmlns:a14="http://schemas.microsoft.com/office/drawing/2010/main" xmlns:a16="http://schemas.microsoft.com/office/drawing/2014/main" xmlns="" w="9525">
+                <a14:hiddenLine xmlns="" xmlns:a16="http://schemas.microsoft.com/office/drawing/2014/main" xmlns:a14="http://schemas.microsoft.com/office/drawing/2010/main" w="9525">
                   <a:solidFill>
                     <a:srgbClr val="000000"/>
                   </a:solidFill>
@@ -19123,7 +19702,7 @@
             </a:ln>
             <a:extLst>
               <a:ext uri="{91240B29-F687-4f45-9708-019B960494DF}">
-                <a14:hiddenLine xmlns:a14="http://schemas.microsoft.com/office/drawing/2010/main" xmlns:a16="http://schemas.microsoft.com/office/drawing/2014/main" xmlns="" w="9525">
+                <a14:hiddenLine xmlns="" xmlns:a16="http://schemas.microsoft.com/office/drawing/2014/main" xmlns:a14="http://schemas.microsoft.com/office/drawing/2010/main" w="9525">
                   <a:solidFill>
                     <a:srgbClr val="000000"/>
                   </a:solidFill>
@@ -19228,7 +19807,7 @@
             </a:ln>
             <a:extLst>
               <a:ext uri="{91240B29-F687-4f45-9708-019B960494DF}">
-                <a14:hiddenLine xmlns:a14="http://schemas.microsoft.com/office/drawing/2010/main" xmlns:a16="http://schemas.microsoft.com/office/drawing/2014/main" xmlns="" w="9525">
+                <a14:hiddenLine xmlns="" xmlns:a16="http://schemas.microsoft.com/office/drawing/2014/main" xmlns:a14="http://schemas.microsoft.com/office/drawing/2010/main" w="9525">
                   <a:solidFill>
                     <a:srgbClr val="000000"/>
                   </a:solidFill>
@@ -19422,7 +20001,7 @@
             </a:ln>
             <a:extLst>
               <a:ext uri="{91240B29-F687-4f45-9708-019B960494DF}">
-                <a14:hiddenLine xmlns:a14="http://schemas.microsoft.com/office/drawing/2010/main" xmlns:p14="http://schemas.microsoft.com/office/powerpoint/2010/main" xmlns:a16="http://schemas.microsoft.com/office/drawing/2014/main" xmlns="" w="9525">
+                <a14:hiddenLine xmlns="" xmlns:a16="http://schemas.microsoft.com/office/drawing/2014/main" xmlns:p14="http://schemas.microsoft.com/office/powerpoint/2010/main" xmlns:a14="http://schemas.microsoft.com/office/drawing/2010/main" w="9525">
                   <a:solidFill>
                     <a:srgbClr val="000000"/>
                   </a:solidFill>
@@ -19527,7 +20106,7 @@
             </a:ln>
             <a:extLst>
               <a:ext uri="{91240B29-F687-4f45-9708-019B960494DF}">
-                <a14:hiddenLine xmlns:a14="http://schemas.microsoft.com/office/drawing/2010/main" xmlns:p14="http://schemas.microsoft.com/office/powerpoint/2010/main" xmlns:a16="http://schemas.microsoft.com/office/drawing/2014/main" xmlns="" w="9525">
+                <a14:hiddenLine xmlns="" xmlns:a16="http://schemas.microsoft.com/office/drawing/2014/main" xmlns:p14="http://schemas.microsoft.com/office/powerpoint/2010/main" xmlns:a14="http://schemas.microsoft.com/office/drawing/2010/main" w="9525">
                   <a:solidFill>
                     <a:srgbClr val="000000"/>
                   </a:solidFill>
@@ -19632,7 +20211,7 @@
             </a:ln>
             <a:extLst>
               <a:ext uri="{91240B29-F687-4f45-9708-019B960494DF}">
-                <a14:hiddenLine xmlns:a14="http://schemas.microsoft.com/office/drawing/2010/main" xmlns:p14="http://schemas.microsoft.com/office/powerpoint/2010/main" xmlns:a16="http://schemas.microsoft.com/office/drawing/2014/main" xmlns="" w="9525">
+                <a14:hiddenLine xmlns="" xmlns:a16="http://schemas.microsoft.com/office/drawing/2014/main" xmlns:p14="http://schemas.microsoft.com/office/powerpoint/2010/main" xmlns:a14="http://schemas.microsoft.com/office/drawing/2010/main" w="9525">
                   <a:solidFill>
                     <a:srgbClr val="000000"/>
                   </a:solidFill>
@@ -19681,7 +20260,7 @@
             </a:ln>
             <a:extLst>
               <a:ext uri="{91240B29-F687-4f45-9708-019B960494DF}">
-                <a14:hiddenLine xmlns:a14="http://schemas.microsoft.com/office/drawing/2010/main" xmlns:p14="http://schemas.microsoft.com/office/powerpoint/2010/main" xmlns:a16="http://schemas.microsoft.com/office/drawing/2014/main" xmlns="" w="9525">
+                <a14:hiddenLine xmlns="" xmlns:a16="http://schemas.microsoft.com/office/drawing/2014/main" xmlns:p14="http://schemas.microsoft.com/office/powerpoint/2010/main" xmlns:a14="http://schemas.microsoft.com/office/drawing/2010/main" w="9525">
                   <a:solidFill>
                     <a:srgbClr val="000000"/>
                   </a:solidFill>
@@ -19786,7 +20365,7 @@
             </a:ln>
             <a:extLst>
               <a:ext uri="{91240B29-F687-4f45-9708-019B960494DF}">
-                <a14:hiddenLine xmlns:a14="http://schemas.microsoft.com/office/drawing/2010/main" xmlns:p14="http://schemas.microsoft.com/office/powerpoint/2010/main" xmlns:a16="http://schemas.microsoft.com/office/drawing/2014/main" xmlns="" w="9525">
+                <a14:hiddenLine xmlns="" xmlns:a16="http://schemas.microsoft.com/office/drawing/2014/main" xmlns:p14="http://schemas.microsoft.com/office/powerpoint/2010/main" xmlns:a14="http://schemas.microsoft.com/office/drawing/2010/main" w="9525">
                   <a:solidFill>
                     <a:srgbClr val="000000"/>
                   </a:solidFill>
@@ -19863,7 +20442,7 @@
             </a:ln>
             <a:extLst>
               <a:ext uri="{91240B29-F687-4f45-9708-019B960494DF}">
-                <a14:hiddenLine xmlns:a14="http://schemas.microsoft.com/office/drawing/2010/main" xmlns:p14="http://schemas.microsoft.com/office/powerpoint/2010/main" xmlns:a16="http://schemas.microsoft.com/office/drawing/2014/main" xmlns="" w="9525">
+                <a14:hiddenLine xmlns="" xmlns:a16="http://schemas.microsoft.com/office/drawing/2014/main" xmlns:p14="http://schemas.microsoft.com/office/powerpoint/2010/main" xmlns:a14="http://schemas.microsoft.com/office/drawing/2010/main" w="9525">
                   <a:solidFill>
                     <a:srgbClr val="000000"/>
                   </a:solidFill>
@@ -19940,7 +20519,7 @@
             </a:ln>
             <a:extLst>
               <a:ext uri="{91240B29-F687-4f45-9708-019B960494DF}">
-                <a14:hiddenLine xmlns:a14="http://schemas.microsoft.com/office/drawing/2010/main" xmlns:p14="http://schemas.microsoft.com/office/powerpoint/2010/main" xmlns:a16="http://schemas.microsoft.com/office/drawing/2014/main" xmlns="" w="9525">
+                <a14:hiddenLine xmlns="" xmlns:a16="http://schemas.microsoft.com/office/drawing/2014/main" xmlns:p14="http://schemas.microsoft.com/office/powerpoint/2010/main" xmlns:a14="http://schemas.microsoft.com/office/drawing/2010/main" w="9525">
                   <a:solidFill>
                     <a:srgbClr val="000000"/>
                   </a:solidFill>
@@ -20045,7 +20624,7 @@
             </a:ln>
             <a:extLst>
               <a:ext uri="{91240B29-F687-4f45-9708-019B960494DF}">
-                <a14:hiddenLine xmlns:a14="http://schemas.microsoft.com/office/drawing/2010/main" xmlns:p14="http://schemas.microsoft.com/office/powerpoint/2010/main" xmlns:a16="http://schemas.microsoft.com/office/drawing/2014/main" xmlns="" w="9525">
+                <a14:hiddenLine xmlns="" xmlns:a16="http://schemas.microsoft.com/office/drawing/2014/main" xmlns:p14="http://schemas.microsoft.com/office/powerpoint/2010/main" xmlns:a14="http://schemas.microsoft.com/office/drawing/2010/main" w="9525">
                   <a:solidFill>
                     <a:srgbClr val="000000"/>
                   </a:solidFill>
@@ -20122,7 +20701,7 @@
             </a:ln>
             <a:extLst>
               <a:ext uri="{91240B29-F687-4f45-9708-019B960494DF}">
-                <a14:hiddenLine xmlns:a14="http://schemas.microsoft.com/office/drawing/2010/main" xmlns:p14="http://schemas.microsoft.com/office/powerpoint/2010/main" xmlns:a16="http://schemas.microsoft.com/office/drawing/2014/main" xmlns="" w="9525">
+                <a14:hiddenLine xmlns="" xmlns:a16="http://schemas.microsoft.com/office/drawing/2014/main" xmlns:p14="http://schemas.microsoft.com/office/powerpoint/2010/main" xmlns:a14="http://schemas.microsoft.com/office/drawing/2010/main" w="9525">
                   <a:solidFill>
                     <a:srgbClr val="000000"/>
                   </a:solidFill>
@@ -20199,7 +20778,7 @@
             </a:ln>
             <a:extLst>
               <a:ext uri="{91240B29-F687-4f45-9708-019B960494DF}">
-                <a14:hiddenLine xmlns:a14="http://schemas.microsoft.com/office/drawing/2010/main" xmlns:p14="http://schemas.microsoft.com/office/powerpoint/2010/main" xmlns:a16="http://schemas.microsoft.com/office/drawing/2014/main" xmlns="" w="9525">
+                <a14:hiddenLine xmlns="" xmlns:a16="http://schemas.microsoft.com/office/drawing/2014/main" xmlns:p14="http://schemas.microsoft.com/office/powerpoint/2010/main" xmlns:a14="http://schemas.microsoft.com/office/drawing/2010/main" w="9525">
                   <a:solidFill>
                     <a:srgbClr val="000000"/>
                   </a:solidFill>
@@ -20304,7 +20883,7 @@
             </a:ln>
             <a:extLst>
               <a:ext uri="{91240B29-F687-4f45-9708-019B960494DF}">
-                <a14:hiddenLine xmlns:a14="http://schemas.microsoft.com/office/drawing/2010/main" xmlns:p14="http://schemas.microsoft.com/office/powerpoint/2010/main" xmlns:a16="http://schemas.microsoft.com/office/drawing/2014/main" xmlns="" w="9525">
+                <a14:hiddenLine xmlns="" xmlns:a16="http://schemas.microsoft.com/office/drawing/2014/main" xmlns:p14="http://schemas.microsoft.com/office/powerpoint/2010/main" xmlns:a14="http://schemas.microsoft.com/office/drawing/2010/main" w="9525">
                   <a:solidFill>
                     <a:srgbClr val="000000"/>
                   </a:solidFill>
@@ -20409,7 +20988,7 @@
             </a:ln>
             <a:extLst>
               <a:ext uri="{91240B29-F687-4f45-9708-019B960494DF}">
-                <a14:hiddenLine xmlns:a14="http://schemas.microsoft.com/office/drawing/2010/main" xmlns:p14="http://schemas.microsoft.com/office/powerpoint/2010/main" xmlns:a16="http://schemas.microsoft.com/office/drawing/2014/main" xmlns="" w="9525">
+                <a14:hiddenLine xmlns="" xmlns:a16="http://schemas.microsoft.com/office/drawing/2014/main" xmlns:p14="http://schemas.microsoft.com/office/powerpoint/2010/main" xmlns:a14="http://schemas.microsoft.com/office/drawing/2010/main" w="9525">
                   <a:solidFill>
                     <a:srgbClr val="000000"/>
                   </a:solidFill>
@@ -20486,7 +21065,7 @@
             </a:ln>
             <a:extLst>
               <a:ext uri="{91240B29-F687-4f45-9708-019B960494DF}">
-                <a14:hiddenLine xmlns:a14="http://schemas.microsoft.com/office/drawing/2010/main" xmlns:p14="http://schemas.microsoft.com/office/powerpoint/2010/main" xmlns:a16="http://schemas.microsoft.com/office/drawing/2014/main" xmlns="" w="9525">
+                <a14:hiddenLine xmlns="" xmlns:a16="http://schemas.microsoft.com/office/drawing/2014/main" xmlns:p14="http://schemas.microsoft.com/office/powerpoint/2010/main" xmlns:a14="http://schemas.microsoft.com/office/drawing/2010/main" w="9525">
                   <a:solidFill>
                     <a:srgbClr val="000000"/>
                   </a:solidFill>
@@ -20611,7 +21190,7 @@
             </a:ln>
             <a:extLst>
               <a:ext uri="{91240B29-F687-4f45-9708-019B960494DF}">
-                <a14:hiddenLine xmlns:a14="http://schemas.microsoft.com/office/drawing/2010/main" xmlns:p14="http://schemas.microsoft.com/office/powerpoint/2010/main" xmlns:a16="http://schemas.microsoft.com/office/drawing/2014/main" xmlns="" w="9525">
+                <a14:hiddenLine xmlns="" xmlns:a16="http://schemas.microsoft.com/office/drawing/2014/main" xmlns:p14="http://schemas.microsoft.com/office/powerpoint/2010/main" xmlns:a14="http://schemas.microsoft.com/office/drawing/2010/main" w="9525">
                   <a:solidFill>
                     <a:srgbClr val="000000"/>
                   </a:solidFill>
@@ -20688,7 +21267,7 @@
             </a:ln>
             <a:extLst>
               <a:ext uri="{91240B29-F687-4f45-9708-019B960494DF}">
-                <a14:hiddenLine xmlns:a14="http://schemas.microsoft.com/office/drawing/2010/main" xmlns:p14="http://schemas.microsoft.com/office/powerpoint/2010/main" xmlns:a16="http://schemas.microsoft.com/office/drawing/2014/main" xmlns="" w="9525">
+                <a14:hiddenLine xmlns="" xmlns:a16="http://schemas.microsoft.com/office/drawing/2014/main" xmlns:p14="http://schemas.microsoft.com/office/powerpoint/2010/main" xmlns:a14="http://schemas.microsoft.com/office/drawing/2010/main" w="9525">
                   <a:solidFill>
                     <a:srgbClr val="000000"/>
                   </a:solidFill>
@@ -20793,7 +21372,7 @@
             </a:ln>
             <a:extLst>
               <a:ext uri="{91240B29-F687-4f45-9708-019B960494DF}">
-                <a14:hiddenLine xmlns:a14="http://schemas.microsoft.com/office/drawing/2010/main" xmlns:p14="http://schemas.microsoft.com/office/powerpoint/2010/main" xmlns:a16="http://schemas.microsoft.com/office/drawing/2014/main" xmlns="" w="9525">
+                <a14:hiddenLine xmlns="" xmlns:a16="http://schemas.microsoft.com/office/drawing/2014/main" xmlns:p14="http://schemas.microsoft.com/office/powerpoint/2010/main" xmlns:a14="http://schemas.microsoft.com/office/drawing/2010/main" w="9525">
                   <a:solidFill>
                     <a:srgbClr val="000000"/>
                   </a:solidFill>
@@ -20898,7 +21477,7 @@
             </a:ln>
             <a:extLst>
               <a:ext uri="{91240B29-F687-4f45-9708-019B960494DF}">
-                <a14:hiddenLine xmlns:a14="http://schemas.microsoft.com/office/drawing/2010/main" xmlns:p14="http://schemas.microsoft.com/office/powerpoint/2010/main" xmlns:a16="http://schemas.microsoft.com/office/drawing/2014/main" xmlns="" w="9525">
+                <a14:hiddenLine xmlns="" xmlns:a16="http://schemas.microsoft.com/office/drawing/2014/main" xmlns:p14="http://schemas.microsoft.com/office/powerpoint/2010/main" xmlns:a14="http://schemas.microsoft.com/office/drawing/2010/main" w="9525">
                   <a:solidFill>
                     <a:srgbClr val="000000"/>
                   </a:solidFill>
@@ -20975,7 +21554,7 @@
             </a:ln>
             <a:extLst>
               <a:ext uri="{91240B29-F687-4f45-9708-019B960494DF}">
-                <a14:hiddenLine xmlns:a14="http://schemas.microsoft.com/office/drawing/2010/main" xmlns:p14="http://schemas.microsoft.com/office/powerpoint/2010/main" xmlns:a16="http://schemas.microsoft.com/office/drawing/2014/main" xmlns="" w="9525">
+                <a14:hiddenLine xmlns="" xmlns:a16="http://schemas.microsoft.com/office/drawing/2014/main" xmlns:p14="http://schemas.microsoft.com/office/powerpoint/2010/main" xmlns:a14="http://schemas.microsoft.com/office/drawing/2010/main" w="9525">
                   <a:solidFill>
                     <a:srgbClr val="000000"/>
                   </a:solidFill>
@@ -21080,7 +21659,7 @@
             </a:ln>
             <a:extLst>
               <a:ext uri="{91240B29-F687-4f45-9708-019B960494DF}">
-                <a14:hiddenLine xmlns:a14="http://schemas.microsoft.com/office/drawing/2010/main" xmlns:p14="http://schemas.microsoft.com/office/powerpoint/2010/main" xmlns:a16="http://schemas.microsoft.com/office/drawing/2014/main" xmlns="" w="9525">
+                <a14:hiddenLine xmlns="" xmlns:a16="http://schemas.microsoft.com/office/drawing/2014/main" xmlns:p14="http://schemas.microsoft.com/office/powerpoint/2010/main" xmlns:a14="http://schemas.microsoft.com/office/drawing/2010/main" w="9525">
                   <a:solidFill>
                     <a:srgbClr val="000000"/>
                   </a:solidFill>
@@ -21185,7 +21764,7 @@
             </a:ln>
             <a:extLst>
               <a:ext uri="{91240B29-F687-4f45-9708-019B960494DF}">
-                <a14:hiddenLine xmlns:a14="http://schemas.microsoft.com/office/drawing/2010/main" xmlns:p14="http://schemas.microsoft.com/office/powerpoint/2010/main" xmlns:a16="http://schemas.microsoft.com/office/drawing/2014/main" xmlns="" w="9525">
+                <a14:hiddenLine xmlns="" xmlns:a16="http://schemas.microsoft.com/office/drawing/2014/main" xmlns:p14="http://schemas.microsoft.com/office/powerpoint/2010/main" xmlns:a14="http://schemas.microsoft.com/office/drawing/2010/main" w="9525">
                   <a:solidFill>
                     <a:srgbClr val="000000"/>
                   </a:solidFill>
@@ -21256,7 +21835,7 @@
             </a:ln>
             <a:extLst>
               <a:ext uri="{91240B29-F687-4f45-9708-019B960494DF}">
-                <a14:hiddenLine xmlns:a14="http://schemas.microsoft.com/office/drawing/2010/main" xmlns:p14="http://schemas.microsoft.com/office/powerpoint/2010/main" xmlns:a16="http://schemas.microsoft.com/office/drawing/2014/main" xmlns="" w="9525">
+                <a14:hiddenLine xmlns="" xmlns:a16="http://schemas.microsoft.com/office/drawing/2014/main" xmlns:p14="http://schemas.microsoft.com/office/powerpoint/2010/main" xmlns:a14="http://schemas.microsoft.com/office/drawing/2010/main" w="9525">
                   <a:solidFill>
                     <a:srgbClr val="000000"/>
                   </a:solidFill>
@@ -21361,7 +21940,7 @@
             </a:ln>
             <a:extLst>
               <a:ext uri="{91240B29-F687-4f45-9708-019B960494DF}">
-                <a14:hiddenLine xmlns:a14="http://schemas.microsoft.com/office/drawing/2010/main" xmlns:p14="http://schemas.microsoft.com/office/powerpoint/2010/main" xmlns:a16="http://schemas.microsoft.com/office/drawing/2014/main" xmlns="" w="9525">
+                <a14:hiddenLine xmlns="" xmlns:a16="http://schemas.microsoft.com/office/drawing/2014/main" xmlns:p14="http://schemas.microsoft.com/office/powerpoint/2010/main" xmlns:a14="http://schemas.microsoft.com/office/drawing/2010/main" w="9525">
                   <a:solidFill>
                     <a:srgbClr val="000000"/>
                   </a:solidFill>
@@ -21432,7 +22011,7 @@
             </a:ln>
             <a:extLst>
               <a:ext uri="{91240B29-F687-4f45-9708-019B960494DF}">
-                <a14:hiddenLine xmlns:a14="http://schemas.microsoft.com/office/drawing/2010/main" xmlns:p14="http://schemas.microsoft.com/office/powerpoint/2010/main" xmlns:a16="http://schemas.microsoft.com/office/drawing/2014/main" xmlns="" w="9525">
+                <a14:hiddenLine xmlns="" xmlns:a16="http://schemas.microsoft.com/office/drawing/2014/main" xmlns:p14="http://schemas.microsoft.com/office/powerpoint/2010/main" xmlns:a14="http://schemas.microsoft.com/office/drawing/2010/main" w="9525">
                   <a:solidFill>
                     <a:srgbClr val="000000"/>
                   </a:solidFill>
@@ -21537,7 +22116,7 @@
             </a:ln>
             <a:extLst>
               <a:ext uri="{91240B29-F687-4f45-9708-019B960494DF}">
-                <a14:hiddenLine xmlns:a14="http://schemas.microsoft.com/office/drawing/2010/main" xmlns:p14="http://schemas.microsoft.com/office/powerpoint/2010/main" xmlns:a16="http://schemas.microsoft.com/office/drawing/2014/main" xmlns="" w="9525">
+                <a14:hiddenLine xmlns="" xmlns:a16="http://schemas.microsoft.com/office/drawing/2014/main" xmlns:p14="http://schemas.microsoft.com/office/powerpoint/2010/main" xmlns:a14="http://schemas.microsoft.com/office/drawing/2010/main" w="9525">
                   <a:solidFill>
                     <a:srgbClr val="000000"/>
                   </a:solidFill>
@@ -21620,7 +22199,7 @@
             </a:ln>
             <a:extLst>
               <a:ext uri="{91240B29-F687-4f45-9708-019B960494DF}">
-                <a14:hiddenLine xmlns:a14="http://schemas.microsoft.com/office/drawing/2010/main" xmlns:p14="http://schemas.microsoft.com/office/powerpoint/2010/main" xmlns:a16="http://schemas.microsoft.com/office/drawing/2014/main" xmlns="" w="9525">
+                <a14:hiddenLine xmlns="" xmlns:a16="http://schemas.microsoft.com/office/drawing/2014/main" xmlns:p14="http://schemas.microsoft.com/office/powerpoint/2010/main" xmlns:a14="http://schemas.microsoft.com/office/drawing/2010/main" w="9525">
                   <a:solidFill>
                     <a:srgbClr val="000000"/>
                   </a:solidFill>
@@ -21725,7 +22304,7 @@
             </a:ln>
             <a:extLst>
               <a:ext uri="{91240B29-F687-4f45-9708-019B960494DF}">
-                <a14:hiddenLine xmlns:a14="http://schemas.microsoft.com/office/drawing/2010/main" xmlns:p14="http://schemas.microsoft.com/office/powerpoint/2010/main" xmlns:a16="http://schemas.microsoft.com/office/drawing/2014/main" xmlns="" w="9525">
+                <a14:hiddenLine xmlns="" xmlns:a16="http://schemas.microsoft.com/office/drawing/2014/main" xmlns:p14="http://schemas.microsoft.com/office/powerpoint/2010/main" xmlns:a14="http://schemas.microsoft.com/office/drawing/2010/main" w="9525">
                   <a:solidFill>
                     <a:srgbClr val="000000"/>
                   </a:solidFill>
@@ -21808,7 +22387,7 @@
             </a:ln>
             <a:extLst>
               <a:ext uri="{91240B29-F687-4f45-9708-019B960494DF}">
-                <a14:hiddenLine xmlns:a14="http://schemas.microsoft.com/office/drawing/2010/main" xmlns:p14="http://schemas.microsoft.com/office/powerpoint/2010/main" xmlns:a16="http://schemas.microsoft.com/office/drawing/2014/main" xmlns="" w="9525">
+                <a14:hiddenLine xmlns="" xmlns:a16="http://schemas.microsoft.com/office/drawing/2014/main" xmlns:p14="http://schemas.microsoft.com/office/powerpoint/2010/main" xmlns:a14="http://schemas.microsoft.com/office/drawing/2010/main" w="9525">
                   <a:solidFill>
                     <a:srgbClr val="000000"/>
                   </a:solidFill>
@@ -21913,7 +22492,7 @@
             </a:ln>
             <a:extLst>
               <a:ext uri="{91240B29-F687-4f45-9708-019B960494DF}">
-                <a14:hiddenLine xmlns:a14="http://schemas.microsoft.com/office/drawing/2010/main" xmlns:p14="http://schemas.microsoft.com/office/powerpoint/2010/main" xmlns:a16="http://schemas.microsoft.com/office/drawing/2014/main" xmlns="" w="9525">
+                <a14:hiddenLine xmlns="" xmlns:a16="http://schemas.microsoft.com/office/drawing/2014/main" xmlns:p14="http://schemas.microsoft.com/office/powerpoint/2010/main" xmlns:a14="http://schemas.microsoft.com/office/drawing/2010/main" w="9525">
                   <a:solidFill>
                     <a:srgbClr val="000000"/>
                   </a:solidFill>
@@ -21962,7 +22541,7 @@
             </a:ln>
             <a:extLst>
               <a:ext uri="{91240B29-F687-4f45-9708-019B960494DF}">
-                <a14:hiddenLine xmlns:a14="http://schemas.microsoft.com/office/drawing/2010/main" xmlns:p14="http://schemas.microsoft.com/office/powerpoint/2010/main" xmlns:a16="http://schemas.microsoft.com/office/drawing/2014/main" xmlns="" w="9525">
+                <a14:hiddenLine xmlns="" xmlns:a16="http://schemas.microsoft.com/office/drawing/2014/main" xmlns:p14="http://schemas.microsoft.com/office/powerpoint/2010/main" xmlns:a14="http://schemas.microsoft.com/office/drawing/2010/main" w="9525">
                   <a:solidFill>
                     <a:srgbClr val="000000"/>
                   </a:solidFill>
@@ -22067,7 +22646,7 @@
             </a:ln>
             <a:extLst>
               <a:ext uri="{91240B29-F687-4f45-9708-019B960494DF}">
-                <a14:hiddenLine xmlns:a14="http://schemas.microsoft.com/office/drawing/2010/main" xmlns:p14="http://schemas.microsoft.com/office/powerpoint/2010/main" xmlns:a16="http://schemas.microsoft.com/office/drawing/2014/main" xmlns="" w="9525">
+                <a14:hiddenLine xmlns="" xmlns:a16="http://schemas.microsoft.com/office/drawing/2014/main" xmlns:p14="http://schemas.microsoft.com/office/powerpoint/2010/main" xmlns:a14="http://schemas.microsoft.com/office/drawing/2010/main" w="9525">
                   <a:solidFill>
                     <a:srgbClr val="000000"/>
                   </a:solidFill>
@@ -22144,7 +22723,7 @@
             </a:ln>
             <a:extLst>
               <a:ext uri="{91240B29-F687-4f45-9708-019B960494DF}">
-                <a14:hiddenLine xmlns:a14="http://schemas.microsoft.com/office/drawing/2010/main" xmlns:p14="http://schemas.microsoft.com/office/powerpoint/2010/main" xmlns:a16="http://schemas.microsoft.com/office/drawing/2014/main" xmlns="" w="9525">
+                <a14:hiddenLine xmlns="" xmlns:a16="http://schemas.microsoft.com/office/drawing/2014/main" xmlns:p14="http://schemas.microsoft.com/office/powerpoint/2010/main" xmlns:a14="http://schemas.microsoft.com/office/drawing/2010/main" w="9525">
                   <a:solidFill>
                     <a:srgbClr val="000000"/>
                   </a:solidFill>
@@ -22221,7 +22800,7 @@
             </a:ln>
             <a:extLst>
               <a:ext uri="{91240B29-F687-4f45-9708-019B960494DF}">
-                <a14:hiddenLine xmlns:a14="http://schemas.microsoft.com/office/drawing/2010/main" xmlns:p14="http://schemas.microsoft.com/office/powerpoint/2010/main" xmlns:a16="http://schemas.microsoft.com/office/drawing/2014/main" xmlns="" w="9525">
+                <a14:hiddenLine xmlns="" xmlns:a16="http://schemas.microsoft.com/office/drawing/2014/main" xmlns:p14="http://schemas.microsoft.com/office/powerpoint/2010/main" xmlns:a14="http://schemas.microsoft.com/office/drawing/2010/main" w="9525">
                   <a:solidFill>
                     <a:srgbClr val="000000"/>
                   </a:solidFill>
@@ -22326,7 +22905,7 @@
             </a:ln>
             <a:extLst>
               <a:ext uri="{91240B29-F687-4f45-9708-019B960494DF}">
-                <a14:hiddenLine xmlns:a14="http://schemas.microsoft.com/office/drawing/2010/main" xmlns:p14="http://schemas.microsoft.com/office/powerpoint/2010/main" xmlns:a16="http://schemas.microsoft.com/office/drawing/2014/main" xmlns="" w="9525">
+                <a14:hiddenLine xmlns="" xmlns:a16="http://schemas.microsoft.com/office/drawing/2014/main" xmlns:p14="http://schemas.microsoft.com/office/powerpoint/2010/main" xmlns:a14="http://schemas.microsoft.com/office/drawing/2010/main" w="9525">
                   <a:solidFill>
                     <a:srgbClr val="000000"/>
                   </a:solidFill>
@@ -22409,7 +22988,7 @@
             </a:ln>
             <a:extLst>
               <a:ext uri="{91240B29-F687-4f45-9708-019B960494DF}">
-                <a14:hiddenLine xmlns:a14="http://schemas.microsoft.com/office/drawing/2010/main" xmlns:p14="http://schemas.microsoft.com/office/powerpoint/2010/main" xmlns:a16="http://schemas.microsoft.com/office/drawing/2014/main" xmlns="" w="9525">
+                <a14:hiddenLine xmlns="" xmlns:a16="http://schemas.microsoft.com/office/drawing/2014/main" xmlns:p14="http://schemas.microsoft.com/office/powerpoint/2010/main" xmlns:a14="http://schemas.microsoft.com/office/drawing/2010/main" w="9525">
                   <a:solidFill>
                     <a:srgbClr val="000000"/>
                   </a:solidFill>
@@ -22486,7 +23065,7 @@
             </a:ln>
             <a:extLst>
               <a:ext uri="{91240B29-F687-4f45-9708-019B960494DF}">
-                <a14:hiddenLine xmlns:a14="http://schemas.microsoft.com/office/drawing/2010/main" xmlns:p14="http://schemas.microsoft.com/office/powerpoint/2010/main" xmlns:a16="http://schemas.microsoft.com/office/drawing/2014/main" xmlns="" w="9525">
+                <a14:hiddenLine xmlns="" xmlns:a16="http://schemas.microsoft.com/office/drawing/2014/main" xmlns:p14="http://schemas.microsoft.com/office/powerpoint/2010/main" xmlns:a14="http://schemas.microsoft.com/office/drawing/2010/main" w="9525">
                   <a:solidFill>
                     <a:srgbClr val="000000"/>
                   </a:solidFill>
@@ -22591,7 +23170,7 @@
             </a:ln>
             <a:extLst>
               <a:ext uri="{91240B29-F687-4f45-9708-019B960494DF}">
-                <a14:hiddenLine xmlns:a14="http://schemas.microsoft.com/office/drawing/2010/main" xmlns:p14="http://schemas.microsoft.com/office/powerpoint/2010/main" xmlns:a16="http://schemas.microsoft.com/office/drawing/2014/main" xmlns="" w="9525">
+                <a14:hiddenLine xmlns="" xmlns:a16="http://schemas.microsoft.com/office/drawing/2014/main" xmlns:p14="http://schemas.microsoft.com/office/powerpoint/2010/main" xmlns:a14="http://schemas.microsoft.com/office/drawing/2010/main" w="9525">
                   <a:solidFill>
                     <a:srgbClr val="000000"/>
                   </a:solidFill>
@@ -22668,7 +23247,7 @@
             </a:ln>
             <a:extLst>
               <a:ext uri="{91240B29-F687-4f45-9708-019B960494DF}">
-                <a14:hiddenLine xmlns:a14="http://schemas.microsoft.com/office/drawing/2010/main" xmlns:p14="http://schemas.microsoft.com/office/powerpoint/2010/main" xmlns:a16="http://schemas.microsoft.com/office/drawing/2014/main" xmlns="" w="9525">
+                <a14:hiddenLine xmlns="" xmlns:a16="http://schemas.microsoft.com/office/drawing/2014/main" xmlns:p14="http://schemas.microsoft.com/office/powerpoint/2010/main" xmlns:a14="http://schemas.microsoft.com/office/drawing/2010/main" w="9525">
                   <a:solidFill>
                     <a:srgbClr val="000000"/>
                   </a:solidFill>
@@ -22773,7 +23352,7 @@
             </a:ln>
             <a:extLst>
               <a:ext uri="{91240B29-F687-4f45-9708-019B960494DF}">
-                <a14:hiddenLine xmlns:a14="http://schemas.microsoft.com/office/drawing/2010/main" xmlns:p14="http://schemas.microsoft.com/office/powerpoint/2010/main" xmlns:a16="http://schemas.microsoft.com/office/drawing/2014/main" xmlns="" w="9525">
+                <a14:hiddenLine xmlns="" xmlns:a16="http://schemas.microsoft.com/office/drawing/2014/main" xmlns:p14="http://schemas.microsoft.com/office/powerpoint/2010/main" xmlns:a14="http://schemas.microsoft.com/office/drawing/2010/main" w="9525">
                   <a:solidFill>
                     <a:srgbClr val="000000"/>
                   </a:solidFill>
@@ -22850,7 +23429,7 @@
             </a:ln>
             <a:extLst>
               <a:ext uri="{91240B29-F687-4f45-9708-019B960494DF}">
-                <a14:hiddenLine xmlns:a14="http://schemas.microsoft.com/office/drawing/2010/main" xmlns:p14="http://schemas.microsoft.com/office/powerpoint/2010/main" xmlns:a16="http://schemas.microsoft.com/office/drawing/2014/main" xmlns="" w="9525">
+                <a14:hiddenLine xmlns="" xmlns:a16="http://schemas.microsoft.com/office/drawing/2014/main" xmlns:p14="http://schemas.microsoft.com/office/powerpoint/2010/main" xmlns:a14="http://schemas.microsoft.com/office/drawing/2010/main" w="9525">
                   <a:solidFill>
                     <a:srgbClr val="000000"/>
                   </a:solidFill>
@@ -22955,7 +23534,7 @@
             </a:ln>
             <a:extLst>
               <a:ext uri="{91240B29-F687-4f45-9708-019B960494DF}">
-                <a14:hiddenLine xmlns:a14="http://schemas.microsoft.com/office/drawing/2010/main" xmlns:p14="http://schemas.microsoft.com/office/powerpoint/2010/main" xmlns:a16="http://schemas.microsoft.com/office/drawing/2014/main" xmlns="" w="9525">
+                <a14:hiddenLine xmlns="" xmlns:a16="http://schemas.microsoft.com/office/drawing/2014/main" xmlns:p14="http://schemas.microsoft.com/office/powerpoint/2010/main" xmlns:a14="http://schemas.microsoft.com/office/drawing/2010/main" w="9525">
                   <a:solidFill>
                     <a:srgbClr val="000000"/>
                   </a:solidFill>
@@ -23004,7 +23583,7 @@
             </a:ln>
             <a:extLst>
               <a:ext uri="{91240B29-F687-4f45-9708-019B960494DF}">
-                <a14:hiddenLine xmlns:a14="http://schemas.microsoft.com/office/drawing/2010/main" xmlns:p14="http://schemas.microsoft.com/office/powerpoint/2010/main" xmlns:a16="http://schemas.microsoft.com/office/drawing/2014/main" xmlns="" w="9525">
+                <a14:hiddenLine xmlns="" xmlns:a16="http://schemas.microsoft.com/office/drawing/2014/main" xmlns:p14="http://schemas.microsoft.com/office/powerpoint/2010/main" xmlns:a14="http://schemas.microsoft.com/office/drawing/2010/main" w="9525">
                   <a:solidFill>
                     <a:srgbClr val="000000"/>
                   </a:solidFill>
@@ -23084,7 +23663,7 @@
             </a:ln>
             <a:extLst>
               <a:ext uri="{91240B29-F687-4f45-9708-019B960494DF}">
-                <a14:hiddenLine xmlns:a14="http://schemas.microsoft.com/office/drawing/2010/main" xmlns:p14="http://schemas.microsoft.com/office/powerpoint/2010/main" xmlns:a16="http://schemas.microsoft.com/office/drawing/2014/main" xmlns="" w="9525">
+                <a14:hiddenLine xmlns="" xmlns:a16="http://schemas.microsoft.com/office/drawing/2014/main" xmlns:p14="http://schemas.microsoft.com/office/powerpoint/2010/main" xmlns:a14="http://schemas.microsoft.com/office/drawing/2010/main" w="9525">
                   <a:solidFill>
                     <a:srgbClr val="000000"/>
                   </a:solidFill>
@@ -23189,7 +23768,7 @@
             </a:ln>
             <a:extLst>
               <a:ext uri="{91240B29-F687-4f45-9708-019B960494DF}">
-                <a14:hiddenLine xmlns:a14="http://schemas.microsoft.com/office/drawing/2010/main" xmlns:p14="http://schemas.microsoft.com/office/powerpoint/2010/main" xmlns:a16="http://schemas.microsoft.com/office/drawing/2014/main" xmlns="" w="9525">
+                <a14:hiddenLine xmlns="" xmlns:a16="http://schemas.microsoft.com/office/drawing/2014/main" xmlns:p14="http://schemas.microsoft.com/office/powerpoint/2010/main" xmlns:a14="http://schemas.microsoft.com/office/drawing/2010/main" w="9525">
                   <a:solidFill>
                     <a:srgbClr val="000000"/>
                   </a:solidFill>
@@ -23266,7 +23845,7 @@
             </a:ln>
             <a:extLst>
               <a:ext uri="{91240B29-F687-4f45-9708-019B960494DF}">
-                <a14:hiddenLine xmlns:a14="http://schemas.microsoft.com/office/drawing/2010/main" xmlns:p14="http://schemas.microsoft.com/office/powerpoint/2010/main" xmlns:a16="http://schemas.microsoft.com/office/drawing/2014/main" xmlns="" w="9525">
+                <a14:hiddenLine xmlns="" xmlns:a16="http://schemas.microsoft.com/office/drawing/2014/main" xmlns:p14="http://schemas.microsoft.com/office/powerpoint/2010/main" xmlns:a14="http://schemas.microsoft.com/office/drawing/2010/main" w="9525">
                   <a:solidFill>
                     <a:srgbClr val="000000"/>
                   </a:solidFill>
@@ -23371,7 +23950,7 @@
             </a:ln>
             <a:extLst>
               <a:ext uri="{91240B29-F687-4f45-9708-019B960494DF}">
-                <a14:hiddenLine xmlns:a14="http://schemas.microsoft.com/office/drawing/2010/main" xmlns:p14="http://schemas.microsoft.com/office/powerpoint/2010/main" xmlns:a16="http://schemas.microsoft.com/office/drawing/2014/main" xmlns="" w="9525">
+                <a14:hiddenLine xmlns="" xmlns:a16="http://schemas.microsoft.com/office/drawing/2014/main" xmlns:p14="http://schemas.microsoft.com/office/powerpoint/2010/main" xmlns:a14="http://schemas.microsoft.com/office/drawing/2010/main" w="9525">
                   <a:solidFill>
                     <a:srgbClr val="000000"/>
                   </a:solidFill>
@@ -23476,7 +24055,7 @@
             </a:ln>
             <a:extLst>
               <a:ext uri="{91240B29-F687-4f45-9708-019B960494DF}">
-                <a14:hiddenLine xmlns:a14="http://schemas.microsoft.com/office/drawing/2010/main" xmlns:p14="http://schemas.microsoft.com/office/powerpoint/2010/main" xmlns:a16="http://schemas.microsoft.com/office/drawing/2014/main" xmlns="" w="9525">
+                <a14:hiddenLine xmlns="" xmlns:a16="http://schemas.microsoft.com/office/drawing/2014/main" xmlns:p14="http://schemas.microsoft.com/office/powerpoint/2010/main" xmlns:a14="http://schemas.microsoft.com/office/drawing/2010/main" w="9525">
                   <a:solidFill>
                     <a:srgbClr val="000000"/>
                   </a:solidFill>
@@ -23556,7 +24135,7 @@
             </a:ln>
             <a:extLst>
               <a:ext uri="{91240B29-F687-4f45-9708-019B960494DF}">
-                <a14:hiddenLine xmlns:a14="http://schemas.microsoft.com/office/drawing/2010/main" xmlns:p14="http://schemas.microsoft.com/office/powerpoint/2010/main" xmlns:a16="http://schemas.microsoft.com/office/drawing/2014/main" xmlns="" w="9525">
+                <a14:hiddenLine xmlns="" xmlns:a16="http://schemas.microsoft.com/office/drawing/2014/main" xmlns:p14="http://schemas.microsoft.com/office/powerpoint/2010/main" xmlns:a14="http://schemas.microsoft.com/office/drawing/2010/main" w="9525">
                   <a:solidFill>
                     <a:srgbClr val="000000"/>
                   </a:solidFill>
@@ -23633,7 +24212,7 @@
             </a:ln>
             <a:extLst>
               <a:ext uri="{91240B29-F687-4f45-9708-019B960494DF}">
-                <a14:hiddenLine xmlns:a14="http://schemas.microsoft.com/office/drawing/2010/main" xmlns:p14="http://schemas.microsoft.com/office/powerpoint/2010/main" xmlns:a16="http://schemas.microsoft.com/office/drawing/2014/main" xmlns="" w="9525">
+                <a14:hiddenLine xmlns="" xmlns:a16="http://schemas.microsoft.com/office/drawing/2014/main" xmlns:p14="http://schemas.microsoft.com/office/powerpoint/2010/main" xmlns:a14="http://schemas.microsoft.com/office/drawing/2010/main" w="9525">
                   <a:solidFill>
                     <a:srgbClr val="000000"/>
                   </a:solidFill>
@@ -23738,7 +24317,7 @@
             </a:ln>
             <a:extLst>
               <a:ext uri="{91240B29-F687-4f45-9708-019B960494DF}">
-                <a14:hiddenLine xmlns:a14="http://schemas.microsoft.com/office/drawing/2010/main" xmlns:p14="http://schemas.microsoft.com/office/powerpoint/2010/main" xmlns:a16="http://schemas.microsoft.com/office/drawing/2014/main" xmlns="" w="9525">
+                <a14:hiddenLine xmlns="" xmlns:a16="http://schemas.microsoft.com/office/drawing/2014/main" xmlns:p14="http://schemas.microsoft.com/office/powerpoint/2010/main" xmlns:a14="http://schemas.microsoft.com/office/drawing/2010/main" w="9525">
                   <a:solidFill>
                     <a:srgbClr val="000000"/>
                   </a:solidFill>
@@ -23843,7 +24422,7 @@
             </a:ln>
             <a:extLst>
               <a:ext uri="{91240B29-F687-4f45-9708-019B960494DF}">
-                <a14:hiddenLine xmlns:a14="http://schemas.microsoft.com/office/drawing/2010/main" xmlns:p14="http://schemas.microsoft.com/office/powerpoint/2010/main" xmlns:a16="http://schemas.microsoft.com/office/drawing/2014/main" xmlns="" w="9525">
+                <a14:hiddenLine xmlns="" xmlns:a16="http://schemas.microsoft.com/office/drawing/2014/main" xmlns:p14="http://schemas.microsoft.com/office/powerpoint/2010/main" xmlns:a14="http://schemas.microsoft.com/office/drawing/2010/main" w="9525">
                   <a:solidFill>
                     <a:srgbClr val="000000"/>
                   </a:solidFill>
@@ -23920,7 +24499,7 @@
             </a:ln>
             <a:extLst>
               <a:ext uri="{91240B29-F687-4f45-9708-019B960494DF}">
-                <a14:hiddenLine xmlns:a14="http://schemas.microsoft.com/office/drawing/2010/main" xmlns:p14="http://schemas.microsoft.com/office/powerpoint/2010/main" xmlns:a16="http://schemas.microsoft.com/office/drawing/2014/main" xmlns="" w="9525">
+                <a14:hiddenLine xmlns="" xmlns:a16="http://schemas.microsoft.com/office/drawing/2014/main" xmlns:p14="http://schemas.microsoft.com/office/powerpoint/2010/main" xmlns:a14="http://schemas.microsoft.com/office/drawing/2010/main" w="9525">
                   <a:solidFill>
                     <a:srgbClr val="000000"/>
                   </a:solidFill>
@@ -24055,7 +24634,7 @@
             </a:ln>
             <a:extLst>
               <a:ext uri="{91240B29-F687-4f45-9708-019B960494DF}">
-                <a14:hiddenLine xmlns:a14="http://schemas.microsoft.com/office/drawing/2010/main" xmlns:p14="http://schemas.microsoft.com/office/powerpoint/2010/main" xmlns:a16="http://schemas.microsoft.com/office/drawing/2014/main" xmlns="" w="9525">
+                <a14:hiddenLine xmlns="" xmlns:a16="http://schemas.microsoft.com/office/drawing/2014/main" xmlns:p14="http://schemas.microsoft.com/office/powerpoint/2010/main" xmlns:a14="http://schemas.microsoft.com/office/drawing/2010/main" w="9525">
                   <a:solidFill>
                     <a:srgbClr val="000000"/>
                   </a:solidFill>
@@ -24138,7 +24717,7 @@
             </a:ln>
             <a:extLst>
               <a:ext uri="{91240B29-F687-4f45-9708-019B960494DF}">
-                <a14:hiddenLine xmlns:a14="http://schemas.microsoft.com/office/drawing/2010/main" xmlns:p14="http://schemas.microsoft.com/office/powerpoint/2010/main" xmlns:a16="http://schemas.microsoft.com/office/drawing/2014/main" xmlns="" w="9525">
+                <a14:hiddenLine xmlns="" xmlns:a16="http://schemas.microsoft.com/office/drawing/2014/main" xmlns:p14="http://schemas.microsoft.com/office/powerpoint/2010/main" xmlns:a14="http://schemas.microsoft.com/office/drawing/2010/main" w="9525">
                   <a:solidFill>
                     <a:srgbClr val="000000"/>
                   </a:solidFill>
@@ -24243,7 +24822,7 @@
             </a:ln>
             <a:extLst>
               <a:ext uri="{91240B29-F687-4f45-9708-019B960494DF}">
-                <a14:hiddenLine xmlns:a14="http://schemas.microsoft.com/office/drawing/2010/main" xmlns:p14="http://schemas.microsoft.com/office/powerpoint/2010/main" xmlns:a16="http://schemas.microsoft.com/office/drawing/2014/main" xmlns="" w="9525">
+                <a14:hiddenLine xmlns="" xmlns:a16="http://schemas.microsoft.com/office/drawing/2014/main" xmlns:p14="http://schemas.microsoft.com/office/powerpoint/2010/main" xmlns:a14="http://schemas.microsoft.com/office/drawing/2010/main" w="9525">
                   <a:solidFill>
                     <a:srgbClr val="000000"/>
                   </a:solidFill>
@@ -24269,7 +24848,7 @@
 </p:sld>
 </file>
 
-<file path=ppt/slides/slide7.xml><?xml version="1.0" encoding="utf-8"?>
+<file path=ppt/slides/slide8.xml><?xml version="1.0" encoding="utf-8"?>
 <p:sld xmlns:a="http://schemas.openxmlformats.org/drawingml/2006/main" xmlns:r="http://schemas.openxmlformats.org/officeDocument/2006/relationships" xmlns:p="http://schemas.openxmlformats.org/presentationml/2006/main">
   <p:cSld>
     <p:spTree>
@@ -24662,7 +25241,7 @@
 </p:sld>
 </file>
 
-<file path=ppt/slides/slide8.xml><?xml version="1.0" encoding="utf-8"?>
+<file path=ppt/slides/slide9.xml><?xml version="1.0" encoding="utf-8"?>
 <p:sld xmlns:a="http://schemas.openxmlformats.org/drawingml/2006/main" xmlns:r="http://schemas.openxmlformats.org/officeDocument/2006/relationships" xmlns:p="http://schemas.openxmlformats.org/presentationml/2006/main">
   <p:cSld>
     <p:spTree>
@@ -25046,343 +25625,6 @@
     <p:extLst>
       <p:ext uri="{BB962C8B-B14F-4D97-AF65-F5344CB8AC3E}">
         <p14:creationId xmlns:p14="http://schemas.microsoft.com/office/powerpoint/2010/main" val="156054493"/>
-      </p:ext>
-    </p:extLst>
-  </p:cSld>
-  <p:clrMapOvr>
-    <a:masterClrMapping/>
-  </p:clrMapOvr>
-</p:sld>
-</file>
-
-<file path=ppt/slides/slide9.xml><?xml version="1.0" encoding="utf-8"?>
-<p:sld xmlns:a="http://schemas.openxmlformats.org/drawingml/2006/main" xmlns:r="http://schemas.openxmlformats.org/officeDocument/2006/relationships" xmlns:p="http://schemas.openxmlformats.org/presentationml/2006/main">
-  <p:cSld>
-    <p:spTree>
-      <p:nvGrpSpPr>
-        <p:cNvPr id="1" name=""/>
-        <p:cNvGrpSpPr/>
-        <p:nvPr/>
-      </p:nvGrpSpPr>
-      <p:grpSpPr>
-        <a:xfrm>
-          <a:off x="0" y="0"/>
-          <a:ext cx="0" cy="0"/>
-          <a:chOff x="0" y="0"/>
-          <a:chExt cx="0" cy="0"/>
-        </a:xfrm>
-      </p:grpSpPr>
-      <p:sp>
-        <p:nvSpPr>
-          <p:cNvPr id="2" name="Título 1">
-            <a:extLst>
-              <a:ext uri="{FF2B5EF4-FFF2-40B4-BE49-F238E27FC236}">
-                <a16:creationId xmlns:a16="http://schemas.microsoft.com/office/drawing/2014/main" id="{CF671BC0-D702-4B14-A755-913591B15581}"/>
-              </a:ext>
-            </a:extLst>
-          </p:cNvPr>
-          <p:cNvSpPr>
-            <a:spLocks noGrp="1"/>
-          </p:cNvSpPr>
-          <p:nvPr>
-            <p:ph type="title"/>
-          </p:nvPr>
-        </p:nvSpPr>
-        <p:spPr/>
-        <p:txBody>
-          <a:bodyPr/>
-          <a:lstStyle/>
-          <a:p>
-            <a:pPr algn="ctr"/>
-            <a:r>
-              <a:rPr lang="es-ES" sz="3600" dirty="0"/>
-              <a:t>Tablas en SQL</a:t>
-            </a:r>
-            <a:endParaRPr lang="es-ES" dirty="0"/>
-          </a:p>
-        </p:txBody>
-      </p:sp>
-      <p:sp>
-        <p:nvSpPr>
-          <p:cNvPr id="3" name="CuadroTexto 2">
-            <a:extLst>
-              <a:ext uri="{FF2B5EF4-FFF2-40B4-BE49-F238E27FC236}">
-                <a16:creationId xmlns:a16="http://schemas.microsoft.com/office/drawing/2014/main" id="{712A6D8C-E204-4D31-8CBC-AFE1404E1CE7}"/>
-              </a:ext>
-            </a:extLst>
-          </p:cNvPr>
-          <p:cNvSpPr txBox="1"/>
-          <p:nvPr/>
-        </p:nvSpPr>
-        <p:spPr>
-          <a:xfrm>
-            <a:off x="1571625" y="2619543"/>
-            <a:ext cx="2914650" cy="2585323"/>
-          </a:xfrm>
-          <a:prstGeom prst="rect">
-            <a:avLst/>
-          </a:prstGeom>
-          <a:noFill/>
-        </p:spPr>
-        <p:txBody>
-          <a:bodyPr wrap="square" rtlCol="0">
-            <a:spAutoFit/>
-          </a:bodyPr>
-          <a:lstStyle/>
-          <a:p>
-            <a:r>
-              <a:rPr lang="es-ES" dirty="0"/>
-              <a:t>	EnfermerosPacientes:</a:t>
-            </a:r>
-          </a:p>
-          <a:p>
-            <a:pPr marL="742950" lvl="1" indent="-285750">
-              <a:buFont typeface="Arial" panose="020B0604020202020204" pitchFamily="34" charset="0"/>
-              <a:buChar char="•"/>
-            </a:pPr>
-            <a:r>
-              <a:rPr lang="es-ES" dirty="0"/>
-              <a:t>Id Enfermero.</a:t>
-            </a:r>
-          </a:p>
-          <a:p>
-            <a:pPr marL="742950" lvl="1" indent="-285750">
-              <a:buFont typeface="Arial" panose="020B0604020202020204" pitchFamily="34" charset="0"/>
-              <a:buChar char="•"/>
-            </a:pPr>
-            <a:r>
-              <a:rPr lang="es-ES" dirty="0"/>
-              <a:t>Id Pacientes.</a:t>
-            </a:r>
-          </a:p>
-          <a:p>
-            <a:pPr marL="742950" lvl="1" indent="-285750">
-              <a:buFont typeface="Arial" panose="020B0604020202020204" pitchFamily="34" charset="0"/>
-              <a:buChar char="•"/>
-            </a:pPr>
-            <a:endParaRPr lang="es-ES" dirty="0"/>
-          </a:p>
-          <a:p>
-            <a:pPr lvl="1"/>
-            <a:endParaRPr lang="es-ES" dirty="0"/>
-          </a:p>
-          <a:p>
-            <a:pPr lvl="1"/>
-            <a:r>
-              <a:rPr lang="es-ES" dirty="0"/>
-              <a:t>Habitaciones:</a:t>
-            </a:r>
-          </a:p>
-          <a:p>
-            <a:pPr marL="742950" lvl="1" indent="-285750">
-              <a:buFont typeface="Arial" panose="020B0604020202020204" pitchFamily="34" charset="0"/>
-              <a:buChar char="•"/>
-            </a:pPr>
-            <a:r>
-              <a:rPr lang="es-ES" dirty="0"/>
-              <a:t>Id.</a:t>
-            </a:r>
-          </a:p>
-          <a:p>
-            <a:pPr marL="742950" lvl="1" indent="-285750">
-              <a:buFont typeface="Arial" panose="020B0604020202020204" pitchFamily="34" charset="0"/>
-              <a:buChar char="•"/>
-            </a:pPr>
-            <a:r>
-              <a:rPr lang="es-ES" dirty="0"/>
-              <a:t>Numero Habitación.</a:t>
-            </a:r>
-          </a:p>
-          <a:p>
-            <a:pPr marL="742950" lvl="1" indent="-285750">
-              <a:buFont typeface="Arial" panose="020B0604020202020204" pitchFamily="34" charset="0"/>
-              <a:buChar char="•"/>
-            </a:pPr>
-            <a:r>
-              <a:rPr lang="es-ES" dirty="0"/>
-              <a:t>Estado.</a:t>
-            </a:r>
-          </a:p>
-        </p:txBody>
-      </p:sp>
-      <p:pic>
-        <p:nvPicPr>
-          <p:cNvPr id="5" name="Imagen 4" descr="Interfaz de usuario gráfica, Texto, Sitio web&#10;&#10;Descripción generada automáticamente">
-            <a:extLst>
-              <a:ext uri="{FF2B5EF4-FFF2-40B4-BE49-F238E27FC236}">
-                <a16:creationId xmlns:a16="http://schemas.microsoft.com/office/drawing/2014/main" id="{E48C6981-F60C-406B-9264-BE5704023A67}"/>
-              </a:ext>
-            </a:extLst>
-          </p:cNvPr>
-          <p:cNvPicPr>
-            <a:picLocks noChangeAspect="1"/>
-          </p:cNvPicPr>
-          <p:nvPr/>
-        </p:nvPicPr>
-        <p:blipFill>
-          <a:blip r:embed="rId2"/>
-          <a:stretch>
-            <a:fillRect/>
-          </a:stretch>
-        </p:blipFill>
-        <p:spPr>
-          <a:xfrm>
-            <a:off x="7326610" y="2743200"/>
-            <a:ext cx="3293765" cy="966826"/>
-          </a:xfrm>
-          <a:prstGeom prst="rect">
-            <a:avLst/>
-          </a:prstGeom>
-        </p:spPr>
-      </p:pic>
-      <p:pic>
-        <p:nvPicPr>
-          <p:cNvPr id="7" name="Imagen 6" descr="Interfaz de usuario gráfica, Texto, Aplicación&#10;&#10;Descripción generada automáticamente">
-            <a:extLst>
-              <a:ext uri="{FF2B5EF4-FFF2-40B4-BE49-F238E27FC236}">
-                <a16:creationId xmlns:a16="http://schemas.microsoft.com/office/drawing/2014/main" id="{ABE0775A-AAA5-463A-B748-F156944207C9}"/>
-              </a:ext>
-            </a:extLst>
-          </p:cNvPr>
-          <p:cNvPicPr>
-            <a:picLocks noChangeAspect="1"/>
-          </p:cNvPicPr>
-          <p:nvPr/>
-        </p:nvPicPr>
-        <p:blipFill>
-          <a:blip r:embed="rId3"/>
-          <a:stretch>
-            <a:fillRect/>
-          </a:stretch>
-        </p:blipFill>
-        <p:spPr>
-          <a:xfrm>
-            <a:off x="7326610" y="4063409"/>
-            <a:ext cx="3293764" cy="1416318"/>
-          </a:xfrm>
-          <a:prstGeom prst="rect">
-            <a:avLst/>
-          </a:prstGeom>
-        </p:spPr>
-      </p:pic>
-      <p:sp>
-        <p:nvSpPr>
-          <p:cNvPr id="8" name="Flecha: a la derecha 7">
-            <a:extLst>
-              <a:ext uri="{FF2B5EF4-FFF2-40B4-BE49-F238E27FC236}">
-                <a16:creationId xmlns:a16="http://schemas.microsoft.com/office/drawing/2014/main" id="{2D6B5585-C494-486B-A9F3-40176C06E462}"/>
-              </a:ext>
-            </a:extLst>
-          </p:cNvPr>
-          <p:cNvSpPr/>
-          <p:nvPr/>
-        </p:nvSpPr>
-        <p:spPr>
-          <a:xfrm>
-            <a:off x="5417238" y="3027731"/>
-            <a:ext cx="978408" cy="484632"/>
-          </a:xfrm>
-          <a:prstGeom prst="rightArrow">
-            <a:avLst/>
-          </a:prstGeom>
-          <a:solidFill>
-            <a:schemeClr val="bg2">
-              <a:lumMod val="50000"/>
-              <a:lumOff val="50000"/>
-            </a:schemeClr>
-          </a:solidFill>
-          <a:ln>
-            <a:solidFill>
-              <a:schemeClr val="bg1"/>
-            </a:solidFill>
-          </a:ln>
-        </p:spPr>
-        <p:style>
-          <a:lnRef idx="2">
-            <a:schemeClr val="accent1">
-              <a:shade val="50000"/>
-            </a:schemeClr>
-          </a:lnRef>
-          <a:fillRef idx="1">
-            <a:schemeClr val="accent1"/>
-          </a:fillRef>
-          <a:effectRef idx="0">
-            <a:schemeClr val="accent1"/>
-          </a:effectRef>
-          <a:fontRef idx="minor">
-            <a:schemeClr val="lt1"/>
-          </a:fontRef>
-        </p:style>
-        <p:txBody>
-          <a:bodyPr rtlCol="0" anchor="ctr"/>
-          <a:lstStyle/>
-          <a:p>
-            <a:pPr algn="ctr"/>
-            <a:endParaRPr lang="es-ES"/>
-          </a:p>
-        </p:txBody>
-      </p:sp>
-      <p:sp>
-        <p:nvSpPr>
-          <p:cNvPr id="9" name="Flecha: a la derecha 8">
-            <a:extLst>
-              <a:ext uri="{FF2B5EF4-FFF2-40B4-BE49-F238E27FC236}">
-                <a16:creationId xmlns:a16="http://schemas.microsoft.com/office/drawing/2014/main" id="{AB75753F-21C9-4607-B1FF-1D0A6D87D853}"/>
-              </a:ext>
-            </a:extLst>
-          </p:cNvPr>
-          <p:cNvSpPr/>
-          <p:nvPr/>
-        </p:nvSpPr>
-        <p:spPr>
-          <a:xfrm>
-            <a:off x="5417238" y="4443006"/>
-            <a:ext cx="978408" cy="484632"/>
-          </a:xfrm>
-          <a:prstGeom prst="rightArrow">
-            <a:avLst/>
-          </a:prstGeom>
-          <a:solidFill>
-            <a:schemeClr val="bg2">
-              <a:lumMod val="50000"/>
-              <a:lumOff val="50000"/>
-            </a:schemeClr>
-          </a:solidFill>
-          <a:ln>
-            <a:solidFill>
-              <a:schemeClr val="bg1"/>
-            </a:solidFill>
-          </a:ln>
-        </p:spPr>
-        <p:style>
-          <a:lnRef idx="2">
-            <a:schemeClr val="accent1">
-              <a:shade val="50000"/>
-            </a:schemeClr>
-          </a:lnRef>
-          <a:fillRef idx="1">
-            <a:schemeClr val="accent1"/>
-          </a:fillRef>
-          <a:effectRef idx="0">
-            <a:schemeClr val="accent1"/>
-          </a:effectRef>
-          <a:fontRef idx="minor">
-            <a:schemeClr val="lt1"/>
-          </a:fontRef>
-        </p:style>
-        <p:txBody>
-          <a:bodyPr rtlCol="0" anchor="ctr"/>
-          <a:lstStyle/>
-          <a:p>
-            <a:pPr algn="ctr"/>
-            <a:endParaRPr lang="es-ES"/>
-          </a:p>
-        </p:txBody>
-      </p:sp>
-    </p:spTree>
-    <p:extLst>
-      <p:ext uri="{BB962C8B-B14F-4D97-AF65-F5344CB8AC3E}">
-        <p14:creationId xmlns:p14="http://schemas.microsoft.com/office/powerpoint/2010/main" val="1652138279"/>
       </p:ext>
     </p:extLst>
   </p:cSld>

</xml_diff>

<commit_message>
Añadido tablas DDL que faltaban
</commit_message>
<xml_diff>
--- a/doc/Presentación_mitad_de_curso_JuanEspinosayNachoRodriguez.pptx
+++ b/doc/Presentación_mitad_de_curso_JuanEspinosayNachoRodriguez.pptx
@@ -5,7 +5,7 @@
     <p:sldMasterId id="2147483648" r:id="rId1"/>
   </p:sldMasterIdLst>
   <p:notesMasterIdLst>
-    <p:notesMasterId r:id="rId12"/>
+    <p:notesMasterId r:id="rId13"/>
   </p:notesMasterIdLst>
   <p:sldIdLst>
     <p:sldId id="256" r:id="rId2"/>
@@ -18,6 +18,7 @@
     <p:sldId id="264" r:id="rId9"/>
     <p:sldId id="265" r:id="rId10"/>
     <p:sldId id="266" r:id="rId11"/>
+    <p:sldId id="268" r:id="rId12"/>
   </p:sldIdLst>
   <p:sldSz cx="12192000" cy="6858000"/>
   <p:notesSz cx="6858000" cy="9144000"/>
@@ -1583,7 +1584,7 @@
           <a:noFill/>
           <a:extLst>
             <a:ext uri="{909E8E84-426E-40dd-AFC4-6F175D3DCCD1}">
-              <a14:hiddenFill xmlns="" xmlns:a14="http://schemas.microsoft.com/office/drawing/2010/main">
+              <a14:hiddenFill xmlns:a14="http://schemas.microsoft.com/office/drawing/2010/main" xmlns="">
                 <a:solidFill>
                   <a:srgbClr val="FFFFFF"/>
                 </a:solidFill>
@@ -1642,7 +1643,7 @@
             </a:ln>
             <a:extLst>
               <a:ext uri="{91240B29-F687-4f45-9708-019B960494DF}">
-                <a14:hiddenLine xmlns="" xmlns:a14="http://schemas.microsoft.com/office/drawing/2010/main" w="9525">
+                <a14:hiddenLine xmlns:a14="http://schemas.microsoft.com/office/drawing/2010/main" xmlns="" w="9525">
                   <a:solidFill>
                     <a:srgbClr val="000000"/>
                   </a:solidFill>
@@ -1732,7 +1733,7 @@
             </a:ln>
             <a:extLst>
               <a:ext uri="{91240B29-F687-4f45-9708-019B960494DF}">
-                <a14:hiddenLine xmlns="" xmlns:a14="http://schemas.microsoft.com/office/drawing/2010/main" w="9525">
+                <a14:hiddenLine xmlns:a14="http://schemas.microsoft.com/office/drawing/2010/main" xmlns="" w="9525">
                   <a:solidFill>
                     <a:srgbClr val="000000"/>
                   </a:solidFill>
@@ -1822,7 +1823,7 @@
             </a:ln>
             <a:extLst>
               <a:ext uri="{91240B29-F687-4f45-9708-019B960494DF}">
-                <a14:hiddenLine xmlns="" xmlns:a14="http://schemas.microsoft.com/office/drawing/2010/main" w="9525">
+                <a14:hiddenLine xmlns:a14="http://schemas.microsoft.com/office/drawing/2010/main" xmlns="" w="9525">
                   <a:solidFill>
                     <a:srgbClr val="000000"/>
                   </a:solidFill>
@@ -1856,7 +1857,7 @@
             </a:ln>
             <a:extLst>
               <a:ext uri="{91240B29-F687-4f45-9708-019B960494DF}">
-                <a14:hiddenLine xmlns="" xmlns:a14="http://schemas.microsoft.com/office/drawing/2010/main" w="9525">
+                <a14:hiddenLine xmlns:a14="http://schemas.microsoft.com/office/drawing/2010/main" xmlns="" w="9525">
                   <a:solidFill>
                     <a:srgbClr val="000000"/>
                   </a:solidFill>
@@ -1946,7 +1947,7 @@
             </a:ln>
             <a:extLst>
               <a:ext uri="{91240B29-F687-4f45-9708-019B960494DF}">
-                <a14:hiddenLine xmlns="" xmlns:a14="http://schemas.microsoft.com/office/drawing/2010/main" w="9525">
+                <a14:hiddenLine xmlns:a14="http://schemas.microsoft.com/office/drawing/2010/main" xmlns="" w="9525">
                   <a:solidFill>
                     <a:srgbClr val="000000"/>
                   </a:solidFill>
@@ -2008,7 +2009,7 @@
             </a:ln>
             <a:extLst>
               <a:ext uri="{91240B29-F687-4f45-9708-019B960494DF}">
-                <a14:hiddenLine xmlns="" xmlns:a14="http://schemas.microsoft.com/office/drawing/2010/main" w="9525">
+                <a14:hiddenLine xmlns:a14="http://schemas.microsoft.com/office/drawing/2010/main" xmlns="" w="9525">
                   <a:solidFill>
                     <a:srgbClr val="000000"/>
                   </a:solidFill>
@@ -2070,7 +2071,7 @@
             </a:ln>
             <a:extLst>
               <a:ext uri="{91240B29-F687-4f45-9708-019B960494DF}">
-                <a14:hiddenLine xmlns="" xmlns:a14="http://schemas.microsoft.com/office/drawing/2010/main" w="9525">
+                <a14:hiddenLine xmlns:a14="http://schemas.microsoft.com/office/drawing/2010/main" xmlns="" w="9525">
                   <a:solidFill>
                     <a:srgbClr val="000000"/>
                   </a:solidFill>
@@ -2160,7 +2161,7 @@
             </a:ln>
             <a:extLst>
               <a:ext uri="{91240B29-F687-4f45-9708-019B960494DF}">
-                <a14:hiddenLine xmlns="" xmlns:a14="http://schemas.microsoft.com/office/drawing/2010/main" w="9525">
+                <a14:hiddenLine xmlns:a14="http://schemas.microsoft.com/office/drawing/2010/main" xmlns="" w="9525">
                   <a:solidFill>
                     <a:srgbClr val="000000"/>
                   </a:solidFill>
@@ -2222,7 +2223,7 @@
             </a:ln>
             <a:extLst>
               <a:ext uri="{91240B29-F687-4f45-9708-019B960494DF}">
-                <a14:hiddenLine xmlns="" xmlns:a14="http://schemas.microsoft.com/office/drawing/2010/main" w="9525">
+                <a14:hiddenLine xmlns:a14="http://schemas.microsoft.com/office/drawing/2010/main" xmlns="" w="9525">
                   <a:solidFill>
                     <a:srgbClr val="000000"/>
                   </a:solidFill>
@@ -2284,7 +2285,7 @@
             </a:ln>
             <a:extLst>
               <a:ext uri="{91240B29-F687-4f45-9708-019B960494DF}">
-                <a14:hiddenLine xmlns="" xmlns:a14="http://schemas.microsoft.com/office/drawing/2010/main" w="9525">
+                <a14:hiddenLine xmlns:a14="http://schemas.microsoft.com/office/drawing/2010/main" xmlns="" w="9525">
                   <a:solidFill>
                     <a:srgbClr val="000000"/>
                   </a:solidFill>
@@ -2374,7 +2375,7 @@
             </a:ln>
             <a:extLst>
               <a:ext uri="{91240B29-F687-4f45-9708-019B960494DF}">
-                <a14:hiddenLine xmlns="" xmlns:a14="http://schemas.microsoft.com/office/drawing/2010/main" w="9525">
+                <a14:hiddenLine xmlns:a14="http://schemas.microsoft.com/office/drawing/2010/main" xmlns="" w="9525">
                   <a:solidFill>
                     <a:srgbClr val="000000"/>
                   </a:solidFill>
@@ -2464,7 +2465,7 @@
             </a:ln>
             <a:extLst>
               <a:ext uri="{91240B29-F687-4f45-9708-019B960494DF}">
-                <a14:hiddenLine xmlns="" xmlns:a14="http://schemas.microsoft.com/office/drawing/2010/main" w="9525">
+                <a14:hiddenLine xmlns:a14="http://schemas.microsoft.com/office/drawing/2010/main" xmlns="" w="9525">
                   <a:solidFill>
                     <a:srgbClr val="000000"/>
                   </a:solidFill>
@@ -2526,7 +2527,7 @@
             </a:ln>
             <a:extLst>
               <a:ext uri="{91240B29-F687-4f45-9708-019B960494DF}">
-                <a14:hiddenLine xmlns="" xmlns:a14="http://schemas.microsoft.com/office/drawing/2010/main" w="9525">
+                <a14:hiddenLine xmlns:a14="http://schemas.microsoft.com/office/drawing/2010/main" xmlns="" w="9525">
                   <a:solidFill>
                     <a:srgbClr val="000000"/>
                   </a:solidFill>
@@ -2636,7 +2637,7 @@
             </a:ln>
             <a:extLst>
               <a:ext uri="{91240B29-F687-4f45-9708-019B960494DF}">
-                <a14:hiddenLine xmlns="" xmlns:a14="http://schemas.microsoft.com/office/drawing/2010/main" w="9525">
+                <a14:hiddenLine xmlns:a14="http://schemas.microsoft.com/office/drawing/2010/main" xmlns="" w="9525">
                   <a:solidFill>
                     <a:srgbClr val="000000"/>
                   </a:solidFill>
@@ -2698,7 +2699,7 @@
             </a:ln>
             <a:extLst>
               <a:ext uri="{91240B29-F687-4f45-9708-019B960494DF}">
-                <a14:hiddenLine xmlns="" xmlns:a14="http://schemas.microsoft.com/office/drawing/2010/main" w="9525">
+                <a14:hiddenLine xmlns:a14="http://schemas.microsoft.com/office/drawing/2010/main" xmlns="" w="9525">
                   <a:solidFill>
                     <a:srgbClr val="000000"/>
                   </a:solidFill>
@@ -2788,7 +2789,7 @@
             </a:ln>
             <a:extLst>
               <a:ext uri="{91240B29-F687-4f45-9708-019B960494DF}">
-                <a14:hiddenLine xmlns="" xmlns:a14="http://schemas.microsoft.com/office/drawing/2010/main" w="9525">
+                <a14:hiddenLine xmlns:a14="http://schemas.microsoft.com/office/drawing/2010/main" xmlns="" w="9525">
                   <a:solidFill>
                     <a:srgbClr val="000000"/>
                   </a:solidFill>
@@ -2878,7 +2879,7 @@
             </a:ln>
             <a:extLst>
               <a:ext uri="{91240B29-F687-4f45-9708-019B960494DF}">
-                <a14:hiddenLine xmlns="" xmlns:a14="http://schemas.microsoft.com/office/drawing/2010/main" w="9525">
+                <a14:hiddenLine xmlns:a14="http://schemas.microsoft.com/office/drawing/2010/main" xmlns="" w="9525">
                   <a:solidFill>
                     <a:srgbClr val="000000"/>
                   </a:solidFill>
@@ -2940,7 +2941,7 @@
             </a:ln>
             <a:extLst>
               <a:ext uri="{91240B29-F687-4f45-9708-019B960494DF}">
-                <a14:hiddenLine xmlns="" xmlns:a14="http://schemas.microsoft.com/office/drawing/2010/main" w="9525">
+                <a14:hiddenLine xmlns:a14="http://schemas.microsoft.com/office/drawing/2010/main" xmlns="" w="9525">
                   <a:solidFill>
                     <a:srgbClr val="000000"/>
                   </a:solidFill>
@@ -3030,7 +3031,7 @@
             </a:ln>
             <a:extLst>
               <a:ext uri="{91240B29-F687-4f45-9708-019B960494DF}">
-                <a14:hiddenLine xmlns="" xmlns:a14="http://schemas.microsoft.com/office/drawing/2010/main" w="9525">
+                <a14:hiddenLine xmlns:a14="http://schemas.microsoft.com/office/drawing/2010/main" xmlns="" w="9525">
                   <a:solidFill>
                     <a:srgbClr val="000000"/>
                   </a:solidFill>
@@ -3120,7 +3121,7 @@
             </a:ln>
             <a:extLst>
               <a:ext uri="{91240B29-F687-4f45-9708-019B960494DF}">
-                <a14:hiddenLine xmlns="" xmlns:a14="http://schemas.microsoft.com/office/drawing/2010/main" w="9525">
+                <a14:hiddenLine xmlns:a14="http://schemas.microsoft.com/office/drawing/2010/main" xmlns="" w="9525">
                   <a:solidFill>
                     <a:srgbClr val="000000"/>
                   </a:solidFill>
@@ -3176,7 +3177,7 @@
             </a:ln>
             <a:extLst>
               <a:ext uri="{91240B29-F687-4f45-9708-019B960494DF}">
-                <a14:hiddenLine xmlns="" xmlns:a14="http://schemas.microsoft.com/office/drawing/2010/main" w="9525">
+                <a14:hiddenLine xmlns:a14="http://schemas.microsoft.com/office/drawing/2010/main" xmlns="" w="9525">
                   <a:solidFill>
                     <a:srgbClr val="000000"/>
                   </a:solidFill>
@@ -3266,7 +3267,7 @@
             </a:ln>
             <a:extLst>
               <a:ext uri="{91240B29-F687-4f45-9708-019B960494DF}">
-                <a14:hiddenLine xmlns="" xmlns:a14="http://schemas.microsoft.com/office/drawing/2010/main" w="9525">
+                <a14:hiddenLine xmlns:a14="http://schemas.microsoft.com/office/drawing/2010/main" xmlns="" w="9525">
                   <a:solidFill>
                     <a:srgbClr val="000000"/>
                   </a:solidFill>
@@ -3322,7 +3323,7 @@
             </a:ln>
             <a:extLst>
               <a:ext uri="{91240B29-F687-4f45-9708-019B960494DF}">
-                <a14:hiddenLine xmlns="" xmlns:a14="http://schemas.microsoft.com/office/drawing/2010/main" w="9525">
+                <a14:hiddenLine xmlns:a14="http://schemas.microsoft.com/office/drawing/2010/main" xmlns="" w="9525">
                   <a:solidFill>
                     <a:srgbClr val="000000"/>
                   </a:solidFill>
@@ -3412,7 +3413,7 @@
             </a:ln>
             <a:extLst>
               <a:ext uri="{91240B29-F687-4f45-9708-019B960494DF}">
-                <a14:hiddenLine xmlns="" xmlns:a14="http://schemas.microsoft.com/office/drawing/2010/main" w="9525">
+                <a14:hiddenLine xmlns:a14="http://schemas.microsoft.com/office/drawing/2010/main" xmlns="" w="9525">
                   <a:solidFill>
                     <a:srgbClr val="000000"/>
                   </a:solidFill>
@@ -3480,7 +3481,7 @@
             </a:ln>
             <a:extLst>
               <a:ext uri="{91240B29-F687-4f45-9708-019B960494DF}">
-                <a14:hiddenLine xmlns="" xmlns:a14="http://schemas.microsoft.com/office/drawing/2010/main" w="9525">
+                <a14:hiddenLine xmlns:a14="http://schemas.microsoft.com/office/drawing/2010/main" xmlns="" w="9525">
                   <a:solidFill>
                     <a:srgbClr val="000000"/>
                   </a:solidFill>
@@ -3570,7 +3571,7 @@
             </a:ln>
             <a:extLst>
               <a:ext uri="{91240B29-F687-4f45-9708-019B960494DF}">
-                <a14:hiddenLine xmlns="" xmlns:a14="http://schemas.microsoft.com/office/drawing/2010/main" w="9525">
+                <a14:hiddenLine xmlns:a14="http://schemas.microsoft.com/office/drawing/2010/main" xmlns="" w="9525">
                   <a:solidFill>
                     <a:srgbClr val="000000"/>
                   </a:solidFill>
@@ -3638,7 +3639,7 @@
             </a:ln>
             <a:extLst>
               <a:ext uri="{91240B29-F687-4f45-9708-019B960494DF}">
-                <a14:hiddenLine xmlns="" xmlns:a14="http://schemas.microsoft.com/office/drawing/2010/main" w="9525">
+                <a14:hiddenLine xmlns:a14="http://schemas.microsoft.com/office/drawing/2010/main" xmlns="" w="9525">
                   <a:solidFill>
                     <a:srgbClr val="000000"/>
                   </a:solidFill>
@@ -3728,7 +3729,7 @@
             </a:ln>
             <a:extLst>
               <a:ext uri="{91240B29-F687-4f45-9708-019B960494DF}">
-                <a14:hiddenLine xmlns="" xmlns:a14="http://schemas.microsoft.com/office/drawing/2010/main" w="9525">
+                <a14:hiddenLine xmlns:a14="http://schemas.microsoft.com/office/drawing/2010/main" xmlns="" w="9525">
                   <a:solidFill>
                     <a:srgbClr val="000000"/>
                   </a:solidFill>
@@ -3762,7 +3763,7 @@
             </a:ln>
             <a:extLst>
               <a:ext uri="{91240B29-F687-4f45-9708-019B960494DF}">
-                <a14:hiddenLine xmlns="" xmlns:a14="http://schemas.microsoft.com/office/drawing/2010/main" w="9525">
+                <a14:hiddenLine xmlns:a14="http://schemas.microsoft.com/office/drawing/2010/main" xmlns="" w="9525">
                   <a:solidFill>
                     <a:srgbClr val="000000"/>
                   </a:solidFill>
@@ -3852,7 +3853,7 @@
             </a:ln>
             <a:extLst>
               <a:ext uri="{91240B29-F687-4f45-9708-019B960494DF}">
-                <a14:hiddenLine xmlns="" xmlns:a14="http://schemas.microsoft.com/office/drawing/2010/main" w="9525">
+                <a14:hiddenLine xmlns:a14="http://schemas.microsoft.com/office/drawing/2010/main" xmlns="" w="9525">
                   <a:solidFill>
                     <a:srgbClr val="000000"/>
                   </a:solidFill>
@@ -3914,7 +3915,7 @@
             </a:ln>
             <a:extLst>
               <a:ext uri="{91240B29-F687-4f45-9708-019B960494DF}">
-                <a14:hiddenLine xmlns="" xmlns:a14="http://schemas.microsoft.com/office/drawing/2010/main" w="9525">
+                <a14:hiddenLine xmlns:a14="http://schemas.microsoft.com/office/drawing/2010/main" xmlns="" w="9525">
                   <a:solidFill>
                     <a:srgbClr val="000000"/>
                   </a:solidFill>
@@ -3976,7 +3977,7 @@
             </a:ln>
             <a:extLst>
               <a:ext uri="{91240B29-F687-4f45-9708-019B960494DF}">
-                <a14:hiddenLine xmlns="" xmlns:a14="http://schemas.microsoft.com/office/drawing/2010/main" w="9525">
+                <a14:hiddenLine xmlns:a14="http://schemas.microsoft.com/office/drawing/2010/main" xmlns="" w="9525">
                   <a:solidFill>
                     <a:srgbClr val="000000"/>
                   </a:solidFill>
@@ -4066,7 +4067,7 @@
             </a:ln>
             <a:extLst>
               <a:ext uri="{91240B29-F687-4f45-9708-019B960494DF}">
-                <a14:hiddenLine xmlns="" xmlns:a14="http://schemas.microsoft.com/office/drawing/2010/main" w="9525">
+                <a14:hiddenLine xmlns:a14="http://schemas.microsoft.com/office/drawing/2010/main" xmlns="" w="9525">
                   <a:solidFill>
                     <a:srgbClr val="000000"/>
                   </a:solidFill>
@@ -4134,7 +4135,7 @@
             </a:ln>
             <a:extLst>
               <a:ext uri="{91240B29-F687-4f45-9708-019B960494DF}">
-                <a14:hiddenLine xmlns="" xmlns:a14="http://schemas.microsoft.com/office/drawing/2010/main" w="9525">
+                <a14:hiddenLine xmlns:a14="http://schemas.microsoft.com/office/drawing/2010/main" xmlns="" w="9525">
                   <a:solidFill>
                     <a:srgbClr val="000000"/>
                   </a:solidFill>
@@ -4196,7 +4197,7 @@
             </a:ln>
             <a:extLst>
               <a:ext uri="{91240B29-F687-4f45-9708-019B960494DF}">
-                <a14:hiddenLine xmlns="" xmlns:a14="http://schemas.microsoft.com/office/drawing/2010/main" w="9525">
+                <a14:hiddenLine xmlns:a14="http://schemas.microsoft.com/office/drawing/2010/main" xmlns="" w="9525">
                   <a:solidFill>
                     <a:srgbClr val="000000"/>
                   </a:solidFill>
@@ -4286,7 +4287,7 @@
             </a:ln>
             <a:extLst>
               <a:ext uri="{91240B29-F687-4f45-9708-019B960494DF}">
-                <a14:hiddenLine xmlns="" xmlns:a14="http://schemas.microsoft.com/office/drawing/2010/main" w="9525">
+                <a14:hiddenLine xmlns:a14="http://schemas.microsoft.com/office/drawing/2010/main" xmlns="" w="9525">
                   <a:solidFill>
                     <a:srgbClr val="000000"/>
                   </a:solidFill>
@@ -4348,7 +4349,7 @@
             </a:ln>
             <a:extLst>
               <a:ext uri="{91240B29-F687-4f45-9708-019B960494DF}">
-                <a14:hiddenLine xmlns="" xmlns:a14="http://schemas.microsoft.com/office/drawing/2010/main" w="9525">
+                <a14:hiddenLine xmlns:a14="http://schemas.microsoft.com/office/drawing/2010/main" xmlns="" w="9525">
                   <a:solidFill>
                     <a:srgbClr val="000000"/>
                   </a:solidFill>
@@ -4438,7 +4439,7 @@
             </a:ln>
             <a:extLst>
               <a:ext uri="{91240B29-F687-4f45-9708-019B960494DF}">
-                <a14:hiddenLine xmlns="" xmlns:a14="http://schemas.microsoft.com/office/drawing/2010/main" w="9525">
+                <a14:hiddenLine xmlns:a14="http://schemas.microsoft.com/office/drawing/2010/main" xmlns="" w="9525">
                   <a:solidFill>
                     <a:srgbClr val="000000"/>
                   </a:solidFill>
@@ -4500,7 +4501,7 @@
             </a:ln>
             <a:extLst>
               <a:ext uri="{91240B29-F687-4f45-9708-019B960494DF}">
-                <a14:hiddenLine xmlns="" xmlns:a14="http://schemas.microsoft.com/office/drawing/2010/main" w="9525">
+                <a14:hiddenLine xmlns:a14="http://schemas.microsoft.com/office/drawing/2010/main" xmlns="" w="9525">
                   <a:solidFill>
                     <a:srgbClr val="000000"/>
                   </a:solidFill>
@@ -4590,7 +4591,7 @@
             </a:ln>
             <a:extLst>
               <a:ext uri="{91240B29-F687-4f45-9708-019B960494DF}">
-                <a14:hiddenLine xmlns="" xmlns:a14="http://schemas.microsoft.com/office/drawing/2010/main" w="9525">
+                <a14:hiddenLine xmlns:a14="http://schemas.microsoft.com/office/drawing/2010/main" xmlns="" w="9525">
                   <a:solidFill>
                     <a:srgbClr val="000000"/>
                   </a:solidFill>
@@ -4624,7 +4625,7 @@
             </a:ln>
             <a:extLst>
               <a:ext uri="{91240B29-F687-4f45-9708-019B960494DF}">
-                <a14:hiddenLine xmlns="" xmlns:a14="http://schemas.microsoft.com/office/drawing/2010/main" w="9525">
+                <a14:hiddenLine xmlns:a14="http://schemas.microsoft.com/office/drawing/2010/main" xmlns="" w="9525">
                   <a:solidFill>
                     <a:srgbClr val="000000"/>
                   </a:solidFill>
@@ -4689,7 +4690,7 @@
             </a:ln>
             <a:extLst>
               <a:ext uri="{91240B29-F687-4f45-9708-019B960494DF}">
-                <a14:hiddenLine xmlns="" xmlns:a14="http://schemas.microsoft.com/office/drawing/2010/main" w="9525">
+                <a14:hiddenLine xmlns:a14="http://schemas.microsoft.com/office/drawing/2010/main" xmlns="" w="9525">
                   <a:solidFill>
                     <a:srgbClr val="000000"/>
                   </a:solidFill>
@@ -4779,7 +4780,7 @@
             </a:ln>
             <a:extLst>
               <a:ext uri="{91240B29-F687-4f45-9708-019B960494DF}">
-                <a14:hiddenLine xmlns="" xmlns:a14="http://schemas.microsoft.com/office/drawing/2010/main" w="9525">
+                <a14:hiddenLine xmlns:a14="http://schemas.microsoft.com/office/drawing/2010/main" xmlns="" w="9525">
                   <a:solidFill>
                     <a:srgbClr val="000000"/>
                   </a:solidFill>
@@ -4841,7 +4842,7 @@
             </a:ln>
             <a:extLst>
               <a:ext uri="{91240B29-F687-4f45-9708-019B960494DF}">
-                <a14:hiddenLine xmlns="" xmlns:a14="http://schemas.microsoft.com/office/drawing/2010/main" w="9525">
+                <a14:hiddenLine xmlns:a14="http://schemas.microsoft.com/office/drawing/2010/main" xmlns="" w="9525">
                   <a:solidFill>
                     <a:srgbClr val="000000"/>
                   </a:solidFill>
@@ -4931,7 +4932,7 @@
             </a:ln>
             <a:extLst>
               <a:ext uri="{91240B29-F687-4f45-9708-019B960494DF}">
-                <a14:hiddenLine xmlns="" xmlns:a14="http://schemas.microsoft.com/office/drawing/2010/main" w="9525">
+                <a14:hiddenLine xmlns:a14="http://schemas.microsoft.com/office/drawing/2010/main" xmlns="" w="9525">
                   <a:solidFill>
                     <a:srgbClr val="000000"/>
                   </a:solidFill>
@@ -5021,7 +5022,7 @@
             </a:ln>
             <a:extLst>
               <a:ext uri="{91240B29-F687-4f45-9708-019B960494DF}">
-                <a14:hiddenLine xmlns="" xmlns:a14="http://schemas.microsoft.com/office/drawing/2010/main" w="9525">
+                <a14:hiddenLine xmlns:a14="http://schemas.microsoft.com/office/drawing/2010/main" xmlns="" w="9525">
                   <a:solidFill>
                     <a:srgbClr val="000000"/>
                   </a:solidFill>
@@ -5086,7 +5087,7 @@
             </a:ln>
             <a:extLst>
               <a:ext uri="{91240B29-F687-4f45-9708-019B960494DF}">
-                <a14:hiddenLine xmlns="" xmlns:a14="http://schemas.microsoft.com/office/drawing/2010/main" w="9525">
+                <a14:hiddenLine xmlns:a14="http://schemas.microsoft.com/office/drawing/2010/main" xmlns="" w="9525">
                   <a:solidFill>
                     <a:srgbClr val="000000"/>
                   </a:solidFill>
@@ -5148,7 +5149,7 @@
             </a:ln>
             <a:extLst>
               <a:ext uri="{91240B29-F687-4f45-9708-019B960494DF}">
-                <a14:hiddenLine xmlns="" xmlns:a14="http://schemas.microsoft.com/office/drawing/2010/main" w="9525">
+                <a14:hiddenLine xmlns:a14="http://schemas.microsoft.com/office/drawing/2010/main" xmlns="" w="9525">
                   <a:solidFill>
                     <a:srgbClr val="000000"/>
                   </a:solidFill>
@@ -5238,7 +5239,7 @@
             </a:ln>
             <a:extLst>
               <a:ext uri="{91240B29-F687-4f45-9708-019B960494DF}">
-                <a14:hiddenLine xmlns="" xmlns:a14="http://schemas.microsoft.com/office/drawing/2010/main" w="9525">
+                <a14:hiddenLine xmlns:a14="http://schemas.microsoft.com/office/drawing/2010/main" xmlns="" w="9525">
                   <a:solidFill>
                     <a:srgbClr val="000000"/>
                   </a:solidFill>
@@ -5328,7 +5329,7 @@
             </a:ln>
             <a:extLst>
               <a:ext uri="{91240B29-F687-4f45-9708-019B960494DF}">
-                <a14:hiddenLine xmlns="" xmlns:a14="http://schemas.microsoft.com/office/drawing/2010/main" w="9525">
+                <a14:hiddenLine xmlns:a14="http://schemas.microsoft.com/office/drawing/2010/main" xmlns="" w="9525">
                   <a:solidFill>
                     <a:srgbClr val="000000"/>
                   </a:solidFill>
@@ -5390,7 +5391,7 @@
             </a:ln>
             <a:extLst>
               <a:ext uri="{91240B29-F687-4f45-9708-019B960494DF}">
-                <a14:hiddenLine xmlns="" xmlns:a14="http://schemas.microsoft.com/office/drawing/2010/main" w="9525">
+                <a14:hiddenLine xmlns:a14="http://schemas.microsoft.com/office/drawing/2010/main" xmlns="" w="9525">
                   <a:solidFill>
                     <a:srgbClr val="000000"/>
                   </a:solidFill>
@@ -5510,7 +5511,7 @@
             </a:ln>
             <a:extLst>
               <a:ext uri="{91240B29-F687-4f45-9708-019B960494DF}">
-                <a14:hiddenLine xmlns="" xmlns:a14="http://schemas.microsoft.com/office/drawing/2010/main" w="9525">
+                <a14:hiddenLine xmlns:a14="http://schemas.microsoft.com/office/drawing/2010/main" xmlns="" w="9525">
                   <a:solidFill>
                     <a:srgbClr val="000000"/>
                   </a:solidFill>
@@ -5578,7 +5579,7 @@
             </a:ln>
             <a:extLst>
               <a:ext uri="{91240B29-F687-4f45-9708-019B960494DF}">
-                <a14:hiddenLine xmlns="" xmlns:a14="http://schemas.microsoft.com/office/drawing/2010/main" w="9525">
+                <a14:hiddenLine xmlns:a14="http://schemas.microsoft.com/office/drawing/2010/main" xmlns="" w="9525">
                   <a:solidFill>
                     <a:srgbClr val="000000"/>
                   </a:solidFill>
@@ -5668,7 +5669,7 @@
             </a:ln>
             <a:extLst>
               <a:ext uri="{91240B29-F687-4f45-9708-019B960494DF}">
-                <a14:hiddenLine xmlns="" xmlns:a14="http://schemas.microsoft.com/office/drawing/2010/main" w="9525">
+                <a14:hiddenLine xmlns:a14="http://schemas.microsoft.com/office/drawing/2010/main" xmlns="" w="9525">
                   <a:solidFill>
                     <a:srgbClr val="000000"/>
                   </a:solidFill>
@@ -10397,7 +10398,7 @@
           <a:noFill/>
           <a:extLst>
             <a:ext uri="{909E8E84-426E-40dd-AFC4-6F175D3DCCD1}">
-              <a14:hiddenFill xmlns="" xmlns:a14="http://schemas.microsoft.com/office/drawing/2010/main">
+              <a14:hiddenFill xmlns:a14="http://schemas.microsoft.com/office/drawing/2010/main" xmlns="">
                 <a:solidFill>
                   <a:srgbClr val="FFFFFF"/>
                 </a:solidFill>
@@ -10471,7 +10472,7 @@
               </a:ln>
               <a:extLst>
                 <a:ext uri="{91240B29-F687-4f45-9708-019B960494DF}">
-                  <a14:hiddenLine xmlns="" xmlns:a14="http://schemas.microsoft.com/office/drawing/2010/main" w="9525">
+                  <a14:hiddenLine xmlns:a14="http://schemas.microsoft.com/office/drawing/2010/main" xmlns="" w="9525">
                     <a:solidFill>
                       <a:srgbClr val="000000"/>
                     </a:solidFill>
@@ -10561,7 +10562,7 @@
               </a:ln>
               <a:extLst>
                 <a:ext uri="{91240B29-F687-4f45-9708-019B960494DF}">
-                  <a14:hiddenLine xmlns="" xmlns:a14="http://schemas.microsoft.com/office/drawing/2010/main" w="9525">
+                  <a14:hiddenLine xmlns:a14="http://schemas.microsoft.com/office/drawing/2010/main" xmlns="" w="9525">
                     <a:solidFill>
                       <a:srgbClr val="000000"/>
                     </a:solidFill>
@@ -10651,7 +10652,7 @@
               </a:ln>
               <a:extLst>
                 <a:ext uri="{91240B29-F687-4f45-9708-019B960494DF}">
-                  <a14:hiddenLine xmlns="" xmlns:a14="http://schemas.microsoft.com/office/drawing/2010/main" w="9525">
+                  <a14:hiddenLine xmlns:a14="http://schemas.microsoft.com/office/drawing/2010/main" xmlns="" w="9525">
                     <a:solidFill>
                       <a:srgbClr val="000000"/>
                     </a:solidFill>
@@ -10713,7 +10714,7 @@
               </a:ln>
               <a:extLst>
                 <a:ext uri="{91240B29-F687-4f45-9708-019B960494DF}">
-                  <a14:hiddenLine xmlns="" xmlns:a14="http://schemas.microsoft.com/office/drawing/2010/main" w="9525">
+                  <a14:hiddenLine xmlns:a14="http://schemas.microsoft.com/office/drawing/2010/main" xmlns="" w="9525">
                     <a:solidFill>
                       <a:srgbClr val="000000"/>
                     </a:solidFill>
@@ -10803,7 +10804,7 @@
               </a:ln>
               <a:extLst>
                 <a:ext uri="{91240B29-F687-4f45-9708-019B960494DF}">
-                  <a14:hiddenLine xmlns="" xmlns:a14="http://schemas.microsoft.com/office/drawing/2010/main" w="9525">
+                  <a14:hiddenLine xmlns:a14="http://schemas.microsoft.com/office/drawing/2010/main" xmlns="" w="9525">
                     <a:solidFill>
                       <a:srgbClr val="000000"/>
                     </a:solidFill>
@@ -10865,7 +10866,7 @@
               </a:ln>
               <a:extLst>
                 <a:ext uri="{91240B29-F687-4f45-9708-019B960494DF}">
-                  <a14:hiddenLine xmlns="" xmlns:a14="http://schemas.microsoft.com/office/drawing/2010/main" w="9525">
+                  <a14:hiddenLine xmlns:a14="http://schemas.microsoft.com/office/drawing/2010/main" xmlns="" w="9525">
                     <a:solidFill>
                       <a:srgbClr val="000000"/>
                     </a:solidFill>
@@ -10927,7 +10928,7 @@
               </a:ln>
               <a:extLst>
                 <a:ext uri="{91240B29-F687-4f45-9708-019B960494DF}">
-                  <a14:hiddenLine xmlns="" xmlns:a14="http://schemas.microsoft.com/office/drawing/2010/main" w="9525">
+                  <a14:hiddenLine xmlns:a14="http://schemas.microsoft.com/office/drawing/2010/main" xmlns="" w="9525">
                     <a:solidFill>
                       <a:srgbClr val="000000"/>
                     </a:solidFill>
@@ -11017,7 +11018,7 @@
               </a:ln>
               <a:extLst>
                 <a:ext uri="{91240B29-F687-4f45-9708-019B960494DF}">
-                  <a14:hiddenLine xmlns="" xmlns:a14="http://schemas.microsoft.com/office/drawing/2010/main" w="9525">
+                  <a14:hiddenLine xmlns:a14="http://schemas.microsoft.com/office/drawing/2010/main" xmlns="" w="9525">
                     <a:solidFill>
                       <a:srgbClr val="000000"/>
                     </a:solidFill>
@@ -11107,7 +11108,7 @@
               </a:ln>
               <a:extLst>
                 <a:ext uri="{91240B29-F687-4f45-9708-019B960494DF}">
-                  <a14:hiddenLine xmlns="" xmlns:a14="http://schemas.microsoft.com/office/drawing/2010/main" w="9525">
+                  <a14:hiddenLine xmlns:a14="http://schemas.microsoft.com/office/drawing/2010/main" xmlns="" w="9525">
                     <a:solidFill>
                       <a:srgbClr val="000000"/>
                     </a:solidFill>
@@ -11169,7 +11170,7 @@
               </a:ln>
               <a:extLst>
                 <a:ext uri="{91240B29-F687-4f45-9708-019B960494DF}">
-                  <a14:hiddenLine xmlns="" xmlns:a14="http://schemas.microsoft.com/office/drawing/2010/main" w="9525">
+                  <a14:hiddenLine xmlns:a14="http://schemas.microsoft.com/office/drawing/2010/main" xmlns="" w="9525">
                     <a:solidFill>
                       <a:srgbClr val="000000"/>
                     </a:solidFill>
@@ -11279,7 +11280,7 @@
               </a:ln>
               <a:extLst>
                 <a:ext uri="{91240B29-F687-4f45-9708-019B960494DF}">
-                  <a14:hiddenLine xmlns="" xmlns:a14="http://schemas.microsoft.com/office/drawing/2010/main" w="9525">
+                  <a14:hiddenLine xmlns:a14="http://schemas.microsoft.com/office/drawing/2010/main" xmlns="" w="9525">
                     <a:solidFill>
                       <a:srgbClr val="000000"/>
                     </a:solidFill>
@@ -11363,7 +11364,7 @@
               </a:ln>
               <a:extLst>
                 <a:ext uri="{91240B29-F687-4f45-9708-019B960494DF}">
-                  <a14:hiddenLine xmlns="" xmlns:a14="http://schemas.microsoft.com/office/drawing/2010/main" w="9525">
+                  <a14:hiddenLine xmlns:a14="http://schemas.microsoft.com/office/drawing/2010/main" xmlns="" w="9525">
                     <a:solidFill>
                       <a:srgbClr val="000000"/>
                     </a:solidFill>
@@ -11425,7 +11426,7 @@
               </a:ln>
               <a:extLst>
                 <a:ext uri="{91240B29-F687-4f45-9708-019B960494DF}">
-                  <a14:hiddenLine xmlns="" xmlns:a14="http://schemas.microsoft.com/office/drawing/2010/main" w="9525">
+                  <a14:hiddenLine xmlns:a14="http://schemas.microsoft.com/office/drawing/2010/main" xmlns="" w="9525">
                     <a:solidFill>
                       <a:srgbClr val="000000"/>
                     </a:solidFill>
@@ -11487,7 +11488,7 @@
               </a:ln>
               <a:extLst>
                 <a:ext uri="{91240B29-F687-4f45-9708-019B960494DF}">
-                  <a14:hiddenLine xmlns="" xmlns:a14="http://schemas.microsoft.com/office/drawing/2010/main" w="9525">
+                  <a14:hiddenLine xmlns:a14="http://schemas.microsoft.com/office/drawing/2010/main" xmlns="" w="9525">
                     <a:solidFill>
                       <a:srgbClr val="000000"/>
                     </a:solidFill>
@@ -11577,7 +11578,7 @@
               </a:ln>
               <a:extLst>
                 <a:ext uri="{91240B29-F687-4f45-9708-019B960494DF}">
-                  <a14:hiddenLine xmlns="" xmlns:a14="http://schemas.microsoft.com/office/drawing/2010/main" w="9525">
+                  <a14:hiddenLine xmlns:a14="http://schemas.microsoft.com/office/drawing/2010/main" xmlns="" w="9525">
                     <a:solidFill>
                       <a:srgbClr val="000000"/>
                     </a:solidFill>
@@ -11611,7 +11612,7 @@
               </a:ln>
               <a:extLst>
                 <a:ext uri="{91240B29-F687-4f45-9708-019B960494DF}">
-                  <a14:hiddenLine xmlns="" xmlns:a14="http://schemas.microsoft.com/office/drawing/2010/main" w="9525">
+                  <a14:hiddenLine xmlns:a14="http://schemas.microsoft.com/office/drawing/2010/main" xmlns="" w="9525">
                     <a:solidFill>
                       <a:srgbClr val="000000"/>
                     </a:solidFill>
@@ -11676,7 +11677,7 @@
               </a:ln>
               <a:extLst>
                 <a:ext uri="{91240B29-F687-4f45-9708-019B960494DF}">
-                  <a14:hiddenLine xmlns="" xmlns:a14="http://schemas.microsoft.com/office/drawing/2010/main" w="9525">
+                  <a14:hiddenLine xmlns:a14="http://schemas.microsoft.com/office/drawing/2010/main" xmlns="" w="9525">
                     <a:solidFill>
                       <a:srgbClr val="000000"/>
                     </a:solidFill>
@@ -11766,7 +11767,7 @@
               </a:ln>
               <a:extLst>
                 <a:ext uri="{91240B29-F687-4f45-9708-019B960494DF}">
-                  <a14:hiddenLine xmlns="" xmlns:a14="http://schemas.microsoft.com/office/drawing/2010/main" w="9525">
+                  <a14:hiddenLine xmlns:a14="http://schemas.microsoft.com/office/drawing/2010/main" xmlns="" w="9525">
                     <a:solidFill>
                       <a:srgbClr val="000000"/>
                     </a:solidFill>
@@ -11828,7 +11829,7 @@
               </a:ln>
               <a:extLst>
                 <a:ext uri="{91240B29-F687-4f45-9708-019B960494DF}">
-                  <a14:hiddenLine xmlns="" xmlns:a14="http://schemas.microsoft.com/office/drawing/2010/main" w="9525">
+                  <a14:hiddenLine xmlns:a14="http://schemas.microsoft.com/office/drawing/2010/main" xmlns="" w="9525">
                     <a:solidFill>
                       <a:srgbClr val="000000"/>
                     </a:solidFill>
@@ -11918,7 +11919,7 @@
               </a:ln>
               <a:extLst>
                 <a:ext uri="{91240B29-F687-4f45-9708-019B960494DF}">
-                  <a14:hiddenLine xmlns="" xmlns:a14="http://schemas.microsoft.com/office/drawing/2010/main" w="9525">
+                  <a14:hiddenLine xmlns:a14="http://schemas.microsoft.com/office/drawing/2010/main" xmlns="" w="9525">
                     <a:solidFill>
                       <a:srgbClr val="000000"/>
                     </a:solidFill>
@@ -11983,7 +11984,7 @@
               </a:ln>
               <a:extLst>
                 <a:ext uri="{91240B29-F687-4f45-9708-019B960494DF}">
-                  <a14:hiddenLine xmlns="" xmlns:a14="http://schemas.microsoft.com/office/drawing/2010/main" w="9525">
+                  <a14:hiddenLine xmlns:a14="http://schemas.microsoft.com/office/drawing/2010/main" xmlns="" w="9525">
                     <a:solidFill>
                       <a:srgbClr val="000000"/>
                     </a:solidFill>
@@ -12045,7 +12046,7 @@
               </a:ln>
               <a:extLst>
                 <a:ext uri="{91240B29-F687-4f45-9708-019B960494DF}">
-                  <a14:hiddenLine xmlns="" xmlns:a14="http://schemas.microsoft.com/office/drawing/2010/main" w="9525">
+                  <a14:hiddenLine xmlns:a14="http://schemas.microsoft.com/office/drawing/2010/main" xmlns="" w="9525">
                     <a:solidFill>
                       <a:srgbClr val="000000"/>
                     </a:solidFill>
@@ -12135,7 +12136,7 @@
               </a:ln>
               <a:extLst>
                 <a:ext uri="{91240B29-F687-4f45-9708-019B960494DF}">
-                  <a14:hiddenLine xmlns="" xmlns:a14="http://schemas.microsoft.com/office/drawing/2010/main" w="9525">
+                  <a14:hiddenLine xmlns:a14="http://schemas.microsoft.com/office/drawing/2010/main" xmlns="" w="9525">
                     <a:solidFill>
                       <a:srgbClr val="000000"/>
                     </a:solidFill>
@@ -12225,7 +12226,7 @@
               </a:ln>
               <a:extLst>
                 <a:ext uri="{91240B29-F687-4f45-9708-019B960494DF}">
-                  <a14:hiddenLine xmlns="" xmlns:a14="http://schemas.microsoft.com/office/drawing/2010/main" w="9525">
+                  <a14:hiddenLine xmlns:a14="http://schemas.microsoft.com/office/drawing/2010/main" xmlns="" w="9525">
                     <a:solidFill>
                       <a:srgbClr val="000000"/>
                     </a:solidFill>
@@ -12290,7 +12291,7 @@
               </a:ln>
               <a:extLst>
                 <a:ext uri="{91240B29-F687-4f45-9708-019B960494DF}">
-                  <a14:hiddenLine xmlns="" xmlns:a14="http://schemas.microsoft.com/office/drawing/2010/main" w="9525">
+                  <a14:hiddenLine xmlns:a14="http://schemas.microsoft.com/office/drawing/2010/main" xmlns="" w="9525">
                     <a:solidFill>
                       <a:srgbClr val="000000"/>
                     </a:solidFill>
@@ -12410,7 +12411,7 @@
               </a:ln>
               <a:extLst>
                 <a:ext uri="{91240B29-F687-4f45-9708-019B960494DF}">
-                  <a14:hiddenLine xmlns="" xmlns:a14="http://schemas.microsoft.com/office/drawing/2010/main" w="9525">
+                  <a14:hiddenLine xmlns:a14="http://schemas.microsoft.com/office/drawing/2010/main" xmlns="" w="9525">
                     <a:solidFill>
                       <a:srgbClr val="000000"/>
                     </a:solidFill>
@@ -12491,7 +12492,7 @@
               </a:ln>
               <a:extLst>
                 <a:ext uri="{91240B29-F687-4f45-9708-019B960494DF}">
-                  <a14:hiddenLine xmlns="" xmlns:a14="http://schemas.microsoft.com/office/drawing/2010/main" w="9525">
+                  <a14:hiddenLine xmlns:a14="http://schemas.microsoft.com/office/drawing/2010/main" xmlns="" w="9525">
                     <a:solidFill>
                       <a:srgbClr val="000000"/>
                     </a:solidFill>
@@ -12606,7 +12607,7 @@
               </a:ln>
               <a:extLst>
                 <a:ext uri="{91240B29-F687-4f45-9708-019B960494DF}">
-                  <a14:hiddenLine xmlns="" xmlns:a14="http://schemas.microsoft.com/office/drawing/2010/main" w="9525">
+                  <a14:hiddenLine xmlns:a14="http://schemas.microsoft.com/office/drawing/2010/main" xmlns="" w="9525">
                     <a:solidFill>
                       <a:srgbClr val="000000"/>
                     </a:solidFill>
@@ -12696,7 +12697,7 @@
               </a:ln>
               <a:extLst>
                 <a:ext uri="{91240B29-F687-4f45-9708-019B960494DF}">
-                  <a14:hiddenLine xmlns="" xmlns:a14="http://schemas.microsoft.com/office/drawing/2010/main" w="9525">
+                  <a14:hiddenLine xmlns:a14="http://schemas.microsoft.com/office/drawing/2010/main" xmlns="" w="9525">
                     <a:solidFill>
                       <a:srgbClr val="000000"/>
                     </a:solidFill>
@@ -12761,7 +12762,7 @@
               </a:ln>
               <a:extLst>
                 <a:ext uri="{91240B29-F687-4f45-9708-019B960494DF}">
-                  <a14:hiddenLine xmlns="" xmlns:a14="http://schemas.microsoft.com/office/drawing/2010/main" w="9525">
+                  <a14:hiddenLine xmlns:a14="http://schemas.microsoft.com/office/drawing/2010/main" xmlns="" w="9525">
                     <a:solidFill>
                       <a:srgbClr val="000000"/>
                     </a:solidFill>
@@ -12851,7 +12852,7 @@
               </a:ln>
               <a:extLst>
                 <a:ext uri="{91240B29-F687-4f45-9708-019B960494DF}">
-                  <a14:hiddenLine xmlns="" xmlns:a14="http://schemas.microsoft.com/office/drawing/2010/main" w="9525">
+                  <a14:hiddenLine xmlns:a14="http://schemas.microsoft.com/office/drawing/2010/main" xmlns="" w="9525">
                     <a:solidFill>
                       <a:srgbClr val="000000"/>
                     </a:solidFill>
@@ -12919,7 +12920,7 @@
               </a:ln>
               <a:extLst>
                 <a:ext uri="{91240B29-F687-4f45-9708-019B960494DF}">
-                  <a14:hiddenLine xmlns="" xmlns:a14="http://schemas.microsoft.com/office/drawing/2010/main" w="9525">
+                  <a14:hiddenLine xmlns:a14="http://schemas.microsoft.com/office/drawing/2010/main" xmlns="" w="9525">
                     <a:solidFill>
                       <a:srgbClr val="000000"/>
                     </a:solidFill>
@@ -13009,7 +13010,7 @@
               </a:ln>
               <a:extLst>
                 <a:ext uri="{91240B29-F687-4f45-9708-019B960494DF}">
-                  <a14:hiddenLine xmlns="" xmlns:a14="http://schemas.microsoft.com/office/drawing/2010/main" w="9525">
+                  <a14:hiddenLine xmlns:a14="http://schemas.microsoft.com/office/drawing/2010/main" xmlns="" w="9525">
                     <a:solidFill>
                       <a:srgbClr val="000000"/>
                     </a:solidFill>
@@ -13077,7 +13078,7 @@
               </a:ln>
               <a:extLst>
                 <a:ext uri="{91240B29-F687-4f45-9708-019B960494DF}">
-                  <a14:hiddenLine xmlns="" xmlns:a14="http://schemas.microsoft.com/office/drawing/2010/main" w="9525">
+                  <a14:hiddenLine xmlns:a14="http://schemas.microsoft.com/office/drawing/2010/main" xmlns="" w="9525">
                     <a:solidFill>
                       <a:srgbClr val="000000"/>
                     </a:solidFill>
@@ -13167,7 +13168,7 @@
               </a:ln>
               <a:extLst>
                 <a:ext uri="{91240B29-F687-4f45-9708-019B960494DF}">
-                  <a14:hiddenLine xmlns="" xmlns:a14="http://schemas.microsoft.com/office/drawing/2010/main" w="9525">
+                  <a14:hiddenLine xmlns:a14="http://schemas.microsoft.com/office/drawing/2010/main" xmlns="" w="9525">
                     <a:solidFill>
                       <a:srgbClr val="000000"/>
                     </a:solidFill>
@@ -13201,7 +13202,7 @@
               </a:ln>
               <a:extLst>
                 <a:ext uri="{91240B29-F687-4f45-9708-019B960494DF}">
-                  <a14:hiddenLine xmlns="" xmlns:a14="http://schemas.microsoft.com/office/drawing/2010/main" w="9525">
+                  <a14:hiddenLine xmlns:a14="http://schemas.microsoft.com/office/drawing/2010/main" xmlns="" w="9525">
                     <a:solidFill>
                       <a:srgbClr val="000000"/>
                     </a:solidFill>
@@ -14264,6 +14265,362 @@
 </p:sld>
 </file>
 
+<file path=ppt/slides/slide11.xml><?xml version="1.0" encoding="utf-8"?>
+<p:sld xmlns:a="http://schemas.openxmlformats.org/drawingml/2006/main" xmlns:r="http://schemas.openxmlformats.org/officeDocument/2006/relationships" xmlns:p="http://schemas.openxmlformats.org/presentationml/2006/main">
+  <p:cSld>
+    <p:spTree>
+      <p:nvGrpSpPr>
+        <p:cNvPr id="1" name=""/>
+        <p:cNvGrpSpPr/>
+        <p:nvPr/>
+      </p:nvGrpSpPr>
+      <p:grpSpPr>
+        <a:xfrm>
+          <a:off x="0" y="0"/>
+          <a:ext cx="0" cy="0"/>
+          <a:chOff x="0" y="0"/>
+          <a:chExt cx="0" cy="0"/>
+        </a:xfrm>
+      </p:grpSpPr>
+      <p:sp>
+        <p:nvSpPr>
+          <p:cNvPr id="2" name="Título 1">
+            <a:extLst>
+              <a:ext uri="{FF2B5EF4-FFF2-40B4-BE49-F238E27FC236}">
+                <a16:creationId xmlns:a16="http://schemas.microsoft.com/office/drawing/2014/main" id="{8426950A-93C8-E90F-588F-5BCB52726D90}"/>
+              </a:ext>
+            </a:extLst>
+          </p:cNvPr>
+          <p:cNvSpPr>
+            <a:spLocks noGrp="1"/>
+          </p:cNvSpPr>
+          <p:nvPr>
+            <p:ph type="title"/>
+          </p:nvPr>
+        </p:nvSpPr>
+        <p:spPr>
+          <a:xfrm>
+            <a:off x="984250" y="664238"/>
+            <a:ext cx="9905998" cy="1478570"/>
+          </a:xfrm>
+        </p:spPr>
+        <p:txBody>
+          <a:bodyPr/>
+          <a:lstStyle/>
+          <a:p>
+            <a:pPr algn="ctr"/>
+            <a:r>
+              <a:rPr lang="es-ES" sz="3600" dirty="0"/>
+              <a:t>Tablas en SQL</a:t>
+            </a:r>
+            <a:endParaRPr lang="es-ES" dirty="0"/>
+          </a:p>
+        </p:txBody>
+      </p:sp>
+      <p:pic>
+        <p:nvPicPr>
+          <p:cNvPr id="6" name="Imagen 5">
+            <a:extLst>
+              <a:ext uri="{FF2B5EF4-FFF2-40B4-BE49-F238E27FC236}">
+                <a16:creationId xmlns:a16="http://schemas.microsoft.com/office/drawing/2014/main" id="{CA53390F-C838-67E8-6383-6585BE5CAB43}"/>
+              </a:ext>
+            </a:extLst>
+          </p:cNvPr>
+          <p:cNvPicPr>
+            <a:picLocks noChangeAspect="1"/>
+          </p:cNvPicPr>
+          <p:nvPr/>
+        </p:nvPicPr>
+        <p:blipFill>
+          <a:blip r:embed="rId2"/>
+          <a:stretch>
+            <a:fillRect/>
+          </a:stretch>
+        </p:blipFill>
+        <p:spPr>
+          <a:xfrm>
+            <a:off x="7246339" y="2305009"/>
+            <a:ext cx="3643909" cy="1123991"/>
+          </a:xfrm>
+          <a:prstGeom prst="rect">
+            <a:avLst/>
+          </a:prstGeom>
+        </p:spPr>
+      </p:pic>
+      <p:pic>
+        <p:nvPicPr>
+          <p:cNvPr id="10" name="Imagen 9">
+            <a:extLst>
+              <a:ext uri="{FF2B5EF4-FFF2-40B4-BE49-F238E27FC236}">
+                <a16:creationId xmlns:a16="http://schemas.microsoft.com/office/drawing/2014/main" id="{A2B6C4CB-25D4-2E1B-6D02-DF0F21E0B593}"/>
+              </a:ext>
+            </a:extLst>
+          </p:cNvPr>
+          <p:cNvPicPr>
+            <a:picLocks noChangeAspect="1"/>
+          </p:cNvPicPr>
+          <p:nvPr/>
+        </p:nvPicPr>
+        <p:blipFill>
+          <a:blip r:embed="rId3"/>
+          <a:stretch>
+            <a:fillRect/>
+          </a:stretch>
+        </p:blipFill>
+        <p:spPr>
+          <a:xfrm>
+            <a:off x="7246339" y="3919474"/>
+            <a:ext cx="3643908" cy="1672325"/>
+          </a:xfrm>
+          <a:prstGeom prst="rect">
+            <a:avLst/>
+          </a:prstGeom>
+        </p:spPr>
+      </p:pic>
+      <p:sp>
+        <p:nvSpPr>
+          <p:cNvPr id="11" name="CuadroTexto 10">
+            <a:extLst>
+              <a:ext uri="{FF2B5EF4-FFF2-40B4-BE49-F238E27FC236}">
+                <a16:creationId xmlns:a16="http://schemas.microsoft.com/office/drawing/2014/main" id="{4C48F300-7201-9519-6601-3CB5A2E72EF7}"/>
+              </a:ext>
+            </a:extLst>
+          </p:cNvPr>
+          <p:cNvSpPr txBox="1"/>
+          <p:nvPr/>
+        </p:nvSpPr>
+        <p:spPr>
+          <a:xfrm>
+            <a:off x="1657350" y="2305009"/>
+            <a:ext cx="1321324" cy="2862322"/>
+          </a:xfrm>
+          <a:prstGeom prst="rect">
+            <a:avLst/>
+          </a:prstGeom>
+          <a:noFill/>
+        </p:spPr>
+        <p:txBody>
+          <a:bodyPr wrap="none" rtlCol="0">
+            <a:spAutoFit/>
+          </a:bodyPr>
+          <a:lstStyle/>
+          <a:p>
+            <a:r>
+              <a:rPr lang="es-ES" dirty="0"/>
+              <a:t>Roles:</a:t>
+            </a:r>
+          </a:p>
+          <a:p>
+            <a:pPr marL="285750" indent="-285750">
+              <a:buFont typeface="Arial" panose="020B0604020202020204" pitchFamily="34" charset="0"/>
+              <a:buChar char="•"/>
+            </a:pPr>
+            <a:r>
+              <a:rPr lang="es-ES" dirty="0"/>
+              <a:t>ID</a:t>
+            </a:r>
+          </a:p>
+          <a:p>
+            <a:pPr marL="285750" indent="-285750">
+              <a:buFont typeface="Arial" panose="020B0604020202020204" pitchFamily="34" charset="0"/>
+              <a:buChar char="•"/>
+            </a:pPr>
+            <a:r>
+              <a:rPr lang="es-ES" dirty="0"/>
+              <a:t>Nombre</a:t>
+            </a:r>
+          </a:p>
+          <a:p>
+            <a:pPr marL="285750" indent="-285750">
+              <a:buFont typeface="Arial" panose="020B0604020202020204" pitchFamily="34" charset="0"/>
+              <a:buChar char="•"/>
+            </a:pPr>
+            <a:endParaRPr lang="es-ES" dirty="0"/>
+          </a:p>
+          <a:p>
+            <a:pPr marL="285750" indent="-285750">
+              <a:buFont typeface="Arial" panose="020B0604020202020204" pitchFamily="34" charset="0"/>
+              <a:buChar char="•"/>
+            </a:pPr>
+            <a:endParaRPr lang="es-ES" dirty="0"/>
+          </a:p>
+          <a:p>
+            <a:r>
+              <a:rPr lang="es-ES" dirty="0"/>
+              <a:t>Usuarios:</a:t>
+            </a:r>
+          </a:p>
+          <a:p>
+            <a:pPr marL="285750" indent="-285750">
+              <a:buFont typeface="Arial" panose="020B0604020202020204" pitchFamily="34" charset="0"/>
+              <a:buChar char="•"/>
+            </a:pPr>
+            <a:r>
+              <a:rPr lang="es-ES" dirty="0"/>
+              <a:t>ID</a:t>
+            </a:r>
+          </a:p>
+          <a:p>
+            <a:pPr marL="285750" indent="-285750">
+              <a:buFont typeface="Arial" panose="020B0604020202020204" pitchFamily="34" charset="0"/>
+              <a:buChar char="•"/>
+            </a:pPr>
+            <a:r>
+              <a:rPr lang="es-ES" dirty="0"/>
+              <a:t>Email</a:t>
+            </a:r>
+          </a:p>
+          <a:p>
+            <a:pPr marL="285750" indent="-285750">
+              <a:buFont typeface="Arial" panose="020B0604020202020204" pitchFamily="34" charset="0"/>
+              <a:buChar char="•"/>
+            </a:pPr>
+            <a:r>
+              <a:rPr lang="es-ES" dirty="0" err="1"/>
+              <a:t>Password</a:t>
+            </a:r>
+            <a:endParaRPr lang="es-ES" dirty="0"/>
+          </a:p>
+          <a:p>
+            <a:pPr marL="285750" indent="-285750">
+              <a:buFont typeface="Arial" panose="020B0604020202020204" pitchFamily="34" charset="0"/>
+              <a:buChar char="•"/>
+            </a:pPr>
+            <a:r>
+              <a:rPr lang="es-ES" dirty="0" err="1"/>
+              <a:t>IdRol</a:t>
+            </a:r>
+            <a:endParaRPr lang="es-ES" dirty="0"/>
+          </a:p>
+        </p:txBody>
+      </p:sp>
+      <p:sp>
+        <p:nvSpPr>
+          <p:cNvPr id="12" name="Flecha: a la derecha 11">
+            <a:extLst>
+              <a:ext uri="{FF2B5EF4-FFF2-40B4-BE49-F238E27FC236}">
+                <a16:creationId xmlns:a16="http://schemas.microsoft.com/office/drawing/2014/main" id="{1624353A-50EF-118C-EB46-810CDE1606B8}"/>
+              </a:ext>
+            </a:extLst>
+          </p:cNvPr>
+          <p:cNvSpPr/>
+          <p:nvPr/>
+        </p:nvSpPr>
+        <p:spPr>
+          <a:xfrm>
+            <a:off x="4675688" y="4472877"/>
+            <a:ext cx="1167899" cy="694454"/>
+          </a:xfrm>
+          <a:prstGeom prst="rightArrow">
+            <a:avLst/>
+          </a:prstGeom>
+          <a:solidFill>
+            <a:schemeClr val="bg2">
+              <a:lumMod val="50000"/>
+              <a:lumOff val="50000"/>
+            </a:schemeClr>
+          </a:solidFill>
+          <a:ln>
+            <a:solidFill>
+              <a:schemeClr val="bg1"/>
+            </a:solidFill>
+          </a:ln>
+        </p:spPr>
+        <p:style>
+          <a:lnRef idx="2">
+            <a:schemeClr val="accent1">
+              <a:shade val="50000"/>
+            </a:schemeClr>
+          </a:lnRef>
+          <a:fillRef idx="1">
+            <a:schemeClr val="accent1"/>
+          </a:fillRef>
+          <a:effectRef idx="0">
+            <a:schemeClr val="accent1"/>
+          </a:effectRef>
+          <a:fontRef idx="minor">
+            <a:schemeClr val="lt1"/>
+          </a:fontRef>
+        </p:style>
+        <p:txBody>
+          <a:bodyPr rtlCol="0" anchor="ctr"/>
+          <a:lstStyle/>
+          <a:p>
+            <a:pPr algn="ctr"/>
+            <a:endParaRPr lang="es-ES"/>
+          </a:p>
+        </p:txBody>
+      </p:sp>
+      <p:sp>
+        <p:nvSpPr>
+          <p:cNvPr id="13" name="Flecha: a la derecha 12">
+            <a:extLst>
+              <a:ext uri="{FF2B5EF4-FFF2-40B4-BE49-F238E27FC236}">
+                <a16:creationId xmlns:a16="http://schemas.microsoft.com/office/drawing/2014/main" id="{8BFAAE32-2054-A2B6-03C9-0C34534767F9}"/>
+              </a:ext>
+            </a:extLst>
+          </p:cNvPr>
+          <p:cNvSpPr/>
+          <p:nvPr/>
+        </p:nvSpPr>
+        <p:spPr>
+          <a:xfrm>
+            <a:off x="4675687" y="2519777"/>
+            <a:ext cx="1167899" cy="694454"/>
+          </a:xfrm>
+          <a:prstGeom prst="rightArrow">
+            <a:avLst/>
+          </a:prstGeom>
+          <a:solidFill>
+            <a:schemeClr val="bg2">
+              <a:lumMod val="50000"/>
+              <a:lumOff val="50000"/>
+            </a:schemeClr>
+          </a:solidFill>
+          <a:ln>
+            <a:solidFill>
+              <a:schemeClr val="bg1"/>
+            </a:solidFill>
+          </a:ln>
+        </p:spPr>
+        <p:style>
+          <a:lnRef idx="2">
+            <a:schemeClr val="accent1">
+              <a:shade val="50000"/>
+            </a:schemeClr>
+          </a:lnRef>
+          <a:fillRef idx="1">
+            <a:schemeClr val="accent1"/>
+          </a:fillRef>
+          <a:effectRef idx="0">
+            <a:schemeClr val="accent1"/>
+          </a:effectRef>
+          <a:fontRef idx="minor">
+            <a:schemeClr val="lt1"/>
+          </a:fontRef>
+        </p:style>
+        <p:txBody>
+          <a:bodyPr rtlCol="0" anchor="ctr"/>
+          <a:lstStyle/>
+          <a:p>
+            <a:pPr algn="ctr"/>
+            <a:endParaRPr lang="es-ES"/>
+          </a:p>
+        </p:txBody>
+      </p:sp>
+    </p:spTree>
+    <p:extLst>
+      <p:ext uri="{BB962C8B-B14F-4D97-AF65-F5344CB8AC3E}">
+        <p14:creationId xmlns:p14="http://schemas.microsoft.com/office/powerpoint/2010/main" val="2542330213"/>
+      </p:ext>
+    </p:extLst>
+  </p:cSld>
+  <p:clrMapOvr>
+    <a:masterClrMapping/>
+  </p:clrMapOvr>
+</p:sld>
+</file>
+
 <file path=ppt/slides/slide2.xml><?xml version="1.0" encoding="utf-8"?>
 <p:sld xmlns:a="http://schemas.openxmlformats.org/drawingml/2006/main" xmlns:r="http://schemas.openxmlformats.org/officeDocument/2006/relationships" xmlns:p="http://schemas.openxmlformats.org/presentationml/2006/main">
   <p:cSld>
@@ -14894,7 +15251,7 @@
           <a:noFill/>
           <a:extLst>
             <a:ext uri="{909E8E84-426E-40dd-AFC4-6F175D3DCCD1}">
-              <a14:hiddenFill xmlns="" xmlns:a16="http://schemas.microsoft.com/office/drawing/2014/main" xmlns:a14="http://schemas.microsoft.com/office/drawing/2010/main">
+              <a14:hiddenFill xmlns:a14="http://schemas.microsoft.com/office/drawing/2010/main" xmlns:a16="http://schemas.microsoft.com/office/drawing/2014/main" xmlns="">
                 <a:solidFill>
                   <a:srgbClr val="FFFFFF"/>
                 </a:solidFill>
@@ -14986,7 +15343,7 @@
             </a:ln>
             <a:extLst>
               <a:ext uri="{91240B29-F687-4f45-9708-019B960494DF}">
-                <a14:hiddenLine xmlns="" xmlns:a16="http://schemas.microsoft.com/office/drawing/2014/main" xmlns:a14="http://schemas.microsoft.com/office/drawing/2010/main" w="9525">
+                <a14:hiddenLine xmlns:a14="http://schemas.microsoft.com/office/drawing/2010/main" xmlns:a16="http://schemas.microsoft.com/office/drawing/2014/main" xmlns="" w="9525">
                   <a:solidFill>
                     <a:srgbClr val="000000"/>
                   </a:solidFill>
@@ -15091,7 +15448,7 @@
             </a:ln>
             <a:extLst>
               <a:ext uri="{91240B29-F687-4f45-9708-019B960494DF}">
-                <a14:hiddenLine xmlns="" xmlns:a16="http://schemas.microsoft.com/office/drawing/2014/main" xmlns:a14="http://schemas.microsoft.com/office/drawing/2010/main" w="9525">
+                <a14:hiddenLine xmlns:a14="http://schemas.microsoft.com/office/drawing/2010/main" xmlns:a16="http://schemas.microsoft.com/office/drawing/2014/main" xmlns="" w="9525">
                   <a:solidFill>
                     <a:srgbClr val="000000"/>
                   </a:solidFill>
@@ -15196,7 +15553,7 @@
             </a:ln>
             <a:extLst>
               <a:ext uri="{91240B29-F687-4f45-9708-019B960494DF}">
-                <a14:hiddenLine xmlns="" xmlns:a16="http://schemas.microsoft.com/office/drawing/2014/main" xmlns:a14="http://schemas.microsoft.com/office/drawing/2010/main" w="9525">
+                <a14:hiddenLine xmlns:a14="http://schemas.microsoft.com/office/drawing/2010/main" xmlns:a16="http://schemas.microsoft.com/office/drawing/2014/main" xmlns="" w="9525">
                   <a:solidFill>
                     <a:srgbClr val="000000"/>
                   </a:solidFill>
@@ -15245,7 +15602,7 @@
             </a:ln>
             <a:extLst>
               <a:ext uri="{91240B29-F687-4f45-9708-019B960494DF}">
-                <a14:hiddenLine xmlns="" xmlns:a16="http://schemas.microsoft.com/office/drawing/2014/main" xmlns:a14="http://schemas.microsoft.com/office/drawing/2010/main" w="9525">
+                <a14:hiddenLine xmlns:a14="http://schemas.microsoft.com/office/drawing/2010/main" xmlns:a16="http://schemas.microsoft.com/office/drawing/2014/main" xmlns="" w="9525">
                   <a:solidFill>
                     <a:srgbClr val="000000"/>
                   </a:solidFill>
@@ -15350,7 +15707,7 @@
             </a:ln>
             <a:extLst>
               <a:ext uri="{91240B29-F687-4f45-9708-019B960494DF}">
-                <a14:hiddenLine xmlns="" xmlns:a16="http://schemas.microsoft.com/office/drawing/2014/main" xmlns:a14="http://schemas.microsoft.com/office/drawing/2010/main" w="9525">
+                <a14:hiddenLine xmlns:a14="http://schemas.microsoft.com/office/drawing/2010/main" xmlns:a16="http://schemas.microsoft.com/office/drawing/2014/main" xmlns="" w="9525">
                   <a:solidFill>
                     <a:srgbClr val="000000"/>
                   </a:solidFill>
@@ -15427,7 +15784,7 @@
             </a:ln>
             <a:extLst>
               <a:ext uri="{91240B29-F687-4f45-9708-019B960494DF}">
-                <a14:hiddenLine xmlns="" xmlns:a16="http://schemas.microsoft.com/office/drawing/2014/main" xmlns:a14="http://schemas.microsoft.com/office/drawing/2010/main" w="9525">
+                <a14:hiddenLine xmlns:a14="http://schemas.microsoft.com/office/drawing/2010/main" xmlns:a16="http://schemas.microsoft.com/office/drawing/2014/main" xmlns="" w="9525">
                   <a:solidFill>
                     <a:srgbClr val="000000"/>
                   </a:solidFill>
@@ -15504,7 +15861,7 @@
             </a:ln>
             <a:extLst>
               <a:ext uri="{91240B29-F687-4f45-9708-019B960494DF}">
-                <a14:hiddenLine xmlns="" xmlns:a16="http://schemas.microsoft.com/office/drawing/2014/main" xmlns:a14="http://schemas.microsoft.com/office/drawing/2010/main" w="9525">
+                <a14:hiddenLine xmlns:a14="http://schemas.microsoft.com/office/drawing/2010/main" xmlns:a16="http://schemas.microsoft.com/office/drawing/2014/main" xmlns="" w="9525">
                   <a:solidFill>
                     <a:srgbClr val="000000"/>
                   </a:solidFill>
@@ -15609,7 +15966,7 @@
             </a:ln>
             <a:extLst>
               <a:ext uri="{91240B29-F687-4f45-9708-019B960494DF}">
-                <a14:hiddenLine xmlns="" xmlns:a16="http://schemas.microsoft.com/office/drawing/2014/main" xmlns:a14="http://schemas.microsoft.com/office/drawing/2010/main" w="9525">
+                <a14:hiddenLine xmlns:a14="http://schemas.microsoft.com/office/drawing/2010/main" xmlns:a16="http://schemas.microsoft.com/office/drawing/2014/main" xmlns="" w="9525">
                   <a:solidFill>
                     <a:srgbClr val="000000"/>
                   </a:solidFill>
@@ -15686,7 +16043,7 @@
             </a:ln>
             <a:extLst>
               <a:ext uri="{91240B29-F687-4f45-9708-019B960494DF}">
-                <a14:hiddenLine xmlns="" xmlns:a16="http://schemas.microsoft.com/office/drawing/2014/main" xmlns:a14="http://schemas.microsoft.com/office/drawing/2010/main" w="9525">
+                <a14:hiddenLine xmlns:a14="http://schemas.microsoft.com/office/drawing/2010/main" xmlns:a16="http://schemas.microsoft.com/office/drawing/2014/main" xmlns="" w="9525">
                   <a:solidFill>
                     <a:srgbClr val="000000"/>
                   </a:solidFill>
@@ -15763,7 +16120,7 @@
             </a:ln>
             <a:extLst>
               <a:ext uri="{91240B29-F687-4f45-9708-019B960494DF}">
-                <a14:hiddenLine xmlns="" xmlns:a16="http://schemas.microsoft.com/office/drawing/2014/main" xmlns:a14="http://schemas.microsoft.com/office/drawing/2010/main" w="9525">
+                <a14:hiddenLine xmlns:a14="http://schemas.microsoft.com/office/drawing/2010/main" xmlns:a16="http://schemas.microsoft.com/office/drawing/2014/main" xmlns="" w="9525">
                   <a:solidFill>
                     <a:srgbClr val="000000"/>
                   </a:solidFill>
@@ -15868,7 +16225,7 @@
             </a:ln>
             <a:extLst>
               <a:ext uri="{91240B29-F687-4f45-9708-019B960494DF}">
-                <a14:hiddenLine xmlns="" xmlns:a16="http://schemas.microsoft.com/office/drawing/2014/main" xmlns:a14="http://schemas.microsoft.com/office/drawing/2010/main" w="9525">
+                <a14:hiddenLine xmlns:a14="http://schemas.microsoft.com/office/drawing/2010/main" xmlns:a16="http://schemas.microsoft.com/office/drawing/2014/main" xmlns="" w="9525">
                   <a:solidFill>
                     <a:srgbClr val="000000"/>
                   </a:solidFill>
@@ -15973,7 +16330,7 @@
             </a:ln>
             <a:extLst>
               <a:ext uri="{91240B29-F687-4f45-9708-019B960494DF}">
-                <a14:hiddenLine xmlns="" xmlns:a16="http://schemas.microsoft.com/office/drawing/2014/main" xmlns:a14="http://schemas.microsoft.com/office/drawing/2010/main" w="9525">
+                <a14:hiddenLine xmlns:a14="http://schemas.microsoft.com/office/drawing/2010/main" xmlns:a16="http://schemas.microsoft.com/office/drawing/2014/main" xmlns="" w="9525">
                   <a:solidFill>
                     <a:srgbClr val="000000"/>
                   </a:solidFill>
@@ -16050,7 +16407,7 @@
             </a:ln>
             <a:extLst>
               <a:ext uri="{91240B29-F687-4f45-9708-019B960494DF}">
-                <a14:hiddenLine xmlns="" xmlns:a16="http://schemas.microsoft.com/office/drawing/2014/main" xmlns:a14="http://schemas.microsoft.com/office/drawing/2010/main" w="9525">
+                <a14:hiddenLine xmlns:a14="http://schemas.microsoft.com/office/drawing/2010/main" xmlns:a16="http://schemas.microsoft.com/office/drawing/2014/main" xmlns="" w="9525">
                   <a:solidFill>
                     <a:srgbClr val="000000"/>
                   </a:solidFill>
@@ -16175,7 +16532,7 @@
             </a:ln>
             <a:extLst>
               <a:ext uri="{91240B29-F687-4f45-9708-019B960494DF}">
-                <a14:hiddenLine xmlns="" xmlns:a16="http://schemas.microsoft.com/office/drawing/2014/main" xmlns:a14="http://schemas.microsoft.com/office/drawing/2010/main" w="9525">
+                <a14:hiddenLine xmlns:a14="http://schemas.microsoft.com/office/drawing/2010/main" xmlns:a16="http://schemas.microsoft.com/office/drawing/2014/main" xmlns="" w="9525">
                   <a:solidFill>
                     <a:srgbClr val="000000"/>
                   </a:solidFill>
@@ -16252,7 +16609,7 @@
             </a:ln>
             <a:extLst>
               <a:ext uri="{91240B29-F687-4f45-9708-019B960494DF}">
-                <a14:hiddenLine xmlns="" xmlns:a16="http://schemas.microsoft.com/office/drawing/2014/main" xmlns:a14="http://schemas.microsoft.com/office/drawing/2010/main" w="9525">
+                <a14:hiddenLine xmlns:a14="http://schemas.microsoft.com/office/drawing/2010/main" xmlns:a16="http://schemas.microsoft.com/office/drawing/2014/main" xmlns="" w="9525">
                   <a:solidFill>
                     <a:srgbClr val="000000"/>
                   </a:solidFill>
@@ -16357,7 +16714,7 @@
             </a:ln>
             <a:extLst>
               <a:ext uri="{91240B29-F687-4f45-9708-019B960494DF}">
-                <a14:hiddenLine xmlns="" xmlns:a16="http://schemas.microsoft.com/office/drawing/2014/main" xmlns:a14="http://schemas.microsoft.com/office/drawing/2010/main" w="9525">
+                <a14:hiddenLine xmlns:a14="http://schemas.microsoft.com/office/drawing/2010/main" xmlns:a16="http://schemas.microsoft.com/office/drawing/2014/main" xmlns="" w="9525">
                   <a:solidFill>
                     <a:srgbClr val="000000"/>
                   </a:solidFill>
@@ -16462,7 +16819,7 @@
             </a:ln>
             <a:extLst>
               <a:ext uri="{91240B29-F687-4f45-9708-019B960494DF}">
-                <a14:hiddenLine xmlns="" xmlns:a16="http://schemas.microsoft.com/office/drawing/2014/main" xmlns:a14="http://schemas.microsoft.com/office/drawing/2010/main" w="9525">
+                <a14:hiddenLine xmlns:a14="http://schemas.microsoft.com/office/drawing/2010/main" xmlns:a16="http://schemas.microsoft.com/office/drawing/2014/main" xmlns="" w="9525">
                   <a:solidFill>
                     <a:srgbClr val="000000"/>
                   </a:solidFill>
@@ -16539,7 +16896,7 @@
             </a:ln>
             <a:extLst>
               <a:ext uri="{91240B29-F687-4f45-9708-019B960494DF}">
-                <a14:hiddenLine xmlns="" xmlns:a16="http://schemas.microsoft.com/office/drawing/2014/main" xmlns:a14="http://schemas.microsoft.com/office/drawing/2010/main" w="9525">
+                <a14:hiddenLine xmlns:a14="http://schemas.microsoft.com/office/drawing/2010/main" xmlns:a16="http://schemas.microsoft.com/office/drawing/2014/main" xmlns="" w="9525">
                   <a:solidFill>
                     <a:srgbClr val="000000"/>
                   </a:solidFill>
@@ -16644,7 +17001,7 @@
             </a:ln>
             <a:extLst>
               <a:ext uri="{91240B29-F687-4f45-9708-019B960494DF}">
-                <a14:hiddenLine xmlns="" xmlns:a16="http://schemas.microsoft.com/office/drawing/2014/main" xmlns:a14="http://schemas.microsoft.com/office/drawing/2010/main" w="9525">
+                <a14:hiddenLine xmlns:a14="http://schemas.microsoft.com/office/drawing/2010/main" xmlns:a16="http://schemas.microsoft.com/office/drawing/2014/main" xmlns="" w="9525">
                   <a:solidFill>
                     <a:srgbClr val="000000"/>
                   </a:solidFill>
@@ -16749,7 +17106,7 @@
             </a:ln>
             <a:extLst>
               <a:ext uri="{91240B29-F687-4f45-9708-019B960494DF}">
-                <a14:hiddenLine xmlns="" xmlns:a16="http://schemas.microsoft.com/office/drawing/2014/main" xmlns:a14="http://schemas.microsoft.com/office/drawing/2010/main" w="9525">
+                <a14:hiddenLine xmlns:a14="http://schemas.microsoft.com/office/drawing/2010/main" xmlns:a16="http://schemas.microsoft.com/office/drawing/2014/main" xmlns="" w="9525">
                   <a:solidFill>
                     <a:srgbClr val="000000"/>
                   </a:solidFill>
@@ -16820,7 +17177,7 @@
             </a:ln>
             <a:extLst>
               <a:ext uri="{91240B29-F687-4f45-9708-019B960494DF}">
-                <a14:hiddenLine xmlns="" xmlns:a16="http://schemas.microsoft.com/office/drawing/2014/main" xmlns:a14="http://schemas.microsoft.com/office/drawing/2010/main" w="9525">
+                <a14:hiddenLine xmlns:a14="http://schemas.microsoft.com/office/drawing/2010/main" xmlns:a16="http://schemas.microsoft.com/office/drawing/2014/main" xmlns="" w="9525">
                   <a:solidFill>
                     <a:srgbClr val="000000"/>
                   </a:solidFill>
@@ -16925,7 +17282,7 @@
             </a:ln>
             <a:extLst>
               <a:ext uri="{91240B29-F687-4f45-9708-019B960494DF}">
-                <a14:hiddenLine xmlns="" xmlns:a16="http://schemas.microsoft.com/office/drawing/2014/main" xmlns:a14="http://schemas.microsoft.com/office/drawing/2010/main" w="9525">
+                <a14:hiddenLine xmlns:a14="http://schemas.microsoft.com/office/drawing/2010/main" xmlns:a16="http://schemas.microsoft.com/office/drawing/2014/main" xmlns="" w="9525">
                   <a:solidFill>
                     <a:srgbClr val="000000"/>
                   </a:solidFill>
@@ -16996,7 +17353,7 @@
             </a:ln>
             <a:extLst>
               <a:ext uri="{91240B29-F687-4f45-9708-019B960494DF}">
-                <a14:hiddenLine xmlns="" xmlns:a16="http://schemas.microsoft.com/office/drawing/2014/main" xmlns:a14="http://schemas.microsoft.com/office/drawing/2010/main" w="9525">
+                <a14:hiddenLine xmlns:a14="http://schemas.microsoft.com/office/drawing/2010/main" xmlns:a16="http://schemas.microsoft.com/office/drawing/2014/main" xmlns="" w="9525">
                   <a:solidFill>
                     <a:srgbClr val="000000"/>
                   </a:solidFill>
@@ -17101,7 +17458,7 @@
             </a:ln>
             <a:extLst>
               <a:ext uri="{91240B29-F687-4f45-9708-019B960494DF}">
-                <a14:hiddenLine xmlns="" xmlns:a16="http://schemas.microsoft.com/office/drawing/2014/main" xmlns:a14="http://schemas.microsoft.com/office/drawing/2010/main" w="9525">
+                <a14:hiddenLine xmlns:a14="http://schemas.microsoft.com/office/drawing/2010/main" xmlns:a16="http://schemas.microsoft.com/office/drawing/2014/main" xmlns="" w="9525">
                   <a:solidFill>
                     <a:srgbClr val="000000"/>
                   </a:solidFill>
@@ -17184,7 +17541,7 @@
             </a:ln>
             <a:extLst>
               <a:ext uri="{91240B29-F687-4f45-9708-019B960494DF}">
-                <a14:hiddenLine xmlns="" xmlns:a16="http://schemas.microsoft.com/office/drawing/2014/main" xmlns:a14="http://schemas.microsoft.com/office/drawing/2010/main" w="9525">
+                <a14:hiddenLine xmlns:a14="http://schemas.microsoft.com/office/drawing/2010/main" xmlns:a16="http://schemas.microsoft.com/office/drawing/2014/main" xmlns="" w="9525">
                   <a:solidFill>
                     <a:srgbClr val="000000"/>
                   </a:solidFill>
@@ -17289,7 +17646,7 @@
             </a:ln>
             <a:extLst>
               <a:ext uri="{91240B29-F687-4f45-9708-019B960494DF}">
-                <a14:hiddenLine xmlns="" xmlns:a16="http://schemas.microsoft.com/office/drawing/2014/main" xmlns:a14="http://schemas.microsoft.com/office/drawing/2010/main" w="9525">
+                <a14:hiddenLine xmlns:a14="http://schemas.microsoft.com/office/drawing/2010/main" xmlns:a16="http://schemas.microsoft.com/office/drawing/2014/main" xmlns="" w="9525">
                   <a:solidFill>
                     <a:srgbClr val="000000"/>
                   </a:solidFill>
@@ -17372,7 +17729,7 @@
             </a:ln>
             <a:extLst>
               <a:ext uri="{91240B29-F687-4f45-9708-019B960494DF}">
-                <a14:hiddenLine xmlns="" xmlns:a16="http://schemas.microsoft.com/office/drawing/2014/main" xmlns:a14="http://schemas.microsoft.com/office/drawing/2010/main" w="9525">
+                <a14:hiddenLine xmlns:a14="http://schemas.microsoft.com/office/drawing/2010/main" xmlns:a16="http://schemas.microsoft.com/office/drawing/2014/main" xmlns="" w="9525">
                   <a:solidFill>
                     <a:srgbClr val="000000"/>
                   </a:solidFill>
@@ -17477,7 +17834,7 @@
             </a:ln>
             <a:extLst>
               <a:ext uri="{91240B29-F687-4f45-9708-019B960494DF}">
-                <a14:hiddenLine xmlns="" xmlns:a16="http://schemas.microsoft.com/office/drawing/2014/main" xmlns:a14="http://schemas.microsoft.com/office/drawing/2010/main" w="9525">
+                <a14:hiddenLine xmlns:a14="http://schemas.microsoft.com/office/drawing/2010/main" xmlns:a16="http://schemas.microsoft.com/office/drawing/2014/main" xmlns="" w="9525">
                   <a:solidFill>
                     <a:srgbClr val="000000"/>
                   </a:solidFill>
@@ -17526,7 +17883,7 @@
             </a:ln>
             <a:extLst>
               <a:ext uri="{91240B29-F687-4f45-9708-019B960494DF}">
-                <a14:hiddenLine xmlns="" xmlns:a16="http://schemas.microsoft.com/office/drawing/2014/main" xmlns:a14="http://schemas.microsoft.com/office/drawing/2010/main" w="9525">
+                <a14:hiddenLine xmlns:a14="http://schemas.microsoft.com/office/drawing/2010/main" xmlns:a16="http://schemas.microsoft.com/office/drawing/2014/main" xmlns="" w="9525">
                   <a:solidFill>
                     <a:srgbClr val="000000"/>
                   </a:solidFill>
@@ -17631,7 +17988,7 @@
             </a:ln>
             <a:extLst>
               <a:ext uri="{91240B29-F687-4f45-9708-019B960494DF}">
-                <a14:hiddenLine xmlns="" xmlns:a16="http://schemas.microsoft.com/office/drawing/2014/main" xmlns:a14="http://schemas.microsoft.com/office/drawing/2010/main" w="9525">
+                <a14:hiddenLine xmlns:a14="http://schemas.microsoft.com/office/drawing/2010/main" xmlns:a16="http://schemas.microsoft.com/office/drawing/2014/main" xmlns="" w="9525">
                   <a:solidFill>
                     <a:srgbClr val="000000"/>
                   </a:solidFill>
@@ -17708,7 +18065,7 @@
             </a:ln>
             <a:extLst>
               <a:ext uri="{91240B29-F687-4f45-9708-019B960494DF}">
-                <a14:hiddenLine xmlns="" xmlns:a16="http://schemas.microsoft.com/office/drawing/2014/main" xmlns:a14="http://schemas.microsoft.com/office/drawing/2010/main" w="9525">
+                <a14:hiddenLine xmlns:a14="http://schemas.microsoft.com/office/drawing/2010/main" xmlns:a16="http://schemas.microsoft.com/office/drawing/2014/main" xmlns="" w="9525">
                   <a:solidFill>
                     <a:srgbClr val="000000"/>
                   </a:solidFill>
@@ -17785,7 +18142,7 @@
             </a:ln>
             <a:extLst>
               <a:ext uri="{91240B29-F687-4f45-9708-019B960494DF}">
-                <a14:hiddenLine xmlns="" xmlns:a16="http://schemas.microsoft.com/office/drawing/2014/main" xmlns:a14="http://schemas.microsoft.com/office/drawing/2010/main" w="9525">
+                <a14:hiddenLine xmlns:a14="http://schemas.microsoft.com/office/drawing/2010/main" xmlns:a16="http://schemas.microsoft.com/office/drawing/2014/main" xmlns="" w="9525">
                   <a:solidFill>
                     <a:srgbClr val="000000"/>
                   </a:solidFill>
@@ -17890,7 +18247,7 @@
             </a:ln>
             <a:extLst>
               <a:ext uri="{91240B29-F687-4f45-9708-019B960494DF}">
-                <a14:hiddenLine xmlns="" xmlns:a16="http://schemas.microsoft.com/office/drawing/2014/main" xmlns:a14="http://schemas.microsoft.com/office/drawing/2010/main" w="9525">
+                <a14:hiddenLine xmlns:a14="http://schemas.microsoft.com/office/drawing/2010/main" xmlns:a16="http://schemas.microsoft.com/office/drawing/2014/main" xmlns="" w="9525">
                   <a:solidFill>
                     <a:srgbClr val="000000"/>
                   </a:solidFill>
@@ -17973,7 +18330,7 @@
             </a:ln>
             <a:extLst>
               <a:ext uri="{91240B29-F687-4f45-9708-019B960494DF}">
-                <a14:hiddenLine xmlns="" xmlns:a16="http://schemas.microsoft.com/office/drawing/2014/main" xmlns:a14="http://schemas.microsoft.com/office/drawing/2010/main" w="9525">
+                <a14:hiddenLine xmlns:a14="http://schemas.microsoft.com/office/drawing/2010/main" xmlns:a16="http://schemas.microsoft.com/office/drawing/2014/main" xmlns="" w="9525">
                   <a:solidFill>
                     <a:srgbClr val="000000"/>
                   </a:solidFill>
@@ -18050,7 +18407,7 @@
             </a:ln>
             <a:extLst>
               <a:ext uri="{91240B29-F687-4f45-9708-019B960494DF}">
-                <a14:hiddenLine xmlns="" xmlns:a16="http://schemas.microsoft.com/office/drawing/2014/main" xmlns:a14="http://schemas.microsoft.com/office/drawing/2010/main" w="9525">
+                <a14:hiddenLine xmlns:a14="http://schemas.microsoft.com/office/drawing/2010/main" xmlns:a16="http://schemas.microsoft.com/office/drawing/2014/main" xmlns="" w="9525">
                   <a:solidFill>
                     <a:srgbClr val="000000"/>
                   </a:solidFill>
@@ -18155,7 +18512,7 @@
             </a:ln>
             <a:extLst>
               <a:ext uri="{91240B29-F687-4f45-9708-019B960494DF}">
-                <a14:hiddenLine xmlns="" xmlns:a16="http://schemas.microsoft.com/office/drawing/2014/main" xmlns:a14="http://schemas.microsoft.com/office/drawing/2010/main" w="9525">
+                <a14:hiddenLine xmlns:a14="http://schemas.microsoft.com/office/drawing/2010/main" xmlns:a16="http://schemas.microsoft.com/office/drawing/2014/main" xmlns="" w="9525">
                   <a:solidFill>
                     <a:srgbClr val="000000"/>
                   </a:solidFill>
@@ -18232,7 +18589,7 @@
             </a:ln>
             <a:extLst>
               <a:ext uri="{91240B29-F687-4f45-9708-019B960494DF}">
-                <a14:hiddenLine xmlns="" xmlns:a16="http://schemas.microsoft.com/office/drawing/2014/main" xmlns:a14="http://schemas.microsoft.com/office/drawing/2010/main" w="9525">
+                <a14:hiddenLine xmlns:a14="http://schemas.microsoft.com/office/drawing/2010/main" xmlns:a16="http://schemas.microsoft.com/office/drawing/2014/main" xmlns="" w="9525">
                   <a:solidFill>
                     <a:srgbClr val="000000"/>
                   </a:solidFill>
@@ -18337,7 +18694,7 @@
             </a:ln>
             <a:extLst>
               <a:ext uri="{91240B29-F687-4f45-9708-019B960494DF}">
-                <a14:hiddenLine xmlns="" xmlns:a16="http://schemas.microsoft.com/office/drawing/2014/main" xmlns:a14="http://schemas.microsoft.com/office/drawing/2010/main" w="9525">
+                <a14:hiddenLine xmlns:a14="http://schemas.microsoft.com/office/drawing/2010/main" xmlns:a16="http://schemas.microsoft.com/office/drawing/2014/main" xmlns="" w="9525">
                   <a:solidFill>
                     <a:srgbClr val="000000"/>
                   </a:solidFill>
@@ -18414,7 +18771,7 @@
             </a:ln>
             <a:extLst>
               <a:ext uri="{91240B29-F687-4f45-9708-019B960494DF}">
-                <a14:hiddenLine xmlns="" xmlns:a16="http://schemas.microsoft.com/office/drawing/2014/main" xmlns:a14="http://schemas.microsoft.com/office/drawing/2010/main" w="9525">
+                <a14:hiddenLine xmlns:a14="http://schemas.microsoft.com/office/drawing/2010/main" xmlns:a16="http://schemas.microsoft.com/office/drawing/2014/main" xmlns="" w="9525">
                   <a:solidFill>
                     <a:srgbClr val="000000"/>
                   </a:solidFill>
@@ -18519,7 +18876,7 @@
             </a:ln>
             <a:extLst>
               <a:ext uri="{91240B29-F687-4f45-9708-019B960494DF}">
-                <a14:hiddenLine xmlns="" xmlns:a16="http://schemas.microsoft.com/office/drawing/2014/main" xmlns:a14="http://schemas.microsoft.com/office/drawing/2010/main" w="9525">
+                <a14:hiddenLine xmlns:a14="http://schemas.microsoft.com/office/drawing/2010/main" xmlns:a16="http://schemas.microsoft.com/office/drawing/2014/main" xmlns="" w="9525">
                   <a:solidFill>
                     <a:srgbClr val="000000"/>
                   </a:solidFill>
@@ -18568,7 +18925,7 @@
             </a:ln>
             <a:extLst>
               <a:ext uri="{91240B29-F687-4f45-9708-019B960494DF}">
-                <a14:hiddenLine xmlns="" xmlns:a16="http://schemas.microsoft.com/office/drawing/2014/main" xmlns:a14="http://schemas.microsoft.com/office/drawing/2010/main" w="9525">
+                <a14:hiddenLine xmlns:a14="http://schemas.microsoft.com/office/drawing/2010/main" xmlns:a16="http://schemas.microsoft.com/office/drawing/2014/main" xmlns="" w="9525">
                   <a:solidFill>
                     <a:srgbClr val="000000"/>
                   </a:solidFill>
@@ -18648,7 +19005,7 @@
             </a:ln>
             <a:extLst>
               <a:ext uri="{91240B29-F687-4f45-9708-019B960494DF}">
-                <a14:hiddenLine xmlns="" xmlns:a16="http://schemas.microsoft.com/office/drawing/2014/main" xmlns:a14="http://schemas.microsoft.com/office/drawing/2010/main" w="9525">
+                <a14:hiddenLine xmlns:a14="http://schemas.microsoft.com/office/drawing/2010/main" xmlns:a16="http://schemas.microsoft.com/office/drawing/2014/main" xmlns="" w="9525">
                   <a:solidFill>
                     <a:srgbClr val="000000"/>
                   </a:solidFill>
@@ -18753,7 +19110,7 @@
             </a:ln>
             <a:extLst>
               <a:ext uri="{91240B29-F687-4f45-9708-019B960494DF}">
-                <a14:hiddenLine xmlns="" xmlns:a16="http://schemas.microsoft.com/office/drawing/2014/main" xmlns:a14="http://schemas.microsoft.com/office/drawing/2010/main" w="9525">
+                <a14:hiddenLine xmlns:a14="http://schemas.microsoft.com/office/drawing/2010/main" xmlns:a16="http://schemas.microsoft.com/office/drawing/2014/main" xmlns="" w="9525">
                   <a:solidFill>
                     <a:srgbClr val="000000"/>
                   </a:solidFill>
@@ -18830,7 +19187,7 @@
             </a:ln>
             <a:extLst>
               <a:ext uri="{91240B29-F687-4f45-9708-019B960494DF}">
-                <a14:hiddenLine xmlns="" xmlns:a16="http://schemas.microsoft.com/office/drawing/2014/main" xmlns:a14="http://schemas.microsoft.com/office/drawing/2010/main" w="9525">
+                <a14:hiddenLine xmlns:a14="http://schemas.microsoft.com/office/drawing/2010/main" xmlns:a16="http://schemas.microsoft.com/office/drawing/2014/main" xmlns="" w="9525">
                   <a:solidFill>
                     <a:srgbClr val="000000"/>
                   </a:solidFill>
@@ -18935,7 +19292,7 @@
             </a:ln>
             <a:extLst>
               <a:ext uri="{91240B29-F687-4f45-9708-019B960494DF}">
-                <a14:hiddenLine xmlns="" xmlns:a16="http://schemas.microsoft.com/office/drawing/2014/main" xmlns:a14="http://schemas.microsoft.com/office/drawing/2010/main" w="9525">
+                <a14:hiddenLine xmlns:a14="http://schemas.microsoft.com/office/drawing/2010/main" xmlns:a16="http://schemas.microsoft.com/office/drawing/2014/main" xmlns="" w="9525">
                   <a:solidFill>
                     <a:srgbClr val="000000"/>
                   </a:solidFill>
@@ -19040,7 +19397,7 @@
             </a:ln>
             <a:extLst>
               <a:ext uri="{91240B29-F687-4f45-9708-019B960494DF}">
-                <a14:hiddenLine xmlns="" xmlns:a16="http://schemas.microsoft.com/office/drawing/2014/main" xmlns:a14="http://schemas.microsoft.com/office/drawing/2010/main" w="9525">
+                <a14:hiddenLine xmlns:a14="http://schemas.microsoft.com/office/drawing/2010/main" xmlns:a16="http://schemas.microsoft.com/office/drawing/2014/main" xmlns="" w="9525">
                   <a:solidFill>
                     <a:srgbClr val="000000"/>
                   </a:solidFill>
@@ -19120,7 +19477,7 @@
             </a:ln>
             <a:extLst>
               <a:ext uri="{91240B29-F687-4f45-9708-019B960494DF}">
-                <a14:hiddenLine xmlns="" xmlns:a16="http://schemas.microsoft.com/office/drawing/2014/main" xmlns:a14="http://schemas.microsoft.com/office/drawing/2010/main" w="9525">
+                <a14:hiddenLine xmlns:a14="http://schemas.microsoft.com/office/drawing/2010/main" xmlns:a16="http://schemas.microsoft.com/office/drawing/2014/main" xmlns="" w="9525">
                   <a:solidFill>
                     <a:srgbClr val="000000"/>
                   </a:solidFill>
@@ -19197,7 +19554,7 @@
             </a:ln>
             <a:extLst>
               <a:ext uri="{91240B29-F687-4f45-9708-019B960494DF}">
-                <a14:hiddenLine xmlns="" xmlns:a16="http://schemas.microsoft.com/office/drawing/2014/main" xmlns:a14="http://schemas.microsoft.com/office/drawing/2010/main" w="9525">
+                <a14:hiddenLine xmlns:a14="http://schemas.microsoft.com/office/drawing/2010/main" xmlns:a16="http://schemas.microsoft.com/office/drawing/2014/main" xmlns="" w="9525">
                   <a:solidFill>
                     <a:srgbClr val="000000"/>
                   </a:solidFill>
@@ -19302,7 +19659,7 @@
             </a:ln>
             <a:extLst>
               <a:ext uri="{91240B29-F687-4f45-9708-019B960494DF}">
-                <a14:hiddenLine xmlns="" xmlns:a16="http://schemas.microsoft.com/office/drawing/2014/main" xmlns:a14="http://schemas.microsoft.com/office/drawing/2010/main" w="9525">
+                <a14:hiddenLine xmlns:a14="http://schemas.microsoft.com/office/drawing/2010/main" xmlns:a16="http://schemas.microsoft.com/office/drawing/2014/main" xmlns="" w="9525">
                   <a:solidFill>
                     <a:srgbClr val="000000"/>
                   </a:solidFill>
@@ -19407,7 +19764,7 @@
             </a:ln>
             <a:extLst>
               <a:ext uri="{91240B29-F687-4f45-9708-019B960494DF}">
-                <a14:hiddenLine xmlns="" xmlns:a16="http://schemas.microsoft.com/office/drawing/2014/main" xmlns:a14="http://schemas.microsoft.com/office/drawing/2010/main" w="9525">
+                <a14:hiddenLine xmlns:a14="http://schemas.microsoft.com/office/drawing/2010/main" xmlns:a16="http://schemas.microsoft.com/office/drawing/2014/main" xmlns="" w="9525">
                   <a:solidFill>
                     <a:srgbClr val="000000"/>
                   </a:solidFill>
@@ -19484,7 +19841,7 @@
             </a:ln>
             <a:extLst>
               <a:ext uri="{91240B29-F687-4f45-9708-019B960494DF}">
-                <a14:hiddenLine xmlns="" xmlns:a16="http://schemas.microsoft.com/office/drawing/2014/main" xmlns:a14="http://schemas.microsoft.com/office/drawing/2010/main" w="9525">
+                <a14:hiddenLine xmlns:a14="http://schemas.microsoft.com/office/drawing/2010/main" xmlns:a16="http://schemas.microsoft.com/office/drawing/2014/main" xmlns="" w="9525">
                   <a:solidFill>
                     <a:srgbClr val="000000"/>
                   </a:solidFill>
@@ -19619,7 +19976,7 @@
             </a:ln>
             <a:extLst>
               <a:ext uri="{91240B29-F687-4f45-9708-019B960494DF}">
-                <a14:hiddenLine xmlns="" xmlns:a16="http://schemas.microsoft.com/office/drawing/2014/main" xmlns:a14="http://schemas.microsoft.com/office/drawing/2010/main" w="9525">
+                <a14:hiddenLine xmlns:a14="http://schemas.microsoft.com/office/drawing/2010/main" xmlns:a16="http://schemas.microsoft.com/office/drawing/2014/main" xmlns="" w="9525">
                   <a:solidFill>
                     <a:srgbClr val="000000"/>
                   </a:solidFill>
@@ -19702,7 +20059,7 @@
             </a:ln>
             <a:extLst>
               <a:ext uri="{91240B29-F687-4f45-9708-019B960494DF}">
-                <a14:hiddenLine xmlns="" xmlns:a16="http://schemas.microsoft.com/office/drawing/2014/main" xmlns:a14="http://schemas.microsoft.com/office/drawing/2010/main" w="9525">
+                <a14:hiddenLine xmlns:a14="http://schemas.microsoft.com/office/drawing/2010/main" xmlns:a16="http://schemas.microsoft.com/office/drawing/2014/main" xmlns="" w="9525">
                   <a:solidFill>
                     <a:srgbClr val="000000"/>
                   </a:solidFill>
@@ -19807,7 +20164,7 @@
             </a:ln>
             <a:extLst>
               <a:ext uri="{91240B29-F687-4f45-9708-019B960494DF}">
-                <a14:hiddenLine xmlns="" xmlns:a16="http://schemas.microsoft.com/office/drawing/2014/main" xmlns:a14="http://schemas.microsoft.com/office/drawing/2010/main" w="9525">
+                <a14:hiddenLine xmlns:a14="http://schemas.microsoft.com/office/drawing/2010/main" xmlns:a16="http://schemas.microsoft.com/office/drawing/2014/main" xmlns="" w="9525">
                   <a:solidFill>
                     <a:srgbClr val="000000"/>
                   </a:solidFill>
@@ -20001,7 +20358,7 @@
             </a:ln>
             <a:extLst>
               <a:ext uri="{91240B29-F687-4f45-9708-019B960494DF}">
-                <a14:hiddenLine xmlns="" xmlns:a16="http://schemas.microsoft.com/office/drawing/2014/main" xmlns:p14="http://schemas.microsoft.com/office/powerpoint/2010/main" xmlns:a14="http://schemas.microsoft.com/office/drawing/2010/main" w="9525">
+                <a14:hiddenLine xmlns:a14="http://schemas.microsoft.com/office/drawing/2010/main" xmlns:p14="http://schemas.microsoft.com/office/powerpoint/2010/main" xmlns:a16="http://schemas.microsoft.com/office/drawing/2014/main" xmlns="" w="9525">
                   <a:solidFill>
                     <a:srgbClr val="000000"/>
                   </a:solidFill>
@@ -20106,7 +20463,7 @@
             </a:ln>
             <a:extLst>
               <a:ext uri="{91240B29-F687-4f45-9708-019B960494DF}">
-                <a14:hiddenLine xmlns="" xmlns:a16="http://schemas.microsoft.com/office/drawing/2014/main" xmlns:p14="http://schemas.microsoft.com/office/powerpoint/2010/main" xmlns:a14="http://schemas.microsoft.com/office/drawing/2010/main" w="9525">
+                <a14:hiddenLine xmlns:a14="http://schemas.microsoft.com/office/drawing/2010/main" xmlns:p14="http://schemas.microsoft.com/office/powerpoint/2010/main" xmlns:a16="http://schemas.microsoft.com/office/drawing/2014/main" xmlns="" w="9525">
                   <a:solidFill>
                     <a:srgbClr val="000000"/>
                   </a:solidFill>
@@ -20211,7 +20568,7 @@
             </a:ln>
             <a:extLst>
               <a:ext uri="{91240B29-F687-4f45-9708-019B960494DF}">
-                <a14:hiddenLine xmlns="" xmlns:a16="http://schemas.microsoft.com/office/drawing/2014/main" xmlns:p14="http://schemas.microsoft.com/office/powerpoint/2010/main" xmlns:a14="http://schemas.microsoft.com/office/drawing/2010/main" w="9525">
+                <a14:hiddenLine xmlns:a14="http://schemas.microsoft.com/office/drawing/2010/main" xmlns:p14="http://schemas.microsoft.com/office/powerpoint/2010/main" xmlns:a16="http://schemas.microsoft.com/office/drawing/2014/main" xmlns="" w="9525">
                   <a:solidFill>
                     <a:srgbClr val="000000"/>
                   </a:solidFill>
@@ -20260,7 +20617,7 @@
             </a:ln>
             <a:extLst>
               <a:ext uri="{91240B29-F687-4f45-9708-019B960494DF}">
-                <a14:hiddenLine xmlns="" xmlns:a16="http://schemas.microsoft.com/office/drawing/2014/main" xmlns:p14="http://schemas.microsoft.com/office/powerpoint/2010/main" xmlns:a14="http://schemas.microsoft.com/office/drawing/2010/main" w="9525">
+                <a14:hiddenLine xmlns:a14="http://schemas.microsoft.com/office/drawing/2010/main" xmlns:p14="http://schemas.microsoft.com/office/powerpoint/2010/main" xmlns:a16="http://schemas.microsoft.com/office/drawing/2014/main" xmlns="" w="9525">
                   <a:solidFill>
                     <a:srgbClr val="000000"/>
                   </a:solidFill>
@@ -20365,7 +20722,7 @@
             </a:ln>
             <a:extLst>
               <a:ext uri="{91240B29-F687-4f45-9708-019B960494DF}">
-                <a14:hiddenLine xmlns="" xmlns:a16="http://schemas.microsoft.com/office/drawing/2014/main" xmlns:p14="http://schemas.microsoft.com/office/powerpoint/2010/main" xmlns:a14="http://schemas.microsoft.com/office/drawing/2010/main" w="9525">
+                <a14:hiddenLine xmlns:a14="http://schemas.microsoft.com/office/drawing/2010/main" xmlns:p14="http://schemas.microsoft.com/office/powerpoint/2010/main" xmlns:a16="http://schemas.microsoft.com/office/drawing/2014/main" xmlns="" w="9525">
                   <a:solidFill>
                     <a:srgbClr val="000000"/>
                   </a:solidFill>
@@ -20442,7 +20799,7 @@
             </a:ln>
             <a:extLst>
               <a:ext uri="{91240B29-F687-4f45-9708-019B960494DF}">
-                <a14:hiddenLine xmlns="" xmlns:a16="http://schemas.microsoft.com/office/drawing/2014/main" xmlns:p14="http://schemas.microsoft.com/office/powerpoint/2010/main" xmlns:a14="http://schemas.microsoft.com/office/drawing/2010/main" w="9525">
+                <a14:hiddenLine xmlns:a14="http://schemas.microsoft.com/office/drawing/2010/main" xmlns:p14="http://schemas.microsoft.com/office/powerpoint/2010/main" xmlns:a16="http://schemas.microsoft.com/office/drawing/2014/main" xmlns="" w="9525">
                   <a:solidFill>
                     <a:srgbClr val="000000"/>
                   </a:solidFill>
@@ -20519,7 +20876,7 @@
             </a:ln>
             <a:extLst>
               <a:ext uri="{91240B29-F687-4f45-9708-019B960494DF}">
-                <a14:hiddenLine xmlns="" xmlns:a16="http://schemas.microsoft.com/office/drawing/2014/main" xmlns:p14="http://schemas.microsoft.com/office/powerpoint/2010/main" xmlns:a14="http://schemas.microsoft.com/office/drawing/2010/main" w="9525">
+                <a14:hiddenLine xmlns:a14="http://schemas.microsoft.com/office/drawing/2010/main" xmlns:p14="http://schemas.microsoft.com/office/powerpoint/2010/main" xmlns:a16="http://schemas.microsoft.com/office/drawing/2014/main" xmlns="" w="9525">
                   <a:solidFill>
                     <a:srgbClr val="000000"/>
                   </a:solidFill>
@@ -20624,7 +20981,7 @@
             </a:ln>
             <a:extLst>
               <a:ext uri="{91240B29-F687-4f45-9708-019B960494DF}">
-                <a14:hiddenLine xmlns="" xmlns:a16="http://schemas.microsoft.com/office/drawing/2014/main" xmlns:p14="http://schemas.microsoft.com/office/powerpoint/2010/main" xmlns:a14="http://schemas.microsoft.com/office/drawing/2010/main" w="9525">
+                <a14:hiddenLine xmlns:a14="http://schemas.microsoft.com/office/drawing/2010/main" xmlns:p14="http://schemas.microsoft.com/office/powerpoint/2010/main" xmlns:a16="http://schemas.microsoft.com/office/drawing/2014/main" xmlns="" w="9525">
                   <a:solidFill>
                     <a:srgbClr val="000000"/>
                   </a:solidFill>
@@ -20701,7 +21058,7 @@
             </a:ln>
             <a:extLst>
               <a:ext uri="{91240B29-F687-4f45-9708-019B960494DF}">
-                <a14:hiddenLine xmlns="" xmlns:a16="http://schemas.microsoft.com/office/drawing/2014/main" xmlns:p14="http://schemas.microsoft.com/office/powerpoint/2010/main" xmlns:a14="http://schemas.microsoft.com/office/drawing/2010/main" w="9525">
+                <a14:hiddenLine xmlns:a14="http://schemas.microsoft.com/office/drawing/2010/main" xmlns:p14="http://schemas.microsoft.com/office/powerpoint/2010/main" xmlns:a16="http://schemas.microsoft.com/office/drawing/2014/main" xmlns="" w="9525">
                   <a:solidFill>
                     <a:srgbClr val="000000"/>
                   </a:solidFill>
@@ -20778,7 +21135,7 @@
             </a:ln>
             <a:extLst>
               <a:ext uri="{91240B29-F687-4f45-9708-019B960494DF}">
-                <a14:hiddenLine xmlns="" xmlns:a16="http://schemas.microsoft.com/office/drawing/2014/main" xmlns:p14="http://schemas.microsoft.com/office/powerpoint/2010/main" xmlns:a14="http://schemas.microsoft.com/office/drawing/2010/main" w="9525">
+                <a14:hiddenLine xmlns:a14="http://schemas.microsoft.com/office/drawing/2010/main" xmlns:p14="http://schemas.microsoft.com/office/powerpoint/2010/main" xmlns:a16="http://schemas.microsoft.com/office/drawing/2014/main" xmlns="" w="9525">
                   <a:solidFill>
                     <a:srgbClr val="000000"/>
                   </a:solidFill>
@@ -20883,7 +21240,7 @@
             </a:ln>
             <a:extLst>
               <a:ext uri="{91240B29-F687-4f45-9708-019B960494DF}">
-                <a14:hiddenLine xmlns="" xmlns:a16="http://schemas.microsoft.com/office/drawing/2014/main" xmlns:p14="http://schemas.microsoft.com/office/powerpoint/2010/main" xmlns:a14="http://schemas.microsoft.com/office/drawing/2010/main" w="9525">
+                <a14:hiddenLine xmlns:a14="http://schemas.microsoft.com/office/drawing/2010/main" xmlns:p14="http://schemas.microsoft.com/office/powerpoint/2010/main" xmlns:a16="http://schemas.microsoft.com/office/drawing/2014/main" xmlns="" w="9525">
                   <a:solidFill>
                     <a:srgbClr val="000000"/>
                   </a:solidFill>
@@ -20988,7 +21345,7 @@
             </a:ln>
             <a:extLst>
               <a:ext uri="{91240B29-F687-4f45-9708-019B960494DF}">
-                <a14:hiddenLine xmlns="" xmlns:a16="http://schemas.microsoft.com/office/drawing/2014/main" xmlns:p14="http://schemas.microsoft.com/office/powerpoint/2010/main" xmlns:a14="http://schemas.microsoft.com/office/drawing/2010/main" w="9525">
+                <a14:hiddenLine xmlns:a14="http://schemas.microsoft.com/office/drawing/2010/main" xmlns:p14="http://schemas.microsoft.com/office/powerpoint/2010/main" xmlns:a16="http://schemas.microsoft.com/office/drawing/2014/main" xmlns="" w="9525">
                   <a:solidFill>
                     <a:srgbClr val="000000"/>
                   </a:solidFill>
@@ -21065,7 +21422,7 @@
             </a:ln>
             <a:extLst>
               <a:ext uri="{91240B29-F687-4f45-9708-019B960494DF}">
-                <a14:hiddenLine xmlns="" xmlns:a16="http://schemas.microsoft.com/office/drawing/2014/main" xmlns:p14="http://schemas.microsoft.com/office/powerpoint/2010/main" xmlns:a14="http://schemas.microsoft.com/office/drawing/2010/main" w="9525">
+                <a14:hiddenLine xmlns:a14="http://schemas.microsoft.com/office/drawing/2010/main" xmlns:p14="http://schemas.microsoft.com/office/powerpoint/2010/main" xmlns:a16="http://schemas.microsoft.com/office/drawing/2014/main" xmlns="" w="9525">
                   <a:solidFill>
                     <a:srgbClr val="000000"/>
                   </a:solidFill>
@@ -21190,7 +21547,7 @@
             </a:ln>
             <a:extLst>
               <a:ext uri="{91240B29-F687-4f45-9708-019B960494DF}">
-                <a14:hiddenLine xmlns="" xmlns:a16="http://schemas.microsoft.com/office/drawing/2014/main" xmlns:p14="http://schemas.microsoft.com/office/powerpoint/2010/main" xmlns:a14="http://schemas.microsoft.com/office/drawing/2010/main" w="9525">
+                <a14:hiddenLine xmlns:a14="http://schemas.microsoft.com/office/drawing/2010/main" xmlns:p14="http://schemas.microsoft.com/office/powerpoint/2010/main" xmlns:a16="http://schemas.microsoft.com/office/drawing/2014/main" xmlns="" w="9525">
                   <a:solidFill>
                     <a:srgbClr val="000000"/>
                   </a:solidFill>
@@ -21267,7 +21624,7 @@
             </a:ln>
             <a:extLst>
               <a:ext uri="{91240B29-F687-4f45-9708-019B960494DF}">
-                <a14:hiddenLine xmlns="" xmlns:a16="http://schemas.microsoft.com/office/drawing/2014/main" xmlns:p14="http://schemas.microsoft.com/office/powerpoint/2010/main" xmlns:a14="http://schemas.microsoft.com/office/drawing/2010/main" w="9525">
+                <a14:hiddenLine xmlns:a14="http://schemas.microsoft.com/office/drawing/2010/main" xmlns:p14="http://schemas.microsoft.com/office/powerpoint/2010/main" xmlns:a16="http://schemas.microsoft.com/office/drawing/2014/main" xmlns="" w="9525">
                   <a:solidFill>
                     <a:srgbClr val="000000"/>
                   </a:solidFill>
@@ -21372,7 +21729,7 @@
             </a:ln>
             <a:extLst>
               <a:ext uri="{91240B29-F687-4f45-9708-019B960494DF}">
-                <a14:hiddenLine xmlns="" xmlns:a16="http://schemas.microsoft.com/office/drawing/2014/main" xmlns:p14="http://schemas.microsoft.com/office/powerpoint/2010/main" xmlns:a14="http://schemas.microsoft.com/office/drawing/2010/main" w="9525">
+                <a14:hiddenLine xmlns:a14="http://schemas.microsoft.com/office/drawing/2010/main" xmlns:p14="http://schemas.microsoft.com/office/powerpoint/2010/main" xmlns:a16="http://schemas.microsoft.com/office/drawing/2014/main" xmlns="" w="9525">
                   <a:solidFill>
                     <a:srgbClr val="000000"/>
                   </a:solidFill>
@@ -21477,7 +21834,7 @@
             </a:ln>
             <a:extLst>
               <a:ext uri="{91240B29-F687-4f45-9708-019B960494DF}">
-                <a14:hiddenLine xmlns="" xmlns:a16="http://schemas.microsoft.com/office/drawing/2014/main" xmlns:p14="http://schemas.microsoft.com/office/powerpoint/2010/main" xmlns:a14="http://schemas.microsoft.com/office/drawing/2010/main" w="9525">
+                <a14:hiddenLine xmlns:a14="http://schemas.microsoft.com/office/drawing/2010/main" xmlns:p14="http://schemas.microsoft.com/office/powerpoint/2010/main" xmlns:a16="http://schemas.microsoft.com/office/drawing/2014/main" xmlns="" w="9525">
                   <a:solidFill>
                     <a:srgbClr val="000000"/>
                   </a:solidFill>
@@ -21554,7 +21911,7 @@
             </a:ln>
             <a:extLst>
               <a:ext uri="{91240B29-F687-4f45-9708-019B960494DF}">
-                <a14:hiddenLine xmlns="" xmlns:a16="http://schemas.microsoft.com/office/drawing/2014/main" xmlns:p14="http://schemas.microsoft.com/office/powerpoint/2010/main" xmlns:a14="http://schemas.microsoft.com/office/drawing/2010/main" w="9525">
+                <a14:hiddenLine xmlns:a14="http://schemas.microsoft.com/office/drawing/2010/main" xmlns:p14="http://schemas.microsoft.com/office/powerpoint/2010/main" xmlns:a16="http://schemas.microsoft.com/office/drawing/2014/main" xmlns="" w="9525">
                   <a:solidFill>
                     <a:srgbClr val="000000"/>
                   </a:solidFill>
@@ -21659,7 +22016,7 @@
             </a:ln>
             <a:extLst>
               <a:ext uri="{91240B29-F687-4f45-9708-019B960494DF}">
-                <a14:hiddenLine xmlns="" xmlns:a16="http://schemas.microsoft.com/office/drawing/2014/main" xmlns:p14="http://schemas.microsoft.com/office/powerpoint/2010/main" xmlns:a14="http://schemas.microsoft.com/office/drawing/2010/main" w="9525">
+                <a14:hiddenLine xmlns:a14="http://schemas.microsoft.com/office/drawing/2010/main" xmlns:p14="http://schemas.microsoft.com/office/powerpoint/2010/main" xmlns:a16="http://schemas.microsoft.com/office/drawing/2014/main" xmlns="" w="9525">
                   <a:solidFill>
                     <a:srgbClr val="000000"/>
                   </a:solidFill>
@@ -21764,7 +22121,7 @@
             </a:ln>
             <a:extLst>
               <a:ext uri="{91240B29-F687-4f45-9708-019B960494DF}">
-                <a14:hiddenLine xmlns="" xmlns:a16="http://schemas.microsoft.com/office/drawing/2014/main" xmlns:p14="http://schemas.microsoft.com/office/powerpoint/2010/main" xmlns:a14="http://schemas.microsoft.com/office/drawing/2010/main" w="9525">
+                <a14:hiddenLine xmlns:a14="http://schemas.microsoft.com/office/drawing/2010/main" xmlns:p14="http://schemas.microsoft.com/office/powerpoint/2010/main" xmlns:a16="http://schemas.microsoft.com/office/drawing/2014/main" xmlns="" w="9525">
                   <a:solidFill>
                     <a:srgbClr val="000000"/>
                   </a:solidFill>
@@ -21835,7 +22192,7 @@
             </a:ln>
             <a:extLst>
               <a:ext uri="{91240B29-F687-4f45-9708-019B960494DF}">
-                <a14:hiddenLine xmlns="" xmlns:a16="http://schemas.microsoft.com/office/drawing/2014/main" xmlns:p14="http://schemas.microsoft.com/office/powerpoint/2010/main" xmlns:a14="http://schemas.microsoft.com/office/drawing/2010/main" w="9525">
+                <a14:hiddenLine xmlns:a14="http://schemas.microsoft.com/office/drawing/2010/main" xmlns:p14="http://schemas.microsoft.com/office/powerpoint/2010/main" xmlns:a16="http://schemas.microsoft.com/office/drawing/2014/main" xmlns="" w="9525">
                   <a:solidFill>
                     <a:srgbClr val="000000"/>
                   </a:solidFill>
@@ -21940,7 +22297,7 @@
             </a:ln>
             <a:extLst>
               <a:ext uri="{91240B29-F687-4f45-9708-019B960494DF}">
-                <a14:hiddenLine xmlns="" xmlns:a16="http://schemas.microsoft.com/office/drawing/2014/main" xmlns:p14="http://schemas.microsoft.com/office/powerpoint/2010/main" xmlns:a14="http://schemas.microsoft.com/office/drawing/2010/main" w="9525">
+                <a14:hiddenLine xmlns:a14="http://schemas.microsoft.com/office/drawing/2010/main" xmlns:p14="http://schemas.microsoft.com/office/powerpoint/2010/main" xmlns:a16="http://schemas.microsoft.com/office/drawing/2014/main" xmlns="" w="9525">
                   <a:solidFill>
                     <a:srgbClr val="000000"/>
                   </a:solidFill>
@@ -22011,7 +22368,7 @@
             </a:ln>
             <a:extLst>
               <a:ext uri="{91240B29-F687-4f45-9708-019B960494DF}">
-                <a14:hiddenLine xmlns="" xmlns:a16="http://schemas.microsoft.com/office/drawing/2014/main" xmlns:p14="http://schemas.microsoft.com/office/powerpoint/2010/main" xmlns:a14="http://schemas.microsoft.com/office/drawing/2010/main" w="9525">
+                <a14:hiddenLine xmlns:a14="http://schemas.microsoft.com/office/drawing/2010/main" xmlns:p14="http://schemas.microsoft.com/office/powerpoint/2010/main" xmlns:a16="http://schemas.microsoft.com/office/drawing/2014/main" xmlns="" w="9525">
                   <a:solidFill>
                     <a:srgbClr val="000000"/>
                   </a:solidFill>
@@ -22116,7 +22473,7 @@
             </a:ln>
             <a:extLst>
               <a:ext uri="{91240B29-F687-4f45-9708-019B960494DF}">
-                <a14:hiddenLine xmlns="" xmlns:a16="http://schemas.microsoft.com/office/drawing/2014/main" xmlns:p14="http://schemas.microsoft.com/office/powerpoint/2010/main" xmlns:a14="http://schemas.microsoft.com/office/drawing/2010/main" w="9525">
+                <a14:hiddenLine xmlns:a14="http://schemas.microsoft.com/office/drawing/2010/main" xmlns:p14="http://schemas.microsoft.com/office/powerpoint/2010/main" xmlns:a16="http://schemas.microsoft.com/office/drawing/2014/main" xmlns="" w="9525">
                   <a:solidFill>
                     <a:srgbClr val="000000"/>
                   </a:solidFill>
@@ -22199,7 +22556,7 @@
             </a:ln>
             <a:extLst>
               <a:ext uri="{91240B29-F687-4f45-9708-019B960494DF}">
-                <a14:hiddenLine xmlns="" xmlns:a16="http://schemas.microsoft.com/office/drawing/2014/main" xmlns:p14="http://schemas.microsoft.com/office/powerpoint/2010/main" xmlns:a14="http://schemas.microsoft.com/office/drawing/2010/main" w="9525">
+                <a14:hiddenLine xmlns:a14="http://schemas.microsoft.com/office/drawing/2010/main" xmlns:p14="http://schemas.microsoft.com/office/powerpoint/2010/main" xmlns:a16="http://schemas.microsoft.com/office/drawing/2014/main" xmlns="" w="9525">
                   <a:solidFill>
                     <a:srgbClr val="000000"/>
                   </a:solidFill>
@@ -22304,7 +22661,7 @@
             </a:ln>
             <a:extLst>
               <a:ext uri="{91240B29-F687-4f45-9708-019B960494DF}">
-                <a14:hiddenLine xmlns="" xmlns:a16="http://schemas.microsoft.com/office/drawing/2014/main" xmlns:p14="http://schemas.microsoft.com/office/powerpoint/2010/main" xmlns:a14="http://schemas.microsoft.com/office/drawing/2010/main" w="9525">
+                <a14:hiddenLine xmlns:a14="http://schemas.microsoft.com/office/drawing/2010/main" xmlns:p14="http://schemas.microsoft.com/office/powerpoint/2010/main" xmlns:a16="http://schemas.microsoft.com/office/drawing/2014/main" xmlns="" w="9525">
                   <a:solidFill>
                     <a:srgbClr val="000000"/>
                   </a:solidFill>
@@ -22387,7 +22744,7 @@
             </a:ln>
             <a:extLst>
               <a:ext uri="{91240B29-F687-4f45-9708-019B960494DF}">
-                <a14:hiddenLine xmlns="" xmlns:a16="http://schemas.microsoft.com/office/drawing/2014/main" xmlns:p14="http://schemas.microsoft.com/office/powerpoint/2010/main" xmlns:a14="http://schemas.microsoft.com/office/drawing/2010/main" w="9525">
+                <a14:hiddenLine xmlns:a14="http://schemas.microsoft.com/office/drawing/2010/main" xmlns:p14="http://schemas.microsoft.com/office/powerpoint/2010/main" xmlns:a16="http://schemas.microsoft.com/office/drawing/2014/main" xmlns="" w="9525">
                   <a:solidFill>
                     <a:srgbClr val="000000"/>
                   </a:solidFill>
@@ -22492,7 +22849,7 @@
             </a:ln>
             <a:extLst>
               <a:ext uri="{91240B29-F687-4f45-9708-019B960494DF}">
-                <a14:hiddenLine xmlns="" xmlns:a16="http://schemas.microsoft.com/office/drawing/2014/main" xmlns:p14="http://schemas.microsoft.com/office/powerpoint/2010/main" xmlns:a14="http://schemas.microsoft.com/office/drawing/2010/main" w="9525">
+                <a14:hiddenLine xmlns:a14="http://schemas.microsoft.com/office/drawing/2010/main" xmlns:p14="http://schemas.microsoft.com/office/powerpoint/2010/main" xmlns:a16="http://schemas.microsoft.com/office/drawing/2014/main" xmlns="" w="9525">
                   <a:solidFill>
                     <a:srgbClr val="000000"/>
                   </a:solidFill>
@@ -22541,7 +22898,7 @@
             </a:ln>
             <a:extLst>
               <a:ext uri="{91240B29-F687-4f45-9708-019B960494DF}">
-                <a14:hiddenLine xmlns="" xmlns:a16="http://schemas.microsoft.com/office/drawing/2014/main" xmlns:p14="http://schemas.microsoft.com/office/powerpoint/2010/main" xmlns:a14="http://schemas.microsoft.com/office/drawing/2010/main" w="9525">
+                <a14:hiddenLine xmlns:a14="http://schemas.microsoft.com/office/drawing/2010/main" xmlns:p14="http://schemas.microsoft.com/office/powerpoint/2010/main" xmlns:a16="http://schemas.microsoft.com/office/drawing/2014/main" xmlns="" w="9525">
                   <a:solidFill>
                     <a:srgbClr val="000000"/>
                   </a:solidFill>
@@ -22646,7 +23003,7 @@
             </a:ln>
             <a:extLst>
               <a:ext uri="{91240B29-F687-4f45-9708-019B960494DF}">
-                <a14:hiddenLine xmlns="" xmlns:a16="http://schemas.microsoft.com/office/drawing/2014/main" xmlns:p14="http://schemas.microsoft.com/office/powerpoint/2010/main" xmlns:a14="http://schemas.microsoft.com/office/drawing/2010/main" w="9525">
+                <a14:hiddenLine xmlns:a14="http://schemas.microsoft.com/office/drawing/2010/main" xmlns:p14="http://schemas.microsoft.com/office/powerpoint/2010/main" xmlns:a16="http://schemas.microsoft.com/office/drawing/2014/main" xmlns="" w="9525">
                   <a:solidFill>
                     <a:srgbClr val="000000"/>
                   </a:solidFill>
@@ -22723,7 +23080,7 @@
             </a:ln>
             <a:extLst>
               <a:ext uri="{91240B29-F687-4f45-9708-019B960494DF}">
-                <a14:hiddenLine xmlns="" xmlns:a16="http://schemas.microsoft.com/office/drawing/2014/main" xmlns:p14="http://schemas.microsoft.com/office/powerpoint/2010/main" xmlns:a14="http://schemas.microsoft.com/office/drawing/2010/main" w="9525">
+                <a14:hiddenLine xmlns:a14="http://schemas.microsoft.com/office/drawing/2010/main" xmlns:p14="http://schemas.microsoft.com/office/powerpoint/2010/main" xmlns:a16="http://schemas.microsoft.com/office/drawing/2014/main" xmlns="" w="9525">
                   <a:solidFill>
                     <a:srgbClr val="000000"/>
                   </a:solidFill>
@@ -22800,7 +23157,7 @@
             </a:ln>
             <a:extLst>
               <a:ext uri="{91240B29-F687-4f45-9708-019B960494DF}">
-                <a14:hiddenLine xmlns="" xmlns:a16="http://schemas.microsoft.com/office/drawing/2014/main" xmlns:p14="http://schemas.microsoft.com/office/powerpoint/2010/main" xmlns:a14="http://schemas.microsoft.com/office/drawing/2010/main" w="9525">
+                <a14:hiddenLine xmlns:a14="http://schemas.microsoft.com/office/drawing/2010/main" xmlns:p14="http://schemas.microsoft.com/office/powerpoint/2010/main" xmlns:a16="http://schemas.microsoft.com/office/drawing/2014/main" xmlns="" w="9525">
                   <a:solidFill>
                     <a:srgbClr val="000000"/>
                   </a:solidFill>
@@ -22905,7 +23262,7 @@
             </a:ln>
             <a:extLst>
               <a:ext uri="{91240B29-F687-4f45-9708-019B960494DF}">
-                <a14:hiddenLine xmlns="" xmlns:a16="http://schemas.microsoft.com/office/drawing/2014/main" xmlns:p14="http://schemas.microsoft.com/office/powerpoint/2010/main" xmlns:a14="http://schemas.microsoft.com/office/drawing/2010/main" w="9525">
+                <a14:hiddenLine xmlns:a14="http://schemas.microsoft.com/office/drawing/2010/main" xmlns:p14="http://schemas.microsoft.com/office/powerpoint/2010/main" xmlns:a16="http://schemas.microsoft.com/office/drawing/2014/main" xmlns="" w="9525">
                   <a:solidFill>
                     <a:srgbClr val="000000"/>
                   </a:solidFill>
@@ -22988,7 +23345,7 @@
             </a:ln>
             <a:extLst>
               <a:ext uri="{91240B29-F687-4f45-9708-019B960494DF}">
-                <a14:hiddenLine xmlns="" xmlns:a16="http://schemas.microsoft.com/office/drawing/2014/main" xmlns:p14="http://schemas.microsoft.com/office/powerpoint/2010/main" xmlns:a14="http://schemas.microsoft.com/office/drawing/2010/main" w="9525">
+                <a14:hiddenLine xmlns:a14="http://schemas.microsoft.com/office/drawing/2010/main" xmlns:p14="http://schemas.microsoft.com/office/powerpoint/2010/main" xmlns:a16="http://schemas.microsoft.com/office/drawing/2014/main" xmlns="" w="9525">
                   <a:solidFill>
                     <a:srgbClr val="000000"/>
                   </a:solidFill>
@@ -23065,7 +23422,7 @@
             </a:ln>
             <a:extLst>
               <a:ext uri="{91240B29-F687-4f45-9708-019B960494DF}">
-                <a14:hiddenLine xmlns="" xmlns:a16="http://schemas.microsoft.com/office/drawing/2014/main" xmlns:p14="http://schemas.microsoft.com/office/powerpoint/2010/main" xmlns:a14="http://schemas.microsoft.com/office/drawing/2010/main" w="9525">
+                <a14:hiddenLine xmlns:a14="http://schemas.microsoft.com/office/drawing/2010/main" xmlns:p14="http://schemas.microsoft.com/office/powerpoint/2010/main" xmlns:a16="http://schemas.microsoft.com/office/drawing/2014/main" xmlns="" w="9525">
                   <a:solidFill>
                     <a:srgbClr val="000000"/>
                   </a:solidFill>
@@ -23170,7 +23527,7 @@
             </a:ln>
             <a:extLst>
               <a:ext uri="{91240B29-F687-4f45-9708-019B960494DF}">
-                <a14:hiddenLine xmlns="" xmlns:a16="http://schemas.microsoft.com/office/drawing/2014/main" xmlns:p14="http://schemas.microsoft.com/office/powerpoint/2010/main" xmlns:a14="http://schemas.microsoft.com/office/drawing/2010/main" w="9525">
+                <a14:hiddenLine xmlns:a14="http://schemas.microsoft.com/office/drawing/2010/main" xmlns:p14="http://schemas.microsoft.com/office/powerpoint/2010/main" xmlns:a16="http://schemas.microsoft.com/office/drawing/2014/main" xmlns="" w="9525">
                   <a:solidFill>
                     <a:srgbClr val="000000"/>
                   </a:solidFill>
@@ -23247,7 +23604,7 @@
             </a:ln>
             <a:extLst>
               <a:ext uri="{91240B29-F687-4f45-9708-019B960494DF}">
-                <a14:hiddenLine xmlns="" xmlns:a16="http://schemas.microsoft.com/office/drawing/2014/main" xmlns:p14="http://schemas.microsoft.com/office/powerpoint/2010/main" xmlns:a14="http://schemas.microsoft.com/office/drawing/2010/main" w="9525">
+                <a14:hiddenLine xmlns:a14="http://schemas.microsoft.com/office/drawing/2010/main" xmlns:p14="http://schemas.microsoft.com/office/powerpoint/2010/main" xmlns:a16="http://schemas.microsoft.com/office/drawing/2014/main" xmlns="" w="9525">
                   <a:solidFill>
                     <a:srgbClr val="000000"/>
                   </a:solidFill>
@@ -23352,7 +23709,7 @@
             </a:ln>
             <a:extLst>
               <a:ext uri="{91240B29-F687-4f45-9708-019B960494DF}">
-                <a14:hiddenLine xmlns="" xmlns:a16="http://schemas.microsoft.com/office/drawing/2014/main" xmlns:p14="http://schemas.microsoft.com/office/powerpoint/2010/main" xmlns:a14="http://schemas.microsoft.com/office/drawing/2010/main" w="9525">
+                <a14:hiddenLine xmlns:a14="http://schemas.microsoft.com/office/drawing/2010/main" xmlns:p14="http://schemas.microsoft.com/office/powerpoint/2010/main" xmlns:a16="http://schemas.microsoft.com/office/drawing/2014/main" xmlns="" w="9525">
                   <a:solidFill>
                     <a:srgbClr val="000000"/>
                   </a:solidFill>
@@ -23429,7 +23786,7 @@
             </a:ln>
             <a:extLst>
               <a:ext uri="{91240B29-F687-4f45-9708-019B960494DF}">
-                <a14:hiddenLine xmlns="" xmlns:a16="http://schemas.microsoft.com/office/drawing/2014/main" xmlns:p14="http://schemas.microsoft.com/office/powerpoint/2010/main" xmlns:a14="http://schemas.microsoft.com/office/drawing/2010/main" w="9525">
+                <a14:hiddenLine xmlns:a14="http://schemas.microsoft.com/office/drawing/2010/main" xmlns:p14="http://schemas.microsoft.com/office/powerpoint/2010/main" xmlns:a16="http://schemas.microsoft.com/office/drawing/2014/main" xmlns="" w="9525">
                   <a:solidFill>
                     <a:srgbClr val="000000"/>
                   </a:solidFill>
@@ -23534,7 +23891,7 @@
             </a:ln>
             <a:extLst>
               <a:ext uri="{91240B29-F687-4f45-9708-019B960494DF}">
-                <a14:hiddenLine xmlns="" xmlns:a16="http://schemas.microsoft.com/office/drawing/2014/main" xmlns:p14="http://schemas.microsoft.com/office/powerpoint/2010/main" xmlns:a14="http://schemas.microsoft.com/office/drawing/2010/main" w="9525">
+                <a14:hiddenLine xmlns:a14="http://schemas.microsoft.com/office/drawing/2010/main" xmlns:p14="http://schemas.microsoft.com/office/powerpoint/2010/main" xmlns:a16="http://schemas.microsoft.com/office/drawing/2014/main" xmlns="" w="9525">
                   <a:solidFill>
                     <a:srgbClr val="000000"/>
                   </a:solidFill>
@@ -23583,7 +23940,7 @@
             </a:ln>
             <a:extLst>
               <a:ext uri="{91240B29-F687-4f45-9708-019B960494DF}">
-                <a14:hiddenLine xmlns="" xmlns:a16="http://schemas.microsoft.com/office/drawing/2014/main" xmlns:p14="http://schemas.microsoft.com/office/powerpoint/2010/main" xmlns:a14="http://schemas.microsoft.com/office/drawing/2010/main" w="9525">
+                <a14:hiddenLine xmlns:a14="http://schemas.microsoft.com/office/drawing/2010/main" xmlns:p14="http://schemas.microsoft.com/office/powerpoint/2010/main" xmlns:a16="http://schemas.microsoft.com/office/drawing/2014/main" xmlns="" w="9525">
                   <a:solidFill>
                     <a:srgbClr val="000000"/>
                   </a:solidFill>
@@ -23663,7 +24020,7 @@
             </a:ln>
             <a:extLst>
               <a:ext uri="{91240B29-F687-4f45-9708-019B960494DF}">
-                <a14:hiddenLine xmlns="" xmlns:a16="http://schemas.microsoft.com/office/drawing/2014/main" xmlns:p14="http://schemas.microsoft.com/office/powerpoint/2010/main" xmlns:a14="http://schemas.microsoft.com/office/drawing/2010/main" w="9525">
+                <a14:hiddenLine xmlns:a14="http://schemas.microsoft.com/office/drawing/2010/main" xmlns:p14="http://schemas.microsoft.com/office/powerpoint/2010/main" xmlns:a16="http://schemas.microsoft.com/office/drawing/2014/main" xmlns="" w="9525">
                   <a:solidFill>
                     <a:srgbClr val="000000"/>
                   </a:solidFill>
@@ -23768,7 +24125,7 @@
             </a:ln>
             <a:extLst>
               <a:ext uri="{91240B29-F687-4f45-9708-019B960494DF}">
-                <a14:hiddenLine xmlns="" xmlns:a16="http://schemas.microsoft.com/office/drawing/2014/main" xmlns:p14="http://schemas.microsoft.com/office/powerpoint/2010/main" xmlns:a14="http://schemas.microsoft.com/office/drawing/2010/main" w="9525">
+                <a14:hiddenLine xmlns:a14="http://schemas.microsoft.com/office/drawing/2010/main" xmlns:p14="http://schemas.microsoft.com/office/powerpoint/2010/main" xmlns:a16="http://schemas.microsoft.com/office/drawing/2014/main" xmlns="" w="9525">
                   <a:solidFill>
                     <a:srgbClr val="000000"/>
                   </a:solidFill>
@@ -23845,7 +24202,7 @@
             </a:ln>
             <a:extLst>
               <a:ext uri="{91240B29-F687-4f45-9708-019B960494DF}">
-                <a14:hiddenLine xmlns="" xmlns:a16="http://schemas.microsoft.com/office/drawing/2014/main" xmlns:p14="http://schemas.microsoft.com/office/powerpoint/2010/main" xmlns:a14="http://schemas.microsoft.com/office/drawing/2010/main" w="9525">
+                <a14:hiddenLine xmlns:a14="http://schemas.microsoft.com/office/drawing/2010/main" xmlns:p14="http://schemas.microsoft.com/office/powerpoint/2010/main" xmlns:a16="http://schemas.microsoft.com/office/drawing/2014/main" xmlns="" w="9525">
                   <a:solidFill>
                     <a:srgbClr val="000000"/>
                   </a:solidFill>
@@ -23950,7 +24307,7 @@
             </a:ln>
             <a:extLst>
               <a:ext uri="{91240B29-F687-4f45-9708-019B960494DF}">
-                <a14:hiddenLine xmlns="" xmlns:a16="http://schemas.microsoft.com/office/drawing/2014/main" xmlns:p14="http://schemas.microsoft.com/office/powerpoint/2010/main" xmlns:a14="http://schemas.microsoft.com/office/drawing/2010/main" w="9525">
+                <a14:hiddenLine xmlns:a14="http://schemas.microsoft.com/office/drawing/2010/main" xmlns:p14="http://schemas.microsoft.com/office/powerpoint/2010/main" xmlns:a16="http://schemas.microsoft.com/office/drawing/2014/main" xmlns="" w="9525">
                   <a:solidFill>
                     <a:srgbClr val="000000"/>
                   </a:solidFill>
@@ -24055,7 +24412,7 @@
             </a:ln>
             <a:extLst>
               <a:ext uri="{91240B29-F687-4f45-9708-019B960494DF}">
-                <a14:hiddenLine xmlns="" xmlns:a16="http://schemas.microsoft.com/office/drawing/2014/main" xmlns:p14="http://schemas.microsoft.com/office/powerpoint/2010/main" xmlns:a14="http://schemas.microsoft.com/office/drawing/2010/main" w="9525">
+                <a14:hiddenLine xmlns:a14="http://schemas.microsoft.com/office/drawing/2010/main" xmlns:p14="http://schemas.microsoft.com/office/powerpoint/2010/main" xmlns:a16="http://schemas.microsoft.com/office/drawing/2014/main" xmlns="" w="9525">
                   <a:solidFill>
                     <a:srgbClr val="000000"/>
                   </a:solidFill>
@@ -24135,7 +24492,7 @@
             </a:ln>
             <a:extLst>
               <a:ext uri="{91240B29-F687-4f45-9708-019B960494DF}">
-                <a14:hiddenLine xmlns="" xmlns:a16="http://schemas.microsoft.com/office/drawing/2014/main" xmlns:p14="http://schemas.microsoft.com/office/powerpoint/2010/main" xmlns:a14="http://schemas.microsoft.com/office/drawing/2010/main" w="9525">
+                <a14:hiddenLine xmlns:a14="http://schemas.microsoft.com/office/drawing/2010/main" xmlns:p14="http://schemas.microsoft.com/office/powerpoint/2010/main" xmlns:a16="http://schemas.microsoft.com/office/drawing/2014/main" xmlns="" w="9525">
                   <a:solidFill>
                     <a:srgbClr val="000000"/>
                   </a:solidFill>
@@ -24212,7 +24569,7 @@
             </a:ln>
             <a:extLst>
               <a:ext uri="{91240B29-F687-4f45-9708-019B960494DF}">
-                <a14:hiddenLine xmlns="" xmlns:a16="http://schemas.microsoft.com/office/drawing/2014/main" xmlns:p14="http://schemas.microsoft.com/office/powerpoint/2010/main" xmlns:a14="http://schemas.microsoft.com/office/drawing/2010/main" w="9525">
+                <a14:hiddenLine xmlns:a14="http://schemas.microsoft.com/office/drawing/2010/main" xmlns:p14="http://schemas.microsoft.com/office/powerpoint/2010/main" xmlns:a16="http://schemas.microsoft.com/office/drawing/2014/main" xmlns="" w="9525">
                   <a:solidFill>
                     <a:srgbClr val="000000"/>
                   </a:solidFill>
@@ -24317,7 +24674,7 @@
             </a:ln>
             <a:extLst>
               <a:ext uri="{91240B29-F687-4f45-9708-019B960494DF}">
-                <a14:hiddenLine xmlns="" xmlns:a16="http://schemas.microsoft.com/office/drawing/2014/main" xmlns:p14="http://schemas.microsoft.com/office/powerpoint/2010/main" xmlns:a14="http://schemas.microsoft.com/office/drawing/2010/main" w="9525">
+                <a14:hiddenLine xmlns:a14="http://schemas.microsoft.com/office/drawing/2010/main" xmlns:p14="http://schemas.microsoft.com/office/powerpoint/2010/main" xmlns:a16="http://schemas.microsoft.com/office/drawing/2014/main" xmlns="" w="9525">
                   <a:solidFill>
                     <a:srgbClr val="000000"/>
                   </a:solidFill>
@@ -24422,7 +24779,7 @@
             </a:ln>
             <a:extLst>
               <a:ext uri="{91240B29-F687-4f45-9708-019B960494DF}">
-                <a14:hiddenLine xmlns="" xmlns:a16="http://schemas.microsoft.com/office/drawing/2014/main" xmlns:p14="http://schemas.microsoft.com/office/powerpoint/2010/main" xmlns:a14="http://schemas.microsoft.com/office/drawing/2010/main" w="9525">
+                <a14:hiddenLine xmlns:a14="http://schemas.microsoft.com/office/drawing/2010/main" xmlns:p14="http://schemas.microsoft.com/office/powerpoint/2010/main" xmlns:a16="http://schemas.microsoft.com/office/drawing/2014/main" xmlns="" w="9525">
                   <a:solidFill>
                     <a:srgbClr val="000000"/>
                   </a:solidFill>
@@ -24499,7 +24856,7 @@
             </a:ln>
             <a:extLst>
               <a:ext uri="{91240B29-F687-4f45-9708-019B960494DF}">
-                <a14:hiddenLine xmlns="" xmlns:a16="http://schemas.microsoft.com/office/drawing/2014/main" xmlns:p14="http://schemas.microsoft.com/office/powerpoint/2010/main" xmlns:a14="http://schemas.microsoft.com/office/drawing/2010/main" w="9525">
+                <a14:hiddenLine xmlns:a14="http://schemas.microsoft.com/office/drawing/2010/main" xmlns:p14="http://schemas.microsoft.com/office/powerpoint/2010/main" xmlns:a16="http://schemas.microsoft.com/office/drawing/2014/main" xmlns="" w="9525">
                   <a:solidFill>
                     <a:srgbClr val="000000"/>
                   </a:solidFill>
@@ -24634,7 +24991,7 @@
             </a:ln>
             <a:extLst>
               <a:ext uri="{91240B29-F687-4f45-9708-019B960494DF}">
-                <a14:hiddenLine xmlns="" xmlns:a16="http://schemas.microsoft.com/office/drawing/2014/main" xmlns:p14="http://schemas.microsoft.com/office/powerpoint/2010/main" xmlns:a14="http://schemas.microsoft.com/office/drawing/2010/main" w="9525">
+                <a14:hiddenLine xmlns:a14="http://schemas.microsoft.com/office/drawing/2010/main" xmlns:p14="http://schemas.microsoft.com/office/powerpoint/2010/main" xmlns:a16="http://schemas.microsoft.com/office/drawing/2014/main" xmlns="" w="9525">
                   <a:solidFill>
                     <a:srgbClr val="000000"/>
                   </a:solidFill>
@@ -24717,7 +25074,7 @@
             </a:ln>
             <a:extLst>
               <a:ext uri="{91240B29-F687-4f45-9708-019B960494DF}">
-                <a14:hiddenLine xmlns="" xmlns:a16="http://schemas.microsoft.com/office/drawing/2014/main" xmlns:p14="http://schemas.microsoft.com/office/powerpoint/2010/main" xmlns:a14="http://schemas.microsoft.com/office/drawing/2010/main" w="9525">
+                <a14:hiddenLine xmlns:a14="http://schemas.microsoft.com/office/drawing/2010/main" xmlns:p14="http://schemas.microsoft.com/office/powerpoint/2010/main" xmlns:a16="http://schemas.microsoft.com/office/drawing/2014/main" xmlns="" w="9525">
                   <a:solidFill>
                     <a:srgbClr val="000000"/>
                   </a:solidFill>
@@ -24822,7 +25179,7 @@
             </a:ln>
             <a:extLst>
               <a:ext uri="{91240B29-F687-4f45-9708-019B960494DF}">
-                <a14:hiddenLine xmlns="" xmlns:a16="http://schemas.microsoft.com/office/drawing/2014/main" xmlns:p14="http://schemas.microsoft.com/office/powerpoint/2010/main" xmlns:a14="http://schemas.microsoft.com/office/drawing/2010/main" w="9525">
+                <a14:hiddenLine xmlns:a14="http://schemas.microsoft.com/office/drawing/2010/main" xmlns:p14="http://schemas.microsoft.com/office/powerpoint/2010/main" xmlns:a16="http://schemas.microsoft.com/office/drawing/2014/main" xmlns="" w="9525">
                   <a:solidFill>
                     <a:srgbClr val="000000"/>
                   </a:solidFill>

</xml_diff>

<commit_message>
Añadido nuevo diagrama E-R
</commit_message>
<xml_diff>
--- a/doc/Presentación_mitad_de_curso_JuanEspinosayNachoRodriguez.pptx
+++ b/doc/Presentación_mitad_de_curso_JuanEspinosayNachoRodriguez.pptx
@@ -1584,7 +1584,7 @@
           <a:noFill/>
           <a:extLst>
             <a:ext uri="{909E8E84-426E-40dd-AFC4-6F175D3DCCD1}">
-              <a14:hiddenFill xmlns:a14="http://schemas.microsoft.com/office/drawing/2010/main" xmlns="">
+              <a14:hiddenFill xmlns="" xmlns:a14="http://schemas.microsoft.com/office/drawing/2010/main">
                 <a:solidFill>
                   <a:srgbClr val="FFFFFF"/>
                 </a:solidFill>
@@ -1643,7 +1643,7 @@
             </a:ln>
             <a:extLst>
               <a:ext uri="{91240B29-F687-4f45-9708-019B960494DF}">
-                <a14:hiddenLine xmlns:a14="http://schemas.microsoft.com/office/drawing/2010/main" xmlns="" w="9525">
+                <a14:hiddenLine xmlns="" xmlns:a14="http://schemas.microsoft.com/office/drawing/2010/main" w="9525">
                   <a:solidFill>
                     <a:srgbClr val="000000"/>
                   </a:solidFill>
@@ -1733,7 +1733,7 @@
             </a:ln>
             <a:extLst>
               <a:ext uri="{91240B29-F687-4f45-9708-019B960494DF}">
-                <a14:hiddenLine xmlns:a14="http://schemas.microsoft.com/office/drawing/2010/main" xmlns="" w="9525">
+                <a14:hiddenLine xmlns="" xmlns:a14="http://schemas.microsoft.com/office/drawing/2010/main" w="9525">
                   <a:solidFill>
                     <a:srgbClr val="000000"/>
                   </a:solidFill>
@@ -1823,7 +1823,7 @@
             </a:ln>
             <a:extLst>
               <a:ext uri="{91240B29-F687-4f45-9708-019B960494DF}">
-                <a14:hiddenLine xmlns:a14="http://schemas.microsoft.com/office/drawing/2010/main" xmlns="" w="9525">
+                <a14:hiddenLine xmlns="" xmlns:a14="http://schemas.microsoft.com/office/drawing/2010/main" w="9525">
                   <a:solidFill>
                     <a:srgbClr val="000000"/>
                   </a:solidFill>
@@ -1857,7 +1857,7 @@
             </a:ln>
             <a:extLst>
               <a:ext uri="{91240B29-F687-4f45-9708-019B960494DF}">
-                <a14:hiddenLine xmlns:a14="http://schemas.microsoft.com/office/drawing/2010/main" xmlns="" w="9525">
+                <a14:hiddenLine xmlns="" xmlns:a14="http://schemas.microsoft.com/office/drawing/2010/main" w="9525">
                   <a:solidFill>
                     <a:srgbClr val="000000"/>
                   </a:solidFill>
@@ -1947,7 +1947,7 @@
             </a:ln>
             <a:extLst>
               <a:ext uri="{91240B29-F687-4f45-9708-019B960494DF}">
-                <a14:hiddenLine xmlns:a14="http://schemas.microsoft.com/office/drawing/2010/main" xmlns="" w="9525">
+                <a14:hiddenLine xmlns="" xmlns:a14="http://schemas.microsoft.com/office/drawing/2010/main" w="9525">
                   <a:solidFill>
                     <a:srgbClr val="000000"/>
                   </a:solidFill>
@@ -2009,7 +2009,7 @@
             </a:ln>
             <a:extLst>
               <a:ext uri="{91240B29-F687-4f45-9708-019B960494DF}">
-                <a14:hiddenLine xmlns:a14="http://schemas.microsoft.com/office/drawing/2010/main" xmlns="" w="9525">
+                <a14:hiddenLine xmlns="" xmlns:a14="http://schemas.microsoft.com/office/drawing/2010/main" w="9525">
                   <a:solidFill>
                     <a:srgbClr val="000000"/>
                   </a:solidFill>
@@ -2071,7 +2071,7 @@
             </a:ln>
             <a:extLst>
               <a:ext uri="{91240B29-F687-4f45-9708-019B960494DF}">
-                <a14:hiddenLine xmlns:a14="http://schemas.microsoft.com/office/drawing/2010/main" xmlns="" w="9525">
+                <a14:hiddenLine xmlns="" xmlns:a14="http://schemas.microsoft.com/office/drawing/2010/main" w="9525">
                   <a:solidFill>
                     <a:srgbClr val="000000"/>
                   </a:solidFill>
@@ -2161,7 +2161,7 @@
             </a:ln>
             <a:extLst>
               <a:ext uri="{91240B29-F687-4f45-9708-019B960494DF}">
-                <a14:hiddenLine xmlns:a14="http://schemas.microsoft.com/office/drawing/2010/main" xmlns="" w="9525">
+                <a14:hiddenLine xmlns="" xmlns:a14="http://schemas.microsoft.com/office/drawing/2010/main" w="9525">
                   <a:solidFill>
                     <a:srgbClr val="000000"/>
                   </a:solidFill>
@@ -2223,7 +2223,7 @@
             </a:ln>
             <a:extLst>
               <a:ext uri="{91240B29-F687-4f45-9708-019B960494DF}">
-                <a14:hiddenLine xmlns:a14="http://schemas.microsoft.com/office/drawing/2010/main" xmlns="" w="9525">
+                <a14:hiddenLine xmlns="" xmlns:a14="http://schemas.microsoft.com/office/drawing/2010/main" w="9525">
                   <a:solidFill>
                     <a:srgbClr val="000000"/>
                   </a:solidFill>
@@ -2285,7 +2285,7 @@
             </a:ln>
             <a:extLst>
               <a:ext uri="{91240B29-F687-4f45-9708-019B960494DF}">
-                <a14:hiddenLine xmlns:a14="http://schemas.microsoft.com/office/drawing/2010/main" xmlns="" w="9525">
+                <a14:hiddenLine xmlns="" xmlns:a14="http://schemas.microsoft.com/office/drawing/2010/main" w="9525">
                   <a:solidFill>
                     <a:srgbClr val="000000"/>
                   </a:solidFill>
@@ -2375,7 +2375,7 @@
             </a:ln>
             <a:extLst>
               <a:ext uri="{91240B29-F687-4f45-9708-019B960494DF}">
-                <a14:hiddenLine xmlns:a14="http://schemas.microsoft.com/office/drawing/2010/main" xmlns="" w="9525">
+                <a14:hiddenLine xmlns="" xmlns:a14="http://schemas.microsoft.com/office/drawing/2010/main" w="9525">
                   <a:solidFill>
                     <a:srgbClr val="000000"/>
                   </a:solidFill>
@@ -2465,7 +2465,7 @@
             </a:ln>
             <a:extLst>
               <a:ext uri="{91240B29-F687-4f45-9708-019B960494DF}">
-                <a14:hiddenLine xmlns:a14="http://schemas.microsoft.com/office/drawing/2010/main" xmlns="" w="9525">
+                <a14:hiddenLine xmlns="" xmlns:a14="http://schemas.microsoft.com/office/drawing/2010/main" w="9525">
                   <a:solidFill>
                     <a:srgbClr val="000000"/>
                   </a:solidFill>
@@ -2527,7 +2527,7 @@
             </a:ln>
             <a:extLst>
               <a:ext uri="{91240B29-F687-4f45-9708-019B960494DF}">
-                <a14:hiddenLine xmlns:a14="http://schemas.microsoft.com/office/drawing/2010/main" xmlns="" w="9525">
+                <a14:hiddenLine xmlns="" xmlns:a14="http://schemas.microsoft.com/office/drawing/2010/main" w="9525">
                   <a:solidFill>
                     <a:srgbClr val="000000"/>
                   </a:solidFill>
@@ -2637,7 +2637,7 @@
             </a:ln>
             <a:extLst>
               <a:ext uri="{91240B29-F687-4f45-9708-019B960494DF}">
-                <a14:hiddenLine xmlns:a14="http://schemas.microsoft.com/office/drawing/2010/main" xmlns="" w="9525">
+                <a14:hiddenLine xmlns="" xmlns:a14="http://schemas.microsoft.com/office/drawing/2010/main" w="9525">
                   <a:solidFill>
                     <a:srgbClr val="000000"/>
                   </a:solidFill>
@@ -2699,7 +2699,7 @@
             </a:ln>
             <a:extLst>
               <a:ext uri="{91240B29-F687-4f45-9708-019B960494DF}">
-                <a14:hiddenLine xmlns:a14="http://schemas.microsoft.com/office/drawing/2010/main" xmlns="" w="9525">
+                <a14:hiddenLine xmlns="" xmlns:a14="http://schemas.microsoft.com/office/drawing/2010/main" w="9525">
                   <a:solidFill>
                     <a:srgbClr val="000000"/>
                   </a:solidFill>
@@ -2789,7 +2789,7 @@
             </a:ln>
             <a:extLst>
               <a:ext uri="{91240B29-F687-4f45-9708-019B960494DF}">
-                <a14:hiddenLine xmlns:a14="http://schemas.microsoft.com/office/drawing/2010/main" xmlns="" w="9525">
+                <a14:hiddenLine xmlns="" xmlns:a14="http://schemas.microsoft.com/office/drawing/2010/main" w="9525">
                   <a:solidFill>
                     <a:srgbClr val="000000"/>
                   </a:solidFill>
@@ -2879,7 +2879,7 @@
             </a:ln>
             <a:extLst>
               <a:ext uri="{91240B29-F687-4f45-9708-019B960494DF}">
-                <a14:hiddenLine xmlns:a14="http://schemas.microsoft.com/office/drawing/2010/main" xmlns="" w="9525">
+                <a14:hiddenLine xmlns="" xmlns:a14="http://schemas.microsoft.com/office/drawing/2010/main" w="9525">
                   <a:solidFill>
                     <a:srgbClr val="000000"/>
                   </a:solidFill>
@@ -2941,7 +2941,7 @@
             </a:ln>
             <a:extLst>
               <a:ext uri="{91240B29-F687-4f45-9708-019B960494DF}">
-                <a14:hiddenLine xmlns:a14="http://schemas.microsoft.com/office/drawing/2010/main" xmlns="" w="9525">
+                <a14:hiddenLine xmlns="" xmlns:a14="http://schemas.microsoft.com/office/drawing/2010/main" w="9525">
                   <a:solidFill>
                     <a:srgbClr val="000000"/>
                   </a:solidFill>
@@ -3031,7 +3031,7 @@
             </a:ln>
             <a:extLst>
               <a:ext uri="{91240B29-F687-4f45-9708-019B960494DF}">
-                <a14:hiddenLine xmlns:a14="http://schemas.microsoft.com/office/drawing/2010/main" xmlns="" w="9525">
+                <a14:hiddenLine xmlns="" xmlns:a14="http://schemas.microsoft.com/office/drawing/2010/main" w="9525">
                   <a:solidFill>
                     <a:srgbClr val="000000"/>
                   </a:solidFill>
@@ -3121,7 +3121,7 @@
             </a:ln>
             <a:extLst>
               <a:ext uri="{91240B29-F687-4f45-9708-019B960494DF}">
-                <a14:hiddenLine xmlns:a14="http://schemas.microsoft.com/office/drawing/2010/main" xmlns="" w="9525">
+                <a14:hiddenLine xmlns="" xmlns:a14="http://schemas.microsoft.com/office/drawing/2010/main" w="9525">
                   <a:solidFill>
                     <a:srgbClr val="000000"/>
                   </a:solidFill>
@@ -3177,7 +3177,7 @@
             </a:ln>
             <a:extLst>
               <a:ext uri="{91240B29-F687-4f45-9708-019B960494DF}">
-                <a14:hiddenLine xmlns:a14="http://schemas.microsoft.com/office/drawing/2010/main" xmlns="" w="9525">
+                <a14:hiddenLine xmlns="" xmlns:a14="http://schemas.microsoft.com/office/drawing/2010/main" w="9525">
                   <a:solidFill>
                     <a:srgbClr val="000000"/>
                   </a:solidFill>
@@ -3267,7 +3267,7 @@
             </a:ln>
             <a:extLst>
               <a:ext uri="{91240B29-F687-4f45-9708-019B960494DF}">
-                <a14:hiddenLine xmlns:a14="http://schemas.microsoft.com/office/drawing/2010/main" xmlns="" w="9525">
+                <a14:hiddenLine xmlns="" xmlns:a14="http://schemas.microsoft.com/office/drawing/2010/main" w="9525">
                   <a:solidFill>
                     <a:srgbClr val="000000"/>
                   </a:solidFill>
@@ -3323,7 +3323,7 @@
             </a:ln>
             <a:extLst>
               <a:ext uri="{91240B29-F687-4f45-9708-019B960494DF}">
-                <a14:hiddenLine xmlns:a14="http://schemas.microsoft.com/office/drawing/2010/main" xmlns="" w="9525">
+                <a14:hiddenLine xmlns="" xmlns:a14="http://schemas.microsoft.com/office/drawing/2010/main" w="9525">
                   <a:solidFill>
                     <a:srgbClr val="000000"/>
                   </a:solidFill>
@@ -3413,7 +3413,7 @@
             </a:ln>
             <a:extLst>
               <a:ext uri="{91240B29-F687-4f45-9708-019B960494DF}">
-                <a14:hiddenLine xmlns:a14="http://schemas.microsoft.com/office/drawing/2010/main" xmlns="" w="9525">
+                <a14:hiddenLine xmlns="" xmlns:a14="http://schemas.microsoft.com/office/drawing/2010/main" w="9525">
                   <a:solidFill>
                     <a:srgbClr val="000000"/>
                   </a:solidFill>
@@ -3481,7 +3481,7 @@
             </a:ln>
             <a:extLst>
               <a:ext uri="{91240B29-F687-4f45-9708-019B960494DF}">
-                <a14:hiddenLine xmlns:a14="http://schemas.microsoft.com/office/drawing/2010/main" xmlns="" w="9525">
+                <a14:hiddenLine xmlns="" xmlns:a14="http://schemas.microsoft.com/office/drawing/2010/main" w="9525">
                   <a:solidFill>
                     <a:srgbClr val="000000"/>
                   </a:solidFill>
@@ -3571,7 +3571,7 @@
             </a:ln>
             <a:extLst>
               <a:ext uri="{91240B29-F687-4f45-9708-019B960494DF}">
-                <a14:hiddenLine xmlns:a14="http://schemas.microsoft.com/office/drawing/2010/main" xmlns="" w="9525">
+                <a14:hiddenLine xmlns="" xmlns:a14="http://schemas.microsoft.com/office/drawing/2010/main" w="9525">
                   <a:solidFill>
                     <a:srgbClr val="000000"/>
                   </a:solidFill>
@@ -3639,7 +3639,7 @@
             </a:ln>
             <a:extLst>
               <a:ext uri="{91240B29-F687-4f45-9708-019B960494DF}">
-                <a14:hiddenLine xmlns:a14="http://schemas.microsoft.com/office/drawing/2010/main" xmlns="" w="9525">
+                <a14:hiddenLine xmlns="" xmlns:a14="http://schemas.microsoft.com/office/drawing/2010/main" w="9525">
                   <a:solidFill>
                     <a:srgbClr val="000000"/>
                   </a:solidFill>
@@ -3729,7 +3729,7 @@
             </a:ln>
             <a:extLst>
               <a:ext uri="{91240B29-F687-4f45-9708-019B960494DF}">
-                <a14:hiddenLine xmlns:a14="http://schemas.microsoft.com/office/drawing/2010/main" xmlns="" w="9525">
+                <a14:hiddenLine xmlns="" xmlns:a14="http://schemas.microsoft.com/office/drawing/2010/main" w="9525">
                   <a:solidFill>
                     <a:srgbClr val="000000"/>
                   </a:solidFill>
@@ -3763,7 +3763,7 @@
             </a:ln>
             <a:extLst>
               <a:ext uri="{91240B29-F687-4f45-9708-019B960494DF}">
-                <a14:hiddenLine xmlns:a14="http://schemas.microsoft.com/office/drawing/2010/main" xmlns="" w="9525">
+                <a14:hiddenLine xmlns="" xmlns:a14="http://schemas.microsoft.com/office/drawing/2010/main" w="9525">
                   <a:solidFill>
                     <a:srgbClr val="000000"/>
                   </a:solidFill>
@@ -3853,7 +3853,7 @@
             </a:ln>
             <a:extLst>
               <a:ext uri="{91240B29-F687-4f45-9708-019B960494DF}">
-                <a14:hiddenLine xmlns:a14="http://schemas.microsoft.com/office/drawing/2010/main" xmlns="" w="9525">
+                <a14:hiddenLine xmlns="" xmlns:a14="http://schemas.microsoft.com/office/drawing/2010/main" w="9525">
                   <a:solidFill>
                     <a:srgbClr val="000000"/>
                   </a:solidFill>
@@ -3915,7 +3915,7 @@
             </a:ln>
             <a:extLst>
               <a:ext uri="{91240B29-F687-4f45-9708-019B960494DF}">
-                <a14:hiddenLine xmlns:a14="http://schemas.microsoft.com/office/drawing/2010/main" xmlns="" w="9525">
+                <a14:hiddenLine xmlns="" xmlns:a14="http://schemas.microsoft.com/office/drawing/2010/main" w="9525">
                   <a:solidFill>
                     <a:srgbClr val="000000"/>
                   </a:solidFill>
@@ -3977,7 +3977,7 @@
             </a:ln>
             <a:extLst>
               <a:ext uri="{91240B29-F687-4f45-9708-019B960494DF}">
-                <a14:hiddenLine xmlns:a14="http://schemas.microsoft.com/office/drawing/2010/main" xmlns="" w="9525">
+                <a14:hiddenLine xmlns="" xmlns:a14="http://schemas.microsoft.com/office/drawing/2010/main" w="9525">
                   <a:solidFill>
                     <a:srgbClr val="000000"/>
                   </a:solidFill>
@@ -4067,7 +4067,7 @@
             </a:ln>
             <a:extLst>
               <a:ext uri="{91240B29-F687-4f45-9708-019B960494DF}">
-                <a14:hiddenLine xmlns:a14="http://schemas.microsoft.com/office/drawing/2010/main" xmlns="" w="9525">
+                <a14:hiddenLine xmlns="" xmlns:a14="http://schemas.microsoft.com/office/drawing/2010/main" w="9525">
                   <a:solidFill>
                     <a:srgbClr val="000000"/>
                   </a:solidFill>
@@ -4135,7 +4135,7 @@
             </a:ln>
             <a:extLst>
               <a:ext uri="{91240B29-F687-4f45-9708-019B960494DF}">
-                <a14:hiddenLine xmlns:a14="http://schemas.microsoft.com/office/drawing/2010/main" xmlns="" w="9525">
+                <a14:hiddenLine xmlns="" xmlns:a14="http://schemas.microsoft.com/office/drawing/2010/main" w="9525">
                   <a:solidFill>
                     <a:srgbClr val="000000"/>
                   </a:solidFill>
@@ -4197,7 +4197,7 @@
             </a:ln>
             <a:extLst>
               <a:ext uri="{91240B29-F687-4f45-9708-019B960494DF}">
-                <a14:hiddenLine xmlns:a14="http://schemas.microsoft.com/office/drawing/2010/main" xmlns="" w="9525">
+                <a14:hiddenLine xmlns="" xmlns:a14="http://schemas.microsoft.com/office/drawing/2010/main" w="9525">
                   <a:solidFill>
                     <a:srgbClr val="000000"/>
                   </a:solidFill>
@@ -4287,7 +4287,7 @@
             </a:ln>
             <a:extLst>
               <a:ext uri="{91240B29-F687-4f45-9708-019B960494DF}">
-                <a14:hiddenLine xmlns:a14="http://schemas.microsoft.com/office/drawing/2010/main" xmlns="" w="9525">
+                <a14:hiddenLine xmlns="" xmlns:a14="http://schemas.microsoft.com/office/drawing/2010/main" w="9525">
                   <a:solidFill>
                     <a:srgbClr val="000000"/>
                   </a:solidFill>
@@ -4349,7 +4349,7 @@
             </a:ln>
             <a:extLst>
               <a:ext uri="{91240B29-F687-4f45-9708-019B960494DF}">
-                <a14:hiddenLine xmlns:a14="http://schemas.microsoft.com/office/drawing/2010/main" xmlns="" w="9525">
+                <a14:hiddenLine xmlns="" xmlns:a14="http://schemas.microsoft.com/office/drawing/2010/main" w="9525">
                   <a:solidFill>
                     <a:srgbClr val="000000"/>
                   </a:solidFill>
@@ -4439,7 +4439,7 @@
             </a:ln>
             <a:extLst>
               <a:ext uri="{91240B29-F687-4f45-9708-019B960494DF}">
-                <a14:hiddenLine xmlns:a14="http://schemas.microsoft.com/office/drawing/2010/main" xmlns="" w="9525">
+                <a14:hiddenLine xmlns="" xmlns:a14="http://schemas.microsoft.com/office/drawing/2010/main" w="9525">
                   <a:solidFill>
                     <a:srgbClr val="000000"/>
                   </a:solidFill>
@@ -4501,7 +4501,7 @@
             </a:ln>
             <a:extLst>
               <a:ext uri="{91240B29-F687-4f45-9708-019B960494DF}">
-                <a14:hiddenLine xmlns:a14="http://schemas.microsoft.com/office/drawing/2010/main" xmlns="" w="9525">
+                <a14:hiddenLine xmlns="" xmlns:a14="http://schemas.microsoft.com/office/drawing/2010/main" w="9525">
                   <a:solidFill>
                     <a:srgbClr val="000000"/>
                   </a:solidFill>
@@ -4591,7 +4591,7 @@
             </a:ln>
             <a:extLst>
               <a:ext uri="{91240B29-F687-4f45-9708-019B960494DF}">
-                <a14:hiddenLine xmlns:a14="http://schemas.microsoft.com/office/drawing/2010/main" xmlns="" w="9525">
+                <a14:hiddenLine xmlns="" xmlns:a14="http://schemas.microsoft.com/office/drawing/2010/main" w="9525">
                   <a:solidFill>
                     <a:srgbClr val="000000"/>
                   </a:solidFill>
@@ -4625,7 +4625,7 @@
             </a:ln>
             <a:extLst>
               <a:ext uri="{91240B29-F687-4f45-9708-019B960494DF}">
-                <a14:hiddenLine xmlns:a14="http://schemas.microsoft.com/office/drawing/2010/main" xmlns="" w="9525">
+                <a14:hiddenLine xmlns="" xmlns:a14="http://schemas.microsoft.com/office/drawing/2010/main" w="9525">
                   <a:solidFill>
                     <a:srgbClr val="000000"/>
                   </a:solidFill>
@@ -4690,7 +4690,7 @@
             </a:ln>
             <a:extLst>
               <a:ext uri="{91240B29-F687-4f45-9708-019B960494DF}">
-                <a14:hiddenLine xmlns:a14="http://schemas.microsoft.com/office/drawing/2010/main" xmlns="" w="9525">
+                <a14:hiddenLine xmlns="" xmlns:a14="http://schemas.microsoft.com/office/drawing/2010/main" w="9525">
                   <a:solidFill>
                     <a:srgbClr val="000000"/>
                   </a:solidFill>
@@ -4780,7 +4780,7 @@
             </a:ln>
             <a:extLst>
               <a:ext uri="{91240B29-F687-4f45-9708-019B960494DF}">
-                <a14:hiddenLine xmlns:a14="http://schemas.microsoft.com/office/drawing/2010/main" xmlns="" w="9525">
+                <a14:hiddenLine xmlns="" xmlns:a14="http://schemas.microsoft.com/office/drawing/2010/main" w="9525">
                   <a:solidFill>
                     <a:srgbClr val="000000"/>
                   </a:solidFill>
@@ -4842,7 +4842,7 @@
             </a:ln>
             <a:extLst>
               <a:ext uri="{91240B29-F687-4f45-9708-019B960494DF}">
-                <a14:hiddenLine xmlns:a14="http://schemas.microsoft.com/office/drawing/2010/main" xmlns="" w="9525">
+                <a14:hiddenLine xmlns="" xmlns:a14="http://schemas.microsoft.com/office/drawing/2010/main" w="9525">
                   <a:solidFill>
                     <a:srgbClr val="000000"/>
                   </a:solidFill>
@@ -4932,7 +4932,7 @@
             </a:ln>
             <a:extLst>
               <a:ext uri="{91240B29-F687-4f45-9708-019B960494DF}">
-                <a14:hiddenLine xmlns:a14="http://schemas.microsoft.com/office/drawing/2010/main" xmlns="" w="9525">
+                <a14:hiddenLine xmlns="" xmlns:a14="http://schemas.microsoft.com/office/drawing/2010/main" w="9525">
                   <a:solidFill>
                     <a:srgbClr val="000000"/>
                   </a:solidFill>
@@ -5022,7 +5022,7 @@
             </a:ln>
             <a:extLst>
               <a:ext uri="{91240B29-F687-4f45-9708-019B960494DF}">
-                <a14:hiddenLine xmlns:a14="http://schemas.microsoft.com/office/drawing/2010/main" xmlns="" w="9525">
+                <a14:hiddenLine xmlns="" xmlns:a14="http://schemas.microsoft.com/office/drawing/2010/main" w="9525">
                   <a:solidFill>
                     <a:srgbClr val="000000"/>
                   </a:solidFill>
@@ -5087,7 +5087,7 @@
             </a:ln>
             <a:extLst>
               <a:ext uri="{91240B29-F687-4f45-9708-019B960494DF}">
-                <a14:hiddenLine xmlns:a14="http://schemas.microsoft.com/office/drawing/2010/main" xmlns="" w="9525">
+                <a14:hiddenLine xmlns="" xmlns:a14="http://schemas.microsoft.com/office/drawing/2010/main" w="9525">
                   <a:solidFill>
                     <a:srgbClr val="000000"/>
                   </a:solidFill>
@@ -5149,7 +5149,7 @@
             </a:ln>
             <a:extLst>
               <a:ext uri="{91240B29-F687-4f45-9708-019B960494DF}">
-                <a14:hiddenLine xmlns:a14="http://schemas.microsoft.com/office/drawing/2010/main" xmlns="" w="9525">
+                <a14:hiddenLine xmlns="" xmlns:a14="http://schemas.microsoft.com/office/drawing/2010/main" w="9525">
                   <a:solidFill>
                     <a:srgbClr val="000000"/>
                   </a:solidFill>
@@ -5239,7 +5239,7 @@
             </a:ln>
             <a:extLst>
               <a:ext uri="{91240B29-F687-4f45-9708-019B960494DF}">
-                <a14:hiddenLine xmlns:a14="http://schemas.microsoft.com/office/drawing/2010/main" xmlns="" w="9525">
+                <a14:hiddenLine xmlns="" xmlns:a14="http://schemas.microsoft.com/office/drawing/2010/main" w="9525">
                   <a:solidFill>
                     <a:srgbClr val="000000"/>
                   </a:solidFill>
@@ -5329,7 +5329,7 @@
             </a:ln>
             <a:extLst>
               <a:ext uri="{91240B29-F687-4f45-9708-019B960494DF}">
-                <a14:hiddenLine xmlns:a14="http://schemas.microsoft.com/office/drawing/2010/main" xmlns="" w="9525">
+                <a14:hiddenLine xmlns="" xmlns:a14="http://schemas.microsoft.com/office/drawing/2010/main" w="9525">
                   <a:solidFill>
                     <a:srgbClr val="000000"/>
                   </a:solidFill>
@@ -5391,7 +5391,7 @@
             </a:ln>
             <a:extLst>
               <a:ext uri="{91240B29-F687-4f45-9708-019B960494DF}">
-                <a14:hiddenLine xmlns:a14="http://schemas.microsoft.com/office/drawing/2010/main" xmlns="" w="9525">
+                <a14:hiddenLine xmlns="" xmlns:a14="http://schemas.microsoft.com/office/drawing/2010/main" w="9525">
                   <a:solidFill>
                     <a:srgbClr val="000000"/>
                   </a:solidFill>
@@ -5511,7 +5511,7 @@
             </a:ln>
             <a:extLst>
               <a:ext uri="{91240B29-F687-4f45-9708-019B960494DF}">
-                <a14:hiddenLine xmlns:a14="http://schemas.microsoft.com/office/drawing/2010/main" xmlns="" w="9525">
+                <a14:hiddenLine xmlns="" xmlns:a14="http://schemas.microsoft.com/office/drawing/2010/main" w="9525">
                   <a:solidFill>
                     <a:srgbClr val="000000"/>
                   </a:solidFill>
@@ -5579,7 +5579,7 @@
             </a:ln>
             <a:extLst>
               <a:ext uri="{91240B29-F687-4f45-9708-019B960494DF}">
-                <a14:hiddenLine xmlns:a14="http://schemas.microsoft.com/office/drawing/2010/main" xmlns="" w="9525">
+                <a14:hiddenLine xmlns="" xmlns:a14="http://schemas.microsoft.com/office/drawing/2010/main" w="9525">
                   <a:solidFill>
                     <a:srgbClr val="000000"/>
                   </a:solidFill>
@@ -5669,7 +5669,7 @@
             </a:ln>
             <a:extLst>
               <a:ext uri="{91240B29-F687-4f45-9708-019B960494DF}">
-                <a14:hiddenLine xmlns:a14="http://schemas.microsoft.com/office/drawing/2010/main" xmlns="" w="9525">
+                <a14:hiddenLine xmlns="" xmlns:a14="http://schemas.microsoft.com/office/drawing/2010/main" w="9525">
                   <a:solidFill>
                     <a:srgbClr val="000000"/>
                   </a:solidFill>
@@ -10398,7 +10398,7 @@
           <a:noFill/>
           <a:extLst>
             <a:ext uri="{909E8E84-426E-40dd-AFC4-6F175D3DCCD1}">
-              <a14:hiddenFill xmlns:a14="http://schemas.microsoft.com/office/drawing/2010/main" xmlns="">
+              <a14:hiddenFill xmlns="" xmlns:a14="http://schemas.microsoft.com/office/drawing/2010/main">
                 <a:solidFill>
                   <a:srgbClr val="FFFFFF"/>
                 </a:solidFill>
@@ -10472,7 +10472,7 @@
               </a:ln>
               <a:extLst>
                 <a:ext uri="{91240B29-F687-4f45-9708-019B960494DF}">
-                  <a14:hiddenLine xmlns:a14="http://schemas.microsoft.com/office/drawing/2010/main" xmlns="" w="9525">
+                  <a14:hiddenLine xmlns="" xmlns:a14="http://schemas.microsoft.com/office/drawing/2010/main" w="9525">
                     <a:solidFill>
                       <a:srgbClr val="000000"/>
                     </a:solidFill>
@@ -10562,7 +10562,7 @@
               </a:ln>
               <a:extLst>
                 <a:ext uri="{91240B29-F687-4f45-9708-019B960494DF}">
-                  <a14:hiddenLine xmlns:a14="http://schemas.microsoft.com/office/drawing/2010/main" xmlns="" w="9525">
+                  <a14:hiddenLine xmlns="" xmlns:a14="http://schemas.microsoft.com/office/drawing/2010/main" w="9525">
                     <a:solidFill>
                       <a:srgbClr val="000000"/>
                     </a:solidFill>
@@ -10652,7 +10652,7 @@
               </a:ln>
               <a:extLst>
                 <a:ext uri="{91240B29-F687-4f45-9708-019B960494DF}">
-                  <a14:hiddenLine xmlns:a14="http://schemas.microsoft.com/office/drawing/2010/main" xmlns="" w="9525">
+                  <a14:hiddenLine xmlns="" xmlns:a14="http://schemas.microsoft.com/office/drawing/2010/main" w="9525">
                     <a:solidFill>
                       <a:srgbClr val="000000"/>
                     </a:solidFill>
@@ -10714,7 +10714,7 @@
               </a:ln>
               <a:extLst>
                 <a:ext uri="{91240B29-F687-4f45-9708-019B960494DF}">
-                  <a14:hiddenLine xmlns:a14="http://schemas.microsoft.com/office/drawing/2010/main" xmlns="" w="9525">
+                  <a14:hiddenLine xmlns="" xmlns:a14="http://schemas.microsoft.com/office/drawing/2010/main" w="9525">
                     <a:solidFill>
                       <a:srgbClr val="000000"/>
                     </a:solidFill>
@@ -10804,7 +10804,7 @@
               </a:ln>
               <a:extLst>
                 <a:ext uri="{91240B29-F687-4f45-9708-019B960494DF}">
-                  <a14:hiddenLine xmlns:a14="http://schemas.microsoft.com/office/drawing/2010/main" xmlns="" w="9525">
+                  <a14:hiddenLine xmlns="" xmlns:a14="http://schemas.microsoft.com/office/drawing/2010/main" w="9525">
                     <a:solidFill>
                       <a:srgbClr val="000000"/>
                     </a:solidFill>
@@ -10866,7 +10866,7 @@
               </a:ln>
               <a:extLst>
                 <a:ext uri="{91240B29-F687-4f45-9708-019B960494DF}">
-                  <a14:hiddenLine xmlns:a14="http://schemas.microsoft.com/office/drawing/2010/main" xmlns="" w="9525">
+                  <a14:hiddenLine xmlns="" xmlns:a14="http://schemas.microsoft.com/office/drawing/2010/main" w="9525">
                     <a:solidFill>
                       <a:srgbClr val="000000"/>
                     </a:solidFill>
@@ -10928,7 +10928,7 @@
               </a:ln>
               <a:extLst>
                 <a:ext uri="{91240B29-F687-4f45-9708-019B960494DF}">
-                  <a14:hiddenLine xmlns:a14="http://schemas.microsoft.com/office/drawing/2010/main" xmlns="" w="9525">
+                  <a14:hiddenLine xmlns="" xmlns:a14="http://schemas.microsoft.com/office/drawing/2010/main" w="9525">
                     <a:solidFill>
                       <a:srgbClr val="000000"/>
                     </a:solidFill>
@@ -11018,7 +11018,7 @@
               </a:ln>
               <a:extLst>
                 <a:ext uri="{91240B29-F687-4f45-9708-019B960494DF}">
-                  <a14:hiddenLine xmlns:a14="http://schemas.microsoft.com/office/drawing/2010/main" xmlns="" w="9525">
+                  <a14:hiddenLine xmlns="" xmlns:a14="http://schemas.microsoft.com/office/drawing/2010/main" w="9525">
                     <a:solidFill>
                       <a:srgbClr val="000000"/>
                     </a:solidFill>
@@ -11108,7 +11108,7 @@
               </a:ln>
               <a:extLst>
                 <a:ext uri="{91240B29-F687-4f45-9708-019B960494DF}">
-                  <a14:hiddenLine xmlns:a14="http://schemas.microsoft.com/office/drawing/2010/main" xmlns="" w="9525">
+                  <a14:hiddenLine xmlns="" xmlns:a14="http://schemas.microsoft.com/office/drawing/2010/main" w="9525">
                     <a:solidFill>
                       <a:srgbClr val="000000"/>
                     </a:solidFill>
@@ -11170,7 +11170,7 @@
               </a:ln>
               <a:extLst>
                 <a:ext uri="{91240B29-F687-4f45-9708-019B960494DF}">
-                  <a14:hiddenLine xmlns:a14="http://schemas.microsoft.com/office/drawing/2010/main" xmlns="" w="9525">
+                  <a14:hiddenLine xmlns="" xmlns:a14="http://schemas.microsoft.com/office/drawing/2010/main" w="9525">
                     <a:solidFill>
                       <a:srgbClr val="000000"/>
                     </a:solidFill>
@@ -11280,7 +11280,7 @@
               </a:ln>
               <a:extLst>
                 <a:ext uri="{91240B29-F687-4f45-9708-019B960494DF}">
-                  <a14:hiddenLine xmlns:a14="http://schemas.microsoft.com/office/drawing/2010/main" xmlns="" w="9525">
+                  <a14:hiddenLine xmlns="" xmlns:a14="http://schemas.microsoft.com/office/drawing/2010/main" w="9525">
                     <a:solidFill>
                       <a:srgbClr val="000000"/>
                     </a:solidFill>
@@ -11364,7 +11364,7 @@
               </a:ln>
               <a:extLst>
                 <a:ext uri="{91240B29-F687-4f45-9708-019B960494DF}">
-                  <a14:hiddenLine xmlns:a14="http://schemas.microsoft.com/office/drawing/2010/main" xmlns="" w="9525">
+                  <a14:hiddenLine xmlns="" xmlns:a14="http://schemas.microsoft.com/office/drawing/2010/main" w="9525">
                     <a:solidFill>
                       <a:srgbClr val="000000"/>
                     </a:solidFill>
@@ -11426,7 +11426,7 @@
               </a:ln>
               <a:extLst>
                 <a:ext uri="{91240B29-F687-4f45-9708-019B960494DF}">
-                  <a14:hiddenLine xmlns:a14="http://schemas.microsoft.com/office/drawing/2010/main" xmlns="" w="9525">
+                  <a14:hiddenLine xmlns="" xmlns:a14="http://schemas.microsoft.com/office/drawing/2010/main" w="9525">
                     <a:solidFill>
                       <a:srgbClr val="000000"/>
                     </a:solidFill>
@@ -11488,7 +11488,7 @@
               </a:ln>
               <a:extLst>
                 <a:ext uri="{91240B29-F687-4f45-9708-019B960494DF}">
-                  <a14:hiddenLine xmlns:a14="http://schemas.microsoft.com/office/drawing/2010/main" xmlns="" w="9525">
+                  <a14:hiddenLine xmlns="" xmlns:a14="http://schemas.microsoft.com/office/drawing/2010/main" w="9525">
                     <a:solidFill>
                       <a:srgbClr val="000000"/>
                     </a:solidFill>
@@ -11578,7 +11578,7 @@
               </a:ln>
               <a:extLst>
                 <a:ext uri="{91240B29-F687-4f45-9708-019B960494DF}">
-                  <a14:hiddenLine xmlns:a14="http://schemas.microsoft.com/office/drawing/2010/main" xmlns="" w="9525">
+                  <a14:hiddenLine xmlns="" xmlns:a14="http://schemas.microsoft.com/office/drawing/2010/main" w="9525">
                     <a:solidFill>
                       <a:srgbClr val="000000"/>
                     </a:solidFill>
@@ -11612,7 +11612,7 @@
               </a:ln>
               <a:extLst>
                 <a:ext uri="{91240B29-F687-4f45-9708-019B960494DF}">
-                  <a14:hiddenLine xmlns:a14="http://schemas.microsoft.com/office/drawing/2010/main" xmlns="" w="9525">
+                  <a14:hiddenLine xmlns="" xmlns:a14="http://schemas.microsoft.com/office/drawing/2010/main" w="9525">
                     <a:solidFill>
                       <a:srgbClr val="000000"/>
                     </a:solidFill>
@@ -11677,7 +11677,7 @@
               </a:ln>
               <a:extLst>
                 <a:ext uri="{91240B29-F687-4f45-9708-019B960494DF}">
-                  <a14:hiddenLine xmlns:a14="http://schemas.microsoft.com/office/drawing/2010/main" xmlns="" w="9525">
+                  <a14:hiddenLine xmlns="" xmlns:a14="http://schemas.microsoft.com/office/drawing/2010/main" w="9525">
                     <a:solidFill>
                       <a:srgbClr val="000000"/>
                     </a:solidFill>
@@ -11767,7 +11767,7 @@
               </a:ln>
               <a:extLst>
                 <a:ext uri="{91240B29-F687-4f45-9708-019B960494DF}">
-                  <a14:hiddenLine xmlns:a14="http://schemas.microsoft.com/office/drawing/2010/main" xmlns="" w="9525">
+                  <a14:hiddenLine xmlns="" xmlns:a14="http://schemas.microsoft.com/office/drawing/2010/main" w="9525">
                     <a:solidFill>
                       <a:srgbClr val="000000"/>
                     </a:solidFill>
@@ -11829,7 +11829,7 @@
               </a:ln>
               <a:extLst>
                 <a:ext uri="{91240B29-F687-4f45-9708-019B960494DF}">
-                  <a14:hiddenLine xmlns:a14="http://schemas.microsoft.com/office/drawing/2010/main" xmlns="" w="9525">
+                  <a14:hiddenLine xmlns="" xmlns:a14="http://schemas.microsoft.com/office/drawing/2010/main" w="9525">
                     <a:solidFill>
                       <a:srgbClr val="000000"/>
                     </a:solidFill>
@@ -11919,7 +11919,7 @@
               </a:ln>
               <a:extLst>
                 <a:ext uri="{91240B29-F687-4f45-9708-019B960494DF}">
-                  <a14:hiddenLine xmlns:a14="http://schemas.microsoft.com/office/drawing/2010/main" xmlns="" w="9525">
+                  <a14:hiddenLine xmlns="" xmlns:a14="http://schemas.microsoft.com/office/drawing/2010/main" w="9525">
                     <a:solidFill>
                       <a:srgbClr val="000000"/>
                     </a:solidFill>
@@ -11984,7 +11984,7 @@
               </a:ln>
               <a:extLst>
                 <a:ext uri="{91240B29-F687-4f45-9708-019B960494DF}">
-                  <a14:hiddenLine xmlns:a14="http://schemas.microsoft.com/office/drawing/2010/main" xmlns="" w="9525">
+                  <a14:hiddenLine xmlns="" xmlns:a14="http://schemas.microsoft.com/office/drawing/2010/main" w="9525">
                     <a:solidFill>
                       <a:srgbClr val="000000"/>
                     </a:solidFill>
@@ -12046,7 +12046,7 @@
               </a:ln>
               <a:extLst>
                 <a:ext uri="{91240B29-F687-4f45-9708-019B960494DF}">
-                  <a14:hiddenLine xmlns:a14="http://schemas.microsoft.com/office/drawing/2010/main" xmlns="" w="9525">
+                  <a14:hiddenLine xmlns="" xmlns:a14="http://schemas.microsoft.com/office/drawing/2010/main" w="9525">
                     <a:solidFill>
                       <a:srgbClr val="000000"/>
                     </a:solidFill>
@@ -12136,7 +12136,7 @@
               </a:ln>
               <a:extLst>
                 <a:ext uri="{91240B29-F687-4f45-9708-019B960494DF}">
-                  <a14:hiddenLine xmlns:a14="http://schemas.microsoft.com/office/drawing/2010/main" xmlns="" w="9525">
+                  <a14:hiddenLine xmlns="" xmlns:a14="http://schemas.microsoft.com/office/drawing/2010/main" w="9525">
                     <a:solidFill>
                       <a:srgbClr val="000000"/>
                     </a:solidFill>
@@ -12226,7 +12226,7 @@
               </a:ln>
               <a:extLst>
                 <a:ext uri="{91240B29-F687-4f45-9708-019B960494DF}">
-                  <a14:hiddenLine xmlns:a14="http://schemas.microsoft.com/office/drawing/2010/main" xmlns="" w="9525">
+                  <a14:hiddenLine xmlns="" xmlns:a14="http://schemas.microsoft.com/office/drawing/2010/main" w="9525">
                     <a:solidFill>
                       <a:srgbClr val="000000"/>
                     </a:solidFill>
@@ -12291,7 +12291,7 @@
               </a:ln>
               <a:extLst>
                 <a:ext uri="{91240B29-F687-4f45-9708-019B960494DF}">
-                  <a14:hiddenLine xmlns:a14="http://schemas.microsoft.com/office/drawing/2010/main" xmlns="" w="9525">
+                  <a14:hiddenLine xmlns="" xmlns:a14="http://schemas.microsoft.com/office/drawing/2010/main" w="9525">
                     <a:solidFill>
                       <a:srgbClr val="000000"/>
                     </a:solidFill>
@@ -12411,7 +12411,7 @@
               </a:ln>
               <a:extLst>
                 <a:ext uri="{91240B29-F687-4f45-9708-019B960494DF}">
-                  <a14:hiddenLine xmlns:a14="http://schemas.microsoft.com/office/drawing/2010/main" xmlns="" w="9525">
+                  <a14:hiddenLine xmlns="" xmlns:a14="http://schemas.microsoft.com/office/drawing/2010/main" w="9525">
                     <a:solidFill>
                       <a:srgbClr val="000000"/>
                     </a:solidFill>
@@ -12492,7 +12492,7 @@
               </a:ln>
               <a:extLst>
                 <a:ext uri="{91240B29-F687-4f45-9708-019B960494DF}">
-                  <a14:hiddenLine xmlns:a14="http://schemas.microsoft.com/office/drawing/2010/main" xmlns="" w="9525">
+                  <a14:hiddenLine xmlns="" xmlns:a14="http://schemas.microsoft.com/office/drawing/2010/main" w="9525">
                     <a:solidFill>
                       <a:srgbClr val="000000"/>
                     </a:solidFill>
@@ -12607,7 +12607,7 @@
               </a:ln>
               <a:extLst>
                 <a:ext uri="{91240B29-F687-4f45-9708-019B960494DF}">
-                  <a14:hiddenLine xmlns:a14="http://schemas.microsoft.com/office/drawing/2010/main" xmlns="" w="9525">
+                  <a14:hiddenLine xmlns="" xmlns:a14="http://schemas.microsoft.com/office/drawing/2010/main" w="9525">
                     <a:solidFill>
                       <a:srgbClr val="000000"/>
                     </a:solidFill>
@@ -12697,7 +12697,7 @@
               </a:ln>
               <a:extLst>
                 <a:ext uri="{91240B29-F687-4f45-9708-019B960494DF}">
-                  <a14:hiddenLine xmlns:a14="http://schemas.microsoft.com/office/drawing/2010/main" xmlns="" w="9525">
+                  <a14:hiddenLine xmlns="" xmlns:a14="http://schemas.microsoft.com/office/drawing/2010/main" w="9525">
                     <a:solidFill>
                       <a:srgbClr val="000000"/>
                     </a:solidFill>
@@ -12762,7 +12762,7 @@
               </a:ln>
               <a:extLst>
                 <a:ext uri="{91240B29-F687-4f45-9708-019B960494DF}">
-                  <a14:hiddenLine xmlns:a14="http://schemas.microsoft.com/office/drawing/2010/main" xmlns="" w="9525">
+                  <a14:hiddenLine xmlns="" xmlns:a14="http://schemas.microsoft.com/office/drawing/2010/main" w="9525">
                     <a:solidFill>
                       <a:srgbClr val="000000"/>
                     </a:solidFill>
@@ -12852,7 +12852,7 @@
               </a:ln>
               <a:extLst>
                 <a:ext uri="{91240B29-F687-4f45-9708-019B960494DF}">
-                  <a14:hiddenLine xmlns:a14="http://schemas.microsoft.com/office/drawing/2010/main" xmlns="" w="9525">
+                  <a14:hiddenLine xmlns="" xmlns:a14="http://schemas.microsoft.com/office/drawing/2010/main" w="9525">
                     <a:solidFill>
                       <a:srgbClr val="000000"/>
                     </a:solidFill>
@@ -12920,7 +12920,7 @@
               </a:ln>
               <a:extLst>
                 <a:ext uri="{91240B29-F687-4f45-9708-019B960494DF}">
-                  <a14:hiddenLine xmlns:a14="http://schemas.microsoft.com/office/drawing/2010/main" xmlns="" w="9525">
+                  <a14:hiddenLine xmlns="" xmlns:a14="http://schemas.microsoft.com/office/drawing/2010/main" w="9525">
                     <a:solidFill>
                       <a:srgbClr val="000000"/>
                     </a:solidFill>
@@ -13010,7 +13010,7 @@
               </a:ln>
               <a:extLst>
                 <a:ext uri="{91240B29-F687-4f45-9708-019B960494DF}">
-                  <a14:hiddenLine xmlns:a14="http://schemas.microsoft.com/office/drawing/2010/main" xmlns="" w="9525">
+                  <a14:hiddenLine xmlns="" xmlns:a14="http://schemas.microsoft.com/office/drawing/2010/main" w="9525">
                     <a:solidFill>
                       <a:srgbClr val="000000"/>
                     </a:solidFill>
@@ -13078,7 +13078,7 @@
               </a:ln>
               <a:extLst>
                 <a:ext uri="{91240B29-F687-4f45-9708-019B960494DF}">
-                  <a14:hiddenLine xmlns:a14="http://schemas.microsoft.com/office/drawing/2010/main" xmlns="" w="9525">
+                  <a14:hiddenLine xmlns="" xmlns:a14="http://schemas.microsoft.com/office/drawing/2010/main" w="9525">
                     <a:solidFill>
                       <a:srgbClr val="000000"/>
                     </a:solidFill>
@@ -13168,7 +13168,7 @@
               </a:ln>
               <a:extLst>
                 <a:ext uri="{91240B29-F687-4f45-9708-019B960494DF}">
-                  <a14:hiddenLine xmlns:a14="http://schemas.microsoft.com/office/drawing/2010/main" xmlns="" w="9525">
+                  <a14:hiddenLine xmlns="" xmlns:a14="http://schemas.microsoft.com/office/drawing/2010/main" w="9525">
                     <a:solidFill>
                       <a:srgbClr val="000000"/>
                     </a:solidFill>
@@ -13202,7 +13202,7 @@
               </a:ln>
               <a:extLst>
                 <a:ext uri="{91240B29-F687-4f45-9708-019B960494DF}">
-                  <a14:hiddenLine xmlns:a14="http://schemas.microsoft.com/office/drawing/2010/main" xmlns="" w="9525">
+                  <a14:hiddenLine xmlns="" xmlns:a14="http://schemas.microsoft.com/office/drawing/2010/main" w="9525">
                     <a:solidFill>
                       <a:srgbClr val="000000"/>
                     </a:solidFill>
@@ -15138,10 +15138,10 @@
       </p:sp>
       <p:pic>
         <p:nvPicPr>
-          <p:cNvPr id="6" name="Marcador de contenido 5" descr="Diagrama&#10;&#10;Descripción generada automáticamente">
+          <p:cNvPr id="7" name="Marcador de contenido 6" descr="Diagrama&#10;&#10;Descripción generada automáticamente">
             <a:extLst>
               <a:ext uri="{FF2B5EF4-FFF2-40B4-BE49-F238E27FC236}">
-                <a16:creationId xmlns:a16="http://schemas.microsoft.com/office/drawing/2014/main" id="{42FDF08F-2853-4C18-9C9B-6BDCB586D80D}"/>
+                <a16:creationId xmlns:a16="http://schemas.microsoft.com/office/drawing/2014/main" id="{30CE64B7-A08E-0461-C7EF-54588186EF5C}"/>
               </a:ext>
             </a:extLst>
           </p:cNvPr>
@@ -15160,8 +15160,8 @@
         </p:blipFill>
         <p:spPr>
           <a:xfrm>
-            <a:off x="2677139" y="867008"/>
-            <a:ext cx="6837721" cy="5651991"/>
+            <a:off x="1321939" y="1013422"/>
+            <a:ext cx="8205095" cy="5661610"/>
           </a:xfrm>
         </p:spPr>
       </p:pic>
@@ -15251,7 +15251,7 @@
           <a:noFill/>
           <a:extLst>
             <a:ext uri="{909E8E84-426E-40dd-AFC4-6F175D3DCCD1}">
-              <a14:hiddenFill xmlns:a14="http://schemas.microsoft.com/office/drawing/2010/main" xmlns:a16="http://schemas.microsoft.com/office/drawing/2014/main" xmlns="">
+              <a14:hiddenFill xmlns="" xmlns:a16="http://schemas.microsoft.com/office/drawing/2014/main" xmlns:a14="http://schemas.microsoft.com/office/drawing/2010/main">
                 <a:solidFill>
                   <a:srgbClr val="FFFFFF"/>
                 </a:solidFill>
@@ -15343,7 +15343,7 @@
             </a:ln>
             <a:extLst>
               <a:ext uri="{91240B29-F687-4f45-9708-019B960494DF}">
-                <a14:hiddenLine xmlns:a14="http://schemas.microsoft.com/office/drawing/2010/main" xmlns:a16="http://schemas.microsoft.com/office/drawing/2014/main" xmlns="" w="9525">
+                <a14:hiddenLine xmlns="" xmlns:a16="http://schemas.microsoft.com/office/drawing/2014/main" xmlns:a14="http://schemas.microsoft.com/office/drawing/2010/main" w="9525">
                   <a:solidFill>
                     <a:srgbClr val="000000"/>
                   </a:solidFill>
@@ -15448,7 +15448,7 @@
             </a:ln>
             <a:extLst>
               <a:ext uri="{91240B29-F687-4f45-9708-019B960494DF}">
-                <a14:hiddenLine xmlns:a14="http://schemas.microsoft.com/office/drawing/2010/main" xmlns:a16="http://schemas.microsoft.com/office/drawing/2014/main" xmlns="" w="9525">
+                <a14:hiddenLine xmlns="" xmlns:a16="http://schemas.microsoft.com/office/drawing/2014/main" xmlns:a14="http://schemas.microsoft.com/office/drawing/2010/main" w="9525">
                   <a:solidFill>
                     <a:srgbClr val="000000"/>
                   </a:solidFill>
@@ -15553,7 +15553,7 @@
             </a:ln>
             <a:extLst>
               <a:ext uri="{91240B29-F687-4f45-9708-019B960494DF}">
-                <a14:hiddenLine xmlns:a14="http://schemas.microsoft.com/office/drawing/2010/main" xmlns:a16="http://schemas.microsoft.com/office/drawing/2014/main" xmlns="" w="9525">
+                <a14:hiddenLine xmlns="" xmlns:a16="http://schemas.microsoft.com/office/drawing/2014/main" xmlns:a14="http://schemas.microsoft.com/office/drawing/2010/main" w="9525">
                   <a:solidFill>
                     <a:srgbClr val="000000"/>
                   </a:solidFill>
@@ -15602,7 +15602,7 @@
             </a:ln>
             <a:extLst>
               <a:ext uri="{91240B29-F687-4f45-9708-019B960494DF}">
-                <a14:hiddenLine xmlns:a14="http://schemas.microsoft.com/office/drawing/2010/main" xmlns:a16="http://schemas.microsoft.com/office/drawing/2014/main" xmlns="" w="9525">
+                <a14:hiddenLine xmlns="" xmlns:a16="http://schemas.microsoft.com/office/drawing/2014/main" xmlns:a14="http://schemas.microsoft.com/office/drawing/2010/main" w="9525">
                   <a:solidFill>
                     <a:srgbClr val="000000"/>
                   </a:solidFill>
@@ -15707,7 +15707,7 @@
             </a:ln>
             <a:extLst>
               <a:ext uri="{91240B29-F687-4f45-9708-019B960494DF}">
-                <a14:hiddenLine xmlns:a14="http://schemas.microsoft.com/office/drawing/2010/main" xmlns:a16="http://schemas.microsoft.com/office/drawing/2014/main" xmlns="" w="9525">
+                <a14:hiddenLine xmlns="" xmlns:a16="http://schemas.microsoft.com/office/drawing/2014/main" xmlns:a14="http://schemas.microsoft.com/office/drawing/2010/main" w="9525">
                   <a:solidFill>
                     <a:srgbClr val="000000"/>
                   </a:solidFill>
@@ -15784,7 +15784,7 @@
             </a:ln>
             <a:extLst>
               <a:ext uri="{91240B29-F687-4f45-9708-019B960494DF}">
-                <a14:hiddenLine xmlns:a14="http://schemas.microsoft.com/office/drawing/2010/main" xmlns:a16="http://schemas.microsoft.com/office/drawing/2014/main" xmlns="" w="9525">
+                <a14:hiddenLine xmlns="" xmlns:a16="http://schemas.microsoft.com/office/drawing/2014/main" xmlns:a14="http://schemas.microsoft.com/office/drawing/2010/main" w="9525">
                   <a:solidFill>
                     <a:srgbClr val="000000"/>
                   </a:solidFill>
@@ -15861,7 +15861,7 @@
             </a:ln>
             <a:extLst>
               <a:ext uri="{91240B29-F687-4f45-9708-019B960494DF}">
-                <a14:hiddenLine xmlns:a14="http://schemas.microsoft.com/office/drawing/2010/main" xmlns:a16="http://schemas.microsoft.com/office/drawing/2014/main" xmlns="" w="9525">
+                <a14:hiddenLine xmlns="" xmlns:a16="http://schemas.microsoft.com/office/drawing/2014/main" xmlns:a14="http://schemas.microsoft.com/office/drawing/2010/main" w="9525">
                   <a:solidFill>
                     <a:srgbClr val="000000"/>
                   </a:solidFill>
@@ -15966,7 +15966,7 @@
             </a:ln>
             <a:extLst>
               <a:ext uri="{91240B29-F687-4f45-9708-019B960494DF}">
-                <a14:hiddenLine xmlns:a14="http://schemas.microsoft.com/office/drawing/2010/main" xmlns:a16="http://schemas.microsoft.com/office/drawing/2014/main" xmlns="" w="9525">
+                <a14:hiddenLine xmlns="" xmlns:a16="http://schemas.microsoft.com/office/drawing/2014/main" xmlns:a14="http://schemas.microsoft.com/office/drawing/2010/main" w="9525">
                   <a:solidFill>
                     <a:srgbClr val="000000"/>
                   </a:solidFill>
@@ -16043,7 +16043,7 @@
             </a:ln>
             <a:extLst>
               <a:ext uri="{91240B29-F687-4f45-9708-019B960494DF}">
-                <a14:hiddenLine xmlns:a14="http://schemas.microsoft.com/office/drawing/2010/main" xmlns:a16="http://schemas.microsoft.com/office/drawing/2014/main" xmlns="" w="9525">
+                <a14:hiddenLine xmlns="" xmlns:a16="http://schemas.microsoft.com/office/drawing/2014/main" xmlns:a14="http://schemas.microsoft.com/office/drawing/2010/main" w="9525">
                   <a:solidFill>
                     <a:srgbClr val="000000"/>
                   </a:solidFill>
@@ -16120,7 +16120,7 @@
             </a:ln>
             <a:extLst>
               <a:ext uri="{91240B29-F687-4f45-9708-019B960494DF}">
-                <a14:hiddenLine xmlns:a14="http://schemas.microsoft.com/office/drawing/2010/main" xmlns:a16="http://schemas.microsoft.com/office/drawing/2014/main" xmlns="" w="9525">
+                <a14:hiddenLine xmlns="" xmlns:a16="http://schemas.microsoft.com/office/drawing/2014/main" xmlns:a14="http://schemas.microsoft.com/office/drawing/2010/main" w="9525">
                   <a:solidFill>
                     <a:srgbClr val="000000"/>
                   </a:solidFill>
@@ -16225,7 +16225,7 @@
             </a:ln>
             <a:extLst>
               <a:ext uri="{91240B29-F687-4f45-9708-019B960494DF}">
-                <a14:hiddenLine xmlns:a14="http://schemas.microsoft.com/office/drawing/2010/main" xmlns:a16="http://schemas.microsoft.com/office/drawing/2014/main" xmlns="" w="9525">
+                <a14:hiddenLine xmlns="" xmlns:a16="http://schemas.microsoft.com/office/drawing/2014/main" xmlns:a14="http://schemas.microsoft.com/office/drawing/2010/main" w="9525">
                   <a:solidFill>
                     <a:srgbClr val="000000"/>
                   </a:solidFill>
@@ -16330,7 +16330,7 @@
             </a:ln>
             <a:extLst>
               <a:ext uri="{91240B29-F687-4f45-9708-019B960494DF}">
-                <a14:hiddenLine xmlns:a14="http://schemas.microsoft.com/office/drawing/2010/main" xmlns:a16="http://schemas.microsoft.com/office/drawing/2014/main" xmlns="" w="9525">
+                <a14:hiddenLine xmlns="" xmlns:a16="http://schemas.microsoft.com/office/drawing/2014/main" xmlns:a14="http://schemas.microsoft.com/office/drawing/2010/main" w="9525">
                   <a:solidFill>
                     <a:srgbClr val="000000"/>
                   </a:solidFill>
@@ -16407,7 +16407,7 @@
             </a:ln>
             <a:extLst>
               <a:ext uri="{91240B29-F687-4f45-9708-019B960494DF}">
-                <a14:hiddenLine xmlns:a14="http://schemas.microsoft.com/office/drawing/2010/main" xmlns:a16="http://schemas.microsoft.com/office/drawing/2014/main" xmlns="" w="9525">
+                <a14:hiddenLine xmlns="" xmlns:a16="http://schemas.microsoft.com/office/drawing/2014/main" xmlns:a14="http://schemas.microsoft.com/office/drawing/2010/main" w="9525">
                   <a:solidFill>
                     <a:srgbClr val="000000"/>
                   </a:solidFill>
@@ -16532,7 +16532,7 @@
             </a:ln>
             <a:extLst>
               <a:ext uri="{91240B29-F687-4f45-9708-019B960494DF}">
-                <a14:hiddenLine xmlns:a14="http://schemas.microsoft.com/office/drawing/2010/main" xmlns:a16="http://schemas.microsoft.com/office/drawing/2014/main" xmlns="" w="9525">
+                <a14:hiddenLine xmlns="" xmlns:a16="http://schemas.microsoft.com/office/drawing/2014/main" xmlns:a14="http://schemas.microsoft.com/office/drawing/2010/main" w="9525">
                   <a:solidFill>
                     <a:srgbClr val="000000"/>
                   </a:solidFill>
@@ -16609,7 +16609,7 @@
             </a:ln>
             <a:extLst>
               <a:ext uri="{91240B29-F687-4f45-9708-019B960494DF}">
-                <a14:hiddenLine xmlns:a14="http://schemas.microsoft.com/office/drawing/2010/main" xmlns:a16="http://schemas.microsoft.com/office/drawing/2014/main" xmlns="" w="9525">
+                <a14:hiddenLine xmlns="" xmlns:a16="http://schemas.microsoft.com/office/drawing/2014/main" xmlns:a14="http://schemas.microsoft.com/office/drawing/2010/main" w="9525">
                   <a:solidFill>
                     <a:srgbClr val="000000"/>
                   </a:solidFill>
@@ -16714,7 +16714,7 @@
             </a:ln>
             <a:extLst>
               <a:ext uri="{91240B29-F687-4f45-9708-019B960494DF}">
-                <a14:hiddenLine xmlns:a14="http://schemas.microsoft.com/office/drawing/2010/main" xmlns:a16="http://schemas.microsoft.com/office/drawing/2014/main" xmlns="" w="9525">
+                <a14:hiddenLine xmlns="" xmlns:a16="http://schemas.microsoft.com/office/drawing/2014/main" xmlns:a14="http://schemas.microsoft.com/office/drawing/2010/main" w="9525">
                   <a:solidFill>
                     <a:srgbClr val="000000"/>
                   </a:solidFill>
@@ -16819,7 +16819,7 @@
             </a:ln>
             <a:extLst>
               <a:ext uri="{91240B29-F687-4f45-9708-019B960494DF}">
-                <a14:hiddenLine xmlns:a14="http://schemas.microsoft.com/office/drawing/2010/main" xmlns:a16="http://schemas.microsoft.com/office/drawing/2014/main" xmlns="" w="9525">
+                <a14:hiddenLine xmlns="" xmlns:a16="http://schemas.microsoft.com/office/drawing/2014/main" xmlns:a14="http://schemas.microsoft.com/office/drawing/2010/main" w="9525">
                   <a:solidFill>
                     <a:srgbClr val="000000"/>
                   </a:solidFill>
@@ -16896,7 +16896,7 @@
             </a:ln>
             <a:extLst>
               <a:ext uri="{91240B29-F687-4f45-9708-019B960494DF}">
-                <a14:hiddenLine xmlns:a14="http://schemas.microsoft.com/office/drawing/2010/main" xmlns:a16="http://schemas.microsoft.com/office/drawing/2014/main" xmlns="" w="9525">
+                <a14:hiddenLine xmlns="" xmlns:a16="http://schemas.microsoft.com/office/drawing/2014/main" xmlns:a14="http://schemas.microsoft.com/office/drawing/2010/main" w="9525">
                   <a:solidFill>
                     <a:srgbClr val="000000"/>
                   </a:solidFill>
@@ -17001,7 +17001,7 @@
             </a:ln>
             <a:extLst>
               <a:ext uri="{91240B29-F687-4f45-9708-019B960494DF}">
-                <a14:hiddenLine xmlns:a14="http://schemas.microsoft.com/office/drawing/2010/main" xmlns:a16="http://schemas.microsoft.com/office/drawing/2014/main" xmlns="" w="9525">
+                <a14:hiddenLine xmlns="" xmlns:a16="http://schemas.microsoft.com/office/drawing/2014/main" xmlns:a14="http://schemas.microsoft.com/office/drawing/2010/main" w="9525">
                   <a:solidFill>
                     <a:srgbClr val="000000"/>
                   </a:solidFill>
@@ -17106,7 +17106,7 @@
             </a:ln>
             <a:extLst>
               <a:ext uri="{91240B29-F687-4f45-9708-019B960494DF}">
-                <a14:hiddenLine xmlns:a14="http://schemas.microsoft.com/office/drawing/2010/main" xmlns:a16="http://schemas.microsoft.com/office/drawing/2014/main" xmlns="" w="9525">
+                <a14:hiddenLine xmlns="" xmlns:a16="http://schemas.microsoft.com/office/drawing/2014/main" xmlns:a14="http://schemas.microsoft.com/office/drawing/2010/main" w="9525">
                   <a:solidFill>
                     <a:srgbClr val="000000"/>
                   </a:solidFill>
@@ -17177,7 +17177,7 @@
             </a:ln>
             <a:extLst>
               <a:ext uri="{91240B29-F687-4f45-9708-019B960494DF}">
-                <a14:hiddenLine xmlns:a14="http://schemas.microsoft.com/office/drawing/2010/main" xmlns:a16="http://schemas.microsoft.com/office/drawing/2014/main" xmlns="" w="9525">
+                <a14:hiddenLine xmlns="" xmlns:a16="http://schemas.microsoft.com/office/drawing/2014/main" xmlns:a14="http://schemas.microsoft.com/office/drawing/2010/main" w="9525">
                   <a:solidFill>
                     <a:srgbClr val="000000"/>
                   </a:solidFill>
@@ -17282,7 +17282,7 @@
             </a:ln>
             <a:extLst>
               <a:ext uri="{91240B29-F687-4f45-9708-019B960494DF}">
-                <a14:hiddenLine xmlns:a14="http://schemas.microsoft.com/office/drawing/2010/main" xmlns:a16="http://schemas.microsoft.com/office/drawing/2014/main" xmlns="" w="9525">
+                <a14:hiddenLine xmlns="" xmlns:a16="http://schemas.microsoft.com/office/drawing/2014/main" xmlns:a14="http://schemas.microsoft.com/office/drawing/2010/main" w="9525">
                   <a:solidFill>
                     <a:srgbClr val="000000"/>
                   </a:solidFill>
@@ -17353,7 +17353,7 @@
             </a:ln>
             <a:extLst>
               <a:ext uri="{91240B29-F687-4f45-9708-019B960494DF}">
-                <a14:hiddenLine xmlns:a14="http://schemas.microsoft.com/office/drawing/2010/main" xmlns:a16="http://schemas.microsoft.com/office/drawing/2014/main" xmlns="" w="9525">
+                <a14:hiddenLine xmlns="" xmlns:a16="http://schemas.microsoft.com/office/drawing/2014/main" xmlns:a14="http://schemas.microsoft.com/office/drawing/2010/main" w="9525">
                   <a:solidFill>
                     <a:srgbClr val="000000"/>
                   </a:solidFill>
@@ -17458,7 +17458,7 @@
             </a:ln>
             <a:extLst>
               <a:ext uri="{91240B29-F687-4f45-9708-019B960494DF}">
-                <a14:hiddenLine xmlns:a14="http://schemas.microsoft.com/office/drawing/2010/main" xmlns:a16="http://schemas.microsoft.com/office/drawing/2014/main" xmlns="" w="9525">
+                <a14:hiddenLine xmlns="" xmlns:a16="http://schemas.microsoft.com/office/drawing/2014/main" xmlns:a14="http://schemas.microsoft.com/office/drawing/2010/main" w="9525">
                   <a:solidFill>
                     <a:srgbClr val="000000"/>
                   </a:solidFill>
@@ -17541,7 +17541,7 @@
             </a:ln>
             <a:extLst>
               <a:ext uri="{91240B29-F687-4f45-9708-019B960494DF}">
-                <a14:hiddenLine xmlns:a14="http://schemas.microsoft.com/office/drawing/2010/main" xmlns:a16="http://schemas.microsoft.com/office/drawing/2014/main" xmlns="" w="9525">
+                <a14:hiddenLine xmlns="" xmlns:a16="http://schemas.microsoft.com/office/drawing/2014/main" xmlns:a14="http://schemas.microsoft.com/office/drawing/2010/main" w="9525">
                   <a:solidFill>
                     <a:srgbClr val="000000"/>
                   </a:solidFill>
@@ -17646,7 +17646,7 @@
             </a:ln>
             <a:extLst>
               <a:ext uri="{91240B29-F687-4f45-9708-019B960494DF}">
-                <a14:hiddenLine xmlns:a14="http://schemas.microsoft.com/office/drawing/2010/main" xmlns:a16="http://schemas.microsoft.com/office/drawing/2014/main" xmlns="" w="9525">
+                <a14:hiddenLine xmlns="" xmlns:a16="http://schemas.microsoft.com/office/drawing/2014/main" xmlns:a14="http://schemas.microsoft.com/office/drawing/2010/main" w="9525">
                   <a:solidFill>
                     <a:srgbClr val="000000"/>
                   </a:solidFill>
@@ -17729,7 +17729,7 @@
             </a:ln>
             <a:extLst>
               <a:ext uri="{91240B29-F687-4f45-9708-019B960494DF}">
-                <a14:hiddenLine xmlns:a14="http://schemas.microsoft.com/office/drawing/2010/main" xmlns:a16="http://schemas.microsoft.com/office/drawing/2014/main" xmlns="" w="9525">
+                <a14:hiddenLine xmlns="" xmlns:a16="http://schemas.microsoft.com/office/drawing/2014/main" xmlns:a14="http://schemas.microsoft.com/office/drawing/2010/main" w="9525">
                   <a:solidFill>
                     <a:srgbClr val="000000"/>
                   </a:solidFill>
@@ -17834,7 +17834,7 @@
             </a:ln>
             <a:extLst>
               <a:ext uri="{91240B29-F687-4f45-9708-019B960494DF}">
-                <a14:hiddenLine xmlns:a14="http://schemas.microsoft.com/office/drawing/2010/main" xmlns:a16="http://schemas.microsoft.com/office/drawing/2014/main" xmlns="" w="9525">
+                <a14:hiddenLine xmlns="" xmlns:a16="http://schemas.microsoft.com/office/drawing/2014/main" xmlns:a14="http://schemas.microsoft.com/office/drawing/2010/main" w="9525">
                   <a:solidFill>
                     <a:srgbClr val="000000"/>
                   </a:solidFill>
@@ -17883,7 +17883,7 @@
             </a:ln>
             <a:extLst>
               <a:ext uri="{91240B29-F687-4f45-9708-019B960494DF}">
-                <a14:hiddenLine xmlns:a14="http://schemas.microsoft.com/office/drawing/2010/main" xmlns:a16="http://schemas.microsoft.com/office/drawing/2014/main" xmlns="" w="9525">
+                <a14:hiddenLine xmlns="" xmlns:a16="http://schemas.microsoft.com/office/drawing/2014/main" xmlns:a14="http://schemas.microsoft.com/office/drawing/2010/main" w="9525">
                   <a:solidFill>
                     <a:srgbClr val="000000"/>
                   </a:solidFill>
@@ -17988,7 +17988,7 @@
             </a:ln>
             <a:extLst>
               <a:ext uri="{91240B29-F687-4f45-9708-019B960494DF}">
-                <a14:hiddenLine xmlns:a14="http://schemas.microsoft.com/office/drawing/2010/main" xmlns:a16="http://schemas.microsoft.com/office/drawing/2014/main" xmlns="" w="9525">
+                <a14:hiddenLine xmlns="" xmlns:a16="http://schemas.microsoft.com/office/drawing/2014/main" xmlns:a14="http://schemas.microsoft.com/office/drawing/2010/main" w="9525">
                   <a:solidFill>
                     <a:srgbClr val="000000"/>
                   </a:solidFill>
@@ -18065,7 +18065,7 @@
             </a:ln>
             <a:extLst>
               <a:ext uri="{91240B29-F687-4f45-9708-019B960494DF}">
-                <a14:hiddenLine xmlns:a14="http://schemas.microsoft.com/office/drawing/2010/main" xmlns:a16="http://schemas.microsoft.com/office/drawing/2014/main" xmlns="" w="9525">
+                <a14:hiddenLine xmlns="" xmlns:a16="http://schemas.microsoft.com/office/drawing/2014/main" xmlns:a14="http://schemas.microsoft.com/office/drawing/2010/main" w="9525">
                   <a:solidFill>
                     <a:srgbClr val="000000"/>
                   </a:solidFill>
@@ -18142,7 +18142,7 @@
             </a:ln>
             <a:extLst>
               <a:ext uri="{91240B29-F687-4f45-9708-019B960494DF}">
-                <a14:hiddenLine xmlns:a14="http://schemas.microsoft.com/office/drawing/2010/main" xmlns:a16="http://schemas.microsoft.com/office/drawing/2014/main" xmlns="" w="9525">
+                <a14:hiddenLine xmlns="" xmlns:a16="http://schemas.microsoft.com/office/drawing/2014/main" xmlns:a14="http://schemas.microsoft.com/office/drawing/2010/main" w="9525">
                   <a:solidFill>
                     <a:srgbClr val="000000"/>
                   </a:solidFill>
@@ -18247,7 +18247,7 @@
             </a:ln>
             <a:extLst>
               <a:ext uri="{91240B29-F687-4f45-9708-019B960494DF}">
-                <a14:hiddenLine xmlns:a14="http://schemas.microsoft.com/office/drawing/2010/main" xmlns:a16="http://schemas.microsoft.com/office/drawing/2014/main" xmlns="" w="9525">
+                <a14:hiddenLine xmlns="" xmlns:a16="http://schemas.microsoft.com/office/drawing/2014/main" xmlns:a14="http://schemas.microsoft.com/office/drawing/2010/main" w="9525">
                   <a:solidFill>
                     <a:srgbClr val="000000"/>
                   </a:solidFill>
@@ -18330,7 +18330,7 @@
             </a:ln>
             <a:extLst>
               <a:ext uri="{91240B29-F687-4f45-9708-019B960494DF}">
-                <a14:hiddenLine xmlns:a14="http://schemas.microsoft.com/office/drawing/2010/main" xmlns:a16="http://schemas.microsoft.com/office/drawing/2014/main" xmlns="" w="9525">
+                <a14:hiddenLine xmlns="" xmlns:a16="http://schemas.microsoft.com/office/drawing/2014/main" xmlns:a14="http://schemas.microsoft.com/office/drawing/2010/main" w="9525">
                   <a:solidFill>
                     <a:srgbClr val="000000"/>
                   </a:solidFill>
@@ -18407,7 +18407,7 @@
             </a:ln>
             <a:extLst>
               <a:ext uri="{91240B29-F687-4f45-9708-019B960494DF}">
-                <a14:hiddenLine xmlns:a14="http://schemas.microsoft.com/office/drawing/2010/main" xmlns:a16="http://schemas.microsoft.com/office/drawing/2014/main" xmlns="" w="9525">
+                <a14:hiddenLine xmlns="" xmlns:a16="http://schemas.microsoft.com/office/drawing/2014/main" xmlns:a14="http://schemas.microsoft.com/office/drawing/2010/main" w="9525">
                   <a:solidFill>
                     <a:srgbClr val="000000"/>
                   </a:solidFill>
@@ -18512,7 +18512,7 @@
             </a:ln>
             <a:extLst>
               <a:ext uri="{91240B29-F687-4f45-9708-019B960494DF}">
-                <a14:hiddenLine xmlns:a14="http://schemas.microsoft.com/office/drawing/2010/main" xmlns:a16="http://schemas.microsoft.com/office/drawing/2014/main" xmlns="" w="9525">
+                <a14:hiddenLine xmlns="" xmlns:a16="http://schemas.microsoft.com/office/drawing/2014/main" xmlns:a14="http://schemas.microsoft.com/office/drawing/2010/main" w="9525">
                   <a:solidFill>
                     <a:srgbClr val="000000"/>
                   </a:solidFill>
@@ -18589,7 +18589,7 @@
             </a:ln>
             <a:extLst>
               <a:ext uri="{91240B29-F687-4f45-9708-019B960494DF}">
-                <a14:hiddenLine xmlns:a14="http://schemas.microsoft.com/office/drawing/2010/main" xmlns:a16="http://schemas.microsoft.com/office/drawing/2014/main" xmlns="" w="9525">
+                <a14:hiddenLine xmlns="" xmlns:a16="http://schemas.microsoft.com/office/drawing/2014/main" xmlns:a14="http://schemas.microsoft.com/office/drawing/2010/main" w="9525">
                   <a:solidFill>
                     <a:srgbClr val="000000"/>
                   </a:solidFill>
@@ -18694,7 +18694,7 @@
             </a:ln>
             <a:extLst>
               <a:ext uri="{91240B29-F687-4f45-9708-019B960494DF}">
-                <a14:hiddenLine xmlns:a14="http://schemas.microsoft.com/office/drawing/2010/main" xmlns:a16="http://schemas.microsoft.com/office/drawing/2014/main" xmlns="" w="9525">
+                <a14:hiddenLine xmlns="" xmlns:a16="http://schemas.microsoft.com/office/drawing/2014/main" xmlns:a14="http://schemas.microsoft.com/office/drawing/2010/main" w="9525">
                   <a:solidFill>
                     <a:srgbClr val="000000"/>
                   </a:solidFill>
@@ -18771,7 +18771,7 @@
             </a:ln>
             <a:extLst>
               <a:ext uri="{91240B29-F687-4f45-9708-019B960494DF}">
-                <a14:hiddenLine xmlns:a14="http://schemas.microsoft.com/office/drawing/2010/main" xmlns:a16="http://schemas.microsoft.com/office/drawing/2014/main" xmlns="" w="9525">
+                <a14:hiddenLine xmlns="" xmlns:a16="http://schemas.microsoft.com/office/drawing/2014/main" xmlns:a14="http://schemas.microsoft.com/office/drawing/2010/main" w="9525">
                   <a:solidFill>
                     <a:srgbClr val="000000"/>
                   </a:solidFill>
@@ -18876,7 +18876,7 @@
             </a:ln>
             <a:extLst>
               <a:ext uri="{91240B29-F687-4f45-9708-019B960494DF}">
-                <a14:hiddenLine xmlns:a14="http://schemas.microsoft.com/office/drawing/2010/main" xmlns:a16="http://schemas.microsoft.com/office/drawing/2014/main" xmlns="" w="9525">
+                <a14:hiddenLine xmlns="" xmlns:a16="http://schemas.microsoft.com/office/drawing/2014/main" xmlns:a14="http://schemas.microsoft.com/office/drawing/2010/main" w="9525">
                   <a:solidFill>
                     <a:srgbClr val="000000"/>
                   </a:solidFill>
@@ -18925,7 +18925,7 @@
             </a:ln>
             <a:extLst>
               <a:ext uri="{91240B29-F687-4f45-9708-019B960494DF}">
-                <a14:hiddenLine xmlns:a14="http://schemas.microsoft.com/office/drawing/2010/main" xmlns:a16="http://schemas.microsoft.com/office/drawing/2014/main" xmlns="" w="9525">
+                <a14:hiddenLine xmlns="" xmlns:a16="http://schemas.microsoft.com/office/drawing/2014/main" xmlns:a14="http://schemas.microsoft.com/office/drawing/2010/main" w="9525">
                   <a:solidFill>
                     <a:srgbClr val="000000"/>
                   </a:solidFill>
@@ -19005,7 +19005,7 @@
             </a:ln>
             <a:extLst>
               <a:ext uri="{91240B29-F687-4f45-9708-019B960494DF}">
-                <a14:hiddenLine xmlns:a14="http://schemas.microsoft.com/office/drawing/2010/main" xmlns:a16="http://schemas.microsoft.com/office/drawing/2014/main" xmlns="" w="9525">
+                <a14:hiddenLine xmlns="" xmlns:a16="http://schemas.microsoft.com/office/drawing/2014/main" xmlns:a14="http://schemas.microsoft.com/office/drawing/2010/main" w="9525">
                   <a:solidFill>
                     <a:srgbClr val="000000"/>
                   </a:solidFill>
@@ -19110,7 +19110,7 @@
             </a:ln>
             <a:extLst>
               <a:ext uri="{91240B29-F687-4f45-9708-019B960494DF}">
-                <a14:hiddenLine xmlns:a14="http://schemas.microsoft.com/office/drawing/2010/main" xmlns:a16="http://schemas.microsoft.com/office/drawing/2014/main" xmlns="" w="9525">
+                <a14:hiddenLine xmlns="" xmlns:a16="http://schemas.microsoft.com/office/drawing/2014/main" xmlns:a14="http://schemas.microsoft.com/office/drawing/2010/main" w="9525">
                   <a:solidFill>
                     <a:srgbClr val="000000"/>
                   </a:solidFill>
@@ -19187,7 +19187,7 @@
             </a:ln>
             <a:extLst>
               <a:ext uri="{91240B29-F687-4f45-9708-019B960494DF}">
-                <a14:hiddenLine xmlns:a14="http://schemas.microsoft.com/office/drawing/2010/main" xmlns:a16="http://schemas.microsoft.com/office/drawing/2014/main" xmlns="" w="9525">
+                <a14:hiddenLine xmlns="" xmlns:a16="http://schemas.microsoft.com/office/drawing/2014/main" xmlns:a14="http://schemas.microsoft.com/office/drawing/2010/main" w="9525">
                   <a:solidFill>
                     <a:srgbClr val="000000"/>
                   </a:solidFill>
@@ -19292,7 +19292,7 @@
             </a:ln>
             <a:extLst>
               <a:ext uri="{91240B29-F687-4f45-9708-019B960494DF}">
-                <a14:hiddenLine xmlns:a14="http://schemas.microsoft.com/office/drawing/2010/main" xmlns:a16="http://schemas.microsoft.com/office/drawing/2014/main" xmlns="" w="9525">
+                <a14:hiddenLine xmlns="" xmlns:a16="http://schemas.microsoft.com/office/drawing/2014/main" xmlns:a14="http://schemas.microsoft.com/office/drawing/2010/main" w="9525">
                   <a:solidFill>
                     <a:srgbClr val="000000"/>
                   </a:solidFill>
@@ -19397,7 +19397,7 @@
             </a:ln>
             <a:extLst>
               <a:ext uri="{91240B29-F687-4f45-9708-019B960494DF}">
-                <a14:hiddenLine xmlns:a14="http://schemas.microsoft.com/office/drawing/2010/main" xmlns:a16="http://schemas.microsoft.com/office/drawing/2014/main" xmlns="" w="9525">
+                <a14:hiddenLine xmlns="" xmlns:a16="http://schemas.microsoft.com/office/drawing/2014/main" xmlns:a14="http://schemas.microsoft.com/office/drawing/2010/main" w="9525">
                   <a:solidFill>
                     <a:srgbClr val="000000"/>
                   </a:solidFill>
@@ -19477,7 +19477,7 @@
             </a:ln>
             <a:extLst>
               <a:ext uri="{91240B29-F687-4f45-9708-019B960494DF}">
-                <a14:hiddenLine xmlns:a14="http://schemas.microsoft.com/office/drawing/2010/main" xmlns:a16="http://schemas.microsoft.com/office/drawing/2014/main" xmlns="" w="9525">
+                <a14:hiddenLine xmlns="" xmlns:a16="http://schemas.microsoft.com/office/drawing/2014/main" xmlns:a14="http://schemas.microsoft.com/office/drawing/2010/main" w="9525">
                   <a:solidFill>
                     <a:srgbClr val="000000"/>
                   </a:solidFill>
@@ -19554,7 +19554,7 @@
             </a:ln>
             <a:extLst>
               <a:ext uri="{91240B29-F687-4f45-9708-019B960494DF}">
-                <a14:hiddenLine xmlns:a14="http://schemas.microsoft.com/office/drawing/2010/main" xmlns:a16="http://schemas.microsoft.com/office/drawing/2014/main" xmlns="" w="9525">
+                <a14:hiddenLine xmlns="" xmlns:a16="http://schemas.microsoft.com/office/drawing/2014/main" xmlns:a14="http://schemas.microsoft.com/office/drawing/2010/main" w="9525">
                   <a:solidFill>
                     <a:srgbClr val="000000"/>
                   </a:solidFill>
@@ -19659,7 +19659,7 @@
             </a:ln>
             <a:extLst>
               <a:ext uri="{91240B29-F687-4f45-9708-019B960494DF}">
-                <a14:hiddenLine xmlns:a14="http://schemas.microsoft.com/office/drawing/2010/main" xmlns:a16="http://schemas.microsoft.com/office/drawing/2014/main" xmlns="" w="9525">
+                <a14:hiddenLine xmlns="" xmlns:a16="http://schemas.microsoft.com/office/drawing/2014/main" xmlns:a14="http://schemas.microsoft.com/office/drawing/2010/main" w="9525">
                   <a:solidFill>
                     <a:srgbClr val="000000"/>
                   </a:solidFill>
@@ -19764,7 +19764,7 @@
             </a:ln>
             <a:extLst>
               <a:ext uri="{91240B29-F687-4f45-9708-019B960494DF}">
-                <a14:hiddenLine xmlns:a14="http://schemas.microsoft.com/office/drawing/2010/main" xmlns:a16="http://schemas.microsoft.com/office/drawing/2014/main" xmlns="" w="9525">
+                <a14:hiddenLine xmlns="" xmlns:a16="http://schemas.microsoft.com/office/drawing/2014/main" xmlns:a14="http://schemas.microsoft.com/office/drawing/2010/main" w="9525">
                   <a:solidFill>
                     <a:srgbClr val="000000"/>
                   </a:solidFill>
@@ -19841,7 +19841,7 @@
             </a:ln>
             <a:extLst>
               <a:ext uri="{91240B29-F687-4f45-9708-019B960494DF}">
-                <a14:hiddenLine xmlns:a14="http://schemas.microsoft.com/office/drawing/2010/main" xmlns:a16="http://schemas.microsoft.com/office/drawing/2014/main" xmlns="" w="9525">
+                <a14:hiddenLine xmlns="" xmlns:a16="http://schemas.microsoft.com/office/drawing/2014/main" xmlns:a14="http://schemas.microsoft.com/office/drawing/2010/main" w="9525">
                   <a:solidFill>
                     <a:srgbClr val="000000"/>
                   </a:solidFill>
@@ -19976,7 +19976,7 @@
             </a:ln>
             <a:extLst>
               <a:ext uri="{91240B29-F687-4f45-9708-019B960494DF}">
-                <a14:hiddenLine xmlns:a14="http://schemas.microsoft.com/office/drawing/2010/main" xmlns:a16="http://schemas.microsoft.com/office/drawing/2014/main" xmlns="" w="9525">
+                <a14:hiddenLine xmlns="" xmlns:a16="http://schemas.microsoft.com/office/drawing/2014/main" xmlns:a14="http://schemas.microsoft.com/office/drawing/2010/main" w="9525">
                   <a:solidFill>
                     <a:srgbClr val="000000"/>
                   </a:solidFill>
@@ -20059,7 +20059,7 @@
             </a:ln>
             <a:extLst>
               <a:ext uri="{91240B29-F687-4f45-9708-019B960494DF}">
-                <a14:hiddenLine xmlns:a14="http://schemas.microsoft.com/office/drawing/2010/main" xmlns:a16="http://schemas.microsoft.com/office/drawing/2014/main" xmlns="" w="9525">
+                <a14:hiddenLine xmlns="" xmlns:a16="http://schemas.microsoft.com/office/drawing/2014/main" xmlns:a14="http://schemas.microsoft.com/office/drawing/2010/main" w="9525">
                   <a:solidFill>
                     <a:srgbClr val="000000"/>
                   </a:solidFill>
@@ -20164,7 +20164,7 @@
             </a:ln>
             <a:extLst>
               <a:ext uri="{91240B29-F687-4f45-9708-019B960494DF}">
-                <a14:hiddenLine xmlns:a14="http://schemas.microsoft.com/office/drawing/2010/main" xmlns:a16="http://schemas.microsoft.com/office/drawing/2014/main" xmlns="" w="9525">
+                <a14:hiddenLine xmlns="" xmlns:a16="http://schemas.microsoft.com/office/drawing/2014/main" xmlns:a14="http://schemas.microsoft.com/office/drawing/2010/main" w="9525">
                   <a:solidFill>
                     <a:srgbClr val="000000"/>
                   </a:solidFill>
@@ -20358,7 +20358,7 @@
             </a:ln>
             <a:extLst>
               <a:ext uri="{91240B29-F687-4f45-9708-019B960494DF}">
-                <a14:hiddenLine xmlns:a14="http://schemas.microsoft.com/office/drawing/2010/main" xmlns:p14="http://schemas.microsoft.com/office/powerpoint/2010/main" xmlns:a16="http://schemas.microsoft.com/office/drawing/2014/main" xmlns="" w="9525">
+                <a14:hiddenLine xmlns="" xmlns:a16="http://schemas.microsoft.com/office/drawing/2014/main" xmlns:p14="http://schemas.microsoft.com/office/powerpoint/2010/main" xmlns:a14="http://schemas.microsoft.com/office/drawing/2010/main" w="9525">
                   <a:solidFill>
                     <a:srgbClr val="000000"/>
                   </a:solidFill>
@@ -20463,7 +20463,7 @@
             </a:ln>
             <a:extLst>
               <a:ext uri="{91240B29-F687-4f45-9708-019B960494DF}">
-                <a14:hiddenLine xmlns:a14="http://schemas.microsoft.com/office/drawing/2010/main" xmlns:p14="http://schemas.microsoft.com/office/powerpoint/2010/main" xmlns:a16="http://schemas.microsoft.com/office/drawing/2014/main" xmlns="" w="9525">
+                <a14:hiddenLine xmlns="" xmlns:a16="http://schemas.microsoft.com/office/drawing/2014/main" xmlns:p14="http://schemas.microsoft.com/office/powerpoint/2010/main" xmlns:a14="http://schemas.microsoft.com/office/drawing/2010/main" w="9525">
                   <a:solidFill>
                     <a:srgbClr val="000000"/>
                   </a:solidFill>
@@ -20568,7 +20568,7 @@
             </a:ln>
             <a:extLst>
               <a:ext uri="{91240B29-F687-4f45-9708-019B960494DF}">
-                <a14:hiddenLine xmlns:a14="http://schemas.microsoft.com/office/drawing/2010/main" xmlns:p14="http://schemas.microsoft.com/office/powerpoint/2010/main" xmlns:a16="http://schemas.microsoft.com/office/drawing/2014/main" xmlns="" w="9525">
+                <a14:hiddenLine xmlns="" xmlns:a16="http://schemas.microsoft.com/office/drawing/2014/main" xmlns:p14="http://schemas.microsoft.com/office/powerpoint/2010/main" xmlns:a14="http://schemas.microsoft.com/office/drawing/2010/main" w="9525">
                   <a:solidFill>
                     <a:srgbClr val="000000"/>
                   </a:solidFill>
@@ -20617,7 +20617,7 @@
             </a:ln>
             <a:extLst>
               <a:ext uri="{91240B29-F687-4f45-9708-019B960494DF}">
-                <a14:hiddenLine xmlns:a14="http://schemas.microsoft.com/office/drawing/2010/main" xmlns:p14="http://schemas.microsoft.com/office/powerpoint/2010/main" xmlns:a16="http://schemas.microsoft.com/office/drawing/2014/main" xmlns="" w="9525">
+                <a14:hiddenLine xmlns="" xmlns:a16="http://schemas.microsoft.com/office/drawing/2014/main" xmlns:p14="http://schemas.microsoft.com/office/powerpoint/2010/main" xmlns:a14="http://schemas.microsoft.com/office/drawing/2010/main" w="9525">
                   <a:solidFill>
                     <a:srgbClr val="000000"/>
                   </a:solidFill>
@@ -20722,7 +20722,7 @@
             </a:ln>
             <a:extLst>
               <a:ext uri="{91240B29-F687-4f45-9708-019B960494DF}">
-                <a14:hiddenLine xmlns:a14="http://schemas.microsoft.com/office/drawing/2010/main" xmlns:p14="http://schemas.microsoft.com/office/powerpoint/2010/main" xmlns:a16="http://schemas.microsoft.com/office/drawing/2014/main" xmlns="" w="9525">
+                <a14:hiddenLine xmlns="" xmlns:a16="http://schemas.microsoft.com/office/drawing/2014/main" xmlns:p14="http://schemas.microsoft.com/office/powerpoint/2010/main" xmlns:a14="http://schemas.microsoft.com/office/drawing/2010/main" w="9525">
                   <a:solidFill>
                     <a:srgbClr val="000000"/>
                   </a:solidFill>
@@ -20799,7 +20799,7 @@
             </a:ln>
             <a:extLst>
               <a:ext uri="{91240B29-F687-4f45-9708-019B960494DF}">
-                <a14:hiddenLine xmlns:a14="http://schemas.microsoft.com/office/drawing/2010/main" xmlns:p14="http://schemas.microsoft.com/office/powerpoint/2010/main" xmlns:a16="http://schemas.microsoft.com/office/drawing/2014/main" xmlns="" w="9525">
+                <a14:hiddenLine xmlns="" xmlns:a16="http://schemas.microsoft.com/office/drawing/2014/main" xmlns:p14="http://schemas.microsoft.com/office/powerpoint/2010/main" xmlns:a14="http://schemas.microsoft.com/office/drawing/2010/main" w="9525">
                   <a:solidFill>
                     <a:srgbClr val="000000"/>
                   </a:solidFill>
@@ -20876,7 +20876,7 @@
             </a:ln>
             <a:extLst>
               <a:ext uri="{91240B29-F687-4f45-9708-019B960494DF}">
-                <a14:hiddenLine xmlns:a14="http://schemas.microsoft.com/office/drawing/2010/main" xmlns:p14="http://schemas.microsoft.com/office/powerpoint/2010/main" xmlns:a16="http://schemas.microsoft.com/office/drawing/2014/main" xmlns="" w="9525">
+                <a14:hiddenLine xmlns="" xmlns:a16="http://schemas.microsoft.com/office/drawing/2014/main" xmlns:p14="http://schemas.microsoft.com/office/powerpoint/2010/main" xmlns:a14="http://schemas.microsoft.com/office/drawing/2010/main" w="9525">
                   <a:solidFill>
                     <a:srgbClr val="000000"/>
                   </a:solidFill>
@@ -20981,7 +20981,7 @@
             </a:ln>
             <a:extLst>
               <a:ext uri="{91240B29-F687-4f45-9708-019B960494DF}">
-                <a14:hiddenLine xmlns:a14="http://schemas.microsoft.com/office/drawing/2010/main" xmlns:p14="http://schemas.microsoft.com/office/powerpoint/2010/main" xmlns:a16="http://schemas.microsoft.com/office/drawing/2014/main" xmlns="" w="9525">
+                <a14:hiddenLine xmlns="" xmlns:a16="http://schemas.microsoft.com/office/drawing/2014/main" xmlns:p14="http://schemas.microsoft.com/office/powerpoint/2010/main" xmlns:a14="http://schemas.microsoft.com/office/drawing/2010/main" w="9525">
                   <a:solidFill>
                     <a:srgbClr val="000000"/>
                   </a:solidFill>
@@ -21058,7 +21058,7 @@
             </a:ln>
             <a:extLst>
               <a:ext uri="{91240B29-F687-4f45-9708-019B960494DF}">
-                <a14:hiddenLine xmlns:a14="http://schemas.microsoft.com/office/drawing/2010/main" xmlns:p14="http://schemas.microsoft.com/office/powerpoint/2010/main" xmlns:a16="http://schemas.microsoft.com/office/drawing/2014/main" xmlns="" w="9525">
+                <a14:hiddenLine xmlns="" xmlns:a16="http://schemas.microsoft.com/office/drawing/2014/main" xmlns:p14="http://schemas.microsoft.com/office/powerpoint/2010/main" xmlns:a14="http://schemas.microsoft.com/office/drawing/2010/main" w="9525">
                   <a:solidFill>
                     <a:srgbClr val="000000"/>
                   </a:solidFill>
@@ -21135,7 +21135,7 @@
             </a:ln>
             <a:extLst>
               <a:ext uri="{91240B29-F687-4f45-9708-019B960494DF}">
-                <a14:hiddenLine xmlns:a14="http://schemas.microsoft.com/office/drawing/2010/main" xmlns:p14="http://schemas.microsoft.com/office/powerpoint/2010/main" xmlns:a16="http://schemas.microsoft.com/office/drawing/2014/main" xmlns="" w="9525">
+                <a14:hiddenLine xmlns="" xmlns:a16="http://schemas.microsoft.com/office/drawing/2014/main" xmlns:p14="http://schemas.microsoft.com/office/powerpoint/2010/main" xmlns:a14="http://schemas.microsoft.com/office/drawing/2010/main" w="9525">
                   <a:solidFill>
                     <a:srgbClr val="000000"/>
                   </a:solidFill>
@@ -21240,7 +21240,7 @@
             </a:ln>
             <a:extLst>
               <a:ext uri="{91240B29-F687-4f45-9708-019B960494DF}">
-                <a14:hiddenLine xmlns:a14="http://schemas.microsoft.com/office/drawing/2010/main" xmlns:p14="http://schemas.microsoft.com/office/powerpoint/2010/main" xmlns:a16="http://schemas.microsoft.com/office/drawing/2014/main" xmlns="" w="9525">
+                <a14:hiddenLine xmlns="" xmlns:a16="http://schemas.microsoft.com/office/drawing/2014/main" xmlns:p14="http://schemas.microsoft.com/office/powerpoint/2010/main" xmlns:a14="http://schemas.microsoft.com/office/drawing/2010/main" w="9525">
                   <a:solidFill>
                     <a:srgbClr val="000000"/>
                   </a:solidFill>
@@ -21345,7 +21345,7 @@
             </a:ln>
             <a:extLst>
               <a:ext uri="{91240B29-F687-4f45-9708-019B960494DF}">
-                <a14:hiddenLine xmlns:a14="http://schemas.microsoft.com/office/drawing/2010/main" xmlns:p14="http://schemas.microsoft.com/office/powerpoint/2010/main" xmlns:a16="http://schemas.microsoft.com/office/drawing/2014/main" xmlns="" w="9525">
+                <a14:hiddenLine xmlns="" xmlns:a16="http://schemas.microsoft.com/office/drawing/2014/main" xmlns:p14="http://schemas.microsoft.com/office/powerpoint/2010/main" xmlns:a14="http://schemas.microsoft.com/office/drawing/2010/main" w="9525">
                   <a:solidFill>
                     <a:srgbClr val="000000"/>
                   </a:solidFill>
@@ -21422,7 +21422,7 @@
             </a:ln>
             <a:extLst>
               <a:ext uri="{91240B29-F687-4f45-9708-019B960494DF}">
-                <a14:hiddenLine xmlns:a14="http://schemas.microsoft.com/office/drawing/2010/main" xmlns:p14="http://schemas.microsoft.com/office/powerpoint/2010/main" xmlns:a16="http://schemas.microsoft.com/office/drawing/2014/main" xmlns="" w="9525">
+                <a14:hiddenLine xmlns="" xmlns:a16="http://schemas.microsoft.com/office/drawing/2014/main" xmlns:p14="http://schemas.microsoft.com/office/powerpoint/2010/main" xmlns:a14="http://schemas.microsoft.com/office/drawing/2010/main" w="9525">
                   <a:solidFill>
                     <a:srgbClr val="000000"/>
                   </a:solidFill>
@@ -21547,7 +21547,7 @@
             </a:ln>
             <a:extLst>
               <a:ext uri="{91240B29-F687-4f45-9708-019B960494DF}">
-                <a14:hiddenLine xmlns:a14="http://schemas.microsoft.com/office/drawing/2010/main" xmlns:p14="http://schemas.microsoft.com/office/powerpoint/2010/main" xmlns:a16="http://schemas.microsoft.com/office/drawing/2014/main" xmlns="" w="9525">
+                <a14:hiddenLine xmlns="" xmlns:a16="http://schemas.microsoft.com/office/drawing/2014/main" xmlns:p14="http://schemas.microsoft.com/office/powerpoint/2010/main" xmlns:a14="http://schemas.microsoft.com/office/drawing/2010/main" w="9525">
                   <a:solidFill>
                     <a:srgbClr val="000000"/>
                   </a:solidFill>
@@ -21624,7 +21624,7 @@
             </a:ln>
             <a:extLst>
               <a:ext uri="{91240B29-F687-4f45-9708-019B960494DF}">
-                <a14:hiddenLine xmlns:a14="http://schemas.microsoft.com/office/drawing/2010/main" xmlns:p14="http://schemas.microsoft.com/office/powerpoint/2010/main" xmlns:a16="http://schemas.microsoft.com/office/drawing/2014/main" xmlns="" w="9525">
+                <a14:hiddenLine xmlns="" xmlns:a16="http://schemas.microsoft.com/office/drawing/2014/main" xmlns:p14="http://schemas.microsoft.com/office/powerpoint/2010/main" xmlns:a14="http://schemas.microsoft.com/office/drawing/2010/main" w="9525">
                   <a:solidFill>
                     <a:srgbClr val="000000"/>
                   </a:solidFill>
@@ -21729,7 +21729,7 @@
             </a:ln>
             <a:extLst>
               <a:ext uri="{91240B29-F687-4f45-9708-019B960494DF}">
-                <a14:hiddenLine xmlns:a14="http://schemas.microsoft.com/office/drawing/2010/main" xmlns:p14="http://schemas.microsoft.com/office/powerpoint/2010/main" xmlns:a16="http://schemas.microsoft.com/office/drawing/2014/main" xmlns="" w="9525">
+                <a14:hiddenLine xmlns="" xmlns:a16="http://schemas.microsoft.com/office/drawing/2014/main" xmlns:p14="http://schemas.microsoft.com/office/powerpoint/2010/main" xmlns:a14="http://schemas.microsoft.com/office/drawing/2010/main" w="9525">
                   <a:solidFill>
                     <a:srgbClr val="000000"/>
                   </a:solidFill>
@@ -21834,7 +21834,7 @@
             </a:ln>
             <a:extLst>
               <a:ext uri="{91240B29-F687-4f45-9708-019B960494DF}">
-                <a14:hiddenLine xmlns:a14="http://schemas.microsoft.com/office/drawing/2010/main" xmlns:p14="http://schemas.microsoft.com/office/powerpoint/2010/main" xmlns:a16="http://schemas.microsoft.com/office/drawing/2014/main" xmlns="" w="9525">
+                <a14:hiddenLine xmlns="" xmlns:a16="http://schemas.microsoft.com/office/drawing/2014/main" xmlns:p14="http://schemas.microsoft.com/office/powerpoint/2010/main" xmlns:a14="http://schemas.microsoft.com/office/drawing/2010/main" w="9525">
                   <a:solidFill>
                     <a:srgbClr val="000000"/>
                   </a:solidFill>
@@ -21911,7 +21911,7 @@
             </a:ln>
             <a:extLst>
               <a:ext uri="{91240B29-F687-4f45-9708-019B960494DF}">
-                <a14:hiddenLine xmlns:a14="http://schemas.microsoft.com/office/drawing/2010/main" xmlns:p14="http://schemas.microsoft.com/office/powerpoint/2010/main" xmlns:a16="http://schemas.microsoft.com/office/drawing/2014/main" xmlns="" w="9525">
+                <a14:hiddenLine xmlns="" xmlns:a16="http://schemas.microsoft.com/office/drawing/2014/main" xmlns:p14="http://schemas.microsoft.com/office/powerpoint/2010/main" xmlns:a14="http://schemas.microsoft.com/office/drawing/2010/main" w="9525">
                   <a:solidFill>
                     <a:srgbClr val="000000"/>
                   </a:solidFill>
@@ -22016,7 +22016,7 @@
             </a:ln>
             <a:extLst>
               <a:ext uri="{91240B29-F687-4f45-9708-019B960494DF}">
-                <a14:hiddenLine xmlns:a14="http://schemas.microsoft.com/office/drawing/2010/main" xmlns:p14="http://schemas.microsoft.com/office/powerpoint/2010/main" xmlns:a16="http://schemas.microsoft.com/office/drawing/2014/main" xmlns="" w="9525">
+                <a14:hiddenLine xmlns="" xmlns:a16="http://schemas.microsoft.com/office/drawing/2014/main" xmlns:p14="http://schemas.microsoft.com/office/powerpoint/2010/main" xmlns:a14="http://schemas.microsoft.com/office/drawing/2010/main" w="9525">
                   <a:solidFill>
                     <a:srgbClr val="000000"/>
                   </a:solidFill>
@@ -22121,7 +22121,7 @@
             </a:ln>
             <a:extLst>
               <a:ext uri="{91240B29-F687-4f45-9708-019B960494DF}">
-                <a14:hiddenLine xmlns:a14="http://schemas.microsoft.com/office/drawing/2010/main" xmlns:p14="http://schemas.microsoft.com/office/powerpoint/2010/main" xmlns:a16="http://schemas.microsoft.com/office/drawing/2014/main" xmlns="" w="9525">
+                <a14:hiddenLine xmlns="" xmlns:a16="http://schemas.microsoft.com/office/drawing/2014/main" xmlns:p14="http://schemas.microsoft.com/office/powerpoint/2010/main" xmlns:a14="http://schemas.microsoft.com/office/drawing/2010/main" w="9525">
                   <a:solidFill>
                     <a:srgbClr val="000000"/>
                   </a:solidFill>
@@ -22192,7 +22192,7 @@
             </a:ln>
             <a:extLst>
               <a:ext uri="{91240B29-F687-4f45-9708-019B960494DF}">
-                <a14:hiddenLine xmlns:a14="http://schemas.microsoft.com/office/drawing/2010/main" xmlns:p14="http://schemas.microsoft.com/office/powerpoint/2010/main" xmlns:a16="http://schemas.microsoft.com/office/drawing/2014/main" xmlns="" w="9525">
+                <a14:hiddenLine xmlns="" xmlns:a16="http://schemas.microsoft.com/office/drawing/2014/main" xmlns:p14="http://schemas.microsoft.com/office/powerpoint/2010/main" xmlns:a14="http://schemas.microsoft.com/office/drawing/2010/main" w="9525">
                   <a:solidFill>
                     <a:srgbClr val="000000"/>
                   </a:solidFill>
@@ -22297,7 +22297,7 @@
             </a:ln>
             <a:extLst>
               <a:ext uri="{91240B29-F687-4f45-9708-019B960494DF}">
-                <a14:hiddenLine xmlns:a14="http://schemas.microsoft.com/office/drawing/2010/main" xmlns:p14="http://schemas.microsoft.com/office/powerpoint/2010/main" xmlns:a16="http://schemas.microsoft.com/office/drawing/2014/main" xmlns="" w="9525">
+                <a14:hiddenLine xmlns="" xmlns:a16="http://schemas.microsoft.com/office/drawing/2014/main" xmlns:p14="http://schemas.microsoft.com/office/powerpoint/2010/main" xmlns:a14="http://schemas.microsoft.com/office/drawing/2010/main" w="9525">
                   <a:solidFill>
                     <a:srgbClr val="000000"/>
                   </a:solidFill>
@@ -22368,7 +22368,7 @@
             </a:ln>
             <a:extLst>
               <a:ext uri="{91240B29-F687-4f45-9708-019B960494DF}">
-                <a14:hiddenLine xmlns:a14="http://schemas.microsoft.com/office/drawing/2010/main" xmlns:p14="http://schemas.microsoft.com/office/powerpoint/2010/main" xmlns:a16="http://schemas.microsoft.com/office/drawing/2014/main" xmlns="" w="9525">
+                <a14:hiddenLine xmlns="" xmlns:a16="http://schemas.microsoft.com/office/drawing/2014/main" xmlns:p14="http://schemas.microsoft.com/office/powerpoint/2010/main" xmlns:a14="http://schemas.microsoft.com/office/drawing/2010/main" w="9525">
                   <a:solidFill>
                     <a:srgbClr val="000000"/>
                   </a:solidFill>
@@ -22473,7 +22473,7 @@
             </a:ln>
             <a:extLst>
               <a:ext uri="{91240B29-F687-4f45-9708-019B960494DF}">
-                <a14:hiddenLine xmlns:a14="http://schemas.microsoft.com/office/drawing/2010/main" xmlns:p14="http://schemas.microsoft.com/office/powerpoint/2010/main" xmlns:a16="http://schemas.microsoft.com/office/drawing/2014/main" xmlns="" w="9525">
+                <a14:hiddenLine xmlns="" xmlns:a16="http://schemas.microsoft.com/office/drawing/2014/main" xmlns:p14="http://schemas.microsoft.com/office/powerpoint/2010/main" xmlns:a14="http://schemas.microsoft.com/office/drawing/2010/main" w="9525">
                   <a:solidFill>
                     <a:srgbClr val="000000"/>
                   </a:solidFill>
@@ -22556,7 +22556,7 @@
             </a:ln>
             <a:extLst>
               <a:ext uri="{91240B29-F687-4f45-9708-019B960494DF}">
-                <a14:hiddenLine xmlns:a14="http://schemas.microsoft.com/office/drawing/2010/main" xmlns:p14="http://schemas.microsoft.com/office/powerpoint/2010/main" xmlns:a16="http://schemas.microsoft.com/office/drawing/2014/main" xmlns="" w="9525">
+                <a14:hiddenLine xmlns="" xmlns:a16="http://schemas.microsoft.com/office/drawing/2014/main" xmlns:p14="http://schemas.microsoft.com/office/powerpoint/2010/main" xmlns:a14="http://schemas.microsoft.com/office/drawing/2010/main" w="9525">
                   <a:solidFill>
                     <a:srgbClr val="000000"/>
                   </a:solidFill>
@@ -22661,7 +22661,7 @@
             </a:ln>
             <a:extLst>
               <a:ext uri="{91240B29-F687-4f45-9708-019B960494DF}">
-                <a14:hiddenLine xmlns:a14="http://schemas.microsoft.com/office/drawing/2010/main" xmlns:p14="http://schemas.microsoft.com/office/powerpoint/2010/main" xmlns:a16="http://schemas.microsoft.com/office/drawing/2014/main" xmlns="" w="9525">
+                <a14:hiddenLine xmlns="" xmlns:a16="http://schemas.microsoft.com/office/drawing/2014/main" xmlns:p14="http://schemas.microsoft.com/office/powerpoint/2010/main" xmlns:a14="http://schemas.microsoft.com/office/drawing/2010/main" w="9525">
                   <a:solidFill>
                     <a:srgbClr val="000000"/>
                   </a:solidFill>
@@ -22744,7 +22744,7 @@
             </a:ln>
             <a:extLst>
               <a:ext uri="{91240B29-F687-4f45-9708-019B960494DF}">
-                <a14:hiddenLine xmlns:a14="http://schemas.microsoft.com/office/drawing/2010/main" xmlns:p14="http://schemas.microsoft.com/office/powerpoint/2010/main" xmlns:a16="http://schemas.microsoft.com/office/drawing/2014/main" xmlns="" w="9525">
+                <a14:hiddenLine xmlns="" xmlns:a16="http://schemas.microsoft.com/office/drawing/2014/main" xmlns:p14="http://schemas.microsoft.com/office/powerpoint/2010/main" xmlns:a14="http://schemas.microsoft.com/office/drawing/2010/main" w="9525">
                   <a:solidFill>
                     <a:srgbClr val="000000"/>
                   </a:solidFill>
@@ -22849,7 +22849,7 @@
             </a:ln>
             <a:extLst>
               <a:ext uri="{91240B29-F687-4f45-9708-019B960494DF}">
-                <a14:hiddenLine xmlns:a14="http://schemas.microsoft.com/office/drawing/2010/main" xmlns:p14="http://schemas.microsoft.com/office/powerpoint/2010/main" xmlns:a16="http://schemas.microsoft.com/office/drawing/2014/main" xmlns="" w="9525">
+                <a14:hiddenLine xmlns="" xmlns:a16="http://schemas.microsoft.com/office/drawing/2014/main" xmlns:p14="http://schemas.microsoft.com/office/powerpoint/2010/main" xmlns:a14="http://schemas.microsoft.com/office/drawing/2010/main" w="9525">
                   <a:solidFill>
                     <a:srgbClr val="000000"/>
                   </a:solidFill>
@@ -22898,7 +22898,7 @@
             </a:ln>
             <a:extLst>
               <a:ext uri="{91240B29-F687-4f45-9708-019B960494DF}">
-                <a14:hiddenLine xmlns:a14="http://schemas.microsoft.com/office/drawing/2010/main" xmlns:p14="http://schemas.microsoft.com/office/powerpoint/2010/main" xmlns:a16="http://schemas.microsoft.com/office/drawing/2014/main" xmlns="" w="9525">
+                <a14:hiddenLine xmlns="" xmlns:a16="http://schemas.microsoft.com/office/drawing/2014/main" xmlns:p14="http://schemas.microsoft.com/office/powerpoint/2010/main" xmlns:a14="http://schemas.microsoft.com/office/drawing/2010/main" w="9525">
                   <a:solidFill>
                     <a:srgbClr val="000000"/>
                   </a:solidFill>
@@ -23003,7 +23003,7 @@
             </a:ln>
             <a:extLst>
               <a:ext uri="{91240B29-F687-4f45-9708-019B960494DF}">
-                <a14:hiddenLine xmlns:a14="http://schemas.microsoft.com/office/drawing/2010/main" xmlns:p14="http://schemas.microsoft.com/office/powerpoint/2010/main" xmlns:a16="http://schemas.microsoft.com/office/drawing/2014/main" xmlns="" w="9525">
+                <a14:hiddenLine xmlns="" xmlns:a16="http://schemas.microsoft.com/office/drawing/2014/main" xmlns:p14="http://schemas.microsoft.com/office/powerpoint/2010/main" xmlns:a14="http://schemas.microsoft.com/office/drawing/2010/main" w="9525">
                   <a:solidFill>
                     <a:srgbClr val="000000"/>
                   </a:solidFill>
@@ -23080,7 +23080,7 @@
             </a:ln>
             <a:extLst>
               <a:ext uri="{91240B29-F687-4f45-9708-019B960494DF}">
-                <a14:hiddenLine xmlns:a14="http://schemas.microsoft.com/office/drawing/2010/main" xmlns:p14="http://schemas.microsoft.com/office/powerpoint/2010/main" xmlns:a16="http://schemas.microsoft.com/office/drawing/2014/main" xmlns="" w="9525">
+                <a14:hiddenLine xmlns="" xmlns:a16="http://schemas.microsoft.com/office/drawing/2014/main" xmlns:p14="http://schemas.microsoft.com/office/powerpoint/2010/main" xmlns:a14="http://schemas.microsoft.com/office/drawing/2010/main" w="9525">
                   <a:solidFill>
                     <a:srgbClr val="000000"/>
                   </a:solidFill>
@@ -23157,7 +23157,7 @@
             </a:ln>
             <a:extLst>
               <a:ext uri="{91240B29-F687-4f45-9708-019B960494DF}">
-                <a14:hiddenLine xmlns:a14="http://schemas.microsoft.com/office/drawing/2010/main" xmlns:p14="http://schemas.microsoft.com/office/powerpoint/2010/main" xmlns:a16="http://schemas.microsoft.com/office/drawing/2014/main" xmlns="" w="9525">
+                <a14:hiddenLine xmlns="" xmlns:a16="http://schemas.microsoft.com/office/drawing/2014/main" xmlns:p14="http://schemas.microsoft.com/office/powerpoint/2010/main" xmlns:a14="http://schemas.microsoft.com/office/drawing/2010/main" w="9525">
                   <a:solidFill>
                     <a:srgbClr val="000000"/>
                   </a:solidFill>
@@ -23262,7 +23262,7 @@
             </a:ln>
             <a:extLst>
               <a:ext uri="{91240B29-F687-4f45-9708-019B960494DF}">
-                <a14:hiddenLine xmlns:a14="http://schemas.microsoft.com/office/drawing/2010/main" xmlns:p14="http://schemas.microsoft.com/office/powerpoint/2010/main" xmlns:a16="http://schemas.microsoft.com/office/drawing/2014/main" xmlns="" w="9525">
+                <a14:hiddenLine xmlns="" xmlns:a16="http://schemas.microsoft.com/office/drawing/2014/main" xmlns:p14="http://schemas.microsoft.com/office/powerpoint/2010/main" xmlns:a14="http://schemas.microsoft.com/office/drawing/2010/main" w="9525">
                   <a:solidFill>
                     <a:srgbClr val="000000"/>
                   </a:solidFill>
@@ -23345,7 +23345,7 @@
             </a:ln>
             <a:extLst>
               <a:ext uri="{91240B29-F687-4f45-9708-019B960494DF}">
-                <a14:hiddenLine xmlns:a14="http://schemas.microsoft.com/office/drawing/2010/main" xmlns:p14="http://schemas.microsoft.com/office/powerpoint/2010/main" xmlns:a16="http://schemas.microsoft.com/office/drawing/2014/main" xmlns="" w="9525">
+                <a14:hiddenLine xmlns="" xmlns:a16="http://schemas.microsoft.com/office/drawing/2014/main" xmlns:p14="http://schemas.microsoft.com/office/powerpoint/2010/main" xmlns:a14="http://schemas.microsoft.com/office/drawing/2010/main" w="9525">
                   <a:solidFill>
                     <a:srgbClr val="000000"/>
                   </a:solidFill>
@@ -23422,7 +23422,7 @@
             </a:ln>
             <a:extLst>
               <a:ext uri="{91240B29-F687-4f45-9708-019B960494DF}">
-                <a14:hiddenLine xmlns:a14="http://schemas.microsoft.com/office/drawing/2010/main" xmlns:p14="http://schemas.microsoft.com/office/powerpoint/2010/main" xmlns:a16="http://schemas.microsoft.com/office/drawing/2014/main" xmlns="" w="9525">
+                <a14:hiddenLine xmlns="" xmlns:a16="http://schemas.microsoft.com/office/drawing/2014/main" xmlns:p14="http://schemas.microsoft.com/office/powerpoint/2010/main" xmlns:a14="http://schemas.microsoft.com/office/drawing/2010/main" w="9525">
                   <a:solidFill>
                     <a:srgbClr val="000000"/>
                   </a:solidFill>
@@ -23527,7 +23527,7 @@
             </a:ln>
             <a:extLst>
               <a:ext uri="{91240B29-F687-4f45-9708-019B960494DF}">
-                <a14:hiddenLine xmlns:a14="http://schemas.microsoft.com/office/drawing/2010/main" xmlns:p14="http://schemas.microsoft.com/office/powerpoint/2010/main" xmlns:a16="http://schemas.microsoft.com/office/drawing/2014/main" xmlns="" w="9525">
+                <a14:hiddenLine xmlns="" xmlns:a16="http://schemas.microsoft.com/office/drawing/2014/main" xmlns:p14="http://schemas.microsoft.com/office/powerpoint/2010/main" xmlns:a14="http://schemas.microsoft.com/office/drawing/2010/main" w="9525">
                   <a:solidFill>
                     <a:srgbClr val="000000"/>
                   </a:solidFill>
@@ -23604,7 +23604,7 @@
             </a:ln>
             <a:extLst>
               <a:ext uri="{91240B29-F687-4f45-9708-019B960494DF}">
-                <a14:hiddenLine xmlns:a14="http://schemas.microsoft.com/office/drawing/2010/main" xmlns:p14="http://schemas.microsoft.com/office/powerpoint/2010/main" xmlns:a16="http://schemas.microsoft.com/office/drawing/2014/main" xmlns="" w="9525">
+                <a14:hiddenLine xmlns="" xmlns:a16="http://schemas.microsoft.com/office/drawing/2014/main" xmlns:p14="http://schemas.microsoft.com/office/powerpoint/2010/main" xmlns:a14="http://schemas.microsoft.com/office/drawing/2010/main" w="9525">
                   <a:solidFill>
                     <a:srgbClr val="000000"/>
                   </a:solidFill>
@@ -23709,7 +23709,7 @@
             </a:ln>
             <a:extLst>
               <a:ext uri="{91240B29-F687-4f45-9708-019B960494DF}">
-                <a14:hiddenLine xmlns:a14="http://schemas.microsoft.com/office/drawing/2010/main" xmlns:p14="http://schemas.microsoft.com/office/powerpoint/2010/main" xmlns:a16="http://schemas.microsoft.com/office/drawing/2014/main" xmlns="" w="9525">
+                <a14:hiddenLine xmlns="" xmlns:a16="http://schemas.microsoft.com/office/drawing/2014/main" xmlns:p14="http://schemas.microsoft.com/office/powerpoint/2010/main" xmlns:a14="http://schemas.microsoft.com/office/drawing/2010/main" w="9525">
                   <a:solidFill>
                     <a:srgbClr val="000000"/>
                   </a:solidFill>
@@ -23786,7 +23786,7 @@
             </a:ln>
             <a:extLst>
               <a:ext uri="{91240B29-F687-4f45-9708-019B960494DF}">
-                <a14:hiddenLine xmlns:a14="http://schemas.microsoft.com/office/drawing/2010/main" xmlns:p14="http://schemas.microsoft.com/office/powerpoint/2010/main" xmlns:a16="http://schemas.microsoft.com/office/drawing/2014/main" xmlns="" w="9525">
+                <a14:hiddenLine xmlns="" xmlns:a16="http://schemas.microsoft.com/office/drawing/2014/main" xmlns:p14="http://schemas.microsoft.com/office/powerpoint/2010/main" xmlns:a14="http://schemas.microsoft.com/office/drawing/2010/main" w="9525">
                   <a:solidFill>
                     <a:srgbClr val="000000"/>
                   </a:solidFill>
@@ -23891,7 +23891,7 @@
             </a:ln>
             <a:extLst>
               <a:ext uri="{91240B29-F687-4f45-9708-019B960494DF}">
-                <a14:hiddenLine xmlns:a14="http://schemas.microsoft.com/office/drawing/2010/main" xmlns:p14="http://schemas.microsoft.com/office/powerpoint/2010/main" xmlns:a16="http://schemas.microsoft.com/office/drawing/2014/main" xmlns="" w="9525">
+                <a14:hiddenLine xmlns="" xmlns:a16="http://schemas.microsoft.com/office/drawing/2014/main" xmlns:p14="http://schemas.microsoft.com/office/powerpoint/2010/main" xmlns:a14="http://schemas.microsoft.com/office/drawing/2010/main" w="9525">
                   <a:solidFill>
                     <a:srgbClr val="000000"/>
                   </a:solidFill>
@@ -23940,7 +23940,7 @@
             </a:ln>
             <a:extLst>
               <a:ext uri="{91240B29-F687-4f45-9708-019B960494DF}">
-                <a14:hiddenLine xmlns:a14="http://schemas.microsoft.com/office/drawing/2010/main" xmlns:p14="http://schemas.microsoft.com/office/powerpoint/2010/main" xmlns:a16="http://schemas.microsoft.com/office/drawing/2014/main" xmlns="" w="9525">
+                <a14:hiddenLine xmlns="" xmlns:a16="http://schemas.microsoft.com/office/drawing/2014/main" xmlns:p14="http://schemas.microsoft.com/office/powerpoint/2010/main" xmlns:a14="http://schemas.microsoft.com/office/drawing/2010/main" w="9525">
                   <a:solidFill>
                     <a:srgbClr val="000000"/>
                   </a:solidFill>
@@ -24020,7 +24020,7 @@
             </a:ln>
             <a:extLst>
               <a:ext uri="{91240B29-F687-4f45-9708-019B960494DF}">
-                <a14:hiddenLine xmlns:a14="http://schemas.microsoft.com/office/drawing/2010/main" xmlns:p14="http://schemas.microsoft.com/office/powerpoint/2010/main" xmlns:a16="http://schemas.microsoft.com/office/drawing/2014/main" xmlns="" w="9525">
+                <a14:hiddenLine xmlns="" xmlns:a16="http://schemas.microsoft.com/office/drawing/2014/main" xmlns:p14="http://schemas.microsoft.com/office/powerpoint/2010/main" xmlns:a14="http://schemas.microsoft.com/office/drawing/2010/main" w="9525">
                   <a:solidFill>
                     <a:srgbClr val="000000"/>
                   </a:solidFill>
@@ -24125,7 +24125,7 @@
             </a:ln>
             <a:extLst>
               <a:ext uri="{91240B29-F687-4f45-9708-019B960494DF}">
-                <a14:hiddenLine xmlns:a14="http://schemas.microsoft.com/office/drawing/2010/main" xmlns:p14="http://schemas.microsoft.com/office/powerpoint/2010/main" xmlns:a16="http://schemas.microsoft.com/office/drawing/2014/main" xmlns="" w="9525">
+                <a14:hiddenLine xmlns="" xmlns:a16="http://schemas.microsoft.com/office/drawing/2014/main" xmlns:p14="http://schemas.microsoft.com/office/powerpoint/2010/main" xmlns:a14="http://schemas.microsoft.com/office/drawing/2010/main" w="9525">
                   <a:solidFill>
                     <a:srgbClr val="000000"/>
                   </a:solidFill>
@@ -24202,7 +24202,7 @@
             </a:ln>
             <a:extLst>
               <a:ext uri="{91240B29-F687-4f45-9708-019B960494DF}">
-                <a14:hiddenLine xmlns:a14="http://schemas.microsoft.com/office/drawing/2010/main" xmlns:p14="http://schemas.microsoft.com/office/powerpoint/2010/main" xmlns:a16="http://schemas.microsoft.com/office/drawing/2014/main" xmlns="" w="9525">
+                <a14:hiddenLine xmlns="" xmlns:a16="http://schemas.microsoft.com/office/drawing/2014/main" xmlns:p14="http://schemas.microsoft.com/office/powerpoint/2010/main" xmlns:a14="http://schemas.microsoft.com/office/drawing/2010/main" w="9525">
                   <a:solidFill>
                     <a:srgbClr val="000000"/>
                   </a:solidFill>
@@ -24307,7 +24307,7 @@
             </a:ln>
             <a:extLst>
               <a:ext uri="{91240B29-F687-4f45-9708-019B960494DF}">
-                <a14:hiddenLine xmlns:a14="http://schemas.microsoft.com/office/drawing/2010/main" xmlns:p14="http://schemas.microsoft.com/office/powerpoint/2010/main" xmlns:a16="http://schemas.microsoft.com/office/drawing/2014/main" xmlns="" w="9525">
+                <a14:hiddenLine xmlns="" xmlns:a16="http://schemas.microsoft.com/office/drawing/2014/main" xmlns:p14="http://schemas.microsoft.com/office/powerpoint/2010/main" xmlns:a14="http://schemas.microsoft.com/office/drawing/2010/main" w="9525">
                   <a:solidFill>
                     <a:srgbClr val="000000"/>
                   </a:solidFill>
@@ -24412,7 +24412,7 @@
             </a:ln>
             <a:extLst>
               <a:ext uri="{91240B29-F687-4f45-9708-019B960494DF}">
-                <a14:hiddenLine xmlns:a14="http://schemas.microsoft.com/office/drawing/2010/main" xmlns:p14="http://schemas.microsoft.com/office/powerpoint/2010/main" xmlns:a16="http://schemas.microsoft.com/office/drawing/2014/main" xmlns="" w="9525">
+                <a14:hiddenLine xmlns="" xmlns:a16="http://schemas.microsoft.com/office/drawing/2014/main" xmlns:p14="http://schemas.microsoft.com/office/powerpoint/2010/main" xmlns:a14="http://schemas.microsoft.com/office/drawing/2010/main" w="9525">
                   <a:solidFill>
                     <a:srgbClr val="000000"/>
                   </a:solidFill>
@@ -24492,7 +24492,7 @@
             </a:ln>
             <a:extLst>
               <a:ext uri="{91240B29-F687-4f45-9708-019B960494DF}">
-                <a14:hiddenLine xmlns:a14="http://schemas.microsoft.com/office/drawing/2010/main" xmlns:p14="http://schemas.microsoft.com/office/powerpoint/2010/main" xmlns:a16="http://schemas.microsoft.com/office/drawing/2014/main" xmlns="" w="9525">
+                <a14:hiddenLine xmlns="" xmlns:a16="http://schemas.microsoft.com/office/drawing/2014/main" xmlns:p14="http://schemas.microsoft.com/office/powerpoint/2010/main" xmlns:a14="http://schemas.microsoft.com/office/drawing/2010/main" w="9525">
                   <a:solidFill>
                     <a:srgbClr val="000000"/>
                   </a:solidFill>
@@ -24569,7 +24569,7 @@
             </a:ln>
             <a:extLst>
               <a:ext uri="{91240B29-F687-4f45-9708-019B960494DF}">
-                <a14:hiddenLine xmlns:a14="http://schemas.microsoft.com/office/drawing/2010/main" xmlns:p14="http://schemas.microsoft.com/office/powerpoint/2010/main" xmlns:a16="http://schemas.microsoft.com/office/drawing/2014/main" xmlns="" w="9525">
+                <a14:hiddenLine xmlns="" xmlns:a16="http://schemas.microsoft.com/office/drawing/2014/main" xmlns:p14="http://schemas.microsoft.com/office/powerpoint/2010/main" xmlns:a14="http://schemas.microsoft.com/office/drawing/2010/main" w="9525">
                   <a:solidFill>
                     <a:srgbClr val="000000"/>
                   </a:solidFill>
@@ -24674,7 +24674,7 @@
             </a:ln>
             <a:extLst>
               <a:ext uri="{91240B29-F687-4f45-9708-019B960494DF}">
-                <a14:hiddenLine xmlns:a14="http://schemas.microsoft.com/office/drawing/2010/main" xmlns:p14="http://schemas.microsoft.com/office/powerpoint/2010/main" xmlns:a16="http://schemas.microsoft.com/office/drawing/2014/main" xmlns="" w="9525">
+                <a14:hiddenLine xmlns="" xmlns:a16="http://schemas.microsoft.com/office/drawing/2014/main" xmlns:p14="http://schemas.microsoft.com/office/powerpoint/2010/main" xmlns:a14="http://schemas.microsoft.com/office/drawing/2010/main" w="9525">
                   <a:solidFill>
                     <a:srgbClr val="000000"/>
                   </a:solidFill>
@@ -24779,7 +24779,7 @@
             </a:ln>
             <a:extLst>
               <a:ext uri="{91240B29-F687-4f45-9708-019B960494DF}">
-                <a14:hiddenLine xmlns:a14="http://schemas.microsoft.com/office/drawing/2010/main" xmlns:p14="http://schemas.microsoft.com/office/powerpoint/2010/main" xmlns:a16="http://schemas.microsoft.com/office/drawing/2014/main" xmlns="" w="9525">
+                <a14:hiddenLine xmlns="" xmlns:a16="http://schemas.microsoft.com/office/drawing/2014/main" xmlns:p14="http://schemas.microsoft.com/office/powerpoint/2010/main" xmlns:a14="http://schemas.microsoft.com/office/drawing/2010/main" w="9525">
                   <a:solidFill>
                     <a:srgbClr val="000000"/>
                   </a:solidFill>
@@ -24856,7 +24856,7 @@
             </a:ln>
             <a:extLst>
               <a:ext uri="{91240B29-F687-4f45-9708-019B960494DF}">
-                <a14:hiddenLine xmlns:a14="http://schemas.microsoft.com/office/drawing/2010/main" xmlns:p14="http://schemas.microsoft.com/office/powerpoint/2010/main" xmlns:a16="http://schemas.microsoft.com/office/drawing/2014/main" xmlns="" w="9525">
+                <a14:hiddenLine xmlns="" xmlns:a16="http://schemas.microsoft.com/office/drawing/2014/main" xmlns:p14="http://schemas.microsoft.com/office/powerpoint/2010/main" xmlns:a14="http://schemas.microsoft.com/office/drawing/2010/main" w="9525">
                   <a:solidFill>
                     <a:srgbClr val="000000"/>
                   </a:solidFill>
@@ -24991,7 +24991,7 @@
             </a:ln>
             <a:extLst>
               <a:ext uri="{91240B29-F687-4f45-9708-019B960494DF}">
-                <a14:hiddenLine xmlns:a14="http://schemas.microsoft.com/office/drawing/2010/main" xmlns:p14="http://schemas.microsoft.com/office/powerpoint/2010/main" xmlns:a16="http://schemas.microsoft.com/office/drawing/2014/main" xmlns="" w="9525">
+                <a14:hiddenLine xmlns="" xmlns:a16="http://schemas.microsoft.com/office/drawing/2014/main" xmlns:p14="http://schemas.microsoft.com/office/powerpoint/2010/main" xmlns:a14="http://schemas.microsoft.com/office/drawing/2010/main" w="9525">
                   <a:solidFill>
                     <a:srgbClr val="000000"/>
                   </a:solidFill>
@@ -25074,7 +25074,7 @@
             </a:ln>
             <a:extLst>
               <a:ext uri="{91240B29-F687-4f45-9708-019B960494DF}">
-                <a14:hiddenLine xmlns:a14="http://schemas.microsoft.com/office/drawing/2010/main" xmlns:p14="http://schemas.microsoft.com/office/powerpoint/2010/main" xmlns:a16="http://schemas.microsoft.com/office/drawing/2014/main" xmlns="" w="9525">
+                <a14:hiddenLine xmlns="" xmlns:a16="http://schemas.microsoft.com/office/drawing/2014/main" xmlns:p14="http://schemas.microsoft.com/office/powerpoint/2010/main" xmlns:a14="http://schemas.microsoft.com/office/drawing/2010/main" w="9525">
                   <a:solidFill>
                     <a:srgbClr val="000000"/>
                   </a:solidFill>
@@ -25179,7 +25179,7 @@
             </a:ln>
             <a:extLst>
               <a:ext uri="{91240B29-F687-4f45-9708-019B960494DF}">
-                <a14:hiddenLine xmlns:a14="http://schemas.microsoft.com/office/drawing/2010/main" xmlns:p14="http://schemas.microsoft.com/office/powerpoint/2010/main" xmlns:a16="http://schemas.microsoft.com/office/drawing/2014/main" xmlns="" w="9525">
+                <a14:hiddenLine xmlns="" xmlns:a16="http://schemas.microsoft.com/office/drawing/2014/main" xmlns:p14="http://schemas.microsoft.com/office/powerpoint/2010/main" xmlns:a14="http://schemas.microsoft.com/office/drawing/2010/main" w="9525">
                   <a:solidFill>
                     <a:srgbClr val="000000"/>
                   </a:solidFill>

</xml_diff>